<commit_message>
#12 Extend informations on slides
</commit_message>
<xml_diff>
--- a/SAI_presentation.pptx
+++ b/SAI_presentation.pptx
@@ -109,6 +109,11 @@
       </a:defRPr>
     </a:lvl9pPr>
   </p:defaultTextStyle>
+  <p:extLst>
+    <p:ext uri="{EFAFB233-063F-42B5-8137-9DF3F51BA10A}">
+      <p15:sldGuideLst xmlns:p15="http://schemas.microsoft.com/office/powerpoint/2012/main"/>
+    </p:ext>
+  </p:extLst>
 </p:presentation>
 </file>
 
@@ -5891,6 +5896,48 @@
           <a:bodyPr/>
           <a:lstStyle/>
           <a:p>
+            <a:r>
+              <a:rPr lang="fr-FR"/>
+              <a:t>Create SAI with pyinstaller</a:t>
+            </a:r>
+          </a:p>
+          <a:p>
+            <a:r>
+              <a:rPr lang="fr-FR"/>
+              <a:t>Launch a scan that remove duplicate screenshot and order them by interesting strategie</a:t>
+            </a:r>
+          </a:p>
+          <a:p>
+            <a:r>
+              <a:rPr lang="fr-FR"/>
+              <a:t>Increment the reward if there was difference between images</a:t>
+            </a:r>
+          </a:p>
+          <a:p>
+            <a:r>
+              <a:rPr lang="fr-FR"/>
+              <a:t>Create a web page with the strategies learned</a:t>
+            </a:r>
+          </a:p>
+          <a:p>
+            <a:r>
+              <a:rPr lang="fr-FR"/>
+              <a:t>Create a web interface or a vocal controller to order strategies</a:t>
+            </a:r>
+          </a:p>
+          <a:p>
+            <a:endParaRPr lang="fr-FR"/>
+          </a:p>
+          <a:p>
+            <a:endParaRPr lang="fr-FR"/>
+          </a:p>
+          <a:p>
+            <a:endParaRPr lang="fr-FR"/>
+          </a:p>
+          <a:p>
+            <a:endParaRPr lang="fr-FR"/>
+          </a:p>
+          <a:p>
             <a:endParaRPr lang="en-GB"/>
           </a:p>
         </p:txBody>
@@ -5975,6 +6022,16 @@
           <a:bodyPr/>
           <a:lstStyle/>
           <a:p>
+            <a:r>
+              <a:rPr lang="fr-FR"/>
+              <a:t>Show a graph with the strategies learn with a little picture</a:t>
+            </a:r>
+          </a:p>
+          <a:p>
+            <a:r>
+              <a:rPr lang="fr-FR"/>
+              <a:t>Show the web interface to choose strategies</a:t>
+            </a:r>
             <a:endParaRPr lang="en-GB"/>
           </a:p>
         </p:txBody>
@@ -6059,6 +6116,28 @@
           <a:bodyPr/>
           <a:lstStyle/>
           <a:p>
+            <a:r>
+              <a:rPr lang="fr-FR"/>
+              <a:t>Need a human to teach SIA like a baby</a:t>
+            </a:r>
+          </a:p>
+          <a:p>
+            <a:r>
+              <a:rPr lang="fr-FR"/>
+              <a:t>The SIA will looks like the human teacher at the beginning</a:t>
+            </a:r>
+          </a:p>
+          <a:p>
+            <a:r>
+              <a:rPr lang="fr-FR"/>
+              <a:t>After a treshold it will learn alone</a:t>
+            </a:r>
+          </a:p>
+          <a:p>
+            <a:r>
+              <a:rPr lang="fr-FR"/>
+              <a:t>Self learn need to be implemented</a:t>
+            </a:r>
             <a:endParaRPr lang="en-GB"/>
           </a:p>
         </p:txBody>

</xml_diff>

<commit_message>
#12 Add the annexe with the component SAI schema
</commit_message>
<xml_diff>
--- a/SAI_presentation.pptx
+++ b/SAI_presentation.pptx
@@ -11,6 +11,8 @@
     <p:sldId id="259" r:id="rId5"/>
     <p:sldId id="260" r:id="rId6"/>
     <p:sldId id="261" r:id="rId7"/>
+    <p:sldId id="262" r:id="rId8"/>
+    <p:sldId id="263" r:id="rId9"/>
   </p:sldIdLst>
   <p:sldSz cx="12192000" cy="6858000"/>
   <p:notesSz cx="6858000" cy="9144000"/>
@@ -309,7 +311,7 @@
             <a:fld id="{B61BEF0D-F0BB-DE4B-95CE-6DB70DBA9567}" type="datetimeFigureOut">
               <a:rPr lang="en-US" dirty="0"/>
               <a:pPr/>
-              <a:t>10/5/2019</a:t>
+              <a:t>10/11/2019</a:t>
             </a:fld>
             <a:endParaRPr lang="en-US" dirty="0"/>
           </a:p>
@@ -742,7 +744,7 @@
             <a:fld id="{B61BEF0D-F0BB-DE4B-95CE-6DB70DBA9567}" type="datetimeFigureOut">
               <a:rPr lang="en-US" dirty="0"/>
               <a:pPr/>
-              <a:t>10/5/2019</a:t>
+              <a:t>10/11/2019</a:t>
             </a:fld>
             <a:endParaRPr lang="en-US" dirty="0"/>
           </a:p>
@@ -989,7 +991,7 @@
             <a:fld id="{B61BEF0D-F0BB-DE4B-95CE-6DB70DBA9567}" type="datetimeFigureOut">
               <a:rPr lang="en-US" dirty="0"/>
               <a:pPr/>
-              <a:t>10/5/2019</a:t>
+              <a:t>10/11/2019</a:t>
             </a:fld>
             <a:endParaRPr lang="en-US" dirty="0"/>
           </a:p>
@@ -1294,7 +1296,7 @@
             <a:fld id="{B61BEF0D-F0BB-DE4B-95CE-6DB70DBA9567}" type="datetimeFigureOut">
               <a:rPr lang="en-US" dirty="0"/>
               <a:pPr/>
-              <a:t>10/5/2019</a:t>
+              <a:t>10/11/2019</a:t>
             </a:fld>
             <a:endParaRPr lang="en-US" dirty="0"/>
           </a:p>
@@ -1609,7 +1611,7 @@
             <a:fld id="{B61BEF0D-F0BB-DE4B-95CE-6DB70DBA9567}" type="datetimeFigureOut">
               <a:rPr lang="en-US" dirty="0"/>
               <a:pPr/>
-              <a:t>10/5/2019</a:t>
+              <a:t>10/11/2019</a:t>
             </a:fld>
             <a:endParaRPr lang="en-US" dirty="0"/>
           </a:p>
@@ -1908,7 +1910,7 @@
             <a:fld id="{B61BEF0D-F0BB-DE4B-95CE-6DB70DBA9567}" type="datetimeFigureOut">
               <a:rPr lang="en-US" dirty="0"/>
               <a:pPr/>
-              <a:t>10/5/2019</a:t>
+              <a:t>10/11/2019</a:t>
             </a:fld>
             <a:endParaRPr lang="en-US" dirty="0"/>
           </a:p>
@@ -2272,7 +2274,7 @@
             <a:fld id="{B61BEF0D-F0BB-DE4B-95CE-6DB70DBA9567}" type="datetimeFigureOut">
               <a:rPr lang="en-US" dirty="0"/>
               <a:pPr/>
-              <a:t>10/5/2019</a:t>
+              <a:t>10/11/2019</a:t>
             </a:fld>
             <a:endParaRPr lang="en-US" dirty="0"/>
           </a:p>
@@ -2443,7 +2445,7 @@
             <a:fld id="{B61BEF0D-F0BB-DE4B-95CE-6DB70DBA9567}" type="datetimeFigureOut">
               <a:rPr lang="en-US" dirty="0"/>
               <a:pPr/>
-              <a:t>10/5/2019</a:t>
+              <a:t>10/11/2019</a:t>
             </a:fld>
             <a:endParaRPr lang="en-US" dirty="0"/>
           </a:p>
@@ -2620,7 +2622,7 @@
             <a:fld id="{B61BEF0D-F0BB-DE4B-95CE-6DB70DBA9567}" type="datetimeFigureOut">
               <a:rPr lang="en-US" dirty="0"/>
               <a:pPr/>
-              <a:t>10/5/2019</a:t>
+              <a:t>10/11/2019</a:t>
             </a:fld>
             <a:endParaRPr lang="en-US" dirty="0"/>
           </a:p>
@@ -2787,7 +2789,7 @@
             <a:fld id="{B61BEF0D-F0BB-DE4B-95CE-6DB70DBA9567}" type="datetimeFigureOut">
               <a:rPr lang="en-US" dirty="0"/>
               <a:pPr/>
-              <a:t>10/5/2019</a:t>
+              <a:t>10/11/2019</a:t>
             </a:fld>
             <a:endParaRPr lang="en-US" dirty="0"/>
           </a:p>
@@ -3034,7 +3036,7 @@
             <a:fld id="{B61BEF0D-F0BB-DE4B-95CE-6DB70DBA9567}" type="datetimeFigureOut">
               <a:rPr lang="en-US" dirty="0"/>
               <a:pPr/>
-              <a:t>10/5/2019</a:t>
+              <a:t>10/11/2019</a:t>
             </a:fld>
             <a:endParaRPr lang="en-US" dirty="0"/>
           </a:p>
@@ -3267,7 +3269,7 @@
             <a:fld id="{B61BEF0D-F0BB-DE4B-95CE-6DB70DBA9567}" type="datetimeFigureOut">
               <a:rPr lang="en-US" dirty="0"/>
               <a:pPr/>
-              <a:t>10/5/2019</a:t>
+              <a:t>10/11/2019</a:t>
             </a:fld>
             <a:endParaRPr lang="en-US" dirty="0"/>
           </a:p>
@@ -3646,7 +3648,7 @@
             <a:fld id="{B61BEF0D-F0BB-DE4B-95CE-6DB70DBA9567}" type="datetimeFigureOut">
               <a:rPr lang="en-US" dirty="0"/>
               <a:pPr/>
-              <a:t>10/5/2019</a:t>
+              <a:t>10/11/2019</a:t>
             </a:fld>
             <a:endParaRPr lang="en-US" dirty="0"/>
           </a:p>
@@ -3761,7 +3763,7 @@
             <a:fld id="{B61BEF0D-F0BB-DE4B-95CE-6DB70DBA9567}" type="datetimeFigureOut">
               <a:rPr lang="en-US" dirty="0"/>
               <a:pPr/>
-              <a:t>10/5/2019</a:t>
+              <a:t>10/11/2019</a:t>
             </a:fld>
             <a:endParaRPr lang="en-US" dirty="0"/>
           </a:p>
@@ -3853,7 +3855,7 @@
             <a:fld id="{B61BEF0D-F0BB-DE4B-95CE-6DB70DBA9567}" type="datetimeFigureOut">
               <a:rPr lang="en-US" dirty="0"/>
               <a:pPr/>
-              <a:t>10/5/2019</a:t>
+              <a:t>10/11/2019</a:t>
             </a:fld>
             <a:endParaRPr lang="en-US" dirty="0"/>
           </a:p>
@@ -4105,7 +4107,7 @@
             <a:fld id="{B61BEF0D-F0BB-DE4B-95CE-6DB70DBA9567}" type="datetimeFigureOut">
               <a:rPr lang="en-US" dirty="0"/>
               <a:pPr/>
-              <a:t>10/5/2019</a:t>
+              <a:t>10/11/2019</a:t>
             </a:fld>
             <a:endParaRPr lang="en-US" dirty="0"/>
           </a:p>
@@ -4385,7 +4387,7 @@
             <a:fld id="{B61BEF0D-F0BB-DE4B-95CE-6DB70DBA9567}" type="datetimeFigureOut">
               <a:rPr lang="en-US" dirty="0"/>
               <a:pPr/>
-              <a:t>10/5/2019</a:t>
+              <a:t>10/11/2019</a:t>
             </a:fld>
             <a:endParaRPr lang="en-US" dirty="0"/>
           </a:p>
@@ -4788,7 +4790,7 @@
             <a:fld id="{B61BEF0D-F0BB-DE4B-95CE-6DB70DBA9567}" type="datetimeFigureOut">
               <a:rPr lang="en-US" dirty="0"/>
               <a:pPr/>
-              <a:t>10/5/2019</a:t>
+              <a:t>10/11/2019</a:t>
             </a:fld>
             <a:endParaRPr lang="en-US" dirty="0"/>
           </a:p>
@@ -5893,52 +5895,203 @@
         </p:nvSpPr>
         <p:spPr/>
         <p:txBody>
-          <a:bodyPr/>
-          <a:lstStyle/>
-          <a:p>
-            <a:r>
-              <a:rPr lang="fr-FR"/>
-              <a:t>Create SAI with pyinstaller</a:t>
-            </a:r>
-          </a:p>
-          <a:p>
-            <a:r>
-              <a:rPr lang="fr-FR"/>
-              <a:t>Launch a scan that remove duplicate screenshot and order them by interesting strategie</a:t>
-            </a:r>
-          </a:p>
-          <a:p>
-            <a:r>
-              <a:rPr lang="fr-FR"/>
-              <a:t>Increment the reward if there was difference between images</a:t>
-            </a:r>
-          </a:p>
-          <a:p>
-            <a:r>
-              <a:rPr lang="fr-FR"/>
-              <a:t>Create a web page with the strategies learned</a:t>
-            </a:r>
-          </a:p>
-          <a:p>
-            <a:r>
-              <a:rPr lang="fr-FR"/>
-              <a:t>Create a web interface or a vocal controller to order strategies</a:t>
-            </a:r>
-          </a:p>
-          <a:p>
-            <a:endParaRPr lang="fr-FR"/>
-          </a:p>
-          <a:p>
-            <a:endParaRPr lang="fr-FR"/>
-          </a:p>
-          <a:p>
-            <a:endParaRPr lang="fr-FR"/>
-          </a:p>
-          <a:p>
-            <a:endParaRPr lang="fr-FR"/>
-          </a:p>
-          <a:p>
-            <a:endParaRPr lang="en-GB"/>
+          <a:bodyPr>
+            <a:normAutofit/>
+          </a:bodyPr>
+          <a:lstStyle/>
+          <a:p>
+            <a:r>
+              <a:rPr lang="fr-FR" dirty="0" err="1"/>
+              <a:t>Create</a:t>
+            </a:r>
+            <a:r>
+              <a:rPr lang="fr-FR" dirty="0"/>
+              <a:t> SAI </a:t>
+            </a:r>
+            <a:r>
+              <a:rPr lang="fr-FR" dirty="0" err="1"/>
+              <a:t>with</a:t>
+            </a:r>
+            <a:r>
+              <a:rPr lang="fr-FR" dirty="0"/>
+              <a:t> </a:t>
+            </a:r>
+            <a:r>
+              <a:rPr lang="fr-FR" dirty="0" err="1"/>
+              <a:t>pyinstaller</a:t>
+            </a:r>
+            <a:endParaRPr lang="fr-FR" dirty="0"/>
+          </a:p>
+          <a:p>
+            <a:r>
+              <a:rPr lang="fr-FR" dirty="0"/>
+              <a:t>Launch a scan </a:t>
+            </a:r>
+            <a:r>
+              <a:rPr lang="fr-FR" dirty="0" err="1"/>
+              <a:t>that</a:t>
+            </a:r>
+            <a:r>
+              <a:rPr lang="fr-FR" dirty="0"/>
+              <a:t> </a:t>
+            </a:r>
+            <a:r>
+              <a:rPr lang="fr-FR" dirty="0" err="1"/>
+              <a:t>remove</a:t>
+            </a:r>
+            <a:r>
+              <a:rPr lang="fr-FR" dirty="0"/>
+              <a:t> duplicate </a:t>
+            </a:r>
+            <a:r>
+              <a:rPr lang="fr-FR" dirty="0" err="1"/>
+              <a:t>screenshot</a:t>
+            </a:r>
+            <a:r>
+              <a:rPr lang="fr-FR" dirty="0"/>
+              <a:t> and </a:t>
+            </a:r>
+            <a:r>
+              <a:rPr lang="fr-FR" dirty="0" err="1"/>
+              <a:t>order</a:t>
+            </a:r>
+            <a:r>
+              <a:rPr lang="fr-FR" dirty="0"/>
+              <a:t> </a:t>
+            </a:r>
+            <a:r>
+              <a:rPr lang="fr-FR" dirty="0" err="1"/>
+              <a:t>them</a:t>
+            </a:r>
+            <a:r>
+              <a:rPr lang="fr-FR" dirty="0"/>
+              <a:t> by </a:t>
+            </a:r>
+            <a:r>
+              <a:rPr lang="fr-FR" dirty="0" err="1"/>
+              <a:t>interesting</a:t>
+            </a:r>
+            <a:r>
+              <a:rPr lang="fr-FR" dirty="0"/>
+              <a:t> </a:t>
+            </a:r>
+            <a:r>
+              <a:rPr lang="fr-FR" dirty="0" err="1"/>
+              <a:t>strategie</a:t>
+            </a:r>
+            <a:endParaRPr lang="fr-FR" dirty="0"/>
+          </a:p>
+          <a:p>
+            <a:r>
+              <a:rPr lang="fr-FR" dirty="0" err="1"/>
+              <a:t>Increment</a:t>
+            </a:r>
+            <a:r>
+              <a:rPr lang="fr-FR" dirty="0"/>
+              <a:t> the </a:t>
+            </a:r>
+            <a:r>
+              <a:rPr lang="fr-FR" dirty="0" err="1"/>
+              <a:t>reward</a:t>
+            </a:r>
+            <a:r>
+              <a:rPr lang="fr-FR" dirty="0"/>
+              <a:t> if </a:t>
+            </a:r>
+            <a:r>
+              <a:rPr lang="fr-FR" dirty="0" err="1"/>
+              <a:t>there</a:t>
+            </a:r>
+            <a:r>
+              <a:rPr lang="fr-FR" dirty="0"/>
+              <a:t> </a:t>
+            </a:r>
+            <a:r>
+              <a:rPr lang="fr-FR" dirty="0" err="1"/>
+              <a:t>was</a:t>
+            </a:r>
+            <a:r>
+              <a:rPr lang="fr-FR" dirty="0"/>
+              <a:t> </a:t>
+            </a:r>
+            <a:r>
+              <a:rPr lang="fr-FR" dirty="0" err="1"/>
+              <a:t>difference</a:t>
+            </a:r>
+            <a:r>
+              <a:rPr lang="fr-FR" dirty="0"/>
+              <a:t> </a:t>
+            </a:r>
+            <a:r>
+              <a:rPr lang="fr-FR" dirty="0" err="1"/>
+              <a:t>between</a:t>
+            </a:r>
+            <a:r>
+              <a:rPr lang="fr-FR" dirty="0"/>
+              <a:t> images</a:t>
+            </a:r>
+          </a:p>
+          <a:p>
+            <a:r>
+              <a:rPr lang="fr-FR" dirty="0" err="1"/>
+              <a:t>Create</a:t>
+            </a:r>
+            <a:r>
+              <a:rPr lang="fr-FR" dirty="0"/>
+              <a:t> a web page </a:t>
+            </a:r>
+            <a:r>
+              <a:rPr lang="fr-FR" dirty="0" err="1"/>
+              <a:t>with</a:t>
+            </a:r>
+            <a:r>
+              <a:rPr lang="fr-FR" dirty="0"/>
+              <a:t> the </a:t>
+            </a:r>
+            <a:r>
+              <a:rPr lang="fr-FR" dirty="0" err="1"/>
+              <a:t>strategies</a:t>
+            </a:r>
+            <a:r>
+              <a:rPr lang="fr-FR" dirty="0"/>
+              <a:t> </a:t>
+            </a:r>
+            <a:r>
+              <a:rPr lang="fr-FR" dirty="0" err="1"/>
+              <a:t>learned</a:t>
+            </a:r>
+            <a:endParaRPr lang="fr-FR" dirty="0"/>
+          </a:p>
+          <a:p>
+            <a:r>
+              <a:rPr lang="fr-FR" dirty="0" err="1"/>
+              <a:t>Create</a:t>
+            </a:r>
+            <a:r>
+              <a:rPr lang="fr-FR" dirty="0"/>
+              <a:t> a web interface or a vocal </a:t>
+            </a:r>
+            <a:r>
+              <a:rPr lang="fr-FR" dirty="0" err="1"/>
+              <a:t>controller</a:t>
+            </a:r>
+            <a:r>
+              <a:rPr lang="fr-FR" dirty="0"/>
+              <a:t> to </a:t>
+            </a:r>
+            <a:r>
+              <a:rPr lang="fr-FR" dirty="0" err="1"/>
+              <a:t>order</a:t>
+            </a:r>
+            <a:r>
+              <a:rPr lang="fr-FR" dirty="0"/>
+              <a:t> </a:t>
+            </a:r>
+            <a:r>
+              <a:rPr lang="fr-FR" dirty="0" err="1"/>
+              <a:t>strategies</a:t>
+            </a:r>
+            <a:endParaRPr lang="fr-FR" dirty="0"/>
           </a:p>
         </p:txBody>
       </p:sp>
@@ -6117,28 +6270,150 @@
           <a:lstStyle/>
           <a:p>
             <a:r>
-              <a:rPr lang="fr-FR"/>
-              <a:t>Need a human to teach SIA like a baby</a:t>
-            </a:r>
-          </a:p>
-          <a:p>
-            <a:r>
-              <a:rPr lang="fr-FR"/>
-              <a:t>The SIA will looks like the human teacher at the beginning</a:t>
-            </a:r>
-          </a:p>
-          <a:p>
-            <a:r>
-              <a:rPr lang="fr-FR"/>
-              <a:t>After a treshold it will learn alone</a:t>
-            </a:r>
-          </a:p>
-          <a:p>
-            <a:r>
-              <a:rPr lang="fr-FR"/>
-              <a:t>Self learn need to be implemented</a:t>
-            </a:r>
-            <a:endParaRPr lang="en-GB"/>
+              <a:rPr lang="fr-FR" dirty="0"/>
+              <a:t>Need a </a:t>
+            </a:r>
+            <a:r>
+              <a:rPr lang="fr-FR" dirty="0" err="1"/>
+              <a:t>human</a:t>
+            </a:r>
+            <a:r>
+              <a:rPr lang="fr-FR" dirty="0"/>
+              <a:t> to </a:t>
+            </a:r>
+            <a:r>
+              <a:rPr lang="fr-FR" dirty="0" err="1"/>
+              <a:t>teach</a:t>
+            </a:r>
+            <a:r>
+              <a:rPr lang="fr-FR" dirty="0"/>
+              <a:t> SIA like a baby (Full time 54k €, </a:t>
+            </a:r>
+            <a:r>
+              <a:rPr lang="fr-FR" dirty="0" err="1"/>
+              <a:t>send</a:t>
+            </a:r>
+            <a:r>
+              <a:rPr lang="fr-FR" dirty="0"/>
+              <a:t> CV and ML at johnny.nguyen1192@gmail.com)</a:t>
+            </a:r>
+          </a:p>
+          <a:p>
+            <a:r>
+              <a:rPr lang="fr-FR" dirty="0"/>
+              <a:t>The SIA </a:t>
+            </a:r>
+            <a:r>
+              <a:rPr lang="fr-FR" dirty="0" err="1"/>
+              <a:t>will</a:t>
+            </a:r>
+            <a:r>
+              <a:rPr lang="fr-FR" dirty="0"/>
+              <a:t> looks like the </a:t>
+            </a:r>
+            <a:r>
+              <a:rPr lang="fr-FR" dirty="0" err="1"/>
+              <a:t>human</a:t>
+            </a:r>
+            <a:r>
+              <a:rPr lang="fr-FR" dirty="0"/>
+              <a:t> </a:t>
+            </a:r>
+            <a:r>
+              <a:rPr lang="fr-FR" dirty="0" err="1"/>
+              <a:t>teacher</a:t>
+            </a:r>
+            <a:r>
+              <a:rPr lang="fr-FR" dirty="0"/>
+              <a:t> at the </a:t>
+            </a:r>
+            <a:r>
+              <a:rPr lang="fr-FR" dirty="0" err="1"/>
+              <a:t>beginning</a:t>
+            </a:r>
+            <a:endParaRPr lang="fr-FR" dirty="0"/>
+          </a:p>
+          <a:p>
+            <a:r>
+              <a:rPr lang="fr-FR" dirty="0" err="1"/>
+              <a:t>After</a:t>
+            </a:r>
+            <a:r>
+              <a:rPr lang="fr-FR" dirty="0"/>
+              <a:t> a </a:t>
+            </a:r>
+            <a:r>
+              <a:rPr lang="fr-FR" dirty="0" err="1"/>
+              <a:t>treshold</a:t>
+            </a:r>
+            <a:r>
+              <a:rPr lang="fr-FR" dirty="0"/>
+              <a:t> </a:t>
+            </a:r>
+            <a:r>
+              <a:rPr lang="fr-FR" dirty="0" err="1"/>
+              <a:t>it</a:t>
+            </a:r>
+            <a:r>
+              <a:rPr lang="fr-FR" dirty="0"/>
+              <a:t> </a:t>
+            </a:r>
+            <a:r>
+              <a:rPr lang="fr-FR" dirty="0" err="1"/>
+              <a:t>will</a:t>
+            </a:r>
+            <a:r>
+              <a:rPr lang="fr-FR" dirty="0"/>
+              <a:t> </a:t>
+            </a:r>
+            <a:r>
+              <a:rPr lang="fr-FR" dirty="0" err="1"/>
+              <a:t>learn</a:t>
+            </a:r>
+            <a:r>
+              <a:rPr lang="fr-FR" dirty="0"/>
+              <a:t> </a:t>
+            </a:r>
+            <a:r>
+              <a:rPr lang="fr-FR" dirty="0" err="1"/>
+              <a:t>alone</a:t>
+            </a:r>
+            <a:endParaRPr lang="fr-FR" dirty="0"/>
+          </a:p>
+          <a:p>
+            <a:r>
+              <a:rPr lang="fr-FR" dirty="0"/>
+              <a:t>Self </a:t>
+            </a:r>
+            <a:r>
+              <a:rPr lang="fr-FR" dirty="0" err="1"/>
+              <a:t>learn</a:t>
+            </a:r>
+            <a:r>
+              <a:rPr lang="fr-FR" dirty="0"/>
+              <a:t> </a:t>
+            </a:r>
+            <a:r>
+              <a:rPr lang="fr-FR" dirty="0" err="1"/>
+              <a:t>need</a:t>
+            </a:r>
+            <a:r>
+              <a:rPr lang="fr-FR" dirty="0"/>
+              <a:t> to </a:t>
+            </a:r>
+            <a:r>
+              <a:rPr lang="fr-FR" dirty="0" err="1"/>
+              <a:t>be</a:t>
+            </a:r>
+            <a:r>
+              <a:rPr lang="fr-FR" dirty="0"/>
+              <a:t> </a:t>
+            </a:r>
+            <a:r>
+              <a:rPr lang="fr-FR" dirty="0" err="1"/>
+              <a:t>implemented</a:t>
+            </a:r>
+            <a:endParaRPr lang="en-GB" dirty="0"/>
           </a:p>
         </p:txBody>
       </p:sp>
@@ -6146,6 +6421,816 @@
     <p:extLst>
       <p:ext uri="{BB962C8B-B14F-4D97-AF65-F5344CB8AC3E}">
         <p14:creationId xmlns:p14="http://schemas.microsoft.com/office/powerpoint/2010/main" val="2526747130"/>
+      </p:ext>
+    </p:extLst>
+  </p:cSld>
+  <p:clrMapOvr>
+    <a:masterClrMapping/>
+  </p:clrMapOvr>
+</p:sld>
+</file>
+
+<file path=ppt/slides/slide7.xml><?xml version="1.0" encoding="utf-8"?>
+<p:sld xmlns:a="http://schemas.openxmlformats.org/drawingml/2006/main" xmlns:r="http://schemas.openxmlformats.org/officeDocument/2006/relationships" xmlns:p="http://schemas.openxmlformats.org/presentationml/2006/main">
+  <p:cSld>
+    <p:spTree>
+      <p:nvGrpSpPr>
+        <p:cNvPr id="1" name=""/>
+        <p:cNvGrpSpPr/>
+        <p:nvPr/>
+      </p:nvGrpSpPr>
+      <p:grpSpPr>
+        <a:xfrm>
+          <a:off x="0" y="0"/>
+          <a:ext cx="0" cy="0"/>
+          <a:chOff x="0" y="0"/>
+          <a:chExt cx="0" cy="0"/>
+        </a:xfrm>
+      </p:grpSpPr>
+      <p:sp>
+        <p:nvSpPr>
+          <p:cNvPr id="2" name="Titre 1">
+            <a:extLst>
+              <a:ext uri="{FF2B5EF4-FFF2-40B4-BE49-F238E27FC236}">
+                <a16:creationId xmlns:a16="http://schemas.microsoft.com/office/drawing/2014/main" id="{23C29B9B-505B-4802-8C02-4A6FC4D8E25C}"/>
+              </a:ext>
+            </a:extLst>
+          </p:cNvPr>
+          <p:cNvSpPr>
+            <a:spLocks noGrp="1"/>
+          </p:cNvSpPr>
+          <p:nvPr>
+            <p:ph type="title"/>
+          </p:nvPr>
+        </p:nvSpPr>
+        <p:spPr/>
+        <p:txBody>
+          <a:bodyPr/>
+          <a:lstStyle/>
+          <a:p>
+            <a:r>
+              <a:rPr lang="fr-FR" dirty="0"/>
+              <a:t>annexe</a:t>
+            </a:r>
+            <a:endParaRPr lang="en-GB" dirty="0"/>
+          </a:p>
+        </p:txBody>
+      </p:sp>
+      <p:pic>
+        <p:nvPicPr>
+          <p:cNvPr id="8" name="Graphique 7" descr="Cerveau">
+            <a:extLst>
+              <a:ext uri="{FF2B5EF4-FFF2-40B4-BE49-F238E27FC236}">
+                <a16:creationId xmlns:a16="http://schemas.microsoft.com/office/drawing/2014/main" id="{682917FD-8351-43DD-B751-221C027F590A}"/>
+              </a:ext>
+            </a:extLst>
+          </p:cNvPr>
+          <p:cNvPicPr>
+            <a:picLocks noChangeAspect="1"/>
+          </p:cNvPicPr>
+          <p:nvPr/>
+        </p:nvPicPr>
+        <p:blipFill>
+          <a:blip r:embed="rId2">
+            <a:extLst>
+              <a:ext uri="{96DAC541-7B7A-43D3-8B79-37D633B846F1}">
+                <asvg:svgBlip xmlns:asvg="http://schemas.microsoft.com/office/drawing/2016/SVG/main" r:embed="rId3"/>
+              </a:ext>
+            </a:extLst>
+          </a:blip>
+          <a:stretch>
+            <a:fillRect/>
+          </a:stretch>
+        </p:blipFill>
+        <p:spPr>
+          <a:xfrm>
+            <a:off x="5221551" y="75588"/>
+            <a:ext cx="914400" cy="914400"/>
+          </a:xfrm>
+          <a:prstGeom prst="rect">
+            <a:avLst/>
+          </a:prstGeom>
+        </p:spPr>
+      </p:pic>
+      <p:pic>
+        <p:nvPicPr>
+          <p:cNvPr id="10" name="Graphique 9" descr="Yeux">
+            <a:extLst>
+              <a:ext uri="{FF2B5EF4-FFF2-40B4-BE49-F238E27FC236}">
+                <a16:creationId xmlns:a16="http://schemas.microsoft.com/office/drawing/2014/main" id="{0633E1EA-A82E-482A-99BE-548999154597}"/>
+              </a:ext>
+            </a:extLst>
+          </p:cNvPr>
+          <p:cNvPicPr>
+            <a:picLocks noChangeAspect="1"/>
+          </p:cNvPicPr>
+          <p:nvPr/>
+        </p:nvPicPr>
+        <p:blipFill>
+          <a:blip r:embed="rId4">
+            <a:extLst>
+              <a:ext uri="{96DAC541-7B7A-43D3-8B79-37D633B846F1}">
+                <asvg:svgBlip xmlns:asvg="http://schemas.microsoft.com/office/drawing/2016/SVG/main" r:embed="rId5"/>
+              </a:ext>
+            </a:extLst>
+          </a:blip>
+          <a:stretch>
+            <a:fillRect/>
+          </a:stretch>
+        </p:blipFill>
+        <p:spPr>
+          <a:xfrm>
+            <a:off x="4695032" y="4444413"/>
+            <a:ext cx="914400" cy="914400"/>
+          </a:xfrm>
+          <a:prstGeom prst="rect">
+            <a:avLst/>
+          </a:prstGeom>
+        </p:spPr>
+      </p:pic>
+      <p:pic>
+        <p:nvPicPr>
+          <p:cNvPr id="12" name="Graphique 11" descr="Nez">
+            <a:extLst>
+              <a:ext uri="{FF2B5EF4-FFF2-40B4-BE49-F238E27FC236}">
+                <a16:creationId xmlns:a16="http://schemas.microsoft.com/office/drawing/2014/main" id="{36052CB2-A72B-44CF-B6D9-899442A3568B}"/>
+              </a:ext>
+            </a:extLst>
+          </p:cNvPr>
+          <p:cNvPicPr>
+            <a:picLocks noChangeAspect="1"/>
+          </p:cNvPicPr>
+          <p:nvPr/>
+        </p:nvPicPr>
+        <p:blipFill>
+          <a:blip r:embed="rId6">
+            <a:extLst>
+              <a:ext uri="{96DAC541-7B7A-43D3-8B79-37D633B846F1}">
+                <asvg:svgBlip xmlns:asvg="http://schemas.microsoft.com/office/drawing/2016/SVG/main" r:embed="rId7"/>
+              </a:ext>
+            </a:extLst>
+          </a:blip>
+          <a:stretch>
+            <a:fillRect/>
+          </a:stretch>
+        </p:blipFill>
+        <p:spPr>
+          <a:xfrm>
+            <a:off x="5839620" y="4444413"/>
+            <a:ext cx="914400" cy="914400"/>
+          </a:xfrm>
+          <a:prstGeom prst="rect">
+            <a:avLst/>
+          </a:prstGeom>
+        </p:spPr>
+      </p:pic>
+      <p:pic>
+        <p:nvPicPr>
+          <p:cNvPr id="16" name="Graphique 15" descr="Notation musicale">
+            <a:extLst>
+              <a:ext uri="{FF2B5EF4-FFF2-40B4-BE49-F238E27FC236}">
+                <a16:creationId xmlns:a16="http://schemas.microsoft.com/office/drawing/2014/main" id="{B5409EE7-D25A-4DB8-BB4F-B04FA9D9C255}"/>
+              </a:ext>
+            </a:extLst>
+          </p:cNvPr>
+          <p:cNvPicPr>
+            <a:picLocks noChangeAspect="1"/>
+          </p:cNvPicPr>
+          <p:nvPr/>
+        </p:nvPicPr>
+        <p:blipFill>
+          <a:blip r:embed="rId8">
+            <a:extLst>
+              <a:ext uri="{96DAC541-7B7A-43D3-8B79-37D633B846F1}">
+                <asvg:svgBlip xmlns:asvg="http://schemas.microsoft.com/office/drawing/2016/SVG/main" r:embed="rId9"/>
+              </a:ext>
+            </a:extLst>
+          </a:blip>
+          <a:stretch>
+            <a:fillRect/>
+          </a:stretch>
+        </p:blipFill>
+        <p:spPr>
+          <a:xfrm>
+            <a:off x="2603994" y="2294645"/>
+            <a:ext cx="914400" cy="914400"/>
+          </a:xfrm>
+          <a:prstGeom prst="rect">
+            <a:avLst/>
+          </a:prstGeom>
+        </p:spPr>
+      </p:pic>
+      <p:pic>
+        <p:nvPicPr>
+          <p:cNvPr id="18" name="Graphique 17" descr="Batterie pleine">
+            <a:extLst>
+              <a:ext uri="{FF2B5EF4-FFF2-40B4-BE49-F238E27FC236}">
+                <a16:creationId xmlns:a16="http://schemas.microsoft.com/office/drawing/2014/main" id="{09B427C3-7C0E-4778-BD03-18350A4BDA41}"/>
+              </a:ext>
+            </a:extLst>
+          </p:cNvPr>
+          <p:cNvPicPr>
+            <a:picLocks noChangeAspect="1"/>
+          </p:cNvPicPr>
+          <p:nvPr/>
+        </p:nvPicPr>
+        <p:blipFill>
+          <a:blip r:embed="rId10">
+            <a:extLst>
+              <a:ext uri="{96DAC541-7B7A-43D3-8B79-37D633B846F1}">
+                <asvg:svgBlip xmlns:asvg="http://schemas.microsoft.com/office/drawing/2016/SVG/main" r:embed="rId11"/>
+              </a:ext>
+            </a:extLst>
+          </a:blip>
+          <a:stretch>
+            <a:fillRect/>
+          </a:stretch>
+        </p:blipFill>
+        <p:spPr>
+          <a:xfrm>
+            <a:off x="9767092" y="3294298"/>
+            <a:ext cx="914400" cy="914400"/>
+          </a:xfrm>
+          <a:prstGeom prst="rect">
+            <a:avLst/>
+          </a:prstGeom>
+        </p:spPr>
+      </p:pic>
+      <p:pic>
+        <p:nvPicPr>
+          <p:cNvPr id="20" name="Graphique 19" descr="Curseur">
+            <a:extLst>
+              <a:ext uri="{FF2B5EF4-FFF2-40B4-BE49-F238E27FC236}">
+                <a16:creationId xmlns:a16="http://schemas.microsoft.com/office/drawing/2014/main" id="{792836BA-4B9B-4DB0-9955-879E544631C9}"/>
+              </a:ext>
+            </a:extLst>
+          </p:cNvPr>
+          <p:cNvPicPr>
+            <a:picLocks noChangeAspect="1"/>
+          </p:cNvPicPr>
+          <p:nvPr/>
+        </p:nvPicPr>
+        <p:blipFill>
+          <a:blip r:embed="rId12">
+            <a:extLst>
+              <a:ext uri="{96DAC541-7B7A-43D3-8B79-37D633B846F1}">
+                <asvg:svgBlip xmlns:asvg="http://schemas.microsoft.com/office/drawing/2016/SVG/main" r:embed="rId13"/>
+              </a:ext>
+            </a:extLst>
+          </a:blip>
+          <a:stretch>
+            <a:fillRect/>
+          </a:stretch>
+        </p:blipFill>
+        <p:spPr>
+          <a:xfrm>
+            <a:off x="1967708" y="3811529"/>
+            <a:ext cx="914400" cy="914400"/>
+          </a:xfrm>
+          <a:prstGeom prst="rect">
+            <a:avLst/>
+          </a:prstGeom>
+        </p:spPr>
+      </p:pic>
+      <p:pic>
+        <p:nvPicPr>
+          <p:cNvPr id="22" name="Graphique 21" descr="Image">
+            <a:extLst>
+              <a:ext uri="{FF2B5EF4-FFF2-40B4-BE49-F238E27FC236}">
+                <a16:creationId xmlns:a16="http://schemas.microsoft.com/office/drawing/2014/main" id="{FF64ACD7-2A9D-4CF9-B3DD-947E8AA42D80}"/>
+              </a:ext>
+            </a:extLst>
+          </p:cNvPr>
+          <p:cNvPicPr>
+            <a:picLocks noChangeAspect="1"/>
+          </p:cNvPicPr>
+          <p:nvPr/>
+        </p:nvPicPr>
+        <p:blipFill>
+          <a:blip r:embed="rId14">
+            <a:extLst>
+              <a:ext uri="{96DAC541-7B7A-43D3-8B79-37D633B846F1}">
+                <asvg:svgBlip xmlns:asvg="http://schemas.microsoft.com/office/drawing/2016/SVG/main" r:embed="rId15"/>
+              </a:ext>
+            </a:extLst>
+          </a:blip>
+          <a:stretch>
+            <a:fillRect/>
+          </a:stretch>
+        </p:blipFill>
+        <p:spPr>
+          <a:xfrm>
+            <a:off x="5221551" y="2907511"/>
+            <a:ext cx="914400" cy="914400"/>
+          </a:xfrm>
+          <a:prstGeom prst="rect">
+            <a:avLst/>
+          </a:prstGeom>
+        </p:spPr>
+      </p:pic>
+      <p:pic>
+        <p:nvPicPr>
+          <p:cNvPr id="24" name="Graphique 23" descr="Note de musique">
+            <a:extLst>
+              <a:ext uri="{FF2B5EF4-FFF2-40B4-BE49-F238E27FC236}">
+                <a16:creationId xmlns:a16="http://schemas.microsoft.com/office/drawing/2014/main" id="{D16B5A72-9BE5-482F-B8B6-CE98DB284F93}"/>
+              </a:ext>
+            </a:extLst>
+          </p:cNvPr>
+          <p:cNvPicPr>
+            <a:picLocks noChangeAspect="1"/>
+          </p:cNvPicPr>
+          <p:nvPr/>
+        </p:nvPicPr>
+        <p:blipFill>
+          <a:blip r:embed="rId16">
+            <a:extLst>
+              <a:ext uri="{96DAC541-7B7A-43D3-8B79-37D633B846F1}">
+                <asvg:svgBlip xmlns:asvg="http://schemas.microsoft.com/office/drawing/2016/SVG/main" r:embed="rId17"/>
+              </a:ext>
+            </a:extLst>
+          </a:blip>
+          <a:stretch>
+            <a:fillRect/>
+          </a:stretch>
+        </p:blipFill>
+        <p:spPr>
+          <a:xfrm>
+            <a:off x="1093787" y="3282363"/>
+            <a:ext cx="914400" cy="914400"/>
+          </a:xfrm>
+          <a:prstGeom prst="rect">
+            <a:avLst/>
+          </a:prstGeom>
+        </p:spPr>
+      </p:pic>
+      <p:pic>
+        <p:nvPicPr>
+          <p:cNvPr id="26" name="Graphique 25" descr="Processeur">
+            <a:extLst>
+              <a:ext uri="{FF2B5EF4-FFF2-40B4-BE49-F238E27FC236}">
+                <a16:creationId xmlns:a16="http://schemas.microsoft.com/office/drawing/2014/main" id="{8D6EECE7-424B-4F80-BCAE-0A045AAAEADD}"/>
+              </a:ext>
+            </a:extLst>
+          </p:cNvPr>
+          <p:cNvPicPr>
+            <a:picLocks noChangeAspect="1"/>
+          </p:cNvPicPr>
+          <p:nvPr/>
+        </p:nvPicPr>
+        <p:blipFill>
+          <a:blip r:embed="rId18">
+            <a:extLst>
+              <a:ext uri="{96DAC541-7B7A-43D3-8B79-37D633B846F1}">
+                <asvg:svgBlip xmlns:asvg="http://schemas.microsoft.com/office/drawing/2016/SVG/main" r:embed="rId19"/>
+              </a:ext>
+            </a:extLst>
+          </a:blip>
+          <a:stretch>
+            <a:fillRect/>
+          </a:stretch>
+        </p:blipFill>
+        <p:spPr>
+          <a:xfrm>
+            <a:off x="8595518" y="3808648"/>
+            <a:ext cx="914400" cy="914400"/>
+          </a:xfrm>
+          <a:prstGeom prst="rect">
+            <a:avLst/>
+          </a:prstGeom>
+        </p:spPr>
+      </p:pic>
+      <p:pic>
+        <p:nvPicPr>
+          <p:cNvPr id="28" name="Graphique 27" descr="Organe du cœur">
+            <a:extLst>
+              <a:ext uri="{FF2B5EF4-FFF2-40B4-BE49-F238E27FC236}">
+                <a16:creationId xmlns:a16="http://schemas.microsoft.com/office/drawing/2014/main" id="{F7AA73B0-842C-4032-AD2E-6912851D0C4E}"/>
+              </a:ext>
+            </a:extLst>
+          </p:cNvPr>
+          <p:cNvPicPr>
+            <a:picLocks noChangeAspect="1"/>
+          </p:cNvPicPr>
+          <p:nvPr/>
+        </p:nvPicPr>
+        <p:blipFill>
+          <a:blip r:embed="rId20">
+            <a:extLst>
+              <a:ext uri="{96DAC541-7B7A-43D3-8B79-37D633B846F1}">
+                <asvg:svgBlip xmlns:asvg="http://schemas.microsoft.com/office/drawing/2016/SVG/main" r:embed="rId21"/>
+              </a:ext>
+            </a:extLst>
+          </a:blip>
+          <a:stretch>
+            <a:fillRect/>
+          </a:stretch>
+        </p:blipFill>
+        <p:spPr>
+          <a:xfrm>
+            <a:off x="7839108" y="2294645"/>
+            <a:ext cx="914400" cy="914400"/>
+          </a:xfrm>
+          <a:prstGeom prst="rect">
+            <a:avLst/>
+          </a:prstGeom>
+        </p:spPr>
+      </p:pic>
+      <p:cxnSp>
+        <p:nvCxnSpPr>
+          <p:cNvPr id="30" name="Connecteur droit avec flèche 29">
+            <a:extLst>
+              <a:ext uri="{FF2B5EF4-FFF2-40B4-BE49-F238E27FC236}">
+                <a16:creationId xmlns:a16="http://schemas.microsoft.com/office/drawing/2014/main" id="{43E9868E-6BCA-4BF9-9D72-900C6E2E47EC}"/>
+              </a:ext>
+            </a:extLst>
+          </p:cNvPr>
+          <p:cNvCxnSpPr>
+            <a:cxnSpLocks/>
+          </p:cNvCxnSpPr>
+          <p:nvPr/>
+        </p:nvCxnSpPr>
+        <p:spPr>
+          <a:xfrm>
+            <a:off x="6312875" y="944798"/>
+            <a:ext cx="1526233" cy="1340211"/>
+          </a:xfrm>
+          <a:prstGeom prst="straightConnector1">
+            <a:avLst/>
+          </a:prstGeom>
+          <a:ln w="76200">
+            <a:solidFill>
+              <a:schemeClr val="accent1">
+                <a:lumMod val="60000"/>
+                <a:lumOff val="40000"/>
+                <a:alpha val="60000"/>
+              </a:schemeClr>
+            </a:solidFill>
+            <a:tailEnd type="triangle"/>
+          </a:ln>
+        </p:spPr>
+        <p:style>
+          <a:lnRef idx="1">
+            <a:schemeClr val="accent1"/>
+          </a:lnRef>
+          <a:fillRef idx="0">
+            <a:schemeClr val="accent1"/>
+          </a:fillRef>
+          <a:effectRef idx="0">
+            <a:schemeClr val="accent1"/>
+          </a:effectRef>
+          <a:fontRef idx="minor">
+            <a:schemeClr val="tx1"/>
+          </a:fontRef>
+        </p:style>
+      </p:cxnSp>
+      <p:cxnSp>
+        <p:nvCxnSpPr>
+          <p:cNvPr id="31" name="Connecteur droit avec flèche 30">
+            <a:extLst>
+              <a:ext uri="{FF2B5EF4-FFF2-40B4-BE49-F238E27FC236}">
+                <a16:creationId xmlns:a16="http://schemas.microsoft.com/office/drawing/2014/main" id="{A6C75D6E-0573-4DFA-B2BD-663A6EDA05FB}"/>
+              </a:ext>
+            </a:extLst>
+          </p:cNvPr>
+          <p:cNvCxnSpPr>
+            <a:cxnSpLocks/>
+          </p:cNvCxnSpPr>
+          <p:nvPr/>
+        </p:nvCxnSpPr>
+        <p:spPr>
+          <a:xfrm>
+            <a:off x="5678751" y="1145219"/>
+            <a:ext cx="0" cy="1606626"/>
+          </a:xfrm>
+          <a:prstGeom prst="straightConnector1">
+            <a:avLst/>
+          </a:prstGeom>
+          <a:ln w="76200">
+            <a:solidFill>
+              <a:schemeClr val="accent1">
+                <a:lumMod val="60000"/>
+                <a:lumOff val="40000"/>
+                <a:alpha val="60000"/>
+              </a:schemeClr>
+            </a:solidFill>
+            <a:tailEnd type="triangle"/>
+          </a:ln>
+        </p:spPr>
+        <p:style>
+          <a:lnRef idx="1">
+            <a:schemeClr val="accent1"/>
+          </a:lnRef>
+          <a:fillRef idx="0">
+            <a:schemeClr val="accent1"/>
+          </a:fillRef>
+          <a:effectRef idx="0">
+            <a:schemeClr val="accent1"/>
+          </a:effectRef>
+          <a:fontRef idx="minor">
+            <a:schemeClr val="tx1"/>
+          </a:fontRef>
+        </p:style>
+      </p:cxnSp>
+      <p:cxnSp>
+        <p:nvCxnSpPr>
+          <p:cNvPr id="34" name="Connecteur droit avec flèche 33">
+            <a:extLst>
+              <a:ext uri="{FF2B5EF4-FFF2-40B4-BE49-F238E27FC236}">
+                <a16:creationId xmlns:a16="http://schemas.microsoft.com/office/drawing/2014/main" id="{D9DF8FC9-498A-49AB-877D-D78671B9B9F5}"/>
+              </a:ext>
+            </a:extLst>
+          </p:cNvPr>
+          <p:cNvCxnSpPr>
+            <a:cxnSpLocks/>
+          </p:cNvCxnSpPr>
+          <p:nvPr/>
+        </p:nvCxnSpPr>
+        <p:spPr>
+          <a:xfrm flipH="1">
+            <a:off x="3426782" y="989988"/>
+            <a:ext cx="1617845" cy="1380680"/>
+          </a:xfrm>
+          <a:prstGeom prst="straightConnector1">
+            <a:avLst/>
+          </a:prstGeom>
+          <a:ln w="76200">
+            <a:solidFill>
+              <a:schemeClr val="accent1">
+                <a:lumMod val="60000"/>
+                <a:lumOff val="40000"/>
+                <a:alpha val="60000"/>
+              </a:schemeClr>
+            </a:solidFill>
+            <a:tailEnd type="triangle"/>
+          </a:ln>
+        </p:spPr>
+        <p:style>
+          <a:lnRef idx="1">
+            <a:schemeClr val="accent1"/>
+          </a:lnRef>
+          <a:fillRef idx="0">
+            <a:schemeClr val="accent1"/>
+          </a:fillRef>
+          <a:effectRef idx="0">
+            <a:schemeClr val="accent1"/>
+          </a:effectRef>
+          <a:fontRef idx="minor">
+            <a:schemeClr val="tx1"/>
+          </a:fontRef>
+        </p:style>
+      </p:cxnSp>
+      <p:sp>
+        <p:nvSpPr>
+          <p:cNvPr id="44" name="ZoneTexte 43">
+            <a:extLst>
+              <a:ext uri="{FF2B5EF4-FFF2-40B4-BE49-F238E27FC236}">
+                <a16:creationId xmlns:a16="http://schemas.microsoft.com/office/drawing/2014/main" id="{34E19EA0-D7E0-445E-876B-06B25433E9E6}"/>
+              </a:ext>
+            </a:extLst>
+          </p:cNvPr>
+          <p:cNvSpPr txBox="1"/>
+          <p:nvPr/>
+        </p:nvSpPr>
+        <p:spPr>
+          <a:xfrm>
+            <a:off x="2077435" y="3279624"/>
+            <a:ext cx="928459" cy="369332"/>
+          </a:xfrm>
+          <a:prstGeom prst="rect">
+            <a:avLst/>
+          </a:prstGeom>
+          <a:noFill/>
+        </p:spPr>
+        <p:txBody>
+          <a:bodyPr wrap="none" rtlCol="0">
+            <a:spAutoFit/>
+          </a:bodyPr>
+          <a:lstStyle/>
+          <a:p>
+            <a:r>
+              <a:rPr lang="fr-FR" b="1" dirty="0">
+                <a:solidFill>
+                  <a:schemeClr val="bg1"/>
+                </a:solidFill>
+                <a:latin typeface="Times New Roman" panose="02020603050405020304" pitchFamily="18" charset="0"/>
+                <a:cs typeface="Times New Roman" panose="02020603050405020304" pitchFamily="18" charset="0"/>
+              </a:rPr>
+              <a:t>Actions</a:t>
+            </a:r>
+            <a:endParaRPr lang="en-GB" b="1" dirty="0">
+              <a:solidFill>
+                <a:schemeClr val="bg1"/>
+              </a:solidFill>
+              <a:latin typeface="Times New Roman" panose="02020603050405020304" pitchFamily="18" charset="0"/>
+              <a:cs typeface="Times New Roman" panose="02020603050405020304" pitchFamily="18" charset="0"/>
+            </a:endParaRPr>
+          </a:p>
+        </p:txBody>
+      </p:sp>
+      <p:sp>
+        <p:nvSpPr>
+          <p:cNvPr id="45" name="ZoneTexte 44">
+            <a:extLst>
+              <a:ext uri="{FF2B5EF4-FFF2-40B4-BE49-F238E27FC236}">
+                <a16:creationId xmlns:a16="http://schemas.microsoft.com/office/drawing/2014/main" id="{9FED8DFD-4807-4A0E-92FE-A56533C302F0}"/>
+              </a:ext>
+            </a:extLst>
+          </p:cNvPr>
+          <p:cNvSpPr txBox="1"/>
+          <p:nvPr/>
+        </p:nvSpPr>
+        <p:spPr>
+          <a:xfrm>
+            <a:off x="5221551" y="4030132"/>
+            <a:ext cx="941283" cy="369332"/>
+          </a:xfrm>
+          <a:prstGeom prst="rect">
+            <a:avLst/>
+          </a:prstGeom>
+          <a:noFill/>
+        </p:spPr>
+        <p:txBody>
+          <a:bodyPr wrap="none" rtlCol="0">
+            <a:spAutoFit/>
+          </a:bodyPr>
+          <a:lstStyle/>
+          <a:p>
+            <a:r>
+              <a:rPr lang="fr-FR" b="1" dirty="0" err="1">
+                <a:solidFill>
+                  <a:srgbClr val="92D050"/>
+                </a:solidFill>
+                <a:latin typeface="Times New Roman" panose="02020603050405020304" pitchFamily="18" charset="0"/>
+                <a:cs typeface="Times New Roman" panose="02020603050405020304" pitchFamily="18" charset="0"/>
+              </a:rPr>
+              <a:t>Sensors</a:t>
+            </a:r>
+            <a:endParaRPr lang="en-GB" b="1" dirty="0">
+              <a:solidFill>
+                <a:srgbClr val="92D050"/>
+              </a:solidFill>
+              <a:latin typeface="Times New Roman" panose="02020603050405020304" pitchFamily="18" charset="0"/>
+              <a:cs typeface="Times New Roman" panose="02020603050405020304" pitchFamily="18" charset="0"/>
+            </a:endParaRPr>
+          </a:p>
+        </p:txBody>
+      </p:sp>
+      <p:sp>
+        <p:nvSpPr>
+          <p:cNvPr id="46" name="ZoneTexte 45">
+            <a:extLst>
+              <a:ext uri="{FF2B5EF4-FFF2-40B4-BE49-F238E27FC236}">
+                <a16:creationId xmlns:a16="http://schemas.microsoft.com/office/drawing/2014/main" id="{0399D4C8-9096-4694-A5E4-C6ABA89F1D6D}"/>
+              </a:ext>
+            </a:extLst>
+          </p:cNvPr>
+          <p:cNvSpPr txBox="1"/>
+          <p:nvPr/>
+        </p:nvSpPr>
+        <p:spPr>
+          <a:xfrm>
+            <a:off x="8239377" y="3279624"/>
+            <a:ext cx="1270541" cy="369332"/>
+          </a:xfrm>
+          <a:prstGeom prst="rect">
+            <a:avLst/>
+          </a:prstGeom>
+          <a:noFill/>
+        </p:spPr>
+        <p:txBody>
+          <a:bodyPr wrap="none" rtlCol="0">
+            <a:spAutoFit/>
+          </a:bodyPr>
+          <a:lstStyle/>
+          <a:p>
+            <a:r>
+              <a:rPr lang="fr-FR" b="1" dirty="0">
+                <a:solidFill>
+                  <a:schemeClr val="accent6">
+                    <a:lumMod val="40000"/>
+                    <a:lumOff val="60000"/>
+                  </a:schemeClr>
+                </a:solidFill>
+                <a:latin typeface="Times New Roman" panose="02020603050405020304" pitchFamily="18" charset="0"/>
+                <a:cs typeface="Times New Roman" panose="02020603050405020304" pitchFamily="18" charset="0"/>
+              </a:rPr>
+              <a:t>Ressources</a:t>
+            </a:r>
+            <a:endParaRPr lang="en-GB" b="1" dirty="0">
+              <a:solidFill>
+                <a:schemeClr val="accent6">
+                  <a:lumMod val="40000"/>
+                  <a:lumOff val="60000"/>
+                </a:schemeClr>
+              </a:solidFill>
+              <a:latin typeface="Times New Roman" panose="02020603050405020304" pitchFamily="18" charset="0"/>
+              <a:cs typeface="Times New Roman" panose="02020603050405020304" pitchFamily="18" charset="0"/>
+            </a:endParaRPr>
+          </a:p>
+        </p:txBody>
+      </p:sp>
+    </p:spTree>
+    <p:extLst>
+      <p:ext uri="{BB962C8B-B14F-4D97-AF65-F5344CB8AC3E}">
+        <p14:creationId xmlns:p14="http://schemas.microsoft.com/office/powerpoint/2010/main" val="1936656153"/>
+      </p:ext>
+    </p:extLst>
+  </p:cSld>
+  <p:clrMapOvr>
+    <a:masterClrMapping/>
+  </p:clrMapOvr>
+</p:sld>
+</file>
+
+<file path=ppt/slides/slide8.xml><?xml version="1.0" encoding="utf-8"?>
+<p:sld xmlns:a="http://schemas.openxmlformats.org/drawingml/2006/main" xmlns:r="http://schemas.openxmlformats.org/officeDocument/2006/relationships" xmlns:p="http://schemas.openxmlformats.org/presentationml/2006/main">
+  <p:cSld>
+    <p:spTree>
+      <p:nvGrpSpPr>
+        <p:cNvPr id="1" name=""/>
+        <p:cNvGrpSpPr/>
+        <p:nvPr/>
+      </p:nvGrpSpPr>
+      <p:grpSpPr>
+        <a:xfrm>
+          <a:off x="0" y="0"/>
+          <a:ext cx="0" cy="0"/>
+          <a:chOff x="0" y="0"/>
+          <a:chExt cx="0" cy="0"/>
+        </a:xfrm>
+      </p:grpSpPr>
+      <p:sp>
+        <p:nvSpPr>
+          <p:cNvPr id="2" name="Titre 1">
+            <a:extLst>
+              <a:ext uri="{FF2B5EF4-FFF2-40B4-BE49-F238E27FC236}">
+                <a16:creationId xmlns:a16="http://schemas.microsoft.com/office/drawing/2014/main" id="{60A45B33-4349-4205-A596-A72ABD8F0A69}"/>
+              </a:ext>
+            </a:extLst>
+          </p:cNvPr>
+          <p:cNvSpPr>
+            <a:spLocks noGrp="1"/>
+          </p:cNvSpPr>
+          <p:nvPr>
+            <p:ph type="title"/>
+          </p:nvPr>
+        </p:nvSpPr>
+        <p:spPr/>
+        <p:txBody>
+          <a:bodyPr/>
+          <a:lstStyle/>
+          <a:p>
+            <a:r>
+              <a:rPr lang="fr-FR" dirty="0"/>
+              <a:t>Sources</a:t>
+            </a:r>
+            <a:endParaRPr lang="en-GB" dirty="0"/>
+          </a:p>
+        </p:txBody>
+      </p:sp>
+      <p:sp>
+        <p:nvSpPr>
+          <p:cNvPr id="3" name="Espace réservé du contenu 2">
+            <a:extLst>
+              <a:ext uri="{FF2B5EF4-FFF2-40B4-BE49-F238E27FC236}">
+                <a16:creationId xmlns:a16="http://schemas.microsoft.com/office/drawing/2014/main" id="{825892DE-953F-4021-9EA2-14E93075BB41}"/>
+              </a:ext>
+            </a:extLst>
+          </p:cNvPr>
+          <p:cNvSpPr>
+            <a:spLocks noGrp="1"/>
+          </p:cNvSpPr>
+          <p:nvPr>
+            <p:ph idx="1"/>
+          </p:nvPr>
+        </p:nvSpPr>
+        <p:spPr/>
+        <p:txBody>
+          <a:bodyPr/>
+          <a:lstStyle/>
+          <a:p>
+            <a:r>
+              <a:rPr lang="fr-FR" dirty="0"/>
+              <a:t>Brain image: </a:t>
+            </a:r>
+            <a:r>
+              <a:rPr lang="fr-FR" dirty="0">
+                <a:hlinkClick r:id="rId2"/>
+              </a:rPr>
+              <a:t>https://cdn.mindful.org/Thrive.jpg?q=80&amp;fm=jpg&amp;fit=crop&amp;w=1920&amp;h=1080</a:t>
+            </a:r>
+            <a:endParaRPr lang="fr-FR" dirty="0"/>
+          </a:p>
+          <a:p>
+            <a:endParaRPr lang="en-GB" dirty="0"/>
+          </a:p>
+        </p:txBody>
+      </p:sp>
+    </p:spTree>
+    <p:extLst>
+      <p:ext uri="{BB962C8B-B14F-4D97-AF65-F5344CB8AC3E}">
+        <p14:creationId xmlns:p14="http://schemas.microsoft.com/office/powerpoint/2010/main" val="1489863068"/>
       </p:ext>
     </p:extLst>
   </p:cSld>

</xml_diff>

<commit_message>
#12 Add the annexe with the object SAI schema
</commit_message>
<xml_diff>
--- a/SAI_presentation.pptx
+++ b/SAI_presentation.pptx
@@ -12,7 +12,8 @@
     <p:sldId id="260" r:id="rId6"/>
     <p:sldId id="261" r:id="rId7"/>
     <p:sldId id="262" r:id="rId8"/>
-    <p:sldId id="263" r:id="rId9"/>
+    <p:sldId id="264" r:id="rId9"/>
+    <p:sldId id="263" r:id="rId10"/>
   </p:sldIdLst>
   <p:sldSz cx="12192000" cy="6858000"/>
   <p:notesSz cx="6858000" cy="9144000"/>
@@ -7130,6 +7131,46 @@
           </a:p>
         </p:txBody>
       </p:sp>
+      <p:sp>
+        <p:nvSpPr>
+          <p:cNvPr id="3" name="ZoneTexte 2">
+            <a:extLst>
+              <a:ext uri="{FF2B5EF4-FFF2-40B4-BE49-F238E27FC236}">
+                <a16:creationId xmlns:a16="http://schemas.microsoft.com/office/drawing/2014/main" id="{3DE4F80A-ACF1-49B7-87AE-20A82AEE9849}"/>
+              </a:ext>
+            </a:extLst>
+          </p:cNvPr>
+          <p:cNvSpPr txBox="1"/>
+          <p:nvPr/>
+        </p:nvSpPr>
+        <p:spPr>
+          <a:xfrm>
+            <a:off x="499481" y="348122"/>
+            <a:ext cx="1776448" cy="369332"/>
+          </a:xfrm>
+          <a:prstGeom prst="rect">
+            <a:avLst/>
+          </a:prstGeom>
+          <a:noFill/>
+        </p:spPr>
+        <p:txBody>
+          <a:bodyPr wrap="none" rtlCol="0">
+            <a:spAutoFit/>
+          </a:bodyPr>
+          <a:lstStyle/>
+          <a:p>
+            <a:r>
+              <a:rPr lang="fr-FR" dirty="0"/>
+              <a:t>The main </a:t>
+            </a:r>
+            <a:r>
+              <a:rPr lang="fr-FR" dirty="0" err="1"/>
+              <a:t>idea</a:t>
+            </a:r>
+            <a:endParaRPr lang="en-GB" dirty="0"/>
+          </a:p>
+        </p:txBody>
+      </p:sp>
     </p:spTree>
     <p:extLst>
       <p:ext uri="{BB962C8B-B14F-4D97-AF65-F5344CB8AC3E}">
@@ -7165,6 +7206,517 @@
           <p:cNvPr id="2" name="Titre 1">
             <a:extLst>
               <a:ext uri="{FF2B5EF4-FFF2-40B4-BE49-F238E27FC236}">
+                <a16:creationId xmlns:a16="http://schemas.microsoft.com/office/drawing/2014/main" id="{C3A47323-C1D5-4FF9-968A-64ABFA3C1E18}"/>
+              </a:ext>
+            </a:extLst>
+          </p:cNvPr>
+          <p:cNvSpPr>
+            <a:spLocks noGrp="1"/>
+          </p:cNvSpPr>
+          <p:nvPr>
+            <p:ph type="title"/>
+          </p:nvPr>
+        </p:nvSpPr>
+        <p:spPr/>
+        <p:txBody>
+          <a:bodyPr/>
+          <a:lstStyle/>
+          <a:p>
+            <a:r>
+              <a:rPr lang="fr-FR" dirty="0"/>
+              <a:t>Annexe</a:t>
+            </a:r>
+            <a:endParaRPr lang="en-GB" dirty="0"/>
+          </a:p>
+        </p:txBody>
+      </p:sp>
+      <p:pic>
+        <p:nvPicPr>
+          <p:cNvPr id="16" name="Espace réservé du contenu 15">
+            <a:extLst>
+              <a:ext uri="{FF2B5EF4-FFF2-40B4-BE49-F238E27FC236}">
+                <a16:creationId xmlns:a16="http://schemas.microsoft.com/office/drawing/2014/main" id="{B2C4B2A4-24E6-4EA7-8EF4-F1B0389A247E}"/>
+              </a:ext>
+            </a:extLst>
+          </p:cNvPr>
+          <p:cNvPicPr>
+            <a:picLocks noGrp="1" noChangeAspect="1"/>
+          </p:cNvPicPr>
+          <p:nvPr>
+            <p:ph idx="1"/>
+          </p:nvPr>
+        </p:nvPicPr>
+        <p:blipFill>
+          <a:blip r:embed="rId2"/>
+          <a:stretch>
+            <a:fillRect/>
+          </a:stretch>
+        </p:blipFill>
+        <p:spPr>
+          <a:xfrm>
+            <a:off x="7839108" y="2560399"/>
+            <a:ext cx="1314450" cy="600075"/>
+          </a:xfrm>
+          <a:prstGeom prst="rect">
+            <a:avLst/>
+          </a:prstGeom>
+        </p:spPr>
+      </p:pic>
+      <p:sp>
+        <p:nvSpPr>
+          <p:cNvPr id="4" name="ZoneTexte 3">
+            <a:extLst>
+              <a:ext uri="{FF2B5EF4-FFF2-40B4-BE49-F238E27FC236}">
+                <a16:creationId xmlns:a16="http://schemas.microsoft.com/office/drawing/2014/main" id="{308043D7-F2FD-4D07-9420-385AA37319FD}"/>
+              </a:ext>
+            </a:extLst>
+          </p:cNvPr>
+          <p:cNvSpPr txBox="1"/>
+          <p:nvPr/>
+        </p:nvSpPr>
+        <p:spPr>
+          <a:xfrm>
+            <a:off x="499481" y="348122"/>
+            <a:ext cx="1754006" cy="369332"/>
+          </a:xfrm>
+          <a:prstGeom prst="rect">
+            <a:avLst/>
+          </a:prstGeom>
+          <a:noFill/>
+        </p:spPr>
+        <p:txBody>
+          <a:bodyPr wrap="none" rtlCol="0">
+            <a:spAutoFit/>
+          </a:bodyPr>
+          <a:lstStyle/>
+          <a:p>
+            <a:r>
+              <a:rPr lang="fr-FR" dirty="0"/>
+              <a:t>The prototype</a:t>
+            </a:r>
+            <a:endParaRPr lang="en-GB" dirty="0"/>
+          </a:p>
+        </p:txBody>
+      </p:sp>
+      <p:cxnSp>
+        <p:nvCxnSpPr>
+          <p:cNvPr id="5" name="Connecteur droit avec flèche 4">
+            <a:extLst>
+              <a:ext uri="{FF2B5EF4-FFF2-40B4-BE49-F238E27FC236}">
+                <a16:creationId xmlns:a16="http://schemas.microsoft.com/office/drawing/2014/main" id="{76B2BD43-8A32-4F05-90EE-F4CBE6F6B3AC}"/>
+              </a:ext>
+            </a:extLst>
+          </p:cNvPr>
+          <p:cNvCxnSpPr>
+            <a:cxnSpLocks/>
+          </p:cNvCxnSpPr>
+          <p:nvPr/>
+        </p:nvCxnSpPr>
+        <p:spPr>
+          <a:xfrm>
+            <a:off x="6312875" y="944798"/>
+            <a:ext cx="1526233" cy="1340211"/>
+          </a:xfrm>
+          <a:prstGeom prst="straightConnector1">
+            <a:avLst/>
+          </a:prstGeom>
+          <a:ln w="76200">
+            <a:solidFill>
+              <a:schemeClr val="accent1">
+                <a:lumMod val="60000"/>
+                <a:lumOff val="40000"/>
+                <a:alpha val="60000"/>
+              </a:schemeClr>
+            </a:solidFill>
+            <a:tailEnd type="triangle"/>
+          </a:ln>
+        </p:spPr>
+        <p:style>
+          <a:lnRef idx="1">
+            <a:schemeClr val="accent1"/>
+          </a:lnRef>
+          <a:fillRef idx="0">
+            <a:schemeClr val="accent1"/>
+          </a:fillRef>
+          <a:effectRef idx="0">
+            <a:schemeClr val="accent1"/>
+          </a:effectRef>
+          <a:fontRef idx="minor">
+            <a:schemeClr val="tx1"/>
+          </a:fontRef>
+        </p:style>
+      </p:cxnSp>
+      <p:cxnSp>
+        <p:nvCxnSpPr>
+          <p:cNvPr id="6" name="Connecteur droit avec flèche 5">
+            <a:extLst>
+              <a:ext uri="{FF2B5EF4-FFF2-40B4-BE49-F238E27FC236}">
+                <a16:creationId xmlns:a16="http://schemas.microsoft.com/office/drawing/2014/main" id="{4FB2FE4C-19EC-481B-8A75-3B52BCC715A8}"/>
+              </a:ext>
+            </a:extLst>
+          </p:cNvPr>
+          <p:cNvCxnSpPr>
+            <a:cxnSpLocks/>
+          </p:cNvCxnSpPr>
+          <p:nvPr/>
+        </p:nvCxnSpPr>
+        <p:spPr>
+          <a:xfrm>
+            <a:off x="5678751" y="1145219"/>
+            <a:ext cx="0" cy="1606626"/>
+          </a:xfrm>
+          <a:prstGeom prst="straightConnector1">
+            <a:avLst/>
+          </a:prstGeom>
+          <a:ln w="76200">
+            <a:solidFill>
+              <a:schemeClr val="accent1">
+                <a:lumMod val="60000"/>
+                <a:lumOff val="40000"/>
+                <a:alpha val="60000"/>
+              </a:schemeClr>
+            </a:solidFill>
+            <a:tailEnd type="triangle"/>
+          </a:ln>
+        </p:spPr>
+        <p:style>
+          <a:lnRef idx="1">
+            <a:schemeClr val="accent1"/>
+          </a:lnRef>
+          <a:fillRef idx="0">
+            <a:schemeClr val="accent1"/>
+          </a:fillRef>
+          <a:effectRef idx="0">
+            <a:schemeClr val="accent1"/>
+          </a:effectRef>
+          <a:fontRef idx="minor">
+            <a:schemeClr val="tx1"/>
+          </a:fontRef>
+        </p:style>
+      </p:cxnSp>
+      <p:cxnSp>
+        <p:nvCxnSpPr>
+          <p:cNvPr id="7" name="Connecteur droit avec flèche 6">
+            <a:extLst>
+              <a:ext uri="{FF2B5EF4-FFF2-40B4-BE49-F238E27FC236}">
+                <a16:creationId xmlns:a16="http://schemas.microsoft.com/office/drawing/2014/main" id="{5B6CFAE7-3CE4-4665-8A62-A74E96029C14}"/>
+              </a:ext>
+            </a:extLst>
+          </p:cNvPr>
+          <p:cNvCxnSpPr>
+            <a:cxnSpLocks/>
+          </p:cNvCxnSpPr>
+          <p:nvPr/>
+        </p:nvCxnSpPr>
+        <p:spPr>
+          <a:xfrm flipH="1">
+            <a:off x="3426782" y="989988"/>
+            <a:ext cx="1617845" cy="1380680"/>
+          </a:xfrm>
+          <a:prstGeom prst="straightConnector1">
+            <a:avLst/>
+          </a:prstGeom>
+          <a:ln w="76200">
+            <a:solidFill>
+              <a:schemeClr val="accent1">
+                <a:lumMod val="60000"/>
+                <a:lumOff val="40000"/>
+                <a:alpha val="60000"/>
+              </a:schemeClr>
+            </a:solidFill>
+            <a:tailEnd type="triangle"/>
+          </a:ln>
+        </p:spPr>
+        <p:style>
+          <a:lnRef idx="1">
+            <a:schemeClr val="accent1"/>
+          </a:lnRef>
+          <a:fillRef idx="0">
+            <a:schemeClr val="accent1"/>
+          </a:fillRef>
+          <a:effectRef idx="0">
+            <a:schemeClr val="accent1"/>
+          </a:effectRef>
+          <a:fontRef idx="minor">
+            <a:schemeClr val="tx1"/>
+          </a:fontRef>
+        </p:style>
+      </p:cxnSp>
+      <p:sp>
+        <p:nvSpPr>
+          <p:cNvPr id="8" name="ZoneTexte 7">
+            <a:extLst>
+              <a:ext uri="{FF2B5EF4-FFF2-40B4-BE49-F238E27FC236}">
+                <a16:creationId xmlns:a16="http://schemas.microsoft.com/office/drawing/2014/main" id="{9035EBA5-A191-4017-9BC3-68668EEEC5A6}"/>
+              </a:ext>
+            </a:extLst>
+          </p:cNvPr>
+          <p:cNvSpPr txBox="1"/>
+          <p:nvPr/>
+        </p:nvSpPr>
+        <p:spPr>
+          <a:xfrm>
+            <a:off x="2077435" y="3279624"/>
+            <a:ext cx="928459" cy="369332"/>
+          </a:xfrm>
+          <a:prstGeom prst="rect">
+            <a:avLst/>
+          </a:prstGeom>
+          <a:noFill/>
+        </p:spPr>
+        <p:txBody>
+          <a:bodyPr wrap="none" rtlCol="0">
+            <a:spAutoFit/>
+          </a:bodyPr>
+          <a:lstStyle/>
+          <a:p>
+            <a:r>
+              <a:rPr lang="fr-FR" b="1" dirty="0">
+                <a:solidFill>
+                  <a:schemeClr val="bg1"/>
+                </a:solidFill>
+                <a:latin typeface="Times New Roman" panose="02020603050405020304" pitchFamily="18" charset="0"/>
+                <a:cs typeface="Times New Roman" panose="02020603050405020304" pitchFamily="18" charset="0"/>
+              </a:rPr>
+              <a:t>Actions</a:t>
+            </a:r>
+            <a:endParaRPr lang="en-GB" b="1" dirty="0">
+              <a:solidFill>
+                <a:schemeClr val="bg1"/>
+              </a:solidFill>
+              <a:latin typeface="Times New Roman" panose="02020603050405020304" pitchFamily="18" charset="0"/>
+              <a:cs typeface="Times New Roman" panose="02020603050405020304" pitchFamily="18" charset="0"/>
+            </a:endParaRPr>
+          </a:p>
+        </p:txBody>
+      </p:sp>
+      <p:sp>
+        <p:nvSpPr>
+          <p:cNvPr id="9" name="ZoneTexte 8">
+            <a:extLst>
+              <a:ext uri="{FF2B5EF4-FFF2-40B4-BE49-F238E27FC236}">
+                <a16:creationId xmlns:a16="http://schemas.microsoft.com/office/drawing/2014/main" id="{BC7F6B83-CFA6-428A-9163-505D9408D6D0}"/>
+              </a:ext>
+            </a:extLst>
+          </p:cNvPr>
+          <p:cNvSpPr txBox="1"/>
+          <p:nvPr/>
+        </p:nvSpPr>
+        <p:spPr>
+          <a:xfrm>
+            <a:off x="5221551" y="4030132"/>
+            <a:ext cx="941283" cy="369332"/>
+          </a:xfrm>
+          <a:prstGeom prst="rect">
+            <a:avLst/>
+          </a:prstGeom>
+          <a:noFill/>
+        </p:spPr>
+        <p:txBody>
+          <a:bodyPr wrap="none" rtlCol="0">
+            <a:spAutoFit/>
+          </a:bodyPr>
+          <a:lstStyle/>
+          <a:p>
+            <a:r>
+              <a:rPr lang="fr-FR" b="1" dirty="0" err="1">
+                <a:solidFill>
+                  <a:srgbClr val="92D050"/>
+                </a:solidFill>
+                <a:latin typeface="Times New Roman" panose="02020603050405020304" pitchFamily="18" charset="0"/>
+                <a:cs typeface="Times New Roman" panose="02020603050405020304" pitchFamily="18" charset="0"/>
+              </a:rPr>
+              <a:t>Sensors</a:t>
+            </a:r>
+            <a:endParaRPr lang="en-GB" b="1" dirty="0">
+              <a:solidFill>
+                <a:srgbClr val="92D050"/>
+              </a:solidFill>
+              <a:latin typeface="Times New Roman" panose="02020603050405020304" pitchFamily="18" charset="0"/>
+              <a:cs typeface="Times New Roman" panose="02020603050405020304" pitchFamily="18" charset="0"/>
+            </a:endParaRPr>
+          </a:p>
+        </p:txBody>
+      </p:sp>
+      <p:sp>
+        <p:nvSpPr>
+          <p:cNvPr id="10" name="ZoneTexte 9">
+            <a:extLst>
+              <a:ext uri="{FF2B5EF4-FFF2-40B4-BE49-F238E27FC236}">
+                <a16:creationId xmlns:a16="http://schemas.microsoft.com/office/drawing/2014/main" id="{9A0D750E-6B64-4F6A-9699-6D981AE0E69F}"/>
+              </a:ext>
+            </a:extLst>
+          </p:cNvPr>
+          <p:cNvSpPr txBox="1"/>
+          <p:nvPr/>
+        </p:nvSpPr>
+        <p:spPr>
+          <a:xfrm>
+            <a:off x="8239377" y="3279624"/>
+            <a:ext cx="1270541" cy="369332"/>
+          </a:xfrm>
+          <a:prstGeom prst="rect">
+            <a:avLst/>
+          </a:prstGeom>
+          <a:noFill/>
+        </p:spPr>
+        <p:txBody>
+          <a:bodyPr wrap="none" rtlCol="0">
+            <a:spAutoFit/>
+          </a:bodyPr>
+          <a:lstStyle/>
+          <a:p>
+            <a:r>
+              <a:rPr lang="fr-FR" b="1" dirty="0">
+                <a:solidFill>
+                  <a:schemeClr val="accent6">
+                    <a:lumMod val="40000"/>
+                    <a:lumOff val="60000"/>
+                  </a:schemeClr>
+                </a:solidFill>
+                <a:latin typeface="Times New Roman" panose="02020603050405020304" pitchFamily="18" charset="0"/>
+                <a:cs typeface="Times New Roman" panose="02020603050405020304" pitchFamily="18" charset="0"/>
+              </a:rPr>
+              <a:t>Ressources</a:t>
+            </a:r>
+            <a:endParaRPr lang="en-GB" b="1" dirty="0">
+              <a:solidFill>
+                <a:schemeClr val="accent6">
+                  <a:lumMod val="40000"/>
+                  <a:lumOff val="60000"/>
+                </a:schemeClr>
+              </a:solidFill>
+              <a:latin typeface="Times New Roman" panose="02020603050405020304" pitchFamily="18" charset="0"/>
+              <a:cs typeface="Times New Roman" panose="02020603050405020304" pitchFamily="18" charset="0"/>
+            </a:endParaRPr>
+          </a:p>
+        </p:txBody>
+      </p:sp>
+      <p:pic>
+        <p:nvPicPr>
+          <p:cNvPr id="12" name="Image 11">
+            <a:extLst>
+              <a:ext uri="{FF2B5EF4-FFF2-40B4-BE49-F238E27FC236}">
+                <a16:creationId xmlns:a16="http://schemas.microsoft.com/office/drawing/2014/main" id="{460BFFBA-E30E-4BA2-B5A0-8B77D3024A79}"/>
+              </a:ext>
+            </a:extLst>
+          </p:cNvPr>
+          <p:cNvPicPr>
+            <a:picLocks noChangeAspect="1"/>
+          </p:cNvPicPr>
+          <p:nvPr/>
+        </p:nvPicPr>
+        <p:blipFill>
+          <a:blip r:embed="rId3"/>
+          <a:stretch>
+            <a:fillRect/>
+          </a:stretch>
+        </p:blipFill>
+        <p:spPr>
+          <a:xfrm>
+            <a:off x="4979375" y="218769"/>
+            <a:ext cx="1333500" cy="619125"/>
+          </a:xfrm>
+          <a:prstGeom prst="rect">
+            <a:avLst/>
+          </a:prstGeom>
+        </p:spPr>
+      </p:pic>
+      <p:pic>
+        <p:nvPicPr>
+          <p:cNvPr id="13" name="Image 12">
+            <a:extLst>
+              <a:ext uri="{FF2B5EF4-FFF2-40B4-BE49-F238E27FC236}">
+                <a16:creationId xmlns:a16="http://schemas.microsoft.com/office/drawing/2014/main" id="{26956F3D-9551-4FC1-8071-92FE32D0ABE2}"/>
+              </a:ext>
+            </a:extLst>
+          </p:cNvPr>
+          <p:cNvPicPr>
+            <a:picLocks noChangeAspect="1"/>
+          </p:cNvPicPr>
+          <p:nvPr/>
+        </p:nvPicPr>
+        <p:blipFill>
+          <a:blip r:embed="rId4"/>
+          <a:stretch>
+            <a:fillRect/>
+          </a:stretch>
+        </p:blipFill>
+        <p:spPr>
+          <a:xfrm>
+            <a:off x="2102807" y="2514600"/>
+            <a:ext cx="1323975" cy="609600"/>
+          </a:xfrm>
+          <a:prstGeom prst="rect">
+            <a:avLst/>
+          </a:prstGeom>
+        </p:spPr>
+      </p:pic>
+      <p:pic>
+        <p:nvPicPr>
+          <p:cNvPr id="15" name="Image 14">
+            <a:extLst>
+              <a:ext uri="{FF2B5EF4-FFF2-40B4-BE49-F238E27FC236}">
+                <a16:creationId xmlns:a16="http://schemas.microsoft.com/office/drawing/2014/main" id="{492195D9-84DC-4159-939B-CED361C5BBCD}"/>
+              </a:ext>
+            </a:extLst>
+          </p:cNvPr>
+          <p:cNvPicPr>
+            <a:picLocks noChangeAspect="1"/>
+          </p:cNvPicPr>
+          <p:nvPr/>
+        </p:nvPicPr>
+        <p:blipFill>
+          <a:blip r:embed="rId5"/>
+          <a:stretch>
+            <a:fillRect/>
+          </a:stretch>
+        </p:blipFill>
+        <p:spPr>
+          <a:xfrm>
+            <a:off x="5034967" y="3279624"/>
+            <a:ext cx="1314450" cy="600075"/>
+          </a:xfrm>
+          <a:prstGeom prst="rect">
+            <a:avLst/>
+          </a:prstGeom>
+        </p:spPr>
+      </p:pic>
+    </p:spTree>
+    <p:extLst>
+      <p:ext uri="{BB962C8B-B14F-4D97-AF65-F5344CB8AC3E}">
+        <p14:creationId xmlns:p14="http://schemas.microsoft.com/office/powerpoint/2010/main" val="2112816624"/>
+      </p:ext>
+    </p:extLst>
+  </p:cSld>
+  <p:clrMapOvr>
+    <a:masterClrMapping/>
+  </p:clrMapOvr>
+</p:sld>
+</file>
+
+<file path=ppt/slides/slide9.xml><?xml version="1.0" encoding="utf-8"?>
+<p:sld xmlns:a="http://schemas.openxmlformats.org/drawingml/2006/main" xmlns:r="http://schemas.openxmlformats.org/officeDocument/2006/relationships" xmlns:p="http://schemas.openxmlformats.org/presentationml/2006/main">
+  <p:cSld>
+    <p:spTree>
+      <p:nvGrpSpPr>
+        <p:cNvPr id="1" name=""/>
+        <p:cNvGrpSpPr/>
+        <p:nvPr/>
+      </p:nvGrpSpPr>
+      <p:grpSpPr>
+        <a:xfrm>
+          <a:off x="0" y="0"/>
+          <a:ext cx="0" cy="0"/>
+          <a:chOff x="0" y="0"/>
+          <a:chExt cx="0" cy="0"/>
+        </a:xfrm>
+      </p:grpSpPr>
+      <p:sp>
+        <p:nvSpPr>
+          <p:cNvPr id="2" name="Titre 1">
+            <a:extLst>
+              <a:ext uri="{FF2B5EF4-FFF2-40B4-BE49-F238E27FC236}">
                 <a16:creationId xmlns:a16="http://schemas.microsoft.com/office/drawing/2014/main" id="{60A45B33-4349-4205-A596-A72ABD8F0A69}"/>
               </a:ext>
             </a:extLst>
@@ -7212,17 +7764,14 @@
           <a:p>
             <a:r>
               <a:rPr lang="fr-FR" dirty="0"/>
-              <a:t>Brain image: </a:t>
-            </a:r>
-            <a:r>
-              <a:rPr lang="fr-FR" dirty="0">
+              <a:t>Annexe prototype: </a:t>
+            </a:r>
+            <a:r>
+              <a:rPr lang="en-GB" dirty="0">
                 <a:hlinkClick r:id="rId2"/>
               </a:rPr>
-              <a:t>https://cdn.mindful.org/Thrive.jpg?q=80&amp;fm=jpg&amp;fit=crop&amp;w=1920&amp;h=1080</a:t>
-            </a:r>
-            <a:endParaRPr lang="fr-FR" dirty="0"/>
-          </a:p>
-          <a:p>
+              <a:t>https://www.draw.io/</a:t>
+            </a:r>
             <a:endParaRPr lang="en-GB" dirty="0"/>
           </a:p>
         </p:txBody>

</xml_diff>

<commit_message>
Add information on solutions slide
</commit_message>
<xml_diff>
--- a/SAI_presentation.pptx
+++ b/SAI_presentation.pptx
@@ -5913,16 +5913,12 @@
               <a:t> SAI </a:t>
             </a:r>
             <a:r>
-              <a:rPr lang="fr-FR" dirty="0" err="1"/>
+              <a:rPr lang="fr-FR" err="1"/>
               <a:t>with</a:t>
             </a:r>
             <a:r>
-              <a:rPr lang="fr-FR" dirty="0"/>
-              <a:t> </a:t>
-            </a:r>
-            <a:r>
-              <a:rPr lang="fr-FR" dirty="0" err="1"/>
-              <a:t>pyinstaller</a:t>
+              <a:rPr lang="fr-FR"/>
+              <a:t> pyinstaller for multiplatform</a:t>
             </a:r>
             <a:endParaRPr lang="fr-FR" dirty="0"/>
           </a:p>

</xml_diff>

<commit_message>
#8 Add informatuon on environment
</commit_message>
<xml_diff>
--- a/SAI_presentation.pptx
+++ b/SAI_presentation.pptx
@@ -312,7 +312,7 @@
             <a:fld id="{B61BEF0D-F0BB-DE4B-95CE-6DB70DBA9567}" type="datetimeFigureOut">
               <a:rPr lang="en-US" dirty="0"/>
               <a:pPr/>
-              <a:t>10/12/2019</a:t>
+              <a:t>10/13/2019</a:t>
             </a:fld>
             <a:endParaRPr lang="en-US" dirty="0"/>
           </a:p>
@@ -745,7 +745,7 @@
             <a:fld id="{B61BEF0D-F0BB-DE4B-95CE-6DB70DBA9567}" type="datetimeFigureOut">
               <a:rPr lang="en-US" dirty="0"/>
               <a:pPr/>
-              <a:t>10/12/2019</a:t>
+              <a:t>10/13/2019</a:t>
             </a:fld>
             <a:endParaRPr lang="en-US" dirty="0"/>
           </a:p>
@@ -992,7 +992,7 @@
             <a:fld id="{B61BEF0D-F0BB-DE4B-95CE-6DB70DBA9567}" type="datetimeFigureOut">
               <a:rPr lang="en-US" dirty="0"/>
               <a:pPr/>
-              <a:t>10/12/2019</a:t>
+              <a:t>10/13/2019</a:t>
             </a:fld>
             <a:endParaRPr lang="en-US" dirty="0"/>
           </a:p>
@@ -1297,7 +1297,7 @@
             <a:fld id="{B61BEF0D-F0BB-DE4B-95CE-6DB70DBA9567}" type="datetimeFigureOut">
               <a:rPr lang="en-US" dirty="0"/>
               <a:pPr/>
-              <a:t>10/12/2019</a:t>
+              <a:t>10/13/2019</a:t>
             </a:fld>
             <a:endParaRPr lang="en-US" dirty="0"/>
           </a:p>
@@ -1612,7 +1612,7 @@
             <a:fld id="{B61BEF0D-F0BB-DE4B-95CE-6DB70DBA9567}" type="datetimeFigureOut">
               <a:rPr lang="en-US" dirty="0"/>
               <a:pPr/>
-              <a:t>10/12/2019</a:t>
+              <a:t>10/13/2019</a:t>
             </a:fld>
             <a:endParaRPr lang="en-US" dirty="0"/>
           </a:p>
@@ -1911,7 +1911,7 @@
             <a:fld id="{B61BEF0D-F0BB-DE4B-95CE-6DB70DBA9567}" type="datetimeFigureOut">
               <a:rPr lang="en-US" dirty="0"/>
               <a:pPr/>
-              <a:t>10/12/2019</a:t>
+              <a:t>10/13/2019</a:t>
             </a:fld>
             <a:endParaRPr lang="en-US" dirty="0"/>
           </a:p>
@@ -2275,7 +2275,7 @@
             <a:fld id="{B61BEF0D-F0BB-DE4B-95CE-6DB70DBA9567}" type="datetimeFigureOut">
               <a:rPr lang="en-US" dirty="0"/>
               <a:pPr/>
-              <a:t>10/12/2019</a:t>
+              <a:t>10/13/2019</a:t>
             </a:fld>
             <a:endParaRPr lang="en-US" dirty="0"/>
           </a:p>
@@ -2446,7 +2446,7 @@
             <a:fld id="{B61BEF0D-F0BB-DE4B-95CE-6DB70DBA9567}" type="datetimeFigureOut">
               <a:rPr lang="en-US" dirty="0"/>
               <a:pPr/>
-              <a:t>10/12/2019</a:t>
+              <a:t>10/13/2019</a:t>
             </a:fld>
             <a:endParaRPr lang="en-US" dirty="0"/>
           </a:p>
@@ -2623,7 +2623,7 @@
             <a:fld id="{B61BEF0D-F0BB-DE4B-95CE-6DB70DBA9567}" type="datetimeFigureOut">
               <a:rPr lang="en-US" dirty="0"/>
               <a:pPr/>
-              <a:t>10/12/2019</a:t>
+              <a:t>10/13/2019</a:t>
             </a:fld>
             <a:endParaRPr lang="en-US" dirty="0"/>
           </a:p>
@@ -2790,7 +2790,7 @@
             <a:fld id="{B61BEF0D-F0BB-DE4B-95CE-6DB70DBA9567}" type="datetimeFigureOut">
               <a:rPr lang="en-US" dirty="0"/>
               <a:pPr/>
-              <a:t>10/12/2019</a:t>
+              <a:t>10/13/2019</a:t>
             </a:fld>
             <a:endParaRPr lang="en-US" dirty="0"/>
           </a:p>
@@ -3037,7 +3037,7 @@
             <a:fld id="{B61BEF0D-F0BB-DE4B-95CE-6DB70DBA9567}" type="datetimeFigureOut">
               <a:rPr lang="en-US" dirty="0"/>
               <a:pPr/>
-              <a:t>10/12/2019</a:t>
+              <a:t>10/13/2019</a:t>
             </a:fld>
             <a:endParaRPr lang="en-US" dirty="0"/>
           </a:p>
@@ -3270,7 +3270,7 @@
             <a:fld id="{B61BEF0D-F0BB-DE4B-95CE-6DB70DBA9567}" type="datetimeFigureOut">
               <a:rPr lang="en-US" dirty="0"/>
               <a:pPr/>
-              <a:t>10/12/2019</a:t>
+              <a:t>10/13/2019</a:t>
             </a:fld>
             <a:endParaRPr lang="en-US" dirty="0"/>
           </a:p>
@@ -3649,7 +3649,7 @@
             <a:fld id="{B61BEF0D-F0BB-DE4B-95CE-6DB70DBA9567}" type="datetimeFigureOut">
               <a:rPr lang="en-US" dirty="0"/>
               <a:pPr/>
-              <a:t>10/12/2019</a:t>
+              <a:t>10/13/2019</a:t>
             </a:fld>
             <a:endParaRPr lang="en-US" dirty="0"/>
           </a:p>
@@ -3764,7 +3764,7 @@
             <a:fld id="{B61BEF0D-F0BB-DE4B-95CE-6DB70DBA9567}" type="datetimeFigureOut">
               <a:rPr lang="en-US" dirty="0"/>
               <a:pPr/>
-              <a:t>10/12/2019</a:t>
+              <a:t>10/13/2019</a:t>
             </a:fld>
             <a:endParaRPr lang="en-US" dirty="0"/>
           </a:p>
@@ -3856,7 +3856,7 @@
             <a:fld id="{B61BEF0D-F0BB-DE4B-95CE-6DB70DBA9567}" type="datetimeFigureOut">
               <a:rPr lang="en-US" dirty="0"/>
               <a:pPr/>
-              <a:t>10/12/2019</a:t>
+              <a:t>10/13/2019</a:t>
             </a:fld>
             <a:endParaRPr lang="en-US" dirty="0"/>
           </a:p>
@@ -4108,7 +4108,7 @@
             <a:fld id="{B61BEF0D-F0BB-DE4B-95CE-6DB70DBA9567}" type="datetimeFigureOut">
               <a:rPr lang="en-US" dirty="0"/>
               <a:pPr/>
-              <a:t>10/12/2019</a:t>
+              <a:t>10/13/2019</a:t>
             </a:fld>
             <a:endParaRPr lang="en-US" dirty="0"/>
           </a:p>
@@ -4388,7 +4388,7 @@
             <a:fld id="{B61BEF0D-F0BB-DE4B-95CE-6DB70DBA9567}" type="datetimeFigureOut">
               <a:rPr lang="en-US" dirty="0"/>
               <a:pPr/>
-              <a:t>10/12/2019</a:t>
+              <a:t>10/13/2019</a:t>
             </a:fld>
             <a:endParaRPr lang="en-US" dirty="0"/>
           </a:p>
@@ -4791,7 +4791,7 @@
             <a:fld id="{B61BEF0D-F0BB-DE4B-95CE-6DB70DBA9567}" type="datetimeFigureOut">
               <a:rPr lang="en-US" dirty="0"/>
               <a:pPr/>
-              <a:t>10/12/2019</a:t>
+              <a:t>10/13/2019</a:t>
             </a:fld>
             <a:endParaRPr lang="en-US" dirty="0"/>
           </a:p>
@@ -5530,12 +5530,8 @@
           </a:p>
           <a:p>
             <a:r>
-              <a:rPr lang="fr-FR" dirty="0"/>
-              <a:t>New </a:t>
-            </a:r>
-            <a:r>
-              <a:rPr lang="fr-FR" dirty="0" err="1"/>
-              <a:t>technology</a:t>
+              <a:rPr lang="fr-FR"/>
+              <a:t>New technology using daily report and voice command</a:t>
             </a:r>
             <a:endParaRPr lang="fr-FR" dirty="0"/>
           </a:p>

</xml_diff>

<commit_message>
#8 Update information on environment
</commit_message>
<xml_diff>
--- a/SAI_presentation.pptx
+++ b/SAI_presentation.pptx
@@ -5537,9 +5537,10 @@
           </a:p>
           <a:p>
             <a:r>
-              <a:rPr lang="fr-FR" dirty="0"/>
-              <a:t>New baby</a:t>
-            </a:r>
+              <a:rPr lang="fr-FR"/>
+              <a:t>New reinforcement learning like a baby</a:t>
+            </a:r>
+            <a:endParaRPr lang="fr-FR" dirty="0"/>
           </a:p>
           <a:p>
             <a:endParaRPr lang="fr-FR" dirty="0"/>

</xml_diff>

<commit_message>
#8 Update another information on slide environment
</commit_message>
<xml_diff>
--- a/SAI_presentation.pptx
+++ b/SAI_presentation.pptx
@@ -5481,9 +5481,10 @@
           <a:lstStyle/>
           <a:p>
             <a:r>
-              <a:rPr lang="fr-FR" dirty="0"/>
-              <a:t>Post-master</a:t>
-            </a:r>
+              <a:rPr lang="fr-FR"/>
+              <a:t>Work at home after gratuated on Master</a:t>
+            </a:r>
+            <a:endParaRPr lang="fr-FR" dirty="0"/>
           </a:p>
           <a:p>
             <a:r>

</xml_diff>

<commit_message>
#12 Future works added on slides
</commit_message>
<xml_diff>
--- a/SAI_presentation.pptx
+++ b/SAI_presentation.pptx
@@ -11,9 +11,10 @@
     <p:sldId id="259" r:id="rId5"/>
     <p:sldId id="260" r:id="rId6"/>
     <p:sldId id="261" r:id="rId7"/>
-    <p:sldId id="262" r:id="rId8"/>
-    <p:sldId id="264" r:id="rId9"/>
-    <p:sldId id="263" r:id="rId10"/>
+    <p:sldId id="265" r:id="rId8"/>
+    <p:sldId id="262" r:id="rId9"/>
+    <p:sldId id="264" r:id="rId10"/>
+    <p:sldId id="263" r:id="rId11"/>
   </p:sldIdLst>
   <p:sldSz cx="12192000" cy="6858000"/>
   <p:notesSz cx="6858000" cy="9144000"/>
@@ -6736,7 +6737,7 @@
             <a:fld id="{B61BEF0D-F0BB-DE4B-95CE-6DB70DBA9567}" type="datetimeFigureOut">
               <a:rPr lang="en-US" dirty="0"/>
               <a:pPr/>
-              <a:t>1/3/2020</a:t>
+              <a:t>3/1/2020</a:t>
             </a:fld>
             <a:endParaRPr lang="en-US" dirty="0"/>
           </a:p>
@@ -7169,7 +7170,7 @@
             <a:fld id="{B61BEF0D-F0BB-DE4B-95CE-6DB70DBA9567}" type="datetimeFigureOut">
               <a:rPr lang="en-US" dirty="0"/>
               <a:pPr/>
-              <a:t>1/3/2020</a:t>
+              <a:t>3/1/2020</a:t>
             </a:fld>
             <a:endParaRPr lang="en-US" dirty="0"/>
           </a:p>
@@ -7416,7 +7417,7 @@
             <a:fld id="{B61BEF0D-F0BB-DE4B-95CE-6DB70DBA9567}" type="datetimeFigureOut">
               <a:rPr lang="en-US" dirty="0"/>
               <a:pPr/>
-              <a:t>1/3/2020</a:t>
+              <a:t>3/1/2020</a:t>
             </a:fld>
             <a:endParaRPr lang="en-US" dirty="0"/>
           </a:p>
@@ -7721,7 +7722,7 @@
             <a:fld id="{B61BEF0D-F0BB-DE4B-95CE-6DB70DBA9567}" type="datetimeFigureOut">
               <a:rPr lang="en-US" dirty="0"/>
               <a:pPr/>
-              <a:t>1/3/2020</a:t>
+              <a:t>3/1/2020</a:t>
             </a:fld>
             <a:endParaRPr lang="en-US" dirty="0"/>
           </a:p>
@@ -8036,7 +8037,7 @@
             <a:fld id="{B61BEF0D-F0BB-DE4B-95CE-6DB70DBA9567}" type="datetimeFigureOut">
               <a:rPr lang="en-US" dirty="0"/>
               <a:pPr/>
-              <a:t>1/3/2020</a:t>
+              <a:t>3/1/2020</a:t>
             </a:fld>
             <a:endParaRPr lang="en-US" dirty="0"/>
           </a:p>
@@ -8335,7 +8336,7 @@
             <a:fld id="{B61BEF0D-F0BB-DE4B-95CE-6DB70DBA9567}" type="datetimeFigureOut">
               <a:rPr lang="en-US" dirty="0"/>
               <a:pPr/>
-              <a:t>1/3/2020</a:t>
+              <a:t>3/1/2020</a:t>
             </a:fld>
             <a:endParaRPr lang="en-US" dirty="0"/>
           </a:p>
@@ -8699,7 +8700,7 @@
             <a:fld id="{B61BEF0D-F0BB-DE4B-95CE-6DB70DBA9567}" type="datetimeFigureOut">
               <a:rPr lang="en-US" dirty="0"/>
               <a:pPr/>
-              <a:t>1/3/2020</a:t>
+              <a:t>3/1/2020</a:t>
             </a:fld>
             <a:endParaRPr lang="en-US" dirty="0"/>
           </a:p>
@@ -8870,7 +8871,7 @@
             <a:fld id="{B61BEF0D-F0BB-DE4B-95CE-6DB70DBA9567}" type="datetimeFigureOut">
               <a:rPr lang="en-US" dirty="0"/>
               <a:pPr/>
-              <a:t>1/3/2020</a:t>
+              <a:t>3/1/2020</a:t>
             </a:fld>
             <a:endParaRPr lang="en-US" dirty="0"/>
           </a:p>
@@ -9047,7 +9048,7 @@
             <a:fld id="{B61BEF0D-F0BB-DE4B-95CE-6DB70DBA9567}" type="datetimeFigureOut">
               <a:rPr lang="en-US" dirty="0"/>
               <a:pPr/>
-              <a:t>1/3/2020</a:t>
+              <a:t>3/1/2020</a:t>
             </a:fld>
             <a:endParaRPr lang="en-US" dirty="0"/>
           </a:p>
@@ -9214,7 +9215,7 @@
             <a:fld id="{B61BEF0D-F0BB-DE4B-95CE-6DB70DBA9567}" type="datetimeFigureOut">
               <a:rPr lang="en-US" dirty="0"/>
               <a:pPr/>
-              <a:t>1/3/2020</a:t>
+              <a:t>3/1/2020</a:t>
             </a:fld>
             <a:endParaRPr lang="en-US" dirty="0"/>
           </a:p>
@@ -9461,7 +9462,7 @@
             <a:fld id="{B61BEF0D-F0BB-DE4B-95CE-6DB70DBA9567}" type="datetimeFigureOut">
               <a:rPr lang="en-US" dirty="0"/>
               <a:pPr/>
-              <a:t>1/3/2020</a:t>
+              <a:t>3/1/2020</a:t>
             </a:fld>
             <a:endParaRPr lang="en-US" dirty="0"/>
           </a:p>
@@ -9694,7 +9695,7 @@
             <a:fld id="{B61BEF0D-F0BB-DE4B-95CE-6DB70DBA9567}" type="datetimeFigureOut">
               <a:rPr lang="en-US" dirty="0"/>
               <a:pPr/>
-              <a:t>1/3/2020</a:t>
+              <a:t>3/1/2020</a:t>
             </a:fld>
             <a:endParaRPr lang="en-US" dirty="0"/>
           </a:p>
@@ -10073,7 +10074,7 @@
             <a:fld id="{B61BEF0D-F0BB-DE4B-95CE-6DB70DBA9567}" type="datetimeFigureOut">
               <a:rPr lang="en-US" dirty="0"/>
               <a:pPr/>
-              <a:t>1/3/2020</a:t>
+              <a:t>3/1/2020</a:t>
             </a:fld>
             <a:endParaRPr lang="en-US" dirty="0"/>
           </a:p>
@@ -10188,7 +10189,7 @@
             <a:fld id="{B61BEF0D-F0BB-DE4B-95CE-6DB70DBA9567}" type="datetimeFigureOut">
               <a:rPr lang="en-US" dirty="0"/>
               <a:pPr/>
-              <a:t>1/3/2020</a:t>
+              <a:t>3/1/2020</a:t>
             </a:fld>
             <a:endParaRPr lang="en-US" dirty="0"/>
           </a:p>
@@ -10280,7 +10281,7 @@
             <a:fld id="{B61BEF0D-F0BB-DE4B-95CE-6DB70DBA9567}" type="datetimeFigureOut">
               <a:rPr lang="en-US" dirty="0"/>
               <a:pPr/>
-              <a:t>1/3/2020</a:t>
+              <a:t>3/1/2020</a:t>
             </a:fld>
             <a:endParaRPr lang="en-US" dirty="0"/>
           </a:p>
@@ -10532,7 +10533,7 @@
             <a:fld id="{B61BEF0D-F0BB-DE4B-95CE-6DB70DBA9567}" type="datetimeFigureOut">
               <a:rPr lang="en-US" dirty="0"/>
               <a:pPr/>
-              <a:t>1/3/2020</a:t>
+              <a:t>3/1/2020</a:t>
             </a:fld>
             <a:endParaRPr lang="en-US" dirty="0"/>
           </a:p>
@@ -10812,7 +10813,7 @@
             <a:fld id="{B61BEF0D-F0BB-DE4B-95CE-6DB70DBA9567}" type="datetimeFigureOut">
               <a:rPr lang="en-US" dirty="0"/>
               <a:pPr/>
-              <a:t>1/3/2020</a:t>
+              <a:t>3/1/2020</a:t>
             </a:fld>
             <a:endParaRPr lang="en-US" dirty="0"/>
           </a:p>
@@ -11215,7 +11216,7 @@
             <a:fld id="{B61BEF0D-F0BB-DE4B-95CE-6DB70DBA9567}" type="datetimeFigureOut">
               <a:rPr lang="en-US" dirty="0"/>
               <a:pPr/>
-              <a:t>1/3/2020</a:t>
+              <a:t>3/1/2020</a:t>
             </a:fld>
             <a:endParaRPr lang="en-US" dirty="0"/>
           </a:p>
@@ -12012,6 +12013,110 @@
 </p:sld>
 </file>
 
+<file path=ppt/slides/slide10.xml><?xml version="1.0" encoding="utf-8"?>
+<p:sld xmlns:a="http://schemas.openxmlformats.org/drawingml/2006/main" xmlns:r="http://schemas.openxmlformats.org/officeDocument/2006/relationships" xmlns:p="http://schemas.openxmlformats.org/presentationml/2006/main">
+  <p:cSld>
+    <p:spTree>
+      <p:nvGrpSpPr>
+        <p:cNvPr id="1" name=""/>
+        <p:cNvGrpSpPr/>
+        <p:nvPr/>
+      </p:nvGrpSpPr>
+      <p:grpSpPr>
+        <a:xfrm>
+          <a:off x="0" y="0"/>
+          <a:ext cx="0" cy="0"/>
+          <a:chOff x="0" y="0"/>
+          <a:chExt cx="0" cy="0"/>
+        </a:xfrm>
+      </p:grpSpPr>
+      <p:sp>
+        <p:nvSpPr>
+          <p:cNvPr id="2" name="Titre 1">
+            <a:extLst>
+              <a:ext uri="{FF2B5EF4-FFF2-40B4-BE49-F238E27FC236}">
+                <a16:creationId xmlns:a16="http://schemas.microsoft.com/office/drawing/2014/main" id="{60A45B33-4349-4205-A596-A72ABD8F0A69}"/>
+              </a:ext>
+            </a:extLst>
+          </p:cNvPr>
+          <p:cNvSpPr>
+            <a:spLocks noGrp="1"/>
+          </p:cNvSpPr>
+          <p:nvPr>
+            <p:ph type="title"/>
+          </p:nvPr>
+        </p:nvSpPr>
+        <p:spPr>
+          <a:xfrm>
+            <a:off x="684212" y="4487332"/>
+            <a:ext cx="8534400" cy="1507067"/>
+          </a:xfrm>
+        </p:spPr>
+        <p:txBody>
+          <a:bodyPr/>
+          <a:lstStyle/>
+          <a:p>
+            <a:r>
+              <a:rPr lang="fr-FR"/>
+              <a:t>Sources</a:t>
+            </a:r>
+            <a:endParaRPr lang="en-GB" dirty="0"/>
+          </a:p>
+        </p:txBody>
+      </p:sp>
+      <p:sp>
+        <p:nvSpPr>
+          <p:cNvPr id="3" name="Espace réservé du contenu 2">
+            <a:extLst>
+              <a:ext uri="{FF2B5EF4-FFF2-40B4-BE49-F238E27FC236}">
+                <a16:creationId xmlns:a16="http://schemas.microsoft.com/office/drawing/2014/main" id="{825892DE-953F-4021-9EA2-14E93075BB41}"/>
+              </a:ext>
+            </a:extLst>
+          </p:cNvPr>
+          <p:cNvSpPr>
+            <a:spLocks noGrp="1"/>
+          </p:cNvSpPr>
+          <p:nvPr>
+            <p:ph idx="1"/>
+          </p:nvPr>
+        </p:nvSpPr>
+        <p:spPr>
+          <a:xfrm>
+            <a:off x="684212" y="685800"/>
+            <a:ext cx="8534400" cy="3615267"/>
+          </a:xfrm>
+        </p:spPr>
+        <p:txBody>
+          <a:bodyPr/>
+          <a:lstStyle/>
+          <a:p>
+            <a:r>
+              <a:rPr lang="fr-FR"/>
+              <a:t>Annexe prototype: </a:t>
+            </a:r>
+            <a:r>
+              <a:rPr lang="en-GB">
+                <a:hlinkClick r:id="rId2"/>
+              </a:rPr>
+              <a:t>https://www.draw.io/</a:t>
+            </a:r>
+            <a:endParaRPr lang="en-GB" dirty="0"/>
+          </a:p>
+        </p:txBody>
+      </p:sp>
+    </p:spTree>
+    <p:extLst>
+      <p:ext uri="{BB962C8B-B14F-4D97-AF65-F5344CB8AC3E}">
+        <p14:creationId xmlns:p14="http://schemas.microsoft.com/office/powerpoint/2010/main" val="1489863068"/>
+      </p:ext>
+    </p:extLst>
+  </p:cSld>
+  <p:clrMapOvr>
+    <a:masterClrMapping/>
+  </p:clrMapOvr>
+</p:sld>
+</file>
+
 <file path=ppt/slides/slide2.xml><?xml version="1.0" encoding="utf-8"?>
 <p:sld xmlns:a="http://schemas.openxmlformats.org/drawingml/2006/main" xmlns:r="http://schemas.openxmlformats.org/officeDocument/2006/relationships" xmlns:p="http://schemas.openxmlformats.org/presentationml/2006/main">
   <p:cSld>
@@ -13391,6 +13496,186 @@
 </file>
 
 <file path=ppt/slides/slide7.xml><?xml version="1.0" encoding="utf-8"?>
+<p:sld xmlns:a="http://schemas.openxmlformats.org/drawingml/2006/main" xmlns:r="http://schemas.openxmlformats.org/officeDocument/2006/relationships" xmlns:p="http://schemas.openxmlformats.org/presentationml/2006/main">
+  <p:cSld>
+    <p:spTree>
+      <p:nvGrpSpPr>
+        <p:cNvPr id="1" name=""/>
+        <p:cNvGrpSpPr/>
+        <p:nvPr/>
+      </p:nvGrpSpPr>
+      <p:grpSpPr>
+        <a:xfrm>
+          <a:off x="0" y="0"/>
+          <a:ext cx="0" cy="0"/>
+          <a:chOff x="0" y="0"/>
+          <a:chExt cx="0" cy="0"/>
+        </a:xfrm>
+      </p:grpSpPr>
+      <p:sp>
+        <p:nvSpPr>
+          <p:cNvPr id="2" name="Titre 1">
+            <a:extLst>
+              <a:ext uri="{FF2B5EF4-FFF2-40B4-BE49-F238E27FC236}">
+                <a16:creationId xmlns:a16="http://schemas.microsoft.com/office/drawing/2014/main" id="{50C2AE22-9CDD-4DF4-8855-8950B74A3C2C}"/>
+              </a:ext>
+            </a:extLst>
+          </p:cNvPr>
+          <p:cNvSpPr>
+            <a:spLocks noGrp="1"/>
+          </p:cNvSpPr>
+          <p:nvPr>
+            <p:ph type="title"/>
+          </p:nvPr>
+        </p:nvSpPr>
+        <p:spPr/>
+        <p:txBody>
+          <a:bodyPr/>
+          <a:lstStyle/>
+          <a:p>
+            <a:r>
+              <a:rPr lang="fr-FR" dirty="0"/>
+              <a:t>Future </a:t>
+            </a:r>
+            <a:r>
+              <a:rPr lang="fr-FR" dirty="0" err="1"/>
+              <a:t>work</a:t>
+            </a:r>
+            <a:endParaRPr lang="en-GB" dirty="0"/>
+          </a:p>
+        </p:txBody>
+      </p:sp>
+      <p:sp>
+        <p:nvSpPr>
+          <p:cNvPr id="3" name="Espace réservé du contenu 2">
+            <a:extLst>
+              <a:ext uri="{FF2B5EF4-FFF2-40B4-BE49-F238E27FC236}">
+                <a16:creationId xmlns:a16="http://schemas.microsoft.com/office/drawing/2014/main" id="{72E4D2C1-E7EB-4B25-A95A-5210D44CC2AA}"/>
+              </a:ext>
+            </a:extLst>
+          </p:cNvPr>
+          <p:cNvSpPr>
+            <a:spLocks noGrp="1"/>
+          </p:cNvSpPr>
+          <p:nvPr>
+            <p:ph idx="1"/>
+          </p:nvPr>
+        </p:nvSpPr>
+        <p:spPr/>
+        <p:txBody>
+          <a:bodyPr/>
+          <a:lstStyle/>
+          <a:p>
+            <a:r>
+              <a:rPr lang="fr-FR" dirty="0"/>
+              <a:t>Virtual assistant launch </a:t>
+            </a:r>
+            <a:r>
+              <a:rPr lang="fr-FR" dirty="0" err="1"/>
+              <a:t>every</a:t>
+            </a:r>
+            <a:r>
+              <a:rPr lang="fr-FR" dirty="0"/>
+              <a:t> time the computer </a:t>
+            </a:r>
+            <a:r>
+              <a:rPr lang="fr-FR" dirty="0" err="1"/>
+              <a:t>is</a:t>
+            </a:r>
+            <a:r>
+              <a:rPr lang="fr-FR" dirty="0"/>
+              <a:t> up</a:t>
+            </a:r>
+          </a:p>
+          <a:p>
+            <a:r>
+              <a:rPr lang="fr-FR" dirty="0" err="1"/>
+              <a:t>Generate</a:t>
+            </a:r>
+            <a:r>
+              <a:rPr lang="fr-FR" dirty="0"/>
+              <a:t> a </a:t>
+            </a:r>
+            <a:r>
+              <a:rPr lang="fr-FR" dirty="0" err="1"/>
+              <a:t>voice</a:t>
+            </a:r>
+            <a:r>
+              <a:rPr lang="fr-FR" dirty="0"/>
+              <a:t> for the </a:t>
+            </a:r>
+            <a:r>
+              <a:rPr lang="fr-FR" dirty="0" err="1"/>
+              <a:t>virtual</a:t>
+            </a:r>
+            <a:r>
+              <a:rPr lang="fr-FR" dirty="0"/>
+              <a:t> assistant to </a:t>
+            </a:r>
+            <a:r>
+              <a:rPr lang="fr-FR" dirty="0" err="1"/>
+              <a:t>communicate</a:t>
+            </a:r>
+            <a:r>
+              <a:rPr lang="fr-FR" dirty="0"/>
+              <a:t> </a:t>
+            </a:r>
+            <a:r>
+              <a:rPr lang="fr-FR" dirty="0" err="1"/>
+              <a:t>with</a:t>
+            </a:r>
+            <a:r>
+              <a:rPr lang="fr-FR" dirty="0"/>
+              <a:t> the user</a:t>
+            </a:r>
+          </a:p>
+          <a:p>
+            <a:r>
+              <a:rPr lang="fr-FR" dirty="0"/>
+              <a:t>Profiling </a:t>
+            </a:r>
+            <a:r>
+              <a:rPr lang="fr-FR" dirty="0" err="1"/>
+              <a:t>each</a:t>
+            </a:r>
+            <a:r>
+              <a:rPr lang="fr-FR" dirty="0"/>
+              <a:t> user </a:t>
+            </a:r>
+            <a:r>
+              <a:rPr lang="fr-FR" dirty="0" err="1"/>
+              <a:t>that</a:t>
+            </a:r>
+            <a:r>
+              <a:rPr lang="fr-FR" dirty="0"/>
+              <a:t> use the </a:t>
+            </a:r>
+            <a:r>
+              <a:rPr lang="fr-FR" dirty="0" err="1"/>
+              <a:t>virtual</a:t>
+            </a:r>
+            <a:r>
+              <a:rPr lang="fr-FR"/>
+              <a:t> assistant</a:t>
+            </a:r>
+            <a:endParaRPr lang="en-GB"/>
+          </a:p>
+        </p:txBody>
+      </p:sp>
+    </p:spTree>
+    <p:extLst>
+      <p:ext uri="{BB962C8B-B14F-4D97-AF65-F5344CB8AC3E}">
+        <p14:creationId xmlns:p14="http://schemas.microsoft.com/office/powerpoint/2010/main" val="4010460576"/>
+      </p:ext>
+    </p:extLst>
+  </p:cSld>
+  <p:clrMapOvr>
+    <a:masterClrMapping/>
+  </p:clrMapOvr>
+</p:sld>
+</file>
+
+<file path=ppt/slides/slide8.xml><?xml version="1.0" encoding="utf-8"?>
 <p:sld xmlns:a="http://schemas.openxmlformats.org/drawingml/2006/main" xmlns:r="http://schemas.openxmlformats.org/officeDocument/2006/relationships" xmlns:p="http://schemas.openxmlformats.org/presentationml/2006/main">
   <p:cSld>
     <p:spTree>
@@ -14143,7 +14428,7 @@
 </p:sld>
 </file>
 
-<file path=ppt/slides/slide8.xml><?xml version="1.0" encoding="utf-8"?>
+<file path=ppt/slides/slide9.xml><?xml version="1.0" encoding="utf-8"?>
 <p:sld xmlns:a="http://schemas.openxmlformats.org/drawingml/2006/main" xmlns:r="http://schemas.openxmlformats.org/officeDocument/2006/relationships" xmlns:p="http://schemas.openxmlformats.org/presentationml/2006/main">
   <p:cSld>
     <p:spTree>
@@ -14675,110 +14960,6 @@
     <p:extLst>
       <p:ext uri="{BB962C8B-B14F-4D97-AF65-F5344CB8AC3E}">
         <p14:creationId xmlns:p14="http://schemas.microsoft.com/office/powerpoint/2010/main" val="2112816624"/>
-      </p:ext>
-    </p:extLst>
-  </p:cSld>
-  <p:clrMapOvr>
-    <a:masterClrMapping/>
-  </p:clrMapOvr>
-</p:sld>
-</file>
-
-<file path=ppt/slides/slide9.xml><?xml version="1.0" encoding="utf-8"?>
-<p:sld xmlns:a="http://schemas.openxmlformats.org/drawingml/2006/main" xmlns:r="http://schemas.openxmlformats.org/officeDocument/2006/relationships" xmlns:p="http://schemas.openxmlformats.org/presentationml/2006/main">
-  <p:cSld>
-    <p:spTree>
-      <p:nvGrpSpPr>
-        <p:cNvPr id="1" name=""/>
-        <p:cNvGrpSpPr/>
-        <p:nvPr/>
-      </p:nvGrpSpPr>
-      <p:grpSpPr>
-        <a:xfrm>
-          <a:off x="0" y="0"/>
-          <a:ext cx="0" cy="0"/>
-          <a:chOff x="0" y="0"/>
-          <a:chExt cx="0" cy="0"/>
-        </a:xfrm>
-      </p:grpSpPr>
-      <p:sp>
-        <p:nvSpPr>
-          <p:cNvPr id="2" name="Titre 1">
-            <a:extLst>
-              <a:ext uri="{FF2B5EF4-FFF2-40B4-BE49-F238E27FC236}">
-                <a16:creationId xmlns:a16="http://schemas.microsoft.com/office/drawing/2014/main" id="{60A45B33-4349-4205-A596-A72ABD8F0A69}"/>
-              </a:ext>
-            </a:extLst>
-          </p:cNvPr>
-          <p:cNvSpPr>
-            <a:spLocks noGrp="1"/>
-          </p:cNvSpPr>
-          <p:nvPr>
-            <p:ph type="title"/>
-          </p:nvPr>
-        </p:nvSpPr>
-        <p:spPr>
-          <a:xfrm>
-            <a:off x="684212" y="4487332"/>
-            <a:ext cx="8534400" cy="1507067"/>
-          </a:xfrm>
-        </p:spPr>
-        <p:txBody>
-          <a:bodyPr/>
-          <a:lstStyle/>
-          <a:p>
-            <a:r>
-              <a:rPr lang="fr-FR"/>
-              <a:t>Sources</a:t>
-            </a:r>
-            <a:endParaRPr lang="en-GB" dirty="0"/>
-          </a:p>
-        </p:txBody>
-      </p:sp>
-      <p:sp>
-        <p:nvSpPr>
-          <p:cNvPr id="3" name="Espace réservé du contenu 2">
-            <a:extLst>
-              <a:ext uri="{FF2B5EF4-FFF2-40B4-BE49-F238E27FC236}">
-                <a16:creationId xmlns:a16="http://schemas.microsoft.com/office/drawing/2014/main" id="{825892DE-953F-4021-9EA2-14E93075BB41}"/>
-              </a:ext>
-            </a:extLst>
-          </p:cNvPr>
-          <p:cNvSpPr>
-            <a:spLocks noGrp="1"/>
-          </p:cNvSpPr>
-          <p:nvPr>
-            <p:ph idx="1"/>
-          </p:nvPr>
-        </p:nvSpPr>
-        <p:spPr>
-          <a:xfrm>
-            <a:off x="684212" y="685800"/>
-            <a:ext cx="8534400" cy="3615267"/>
-          </a:xfrm>
-        </p:spPr>
-        <p:txBody>
-          <a:bodyPr/>
-          <a:lstStyle/>
-          <a:p>
-            <a:r>
-              <a:rPr lang="fr-FR"/>
-              <a:t>Annexe prototype: </a:t>
-            </a:r>
-            <a:r>
-              <a:rPr lang="en-GB">
-                <a:hlinkClick r:id="rId2"/>
-              </a:rPr>
-              <a:t>https://www.draw.io/</a:t>
-            </a:r>
-            <a:endParaRPr lang="en-GB" dirty="0"/>
-          </a:p>
-        </p:txBody>
-      </p:sp>
-    </p:spTree>
-    <p:extLst>
-      <p:ext uri="{BB962C8B-B14F-4D97-AF65-F5344CB8AC3E}">
-        <p14:creationId xmlns:p14="http://schemas.microsoft.com/office/powerpoint/2010/main" val="1489863068"/>
       </p:ext>
     </p:extLst>
   </p:cSld>

</xml_diff>

<commit_message>
#12 First step of environment added on slides
</commit_message>
<xml_diff>
--- a/SAI_presentation.pptx
+++ b/SAI_presentation.pptx
@@ -7,14 +7,15 @@
   <p:sldIdLst>
     <p:sldId id="256" r:id="rId2"/>
     <p:sldId id="257" r:id="rId3"/>
-    <p:sldId id="258" r:id="rId4"/>
-    <p:sldId id="259" r:id="rId5"/>
-    <p:sldId id="260" r:id="rId6"/>
-    <p:sldId id="261" r:id="rId7"/>
-    <p:sldId id="265" r:id="rId8"/>
-    <p:sldId id="262" r:id="rId9"/>
-    <p:sldId id="264" r:id="rId10"/>
-    <p:sldId id="263" r:id="rId11"/>
+    <p:sldId id="266" r:id="rId4"/>
+    <p:sldId id="258" r:id="rId5"/>
+    <p:sldId id="259" r:id="rId6"/>
+    <p:sldId id="260" r:id="rId7"/>
+    <p:sldId id="261" r:id="rId8"/>
+    <p:sldId id="265" r:id="rId9"/>
+    <p:sldId id="262" r:id="rId10"/>
+    <p:sldId id="264" r:id="rId11"/>
+    <p:sldId id="263" r:id="rId12"/>
   </p:sldIdLst>
   <p:sldSz cx="12192000" cy="6858000"/>
   <p:notesSz cx="6858000" cy="9144000"/>
@@ -12035,6 +12036,547 @@
           <p:cNvPr id="2" name="Titre 1">
             <a:extLst>
               <a:ext uri="{FF2B5EF4-FFF2-40B4-BE49-F238E27FC236}">
+                <a16:creationId xmlns:a16="http://schemas.microsoft.com/office/drawing/2014/main" id="{C3A47323-C1D5-4FF9-968A-64ABFA3C1E18}"/>
+              </a:ext>
+            </a:extLst>
+          </p:cNvPr>
+          <p:cNvSpPr>
+            <a:spLocks noGrp="1"/>
+          </p:cNvSpPr>
+          <p:nvPr>
+            <p:ph type="title"/>
+          </p:nvPr>
+        </p:nvSpPr>
+        <p:spPr/>
+        <p:txBody>
+          <a:bodyPr/>
+          <a:lstStyle/>
+          <a:p>
+            <a:r>
+              <a:rPr lang="fr-FR" dirty="0"/>
+              <a:t>Annexe</a:t>
+            </a:r>
+            <a:endParaRPr lang="en-GB" dirty="0"/>
+          </a:p>
+        </p:txBody>
+      </p:sp>
+      <p:pic>
+        <p:nvPicPr>
+          <p:cNvPr id="16" name="Espace réservé du contenu 15">
+            <a:extLst>
+              <a:ext uri="{FF2B5EF4-FFF2-40B4-BE49-F238E27FC236}">
+                <a16:creationId xmlns:a16="http://schemas.microsoft.com/office/drawing/2014/main" id="{B2C4B2A4-24E6-4EA7-8EF4-F1B0389A247E}"/>
+              </a:ext>
+            </a:extLst>
+          </p:cNvPr>
+          <p:cNvPicPr>
+            <a:picLocks noGrp="1" noChangeAspect="1"/>
+          </p:cNvPicPr>
+          <p:nvPr>
+            <p:ph idx="1"/>
+          </p:nvPr>
+        </p:nvPicPr>
+        <p:blipFill>
+          <a:blip r:embed="rId2"/>
+          <a:stretch>
+            <a:fillRect/>
+          </a:stretch>
+        </p:blipFill>
+        <p:spPr>
+          <a:xfrm>
+            <a:off x="7839108" y="2560399"/>
+            <a:ext cx="1314450" cy="600075"/>
+          </a:xfrm>
+          <a:prstGeom prst="rect">
+            <a:avLst/>
+          </a:prstGeom>
+        </p:spPr>
+      </p:pic>
+      <p:sp>
+        <p:nvSpPr>
+          <p:cNvPr id="4" name="ZoneTexte 3">
+            <a:extLst>
+              <a:ext uri="{FF2B5EF4-FFF2-40B4-BE49-F238E27FC236}">
+                <a16:creationId xmlns:a16="http://schemas.microsoft.com/office/drawing/2014/main" id="{308043D7-F2FD-4D07-9420-385AA37319FD}"/>
+              </a:ext>
+            </a:extLst>
+          </p:cNvPr>
+          <p:cNvSpPr txBox="1"/>
+          <p:nvPr/>
+        </p:nvSpPr>
+        <p:spPr>
+          <a:xfrm>
+            <a:off x="499481" y="348122"/>
+            <a:ext cx="1754006" cy="369332"/>
+          </a:xfrm>
+          <a:prstGeom prst="rect">
+            <a:avLst/>
+          </a:prstGeom>
+          <a:noFill/>
+        </p:spPr>
+        <p:txBody>
+          <a:bodyPr wrap="none" rtlCol="0">
+            <a:spAutoFit/>
+          </a:bodyPr>
+          <a:lstStyle/>
+          <a:p>
+            <a:r>
+              <a:rPr lang="fr-FR" dirty="0"/>
+              <a:t>The prototype</a:t>
+            </a:r>
+            <a:endParaRPr lang="en-GB" dirty="0"/>
+          </a:p>
+        </p:txBody>
+      </p:sp>
+      <p:cxnSp>
+        <p:nvCxnSpPr>
+          <p:cNvPr id="5" name="Connecteur droit avec flèche 4">
+            <a:extLst>
+              <a:ext uri="{FF2B5EF4-FFF2-40B4-BE49-F238E27FC236}">
+                <a16:creationId xmlns:a16="http://schemas.microsoft.com/office/drawing/2014/main" id="{76B2BD43-8A32-4F05-90EE-F4CBE6F6B3AC}"/>
+              </a:ext>
+            </a:extLst>
+          </p:cNvPr>
+          <p:cNvCxnSpPr>
+            <a:cxnSpLocks/>
+          </p:cNvCxnSpPr>
+          <p:nvPr/>
+        </p:nvCxnSpPr>
+        <p:spPr>
+          <a:xfrm>
+            <a:off x="6384258" y="989988"/>
+            <a:ext cx="1526233" cy="1340211"/>
+          </a:xfrm>
+          <a:prstGeom prst="straightConnector1">
+            <a:avLst/>
+          </a:prstGeom>
+          <a:ln w="76200">
+            <a:solidFill>
+              <a:schemeClr val="accent1">
+                <a:lumMod val="60000"/>
+                <a:lumOff val="40000"/>
+                <a:alpha val="60000"/>
+              </a:schemeClr>
+            </a:solidFill>
+            <a:tailEnd type="triangle"/>
+          </a:ln>
+        </p:spPr>
+        <p:style>
+          <a:lnRef idx="1">
+            <a:schemeClr val="accent1"/>
+          </a:lnRef>
+          <a:fillRef idx="0">
+            <a:schemeClr val="accent1"/>
+          </a:fillRef>
+          <a:effectRef idx="0">
+            <a:schemeClr val="accent1"/>
+          </a:effectRef>
+          <a:fontRef idx="minor">
+            <a:schemeClr val="tx1"/>
+          </a:fontRef>
+        </p:style>
+      </p:cxnSp>
+      <p:cxnSp>
+        <p:nvCxnSpPr>
+          <p:cNvPr id="6" name="Connecteur droit avec flèche 5">
+            <a:extLst>
+              <a:ext uri="{FF2B5EF4-FFF2-40B4-BE49-F238E27FC236}">
+                <a16:creationId xmlns:a16="http://schemas.microsoft.com/office/drawing/2014/main" id="{4FB2FE4C-19EC-481B-8A75-3B52BCC715A8}"/>
+              </a:ext>
+            </a:extLst>
+          </p:cNvPr>
+          <p:cNvCxnSpPr>
+            <a:cxnSpLocks/>
+          </p:cNvCxnSpPr>
+          <p:nvPr/>
+        </p:nvCxnSpPr>
+        <p:spPr>
+          <a:xfrm>
+            <a:off x="5678751" y="1145219"/>
+            <a:ext cx="0" cy="1606626"/>
+          </a:xfrm>
+          <a:prstGeom prst="straightConnector1">
+            <a:avLst/>
+          </a:prstGeom>
+          <a:ln w="76200">
+            <a:solidFill>
+              <a:schemeClr val="accent1">
+                <a:lumMod val="60000"/>
+                <a:lumOff val="40000"/>
+                <a:alpha val="60000"/>
+              </a:schemeClr>
+            </a:solidFill>
+            <a:tailEnd type="triangle"/>
+          </a:ln>
+        </p:spPr>
+        <p:style>
+          <a:lnRef idx="1">
+            <a:schemeClr val="accent1"/>
+          </a:lnRef>
+          <a:fillRef idx="0">
+            <a:schemeClr val="accent1"/>
+          </a:fillRef>
+          <a:effectRef idx="0">
+            <a:schemeClr val="accent1"/>
+          </a:effectRef>
+          <a:fontRef idx="minor">
+            <a:schemeClr val="tx1"/>
+          </a:fontRef>
+        </p:style>
+      </p:cxnSp>
+      <p:cxnSp>
+        <p:nvCxnSpPr>
+          <p:cNvPr id="7" name="Connecteur droit avec flèche 6">
+            <a:extLst>
+              <a:ext uri="{FF2B5EF4-FFF2-40B4-BE49-F238E27FC236}">
+                <a16:creationId xmlns:a16="http://schemas.microsoft.com/office/drawing/2014/main" id="{5B6CFAE7-3CE4-4665-8A62-A74E96029C14}"/>
+              </a:ext>
+            </a:extLst>
+          </p:cNvPr>
+          <p:cNvCxnSpPr>
+            <a:cxnSpLocks/>
+          </p:cNvCxnSpPr>
+          <p:nvPr/>
+        </p:nvCxnSpPr>
+        <p:spPr>
+          <a:xfrm flipH="1">
+            <a:off x="3426782" y="989988"/>
+            <a:ext cx="1617845" cy="1380680"/>
+          </a:xfrm>
+          <a:prstGeom prst="straightConnector1">
+            <a:avLst/>
+          </a:prstGeom>
+          <a:ln w="76200">
+            <a:solidFill>
+              <a:schemeClr val="accent1">
+                <a:lumMod val="60000"/>
+                <a:lumOff val="40000"/>
+                <a:alpha val="60000"/>
+              </a:schemeClr>
+            </a:solidFill>
+            <a:tailEnd type="triangle"/>
+          </a:ln>
+        </p:spPr>
+        <p:style>
+          <a:lnRef idx="1">
+            <a:schemeClr val="accent1"/>
+          </a:lnRef>
+          <a:fillRef idx="0">
+            <a:schemeClr val="accent1"/>
+          </a:fillRef>
+          <a:effectRef idx="0">
+            <a:schemeClr val="accent1"/>
+          </a:effectRef>
+          <a:fontRef idx="minor">
+            <a:schemeClr val="tx1"/>
+          </a:fontRef>
+        </p:style>
+      </p:cxnSp>
+      <p:sp>
+        <p:nvSpPr>
+          <p:cNvPr id="8" name="ZoneTexte 7">
+            <a:extLst>
+              <a:ext uri="{FF2B5EF4-FFF2-40B4-BE49-F238E27FC236}">
+                <a16:creationId xmlns:a16="http://schemas.microsoft.com/office/drawing/2014/main" id="{9035EBA5-A191-4017-9BC3-68668EEEC5A6}"/>
+              </a:ext>
+            </a:extLst>
+          </p:cNvPr>
+          <p:cNvSpPr txBox="1"/>
+          <p:nvPr/>
+        </p:nvSpPr>
+        <p:spPr>
+          <a:xfrm>
+            <a:off x="2077435" y="3279624"/>
+            <a:ext cx="928459" cy="369332"/>
+          </a:xfrm>
+          <a:prstGeom prst="rect">
+            <a:avLst/>
+          </a:prstGeom>
+          <a:noFill/>
+        </p:spPr>
+        <p:txBody>
+          <a:bodyPr wrap="none" rtlCol="0">
+            <a:spAutoFit/>
+          </a:bodyPr>
+          <a:lstStyle/>
+          <a:p>
+            <a:r>
+              <a:rPr lang="fr-FR" b="1" dirty="0">
+                <a:solidFill>
+                  <a:schemeClr val="bg1"/>
+                </a:solidFill>
+                <a:latin typeface="Times New Roman" panose="02020603050405020304" pitchFamily="18" charset="0"/>
+                <a:cs typeface="Times New Roman" panose="02020603050405020304" pitchFamily="18" charset="0"/>
+              </a:rPr>
+              <a:t>Actions</a:t>
+            </a:r>
+            <a:endParaRPr lang="en-GB" b="1" dirty="0">
+              <a:solidFill>
+                <a:schemeClr val="bg1"/>
+              </a:solidFill>
+              <a:latin typeface="Times New Roman" panose="02020603050405020304" pitchFamily="18" charset="0"/>
+              <a:cs typeface="Times New Roman" panose="02020603050405020304" pitchFamily="18" charset="0"/>
+            </a:endParaRPr>
+          </a:p>
+        </p:txBody>
+      </p:sp>
+      <p:sp>
+        <p:nvSpPr>
+          <p:cNvPr id="9" name="ZoneTexte 8">
+            <a:extLst>
+              <a:ext uri="{FF2B5EF4-FFF2-40B4-BE49-F238E27FC236}">
+                <a16:creationId xmlns:a16="http://schemas.microsoft.com/office/drawing/2014/main" id="{BC7F6B83-CFA6-428A-9163-505D9408D6D0}"/>
+              </a:ext>
+            </a:extLst>
+          </p:cNvPr>
+          <p:cNvSpPr txBox="1"/>
+          <p:nvPr/>
+        </p:nvSpPr>
+        <p:spPr>
+          <a:xfrm>
+            <a:off x="5221551" y="4030132"/>
+            <a:ext cx="941283" cy="369332"/>
+          </a:xfrm>
+          <a:prstGeom prst="rect">
+            <a:avLst/>
+          </a:prstGeom>
+          <a:noFill/>
+        </p:spPr>
+        <p:txBody>
+          <a:bodyPr wrap="none" rtlCol="0">
+            <a:spAutoFit/>
+          </a:bodyPr>
+          <a:lstStyle/>
+          <a:p>
+            <a:r>
+              <a:rPr lang="fr-FR" b="1" dirty="0" err="1">
+                <a:solidFill>
+                  <a:srgbClr val="92D050"/>
+                </a:solidFill>
+                <a:latin typeface="Times New Roman" panose="02020603050405020304" pitchFamily="18" charset="0"/>
+                <a:cs typeface="Times New Roman" panose="02020603050405020304" pitchFamily="18" charset="0"/>
+              </a:rPr>
+              <a:t>Sensors</a:t>
+            </a:r>
+            <a:endParaRPr lang="en-GB" b="1" dirty="0">
+              <a:solidFill>
+                <a:srgbClr val="92D050"/>
+              </a:solidFill>
+              <a:latin typeface="Times New Roman" panose="02020603050405020304" pitchFamily="18" charset="0"/>
+              <a:cs typeface="Times New Roman" panose="02020603050405020304" pitchFamily="18" charset="0"/>
+            </a:endParaRPr>
+          </a:p>
+        </p:txBody>
+      </p:sp>
+      <p:sp>
+        <p:nvSpPr>
+          <p:cNvPr id="10" name="ZoneTexte 9">
+            <a:extLst>
+              <a:ext uri="{FF2B5EF4-FFF2-40B4-BE49-F238E27FC236}">
+                <a16:creationId xmlns:a16="http://schemas.microsoft.com/office/drawing/2014/main" id="{9A0D750E-6B64-4F6A-9699-6D981AE0E69F}"/>
+              </a:ext>
+            </a:extLst>
+          </p:cNvPr>
+          <p:cNvSpPr txBox="1"/>
+          <p:nvPr/>
+        </p:nvSpPr>
+        <p:spPr>
+          <a:xfrm>
+            <a:off x="8239377" y="3279624"/>
+            <a:ext cx="1270541" cy="369332"/>
+          </a:xfrm>
+          <a:prstGeom prst="rect">
+            <a:avLst/>
+          </a:prstGeom>
+          <a:noFill/>
+        </p:spPr>
+        <p:txBody>
+          <a:bodyPr wrap="none" rtlCol="0">
+            <a:spAutoFit/>
+          </a:bodyPr>
+          <a:lstStyle/>
+          <a:p>
+            <a:r>
+              <a:rPr lang="fr-FR" b="1" dirty="0">
+                <a:solidFill>
+                  <a:schemeClr val="accent6">
+                    <a:lumMod val="40000"/>
+                    <a:lumOff val="60000"/>
+                  </a:schemeClr>
+                </a:solidFill>
+                <a:latin typeface="Times New Roman" panose="02020603050405020304" pitchFamily="18" charset="0"/>
+                <a:cs typeface="Times New Roman" panose="02020603050405020304" pitchFamily="18" charset="0"/>
+              </a:rPr>
+              <a:t>Ressources</a:t>
+            </a:r>
+            <a:endParaRPr lang="en-GB" b="1" dirty="0">
+              <a:solidFill>
+                <a:schemeClr val="accent6">
+                  <a:lumMod val="40000"/>
+                  <a:lumOff val="60000"/>
+                </a:schemeClr>
+              </a:solidFill>
+              <a:latin typeface="Times New Roman" panose="02020603050405020304" pitchFamily="18" charset="0"/>
+              <a:cs typeface="Times New Roman" panose="02020603050405020304" pitchFamily="18" charset="0"/>
+            </a:endParaRPr>
+          </a:p>
+        </p:txBody>
+      </p:sp>
+      <p:pic>
+        <p:nvPicPr>
+          <p:cNvPr id="12" name="Image 11">
+            <a:extLst>
+              <a:ext uri="{FF2B5EF4-FFF2-40B4-BE49-F238E27FC236}">
+                <a16:creationId xmlns:a16="http://schemas.microsoft.com/office/drawing/2014/main" id="{460BFFBA-E30E-4BA2-B5A0-8B77D3024A79}"/>
+              </a:ext>
+            </a:extLst>
+          </p:cNvPr>
+          <p:cNvPicPr>
+            <a:picLocks noChangeAspect="1"/>
+          </p:cNvPicPr>
+          <p:nvPr/>
+        </p:nvPicPr>
+        <p:blipFill>
+          <a:blip r:embed="rId3"/>
+          <a:stretch>
+            <a:fillRect/>
+          </a:stretch>
+        </p:blipFill>
+        <p:spPr>
+          <a:xfrm>
+            <a:off x="4979375" y="218769"/>
+            <a:ext cx="1333500" cy="619125"/>
+          </a:xfrm>
+          <a:prstGeom prst="rect">
+            <a:avLst/>
+          </a:prstGeom>
+        </p:spPr>
+      </p:pic>
+      <p:pic>
+        <p:nvPicPr>
+          <p:cNvPr id="13" name="Image 12">
+            <a:extLst>
+              <a:ext uri="{FF2B5EF4-FFF2-40B4-BE49-F238E27FC236}">
+                <a16:creationId xmlns:a16="http://schemas.microsoft.com/office/drawing/2014/main" id="{26956F3D-9551-4FC1-8071-92FE32D0ABE2}"/>
+              </a:ext>
+            </a:extLst>
+          </p:cNvPr>
+          <p:cNvPicPr>
+            <a:picLocks noChangeAspect="1"/>
+          </p:cNvPicPr>
+          <p:nvPr/>
+        </p:nvPicPr>
+        <p:blipFill>
+          <a:blip r:embed="rId4"/>
+          <a:stretch>
+            <a:fillRect/>
+          </a:stretch>
+        </p:blipFill>
+        <p:spPr>
+          <a:xfrm>
+            <a:off x="2102807" y="2514600"/>
+            <a:ext cx="1323975" cy="609600"/>
+          </a:xfrm>
+          <a:prstGeom prst="rect">
+            <a:avLst/>
+          </a:prstGeom>
+        </p:spPr>
+      </p:pic>
+      <p:pic>
+        <p:nvPicPr>
+          <p:cNvPr id="15" name="Image 14">
+            <a:extLst>
+              <a:ext uri="{FF2B5EF4-FFF2-40B4-BE49-F238E27FC236}">
+                <a16:creationId xmlns:a16="http://schemas.microsoft.com/office/drawing/2014/main" id="{492195D9-84DC-4159-939B-CED361C5BBCD}"/>
+              </a:ext>
+            </a:extLst>
+          </p:cNvPr>
+          <p:cNvPicPr>
+            <a:picLocks noChangeAspect="1"/>
+          </p:cNvPicPr>
+          <p:nvPr/>
+        </p:nvPicPr>
+        <p:blipFill>
+          <a:blip r:embed="rId5"/>
+          <a:stretch>
+            <a:fillRect/>
+          </a:stretch>
+        </p:blipFill>
+        <p:spPr>
+          <a:xfrm>
+            <a:off x="4235704" y="3279623"/>
+            <a:ext cx="1314450" cy="600075"/>
+          </a:xfrm>
+          <a:prstGeom prst="rect">
+            <a:avLst/>
+          </a:prstGeom>
+        </p:spPr>
+      </p:pic>
+      <p:pic>
+        <p:nvPicPr>
+          <p:cNvPr id="3" name="Image 2">
+            <a:extLst>
+              <a:ext uri="{FF2B5EF4-FFF2-40B4-BE49-F238E27FC236}">
+                <a16:creationId xmlns:a16="http://schemas.microsoft.com/office/drawing/2014/main" id="{4D792693-4505-4101-BD7F-57D56B4C40E6}"/>
+              </a:ext>
+            </a:extLst>
+          </p:cNvPr>
+          <p:cNvPicPr>
+            <a:picLocks noChangeAspect="1"/>
+          </p:cNvPicPr>
+          <p:nvPr/>
+        </p:nvPicPr>
+        <p:blipFill>
+          <a:blip r:embed="rId6"/>
+          <a:stretch>
+            <a:fillRect/>
+          </a:stretch>
+        </p:blipFill>
+        <p:spPr>
+          <a:xfrm>
+            <a:off x="5832925" y="3279624"/>
+            <a:ext cx="1314450" cy="600075"/>
+          </a:xfrm>
+          <a:prstGeom prst="rect">
+            <a:avLst/>
+          </a:prstGeom>
+        </p:spPr>
+      </p:pic>
+    </p:spTree>
+    <p:extLst>
+      <p:ext uri="{BB962C8B-B14F-4D97-AF65-F5344CB8AC3E}">
+        <p14:creationId xmlns:p14="http://schemas.microsoft.com/office/powerpoint/2010/main" val="2112816624"/>
+      </p:ext>
+    </p:extLst>
+  </p:cSld>
+  <p:clrMapOvr>
+    <a:masterClrMapping/>
+  </p:clrMapOvr>
+</p:sld>
+</file>
+
+<file path=ppt/slides/slide11.xml><?xml version="1.0" encoding="utf-8"?>
+<p:sld xmlns:a="http://schemas.openxmlformats.org/drawingml/2006/main" xmlns:r="http://schemas.openxmlformats.org/officeDocument/2006/relationships" xmlns:p="http://schemas.openxmlformats.org/presentationml/2006/main">
+  <p:cSld>
+    <p:spTree>
+      <p:nvGrpSpPr>
+        <p:cNvPr id="1" name=""/>
+        <p:cNvGrpSpPr/>
+        <p:nvPr/>
+      </p:nvGrpSpPr>
+      <p:grpSpPr>
+        <a:xfrm>
+          <a:off x="0" y="0"/>
+          <a:ext cx="0" cy="0"/>
+          <a:chOff x="0" y="0"/>
+          <a:chExt cx="0" cy="0"/>
+        </a:xfrm>
+      </p:grpSpPr>
+      <p:sp>
+        <p:nvSpPr>
+          <p:cNvPr id="2" name="Titre 1">
+            <a:extLst>
+              <a:ext uri="{FF2B5EF4-FFF2-40B4-BE49-F238E27FC236}">
                 <a16:creationId xmlns:a16="http://schemas.microsoft.com/office/drawing/2014/main" id="{60A45B33-4349-4205-A596-A72ABD8F0A69}"/>
               </a:ext>
             </a:extLst>
@@ -12683,6 +13225,109 @@
 <file path=ppt/slides/slide3.xml><?xml version="1.0" encoding="utf-8"?>
 <p:sld xmlns:a="http://schemas.openxmlformats.org/drawingml/2006/main" xmlns:r="http://schemas.openxmlformats.org/officeDocument/2006/relationships" xmlns:p="http://schemas.openxmlformats.org/presentationml/2006/main">
   <p:cSld>
+    <p:spTree>
+      <p:nvGrpSpPr>
+        <p:cNvPr id="1" name=""/>
+        <p:cNvGrpSpPr/>
+        <p:nvPr/>
+      </p:nvGrpSpPr>
+      <p:grpSpPr>
+        <a:xfrm>
+          <a:off x="0" y="0"/>
+          <a:ext cx="0" cy="0"/>
+          <a:chOff x="0" y="0"/>
+          <a:chExt cx="0" cy="0"/>
+        </a:xfrm>
+      </p:grpSpPr>
+      <p:sp>
+        <p:nvSpPr>
+          <p:cNvPr id="2" name="Titre 1">
+            <a:extLst>
+              <a:ext uri="{FF2B5EF4-FFF2-40B4-BE49-F238E27FC236}">
+                <a16:creationId xmlns:a16="http://schemas.microsoft.com/office/drawing/2014/main" id="{04581F43-D57A-4533-9B0C-D102DDD60DE2}"/>
+              </a:ext>
+            </a:extLst>
+          </p:cNvPr>
+          <p:cNvSpPr>
+            <a:spLocks noGrp="1"/>
+          </p:cNvSpPr>
+          <p:nvPr>
+            <p:ph type="title"/>
+          </p:nvPr>
+        </p:nvSpPr>
+        <p:spPr/>
+        <p:txBody>
+          <a:bodyPr/>
+          <a:lstStyle/>
+          <a:p>
+            <a:r>
+              <a:rPr lang="fr-FR" dirty="0"/>
+              <a:t>Weak IA and Strong IA</a:t>
+            </a:r>
+            <a:endParaRPr lang="en-GB" dirty="0"/>
+          </a:p>
+        </p:txBody>
+      </p:sp>
+      <p:sp>
+        <p:nvSpPr>
+          <p:cNvPr id="3" name="Espace réservé du contenu 2">
+            <a:extLst>
+              <a:ext uri="{FF2B5EF4-FFF2-40B4-BE49-F238E27FC236}">
+                <a16:creationId xmlns:a16="http://schemas.microsoft.com/office/drawing/2014/main" id="{99D4B22A-53DB-4023-B6F3-71D686A8F429}"/>
+              </a:ext>
+            </a:extLst>
+          </p:cNvPr>
+          <p:cNvSpPr>
+            <a:spLocks noGrp="1"/>
+          </p:cNvSpPr>
+          <p:nvPr>
+            <p:ph idx="1"/>
+          </p:nvPr>
+        </p:nvSpPr>
+        <p:spPr/>
+        <p:txBody>
+          <a:bodyPr/>
+          <a:lstStyle/>
+          <a:p>
+            <a:r>
+              <a:rPr lang="fr-FR" dirty="0"/>
+              <a:t>Use </a:t>
+            </a:r>
+            <a:r>
+              <a:rPr lang="fr-FR" dirty="0" err="1"/>
+              <a:t>definitions</a:t>
+            </a:r>
+            <a:endParaRPr lang="fr-FR" dirty="0"/>
+          </a:p>
+          <a:p>
+            <a:r>
+              <a:rPr lang="fr-FR" dirty="0"/>
+              <a:t>Use </a:t>
+            </a:r>
+            <a:r>
+              <a:rPr lang="fr-FR"/>
+              <a:t>schemas</a:t>
+            </a:r>
+            <a:endParaRPr lang="en-GB" dirty="0"/>
+          </a:p>
+        </p:txBody>
+      </p:sp>
+    </p:spTree>
+    <p:extLst>
+      <p:ext uri="{BB962C8B-B14F-4D97-AF65-F5344CB8AC3E}">
+        <p14:creationId xmlns:p14="http://schemas.microsoft.com/office/powerpoint/2010/main" val="4060382238"/>
+      </p:ext>
+    </p:extLst>
+  </p:cSld>
+  <p:clrMapOvr>
+    <a:masterClrMapping/>
+  </p:clrMapOvr>
+</p:sld>
+</file>
+
+<file path=ppt/slides/slide4.xml><?xml version="1.0" encoding="utf-8"?>
+<p:sld xmlns:a="http://schemas.openxmlformats.org/drawingml/2006/main" xmlns:r="http://schemas.openxmlformats.org/officeDocument/2006/relationships" xmlns:p="http://schemas.openxmlformats.org/presentationml/2006/main">
+  <p:cSld>
     <p:bg>
       <p:bgPr>
         <a:gradFill rotWithShape="1">
@@ -12982,7 +13627,7 @@
 </p:sld>
 </file>
 
-<file path=ppt/slides/slide4.xml><?xml version="1.0" encoding="utf-8"?>
+<file path=ppt/slides/slide5.xml><?xml version="1.0" encoding="utf-8"?>
 <p:sld xmlns:a="http://schemas.openxmlformats.org/drawingml/2006/main" xmlns:r="http://schemas.openxmlformats.org/officeDocument/2006/relationships" xmlns:p="http://schemas.openxmlformats.org/presentationml/2006/main">
   <p:cSld>
     <p:bg>
@@ -13279,7 +13924,7 @@
 </p:sld>
 </file>
 
-<file path=ppt/slides/slide5.xml><?xml version="1.0" encoding="utf-8"?>
+<file path=ppt/slides/slide6.xml><?xml version="1.0" encoding="utf-8"?>
 <p:sld xmlns:a="http://schemas.openxmlformats.org/drawingml/2006/main" xmlns:r="http://schemas.openxmlformats.org/officeDocument/2006/relationships" xmlns:p="http://schemas.openxmlformats.org/presentationml/2006/main">
   <p:cSld>
     <p:spTree>
@@ -13373,7 +14018,7 @@
 </p:sld>
 </file>
 
-<file path=ppt/slides/slide6.xml><?xml version="1.0" encoding="utf-8"?>
+<file path=ppt/slides/slide7.xml><?xml version="1.0" encoding="utf-8"?>
 <p:sld xmlns:a="http://schemas.openxmlformats.org/drawingml/2006/main" xmlns:r="http://schemas.openxmlformats.org/officeDocument/2006/relationships" xmlns:p="http://schemas.openxmlformats.org/presentationml/2006/main">
   <p:cSld>
     <p:bg>
@@ -13495,7 +14140,7 @@
 </p:sld>
 </file>
 
-<file path=ppt/slides/slide7.xml><?xml version="1.0" encoding="utf-8"?>
+<file path=ppt/slides/slide8.xml><?xml version="1.0" encoding="utf-8"?>
 <p:sld xmlns:a="http://schemas.openxmlformats.org/drawingml/2006/main" xmlns:r="http://schemas.openxmlformats.org/officeDocument/2006/relationships" xmlns:p="http://schemas.openxmlformats.org/presentationml/2006/main">
   <p:cSld>
     <p:spTree>
@@ -13675,7 +14320,7 @@
 </p:sld>
 </file>
 
-<file path=ppt/slides/slide8.xml><?xml version="1.0" encoding="utf-8"?>
+<file path=ppt/slides/slide9.xml><?xml version="1.0" encoding="utf-8"?>
 <p:sld xmlns:a="http://schemas.openxmlformats.org/drawingml/2006/main" xmlns:r="http://schemas.openxmlformats.org/officeDocument/2006/relationships" xmlns:p="http://schemas.openxmlformats.org/presentationml/2006/main">
   <p:cSld>
     <p:spTree>
@@ -14428,547 +15073,6 @@
 </p:sld>
 </file>
 
-<file path=ppt/slides/slide9.xml><?xml version="1.0" encoding="utf-8"?>
-<p:sld xmlns:a="http://schemas.openxmlformats.org/drawingml/2006/main" xmlns:r="http://schemas.openxmlformats.org/officeDocument/2006/relationships" xmlns:p="http://schemas.openxmlformats.org/presentationml/2006/main">
-  <p:cSld>
-    <p:spTree>
-      <p:nvGrpSpPr>
-        <p:cNvPr id="1" name=""/>
-        <p:cNvGrpSpPr/>
-        <p:nvPr/>
-      </p:nvGrpSpPr>
-      <p:grpSpPr>
-        <a:xfrm>
-          <a:off x="0" y="0"/>
-          <a:ext cx="0" cy="0"/>
-          <a:chOff x="0" y="0"/>
-          <a:chExt cx="0" cy="0"/>
-        </a:xfrm>
-      </p:grpSpPr>
-      <p:sp>
-        <p:nvSpPr>
-          <p:cNvPr id="2" name="Titre 1">
-            <a:extLst>
-              <a:ext uri="{FF2B5EF4-FFF2-40B4-BE49-F238E27FC236}">
-                <a16:creationId xmlns:a16="http://schemas.microsoft.com/office/drawing/2014/main" id="{C3A47323-C1D5-4FF9-968A-64ABFA3C1E18}"/>
-              </a:ext>
-            </a:extLst>
-          </p:cNvPr>
-          <p:cNvSpPr>
-            <a:spLocks noGrp="1"/>
-          </p:cNvSpPr>
-          <p:nvPr>
-            <p:ph type="title"/>
-          </p:nvPr>
-        </p:nvSpPr>
-        <p:spPr/>
-        <p:txBody>
-          <a:bodyPr/>
-          <a:lstStyle/>
-          <a:p>
-            <a:r>
-              <a:rPr lang="fr-FR" dirty="0"/>
-              <a:t>Annexe</a:t>
-            </a:r>
-            <a:endParaRPr lang="en-GB" dirty="0"/>
-          </a:p>
-        </p:txBody>
-      </p:sp>
-      <p:pic>
-        <p:nvPicPr>
-          <p:cNvPr id="16" name="Espace réservé du contenu 15">
-            <a:extLst>
-              <a:ext uri="{FF2B5EF4-FFF2-40B4-BE49-F238E27FC236}">
-                <a16:creationId xmlns:a16="http://schemas.microsoft.com/office/drawing/2014/main" id="{B2C4B2A4-24E6-4EA7-8EF4-F1B0389A247E}"/>
-              </a:ext>
-            </a:extLst>
-          </p:cNvPr>
-          <p:cNvPicPr>
-            <a:picLocks noGrp="1" noChangeAspect="1"/>
-          </p:cNvPicPr>
-          <p:nvPr>
-            <p:ph idx="1"/>
-          </p:nvPr>
-        </p:nvPicPr>
-        <p:blipFill>
-          <a:blip r:embed="rId2"/>
-          <a:stretch>
-            <a:fillRect/>
-          </a:stretch>
-        </p:blipFill>
-        <p:spPr>
-          <a:xfrm>
-            <a:off x="7839108" y="2560399"/>
-            <a:ext cx="1314450" cy="600075"/>
-          </a:xfrm>
-          <a:prstGeom prst="rect">
-            <a:avLst/>
-          </a:prstGeom>
-        </p:spPr>
-      </p:pic>
-      <p:sp>
-        <p:nvSpPr>
-          <p:cNvPr id="4" name="ZoneTexte 3">
-            <a:extLst>
-              <a:ext uri="{FF2B5EF4-FFF2-40B4-BE49-F238E27FC236}">
-                <a16:creationId xmlns:a16="http://schemas.microsoft.com/office/drawing/2014/main" id="{308043D7-F2FD-4D07-9420-385AA37319FD}"/>
-              </a:ext>
-            </a:extLst>
-          </p:cNvPr>
-          <p:cNvSpPr txBox="1"/>
-          <p:nvPr/>
-        </p:nvSpPr>
-        <p:spPr>
-          <a:xfrm>
-            <a:off x="499481" y="348122"/>
-            <a:ext cx="1754006" cy="369332"/>
-          </a:xfrm>
-          <a:prstGeom prst="rect">
-            <a:avLst/>
-          </a:prstGeom>
-          <a:noFill/>
-        </p:spPr>
-        <p:txBody>
-          <a:bodyPr wrap="none" rtlCol="0">
-            <a:spAutoFit/>
-          </a:bodyPr>
-          <a:lstStyle/>
-          <a:p>
-            <a:r>
-              <a:rPr lang="fr-FR" dirty="0"/>
-              <a:t>The prototype</a:t>
-            </a:r>
-            <a:endParaRPr lang="en-GB" dirty="0"/>
-          </a:p>
-        </p:txBody>
-      </p:sp>
-      <p:cxnSp>
-        <p:nvCxnSpPr>
-          <p:cNvPr id="5" name="Connecteur droit avec flèche 4">
-            <a:extLst>
-              <a:ext uri="{FF2B5EF4-FFF2-40B4-BE49-F238E27FC236}">
-                <a16:creationId xmlns:a16="http://schemas.microsoft.com/office/drawing/2014/main" id="{76B2BD43-8A32-4F05-90EE-F4CBE6F6B3AC}"/>
-              </a:ext>
-            </a:extLst>
-          </p:cNvPr>
-          <p:cNvCxnSpPr>
-            <a:cxnSpLocks/>
-          </p:cNvCxnSpPr>
-          <p:nvPr/>
-        </p:nvCxnSpPr>
-        <p:spPr>
-          <a:xfrm>
-            <a:off x="6384258" y="989988"/>
-            <a:ext cx="1526233" cy="1340211"/>
-          </a:xfrm>
-          <a:prstGeom prst="straightConnector1">
-            <a:avLst/>
-          </a:prstGeom>
-          <a:ln w="76200">
-            <a:solidFill>
-              <a:schemeClr val="accent1">
-                <a:lumMod val="60000"/>
-                <a:lumOff val="40000"/>
-                <a:alpha val="60000"/>
-              </a:schemeClr>
-            </a:solidFill>
-            <a:tailEnd type="triangle"/>
-          </a:ln>
-        </p:spPr>
-        <p:style>
-          <a:lnRef idx="1">
-            <a:schemeClr val="accent1"/>
-          </a:lnRef>
-          <a:fillRef idx="0">
-            <a:schemeClr val="accent1"/>
-          </a:fillRef>
-          <a:effectRef idx="0">
-            <a:schemeClr val="accent1"/>
-          </a:effectRef>
-          <a:fontRef idx="minor">
-            <a:schemeClr val="tx1"/>
-          </a:fontRef>
-        </p:style>
-      </p:cxnSp>
-      <p:cxnSp>
-        <p:nvCxnSpPr>
-          <p:cNvPr id="6" name="Connecteur droit avec flèche 5">
-            <a:extLst>
-              <a:ext uri="{FF2B5EF4-FFF2-40B4-BE49-F238E27FC236}">
-                <a16:creationId xmlns:a16="http://schemas.microsoft.com/office/drawing/2014/main" id="{4FB2FE4C-19EC-481B-8A75-3B52BCC715A8}"/>
-              </a:ext>
-            </a:extLst>
-          </p:cNvPr>
-          <p:cNvCxnSpPr>
-            <a:cxnSpLocks/>
-          </p:cNvCxnSpPr>
-          <p:nvPr/>
-        </p:nvCxnSpPr>
-        <p:spPr>
-          <a:xfrm>
-            <a:off x="5678751" y="1145219"/>
-            <a:ext cx="0" cy="1606626"/>
-          </a:xfrm>
-          <a:prstGeom prst="straightConnector1">
-            <a:avLst/>
-          </a:prstGeom>
-          <a:ln w="76200">
-            <a:solidFill>
-              <a:schemeClr val="accent1">
-                <a:lumMod val="60000"/>
-                <a:lumOff val="40000"/>
-                <a:alpha val="60000"/>
-              </a:schemeClr>
-            </a:solidFill>
-            <a:tailEnd type="triangle"/>
-          </a:ln>
-        </p:spPr>
-        <p:style>
-          <a:lnRef idx="1">
-            <a:schemeClr val="accent1"/>
-          </a:lnRef>
-          <a:fillRef idx="0">
-            <a:schemeClr val="accent1"/>
-          </a:fillRef>
-          <a:effectRef idx="0">
-            <a:schemeClr val="accent1"/>
-          </a:effectRef>
-          <a:fontRef idx="minor">
-            <a:schemeClr val="tx1"/>
-          </a:fontRef>
-        </p:style>
-      </p:cxnSp>
-      <p:cxnSp>
-        <p:nvCxnSpPr>
-          <p:cNvPr id="7" name="Connecteur droit avec flèche 6">
-            <a:extLst>
-              <a:ext uri="{FF2B5EF4-FFF2-40B4-BE49-F238E27FC236}">
-                <a16:creationId xmlns:a16="http://schemas.microsoft.com/office/drawing/2014/main" id="{5B6CFAE7-3CE4-4665-8A62-A74E96029C14}"/>
-              </a:ext>
-            </a:extLst>
-          </p:cNvPr>
-          <p:cNvCxnSpPr>
-            <a:cxnSpLocks/>
-          </p:cNvCxnSpPr>
-          <p:nvPr/>
-        </p:nvCxnSpPr>
-        <p:spPr>
-          <a:xfrm flipH="1">
-            <a:off x="3426782" y="989988"/>
-            <a:ext cx="1617845" cy="1380680"/>
-          </a:xfrm>
-          <a:prstGeom prst="straightConnector1">
-            <a:avLst/>
-          </a:prstGeom>
-          <a:ln w="76200">
-            <a:solidFill>
-              <a:schemeClr val="accent1">
-                <a:lumMod val="60000"/>
-                <a:lumOff val="40000"/>
-                <a:alpha val="60000"/>
-              </a:schemeClr>
-            </a:solidFill>
-            <a:tailEnd type="triangle"/>
-          </a:ln>
-        </p:spPr>
-        <p:style>
-          <a:lnRef idx="1">
-            <a:schemeClr val="accent1"/>
-          </a:lnRef>
-          <a:fillRef idx="0">
-            <a:schemeClr val="accent1"/>
-          </a:fillRef>
-          <a:effectRef idx="0">
-            <a:schemeClr val="accent1"/>
-          </a:effectRef>
-          <a:fontRef idx="minor">
-            <a:schemeClr val="tx1"/>
-          </a:fontRef>
-        </p:style>
-      </p:cxnSp>
-      <p:sp>
-        <p:nvSpPr>
-          <p:cNvPr id="8" name="ZoneTexte 7">
-            <a:extLst>
-              <a:ext uri="{FF2B5EF4-FFF2-40B4-BE49-F238E27FC236}">
-                <a16:creationId xmlns:a16="http://schemas.microsoft.com/office/drawing/2014/main" id="{9035EBA5-A191-4017-9BC3-68668EEEC5A6}"/>
-              </a:ext>
-            </a:extLst>
-          </p:cNvPr>
-          <p:cNvSpPr txBox="1"/>
-          <p:nvPr/>
-        </p:nvSpPr>
-        <p:spPr>
-          <a:xfrm>
-            <a:off x="2077435" y="3279624"/>
-            <a:ext cx="928459" cy="369332"/>
-          </a:xfrm>
-          <a:prstGeom prst="rect">
-            <a:avLst/>
-          </a:prstGeom>
-          <a:noFill/>
-        </p:spPr>
-        <p:txBody>
-          <a:bodyPr wrap="none" rtlCol="0">
-            <a:spAutoFit/>
-          </a:bodyPr>
-          <a:lstStyle/>
-          <a:p>
-            <a:r>
-              <a:rPr lang="fr-FR" b="1" dirty="0">
-                <a:solidFill>
-                  <a:schemeClr val="bg1"/>
-                </a:solidFill>
-                <a:latin typeface="Times New Roman" panose="02020603050405020304" pitchFamily="18" charset="0"/>
-                <a:cs typeface="Times New Roman" panose="02020603050405020304" pitchFamily="18" charset="0"/>
-              </a:rPr>
-              <a:t>Actions</a:t>
-            </a:r>
-            <a:endParaRPr lang="en-GB" b="1" dirty="0">
-              <a:solidFill>
-                <a:schemeClr val="bg1"/>
-              </a:solidFill>
-              <a:latin typeface="Times New Roman" panose="02020603050405020304" pitchFamily="18" charset="0"/>
-              <a:cs typeface="Times New Roman" panose="02020603050405020304" pitchFamily="18" charset="0"/>
-            </a:endParaRPr>
-          </a:p>
-        </p:txBody>
-      </p:sp>
-      <p:sp>
-        <p:nvSpPr>
-          <p:cNvPr id="9" name="ZoneTexte 8">
-            <a:extLst>
-              <a:ext uri="{FF2B5EF4-FFF2-40B4-BE49-F238E27FC236}">
-                <a16:creationId xmlns:a16="http://schemas.microsoft.com/office/drawing/2014/main" id="{BC7F6B83-CFA6-428A-9163-505D9408D6D0}"/>
-              </a:ext>
-            </a:extLst>
-          </p:cNvPr>
-          <p:cNvSpPr txBox="1"/>
-          <p:nvPr/>
-        </p:nvSpPr>
-        <p:spPr>
-          <a:xfrm>
-            <a:off x="5221551" y="4030132"/>
-            <a:ext cx="941283" cy="369332"/>
-          </a:xfrm>
-          <a:prstGeom prst="rect">
-            <a:avLst/>
-          </a:prstGeom>
-          <a:noFill/>
-        </p:spPr>
-        <p:txBody>
-          <a:bodyPr wrap="none" rtlCol="0">
-            <a:spAutoFit/>
-          </a:bodyPr>
-          <a:lstStyle/>
-          <a:p>
-            <a:r>
-              <a:rPr lang="fr-FR" b="1" dirty="0" err="1">
-                <a:solidFill>
-                  <a:srgbClr val="92D050"/>
-                </a:solidFill>
-                <a:latin typeface="Times New Roman" panose="02020603050405020304" pitchFamily="18" charset="0"/>
-                <a:cs typeface="Times New Roman" panose="02020603050405020304" pitchFamily="18" charset="0"/>
-              </a:rPr>
-              <a:t>Sensors</a:t>
-            </a:r>
-            <a:endParaRPr lang="en-GB" b="1" dirty="0">
-              <a:solidFill>
-                <a:srgbClr val="92D050"/>
-              </a:solidFill>
-              <a:latin typeface="Times New Roman" panose="02020603050405020304" pitchFamily="18" charset="0"/>
-              <a:cs typeface="Times New Roman" panose="02020603050405020304" pitchFamily="18" charset="0"/>
-            </a:endParaRPr>
-          </a:p>
-        </p:txBody>
-      </p:sp>
-      <p:sp>
-        <p:nvSpPr>
-          <p:cNvPr id="10" name="ZoneTexte 9">
-            <a:extLst>
-              <a:ext uri="{FF2B5EF4-FFF2-40B4-BE49-F238E27FC236}">
-                <a16:creationId xmlns:a16="http://schemas.microsoft.com/office/drawing/2014/main" id="{9A0D750E-6B64-4F6A-9699-6D981AE0E69F}"/>
-              </a:ext>
-            </a:extLst>
-          </p:cNvPr>
-          <p:cNvSpPr txBox="1"/>
-          <p:nvPr/>
-        </p:nvSpPr>
-        <p:spPr>
-          <a:xfrm>
-            <a:off x="8239377" y="3279624"/>
-            <a:ext cx="1270541" cy="369332"/>
-          </a:xfrm>
-          <a:prstGeom prst="rect">
-            <a:avLst/>
-          </a:prstGeom>
-          <a:noFill/>
-        </p:spPr>
-        <p:txBody>
-          <a:bodyPr wrap="none" rtlCol="0">
-            <a:spAutoFit/>
-          </a:bodyPr>
-          <a:lstStyle/>
-          <a:p>
-            <a:r>
-              <a:rPr lang="fr-FR" b="1" dirty="0">
-                <a:solidFill>
-                  <a:schemeClr val="accent6">
-                    <a:lumMod val="40000"/>
-                    <a:lumOff val="60000"/>
-                  </a:schemeClr>
-                </a:solidFill>
-                <a:latin typeface="Times New Roman" panose="02020603050405020304" pitchFamily="18" charset="0"/>
-                <a:cs typeface="Times New Roman" panose="02020603050405020304" pitchFamily="18" charset="0"/>
-              </a:rPr>
-              <a:t>Ressources</a:t>
-            </a:r>
-            <a:endParaRPr lang="en-GB" b="1" dirty="0">
-              <a:solidFill>
-                <a:schemeClr val="accent6">
-                  <a:lumMod val="40000"/>
-                  <a:lumOff val="60000"/>
-                </a:schemeClr>
-              </a:solidFill>
-              <a:latin typeface="Times New Roman" panose="02020603050405020304" pitchFamily="18" charset="0"/>
-              <a:cs typeface="Times New Roman" panose="02020603050405020304" pitchFamily="18" charset="0"/>
-            </a:endParaRPr>
-          </a:p>
-        </p:txBody>
-      </p:sp>
-      <p:pic>
-        <p:nvPicPr>
-          <p:cNvPr id="12" name="Image 11">
-            <a:extLst>
-              <a:ext uri="{FF2B5EF4-FFF2-40B4-BE49-F238E27FC236}">
-                <a16:creationId xmlns:a16="http://schemas.microsoft.com/office/drawing/2014/main" id="{460BFFBA-E30E-4BA2-B5A0-8B77D3024A79}"/>
-              </a:ext>
-            </a:extLst>
-          </p:cNvPr>
-          <p:cNvPicPr>
-            <a:picLocks noChangeAspect="1"/>
-          </p:cNvPicPr>
-          <p:nvPr/>
-        </p:nvPicPr>
-        <p:blipFill>
-          <a:blip r:embed="rId3"/>
-          <a:stretch>
-            <a:fillRect/>
-          </a:stretch>
-        </p:blipFill>
-        <p:spPr>
-          <a:xfrm>
-            <a:off x="4979375" y="218769"/>
-            <a:ext cx="1333500" cy="619125"/>
-          </a:xfrm>
-          <a:prstGeom prst="rect">
-            <a:avLst/>
-          </a:prstGeom>
-        </p:spPr>
-      </p:pic>
-      <p:pic>
-        <p:nvPicPr>
-          <p:cNvPr id="13" name="Image 12">
-            <a:extLst>
-              <a:ext uri="{FF2B5EF4-FFF2-40B4-BE49-F238E27FC236}">
-                <a16:creationId xmlns:a16="http://schemas.microsoft.com/office/drawing/2014/main" id="{26956F3D-9551-4FC1-8071-92FE32D0ABE2}"/>
-              </a:ext>
-            </a:extLst>
-          </p:cNvPr>
-          <p:cNvPicPr>
-            <a:picLocks noChangeAspect="1"/>
-          </p:cNvPicPr>
-          <p:nvPr/>
-        </p:nvPicPr>
-        <p:blipFill>
-          <a:blip r:embed="rId4"/>
-          <a:stretch>
-            <a:fillRect/>
-          </a:stretch>
-        </p:blipFill>
-        <p:spPr>
-          <a:xfrm>
-            <a:off x="2102807" y="2514600"/>
-            <a:ext cx="1323975" cy="609600"/>
-          </a:xfrm>
-          <a:prstGeom prst="rect">
-            <a:avLst/>
-          </a:prstGeom>
-        </p:spPr>
-      </p:pic>
-      <p:pic>
-        <p:nvPicPr>
-          <p:cNvPr id="15" name="Image 14">
-            <a:extLst>
-              <a:ext uri="{FF2B5EF4-FFF2-40B4-BE49-F238E27FC236}">
-                <a16:creationId xmlns:a16="http://schemas.microsoft.com/office/drawing/2014/main" id="{492195D9-84DC-4159-939B-CED361C5BBCD}"/>
-              </a:ext>
-            </a:extLst>
-          </p:cNvPr>
-          <p:cNvPicPr>
-            <a:picLocks noChangeAspect="1"/>
-          </p:cNvPicPr>
-          <p:nvPr/>
-        </p:nvPicPr>
-        <p:blipFill>
-          <a:blip r:embed="rId5"/>
-          <a:stretch>
-            <a:fillRect/>
-          </a:stretch>
-        </p:blipFill>
-        <p:spPr>
-          <a:xfrm>
-            <a:off x="4235704" y="3279623"/>
-            <a:ext cx="1314450" cy="600075"/>
-          </a:xfrm>
-          <a:prstGeom prst="rect">
-            <a:avLst/>
-          </a:prstGeom>
-        </p:spPr>
-      </p:pic>
-      <p:pic>
-        <p:nvPicPr>
-          <p:cNvPr id="3" name="Image 2">
-            <a:extLst>
-              <a:ext uri="{FF2B5EF4-FFF2-40B4-BE49-F238E27FC236}">
-                <a16:creationId xmlns:a16="http://schemas.microsoft.com/office/drawing/2014/main" id="{4D792693-4505-4101-BD7F-57D56B4C40E6}"/>
-              </a:ext>
-            </a:extLst>
-          </p:cNvPr>
-          <p:cNvPicPr>
-            <a:picLocks noChangeAspect="1"/>
-          </p:cNvPicPr>
-          <p:nvPr/>
-        </p:nvPicPr>
-        <p:blipFill>
-          <a:blip r:embed="rId6"/>
-          <a:stretch>
-            <a:fillRect/>
-          </a:stretch>
-        </p:blipFill>
-        <p:spPr>
-          <a:xfrm>
-            <a:off x="5832925" y="3279624"/>
-            <a:ext cx="1314450" cy="600075"/>
-          </a:xfrm>
-          <a:prstGeom prst="rect">
-            <a:avLst/>
-          </a:prstGeom>
-        </p:spPr>
-      </p:pic>
-    </p:spTree>
-    <p:extLst>
-      <p:ext uri="{BB962C8B-B14F-4D97-AF65-F5344CB8AC3E}">
-        <p14:creationId xmlns:p14="http://schemas.microsoft.com/office/powerpoint/2010/main" val="2112816624"/>
-      </p:ext>
-    </p:extLst>
-  </p:cSld>
-  <p:clrMapOvr>
-    <a:masterClrMapping/>
-  </p:clrMapOvr>
-</p:sld>
-</file>
-
 <file path=ppt/theme/theme1.xml><?xml version="1.0" encoding="utf-8"?>
 <a:theme xmlns:a="http://schemas.openxmlformats.org/drawingml/2006/main" name="Secteur">
   <a:themeElements>

</xml_diff>

<commit_message>
#12 Methods of environment added on slides
</commit_message>
<xml_diff>
--- a/SAI_presentation.pptx
+++ b/SAI_presentation.pptx
@@ -8,14 +8,16 @@
     <p:sldId id="256" r:id="rId2"/>
     <p:sldId id="257" r:id="rId3"/>
     <p:sldId id="266" r:id="rId4"/>
-    <p:sldId id="258" r:id="rId5"/>
-    <p:sldId id="259" r:id="rId6"/>
-    <p:sldId id="260" r:id="rId7"/>
-    <p:sldId id="261" r:id="rId8"/>
-    <p:sldId id="265" r:id="rId9"/>
-    <p:sldId id="262" r:id="rId10"/>
-    <p:sldId id="264" r:id="rId11"/>
-    <p:sldId id="263" r:id="rId12"/>
+    <p:sldId id="267" r:id="rId5"/>
+    <p:sldId id="268" r:id="rId6"/>
+    <p:sldId id="258" r:id="rId7"/>
+    <p:sldId id="259" r:id="rId8"/>
+    <p:sldId id="260" r:id="rId9"/>
+    <p:sldId id="261" r:id="rId10"/>
+    <p:sldId id="265" r:id="rId11"/>
+    <p:sldId id="262" r:id="rId12"/>
+    <p:sldId id="264" r:id="rId13"/>
+    <p:sldId id="263" r:id="rId14"/>
   </p:sldIdLst>
   <p:sldSz cx="12192000" cy="6858000"/>
   <p:notesSz cx="6858000" cy="9144000"/>
@@ -12036,2132 +12038,6 @@
           <p:cNvPr id="2" name="Titre 1">
             <a:extLst>
               <a:ext uri="{FF2B5EF4-FFF2-40B4-BE49-F238E27FC236}">
-                <a16:creationId xmlns:a16="http://schemas.microsoft.com/office/drawing/2014/main" id="{C3A47323-C1D5-4FF9-968A-64ABFA3C1E18}"/>
-              </a:ext>
-            </a:extLst>
-          </p:cNvPr>
-          <p:cNvSpPr>
-            <a:spLocks noGrp="1"/>
-          </p:cNvSpPr>
-          <p:nvPr>
-            <p:ph type="title"/>
-          </p:nvPr>
-        </p:nvSpPr>
-        <p:spPr/>
-        <p:txBody>
-          <a:bodyPr/>
-          <a:lstStyle/>
-          <a:p>
-            <a:r>
-              <a:rPr lang="fr-FR" dirty="0"/>
-              <a:t>Annexe</a:t>
-            </a:r>
-            <a:endParaRPr lang="en-GB" dirty="0"/>
-          </a:p>
-        </p:txBody>
-      </p:sp>
-      <p:pic>
-        <p:nvPicPr>
-          <p:cNvPr id="16" name="Espace réservé du contenu 15">
-            <a:extLst>
-              <a:ext uri="{FF2B5EF4-FFF2-40B4-BE49-F238E27FC236}">
-                <a16:creationId xmlns:a16="http://schemas.microsoft.com/office/drawing/2014/main" id="{B2C4B2A4-24E6-4EA7-8EF4-F1B0389A247E}"/>
-              </a:ext>
-            </a:extLst>
-          </p:cNvPr>
-          <p:cNvPicPr>
-            <a:picLocks noGrp="1" noChangeAspect="1"/>
-          </p:cNvPicPr>
-          <p:nvPr>
-            <p:ph idx="1"/>
-          </p:nvPr>
-        </p:nvPicPr>
-        <p:blipFill>
-          <a:blip r:embed="rId2"/>
-          <a:stretch>
-            <a:fillRect/>
-          </a:stretch>
-        </p:blipFill>
-        <p:spPr>
-          <a:xfrm>
-            <a:off x="7839108" y="2560399"/>
-            <a:ext cx="1314450" cy="600075"/>
-          </a:xfrm>
-          <a:prstGeom prst="rect">
-            <a:avLst/>
-          </a:prstGeom>
-        </p:spPr>
-      </p:pic>
-      <p:sp>
-        <p:nvSpPr>
-          <p:cNvPr id="4" name="ZoneTexte 3">
-            <a:extLst>
-              <a:ext uri="{FF2B5EF4-FFF2-40B4-BE49-F238E27FC236}">
-                <a16:creationId xmlns:a16="http://schemas.microsoft.com/office/drawing/2014/main" id="{308043D7-F2FD-4D07-9420-385AA37319FD}"/>
-              </a:ext>
-            </a:extLst>
-          </p:cNvPr>
-          <p:cNvSpPr txBox="1"/>
-          <p:nvPr/>
-        </p:nvSpPr>
-        <p:spPr>
-          <a:xfrm>
-            <a:off x="499481" y="348122"/>
-            <a:ext cx="1754006" cy="369332"/>
-          </a:xfrm>
-          <a:prstGeom prst="rect">
-            <a:avLst/>
-          </a:prstGeom>
-          <a:noFill/>
-        </p:spPr>
-        <p:txBody>
-          <a:bodyPr wrap="none" rtlCol="0">
-            <a:spAutoFit/>
-          </a:bodyPr>
-          <a:lstStyle/>
-          <a:p>
-            <a:r>
-              <a:rPr lang="fr-FR" dirty="0"/>
-              <a:t>The prototype</a:t>
-            </a:r>
-            <a:endParaRPr lang="en-GB" dirty="0"/>
-          </a:p>
-        </p:txBody>
-      </p:sp>
-      <p:cxnSp>
-        <p:nvCxnSpPr>
-          <p:cNvPr id="5" name="Connecteur droit avec flèche 4">
-            <a:extLst>
-              <a:ext uri="{FF2B5EF4-FFF2-40B4-BE49-F238E27FC236}">
-                <a16:creationId xmlns:a16="http://schemas.microsoft.com/office/drawing/2014/main" id="{76B2BD43-8A32-4F05-90EE-F4CBE6F6B3AC}"/>
-              </a:ext>
-            </a:extLst>
-          </p:cNvPr>
-          <p:cNvCxnSpPr>
-            <a:cxnSpLocks/>
-          </p:cNvCxnSpPr>
-          <p:nvPr/>
-        </p:nvCxnSpPr>
-        <p:spPr>
-          <a:xfrm>
-            <a:off x="6384258" y="989988"/>
-            <a:ext cx="1526233" cy="1340211"/>
-          </a:xfrm>
-          <a:prstGeom prst="straightConnector1">
-            <a:avLst/>
-          </a:prstGeom>
-          <a:ln w="76200">
-            <a:solidFill>
-              <a:schemeClr val="accent1">
-                <a:lumMod val="60000"/>
-                <a:lumOff val="40000"/>
-                <a:alpha val="60000"/>
-              </a:schemeClr>
-            </a:solidFill>
-            <a:tailEnd type="triangle"/>
-          </a:ln>
-        </p:spPr>
-        <p:style>
-          <a:lnRef idx="1">
-            <a:schemeClr val="accent1"/>
-          </a:lnRef>
-          <a:fillRef idx="0">
-            <a:schemeClr val="accent1"/>
-          </a:fillRef>
-          <a:effectRef idx="0">
-            <a:schemeClr val="accent1"/>
-          </a:effectRef>
-          <a:fontRef idx="minor">
-            <a:schemeClr val="tx1"/>
-          </a:fontRef>
-        </p:style>
-      </p:cxnSp>
-      <p:cxnSp>
-        <p:nvCxnSpPr>
-          <p:cNvPr id="6" name="Connecteur droit avec flèche 5">
-            <a:extLst>
-              <a:ext uri="{FF2B5EF4-FFF2-40B4-BE49-F238E27FC236}">
-                <a16:creationId xmlns:a16="http://schemas.microsoft.com/office/drawing/2014/main" id="{4FB2FE4C-19EC-481B-8A75-3B52BCC715A8}"/>
-              </a:ext>
-            </a:extLst>
-          </p:cNvPr>
-          <p:cNvCxnSpPr>
-            <a:cxnSpLocks/>
-          </p:cNvCxnSpPr>
-          <p:nvPr/>
-        </p:nvCxnSpPr>
-        <p:spPr>
-          <a:xfrm>
-            <a:off x="5678751" y="1145219"/>
-            <a:ext cx="0" cy="1606626"/>
-          </a:xfrm>
-          <a:prstGeom prst="straightConnector1">
-            <a:avLst/>
-          </a:prstGeom>
-          <a:ln w="76200">
-            <a:solidFill>
-              <a:schemeClr val="accent1">
-                <a:lumMod val="60000"/>
-                <a:lumOff val="40000"/>
-                <a:alpha val="60000"/>
-              </a:schemeClr>
-            </a:solidFill>
-            <a:tailEnd type="triangle"/>
-          </a:ln>
-        </p:spPr>
-        <p:style>
-          <a:lnRef idx="1">
-            <a:schemeClr val="accent1"/>
-          </a:lnRef>
-          <a:fillRef idx="0">
-            <a:schemeClr val="accent1"/>
-          </a:fillRef>
-          <a:effectRef idx="0">
-            <a:schemeClr val="accent1"/>
-          </a:effectRef>
-          <a:fontRef idx="minor">
-            <a:schemeClr val="tx1"/>
-          </a:fontRef>
-        </p:style>
-      </p:cxnSp>
-      <p:cxnSp>
-        <p:nvCxnSpPr>
-          <p:cNvPr id="7" name="Connecteur droit avec flèche 6">
-            <a:extLst>
-              <a:ext uri="{FF2B5EF4-FFF2-40B4-BE49-F238E27FC236}">
-                <a16:creationId xmlns:a16="http://schemas.microsoft.com/office/drawing/2014/main" id="{5B6CFAE7-3CE4-4665-8A62-A74E96029C14}"/>
-              </a:ext>
-            </a:extLst>
-          </p:cNvPr>
-          <p:cNvCxnSpPr>
-            <a:cxnSpLocks/>
-          </p:cNvCxnSpPr>
-          <p:nvPr/>
-        </p:nvCxnSpPr>
-        <p:spPr>
-          <a:xfrm flipH="1">
-            <a:off x="3426782" y="989988"/>
-            <a:ext cx="1617845" cy="1380680"/>
-          </a:xfrm>
-          <a:prstGeom prst="straightConnector1">
-            <a:avLst/>
-          </a:prstGeom>
-          <a:ln w="76200">
-            <a:solidFill>
-              <a:schemeClr val="accent1">
-                <a:lumMod val="60000"/>
-                <a:lumOff val="40000"/>
-                <a:alpha val="60000"/>
-              </a:schemeClr>
-            </a:solidFill>
-            <a:tailEnd type="triangle"/>
-          </a:ln>
-        </p:spPr>
-        <p:style>
-          <a:lnRef idx="1">
-            <a:schemeClr val="accent1"/>
-          </a:lnRef>
-          <a:fillRef idx="0">
-            <a:schemeClr val="accent1"/>
-          </a:fillRef>
-          <a:effectRef idx="0">
-            <a:schemeClr val="accent1"/>
-          </a:effectRef>
-          <a:fontRef idx="minor">
-            <a:schemeClr val="tx1"/>
-          </a:fontRef>
-        </p:style>
-      </p:cxnSp>
-      <p:sp>
-        <p:nvSpPr>
-          <p:cNvPr id="8" name="ZoneTexte 7">
-            <a:extLst>
-              <a:ext uri="{FF2B5EF4-FFF2-40B4-BE49-F238E27FC236}">
-                <a16:creationId xmlns:a16="http://schemas.microsoft.com/office/drawing/2014/main" id="{9035EBA5-A191-4017-9BC3-68668EEEC5A6}"/>
-              </a:ext>
-            </a:extLst>
-          </p:cNvPr>
-          <p:cNvSpPr txBox="1"/>
-          <p:nvPr/>
-        </p:nvSpPr>
-        <p:spPr>
-          <a:xfrm>
-            <a:off x="2077435" y="3279624"/>
-            <a:ext cx="928459" cy="369332"/>
-          </a:xfrm>
-          <a:prstGeom prst="rect">
-            <a:avLst/>
-          </a:prstGeom>
-          <a:noFill/>
-        </p:spPr>
-        <p:txBody>
-          <a:bodyPr wrap="none" rtlCol="0">
-            <a:spAutoFit/>
-          </a:bodyPr>
-          <a:lstStyle/>
-          <a:p>
-            <a:r>
-              <a:rPr lang="fr-FR" b="1" dirty="0">
-                <a:solidFill>
-                  <a:schemeClr val="bg1"/>
-                </a:solidFill>
-                <a:latin typeface="Times New Roman" panose="02020603050405020304" pitchFamily="18" charset="0"/>
-                <a:cs typeface="Times New Roman" panose="02020603050405020304" pitchFamily="18" charset="0"/>
-              </a:rPr>
-              <a:t>Actions</a:t>
-            </a:r>
-            <a:endParaRPr lang="en-GB" b="1" dirty="0">
-              <a:solidFill>
-                <a:schemeClr val="bg1"/>
-              </a:solidFill>
-              <a:latin typeface="Times New Roman" panose="02020603050405020304" pitchFamily="18" charset="0"/>
-              <a:cs typeface="Times New Roman" panose="02020603050405020304" pitchFamily="18" charset="0"/>
-            </a:endParaRPr>
-          </a:p>
-        </p:txBody>
-      </p:sp>
-      <p:sp>
-        <p:nvSpPr>
-          <p:cNvPr id="9" name="ZoneTexte 8">
-            <a:extLst>
-              <a:ext uri="{FF2B5EF4-FFF2-40B4-BE49-F238E27FC236}">
-                <a16:creationId xmlns:a16="http://schemas.microsoft.com/office/drawing/2014/main" id="{BC7F6B83-CFA6-428A-9163-505D9408D6D0}"/>
-              </a:ext>
-            </a:extLst>
-          </p:cNvPr>
-          <p:cNvSpPr txBox="1"/>
-          <p:nvPr/>
-        </p:nvSpPr>
-        <p:spPr>
-          <a:xfrm>
-            <a:off x="5221551" y="4030132"/>
-            <a:ext cx="941283" cy="369332"/>
-          </a:xfrm>
-          <a:prstGeom prst="rect">
-            <a:avLst/>
-          </a:prstGeom>
-          <a:noFill/>
-        </p:spPr>
-        <p:txBody>
-          <a:bodyPr wrap="none" rtlCol="0">
-            <a:spAutoFit/>
-          </a:bodyPr>
-          <a:lstStyle/>
-          <a:p>
-            <a:r>
-              <a:rPr lang="fr-FR" b="1" dirty="0" err="1">
-                <a:solidFill>
-                  <a:srgbClr val="92D050"/>
-                </a:solidFill>
-                <a:latin typeface="Times New Roman" panose="02020603050405020304" pitchFamily="18" charset="0"/>
-                <a:cs typeface="Times New Roman" panose="02020603050405020304" pitchFamily="18" charset="0"/>
-              </a:rPr>
-              <a:t>Sensors</a:t>
-            </a:r>
-            <a:endParaRPr lang="en-GB" b="1" dirty="0">
-              <a:solidFill>
-                <a:srgbClr val="92D050"/>
-              </a:solidFill>
-              <a:latin typeface="Times New Roman" panose="02020603050405020304" pitchFamily="18" charset="0"/>
-              <a:cs typeface="Times New Roman" panose="02020603050405020304" pitchFamily="18" charset="0"/>
-            </a:endParaRPr>
-          </a:p>
-        </p:txBody>
-      </p:sp>
-      <p:sp>
-        <p:nvSpPr>
-          <p:cNvPr id="10" name="ZoneTexte 9">
-            <a:extLst>
-              <a:ext uri="{FF2B5EF4-FFF2-40B4-BE49-F238E27FC236}">
-                <a16:creationId xmlns:a16="http://schemas.microsoft.com/office/drawing/2014/main" id="{9A0D750E-6B64-4F6A-9699-6D981AE0E69F}"/>
-              </a:ext>
-            </a:extLst>
-          </p:cNvPr>
-          <p:cNvSpPr txBox="1"/>
-          <p:nvPr/>
-        </p:nvSpPr>
-        <p:spPr>
-          <a:xfrm>
-            <a:off x="8239377" y="3279624"/>
-            <a:ext cx="1270541" cy="369332"/>
-          </a:xfrm>
-          <a:prstGeom prst="rect">
-            <a:avLst/>
-          </a:prstGeom>
-          <a:noFill/>
-        </p:spPr>
-        <p:txBody>
-          <a:bodyPr wrap="none" rtlCol="0">
-            <a:spAutoFit/>
-          </a:bodyPr>
-          <a:lstStyle/>
-          <a:p>
-            <a:r>
-              <a:rPr lang="fr-FR" b="1" dirty="0">
-                <a:solidFill>
-                  <a:schemeClr val="accent6">
-                    <a:lumMod val="40000"/>
-                    <a:lumOff val="60000"/>
-                  </a:schemeClr>
-                </a:solidFill>
-                <a:latin typeface="Times New Roman" panose="02020603050405020304" pitchFamily="18" charset="0"/>
-                <a:cs typeface="Times New Roman" panose="02020603050405020304" pitchFamily="18" charset="0"/>
-              </a:rPr>
-              <a:t>Ressources</a:t>
-            </a:r>
-            <a:endParaRPr lang="en-GB" b="1" dirty="0">
-              <a:solidFill>
-                <a:schemeClr val="accent6">
-                  <a:lumMod val="40000"/>
-                  <a:lumOff val="60000"/>
-                </a:schemeClr>
-              </a:solidFill>
-              <a:latin typeface="Times New Roman" panose="02020603050405020304" pitchFamily="18" charset="0"/>
-              <a:cs typeface="Times New Roman" panose="02020603050405020304" pitchFamily="18" charset="0"/>
-            </a:endParaRPr>
-          </a:p>
-        </p:txBody>
-      </p:sp>
-      <p:pic>
-        <p:nvPicPr>
-          <p:cNvPr id="12" name="Image 11">
-            <a:extLst>
-              <a:ext uri="{FF2B5EF4-FFF2-40B4-BE49-F238E27FC236}">
-                <a16:creationId xmlns:a16="http://schemas.microsoft.com/office/drawing/2014/main" id="{460BFFBA-E30E-4BA2-B5A0-8B77D3024A79}"/>
-              </a:ext>
-            </a:extLst>
-          </p:cNvPr>
-          <p:cNvPicPr>
-            <a:picLocks noChangeAspect="1"/>
-          </p:cNvPicPr>
-          <p:nvPr/>
-        </p:nvPicPr>
-        <p:blipFill>
-          <a:blip r:embed="rId3"/>
-          <a:stretch>
-            <a:fillRect/>
-          </a:stretch>
-        </p:blipFill>
-        <p:spPr>
-          <a:xfrm>
-            <a:off x="4979375" y="218769"/>
-            <a:ext cx="1333500" cy="619125"/>
-          </a:xfrm>
-          <a:prstGeom prst="rect">
-            <a:avLst/>
-          </a:prstGeom>
-        </p:spPr>
-      </p:pic>
-      <p:pic>
-        <p:nvPicPr>
-          <p:cNvPr id="13" name="Image 12">
-            <a:extLst>
-              <a:ext uri="{FF2B5EF4-FFF2-40B4-BE49-F238E27FC236}">
-                <a16:creationId xmlns:a16="http://schemas.microsoft.com/office/drawing/2014/main" id="{26956F3D-9551-4FC1-8071-92FE32D0ABE2}"/>
-              </a:ext>
-            </a:extLst>
-          </p:cNvPr>
-          <p:cNvPicPr>
-            <a:picLocks noChangeAspect="1"/>
-          </p:cNvPicPr>
-          <p:nvPr/>
-        </p:nvPicPr>
-        <p:blipFill>
-          <a:blip r:embed="rId4"/>
-          <a:stretch>
-            <a:fillRect/>
-          </a:stretch>
-        </p:blipFill>
-        <p:spPr>
-          <a:xfrm>
-            <a:off x="2102807" y="2514600"/>
-            <a:ext cx="1323975" cy="609600"/>
-          </a:xfrm>
-          <a:prstGeom prst="rect">
-            <a:avLst/>
-          </a:prstGeom>
-        </p:spPr>
-      </p:pic>
-      <p:pic>
-        <p:nvPicPr>
-          <p:cNvPr id="15" name="Image 14">
-            <a:extLst>
-              <a:ext uri="{FF2B5EF4-FFF2-40B4-BE49-F238E27FC236}">
-                <a16:creationId xmlns:a16="http://schemas.microsoft.com/office/drawing/2014/main" id="{492195D9-84DC-4159-939B-CED361C5BBCD}"/>
-              </a:ext>
-            </a:extLst>
-          </p:cNvPr>
-          <p:cNvPicPr>
-            <a:picLocks noChangeAspect="1"/>
-          </p:cNvPicPr>
-          <p:nvPr/>
-        </p:nvPicPr>
-        <p:blipFill>
-          <a:blip r:embed="rId5"/>
-          <a:stretch>
-            <a:fillRect/>
-          </a:stretch>
-        </p:blipFill>
-        <p:spPr>
-          <a:xfrm>
-            <a:off x="4235704" y="3279623"/>
-            <a:ext cx="1314450" cy="600075"/>
-          </a:xfrm>
-          <a:prstGeom prst="rect">
-            <a:avLst/>
-          </a:prstGeom>
-        </p:spPr>
-      </p:pic>
-      <p:pic>
-        <p:nvPicPr>
-          <p:cNvPr id="3" name="Image 2">
-            <a:extLst>
-              <a:ext uri="{FF2B5EF4-FFF2-40B4-BE49-F238E27FC236}">
-                <a16:creationId xmlns:a16="http://schemas.microsoft.com/office/drawing/2014/main" id="{4D792693-4505-4101-BD7F-57D56B4C40E6}"/>
-              </a:ext>
-            </a:extLst>
-          </p:cNvPr>
-          <p:cNvPicPr>
-            <a:picLocks noChangeAspect="1"/>
-          </p:cNvPicPr>
-          <p:nvPr/>
-        </p:nvPicPr>
-        <p:blipFill>
-          <a:blip r:embed="rId6"/>
-          <a:stretch>
-            <a:fillRect/>
-          </a:stretch>
-        </p:blipFill>
-        <p:spPr>
-          <a:xfrm>
-            <a:off x="5832925" y="3279624"/>
-            <a:ext cx="1314450" cy="600075"/>
-          </a:xfrm>
-          <a:prstGeom prst="rect">
-            <a:avLst/>
-          </a:prstGeom>
-        </p:spPr>
-      </p:pic>
-    </p:spTree>
-    <p:extLst>
-      <p:ext uri="{BB962C8B-B14F-4D97-AF65-F5344CB8AC3E}">
-        <p14:creationId xmlns:p14="http://schemas.microsoft.com/office/powerpoint/2010/main" val="2112816624"/>
-      </p:ext>
-    </p:extLst>
-  </p:cSld>
-  <p:clrMapOvr>
-    <a:masterClrMapping/>
-  </p:clrMapOvr>
-</p:sld>
-</file>
-
-<file path=ppt/slides/slide11.xml><?xml version="1.0" encoding="utf-8"?>
-<p:sld xmlns:a="http://schemas.openxmlformats.org/drawingml/2006/main" xmlns:r="http://schemas.openxmlformats.org/officeDocument/2006/relationships" xmlns:p="http://schemas.openxmlformats.org/presentationml/2006/main">
-  <p:cSld>
-    <p:spTree>
-      <p:nvGrpSpPr>
-        <p:cNvPr id="1" name=""/>
-        <p:cNvGrpSpPr/>
-        <p:nvPr/>
-      </p:nvGrpSpPr>
-      <p:grpSpPr>
-        <a:xfrm>
-          <a:off x="0" y="0"/>
-          <a:ext cx="0" cy="0"/>
-          <a:chOff x="0" y="0"/>
-          <a:chExt cx="0" cy="0"/>
-        </a:xfrm>
-      </p:grpSpPr>
-      <p:sp>
-        <p:nvSpPr>
-          <p:cNvPr id="2" name="Titre 1">
-            <a:extLst>
-              <a:ext uri="{FF2B5EF4-FFF2-40B4-BE49-F238E27FC236}">
-                <a16:creationId xmlns:a16="http://schemas.microsoft.com/office/drawing/2014/main" id="{60A45B33-4349-4205-A596-A72ABD8F0A69}"/>
-              </a:ext>
-            </a:extLst>
-          </p:cNvPr>
-          <p:cNvSpPr>
-            <a:spLocks noGrp="1"/>
-          </p:cNvSpPr>
-          <p:nvPr>
-            <p:ph type="title"/>
-          </p:nvPr>
-        </p:nvSpPr>
-        <p:spPr>
-          <a:xfrm>
-            <a:off x="684212" y="4487332"/>
-            <a:ext cx="8534400" cy="1507067"/>
-          </a:xfrm>
-        </p:spPr>
-        <p:txBody>
-          <a:bodyPr/>
-          <a:lstStyle/>
-          <a:p>
-            <a:r>
-              <a:rPr lang="fr-FR"/>
-              <a:t>Sources</a:t>
-            </a:r>
-            <a:endParaRPr lang="en-GB" dirty="0"/>
-          </a:p>
-        </p:txBody>
-      </p:sp>
-      <p:sp>
-        <p:nvSpPr>
-          <p:cNvPr id="3" name="Espace réservé du contenu 2">
-            <a:extLst>
-              <a:ext uri="{FF2B5EF4-FFF2-40B4-BE49-F238E27FC236}">
-                <a16:creationId xmlns:a16="http://schemas.microsoft.com/office/drawing/2014/main" id="{825892DE-953F-4021-9EA2-14E93075BB41}"/>
-              </a:ext>
-            </a:extLst>
-          </p:cNvPr>
-          <p:cNvSpPr>
-            <a:spLocks noGrp="1"/>
-          </p:cNvSpPr>
-          <p:nvPr>
-            <p:ph idx="1"/>
-          </p:nvPr>
-        </p:nvSpPr>
-        <p:spPr>
-          <a:xfrm>
-            <a:off x="684212" y="685800"/>
-            <a:ext cx="8534400" cy="3615267"/>
-          </a:xfrm>
-        </p:spPr>
-        <p:txBody>
-          <a:bodyPr/>
-          <a:lstStyle/>
-          <a:p>
-            <a:r>
-              <a:rPr lang="fr-FR"/>
-              <a:t>Annexe prototype: </a:t>
-            </a:r>
-            <a:r>
-              <a:rPr lang="en-GB">
-                <a:hlinkClick r:id="rId2"/>
-              </a:rPr>
-              <a:t>https://www.draw.io/</a:t>
-            </a:r>
-            <a:endParaRPr lang="en-GB" dirty="0"/>
-          </a:p>
-        </p:txBody>
-      </p:sp>
-    </p:spTree>
-    <p:extLst>
-      <p:ext uri="{BB962C8B-B14F-4D97-AF65-F5344CB8AC3E}">
-        <p14:creationId xmlns:p14="http://schemas.microsoft.com/office/powerpoint/2010/main" val="1489863068"/>
-      </p:ext>
-    </p:extLst>
-  </p:cSld>
-  <p:clrMapOvr>
-    <a:masterClrMapping/>
-  </p:clrMapOvr>
-</p:sld>
-</file>
-
-<file path=ppt/slides/slide2.xml><?xml version="1.0" encoding="utf-8"?>
-<p:sld xmlns:a="http://schemas.openxmlformats.org/drawingml/2006/main" xmlns:r="http://schemas.openxmlformats.org/officeDocument/2006/relationships" xmlns:p="http://schemas.openxmlformats.org/presentationml/2006/main">
-  <p:cSld>
-    <p:bg>
-      <p:bgPr>
-        <a:gradFill rotWithShape="1">
-          <a:gsLst>
-            <a:gs pos="0">
-              <a:schemeClr val="bg2">
-                <a:tint val="97000"/>
-                <a:hueMod val="92000"/>
-                <a:satMod val="169000"/>
-                <a:lumMod val="164000"/>
-              </a:schemeClr>
-            </a:gs>
-            <a:gs pos="100000">
-              <a:schemeClr val="bg2">
-                <a:shade val="96000"/>
-                <a:satMod val="120000"/>
-                <a:lumMod val="90000"/>
-              </a:schemeClr>
-            </a:gs>
-          </a:gsLst>
-          <a:path path="circle">
-            <a:fillToRect b="100000"/>
-          </a:path>
-        </a:gradFill>
-        <a:effectLst/>
-      </p:bgPr>
-    </p:bg>
-    <p:spTree>
-      <p:nvGrpSpPr>
-        <p:cNvPr id="1" name=""/>
-        <p:cNvGrpSpPr/>
-        <p:nvPr/>
-      </p:nvGrpSpPr>
-      <p:grpSpPr>
-        <a:xfrm>
-          <a:off x="0" y="0"/>
-          <a:ext cx="0" cy="0"/>
-          <a:chOff x="0" y="0"/>
-          <a:chExt cx="0" cy="0"/>
-        </a:xfrm>
-      </p:grpSpPr>
-      <p:sp>
-        <p:nvSpPr>
-          <p:cNvPr id="10" name="Rectangle 9">
-            <a:extLst>
-              <a:ext uri="{FF2B5EF4-FFF2-40B4-BE49-F238E27FC236}">
-                <a16:creationId xmlns:a16="http://schemas.microsoft.com/office/drawing/2014/main" id="{2C33F367-76E5-4D2A-96B1-4FD443CDD1CF}"/>
-              </a:ext>
-              <a:ext uri="{C183D7F6-B498-43B3-948B-1728B52AA6E4}">
-                <adec:decorative xmlns:adec="http://schemas.microsoft.com/office/drawing/2017/decorative" val="1"/>
-              </a:ext>
-            </a:extLst>
-          </p:cNvPr>
-          <p:cNvSpPr>
-            <a:spLocks noGrp="1" noRot="1" noChangeAspect="1" noMove="1" noResize="1" noEditPoints="1" noAdjustHandles="1" noChangeArrowheads="1" noChangeShapeType="1" noTextEdit="1"/>
-          </p:cNvSpPr>
-          <p:nvPr>
-            <p:extLst>
-              <p:ext uri="{386F3935-93C4-4BCD-93E2-E3B085C9AB24}">
-                <p16:designElem xmlns:p16="http://schemas.microsoft.com/office/powerpoint/2015/main" val="1"/>
-              </p:ext>
-            </p:extLst>
-          </p:nvPr>
-        </p:nvSpPr>
-        <p:spPr>
-          <a:xfrm>
-            <a:off x="0" y="0"/>
-            <a:ext cx="12192000" cy="6858000"/>
-          </a:xfrm>
-          <a:prstGeom prst="rect">
-            <a:avLst/>
-          </a:prstGeom>
-          <a:gradFill>
-            <a:gsLst>
-              <a:gs pos="10000">
-                <a:schemeClr val="dk2">
-                  <a:tint val="97000"/>
-                  <a:hueMod val="92000"/>
-                  <a:satMod val="169000"/>
-                  <a:lumMod val="164000"/>
-                </a:schemeClr>
-              </a:gs>
-              <a:gs pos="100000">
-                <a:schemeClr val="dk2">
-                  <a:shade val="96000"/>
-                  <a:satMod val="120000"/>
-                  <a:lumMod val="90000"/>
-                </a:schemeClr>
-              </a:gs>
-            </a:gsLst>
-            <a:lin ang="6120000" scaled="1"/>
-          </a:gradFill>
-          <a:ln>
-            <a:noFill/>
-          </a:ln>
-        </p:spPr>
-        <p:style>
-          <a:lnRef idx="2">
-            <a:schemeClr val="accent1">
-              <a:shade val="50000"/>
-            </a:schemeClr>
-          </a:lnRef>
-          <a:fillRef idx="1002">
-            <a:schemeClr val="dk2"/>
-          </a:fillRef>
-          <a:effectRef idx="0">
-            <a:schemeClr val="accent1"/>
-          </a:effectRef>
-          <a:fontRef idx="minor">
-            <a:schemeClr val="lt1"/>
-          </a:fontRef>
-        </p:style>
-        <p:txBody>
-          <a:bodyPr rtlCol="0" anchor="ctr"/>
-          <a:lstStyle/>
-          <a:p>
-            <a:pPr algn="ctr"/>
-            <a:endParaRPr lang="en-US"/>
-          </a:p>
-        </p:txBody>
-      </p:sp>
-      <p:sp>
-        <p:nvSpPr>
-          <p:cNvPr id="12" name="Snip Diagonal Corner Rectangle 21">
-            <a:extLst>
-              <a:ext uri="{FF2B5EF4-FFF2-40B4-BE49-F238E27FC236}">
-                <a16:creationId xmlns:a16="http://schemas.microsoft.com/office/drawing/2014/main" id="{6F769419-3E73-449D-B62A-0CDEC946A679}"/>
-              </a:ext>
-              <a:ext uri="{C183D7F6-B498-43B3-948B-1728B52AA6E4}">
-                <adec:decorative xmlns:adec="http://schemas.microsoft.com/office/drawing/2017/decorative" val="1"/>
-              </a:ext>
-            </a:extLst>
-          </p:cNvPr>
-          <p:cNvSpPr>
-            <a:spLocks noGrp="1" noRot="1" noChangeAspect="1" noMove="1" noResize="1" noEditPoints="1" noAdjustHandles="1" noChangeArrowheads="1" noChangeShapeType="1" noTextEdit="1"/>
-          </p:cNvSpPr>
-          <p:nvPr>
-            <p:extLst>
-              <p:ext uri="{386F3935-93C4-4BCD-93E2-E3B085C9AB24}">
-                <p16:designElem xmlns:p16="http://schemas.microsoft.com/office/powerpoint/2015/main" val="1"/>
-              </p:ext>
-            </p:extLst>
-          </p:nvPr>
-        </p:nvSpPr>
-        <p:spPr>
-          <a:xfrm>
-            <a:off x="0" y="-2"/>
-            <a:ext cx="8129873" cy="6858002"/>
-          </a:xfrm>
-          <a:prstGeom prst="snip2DiagRect">
-            <a:avLst>
-              <a:gd name="adj1" fmla="val 0"/>
-              <a:gd name="adj2" fmla="val 0"/>
-            </a:avLst>
-          </a:prstGeom>
-          <a:solidFill>
-            <a:schemeClr val="bg1">
-              <a:alpha val="0"/>
-            </a:schemeClr>
-          </a:solidFill>
-          <a:ln>
-            <a:noFill/>
-          </a:ln>
-          <a:effectLst/>
-        </p:spPr>
-        <p:style>
-          <a:lnRef idx="2">
-            <a:schemeClr val="accent1">
-              <a:shade val="50000"/>
-            </a:schemeClr>
-          </a:lnRef>
-          <a:fillRef idx="1">
-            <a:schemeClr val="accent1"/>
-          </a:fillRef>
-          <a:effectRef idx="0">
-            <a:schemeClr val="accent1"/>
-          </a:effectRef>
-          <a:fontRef idx="minor">
-            <a:schemeClr val="lt1"/>
-          </a:fontRef>
-        </p:style>
-        <p:txBody>
-          <a:bodyPr rtlCol="0" anchor="ctr"/>
-          <a:lstStyle/>
-          <a:p>
-            <a:pPr algn="ctr"/>
-            <a:endParaRPr lang="en-US"/>
-          </a:p>
-        </p:txBody>
-      </p:sp>
-      <p:grpSp>
-        <p:nvGrpSpPr>
-          <p:cNvPr id="14" name="Group 13">
-            <a:extLst>
-              <a:ext uri="{FF2B5EF4-FFF2-40B4-BE49-F238E27FC236}">
-                <a16:creationId xmlns:a16="http://schemas.microsoft.com/office/drawing/2014/main" id="{A6515200-42F9-488F-9895-6CDBCD1E87C8}"/>
-              </a:ext>
-              <a:ext uri="{C183D7F6-B498-43B3-948B-1728B52AA6E4}">
-                <adec:decorative xmlns:adec="http://schemas.microsoft.com/office/drawing/2017/decorative" val="1"/>
-              </a:ext>
-            </a:extLst>
-          </p:cNvPr>
-          <p:cNvGrpSpPr>
-            <a:grpSpLocks noGrp="1" noUngrp="1" noRot="1" noChangeAspect="1" noMove="1" noResize="1"/>
-          </p:cNvGrpSpPr>
-          <p:nvPr>
-            <p:extLst>
-              <p:ext uri="{386F3935-93C4-4BCD-93E2-E3B085C9AB24}">
-                <p16:designElem xmlns:p16="http://schemas.microsoft.com/office/powerpoint/2015/main" val="1"/>
-              </p:ext>
-            </p:extLst>
-          </p:nvPr>
-        </p:nvGrpSpPr>
-        <p:grpSpPr>
-          <a:xfrm>
-            <a:off x="9206969" y="2963333"/>
-            <a:ext cx="2981858" cy="3208867"/>
-            <a:chOff x="9206969" y="2963333"/>
-            <a:chExt cx="2981858" cy="3208867"/>
-          </a:xfrm>
-        </p:grpSpPr>
-        <p:cxnSp>
-          <p:nvCxnSpPr>
-            <p:cNvPr id="15" name="Straight Connector 14">
-              <a:extLst>
-                <a:ext uri="{FF2B5EF4-FFF2-40B4-BE49-F238E27FC236}">
-                  <a16:creationId xmlns:a16="http://schemas.microsoft.com/office/drawing/2014/main" id="{43185F0E-78D5-4C2D-9239-D3515B448837}"/>
-                </a:ext>
-                <a:ext uri="{C183D7F6-B498-43B3-948B-1728B52AA6E4}">
-                  <adec:decorative xmlns:adec="http://schemas.microsoft.com/office/drawing/2017/decorative" val="1"/>
-                </a:ext>
-              </a:extLst>
-            </p:cNvPr>
-            <p:cNvCxnSpPr/>
-            <p:nvPr>
-              <p:extLst>
-                <p:ext uri="{386F3935-93C4-4BCD-93E2-E3B085C9AB24}">
-                  <p16:designElem xmlns:p16="http://schemas.microsoft.com/office/powerpoint/2015/main" val="1"/>
-                </p:ext>
-              </p:extLst>
-            </p:nvPr>
-          </p:nvCxnSpPr>
-          <p:spPr>
-            <a:xfrm flipH="1">
-              <a:off x="11276012" y="2963333"/>
-              <a:ext cx="912814" cy="912812"/>
-            </a:xfrm>
-            <a:prstGeom prst="line">
-              <a:avLst/>
-            </a:prstGeom>
-            <a:ln w="9525">
-              <a:solidFill>
-                <a:srgbClr val="FFFFFF"/>
-              </a:solidFill>
-            </a:ln>
-          </p:spPr>
-          <p:style>
-            <a:lnRef idx="2">
-              <a:schemeClr val="accent1"/>
-            </a:lnRef>
-            <a:fillRef idx="0">
-              <a:schemeClr val="accent1"/>
-            </a:fillRef>
-            <a:effectRef idx="1">
-              <a:schemeClr val="accent1"/>
-            </a:effectRef>
-            <a:fontRef idx="minor">
-              <a:schemeClr val="tx1"/>
-            </a:fontRef>
-          </p:style>
-        </p:cxnSp>
-        <p:cxnSp>
-          <p:nvCxnSpPr>
-            <p:cNvPr id="16" name="Straight Connector 15">
-              <a:extLst>
-                <a:ext uri="{FF2B5EF4-FFF2-40B4-BE49-F238E27FC236}">
-                  <a16:creationId xmlns:a16="http://schemas.microsoft.com/office/drawing/2014/main" id="{D5BD9142-FF9C-4EED-A027-18D095481BB8}"/>
-                </a:ext>
-                <a:ext uri="{C183D7F6-B498-43B3-948B-1728B52AA6E4}">
-                  <adec:decorative xmlns:adec="http://schemas.microsoft.com/office/drawing/2017/decorative" val="1"/>
-                </a:ext>
-              </a:extLst>
-            </p:cNvPr>
-            <p:cNvCxnSpPr/>
-            <p:nvPr>
-              <p:extLst>
-                <p:ext uri="{386F3935-93C4-4BCD-93E2-E3B085C9AB24}">
-                  <p16:designElem xmlns:p16="http://schemas.microsoft.com/office/powerpoint/2015/main" val="1"/>
-                </p:ext>
-              </p:extLst>
-            </p:nvPr>
-          </p:nvCxnSpPr>
-          <p:spPr>
-            <a:xfrm flipH="1">
-              <a:off x="9206969" y="3190344"/>
-              <a:ext cx="2981857" cy="2981856"/>
-            </a:xfrm>
-            <a:prstGeom prst="line">
-              <a:avLst/>
-            </a:prstGeom>
-            <a:ln w="9525">
-              <a:solidFill>
-                <a:srgbClr val="FFFFFF"/>
-              </a:solidFill>
-            </a:ln>
-          </p:spPr>
-          <p:style>
-            <a:lnRef idx="2">
-              <a:schemeClr val="accent1"/>
-            </a:lnRef>
-            <a:fillRef idx="0">
-              <a:schemeClr val="accent1"/>
-            </a:fillRef>
-            <a:effectRef idx="1">
-              <a:schemeClr val="accent1"/>
-            </a:effectRef>
-            <a:fontRef idx="minor">
-              <a:schemeClr val="tx1"/>
-            </a:fontRef>
-          </p:style>
-        </p:cxnSp>
-        <p:cxnSp>
-          <p:nvCxnSpPr>
-            <p:cNvPr id="17" name="Straight Connector 16">
-              <a:extLst>
-                <a:ext uri="{FF2B5EF4-FFF2-40B4-BE49-F238E27FC236}">
-                  <a16:creationId xmlns:a16="http://schemas.microsoft.com/office/drawing/2014/main" id="{42F547D3-9752-4481-B3A8-50E08610B8EC}"/>
-                </a:ext>
-                <a:ext uri="{C183D7F6-B498-43B3-948B-1728B52AA6E4}">
-                  <adec:decorative xmlns:adec="http://schemas.microsoft.com/office/drawing/2017/decorative" val="1"/>
-                </a:ext>
-              </a:extLst>
-            </p:cNvPr>
-            <p:cNvCxnSpPr/>
-            <p:nvPr>
-              <p:extLst>
-                <p:ext uri="{386F3935-93C4-4BCD-93E2-E3B085C9AB24}">
-                  <p16:designElem xmlns:p16="http://schemas.microsoft.com/office/powerpoint/2015/main" val="1"/>
-                </p:ext>
-              </p:extLst>
-            </p:nvPr>
-          </p:nvCxnSpPr>
-          <p:spPr>
-            <a:xfrm flipH="1">
-              <a:off x="10292292" y="3285067"/>
-              <a:ext cx="1896534" cy="1896533"/>
-            </a:xfrm>
-            <a:prstGeom prst="line">
-              <a:avLst/>
-            </a:prstGeom>
-            <a:ln w="9525">
-              <a:solidFill>
-                <a:srgbClr val="FFFFFF"/>
-              </a:solidFill>
-            </a:ln>
-          </p:spPr>
-          <p:style>
-            <a:lnRef idx="2">
-              <a:schemeClr val="accent1"/>
-            </a:lnRef>
-            <a:fillRef idx="0">
-              <a:schemeClr val="accent1"/>
-            </a:fillRef>
-            <a:effectRef idx="1">
-              <a:schemeClr val="accent1"/>
-            </a:effectRef>
-            <a:fontRef idx="minor">
-              <a:schemeClr val="tx1"/>
-            </a:fontRef>
-          </p:style>
-        </p:cxnSp>
-        <p:cxnSp>
-          <p:nvCxnSpPr>
-            <p:cNvPr id="18" name="Straight Connector 17">
-              <a:extLst>
-                <a:ext uri="{FF2B5EF4-FFF2-40B4-BE49-F238E27FC236}">
-                  <a16:creationId xmlns:a16="http://schemas.microsoft.com/office/drawing/2014/main" id="{F1999C2F-3D0D-4813-9696-83630A6FEABD}"/>
-                </a:ext>
-                <a:ext uri="{C183D7F6-B498-43B3-948B-1728B52AA6E4}">
-                  <adec:decorative xmlns:adec="http://schemas.microsoft.com/office/drawing/2017/decorative" val="1"/>
-                </a:ext>
-              </a:extLst>
-            </p:cNvPr>
-            <p:cNvCxnSpPr/>
-            <p:nvPr>
-              <p:extLst>
-                <p:ext uri="{386F3935-93C4-4BCD-93E2-E3B085C9AB24}">
-                  <p16:designElem xmlns:p16="http://schemas.microsoft.com/office/powerpoint/2015/main" val="1"/>
-                </p:ext>
-              </p:extLst>
-            </p:nvPr>
-          </p:nvCxnSpPr>
-          <p:spPr>
-            <a:xfrm flipH="1">
-              <a:off x="10443103" y="3131080"/>
-              <a:ext cx="1745722" cy="1745720"/>
-            </a:xfrm>
-            <a:prstGeom prst="line">
-              <a:avLst/>
-            </a:prstGeom>
-            <a:ln w="28575">
-              <a:solidFill>
-                <a:srgbClr val="FFFFFF"/>
-              </a:solidFill>
-            </a:ln>
-          </p:spPr>
-          <p:style>
-            <a:lnRef idx="2">
-              <a:schemeClr val="accent1"/>
-            </a:lnRef>
-            <a:fillRef idx="0">
-              <a:schemeClr val="accent1"/>
-            </a:fillRef>
-            <a:effectRef idx="1">
-              <a:schemeClr val="accent1"/>
-            </a:effectRef>
-            <a:fontRef idx="minor">
-              <a:schemeClr val="tx1"/>
-            </a:fontRef>
-          </p:style>
-        </p:cxnSp>
-        <p:cxnSp>
-          <p:nvCxnSpPr>
-            <p:cNvPr id="19" name="Straight Connector 18">
-              <a:extLst>
-                <a:ext uri="{FF2B5EF4-FFF2-40B4-BE49-F238E27FC236}">
-                  <a16:creationId xmlns:a16="http://schemas.microsoft.com/office/drawing/2014/main" id="{EC737390-C9CA-456B-9F40-D7A76EA242E7}"/>
-                </a:ext>
-                <a:ext uri="{C183D7F6-B498-43B3-948B-1728B52AA6E4}">
-                  <adec:decorative xmlns:adec="http://schemas.microsoft.com/office/drawing/2017/decorative" val="1"/>
-                </a:ext>
-              </a:extLst>
-            </p:cNvPr>
-            <p:cNvCxnSpPr/>
-            <p:nvPr>
-              <p:extLst>
-                <p:ext uri="{386F3935-93C4-4BCD-93E2-E3B085C9AB24}">
-                  <p16:designElem xmlns:p16="http://schemas.microsoft.com/office/powerpoint/2015/main" val="1"/>
-                </p:ext>
-              </p:extLst>
-            </p:nvPr>
-          </p:nvCxnSpPr>
-          <p:spPr>
-            <a:xfrm flipH="1">
-              <a:off x="10918826" y="3683001"/>
-              <a:ext cx="1270001" cy="1269999"/>
-            </a:xfrm>
-            <a:prstGeom prst="line">
-              <a:avLst/>
-            </a:prstGeom>
-            <a:ln w="28575">
-              <a:solidFill>
-                <a:srgbClr val="FFFFFF"/>
-              </a:solidFill>
-            </a:ln>
-          </p:spPr>
-          <p:style>
-            <a:lnRef idx="2">
-              <a:schemeClr val="accent1"/>
-            </a:lnRef>
-            <a:fillRef idx="0">
-              <a:schemeClr val="accent1"/>
-            </a:fillRef>
-            <a:effectRef idx="1">
-              <a:schemeClr val="accent1"/>
-            </a:effectRef>
-            <a:fontRef idx="minor">
-              <a:schemeClr val="tx1"/>
-            </a:fontRef>
-          </p:style>
-        </p:cxnSp>
-      </p:grpSp>
-      <p:sp>
-        <p:nvSpPr>
-          <p:cNvPr id="2" name="Titre 1">
-            <a:extLst>
-              <a:ext uri="{FF2B5EF4-FFF2-40B4-BE49-F238E27FC236}">
-                <a16:creationId xmlns:a16="http://schemas.microsoft.com/office/drawing/2014/main" id="{91F2D697-AEBD-4258-8341-1E8F9EDF1DFB}"/>
-              </a:ext>
-            </a:extLst>
-          </p:cNvPr>
-          <p:cNvSpPr>
-            <a:spLocks noGrp="1"/>
-          </p:cNvSpPr>
-          <p:nvPr>
-            <p:ph type="title"/>
-          </p:nvPr>
-        </p:nvSpPr>
-        <p:spPr>
-          <a:xfrm>
-            <a:off x="8588661" y="941424"/>
-            <a:ext cx="3043896" cy="3248611"/>
-          </a:xfrm>
-        </p:spPr>
-        <p:txBody>
-          <a:bodyPr>
-            <a:normAutofit/>
-          </a:bodyPr>
-          <a:lstStyle/>
-          <a:p>
-            <a:r>
-              <a:rPr lang="fr-FR" sz="3100">
-                <a:solidFill>
-                  <a:srgbClr val="FFFFFF"/>
-                </a:solidFill>
-              </a:rPr>
-              <a:t>Environment</a:t>
-            </a:r>
-            <a:endParaRPr lang="en-GB" sz="3100">
-              <a:solidFill>
-                <a:srgbClr val="FFFFFF"/>
-              </a:solidFill>
-            </a:endParaRPr>
-          </a:p>
-        </p:txBody>
-      </p:sp>
-      <p:graphicFrame>
-        <p:nvGraphicFramePr>
-          <p:cNvPr id="5" name="Espace réservé du contenu 2">
-            <a:extLst>
-              <a:ext uri="{FF2B5EF4-FFF2-40B4-BE49-F238E27FC236}">
-                <a16:creationId xmlns:a16="http://schemas.microsoft.com/office/drawing/2014/main" id="{9C052EF2-23D5-4840-B6B1-5F32104F68AC}"/>
-              </a:ext>
-            </a:extLst>
-          </p:cNvPr>
-          <p:cNvGraphicFramePr>
-            <a:graphicFrameLocks noGrp="1"/>
-          </p:cNvGraphicFramePr>
-          <p:nvPr>
-            <p:ph idx="1"/>
-            <p:extLst>
-              <p:ext uri="{D42A27DB-BD31-4B8C-83A1-F6EECF244321}">
-                <p14:modId xmlns:p14="http://schemas.microsoft.com/office/powerpoint/2010/main" val="3871919060"/>
-              </p:ext>
-            </p:extLst>
-          </p:nvPr>
-        </p:nvGraphicFramePr>
-        <p:xfrm>
-          <a:off x="940645" y="941424"/>
-          <a:ext cx="6190459" cy="4768713"/>
-        </p:xfrm>
-        <a:graphic>
-          <a:graphicData uri="http://schemas.openxmlformats.org/drawingml/2006/diagram">
-            <dgm:relIds xmlns:dgm="http://schemas.openxmlformats.org/drawingml/2006/diagram" xmlns:r="http://schemas.openxmlformats.org/officeDocument/2006/relationships" r:dm="rId2" r:lo="rId3" r:qs="rId4" r:cs="rId5"/>
-          </a:graphicData>
-        </a:graphic>
-      </p:graphicFrame>
-    </p:spTree>
-    <p:extLst>
-      <p:ext uri="{BB962C8B-B14F-4D97-AF65-F5344CB8AC3E}">
-        <p14:creationId xmlns:p14="http://schemas.microsoft.com/office/powerpoint/2010/main" val="602710572"/>
-      </p:ext>
-    </p:extLst>
-  </p:cSld>
-  <p:clrMapOvr>
-    <a:masterClrMapping/>
-  </p:clrMapOvr>
-</p:sld>
-</file>
-
-<file path=ppt/slides/slide3.xml><?xml version="1.0" encoding="utf-8"?>
-<p:sld xmlns:a="http://schemas.openxmlformats.org/drawingml/2006/main" xmlns:r="http://schemas.openxmlformats.org/officeDocument/2006/relationships" xmlns:p="http://schemas.openxmlformats.org/presentationml/2006/main">
-  <p:cSld>
-    <p:spTree>
-      <p:nvGrpSpPr>
-        <p:cNvPr id="1" name=""/>
-        <p:cNvGrpSpPr/>
-        <p:nvPr/>
-      </p:nvGrpSpPr>
-      <p:grpSpPr>
-        <a:xfrm>
-          <a:off x="0" y="0"/>
-          <a:ext cx="0" cy="0"/>
-          <a:chOff x="0" y="0"/>
-          <a:chExt cx="0" cy="0"/>
-        </a:xfrm>
-      </p:grpSpPr>
-      <p:sp>
-        <p:nvSpPr>
-          <p:cNvPr id="2" name="Titre 1">
-            <a:extLst>
-              <a:ext uri="{FF2B5EF4-FFF2-40B4-BE49-F238E27FC236}">
-                <a16:creationId xmlns:a16="http://schemas.microsoft.com/office/drawing/2014/main" id="{04581F43-D57A-4533-9B0C-D102DDD60DE2}"/>
-              </a:ext>
-            </a:extLst>
-          </p:cNvPr>
-          <p:cNvSpPr>
-            <a:spLocks noGrp="1"/>
-          </p:cNvSpPr>
-          <p:nvPr>
-            <p:ph type="title"/>
-          </p:nvPr>
-        </p:nvSpPr>
-        <p:spPr/>
-        <p:txBody>
-          <a:bodyPr/>
-          <a:lstStyle/>
-          <a:p>
-            <a:r>
-              <a:rPr lang="fr-FR" dirty="0"/>
-              <a:t>Weak IA and Strong IA</a:t>
-            </a:r>
-            <a:endParaRPr lang="en-GB" dirty="0"/>
-          </a:p>
-        </p:txBody>
-      </p:sp>
-      <p:sp>
-        <p:nvSpPr>
-          <p:cNvPr id="3" name="Espace réservé du contenu 2">
-            <a:extLst>
-              <a:ext uri="{FF2B5EF4-FFF2-40B4-BE49-F238E27FC236}">
-                <a16:creationId xmlns:a16="http://schemas.microsoft.com/office/drawing/2014/main" id="{99D4B22A-53DB-4023-B6F3-71D686A8F429}"/>
-              </a:ext>
-            </a:extLst>
-          </p:cNvPr>
-          <p:cNvSpPr>
-            <a:spLocks noGrp="1"/>
-          </p:cNvSpPr>
-          <p:nvPr>
-            <p:ph idx="1"/>
-          </p:nvPr>
-        </p:nvSpPr>
-        <p:spPr/>
-        <p:txBody>
-          <a:bodyPr/>
-          <a:lstStyle/>
-          <a:p>
-            <a:r>
-              <a:rPr lang="fr-FR" dirty="0"/>
-              <a:t>Use </a:t>
-            </a:r>
-            <a:r>
-              <a:rPr lang="fr-FR" dirty="0" err="1"/>
-              <a:t>definitions</a:t>
-            </a:r>
-            <a:endParaRPr lang="fr-FR" dirty="0"/>
-          </a:p>
-          <a:p>
-            <a:r>
-              <a:rPr lang="fr-FR" dirty="0"/>
-              <a:t>Use </a:t>
-            </a:r>
-            <a:r>
-              <a:rPr lang="fr-FR"/>
-              <a:t>schemas</a:t>
-            </a:r>
-            <a:endParaRPr lang="en-GB" dirty="0"/>
-          </a:p>
-        </p:txBody>
-      </p:sp>
-    </p:spTree>
-    <p:extLst>
-      <p:ext uri="{BB962C8B-B14F-4D97-AF65-F5344CB8AC3E}">
-        <p14:creationId xmlns:p14="http://schemas.microsoft.com/office/powerpoint/2010/main" val="4060382238"/>
-      </p:ext>
-    </p:extLst>
-  </p:cSld>
-  <p:clrMapOvr>
-    <a:masterClrMapping/>
-  </p:clrMapOvr>
-</p:sld>
-</file>
-
-<file path=ppt/slides/slide4.xml><?xml version="1.0" encoding="utf-8"?>
-<p:sld xmlns:a="http://schemas.openxmlformats.org/drawingml/2006/main" xmlns:r="http://schemas.openxmlformats.org/officeDocument/2006/relationships" xmlns:p="http://schemas.openxmlformats.org/presentationml/2006/main">
-  <p:cSld>
-    <p:bg>
-      <p:bgPr>
-        <a:gradFill rotWithShape="1">
-          <a:gsLst>
-            <a:gs pos="10000">
-              <a:schemeClr val="bg2">
-                <a:tint val="97000"/>
-                <a:hueMod val="92000"/>
-                <a:satMod val="169000"/>
-                <a:lumMod val="164000"/>
-              </a:schemeClr>
-            </a:gs>
-            <a:gs pos="100000">
-              <a:schemeClr val="bg2">
-                <a:shade val="96000"/>
-                <a:satMod val="120000"/>
-                <a:lumMod val="90000"/>
-              </a:schemeClr>
-            </a:gs>
-          </a:gsLst>
-          <a:lin ang="6120000" scaled="1"/>
-        </a:gradFill>
-        <a:effectLst/>
-      </p:bgPr>
-    </p:bg>
-    <p:spTree>
-      <p:nvGrpSpPr>
-        <p:cNvPr id="1" name=""/>
-        <p:cNvGrpSpPr/>
-        <p:nvPr/>
-      </p:nvGrpSpPr>
-      <p:grpSpPr>
-        <a:xfrm>
-          <a:off x="0" y="0"/>
-          <a:ext cx="0" cy="0"/>
-          <a:chOff x="0" y="0"/>
-          <a:chExt cx="0" cy="0"/>
-        </a:xfrm>
-      </p:grpSpPr>
-      <p:sp useBgFill="1">
-        <p:nvSpPr>
-          <p:cNvPr id="15" name="Rectangle 14">
-            <a:extLst>
-              <a:ext uri="{FF2B5EF4-FFF2-40B4-BE49-F238E27FC236}">
-                <a16:creationId xmlns:a16="http://schemas.microsoft.com/office/drawing/2014/main" id="{7509B08A-C1EC-478C-86AF-60ADE06D9BBB}"/>
-              </a:ext>
-              <a:ext uri="{C183D7F6-B498-43B3-948B-1728B52AA6E4}">
-                <adec:decorative xmlns:adec="http://schemas.microsoft.com/office/drawing/2017/decorative" val="1"/>
-              </a:ext>
-            </a:extLst>
-          </p:cNvPr>
-          <p:cNvSpPr>
-            <a:spLocks noGrp="1" noRot="1" noChangeAspect="1" noMove="1" noResize="1" noEditPoints="1" noAdjustHandles="1" noChangeArrowheads="1" noChangeShapeType="1" noTextEdit="1"/>
-          </p:cNvSpPr>
-          <p:nvPr>
-            <p:extLst>
-              <p:ext uri="{386F3935-93C4-4BCD-93E2-E3B085C9AB24}">
-                <p16:designElem xmlns:p16="http://schemas.microsoft.com/office/powerpoint/2015/main" val="1"/>
-              </p:ext>
-            </p:extLst>
-          </p:nvPr>
-        </p:nvSpPr>
-        <p:spPr>
-          <a:xfrm>
-            <a:off x="0" y="0"/>
-            <a:ext cx="12192000" cy="6858000"/>
-          </a:xfrm>
-          <a:prstGeom prst="rect">
-            <a:avLst/>
-          </a:prstGeom>
-          <a:ln>
-            <a:noFill/>
-          </a:ln>
-        </p:spPr>
-        <p:style>
-          <a:lnRef idx="2">
-            <a:schemeClr val="accent1">
-              <a:shade val="50000"/>
-            </a:schemeClr>
-          </a:lnRef>
-          <a:fillRef idx="1">
-            <a:schemeClr val="accent1"/>
-          </a:fillRef>
-          <a:effectRef idx="0">
-            <a:schemeClr val="accent1"/>
-          </a:effectRef>
-          <a:fontRef idx="minor">
-            <a:schemeClr val="lt1"/>
-          </a:fontRef>
-        </p:style>
-        <p:txBody>
-          <a:bodyPr rtlCol="0" anchor="ctr"/>
-          <a:lstStyle/>
-          <a:p>
-            <a:pPr algn="ctr"/>
-            <a:endParaRPr lang="en-US"/>
-          </a:p>
-        </p:txBody>
-      </p:sp>
-      <p:sp>
-        <p:nvSpPr>
-          <p:cNvPr id="2" name="Titre 1">
-            <a:extLst>
-              <a:ext uri="{FF2B5EF4-FFF2-40B4-BE49-F238E27FC236}">
-                <a16:creationId xmlns:a16="http://schemas.microsoft.com/office/drawing/2014/main" id="{77851132-74B7-4D74-B115-071128FEC992}"/>
-              </a:ext>
-            </a:extLst>
-          </p:cNvPr>
-          <p:cNvSpPr>
-            <a:spLocks noGrp="1"/>
-          </p:cNvSpPr>
-          <p:nvPr>
-            <p:ph type="title"/>
-          </p:nvPr>
-        </p:nvSpPr>
-        <p:spPr>
-          <a:xfrm>
-            <a:off x="640290" y="685800"/>
-            <a:ext cx="4818656" cy="4603749"/>
-          </a:xfrm>
-        </p:spPr>
-        <p:txBody>
-          <a:bodyPr>
-            <a:normAutofit/>
-          </a:bodyPr>
-          <a:lstStyle/>
-          <a:p>
-            <a:pPr algn="r"/>
-            <a:r>
-              <a:rPr lang="fr-FR" sz="5200"/>
-              <a:t>issues</a:t>
-            </a:r>
-            <a:endParaRPr lang="en-GB" sz="5200"/>
-          </a:p>
-        </p:txBody>
-      </p:sp>
-      <p:sp>
-        <p:nvSpPr>
-          <p:cNvPr id="17" name="Rectangle 16">
-            <a:extLst>
-              <a:ext uri="{FF2B5EF4-FFF2-40B4-BE49-F238E27FC236}">
-                <a16:creationId xmlns:a16="http://schemas.microsoft.com/office/drawing/2014/main" id="{221CC330-4259-4C32-BF8B-5FE13FFABB3A}"/>
-              </a:ext>
-              <a:ext uri="{C183D7F6-B498-43B3-948B-1728B52AA6E4}">
-                <adec:decorative xmlns:adec="http://schemas.microsoft.com/office/drawing/2017/decorative" val="1"/>
-              </a:ext>
-            </a:extLst>
-          </p:cNvPr>
-          <p:cNvSpPr>
-            <a:spLocks noGrp="1" noRot="1" noChangeAspect="1" noMove="1" noResize="1" noEditPoints="1" noAdjustHandles="1" noChangeArrowheads="1" noChangeShapeType="1" noTextEdit="1"/>
-          </p:cNvSpPr>
-          <p:nvPr>
-            <p:extLst>
-              <p:ext uri="{386F3935-93C4-4BCD-93E2-E3B085C9AB24}">
-                <p16:designElem xmlns:p16="http://schemas.microsoft.com/office/powerpoint/2015/main" val="1"/>
-              </p:ext>
-            </p:extLst>
-          </p:nvPr>
-        </p:nvSpPr>
-        <p:spPr>
-          <a:xfrm>
-            <a:off x="6095999" y="0"/>
-            <a:ext cx="6096001" cy="6858000"/>
-          </a:xfrm>
-          <a:prstGeom prst="rect">
-            <a:avLst/>
-          </a:prstGeom>
-          <a:solidFill>
-            <a:schemeClr val="bg2">
-              <a:alpha val="97000"/>
-            </a:schemeClr>
-          </a:solidFill>
-          <a:ln>
-            <a:noFill/>
-          </a:ln>
-          <a:effectLst/>
-        </p:spPr>
-        <p:style>
-          <a:lnRef idx="2">
-            <a:schemeClr val="accent1">
-              <a:shade val="50000"/>
-            </a:schemeClr>
-          </a:lnRef>
-          <a:fillRef idx="1001">
-            <a:schemeClr val="dk2"/>
-          </a:fillRef>
-          <a:effectRef idx="0">
-            <a:schemeClr val="accent1"/>
-          </a:effectRef>
-          <a:fontRef idx="minor">
-            <a:schemeClr val="lt1"/>
-          </a:fontRef>
-        </p:style>
-        <p:txBody>
-          <a:bodyPr rtlCol="0" anchor="ctr"/>
-          <a:lstStyle/>
-          <a:p>
-            <a:pPr algn="ctr"/>
-            <a:endParaRPr lang="en-US"/>
-          </a:p>
-        </p:txBody>
-      </p:sp>
-      <p:sp>
-        <p:nvSpPr>
-          <p:cNvPr id="3" name="Espace réservé du contenu 2">
-            <a:extLst>
-              <a:ext uri="{FF2B5EF4-FFF2-40B4-BE49-F238E27FC236}">
-                <a16:creationId xmlns:a16="http://schemas.microsoft.com/office/drawing/2014/main" id="{A8089F6D-E260-4620-8DCB-5ABC107EF384}"/>
-              </a:ext>
-            </a:extLst>
-          </p:cNvPr>
-          <p:cNvSpPr>
-            <a:spLocks noGrp="1"/>
-          </p:cNvSpPr>
-          <p:nvPr>
-            <p:ph idx="1"/>
-          </p:nvPr>
-        </p:nvSpPr>
-        <p:spPr>
-          <a:xfrm>
-            <a:off x="6625651" y="685800"/>
-            <a:ext cx="4878959" cy="4603750"/>
-          </a:xfrm>
-        </p:spPr>
-        <p:txBody>
-          <a:bodyPr>
-            <a:normAutofit/>
-          </a:bodyPr>
-          <a:lstStyle/>
-          <a:p>
-            <a:r>
-              <a:rPr lang="fr-FR">
-                <a:solidFill>
-                  <a:schemeClr val="tx1"/>
-                </a:solidFill>
-              </a:rPr>
-              <a:t>Hard to deploy</a:t>
-            </a:r>
-          </a:p>
-          <a:p>
-            <a:r>
-              <a:rPr lang="fr-FR">
-                <a:solidFill>
-                  <a:schemeClr val="tx1"/>
-                </a:solidFill>
-              </a:rPr>
-              <a:t>Simulate the brain behavior during sleep (sort/compress/delete data)</a:t>
-            </a:r>
-          </a:p>
-          <a:p>
-            <a:r>
-              <a:rPr lang="fr-FR">
-                <a:solidFill>
-                  <a:schemeClr val="tx1"/>
-                </a:solidFill>
-              </a:rPr>
-              <a:t>Add a reward (seems like RL, pheromon)</a:t>
-            </a:r>
-          </a:p>
-          <a:p>
-            <a:r>
-              <a:rPr lang="fr-FR">
-                <a:solidFill>
-                  <a:schemeClr val="tx1"/>
-                </a:solidFill>
-              </a:rPr>
-              <a:t>Launch the SAI each day, it will give a report of what it learned</a:t>
-            </a:r>
-          </a:p>
-          <a:p>
-            <a:r>
-              <a:rPr lang="fr-FR">
-                <a:solidFill>
-                  <a:schemeClr val="tx1"/>
-                </a:solidFill>
-              </a:rPr>
-              <a:t>Sort what SAI learned</a:t>
-            </a:r>
-            <a:endParaRPr lang="en-GB">
-              <a:solidFill>
-                <a:schemeClr val="tx1"/>
-              </a:solidFill>
-            </a:endParaRPr>
-          </a:p>
-        </p:txBody>
-      </p:sp>
-    </p:spTree>
-    <p:extLst>
-      <p:ext uri="{BB962C8B-B14F-4D97-AF65-F5344CB8AC3E}">
-        <p14:creationId xmlns:p14="http://schemas.microsoft.com/office/powerpoint/2010/main" val="1559484787"/>
-      </p:ext>
-    </p:extLst>
-  </p:cSld>
-  <p:clrMapOvr>
-    <a:masterClrMapping/>
-  </p:clrMapOvr>
-</p:sld>
-</file>
-
-<file path=ppt/slides/slide5.xml><?xml version="1.0" encoding="utf-8"?>
-<p:sld xmlns:a="http://schemas.openxmlformats.org/drawingml/2006/main" xmlns:r="http://schemas.openxmlformats.org/officeDocument/2006/relationships" xmlns:p="http://schemas.openxmlformats.org/presentationml/2006/main">
-  <p:cSld>
-    <p:bg>
-      <p:bgPr>
-        <a:gradFill rotWithShape="1">
-          <a:gsLst>
-            <a:gs pos="10000">
-              <a:schemeClr val="bg2">
-                <a:tint val="97000"/>
-                <a:hueMod val="92000"/>
-                <a:satMod val="169000"/>
-                <a:lumMod val="164000"/>
-              </a:schemeClr>
-            </a:gs>
-            <a:gs pos="100000">
-              <a:schemeClr val="bg2">
-                <a:shade val="96000"/>
-                <a:satMod val="120000"/>
-                <a:lumMod val="90000"/>
-              </a:schemeClr>
-            </a:gs>
-          </a:gsLst>
-          <a:lin ang="6120000" scaled="1"/>
-        </a:gradFill>
-        <a:effectLst/>
-      </p:bgPr>
-    </p:bg>
-    <p:spTree>
-      <p:nvGrpSpPr>
-        <p:cNvPr id="1" name=""/>
-        <p:cNvGrpSpPr/>
-        <p:nvPr/>
-      </p:nvGrpSpPr>
-      <p:grpSpPr>
-        <a:xfrm>
-          <a:off x="0" y="0"/>
-          <a:ext cx="0" cy="0"/>
-          <a:chOff x="0" y="0"/>
-          <a:chExt cx="0" cy="0"/>
-        </a:xfrm>
-      </p:grpSpPr>
-      <p:sp useBgFill="1">
-        <p:nvSpPr>
-          <p:cNvPr id="23" name="Rectangle 7">
-            <a:extLst>
-              <a:ext uri="{FF2B5EF4-FFF2-40B4-BE49-F238E27FC236}">
-                <a16:creationId xmlns:a16="http://schemas.microsoft.com/office/drawing/2014/main" id="{7509B08A-C1EC-478C-86AF-60ADE06D9BBB}"/>
-              </a:ext>
-              <a:ext uri="{C183D7F6-B498-43B3-948B-1728B52AA6E4}">
-                <adec:decorative xmlns:adec="http://schemas.microsoft.com/office/drawing/2017/decorative" val="1"/>
-              </a:ext>
-            </a:extLst>
-          </p:cNvPr>
-          <p:cNvSpPr>
-            <a:spLocks noGrp="1" noRot="1" noChangeAspect="1" noMove="1" noResize="1" noEditPoints="1" noAdjustHandles="1" noChangeArrowheads="1" noChangeShapeType="1" noTextEdit="1"/>
-          </p:cNvSpPr>
-          <p:nvPr>
-            <p:extLst>
-              <p:ext uri="{386F3935-93C4-4BCD-93E2-E3B085C9AB24}">
-                <p16:designElem xmlns:p16="http://schemas.microsoft.com/office/powerpoint/2015/main" val="1"/>
-              </p:ext>
-            </p:extLst>
-          </p:nvPr>
-        </p:nvSpPr>
-        <p:spPr>
-          <a:xfrm>
-            <a:off x="0" y="0"/>
-            <a:ext cx="12192000" cy="6858000"/>
-          </a:xfrm>
-          <a:prstGeom prst="rect">
-            <a:avLst/>
-          </a:prstGeom>
-          <a:ln>
-            <a:noFill/>
-          </a:ln>
-        </p:spPr>
-        <p:style>
-          <a:lnRef idx="2">
-            <a:schemeClr val="accent1">
-              <a:shade val="50000"/>
-            </a:schemeClr>
-          </a:lnRef>
-          <a:fillRef idx="1">
-            <a:schemeClr val="accent1"/>
-          </a:fillRef>
-          <a:effectRef idx="0">
-            <a:schemeClr val="accent1"/>
-          </a:effectRef>
-          <a:fontRef idx="minor">
-            <a:schemeClr val="lt1"/>
-          </a:fontRef>
-        </p:style>
-        <p:txBody>
-          <a:bodyPr rtlCol="0" anchor="ctr"/>
-          <a:lstStyle/>
-          <a:p>
-            <a:pPr algn="ctr"/>
-            <a:endParaRPr lang="en-US"/>
-          </a:p>
-        </p:txBody>
-      </p:sp>
-      <p:sp>
-        <p:nvSpPr>
-          <p:cNvPr id="2" name="Titre 1">
-            <a:extLst>
-              <a:ext uri="{FF2B5EF4-FFF2-40B4-BE49-F238E27FC236}">
-                <a16:creationId xmlns:a16="http://schemas.microsoft.com/office/drawing/2014/main" id="{E286FAAA-D668-42B4-9647-5ECEBD96BC52}"/>
-              </a:ext>
-            </a:extLst>
-          </p:cNvPr>
-          <p:cNvSpPr>
-            <a:spLocks noGrp="1"/>
-          </p:cNvSpPr>
-          <p:nvPr>
-            <p:ph type="title"/>
-          </p:nvPr>
-        </p:nvSpPr>
-        <p:spPr>
-          <a:xfrm>
-            <a:off x="640290" y="685800"/>
-            <a:ext cx="4818656" cy="4603749"/>
-          </a:xfrm>
-        </p:spPr>
-        <p:txBody>
-          <a:bodyPr>
-            <a:normAutofit/>
-          </a:bodyPr>
-          <a:lstStyle/>
-          <a:p>
-            <a:pPr algn="r"/>
-            <a:r>
-              <a:rPr lang="fr-FR" sz="5200"/>
-              <a:t>Solutions</a:t>
-            </a:r>
-            <a:endParaRPr lang="en-GB" sz="5200"/>
-          </a:p>
-        </p:txBody>
-      </p:sp>
-      <p:sp>
-        <p:nvSpPr>
-          <p:cNvPr id="10" name="Rectangle 9">
-            <a:extLst>
-              <a:ext uri="{FF2B5EF4-FFF2-40B4-BE49-F238E27FC236}">
-                <a16:creationId xmlns:a16="http://schemas.microsoft.com/office/drawing/2014/main" id="{221CC330-4259-4C32-BF8B-5FE13FFABB3A}"/>
-              </a:ext>
-              <a:ext uri="{C183D7F6-B498-43B3-948B-1728B52AA6E4}">
-                <adec:decorative xmlns:adec="http://schemas.microsoft.com/office/drawing/2017/decorative" val="1"/>
-              </a:ext>
-            </a:extLst>
-          </p:cNvPr>
-          <p:cNvSpPr>
-            <a:spLocks noGrp="1" noRot="1" noChangeAspect="1" noMove="1" noResize="1" noEditPoints="1" noAdjustHandles="1" noChangeArrowheads="1" noChangeShapeType="1" noTextEdit="1"/>
-          </p:cNvSpPr>
-          <p:nvPr>
-            <p:extLst>
-              <p:ext uri="{386F3935-93C4-4BCD-93E2-E3B085C9AB24}">
-                <p16:designElem xmlns:p16="http://schemas.microsoft.com/office/powerpoint/2015/main" val="1"/>
-              </p:ext>
-            </p:extLst>
-          </p:nvPr>
-        </p:nvSpPr>
-        <p:spPr>
-          <a:xfrm>
-            <a:off x="6095999" y="0"/>
-            <a:ext cx="6096001" cy="6858000"/>
-          </a:xfrm>
-          <a:prstGeom prst="rect">
-            <a:avLst/>
-          </a:prstGeom>
-          <a:solidFill>
-            <a:schemeClr val="bg2">
-              <a:alpha val="97000"/>
-            </a:schemeClr>
-          </a:solidFill>
-          <a:ln>
-            <a:noFill/>
-          </a:ln>
-          <a:effectLst/>
-        </p:spPr>
-        <p:style>
-          <a:lnRef idx="2">
-            <a:schemeClr val="accent1">
-              <a:shade val="50000"/>
-            </a:schemeClr>
-          </a:lnRef>
-          <a:fillRef idx="1001">
-            <a:schemeClr val="dk2"/>
-          </a:fillRef>
-          <a:effectRef idx="0">
-            <a:schemeClr val="accent1"/>
-          </a:effectRef>
-          <a:fontRef idx="minor">
-            <a:schemeClr val="lt1"/>
-          </a:fontRef>
-        </p:style>
-        <p:txBody>
-          <a:bodyPr rtlCol="0" anchor="ctr"/>
-          <a:lstStyle/>
-          <a:p>
-            <a:pPr algn="ctr"/>
-            <a:endParaRPr lang="en-US"/>
-          </a:p>
-        </p:txBody>
-      </p:sp>
-      <p:sp>
-        <p:nvSpPr>
-          <p:cNvPr id="3" name="Espace réservé du contenu 2">
-            <a:extLst>
-              <a:ext uri="{FF2B5EF4-FFF2-40B4-BE49-F238E27FC236}">
-                <a16:creationId xmlns:a16="http://schemas.microsoft.com/office/drawing/2014/main" id="{128178D9-55E1-4BEF-84B2-EF38491DA27C}"/>
-              </a:ext>
-            </a:extLst>
-          </p:cNvPr>
-          <p:cNvSpPr>
-            <a:spLocks noGrp="1"/>
-          </p:cNvSpPr>
-          <p:nvPr>
-            <p:ph idx="1"/>
-          </p:nvPr>
-        </p:nvSpPr>
-        <p:spPr>
-          <a:xfrm>
-            <a:off x="6625651" y="685800"/>
-            <a:ext cx="4878959" cy="4603750"/>
-          </a:xfrm>
-        </p:spPr>
-        <p:txBody>
-          <a:bodyPr>
-            <a:normAutofit/>
-          </a:bodyPr>
-          <a:lstStyle/>
-          <a:p>
-            <a:r>
-              <a:rPr lang="fr-FR">
-                <a:solidFill>
-                  <a:schemeClr val="tx1"/>
-                </a:solidFill>
-              </a:rPr>
-              <a:t>Create SAI with pyinstaller for multiplatform</a:t>
-            </a:r>
-          </a:p>
-          <a:p>
-            <a:r>
-              <a:rPr lang="fr-FR">
-                <a:solidFill>
-                  <a:schemeClr val="tx1"/>
-                </a:solidFill>
-              </a:rPr>
-              <a:t>Launch a scan that remove duplicate screenshot and order them by interesting strategie</a:t>
-            </a:r>
-          </a:p>
-          <a:p>
-            <a:r>
-              <a:rPr lang="fr-FR">
-                <a:solidFill>
-                  <a:schemeClr val="tx1"/>
-                </a:solidFill>
-              </a:rPr>
-              <a:t>Increment the reward if there was difference between images</a:t>
-            </a:r>
-          </a:p>
-          <a:p>
-            <a:r>
-              <a:rPr lang="fr-FR">
-                <a:solidFill>
-                  <a:schemeClr val="tx1"/>
-                </a:solidFill>
-              </a:rPr>
-              <a:t>Create a web page with the strategies learned</a:t>
-            </a:r>
-          </a:p>
-          <a:p>
-            <a:r>
-              <a:rPr lang="fr-FR">
-                <a:solidFill>
-                  <a:schemeClr val="tx1"/>
-                </a:solidFill>
-              </a:rPr>
-              <a:t>Create a web interface or a vocal controller to order strategies</a:t>
-            </a:r>
-          </a:p>
-        </p:txBody>
-      </p:sp>
-    </p:spTree>
-    <p:extLst>
-      <p:ext uri="{BB962C8B-B14F-4D97-AF65-F5344CB8AC3E}">
-        <p14:creationId xmlns:p14="http://schemas.microsoft.com/office/powerpoint/2010/main" val="701313445"/>
-      </p:ext>
-    </p:extLst>
-  </p:cSld>
-  <p:clrMapOvr>
-    <a:masterClrMapping/>
-  </p:clrMapOvr>
-</p:sld>
-</file>
-
-<file path=ppt/slides/slide6.xml><?xml version="1.0" encoding="utf-8"?>
-<p:sld xmlns:a="http://schemas.openxmlformats.org/drawingml/2006/main" xmlns:r="http://schemas.openxmlformats.org/officeDocument/2006/relationships" xmlns:p="http://schemas.openxmlformats.org/presentationml/2006/main">
-  <p:cSld>
-    <p:spTree>
-      <p:nvGrpSpPr>
-        <p:cNvPr id="1" name=""/>
-        <p:cNvGrpSpPr/>
-        <p:nvPr/>
-      </p:nvGrpSpPr>
-      <p:grpSpPr>
-        <a:xfrm>
-          <a:off x="0" y="0"/>
-          <a:ext cx="0" cy="0"/>
-          <a:chOff x="0" y="0"/>
-          <a:chExt cx="0" cy="0"/>
-        </a:xfrm>
-      </p:grpSpPr>
-      <p:sp>
-        <p:nvSpPr>
-          <p:cNvPr id="2" name="Titre 1">
-            <a:extLst>
-              <a:ext uri="{FF2B5EF4-FFF2-40B4-BE49-F238E27FC236}">
-                <a16:creationId xmlns:a16="http://schemas.microsoft.com/office/drawing/2014/main" id="{643ACCC2-1572-47D7-9E8E-170E100F9348}"/>
-              </a:ext>
-            </a:extLst>
-          </p:cNvPr>
-          <p:cNvSpPr>
-            <a:spLocks noGrp="1"/>
-          </p:cNvSpPr>
-          <p:nvPr>
-            <p:ph type="title"/>
-          </p:nvPr>
-        </p:nvSpPr>
-        <p:spPr/>
-        <p:txBody>
-          <a:bodyPr/>
-          <a:lstStyle/>
-          <a:p>
-            <a:r>
-              <a:rPr lang="fr-FR" dirty="0" err="1"/>
-              <a:t>Result</a:t>
-            </a:r>
-            <a:endParaRPr lang="en-GB" dirty="0"/>
-          </a:p>
-        </p:txBody>
-      </p:sp>
-      <p:sp>
-        <p:nvSpPr>
-          <p:cNvPr id="3" name="Espace réservé du contenu 2">
-            <a:extLst>
-              <a:ext uri="{FF2B5EF4-FFF2-40B4-BE49-F238E27FC236}">
-                <a16:creationId xmlns:a16="http://schemas.microsoft.com/office/drawing/2014/main" id="{7528B972-5B40-4B83-A687-4553853739D3}"/>
-              </a:ext>
-            </a:extLst>
-          </p:cNvPr>
-          <p:cNvSpPr>
-            <a:spLocks noGrp="1"/>
-          </p:cNvSpPr>
-          <p:nvPr>
-            <p:ph idx="1"/>
-          </p:nvPr>
-        </p:nvSpPr>
-        <p:spPr/>
-        <p:txBody>
-          <a:bodyPr/>
-          <a:lstStyle/>
-          <a:p>
-            <a:r>
-              <a:rPr lang="fr-FR"/>
-              <a:t>Show a graph with the strategies learn with a little picture</a:t>
-            </a:r>
-          </a:p>
-          <a:p>
-            <a:r>
-              <a:rPr lang="fr-FR"/>
-              <a:t>Show the web interface to choose strategies</a:t>
-            </a:r>
-            <a:endParaRPr lang="en-GB"/>
-          </a:p>
-        </p:txBody>
-      </p:sp>
-    </p:spTree>
-    <p:extLst>
-      <p:ext uri="{BB962C8B-B14F-4D97-AF65-F5344CB8AC3E}">
-        <p14:creationId xmlns:p14="http://schemas.microsoft.com/office/powerpoint/2010/main" val="770528979"/>
-      </p:ext>
-    </p:extLst>
-  </p:cSld>
-  <p:clrMapOvr>
-    <a:masterClrMapping/>
-  </p:clrMapOvr>
-</p:sld>
-</file>
-
-<file path=ppt/slides/slide7.xml><?xml version="1.0" encoding="utf-8"?>
-<p:sld xmlns:a="http://schemas.openxmlformats.org/drawingml/2006/main" xmlns:r="http://schemas.openxmlformats.org/officeDocument/2006/relationships" xmlns:p="http://schemas.openxmlformats.org/presentationml/2006/main">
-  <p:cSld>
-    <p:bg>
-      <p:bgPr>
-        <a:gradFill rotWithShape="1">
-          <a:gsLst>
-            <a:gs pos="10000">
-              <a:schemeClr val="bg2">
-                <a:tint val="97000"/>
-                <a:hueMod val="92000"/>
-                <a:satMod val="169000"/>
-                <a:lumMod val="164000"/>
-              </a:schemeClr>
-            </a:gs>
-            <a:gs pos="100000">
-              <a:schemeClr val="bg2">
-                <a:shade val="96000"/>
-                <a:satMod val="120000"/>
-                <a:lumMod val="90000"/>
-              </a:schemeClr>
-            </a:gs>
-          </a:gsLst>
-          <a:lin ang="6120000" scaled="1"/>
-        </a:gradFill>
-        <a:effectLst/>
-      </p:bgPr>
-    </p:bg>
-    <p:spTree>
-      <p:nvGrpSpPr>
-        <p:cNvPr id="1" name=""/>
-        <p:cNvGrpSpPr/>
-        <p:nvPr/>
-      </p:nvGrpSpPr>
-      <p:grpSpPr>
-        <a:xfrm>
-          <a:off x="0" y="0"/>
-          <a:ext cx="0" cy="0"/>
-          <a:chOff x="0" y="0"/>
-          <a:chExt cx="0" cy="0"/>
-        </a:xfrm>
-      </p:grpSpPr>
-      <p:sp>
-        <p:nvSpPr>
-          <p:cNvPr id="2" name="Titre 1">
-            <a:extLst>
-              <a:ext uri="{FF2B5EF4-FFF2-40B4-BE49-F238E27FC236}">
-                <a16:creationId xmlns:a16="http://schemas.microsoft.com/office/drawing/2014/main" id="{3CDB8273-45A0-4A0F-905C-063E41E279EE}"/>
-              </a:ext>
-            </a:extLst>
-          </p:cNvPr>
-          <p:cNvSpPr>
-            <a:spLocks noGrp="1"/>
-          </p:cNvSpPr>
-          <p:nvPr>
-            <p:ph type="title"/>
-          </p:nvPr>
-        </p:nvSpPr>
-        <p:spPr>
-          <a:xfrm>
-            <a:off x="684212" y="4487332"/>
-            <a:ext cx="8534400" cy="1507067"/>
-          </a:xfrm>
-        </p:spPr>
-        <p:txBody>
-          <a:bodyPr>
-            <a:normAutofit/>
-          </a:bodyPr>
-          <a:lstStyle/>
-          <a:p>
-            <a:r>
-              <a:rPr lang="fr-FR"/>
-              <a:t>Conclusion</a:t>
-            </a:r>
-            <a:endParaRPr lang="en-GB" dirty="0"/>
-          </a:p>
-        </p:txBody>
-      </p:sp>
-      <p:graphicFrame>
-        <p:nvGraphicFramePr>
-          <p:cNvPr id="5" name="Espace réservé du contenu 2">
-            <a:extLst>
-              <a:ext uri="{FF2B5EF4-FFF2-40B4-BE49-F238E27FC236}">
-                <a16:creationId xmlns:a16="http://schemas.microsoft.com/office/drawing/2014/main" id="{9A2F4FC4-8E3A-4880-8CC3-29FF61F63AB1}"/>
-              </a:ext>
-            </a:extLst>
-          </p:cNvPr>
-          <p:cNvGraphicFramePr>
-            <a:graphicFrameLocks noGrp="1"/>
-          </p:cNvGraphicFramePr>
-          <p:nvPr>
-            <p:ph idx="1"/>
-            <p:extLst>
-              <p:ext uri="{D42A27DB-BD31-4B8C-83A1-F6EECF244321}">
-                <p14:modId xmlns:p14="http://schemas.microsoft.com/office/powerpoint/2010/main" val="208525868"/>
-              </p:ext>
-            </p:extLst>
-          </p:nvPr>
-        </p:nvGraphicFramePr>
-        <p:xfrm>
-          <a:off x="684212" y="685800"/>
-          <a:ext cx="10820399" cy="3614738"/>
-        </p:xfrm>
-        <a:graphic>
-          <a:graphicData uri="http://schemas.openxmlformats.org/drawingml/2006/diagram">
-            <dgm:relIds xmlns:dgm="http://schemas.openxmlformats.org/drawingml/2006/diagram" xmlns:r="http://schemas.openxmlformats.org/officeDocument/2006/relationships" r:dm="rId2" r:lo="rId3" r:qs="rId4" r:cs="rId5"/>
-          </a:graphicData>
-        </a:graphic>
-      </p:graphicFrame>
-    </p:spTree>
-    <p:extLst>
-      <p:ext uri="{BB962C8B-B14F-4D97-AF65-F5344CB8AC3E}">
-        <p14:creationId xmlns:p14="http://schemas.microsoft.com/office/powerpoint/2010/main" val="2526747130"/>
-      </p:ext>
-    </p:extLst>
-  </p:cSld>
-  <p:clrMapOvr>
-    <a:masterClrMapping/>
-  </p:clrMapOvr>
-</p:sld>
-</file>
-
-<file path=ppt/slides/slide8.xml><?xml version="1.0" encoding="utf-8"?>
-<p:sld xmlns:a="http://schemas.openxmlformats.org/drawingml/2006/main" xmlns:r="http://schemas.openxmlformats.org/officeDocument/2006/relationships" xmlns:p="http://schemas.openxmlformats.org/presentationml/2006/main">
-  <p:cSld>
-    <p:spTree>
-      <p:nvGrpSpPr>
-        <p:cNvPr id="1" name=""/>
-        <p:cNvGrpSpPr/>
-        <p:nvPr/>
-      </p:nvGrpSpPr>
-      <p:grpSpPr>
-        <a:xfrm>
-          <a:off x="0" y="0"/>
-          <a:ext cx="0" cy="0"/>
-          <a:chOff x="0" y="0"/>
-          <a:chExt cx="0" cy="0"/>
-        </a:xfrm>
-      </p:grpSpPr>
-      <p:sp>
-        <p:nvSpPr>
-          <p:cNvPr id="2" name="Titre 1">
-            <a:extLst>
-              <a:ext uri="{FF2B5EF4-FFF2-40B4-BE49-F238E27FC236}">
                 <a16:creationId xmlns:a16="http://schemas.microsoft.com/office/drawing/2014/main" id="{50C2AE22-9CDD-4DF4-8855-8950B74A3C2C}"/>
               </a:ext>
             </a:extLst>
@@ -14320,7 +12196,7 @@
 </p:sld>
 </file>
 
-<file path=ppt/slides/slide9.xml><?xml version="1.0" encoding="utf-8"?>
+<file path=ppt/slides/slide11.xml><?xml version="1.0" encoding="utf-8"?>
 <p:sld xmlns:a="http://schemas.openxmlformats.org/drawingml/2006/main" xmlns:r="http://schemas.openxmlformats.org/officeDocument/2006/relationships" xmlns:p="http://schemas.openxmlformats.org/presentationml/2006/main">
   <p:cSld>
     <p:spTree>
@@ -15073,6 +12949,2388 @@
 </p:sld>
 </file>
 
+<file path=ppt/slides/slide12.xml><?xml version="1.0" encoding="utf-8"?>
+<p:sld xmlns:a="http://schemas.openxmlformats.org/drawingml/2006/main" xmlns:r="http://schemas.openxmlformats.org/officeDocument/2006/relationships" xmlns:p="http://schemas.openxmlformats.org/presentationml/2006/main">
+  <p:cSld>
+    <p:spTree>
+      <p:nvGrpSpPr>
+        <p:cNvPr id="1" name=""/>
+        <p:cNvGrpSpPr/>
+        <p:nvPr/>
+      </p:nvGrpSpPr>
+      <p:grpSpPr>
+        <a:xfrm>
+          <a:off x="0" y="0"/>
+          <a:ext cx="0" cy="0"/>
+          <a:chOff x="0" y="0"/>
+          <a:chExt cx="0" cy="0"/>
+        </a:xfrm>
+      </p:grpSpPr>
+      <p:sp>
+        <p:nvSpPr>
+          <p:cNvPr id="2" name="Titre 1">
+            <a:extLst>
+              <a:ext uri="{FF2B5EF4-FFF2-40B4-BE49-F238E27FC236}">
+                <a16:creationId xmlns:a16="http://schemas.microsoft.com/office/drawing/2014/main" id="{C3A47323-C1D5-4FF9-968A-64ABFA3C1E18}"/>
+              </a:ext>
+            </a:extLst>
+          </p:cNvPr>
+          <p:cNvSpPr>
+            <a:spLocks noGrp="1"/>
+          </p:cNvSpPr>
+          <p:nvPr>
+            <p:ph type="title"/>
+          </p:nvPr>
+        </p:nvSpPr>
+        <p:spPr/>
+        <p:txBody>
+          <a:bodyPr/>
+          <a:lstStyle/>
+          <a:p>
+            <a:r>
+              <a:rPr lang="fr-FR" dirty="0"/>
+              <a:t>Annexe</a:t>
+            </a:r>
+            <a:endParaRPr lang="en-GB" dirty="0"/>
+          </a:p>
+        </p:txBody>
+      </p:sp>
+      <p:pic>
+        <p:nvPicPr>
+          <p:cNvPr id="16" name="Espace réservé du contenu 15">
+            <a:extLst>
+              <a:ext uri="{FF2B5EF4-FFF2-40B4-BE49-F238E27FC236}">
+                <a16:creationId xmlns:a16="http://schemas.microsoft.com/office/drawing/2014/main" id="{B2C4B2A4-24E6-4EA7-8EF4-F1B0389A247E}"/>
+              </a:ext>
+            </a:extLst>
+          </p:cNvPr>
+          <p:cNvPicPr>
+            <a:picLocks noGrp="1" noChangeAspect="1"/>
+          </p:cNvPicPr>
+          <p:nvPr>
+            <p:ph idx="1"/>
+          </p:nvPr>
+        </p:nvPicPr>
+        <p:blipFill>
+          <a:blip r:embed="rId2"/>
+          <a:stretch>
+            <a:fillRect/>
+          </a:stretch>
+        </p:blipFill>
+        <p:spPr>
+          <a:xfrm>
+            <a:off x="7839108" y="2560399"/>
+            <a:ext cx="1314450" cy="600075"/>
+          </a:xfrm>
+          <a:prstGeom prst="rect">
+            <a:avLst/>
+          </a:prstGeom>
+        </p:spPr>
+      </p:pic>
+      <p:sp>
+        <p:nvSpPr>
+          <p:cNvPr id="4" name="ZoneTexte 3">
+            <a:extLst>
+              <a:ext uri="{FF2B5EF4-FFF2-40B4-BE49-F238E27FC236}">
+                <a16:creationId xmlns:a16="http://schemas.microsoft.com/office/drawing/2014/main" id="{308043D7-F2FD-4D07-9420-385AA37319FD}"/>
+              </a:ext>
+            </a:extLst>
+          </p:cNvPr>
+          <p:cNvSpPr txBox="1"/>
+          <p:nvPr/>
+        </p:nvSpPr>
+        <p:spPr>
+          <a:xfrm>
+            <a:off x="499481" y="348122"/>
+            <a:ext cx="1754006" cy="369332"/>
+          </a:xfrm>
+          <a:prstGeom prst="rect">
+            <a:avLst/>
+          </a:prstGeom>
+          <a:noFill/>
+        </p:spPr>
+        <p:txBody>
+          <a:bodyPr wrap="none" rtlCol="0">
+            <a:spAutoFit/>
+          </a:bodyPr>
+          <a:lstStyle/>
+          <a:p>
+            <a:r>
+              <a:rPr lang="fr-FR" dirty="0"/>
+              <a:t>The prototype</a:t>
+            </a:r>
+            <a:endParaRPr lang="en-GB" dirty="0"/>
+          </a:p>
+        </p:txBody>
+      </p:sp>
+      <p:cxnSp>
+        <p:nvCxnSpPr>
+          <p:cNvPr id="5" name="Connecteur droit avec flèche 4">
+            <a:extLst>
+              <a:ext uri="{FF2B5EF4-FFF2-40B4-BE49-F238E27FC236}">
+                <a16:creationId xmlns:a16="http://schemas.microsoft.com/office/drawing/2014/main" id="{76B2BD43-8A32-4F05-90EE-F4CBE6F6B3AC}"/>
+              </a:ext>
+            </a:extLst>
+          </p:cNvPr>
+          <p:cNvCxnSpPr>
+            <a:cxnSpLocks/>
+          </p:cNvCxnSpPr>
+          <p:nvPr/>
+        </p:nvCxnSpPr>
+        <p:spPr>
+          <a:xfrm>
+            <a:off x="6384258" y="989988"/>
+            <a:ext cx="1526233" cy="1340211"/>
+          </a:xfrm>
+          <a:prstGeom prst="straightConnector1">
+            <a:avLst/>
+          </a:prstGeom>
+          <a:ln w="76200">
+            <a:solidFill>
+              <a:schemeClr val="accent1">
+                <a:lumMod val="60000"/>
+                <a:lumOff val="40000"/>
+                <a:alpha val="60000"/>
+              </a:schemeClr>
+            </a:solidFill>
+            <a:tailEnd type="triangle"/>
+          </a:ln>
+        </p:spPr>
+        <p:style>
+          <a:lnRef idx="1">
+            <a:schemeClr val="accent1"/>
+          </a:lnRef>
+          <a:fillRef idx="0">
+            <a:schemeClr val="accent1"/>
+          </a:fillRef>
+          <a:effectRef idx="0">
+            <a:schemeClr val="accent1"/>
+          </a:effectRef>
+          <a:fontRef idx="minor">
+            <a:schemeClr val="tx1"/>
+          </a:fontRef>
+        </p:style>
+      </p:cxnSp>
+      <p:cxnSp>
+        <p:nvCxnSpPr>
+          <p:cNvPr id="6" name="Connecteur droit avec flèche 5">
+            <a:extLst>
+              <a:ext uri="{FF2B5EF4-FFF2-40B4-BE49-F238E27FC236}">
+                <a16:creationId xmlns:a16="http://schemas.microsoft.com/office/drawing/2014/main" id="{4FB2FE4C-19EC-481B-8A75-3B52BCC715A8}"/>
+              </a:ext>
+            </a:extLst>
+          </p:cNvPr>
+          <p:cNvCxnSpPr>
+            <a:cxnSpLocks/>
+          </p:cNvCxnSpPr>
+          <p:nvPr/>
+        </p:nvCxnSpPr>
+        <p:spPr>
+          <a:xfrm>
+            <a:off x="5678751" y="1145219"/>
+            <a:ext cx="0" cy="1606626"/>
+          </a:xfrm>
+          <a:prstGeom prst="straightConnector1">
+            <a:avLst/>
+          </a:prstGeom>
+          <a:ln w="76200">
+            <a:solidFill>
+              <a:schemeClr val="accent1">
+                <a:lumMod val="60000"/>
+                <a:lumOff val="40000"/>
+                <a:alpha val="60000"/>
+              </a:schemeClr>
+            </a:solidFill>
+            <a:tailEnd type="triangle"/>
+          </a:ln>
+        </p:spPr>
+        <p:style>
+          <a:lnRef idx="1">
+            <a:schemeClr val="accent1"/>
+          </a:lnRef>
+          <a:fillRef idx="0">
+            <a:schemeClr val="accent1"/>
+          </a:fillRef>
+          <a:effectRef idx="0">
+            <a:schemeClr val="accent1"/>
+          </a:effectRef>
+          <a:fontRef idx="minor">
+            <a:schemeClr val="tx1"/>
+          </a:fontRef>
+        </p:style>
+      </p:cxnSp>
+      <p:cxnSp>
+        <p:nvCxnSpPr>
+          <p:cNvPr id="7" name="Connecteur droit avec flèche 6">
+            <a:extLst>
+              <a:ext uri="{FF2B5EF4-FFF2-40B4-BE49-F238E27FC236}">
+                <a16:creationId xmlns:a16="http://schemas.microsoft.com/office/drawing/2014/main" id="{5B6CFAE7-3CE4-4665-8A62-A74E96029C14}"/>
+              </a:ext>
+            </a:extLst>
+          </p:cNvPr>
+          <p:cNvCxnSpPr>
+            <a:cxnSpLocks/>
+          </p:cNvCxnSpPr>
+          <p:nvPr/>
+        </p:nvCxnSpPr>
+        <p:spPr>
+          <a:xfrm flipH="1">
+            <a:off x="3426782" y="989988"/>
+            <a:ext cx="1617845" cy="1380680"/>
+          </a:xfrm>
+          <a:prstGeom prst="straightConnector1">
+            <a:avLst/>
+          </a:prstGeom>
+          <a:ln w="76200">
+            <a:solidFill>
+              <a:schemeClr val="accent1">
+                <a:lumMod val="60000"/>
+                <a:lumOff val="40000"/>
+                <a:alpha val="60000"/>
+              </a:schemeClr>
+            </a:solidFill>
+            <a:tailEnd type="triangle"/>
+          </a:ln>
+        </p:spPr>
+        <p:style>
+          <a:lnRef idx="1">
+            <a:schemeClr val="accent1"/>
+          </a:lnRef>
+          <a:fillRef idx="0">
+            <a:schemeClr val="accent1"/>
+          </a:fillRef>
+          <a:effectRef idx="0">
+            <a:schemeClr val="accent1"/>
+          </a:effectRef>
+          <a:fontRef idx="minor">
+            <a:schemeClr val="tx1"/>
+          </a:fontRef>
+        </p:style>
+      </p:cxnSp>
+      <p:sp>
+        <p:nvSpPr>
+          <p:cNvPr id="8" name="ZoneTexte 7">
+            <a:extLst>
+              <a:ext uri="{FF2B5EF4-FFF2-40B4-BE49-F238E27FC236}">
+                <a16:creationId xmlns:a16="http://schemas.microsoft.com/office/drawing/2014/main" id="{9035EBA5-A191-4017-9BC3-68668EEEC5A6}"/>
+              </a:ext>
+            </a:extLst>
+          </p:cNvPr>
+          <p:cNvSpPr txBox="1"/>
+          <p:nvPr/>
+        </p:nvSpPr>
+        <p:spPr>
+          <a:xfrm>
+            <a:off x="2077435" y="3279624"/>
+            <a:ext cx="928459" cy="369332"/>
+          </a:xfrm>
+          <a:prstGeom prst="rect">
+            <a:avLst/>
+          </a:prstGeom>
+          <a:noFill/>
+        </p:spPr>
+        <p:txBody>
+          <a:bodyPr wrap="none" rtlCol="0">
+            <a:spAutoFit/>
+          </a:bodyPr>
+          <a:lstStyle/>
+          <a:p>
+            <a:r>
+              <a:rPr lang="fr-FR" b="1" dirty="0">
+                <a:solidFill>
+                  <a:schemeClr val="bg1"/>
+                </a:solidFill>
+                <a:latin typeface="Times New Roman" panose="02020603050405020304" pitchFamily="18" charset="0"/>
+                <a:cs typeface="Times New Roman" panose="02020603050405020304" pitchFamily="18" charset="0"/>
+              </a:rPr>
+              <a:t>Actions</a:t>
+            </a:r>
+            <a:endParaRPr lang="en-GB" b="1" dirty="0">
+              <a:solidFill>
+                <a:schemeClr val="bg1"/>
+              </a:solidFill>
+              <a:latin typeface="Times New Roman" panose="02020603050405020304" pitchFamily="18" charset="0"/>
+              <a:cs typeface="Times New Roman" panose="02020603050405020304" pitchFamily="18" charset="0"/>
+            </a:endParaRPr>
+          </a:p>
+        </p:txBody>
+      </p:sp>
+      <p:sp>
+        <p:nvSpPr>
+          <p:cNvPr id="9" name="ZoneTexte 8">
+            <a:extLst>
+              <a:ext uri="{FF2B5EF4-FFF2-40B4-BE49-F238E27FC236}">
+                <a16:creationId xmlns:a16="http://schemas.microsoft.com/office/drawing/2014/main" id="{BC7F6B83-CFA6-428A-9163-505D9408D6D0}"/>
+              </a:ext>
+            </a:extLst>
+          </p:cNvPr>
+          <p:cNvSpPr txBox="1"/>
+          <p:nvPr/>
+        </p:nvSpPr>
+        <p:spPr>
+          <a:xfrm>
+            <a:off x="5221551" y="4030132"/>
+            <a:ext cx="941283" cy="369332"/>
+          </a:xfrm>
+          <a:prstGeom prst="rect">
+            <a:avLst/>
+          </a:prstGeom>
+          <a:noFill/>
+        </p:spPr>
+        <p:txBody>
+          <a:bodyPr wrap="none" rtlCol="0">
+            <a:spAutoFit/>
+          </a:bodyPr>
+          <a:lstStyle/>
+          <a:p>
+            <a:r>
+              <a:rPr lang="fr-FR" b="1" dirty="0" err="1">
+                <a:solidFill>
+                  <a:srgbClr val="92D050"/>
+                </a:solidFill>
+                <a:latin typeface="Times New Roman" panose="02020603050405020304" pitchFamily="18" charset="0"/>
+                <a:cs typeface="Times New Roman" panose="02020603050405020304" pitchFamily="18" charset="0"/>
+              </a:rPr>
+              <a:t>Sensors</a:t>
+            </a:r>
+            <a:endParaRPr lang="en-GB" b="1" dirty="0">
+              <a:solidFill>
+                <a:srgbClr val="92D050"/>
+              </a:solidFill>
+              <a:latin typeface="Times New Roman" panose="02020603050405020304" pitchFamily="18" charset="0"/>
+              <a:cs typeface="Times New Roman" panose="02020603050405020304" pitchFamily="18" charset="0"/>
+            </a:endParaRPr>
+          </a:p>
+        </p:txBody>
+      </p:sp>
+      <p:sp>
+        <p:nvSpPr>
+          <p:cNvPr id="10" name="ZoneTexte 9">
+            <a:extLst>
+              <a:ext uri="{FF2B5EF4-FFF2-40B4-BE49-F238E27FC236}">
+                <a16:creationId xmlns:a16="http://schemas.microsoft.com/office/drawing/2014/main" id="{9A0D750E-6B64-4F6A-9699-6D981AE0E69F}"/>
+              </a:ext>
+            </a:extLst>
+          </p:cNvPr>
+          <p:cNvSpPr txBox="1"/>
+          <p:nvPr/>
+        </p:nvSpPr>
+        <p:spPr>
+          <a:xfrm>
+            <a:off x="8239377" y="3279624"/>
+            <a:ext cx="1270541" cy="369332"/>
+          </a:xfrm>
+          <a:prstGeom prst="rect">
+            <a:avLst/>
+          </a:prstGeom>
+          <a:noFill/>
+        </p:spPr>
+        <p:txBody>
+          <a:bodyPr wrap="none" rtlCol="0">
+            <a:spAutoFit/>
+          </a:bodyPr>
+          <a:lstStyle/>
+          <a:p>
+            <a:r>
+              <a:rPr lang="fr-FR" b="1" dirty="0">
+                <a:solidFill>
+                  <a:schemeClr val="accent6">
+                    <a:lumMod val="40000"/>
+                    <a:lumOff val="60000"/>
+                  </a:schemeClr>
+                </a:solidFill>
+                <a:latin typeface="Times New Roman" panose="02020603050405020304" pitchFamily="18" charset="0"/>
+                <a:cs typeface="Times New Roman" panose="02020603050405020304" pitchFamily="18" charset="0"/>
+              </a:rPr>
+              <a:t>Ressources</a:t>
+            </a:r>
+            <a:endParaRPr lang="en-GB" b="1" dirty="0">
+              <a:solidFill>
+                <a:schemeClr val="accent6">
+                  <a:lumMod val="40000"/>
+                  <a:lumOff val="60000"/>
+                </a:schemeClr>
+              </a:solidFill>
+              <a:latin typeface="Times New Roman" panose="02020603050405020304" pitchFamily="18" charset="0"/>
+              <a:cs typeface="Times New Roman" panose="02020603050405020304" pitchFamily="18" charset="0"/>
+            </a:endParaRPr>
+          </a:p>
+        </p:txBody>
+      </p:sp>
+      <p:pic>
+        <p:nvPicPr>
+          <p:cNvPr id="12" name="Image 11">
+            <a:extLst>
+              <a:ext uri="{FF2B5EF4-FFF2-40B4-BE49-F238E27FC236}">
+                <a16:creationId xmlns:a16="http://schemas.microsoft.com/office/drawing/2014/main" id="{460BFFBA-E30E-4BA2-B5A0-8B77D3024A79}"/>
+              </a:ext>
+            </a:extLst>
+          </p:cNvPr>
+          <p:cNvPicPr>
+            <a:picLocks noChangeAspect="1"/>
+          </p:cNvPicPr>
+          <p:nvPr/>
+        </p:nvPicPr>
+        <p:blipFill>
+          <a:blip r:embed="rId3"/>
+          <a:stretch>
+            <a:fillRect/>
+          </a:stretch>
+        </p:blipFill>
+        <p:spPr>
+          <a:xfrm>
+            <a:off x="4979375" y="218769"/>
+            <a:ext cx="1333500" cy="619125"/>
+          </a:xfrm>
+          <a:prstGeom prst="rect">
+            <a:avLst/>
+          </a:prstGeom>
+        </p:spPr>
+      </p:pic>
+      <p:pic>
+        <p:nvPicPr>
+          <p:cNvPr id="13" name="Image 12">
+            <a:extLst>
+              <a:ext uri="{FF2B5EF4-FFF2-40B4-BE49-F238E27FC236}">
+                <a16:creationId xmlns:a16="http://schemas.microsoft.com/office/drawing/2014/main" id="{26956F3D-9551-4FC1-8071-92FE32D0ABE2}"/>
+              </a:ext>
+            </a:extLst>
+          </p:cNvPr>
+          <p:cNvPicPr>
+            <a:picLocks noChangeAspect="1"/>
+          </p:cNvPicPr>
+          <p:nvPr/>
+        </p:nvPicPr>
+        <p:blipFill>
+          <a:blip r:embed="rId4"/>
+          <a:stretch>
+            <a:fillRect/>
+          </a:stretch>
+        </p:blipFill>
+        <p:spPr>
+          <a:xfrm>
+            <a:off x="2102807" y="2514600"/>
+            <a:ext cx="1323975" cy="609600"/>
+          </a:xfrm>
+          <a:prstGeom prst="rect">
+            <a:avLst/>
+          </a:prstGeom>
+        </p:spPr>
+      </p:pic>
+      <p:pic>
+        <p:nvPicPr>
+          <p:cNvPr id="15" name="Image 14">
+            <a:extLst>
+              <a:ext uri="{FF2B5EF4-FFF2-40B4-BE49-F238E27FC236}">
+                <a16:creationId xmlns:a16="http://schemas.microsoft.com/office/drawing/2014/main" id="{492195D9-84DC-4159-939B-CED361C5BBCD}"/>
+              </a:ext>
+            </a:extLst>
+          </p:cNvPr>
+          <p:cNvPicPr>
+            <a:picLocks noChangeAspect="1"/>
+          </p:cNvPicPr>
+          <p:nvPr/>
+        </p:nvPicPr>
+        <p:blipFill>
+          <a:blip r:embed="rId5"/>
+          <a:stretch>
+            <a:fillRect/>
+          </a:stretch>
+        </p:blipFill>
+        <p:spPr>
+          <a:xfrm>
+            <a:off x="4235704" y="3279623"/>
+            <a:ext cx="1314450" cy="600075"/>
+          </a:xfrm>
+          <a:prstGeom prst="rect">
+            <a:avLst/>
+          </a:prstGeom>
+        </p:spPr>
+      </p:pic>
+      <p:pic>
+        <p:nvPicPr>
+          <p:cNvPr id="3" name="Image 2">
+            <a:extLst>
+              <a:ext uri="{FF2B5EF4-FFF2-40B4-BE49-F238E27FC236}">
+                <a16:creationId xmlns:a16="http://schemas.microsoft.com/office/drawing/2014/main" id="{4D792693-4505-4101-BD7F-57D56B4C40E6}"/>
+              </a:ext>
+            </a:extLst>
+          </p:cNvPr>
+          <p:cNvPicPr>
+            <a:picLocks noChangeAspect="1"/>
+          </p:cNvPicPr>
+          <p:nvPr/>
+        </p:nvPicPr>
+        <p:blipFill>
+          <a:blip r:embed="rId6"/>
+          <a:stretch>
+            <a:fillRect/>
+          </a:stretch>
+        </p:blipFill>
+        <p:spPr>
+          <a:xfrm>
+            <a:off x="5832925" y="3279624"/>
+            <a:ext cx="1314450" cy="600075"/>
+          </a:xfrm>
+          <a:prstGeom prst="rect">
+            <a:avLst/>
+          </a:prstGeom>
+        </p:spPr>
+      </p:pic>
+    </p:spTree>
+    <p:extLst>
+      <p:ext uri="{BB962C8B-B14F-4D97-AF65-F5344CB8AC3E}">
+        <p14:creationId xmlns:p14="http://schemas.microsoft.com/office/powerpoint/2010/main" val="2112816624"/>
+      </p:ext>
+    </p:extLst>
+  </p:cSld>
+  <p:clrMapOvr>
+    <a:masterClrMapping/>
+  </p:clrMapOvr>
+</p:sld>
+</file>
+
+<file path=ppt/slides/slide13.xml><?xml version="1.0" encoding="utf-8"?>
+<p:sld xmlns:a="http://schemas.openxmlformats.org/drawingml/2006/main" xmlns:r="http://schemas.openxmlformats.org/officeDocument/2006/relationships" xmlns:p="http://schemas.openxmlformats.org/presentationml/2006/main">
+  <p:cSld>
+    <p:spTree>
+      <p:nvGrpSpPr>
+        <p:cNvPr id="1" name=""/>
+        <p:cNvGrpSpPr/>
+        <p:nvPr/>
+      </p:nvGrpSpPr>
+      <p:grpSpPr>
+        <a:xfrm>
+          <a:off x="0" y="0"/>
+          <a:ext cx="0" cy="0"/>
+          <a:chOff x="0" y="0"/>
+          <a:chExt cx="0" cy="0"/>
+        </a:xfrm>
+      </p:grpSpPr>
+      <p:sp>
+        <p:nvSpPr>
+          <p:cNvPr id="2" name="Titre 1">
+            <a:extLst>
+              <a:ext uri="{FF2B5EF4-FFF2-40B4-BE49-F238E27FC236}">
+                <a16:creationId xmlns:a16="http://schemas.microsoft.com/office/drawing/2014/main" id="{60A45B33-4349-4205-A596-A72ABD8F0A69}"/>
+              </a:ext>
+            </a:extLst>
+          </p:cNvPr>
+          <p:cNvSpPr>
+            <a:spLocks noGrp="1"/>
+          </p:cNvSpPr>
+          <p:nvPr>
+            <p:ph type="title"/>
+          </p:nvPr>
+        </p:nvSpPr>
+        <p:spPr>
+          <a:xfrm>
+            <a:off x="684212" y="4487332"/>
+            <a:ext cx="8534400" cy="1507067"/>
+          </a:xfrm>
+        </p:spPr>
+        <p:txBody>
+          <a:bodyPr/>
+          <a:lstStyle/>
+          <a:p>
+            <a:r>
+              <a:rPr lang="fr-FR"/>
+              <a:t>Sources</a:t>
+            </a:r>
+            <a:endParaRPr lang="en-GB" dirty="0"/>
+          </a:p>
+        </p:txBody>
+      </p:sp>
+      <p:sp>
+        <p:nvSpPr>
+          <p:cNvPr id="3" name="Espace réservé du contenu 2">
+            <a:extLst>
+              <a:ext uri="{FF2B5EF4-FFF2-40B4-BE49-F238E27FC236}">
+                <a16:creationId xmlns:a16="http://schemas.microsoft.com/office/drawing/2014/main" id="{825892DE-953F-4021-9EA2-14E93075BB41}"/>
+              </a:ext>
+            </a:extLst>
+          </p:cNvPr>
+          <p:cNvSpPr>
+            <a:spLocks noGrp="1"/>
+          </p:cNvSpPr>
+          <p:nvPr>
+            <p:ph idx="1"/>
+          </p:nvPr>
+        </p:nvSpPr>
+        <p:spPr>
+          <a:xfrm>
+            <a:off x="684212" y="685800"/>
+            <a:ext cx="8534400" cy="3615267"/>
+          </a:xfrm>
+        </p:spPr>
+        <p:txBody>
+          <a:bodyPr/>
+          <a:lstStyle/>
+          <a:p>
+            <a:r>
+              <a:rPr lang="fr-FR"/>
+              <a:t>Annexe prototype: </a:t>
+            </a:r>
+            <a:r>
+              <a:rPr lang="en-GB">
+                <a:hlinkClick r:id="rId2"/>
+              </a:rPr>
+              <a:t>https://www.draw.io/</a:t>
+            </a:r>
+            <a:endParaRPr lang="en-GB" dirty="0"/>
+          </a:p>
+        </p:txBody>
+      </p:sp>
+    </p:spTree>
+    <p:extLst>
+      <p:ext uri="{BB962C8B-B14F-4D97-AF65-F5344CB8AC3E}">
+        <p14:creationId xmlns:p14="http://schemas.microsoft.com/office/powerpoint/2010/main" val="1489863068"/>
+      </p:ext>
+    </p:extLst>
+  </p:cSld>
+  <p:clrMapOvr>
+    <a:masterClrMapping/>
+  </p:clrMapOvr>
+</p:sld>
+</file>
+
+<file path=ppt/slides/slide2.xml><?xml version="1.0" encoding="utf-8"?>
+<p:sld xmlns:a="http://schemas.openxmlformats.org/drawingml/2006/main" xmlns:r="http://schemas.openxmlformats.org/officeDocument/2006/relationships" xmlns:p="http://schemas.openxmlformats.org/presentationml/2006/main">
+  <p:cSld>
+    <p:bg>
+      <p:bgPr>
+        <a:gradFill rotWithShape="1">
+          <a:gsLst>
+            <a:gs pos="0">
+              <a:schemeClr val="bg2">
+                <a:tint val="97000"/>
+                <a:hueMod val="92000"/>
+                <a:satMod val="169000"/>
+                <a:lumMod val="164000"/>
+              </a:schemeClr>
+            </a:gs>
+            <a:gs pos="100000">
+              <a:schemeClr val="bg2">
+                <a:shade val="96000"/>
+                <a:satMod val="120000"/>
+                <a:lumMod val="90000"/>
+              </a:schemeClr>
+            </a:gs>
+          </a:gsLst>
+          <a:path path="circle">
+            <a:fillToRect b="100000"/>
+          </a:path>
+        </a:gradFill>
+        <a:effectLst/>
+      </p:bgPr>
+    </p:bg>
+    <p:spTree>
+      <p:nvGrpSpPr>
+        <p:cNvPr id="1" name=""/>
+        <p:cNvGrpSpPr/>
+        <p:nvPr/>
+      </p:nvGrpSpPr>
+      <p:grpSpPr>
+        <a:xfrm>
+          <a:off x="0" y="0"/>
+          <a:ext cx="0" cy="0"/>
+          <a:chOff x="0" y="0"/>
+          <a:chExt cx="0" cy="0"/>
+        </a:xfrm>
+      </p:grpSpPr>
+      <p:sp>
+        <p:nvSpPr>
+          <p:cNvPr id="10" name="Rectangle 9">
+            <a:extLst>
+              <a:ext uri="{FF2B5EF4-FFF2-40B4-BE49-F238E27FC236}">
+                <a16:creationId xmlns:a16="http://schemas.microsoft.com/office/drawing/2014/main" id="{2C33F367-76E5-4D2A-96B1-4FD443CDD1CF}"/>
+              </a:ext>
+              <a:ext uri="{C183D7F6-B498-43B3-948B-1728B52AA6E4}">
+                <adec:decorative xmlns:adec="http://schemas.microsoft.com/office/drawing/2017/decorative" val="1"/>
+              </a:ext>
+            </a:extLst>
+          </p:cNvPr>
+          <p:cNvSpPr>
+            <a:spLocks noGrp="1" noRot="1" noChangeAspect="1" noMove="1" noResize="1" noEditPoints="1" noAdjustHandles="1" noChangeArrowheads="1" noChangeShapeType="1" noTextEdit="1"/>
+          </p:cNvSpPr>
+          <p:nvPr>
+            <p:extLst>
+              <p:ext uri="{386F3935-93C4-4BCD-93E2-E3B085C9AB24}">
+                <p16:designElem xmlns:p16="http://schemas.microsoft.com/office/powerpoint/2015/main" val="1"/>
+              </p:ext>
+            </p:extLst>
+          </p:nvPr>
+        </p:nvSpPr>
+        <p:spPr>
+          <a:xfrm>
+            <a:off x="0" y="0"/>
+            <a:ext cx="12192000" cy="6858000"/>
+          </a:xfrm>
+          <a:prstGeom prst="rect">
+            <a:avLst/>
+          </a:prstGeom>
+          <a:gradFill>
+            <a:gsLst>
+              <a:gs pos="10000">
+                <a:schemeClr val="dk2">
+                  <a:tint val="97000"/>
+                  <a:hueMod val="92000"/>
+                  <a:satMod val="169000"/>
+                  <a:lumMod val="164000"/>
+                </a:schemeClr>
+              </a:gs>
+              <a:gs pos="100000">
+                <a:schemeClr val="dk2">
+                  <a:shade val="96000"/>
+                  <a:satMod val="120000"/>
+                  <a:lumMod val="90000"/>
+                </a:schemeClr>
+              </a:gs>
+            </a:gsLst>
+            <a:lin ang="6120000" scaled="1"/>
+          </a:gradFill>
+          <a:ln>
+            <a:noFill/>
+          </a:ln>
+        </p:spPr>
+        <p:style>
+          <a:lnRef idx="2">
+            <a:schemeClr val="accent1">
+              <a:shade val="50000"/>
+            </a:schemeClr>
+          </a:lnRef>
+          <a:fillRef idx="1002">
+            <a:schemeClr val="dk2"/>
+          </a:fillRef>
+          <a:effectRef idx="0">
+            <a:schemeClr val="accent1"/>
+          </a:effectRef>
+          <a:fontRef idx="minor">
+            <a:schemeClr val="lt1"/>
+          </a:fontRef>
+        </p:style>
+        <p:txBody>
+          <a:bodyPr rtlCol="0" anchor="ctr"/>
+          <a:lstStyle/>
+          <a:p>
+            <a:pPr algn="ctr"/>
+            <a:endParaRPr lang="en-US"/>
+          </a:p>
+        </p:txBody>
+      </p:sp>
+      <p:sp>
+        <p:nvSpPr>
+          <p:cNvPr id="12" name="Snip Diagonal Corner Rectangle 21">
+            <a:extLst>
+              <a:ext uri="{FF2B5EF4-FFF2-40B4-BE49-F238E27FC236}">
+                <a16:creationId xmlns:a16="http://schemas.microsoft.com/office/drawing/2014/main" id="{6F769419-3E73-449D-B62A-0CDEC946A679}"/>
+              </a:ext>
+              <a:ext uri="{C183D7F6-B498-43B3-948B-1728B52AA6E4}">
+                <adec:decorative xmlns:adec="http://schemas.microsoft.com/office/drawing/2017/decorative" val="1"/>
+              </a:ext>
+            </a:extLst>
+          </p:cNvPr>
+          <p:cNvSpPr>
+            <a:spLocks noGrp="1" noRot="1" noChangeAspect="1" noMove="1" noResize="1" noEditPoints="1" noAdjustHandles="1" noChangeArrowheads="1" noChangeShapeType="1" noTextEdit="1"/>
+          </p:cNvSpPr>
+          <p:nvPr>
+            <p:extLst>
+              <p:ext uri="{386F3935-93C4-4BCD-93E2-E3B085C9AB24}">
+                <p16:designElem xmlns:p16="http://schemas.microsoft.com/office/powerpoint/2015/main" val="1"/>
+              </p:ext>
+            </p:extLst>
+          </p:nvPr>
+        </p:nvSpPr>
+        <p:spPr>
+          <a:xfrm>
+            <a:off x="0" y="-2"/>
+            <a:ext cx="8129873" cy="6858002"/>
+          </a:xfrm>
+          <a:prstGeom prst="snip2DiagRect">
+            <a:avLst>
+              <a:gd name="adj1" fmla="val 0"/>
+              <a:gd name="adj2" fmla="val 0"/>
+            </a:avLst>
+          </a:prstGeom>
+          <a:solidFill>
+            <a:schemeClr val="bg1">
+              <a:alpha val="0"/>
+            </a:schemeClr>
+          </a:solidFill>
+          <a:ln>
+            <a:noFill/>
+          </a:ln>
+          <a:effectLst/>
+        </p:spPr>
+        <p:style>
+          <a:lnRef idx="2">
+            <a:schemeClr val="accent1">
+              <a:shade val="50000"/>
+            </a:schemeClr>
+          </a:lnRef>
+          <a:fillRef idx="1">
+            <a:schemeClr val="accent1"/>
+          </a:fillRef>
+          <a:effectRef idx="0">
+            <a:schemeClr val="accent1"/>
+          </a:effectRef>
+          <a:fontRef idx="minor">
+            <a:schemeClr val="lt1"/>
+          </a:fontRef>
+        </p:style>
+        <p:txBody>
+          <a:bodyPr rtlCol="0" anchor="ctr"/>
+          <a:lstStyle/>
+          <a:p>
+            <a:pPr algn="ctr"/>
+            <a:endParaRPr lang="en-US"/>
+          </a:p>
+        </p:txBody>
+      </p:sp>
+      <p:grpSp>
+        <p:nvGrpSpPr>
+          <p:cNvPr id="14" name="Group 13">
+            <a:extLst>
+              <a:ext uri="{FF2B5EF4-FFF2-40B4-BE49-F238E27FC236}">
+                <a16:creationId xmlns:a16="http://schemas.microsoft.com/office/drawing/2014/main" id="{A6515200-42F9-488F-9895-6CDBCD1E87C8}"/>
+              </a:ext>
+              <a:ext uri="{C183D7F6-B498-43B3-948B-1728B52AA6E4}">
+                <adec:decorative xmlns:adec="http://schemas.microsoft.com/office/drawing/2017/decorative" val="1"/>
+              </a:ext>
+            </a:extLst>
+          </p:cNvPr>
+          <p:cNvGrpSpPr>
+            <a:grpSpLocks noGrp="1" noUngrp="1" noRot="1" noChangeAspect="1" noMove="1" noResize="1"/>
+          </p:cNvGrpSpPr>
+          <p:nvPr>
+            <p:extLst>
+              <p:ext uri="{386F3935-93C4-4BCD-93E2-E3B085C9AB24}">
+                <p16:designElem xmlns:p16="http://schemas.microsoft.com/office/powerpoint/2015/main" val="1"/>
+              </p:ext>
+            </p:extLst>
+          </p:nvPr>
+        </p:nvGrpSpPr>
+        <p:grpSpPr>
+          <a:xfrm>
+            <a:off x="9206969" y="2963333"/>
+            <a:ext cx="2981858" cy="3208867"/>
+            <a:chOff x="9206969" y="2963333"/>
+            <a:chExt cx="2981858" cy="3208867"/>
+          </a:xfrm>
+        </p:grpSpPr>
+        <p:cxnSp>
+          <p:nvCxnSpPr>
+            <p:cNvPr id="15" name="Straight Connector 14">
+              <a:extLst>
+                <a:ext uri="{FF2B5EF4-FFF2-40B4-BE49-F238E27FC236}">
+                  <a16:creationId xmlns:a16="http://schemas.microsoft.com/office/drawing/2014/main" id="{43185F0E-78D5-4C2D-9239-D3515B448837}"/>
+                </a:ext>
+                <a:ext uri="{C183D7F6-B498-43B3-948B-1728B52AA6E4}">
+                  <adec:decorative xmlns:adec="http://schemas.microsoft.com/office/drawing/2017/decorative" val="1"/>
+                </a:ext>
+              </a:extLst>
+            </p:cNvPr>
+            <p:cNvCxnSpPr/>
+            <p:nvPr>
+              <p:extLst>
+                <p:ext uri="{386F3935-93C4-4BCD-93E2-E3B085C9AB24}">
+                  <p16:designElem xmlns:p16="http://schemas.microsoft.com/office/powerpoint/2015/main" val="1"/>
+                </p:ext>
+              </p:extLst>
+            </p:nvPr>
+          </p:nvCxnSpPr>
+          <p:spPr>
+            <a:xfrm flipH="1">
+              <a:off x="11276012" y="2963333"/>
+              <a:ext cx="912814" cy="912812"/>
+            </a:xfrm>
+            <a:prstGeom prst="line">
+              <a:avLst/>
+            </a:prstGeom>
+            <a:ln w="9525">
+              <a:solidFill>
+                <a:srgbClr val="FFFFFF"/>
+              </a:solidFill>
+            </a:ln>
+          </p:spPr>
+          <p:style>
+            <a:lnRef idx="2">
+              <a:schemeClr val="accent1"/>
+            </a:lnRef>
+            <a:fillRef idx="0">
+              <a:schemeClr val="accent1"/>
+            </a:fillRef>
+            <a:effectRef idx="1">
+              <a:schemeClr val="accent1"/>
+            </a:effectRef>
+            <a:fontRef idx="minor">
+              <a:schemeClr val="tx1"/>
+            </a:fontRef>
+          </p:style>
+        </p:cxnSp>
+        <p:cxnSp>
+          <p:nvCxnSpPr>
+            <p:cNvPr id="16" name="Straight Connector 15">
+              <a:extLst>
+                <a:ext uri="{FF2B5EF4-FFF2-40B4-BE49-F238E27FC236}">
+                  <a16:creationId xmlns:a16="http://schemas.microsoft.com/office/drawing/2014/main" id="{D5BD9142-FF9C-4EED-A027-18D095481BB8}"/>
+                </a:ext>
+                <a:ext uri="{C183D7F6-B498-43B3-948B-1728B52AA6E4}">
+                  <adec:decorative xmlns:adec="http://schemas.microsoft.com/office/drawing/2017/decorative" val="1"/>
+                </a:ext>
+              </a:extLst>
+            </p:cNvPr>
+            <p:cNvCxnSpPr/>
+            <p:nvPr>
+              <p:extLst>
+                <p:ext uri="{386F3935-93C4-4BCD-93E2-E3B085C9AB24}">
+                  <p16:designElem xmlns:p16="http://schemas.microsoft.com/office/powerpoint/2015/main" val="1"/>
+                </p:ext>
+              </p:extLst>
+            </p:nvPr>
+          </p:nvCxnSpPr>
+          <p:spPr>
+            <a:xfrm flipH="1">
+              <a:off x="9206969" y="3190344"/>
+              <a:ext cx="2981857" cy="2981856"/>
+            </a:xfrm>
+            <a:prstGeom prst="line">
+              <a:avLst/>
+            </a:prstGeom>
+            <a:ln w="9525">
+              <a:solidFill>
+                <a:srgbClr val="FFFFFF"/>
+              </a:solidFill>
+            </a:ln>
+          </p:spPr>
+          <p:style>
+            <a:lnRef idx="2">
+              <a:schemeClr val="accent1"/>
+            </a:lnRef>
+            <a:fillRef idx="0">
+              <a:schemeClr val="accent1"/>
+            </a:fillRef>
+            <a:effectRef idx="1">
+              <a:schemeClr val="accent1"/>
+            </a:effectRef>
+            <a:fontRef idx="minor">
+              <a:schemeClr val="tx1"/>
+            </a:fontRef>
+          </p:style>
+        </p:cxnSp>
+        <p:cxnSp>
+          <p:nvCxnSpPr>
+            <p:cNvPr id="17" name="Straight Connector 16">
+              <a:extLst>
+                <a:ext uri="{FF2B5EF4-FFF2-40B4-BE49-F238E27FC236}">
+                  <a16:creationId xmlns:a16="http://schemas.microsoft.com/office/drawing/2014/main" id="{42F547D3-9752-4481-B3A8-50E08610B8EC}"/>
+                </a:ext>
+                <a:ext uri="{C183D7F6-B498-43B3-948B-1728B52AA6E4}">
+                  <adec:decorative xmlns:adec="http://schemas.microsoft.com/office/drawing/2017/decorative" val="1"/>
+                </a:ext>
+              </a:extLst>
+            </p:cNvPr>
+            <p:cNvCxnSpPr/>
+            <p:nvPr>
+              <p:extLst>
+                <p:ext uri="{386F3935-93C4-4BCD-93E2-E3B085C9AB24}">
+                  <p16:designElem xmlns:p16="http://schemas.microsoft.com/office/powerpoint/2015/main" val="1"/>
+                </p:ext>
+              </p:extLst>
+            </p:nvPr>
+          </p:nvCxnSpPr>
+          <p:spPr>
+            <a:xfrm flipH="1">
+              <a:off x="10292292" y="3285067"/>
+              <a:ext cx="1896534" cy="1896533"/>
+            </a:xfrm>
+            <a:prstGeom prst="line">
+              <a:avLst/>
+            </a:prstGeom>
+            <a:ln w="9525">
+              <a:solidFill>
+                <a:srgbClr val="FFFFFF"/>
+              </a:solidFill>
+            </a:ln>
+          </p:spPr>
+          <p:style>
+            <a:lnRef idx="2">
+              <a:schemeClr val="accent1"/>
+            </a:lnRef>
+            <a:fillRef idx="0">
+              <a:schemeClr val="accent1"/>
+            </a:fillRef>
+            <a:effectRef idx="1">
+              <a:schemeClr val="accent1"/>
+            </a:effectRef>
+            <a:fontRef idx="minor">
+              <a:schemeClr val="tx1"/>
+            </a:fontRef>
+          </p:style>
+        </p:cxnSp>
+        <p:cxnSp>
+          <p:nvCxnSpPr>
+            <p:cNvPr id="18" name="Straight Connector 17">
+              <a:extLst>
+                <a:ext uri="{FF2B5EF4-FFF2-40B4-BE49-F238E27FC236}">
+                  <a16:creationId xmlns:a16="http://schemas.microsoft.com/office/drawing/2014/main" id="{F1999C2F-3D0D-4813-9696-83630A6FEABD}"/>
+                </a:ext>
+                <a:ext uri="{C183D7F6-B498-43B3-948B-1728B52AA6E4}">
+                  <adec:decorative xmlns:adec="http://schemas.microsoft.com/office/drawing/2017/decorative" val="1"/>
+                </a:ext>
+              </a:extLst>
+            </p:cNvPr>
+            <p:cNvCxnSpPr/>
+            <p:nvPr>
+              <p:extLst>
+                <p:ext uri="{386F3935-93C4-4BCD-93E2-E3B085C9AB24}">
+                  <p16:designElem xmlns:p16="http://schemas.microsoft.com/office/powerpoint/2015/main" val="1"/>
+                </p:ext>
+              </p:extLst>
+            </p:nvPr>
+          </p:nvCxnSpPr>
+          <p:spPr>
+            <a:xfrm flipH="1">
+              <a:off x="10443103" y="3131080"/>
+              <a:ext cx="1745722" cy="1745720"/>
+            </a:xfrm>
+            <a:prstGeom prst="line">
+              <a:avLst/>
+            </a:prstGeom>
+            <a:ln w="28575">
+              <a:solidFill>
+                <a:srgbClr val="FFFFFF"/>
+              </a:solidFill>
+            </a:ln>
+          </p:spPr>
+          <p:style>
+            <a:lnRef idx="2">
+              <a:schemeClr val="accent1"/>
+            </a:lnRef>
+            <a:fillRef idx="0">
+              <a:schemeClr val="accent1"/>
+            </a:fillRef>
+            <a:effectRef idx="1">
+              <a:schemeClr val="accent1"/>
+            </a:effectRef>
+            <a:fontRef idx="minor">
+              <a:schemeClr val="tx1"/>
+            </a:fontRef>
+          </p:style>
+        </p:cxnSp>
+        <p:cxnSp>
+          <p:nvCxnSpPr>
+            <p:cNvPr id="19" name="Straight Connector 18">
+              <a:extLst>
+                <a:ext uri="{FF2B5EF4-FFF2-40B4-BE49-F238E27FC236}">
+                  <a16:creationId xmlns:a16="http://schemas.microsoft.com/office/drawing/2014/main" id="{EC737390-C9CA-456B-9F40-D7A76EA242E7}"/>
+                </a:ext>
+                <a:ext uri="{C183D7F6-B498-43B3-948B-1728B52AA6E4}">
+                  <adec:decorative xmlns:adec="http://schemas.microsoft.com/office/drawing/2017/decorative" val="1"/>
+                </a:ext>
+              </a:extLst>
+            </p:cNvPr>
+            <p:cNvCxnSpPr/>
+            <p:nvPr>
+              <p:extLst>
+                <p:ext uri="{386F3935-93C4-4BCD-93E2-E3B085C9AB24}">
+                  <p16:designElem xmlns:p16="http://schemas.microsoft.com/office/powerpoint/2015/main" val="1"/>
+                </p:ext>
+              </p:extLst>
+            </p:nvPr>
+          </p:nvCxnSpPr>
+          <p:spPr>
+            <a:xfrm flipH="1">
+              <a:off x="10918826" y="3683001"/>
+              <a:ext cx="1270001" cy="1269999"/>
+            </a:xfrm>
+            <a:prstGeom prst="line">
+              <a:avLst/>
+            </a:prstGeom>
+            <a:ln w="28575">
+              <a:solidFill>
+                <a:srgbClr val="FFFFFF"/>
+              </a:solidFill>
+            </a:ln>
+          </p:spPr>
+          <p:style>
+            <a:lnRef idx="2">
+              <a:schemeClr val="accent1"/>
+            </a:lnRef>
+            <a:fillRef idx="0">
+              <a:schemeClr val="accent1"/>
+            </a:fillRef>
+            <a:effectRef idx="1">
+              <a:schemeClr val="accent1"/>
+            </a:effectRef>
+            <a:fontRef idx="minor">
+              <a:schemeClr val="tx1"/>
+            </a:fontRef>
+          </p:style>
+        </p:cxnSp>
+      </p:grpSp>
+      <p:sp>
+        <p:nvSpPr>
+          <p:cNvPr id="2" name="Titre 1">
+            <a:extLst>
+              <a:ext uri="{FF2B5EF4-FFF2-40B4-BE49-F238E27FC236}">
+                <a16:creationId xmlns:a16="http://schemas.microsoft.com/office/drawing/2014/main" id="{91F2D697-AEBD-4258-8341-1E8F9EDF1DFB}"/>
+              </a:ext>
+            </a:extLst>
+          </p:cNvPr>
+          <p:cNvSpPr>
+            <a:spLocks noGrp="1"/>
+          </p:cNvSpPr>
+          <p:nvPr>
+            <p:ph type="title"/>
+          </p:nvPr>
+        </p:nvSpPr>
+        <p:spPr>
+          <a:xfrm>
+            <a:off x="8588661" y="941424"/>
+            <a:ext cx="3043896" cy="3248611"/>
+          </a:xfrm>
+        </p:spPr>
+        <p:txBody>
+          <a:bodyPr>
+            <a:normAutofit/>
+          </a:bodyPr>
+          <a:lstStyle/>
+          <a:p>
+            <a:r>
+              <a:rPr lang="fr-FR" sz="3100">
+                <a:solidFill>
+                  <a:srgbClr val="FFFFFF"/>
+                </a:solidFill>
+              </a:rPr>
+              <a:t>Environment</a:t>
+            </a:r>
+            <a:endParaRPr lang="en-GB" sz="3100">
+              <a:solidFill>
+                <a:srgbClr val="FFFFFF"/>
+              </a:solidFill>
+            </a:endParaRPr>
+          </a:p>
+        </p:txBody>
+      </p:sp>
+      <p:graphicFrame>
+        <p:nvGraphicFramePr>
+          <p:cNvPr id="5" name="Espace réservé du contenu 2">
+            <a:extLst>
+              <a:ext uri="{FF2B5EF4-FFF2-40B4-BE49-F238E27FC236}">
+                <a16:creationId xmlns:a16="http://schemas.microsoft.com/office/drawing/2014/main" id="{9C052EF2-23D5-4840-B6B1-5F32104F68AC}"/>
+              </a:ext>
+            </a:extLst>
+          </p:cNvPr>
+          <p:cNvGraphicFramePr>
+            <a:graphicFrameLocks noGrp="1"/>
+          </p:cNvGraphicFramePr>
+          <p:nvPr>
+            <p:ph idx="1"/>
+            <p:extLst>
+              <p:ext uri="{D42A27DB-BD31-4B8C-83A1-F6EECF244321}">
+                <p14:modId xmlns:p14="http://schemas.microsoft.com/office/powerpoint/2010/main" val="3871919060"/>
+              </p:ext>
+            </p:extLst>
+          </p:nvPr>
+        </p:nvGraphicFramePr>
+        <p:xfrm>
+          <a:off x="940645" y="941424"/>
+          <a:ext cx="6190459" cy="4768713"/>
+        </p:xfrm>
+        <a:graphic>
+          <a:graphicData uri="http://schemas.openxmlformats.org/drawingml/2006/diagram">
+            <dgm:relIds xmlns:dgm="http://schemas.openxmlformats.org/drawingml/2006/diagram" xmlns:r="http://schemas.openxmlformats.org/officeDocument/2006/relationships" r:dm="rId2" r:lo="rId3" r:qs="rId4" r:cs="rId5"/>
+          </a:graphicData>
+        </a:graphic>
+      </p:graphicFrame>
+    </p:spTree>
+    <p:extLst>
+      <p:ext uri="{BB962C8B-B14F-4D97-AF65-F5344CB8AC3E}">
+        <p14:creationId xmlns:p14="http://schemas.microsoft.com/office/powerpoint/2010/main" val="602710572"/>
+      </p:ext>
+    </p:extLst>
+  </p:cSld>
+  <p:clrMapOvr>
+    <a:masterClrMapping/>
+  </p:clrMapOvr>
+</p:sld>
+</file>
+
+<file path=ppt/slides/slide3.xml><?xml version="1.0" encoding="utf-8"?>
+<p:sld xmlns:a="http://schemas.openxmlformats.org/drawingml/2006/main" xmlns:r="http://schemas.openxmlformats.org/officeDocument/2006/relationships" xmlns:p="http://schemas.openxmlformats.org/presentationml/2006/main">
+  <p:cSld>
+    <p:spTree>
+      <p:nvGrpSpPr>
+        <p:cNvPr id="1" name=""/>
+        <p:cNvGrpSpPr/>
+        <p:nvPr/>
+      </p:nvGrpSpPr>
+      <p:grpSpPr>
+        <a:xfrm>
+          <a:off x="0" y="0"/>
+          <a:ext cx="0" cy="0"/>
+          <a:chOff x="0" y="0"/>
+          <a:chExt cx="0" cy="0"/>
+        </a:xfrm>
+      </p:grpSpPr>
+      <p:sp>
+        <p:nvSpPr>
+          <p:cNvPr id="2" name="Titre 1">
+            <a:extLst>
+              <a:ext uri="{FF2B5EF4-FFF2-40B4-BE49-F238E27FC236}">
+                <a16:creationId xmlns:a16="http://schemas.microsoft.com/office/drawing/2014/main" id="{04581F43-D57A-4533-9B0C-D102DDD60DE2}"/>
+              </a:ext>
+            </a:extLst>
+          </p:cNvPr>
+          <p:cNvSpPr>
+            <a:spLocks noGrp="1"/>
+          </p:cNvSpPr>
+          <p:nvPr>
+            <p:ph type="title"/>
+          </p:nvPr>
+        </p:nvSpPr>
+        <p:spPr/>
+        <p:txBody>
+          <a:bodyPr/>
+          <a:lstStyle/>
+          <a:p>
+            <a:r>
+              <a:rPr lang="fr-FR" dirty="0"/>
+              <a:t>Weak IA and Strong IA</a:t>
+            </a:r>
+            <a:endParaRPr lang="en-GB" dirty="0"/>
+          </a:p>
+        </p:txBody>
+      </p:sp>
+      <p:sp>
+        <p:nvSpPr>
+          <p:cNvPr id="3" name="Espace réservé du contenu 2">
+            <a:extLst>
+              <a:ext uri="{FF2B5EF4-FFF2-40B4-BE49-F238E27FC236}">
+                <a16:creationId xmlns:a16="http://schemas.microsoft.com/office/drawing/2014/main" id="{99D4B22A-53DB-4023-B6F3-71D686A8F429}"/>
+              </a:ext>
+            </a:extLst>
+          </p:cNvPr>
+          <p:cNvSpPr>
+            <a:spLocks noGrp="1"/>
+          </p:cNvSpPr>
+          <p:nvPr>
+            <p:ph idx="1"/>
+          </p:nvPr>
+        </p:nvSpPr>
+        <p:spPr/>
+        <p:txBody>
+          <a:bodyPr/>
+          <a:lstStyle/>
+          <a:p>
+            <a:r>
+              <a:rPr lang="fr-FR" dirty="0"/>
+              <a:t>Use </a:t>
+            </a:r>
+            <a:r>
+              <a:rPr lang="fr-FR" dirty="0" err="1"/>
+              <a:t>definitions</a:t>
+            </a:r>
+            <a:endParaRPr lang="fr-FR" dirty="0"/>
+          </a:p>
+          <a:p>
+            <a:r>
+              <a:rPr lang="fr-FR" dirty="0"/>
+              <a:t>Use </a:t>
+            </a:r>
+            <a:r>
+              <a:rPr lang="fr-FR"/>
+              <a:t>schemas</a:t>
+            </a:r>
+            <a:endParaRPr lang="en-GB" dirty="0"/>
+          </a:p>
+        </p:txBody>
+      </p:sp>
+    </p:spTree>
+    <p:extLst>
+      <p:ext uri="{BB962C8B-B14F-4D97-AF65-F5344CB8AC3E}">
+        <p14:creationId xmlns:p14="http://schemas.microsoft.com/office/powerpoint/2010/main" val="4060382238"/>
+      </p:ext>
+    </p:extLst>
+  </p:cSld>
+  <p:clrMapOvr>
+    <a:masterClrMapping/>
+  </p:clrMapOvr>
+</p:sld>
+</file>
+
+<file path=ppt/slides/slide4.xml><?xml version="1.0" encoding="utf-8"?>
+<p:sld xmlns:a="http://schemas.openxmlformats.org/drawingml/2006/main" xmlns:r="http://schemas.openxmlformats.org/officeDocument/2006/relationships" xmlns:p="http://schemas.openxmlformats.org/presentationml/2006/main">
+  <p:cSld>
+    <p:spTree>
+      <p:nvGrpSpPr>
+        <p:cNvPr id="1" name=""/>
+        <p:cNvGrpSpPr/>
+        <p:nvPr/>
+      </p:nvGrpSpPr>
+      <p:grpSpPr>
+        <a:xfrm>
+          <a:off x="0" y="0"/>
+          <a:ext cx="0" cy="0"/>
+          <a:chOff x="0" y="0"/>
+          <a:chExt cx="0" cy="0"/>
+        </a:xfrm>
+      </p:grpSpPr>
+      <p:sp>
+        <p:nvSpPr>
+          <p:cNvPr id="2" name="Titre 1">
+            <a:extLst>
+              <a:ext uri="{FF2B5EF4-FFF2-40B4-BE49-F238E27FC236}">
+                <a16:creationId xmlns:a16="http://schemas.microsoft.com/office/drawing/2014/main" id="{DD6D244C-3912-4AA1-942A-E7AA3B670E60}"/>
+              </a:ext>
+            </a:extLst>
+          </p:cNvPr>
+          <p:cNvSpPr>
+            <a:spLocks noGrp="1"/>
+          </p:cNvSpPr>
+          <p:nvPr>
+            <p:ph type="title"/>
+          </p:nvPr>
+        </p:nvSpPr>
+        <p:spPr/>
+        <p:txBody>
+          <a:bodyPr/>
+          <a:lstStyle/>
+          <a:p>
+            <a:r>
+              <a:rPr lang="fr-FR" dirty="0" err="1"/>
+              <a:t>Reinforcement</a:t>
+            </a:r>
+            <a:r>
+              <a:rPr lang="fr-FR" dirty="0"/>
+              <a:t> </a:t>
+            </a:r>
+            <a:r>
+              <a:rPr lang="fr-FR" dirty="0" err="1"/>
+              <a:t>learning</a:t>
+            </a:r>
+            <a:endParaRPr lang="en-GB" dirty="0"/>
+          </a:p>
+        </p:txBody>
+      </p:sp>
+      <p:sp>
+        <p:nvSpPr>
+          <p:cNvPr id="3" name="Espace réservé du contenu 2">
+            <a:extLst>
+              <a:ext uri="{FF2B5EF4-FFF2-40B4-BE49-F238E27FC236}">
+                <a16:creationId xmlns:a16="http://schemas.microsoft.com/office/drawing/2014/main" id="{6CA0B2F4-9F91-47B3-873F-F2B565C0B68D}"/>
+              </a:ext>
+            </a:extLst>
+          </p:cNvPr>
+          <p:cNvSpPr>
+            <a:spLocks noGrp="1"/>
+          </p:cNvSpPr>
+          <p:nvPr>
+            <p:ph idx="1"/>
+          </p:nvPr>
+        </p:nvSpPr>
+        <p:spPr/>
+        <p:txBody>
+          <a:bodyPr/>
+          <a:lstStyle/>
+          <a:p>
+            <a:r>
+              <a:rPr lang="fr-FR" dirty="0" err="1"/>
+              <a:t>Explain</a:t>
+            </a:r>
+            <a:r>
+              <a:rPr lang="fr-FR" dirty="0"/>
+              <a:t> the basics</a:t>
+            </a:r>
+          </a:p>
+          <a:p>
+            <a:r>
+              <a:rPr lang="fr-FR" dirty="0"/>
+              <a:t>Show a </a:t>
+            </a:r>
+            <a:r>
+              <a:rPr lang="fr-FR" dirty="0" err="1"/>
+              <a:t>schema</a:t>
+            </a:r>
+            <a:r>
+              <a:rPr lang="fr-FR" dirty="0"/>
+              <a:t> to </a:t>
+            </a:r>
+            <a:r>
+              <a:rPr lang="fr-FR" dirty="0" err="1"/>
+              <a:t>understand</a:t>
+            </a:r>
+            <a:endParaRPr lang="en-GB" dirty="0"/>
+          </a:p>
+        </p:txBody>
+      </p:sp>
+    </p:spTree>
+    <p:extLst>
+      <p:ext uri="{BB962C8B-B14F-4D97-AF65-F5344CB8AC3E}">
+        <p14:creationId xmlns:p14="http://schemas.microsoft.com/office/powerpoint/2010/main" val="2298708696"/>
+      </p:ext>
+    </p:extLst>
+  </p:cSld>
+  <p:clrMapOvr>
+    <a:masterClrMapping/>
+  </p:clrMapOvr>
+</p:sld>
+</file>
+
+<file path=ppt/slides/slide5.xml><?xml version="1.0" encoding="utf-8"?>
+<p:sld xmlns:a="http://schemas.openxmlformats.org/drawingml/2006/main" xmlns:r="http://schemas.openxmlformats.org/officeDocument/2006/relationships" xmlns:p="http://schemas.openxmlformats.org/presentationml/2006/main">
+  <p:cSld>
+    <p:spTree>
+      <p:nvGrpSpPr>
+        <p:cNvPr id="1" name=""/>
+        <p:cNvGrpSpPr/>
+        <p:nvPr/>
+      </p:nvGrpSpPr>
+      <p:grpSpPr>
+        <a:xfrm>
+          <a:off x="0" y="0"/>
+          <a:ext cx="0" cy="0"/>
+          <a:chOff x="0" y="0"/>
+          <a:chExt cx="0" cy="0"/>
+        </a:xfrm>
+      </p:grpSpPr>
+      <p:sp>
+        <p:nvSpPr>
+          <p:cNvPr id="2" name="Titre 1">
+            <a:extLst>
+              <a:ext uri="{FF2B5EF4-FFF2-40B4-BE49-F238E27FC236}">
+                <a16:creationId xmlns:a16="http://schemas.microsoft.com/office/drawing/2014/main" id="{5ABBF70E-6DDD-4923-8F2A-1949EBDAC838}"/>
+              </a:ext>
+            </a:extLst>
+          </p:cNvPr>
+          <p:cNvSpPr>
+            <a:spLocks noGrp="1"/>
+          </p:cNvSpPr>
+          <p:nvPr>
+            <p:ph type="title"/>
+          </p:nvPr>
+        </p:nvSpPr>
+        <p:spPr/>
+        <p:txBody>
+          <a:bodyPr/>
+          <a:lstStyle/>
+          <a:p>
+            <a:r>
+              <a:rPr lang="fr-FR" dirty="0" err="1"/>
+              <a:t>DYNAMIc</a:t>
+            </a:r>
+            <a:r>
+              <a:rPr lang="fr-FR" dirty="0"/>
+              <a:t> LEARNING</a:t>
+            </a:r>
+            <a:endParaRPr lang="en-GB" dirty="0"/>
+          </a:p>
+        </p:txBody>
+      </p:sp>
+      <p:sp>
+        <p:nvSpPr>
+          <p:cNvPr id="3" name="Espace réservé du contenu 2">
+            <a:extLst>
+              <a:ext uri="{FF2B5EF4-FFF2-40B4-BE49-F238E27FC236}">
+                <a16:creationId xmlns:a16="http://schemas.microsoft.com/office/drawing/2014/main" id="{1718BDDC-E5BD-4AB6-B798-204544EE6BFC}"/>
+              </a:ext>
+            </a:extLst>
+          </p:cNvPr>
+          <p:cNvSpPr>
+            <a:spLocks noGrp="1"/>
+          </p:cNvSpPr>
+          <p:nvPr>
+            <p:ph idx="1"/>
+          </p:nvPr>
+        </p:nvSpPr>
+        <p:spPr/>
+        <p:txBody>
+          <a:bodyPr/>
+          <a:lstStyle/>
+          <a:p>
+            <a:r>
+              <a:rPr lang="fr-FR" dirty="0" err="1"/>
+              <a:t>Explain</a:t>
+            </a:r>
+            <a:r>
+              <a:rPr lang="fr-FR" dirty="0"/>
+              <a:t> the </a:t>
+            </a:r>
+            <a:r>
+              <a:rPr lang="fr-FR" dirty="0" err="1"/>
+              <a:t>research</a:t>
+            </a:r>
+            <a:r>
+              <a:rPr lang="fr-FR" dirty="0"/>
+              <a:t> </a:t>
+            </a:r>
+            <a:r>
+              <a:rPr lang="fr-FR" dirty="0" err="1"/>
+              <a:t>with</a:t>
+            </a:r>
+            <a:r>
+              <a:rPr lang="fr-FR" dirty="0"/>
+              <a:t> </a:t>
+            </a:r>
+            <a:r>
+              <a:rPr lang="fr-FR"/>
+              <a:t>a citation</a:t>
+            </a:r>
+            <a:endParaRPr lang="fr-FR" dirty="0"/>
+          </a:p>
+          <a:p>
+            <a:r>
+              <a:rPr lang="fr-FR" dirty="0"/>
+              <a:t>Show a </a:t>
+            </a:r>
+            <a:r>
+              <a:rPr lang="fr-FR" dirty="0" err="1"/>
+              <a:t>schema</a:t>
+            </a:r>
+            <a:r>
+              <a:rPr lang="fr-FR" dirty="0"/>
+              <a:t> to </a:t>
+            </a:r>
+            <a:r>
+              <a:rPr lang="fr-FR" dirty="0" err="1"/>
+              <a:t>understand</a:t>
+            </a:r>
+            <a:endParaRPr lang="en-GB" dirty="0"/>
+          </a:p>
+          <a:p>
+            <a:endParaRPr lang="en-GB" dirty="0"/>
+          </a:p>
+        </p:txBody>
+      </p:sp>
+    </p:spTree>
+    <p:extLst>
+      <p:ext uri="{BB962C8B-B14F-4D97-AF65-F5344CB8AC3E}">
+        <p14:creationId xmlns:p14="http://schemas.microsoft.com/office/powerpoint/2010/main" val="2768971090"/>
+      </p:ext>
+    </p:extLst>
+  </p:cSld>
+  <p:clrMapOvr>
+    <a:masterClrMapping/>
+  </p:clrMapOvr>
+</p:sld>
+</file>
+
+<file path=ppt/slides/slide6.xml><?xml version="1.0" encoding="utf-8"?>
+<p:sld xmlns:a="http://schemas.openxmlformats.org/drawingml/2006/main" xmlns:r="http://schemas.openxmlformats.org/officeDocument/2006/relationships" xmlns:p="http://schemas.openxmlformats.org/presentationml/2006/main">
+  <p:cSld>
+    <p:bg>
+      <p:bgPr>
+        <a:gradFill rotWithShape="1">
+          <a:gsLst>
+            <a:gs pos="10000">
+              <a:schemeClr val="bg2">
+                <a:tint val="97000"/>
+                <a:hueMod val="92000"/>
+                <a:satMod val="169000"/>
+                <a:lumMod val="164000"/>
+              </a:schemeClr>
+            </a:gs>
+            <a:gs pos="100000">
+              <a:schemeClr val="bg2">
+                <a:shade val="96000"/>
+                <a:satMod val="120000"/>
+                <a:lumMod val="90000"/>
+              </a:schemeClr>
+            </a:gs>
+          </a:gsLst>
+          <a:lin ang="6120000" scaled="1"/>
+        </a:gradFill>
+        <a:effectLst/>
+      </p:bgPr>
+    </p:bg>
+    <p:spTree>
+      <p:nvGrpSpPr>
+        <p:cNvPr id="1" name=""/>
+        <p:cNvGrpSpPr/>
+        <p:nvPr/>
+      </p:nvGrpSpPr>
+      <p:grpSpPr>
+        <a:xfrm>
+          <a:off x="0" y="0"/>
+          <a:ext cx="0" cy="0"/>
+          <a:chOff x="0" y="0"/>
+          <a:chExt cx="0" cy="0"/>
+        </a:xfrm>
+      </p:grpSpPr>
+      <p:sp useBgFill="1">
+        <p:nvSpPr>
+          <p:cNvPr id="15" name="Rectangle 14">
+            <a:extLst>
+              <a:ext uri="{FF2B5EF4-FFF2-40B4-BE49-F238E27FC236}">
+                <a16:creationId xmlns:a16="http://schemas.microsoft.com/office/drawing/2014/main" id="{7509B08A-C1EC-478C-86AF-60ADE06D9BBB}"/>
+              </a:ext>
+              <a:ext uri="{C183D7F6-B498-43B3-948B-1728B52AA6E4}">
+                <adec:decorative xmlns:adec="http://schemas.microsoft.com/office/drawing/2017/decorative" val="1"/>
+              </a:ext>
+            </a:extLst>
+          </p:cNvPr>
+          <p:cNvSpPr>
+            <a:spLocks noGrp="1" noRot="1" noChangeAspect="1" noMove="1" noResize="1" noEditPoints="1" noAdjustHandles="1" noChangeArrowheads="1" noChangeShapeType="1" noTextEdit="1"/>
+          </p:cNvSpPr>
+          <p:nvPr>
+            <p:extLst>
+              <p:ext uri="{386F3935-93C4-4BCD-93E2-E3B085C9AB24}">
+                <p16:designElem xmlns:p16="http://schemas.microsoft.com/office/powerpoint/2015/main" val="1"/>
+              </p:ext>
+            </p:extLst>
+          </p:nvPr>
+        </p:nvSpPr>
+        <p:spPr>
+          <a:xfrm>
+            <a:off x="0" y="0"/>
+            <a:ext cx="12192000" cy="6858000"/>
+          </a:xfrm>
+          <a:prstGeom prst="rect">
+            <a:avLst/>
+          </a:prstGeom>
+          <a:ln>
+            <a:noFill/>
+          </a:ln>
+        </p:spPr>
+        <p:style>
+          <a:lnRef idx="2">
+            <a:schemeClr val="accent1">
+              <a:shade val="50000"/>
+            </a:schemeClr>
+          </a:lnRef>
+          <a:fillRef idx="1">
+            <a:schemeClr val="accent1"/>
+          </a:fillRef>
+          <a:effectRef idx="0">
+            <a:schemeClr val="accent1"/>
+          </a:effectRef>
+          <a:fontRef idx="minor">
+            <a:schemeClr val="lt1"/>
+          </a:fontRef>
+        </p:style>
+        <p:txBody>
+          <a:bodyPr rtlCol="0" anchor="ctr"/>
+          <a:lstStyle/>
+          <a:p>
+            <a:pPr algn="ctr"/>
+            <a:endParaRPr lang="en-US"/>
+          </a:p>
+        </p:txBody>
+      </p:sp>
+      <p:sp>
+        <p:nvSpPr>
+          <p:cNvPr id="2" name="Titre 1">
+            <a:extLst>
+              <a:ext uri="{FF2B5EF4-FFF2-40B4-BE49-F238E27FC236}">
+                <a16:creationId xmlns:a16="http://schemas.microsoft.com/office/drawing/2014/main" id="{77851132-74B7-4D74-B115-071128FEC992}"/>
+              </a:ext>
+            </a:extLst>
+          </p:cNvPr>
+          <p:cNvSpPr>
+            <a:spLocks noGrp="1"/>
+          </p:cNvSpPr>
+          <p:nvPr>
+            <p:ph type="title"/>
+          </p:nvPr>
+        </p:nvSpPr>
+        <p:spPr>
+          <a:xfrm>
+            <a:off x="640290" y="685800"/>
+            <a:ext cx="4818656" cy="4603749"/>
+          </a:xfrm>
+        </p:spPr>
+        <p:txBody>
+          <a:bodyPr>
+            <a:normAutofit/>
+          </a:bodyPr>
+          <a:lstStyle/>
+          <a:p>
+            <a:pPr algn="r"/>
+            <a:r>
+              <a:rPr lang="fr-FR" sz="5200"/>
+              <a:t>issues</a:t>
+            </a:r>
+            <a:endParaRPr lang="en-GB" sz="5200"/>
+          </a:p>
+        </p:txBody>
+      </p:sp>
+      <p:sp>
+        <p:nvSpPr>
+          <p:cNvPr id="17" name="Rectangle 16">
+            <a:extLst>
+              <a:ext uri="{FF2B5EF4-FFF2-40B4-BE49-F238E27FC236}">
+                <a16:creationId xmlns:a16="http://schemas.microsoft.com/office/drawing/2014/main" id="{221CC330-4259-4C32-BF8B-5FE13FFABB3A}"/>
+              </a:ext>
+              <a:ext uri="{C183D7F6-B498-43B3-948B-1728B52AA6E4}">
+                <adec:decorative xmlns:adec="http://schemas.microsoft.com/office/drawing/2017/decorative" val="1"/>
+              </a:ext>
+            </a:extLst>
+          </p:cNvPr>
+          <p:cNvSpPr>
+            <a:spLocks noGrp="1" noRot="1" noChangeAspect="1" noMove="1" noResize="1" noEditPoints="1" noAdjustHandles="1" noChangeArrowheads="1" noChangeShapeType="1" noTextEdit="1"/>
+          </p:cNvSpPr>
+          <p:nvPr>
+            <p:extLst>
+              <p:ext uri="{386F3935-93C4-4BCD-93E2-E3B085C9AB24}">
+                <p16:designElem xmlns:p16="http://schemas.microsoft.com/office/powerpoint/2015/main" val="1"/>
+              </p:ext>
+            </p:extLst>
+          </p:nvPr>
+        </p:nvSpPr>
+        <p:spPr>
+          <a:xfrm>
+            <a:off x="6095999" y="0"/>
+            <a:ext cx="6096001" cy="6858000"/>
+          </a:xfrm>
+          <a:prstGeom prst="rect">
+            <a:avLst/>
+          </a:prstGeom>
+          <a:solidFill>
+            <a:schemeClr val="bg2">
+              <a:alpha val="97000"/>
+            </a:schemeClr>
+          </a:solidFill>
+          <a:ln>
+            <a:noFill/>
+          </a:ln>
+          <a:effectLst/>
+        </p:spPr>
+        <p:style>
+          <a:lnRef idx="2">
+            <a:schemeClr val="accent1">
+              <a:shade val="50000"/>
+            </a:schemeClr>
+          </a:lnRef>
+          <a:fillRef idx="1001">
+            <a:schemeClr val="dk2"/>
+          </a:fillRef>
+          <a:effectRef idx="0">
+            <a:schemeClr val="accent1"/>
+          </a:effectRef>
+          <a:fontRef idx="minor">
+            <a:schemeClr val="lt1"/>
+          </a:fontRef>
+        </p:style>
+        <p:txBody>
+          <a:bodyPr rtlCol="0" anchor="ctr"/>
+          <a:lstStyle/>
+          <a:p>
+            <a:pPr algn="ctr"/>
+            <a:endParaRPr lang="en-US"/>
+          </a:p>
+        </p:txBody>
+      </p:sp>
+      <p:sp>
+        <p:nvSpPr>
+          <p:cNvPr id="3" name="Espace réservé du contenu 2">
+            <a:extLst>
+              <a:ext uri="{FF2B5EF4-FFF2-40B4-BE49-F238E27FC236}">
+                <a16:creationId xmlns:a16="http://schemas.microsoft.com/office/drawing/2014/main" id="{A8089F6D-E260-4620-8DCB-5ABC107EF384}"/>
+              </a:ext>
+            </a:extLst>
+          </p:cNvPr>
+          <p:cNvSpPr>
+            <a:spLocks noGrp="1"/>
+          </p:cNvSpPr>
+          <p:nvPr>
+            <p:ph idx="1"/>
+          </p:nvPr>
+        </p:nvSpPr>
+        <p:spPr>
+          <a:xfrm>
+            <a:off x="6625651" y="685800"/>
+            <a:ext cx="4878959" cy="4603750"/>
+          </a:xfrm>
+        </p:spPr>
+        <p:txBody>
+          <a:bodyPr>
+            <a:normAutofit/>
+          </a:bodyPr>
+          <a:lstStyle/>
+          <a:p>
+            <a:r>
+              <a:rPr lang="fr-FR">
+                <a:solidFill>
+                  <a:schemeClr val="tx1"/>
+                </a:solidFill>
+              </a:rPr>
+              <a:t>Hard to deploy</a:t>
+            </a:r>
+          </a:p>
+          <a:p>
+            <a:r>
+              <a:rPr lang="fr-FR">
+                <a:solidFill>
+                  <a:schemeClr val="tx1"/>
+                </a:solidFill>
+              </a:rPr>
+              <a:t>Simulate the brain behavior during sleep (sort/compress/delete data)</a:t>
+            </a:r>
+          </a:p>
+          <a:p>
+            <a:r>
+              <a:rPr lang="fr-FR">
+                <a:solidFill>
+                  <a:schemeClr val="tx1"/>
+                </a:solidFill>
+              </a:rPr>
+              <a:t>Add a reward (seems like RL, pheromon)</a:t>
+            </a:r>
+          </a:p>
+          <a:p>
+            <a:r>
+              <a:rPr lang="fr-FR">
+                <a:solidFill>
+                  <a:schemeClr val="tx1"/>
+                </a:solidFill>
+              </a:rPr>
+              <a:t>Launch the SAI each day, it will give a report of what it learned</a:t>
+            </a:r>
+          </a:p>
+          <a:p>
+            <a:r>
+              <a:rPr lang="fr-FR">
+                <a:solidFill>
+                  <a:schemeClr val="tx1"/>
+                </a:solidFill>
+              </a:rPr>
+              <a:t>Sort what SAI learned</a:t>
+            </a:r>
+            <a:endParaRPr lang="en-GB">
+              <a:solidFill>
+                <a:schemeClr val="tx1"/>
+              </a:solidFill>
+            </a:endParaRPr>
+          </a:p>
+        </p:txBody>
+      </p:sp>
+    </p:spTree>
+    <p:extLst>
+      <p:ext uri="{BB962C8B-B14F-4D97-AF65-F5344CB8AC3E}">
+        <p14:creationId xmlns:p14="http://schemas.microsoft.com/office/powerpoint/2010/main" val="1559484787"/>
+      </p:ext>
+    </p:extLst>
+  </p:cSld>
+  <p:clrMapOvr>
+    <a:masterClrMapping/>
+  </p:clrMapOvr>
+</p:sld>
+</file>
+
+<file path=ppt/slides/slide7.xml><?xml version="1.0" encoding="utf-8"?>
+<p:sld xmlns:a="http://schemas.openxmlformats.org/drawingml/2006/main" xmlns:r="http://schemas.openxmlformats.org/officeDocument/2006/relationships" xmlns:p="http://schemas.openxmlformats.org/presentationml/2006/main">
+  <p:cSld>
+    <p:bg>
+      <p:bgPr>
+        <a:gradFill rotWithShape="1">
+          <a:gsLst>
+            <a:gs pos="10000">
+              <a:schemeClr val="bg2">
+                <a:tint val="97000"/>
+                <a:hueMod val="92000"/>
+                <a:satMod val="169000"/>
+                <a:lumMod val="164000"/>
+              </a:schemeClr>
+            </a:gs>
+            <a:gs pos="100000">
+              <a:schemeClr val="bg2">
+                <a:shade val="96000"/>
+                <a:satMod val="120000"/>
+                <a:lumMod val="90000"/>
+              </a:schemeClr>
+            </a:gs>
+          </a:gsLst>
+          <a:lin ang="6120000" scaled="1"/>
+        </a:gradFill>
+        <a:effectLst/>
+      </p:bgPr>
+    </p:bg>
+    <p:spTree>
+      <p:nvGrpSpPr>
+        <p:cNvPr id="1" name=""/>
+        <p:cNvGrpSpPr/>
+        <p:nvPr/>
+      </p:nvGrpSpPr>
+      <p:grpSpPr>
+        <a:xfrm>
+          <a:off x="0" y="0"/>
+          <a:ext cx="0" cy="0"/>
+          <a:chOff x="0" y="0"/>
+          <a:chExt cx="0" cy="0"/>
+        </a:xfrm>
+      </p:grpSpPr>
+      <p:sp useBgFill="1">
+        <p:nvSpPr>
+          <p:cNvPr id="23" name="Rectangle 7">
+            <a:extLst>
+              <a:ext uri="{FF2B5EF4-FFF2-40B4-BE49-F238E27FC236}">
+                <a16:creationId xmlns:a16="http://schemas.microsoft.com/office/drawing/2014/main" id="{7509B08A-C1EC-478C-86AF-60ADE06D9BBB}"/>
+              </a:ext>
+              <a:ext uri="{C183D7F6-B498-43B3-948B-1728B52AA6E4}">
+                <adec:decorative xmlns:adec="http://schemas.microsoft.com/office/drawing/2017/decorative" val="1"/>
+              </a:ext>
+            </a:extLst>
+          </p:cNvPr>
+          <p:cNvSpPr>
+            <a:spLocks noGrp="1" noRot="1" noChangeAspect="1" noMove="1" noResize="1" noEditPoints="1" noAdjustHandles="1" noChangeArrowheads="1" noChangeShapeType="1" noTextEdit="1"/>
+          </p:cNvSpPr>
+          <p:nvPr>
+            <p:extLst>
+              <p:ext uri="{386F3935-93C4-4BCD-93E2-E3B085C9AB24}">
+                <p16:designElem xmlns:p16="http://schemas.microsoft.com/office/powerpoint/2015/main" val="1"/>
+              </p:ext>
+            </p:extLst>
+          </p:nvPr>
+        </p:nvSpPr>
+        <p:spPr>
+          <a:xfrm>
+            <a:off x="0" y="0"/>
+            <a:ext cx="12192000" cy="6858000"/>
+          </a:xfrm>
+          <a:prstGeom prst="rect">
+            <a:avLst/>
+          </a:prstGeom>
+          <a:ln>
+            <a:noFill/>
+          </a:ln>
+        </p:spPr>
+        <p:style>
+          <a:lnRef idx="2">
+            <a:schemeClr val="accent1">
+              <a:shade val="50000"/>
+            </a:schemeClr>
+          </a:lnRef>
+          <a:fillRef idx="1">
+            <a:schemeClr val="accent1"/>
+          </a:fillRef>
+          <a:effectRef idx="0">
+            <a:schemeClr val="accent1"/>
+          </a:effectRef>
+          <a:fontRef idx="minor">
+            <a:schemeClr val="lt1"/>
+          </a:fontRef>
+        </p:style>
+        <p:txBody>
+          <a:bodyPr rtlCol="0" anchor="ctr"/>
+          <a:lstStyle/>
+          <a:p>
+            <a:pPr algn="ctr"/>
+            <a:endParaRPr lang="en-US"/>
+          </a:p>
+        </p:txBody>
+      </p:sp>
+      <p:sp>
+        <p:nvSpPr>
+          <p:cNvPr id="2" name="Titre 1">
+            <a:extLst>
+              <a:ext uri="{FF2B5EF4-FFF2-40B4-BE49-F238E27FC236}">
+                <a16:creationId xmlns:a16="http://schemas.microsoft.com/office/drawing/2014/main" id="{E286FAAA-D668-42B4-9647-5ECEBD96BC52}"/>
+              </a:ext>
+            </a:extLst>
+          </p:cNvPr>
+          <p:cNvSpPr>
+            <a:spLocks noGrp="1"/>
+          </p:cNvSpPr>
+          <p:nvPr>
+            <p:ph type="title"/>
+          </p:nvPr>
+        </p:nvSpPr>
+        <p:spPr>
+          <a:xfrm>
+            <a:off x="640290" y="685800"/>
+            <a:ext cx="4818656" cy="4603749"/>
+          </a:xfrm>
+        </p:spPr>
+        <p:txBody>
+          <a:bodyPr>
+            <a:normAutofit/>
+          </a:bodyPr>
+          <a:lstStyle/>
+          <a:p>
+            <a:pPr algn="r"/>
+            <a:r>
+              <a:rPr lang="fr-FR" sz="5200"/>
+              <a:t>Solutions</a:t>
+            </a:r>
+            <a:endParaRPr lang="en-GB" sz="5200"/>
+          </a:p>
+        </p:txBody>
+      </p:sp>
+      <p:sp>
+        <p:nvSpPr>
+          <p:cNvPr id="10" name="Rectangle 9">
+            <a:extLst>
+              <a:ext uri="{FF2B5EF4-FFF2-40B4-BE49-F238E27FC236}">
+                <a16:creationId xmlns:a16="http://schemas.microsoft.com/office/drawing/2014/main" id="{221CC330-4259-4C32-BF8B-5FE13FFABB3A}"/>
+              </a:ext>
+              <a:ext uri="{C183D7F6-B498-43B3-948B-1728B52AA6E4}">
+                <adec:decorative xmlns:adec="http://schemas.microsoft.com/office/drawing/2017/decorative" val="1"/>
+              </a:ext>
+            </a:extLst>
+          </p:cNvPr>
+          <p:cNvSpPr>
+            <a:spLocks noGrp="1" noRot="1" noChangeAspect="1" noMove="1" noResize="1" noEditPoints="1" noAdjustHandles="1" noChangeArrowheads="1" noChangeShapeType="1" noTextEdit="1"/>
+          </p:cNvSpPr>
+          <p:nvPr>
+            <p:extLst>
+              <p:ext uri="{386F3935-93C4-4BCD-93E2-E3B085C9AB24}">
+                <p16:designElem xmlns:p16="http://schemas.microsoft.com/office/powerpoint/2015/main" val="1"/>
+              </p:ext>
+            </p:extLst>
+          </p:nvPr>
+        </p:nvSpPr>
+        <p:spPr>
+          <a:xfrm>
+            <a:off x="6095999" y="0"/>
+            <a:ext cx="6096001" cy="6858000"/>
+          </a:xfrm>
+          <a:prstGeom prst="rect">
+            <a:avLst/>
+          </a:prstGeom>
+          <a:solidFill>
+            <a:schemeClr val="bg2">
+              <a:alpha val="97000"/>
+            </a:schemeClr>
+          </a:solidFill>
+          <a:ln>
+            <a:noFill/>
+          </a:ln>
+          <a:effectLst/>
+        </p:spPr>
+        <p:style>
+          <a:lnRef idx="2">
+            <a:schemeClr val="accent1">
+              <a:shade val="50000"/>
+            </a:schemeClr>
+          </a:lnRef>
+          <a:fillRef idx="1001">
+            <a:schemeClr val="dk2"/>
+          </a:fillRef>
+          <a:effectRef idx="0">
+            <a:schemeClr val="accent1"/>
+          </a:effectRef>
+          <a:fontRef idx="minor">
+            <a:schemeClr val="lt1"/>
+          </a:fontRef>
+        </p:style>
+        <p:txBody>
+          <a:bodyPr rtlCol="0" anchor="ctr"/>
+          <a:lstStyle/>
+          <a:p>
+            <a:pPr algn="ctr"/>
+            <a:endParaRPr lang="en-US"/>
+          </a:p>
+        </p:txBody>
+      </p:sp>
+      <p:sp>
+        <p:nvSpPr>
+          <p:cNvPr id="3" name="Espace réservé du contenu 2">
+            <a:extLst>
+              <a:ext uri="{FF2B5EF4-FFF2-40B4-BE49-F238E27FC236}">
+                <a16:creationId xmlns:a16="http://schemas.microsoft.com/office/drawing/2014/main" id="{128178D9-55E1-4BEF-84B2-EF38491DA27C}"/>
+              </a:ext>
+            </a:extLst>
+          </p:cNvPr>
+          <p:cNvSpPr>
+            <a:spLocks noGrp="1"/>
+          </p:cNvSpPr>
+          <p:nvPr>
+            <p:ph idx="1"/>
+          </p:nvPr>
+        </p:nvSpPr>
+        <p:spPr>
+          <a:xfrm>
+            <a:off x="6625651" y="685800"/>
+            <a:ext cx="4878959" cy="4603750"/>
+          </a:xfrm>
+        </p:spPr>
+        <p:txBody>
+          <a:bodyPr>
+            <a:normAutofit/>
+          </a:bodyPr>
+          <a:lstStyle/>
+          <a:p>
+            <a:r>
+              <a:rPr lang="fr-FR">
+                <a:solidFill>
+                  <a:schemeClr val="tx1"/>
+                </a:solidFill>
+              </a:rPr>
+              <a:t>Create SAI with pyinstaller for multiplatform</a:t>
+            </a:r>
+          </a:p>
+          <a:p>
+            <a:r>
+              <a:rPr lang="fr-FR">
+                <a:solidFill>
+                  <a:schemeClr val="tx1"/>
+                </a:solidFill>
+              </a:rPr>
+              <a:t>Launch a scan that remove duplicate screenshot and order them by interesting strategie</a:t>
+            </a:r>
+          </a:p>
+          <a:p>
+            <a:r>
+              <a:rPr lang="fr-FR">
+                <a:solidFill>
+                  <a:schemeClr val="tx1"/>
+                </a:solidFill>
+              </a:rPr>
+              <a:t>Increment the reward if there was difference between images</a:t>
+            </a:r>
+          </a:p>
+          <a:p>
+            <a:r>
+              <a:rPr lang="fr-FR">
+                <a:solidFill>
+                  <a:schemeClr val="tx1"/>
+                </a:solidFill>
+              </a:rPr>
+              <a:t>Create a web page with the strategies learned</a:t>
+            </a:r>
+          </a:p>
+          <a:p>
+            <a:r>
+              <a:rPr lang="fr-FR">
+                <a:solidFill>
+                  <a:schemeClr val="tx1"/>
+                </a:solidFill>
+              </a:rPr>
+              <a:t>Create a web interface or a vocal controller to order strategies</a:t>
+            </a:r>
+          </a:p>
+        </p:txBody>
+      </p:sp>
+    </p:spTree>
+    <p:extLst>
+      <p:ext uri="{BB962C8B-B14F-4D97-AF65-F5344CB8AC3E}">
+        <p14:creationId xmlns:p14="http://schemas.microsoft.com/office/powerpoint/2010/main" val="701313445"/>
+      </p:ext>
+    </p:extLst>
+  </p:cSld>
+  <p:clrMapOvr>
+    <a:masterClrMapping/>
+  </p:clrMapOvr>
+</p:sld>
+</file>
+
+<file path=ppt/slides/slide8.xml><?xml version="1.0" encoding="utf-8"?>
+<p:sld xmlns:a="http://schemas.openxmlformats.org/drawingml/2006/main" xmlns:r="http://schemas.openxmlformats.org/officeDocument/2006/relationships" xmlns:p="http://schemas.openxmlformats.org/presentationml/2006/main">
+  <p:cSld>
+    <p:spTree>
+      <p:nvGrpSpPr>
+        <p:cNvPr id="1" name=""/>
+        <p:cNvGrpSpPr/>
+        <p:nvPr/>
+      </p:nvGrpSpPr>
+      <p:grpSpPr>
+        <a:xfrm>
+          <a:off x="0" y="0"/>
+          <a:ext cx="0" cy="0"/>
+          <a:chOff x="0" y="0"/>
+          <a:chExt cx="0" cy="0"/>
+        </a:xfrm>
+      </p:grpSpPr>
+      <p:sp>
+        <p:nvSpPr>
+          <p:cNvPr id="2" name="Titre 1">
+            <a:extLst>
+              <a:ext uri="{FF2B5EF4-FFF2-40B4-BE49-F238E27FC236}">
+                <a16:creationId xmlns:a16="http://schemas.microsoft.com/office/drawing/2014/main" id="{643ACCC2-1572-47D7-9E8E-170E100F9348}"/>
+              </a:ext>
+            </a:extLst>
+          </p:cNvPr>
+          <p:cNvSpPr>
+            <a:spLocks noGrp="1"/>
+          </p:cNvSpPr>
+          <p:nvPr>
+            <p:ph type="title"/>
+          </p:nvPr>
+        </p:nvSpPr>
+        <p:spPr/>
+        <p:txBody>
+          <a:bodyPr/>
+          <a:lstStyle/>
+          <a:p>
+            <a:r>
+              <a:rPr lang="fr-FR" dirty="0" err="1"/>
+              <a:t>Result</a:t>
+            </a:r>
+            <a:endParaRPr lang="en-GB" dirty="0"/>
+          </a:p>
+        </p:txBody>
+      </p:sp>
+      <p:sp>
+        <p:nvSpPr>
+          <p:cNvPr id="3" name="Espace réservé du contenu 2">
+            <a:extLst>
+              <a:ext uri="{FF2B5EF4-FFF2-40B4-BE49-F238E27FC236}">
+                <a16:creationId xmlns:a16="http://schemas.microsoft.com/office/drawing/2014/main" id="{7528B972-5B40-4B83-A687-4553853739D3}"/>
+              </a:ext>
+            </a:extLst>
+          </p:cNvPr>
+          <p:cNvSpPr>
+            <a:spLocks noGrp="1"/>
+          </p:cNvSpPr>
+          <p:nvPr>
+            <p:ph idx="1"/>
+          </p:nvPr>
+        </p:nvSpPr>
+        <p:spPr/>
+        <p:txBody>
+          <a:bodyPr/>
+          <a:lstStyle/>
+          <a:p>
+            <a:r>
+              <a:rPr lang="fr-FR"/>
+              <a:t>Show a graph with the strategies learn with a little picture</a:t>
+            </a:r>
+          </a:p>
+          <a:p>
+            <a:r>
+              <a:rPr lang="fr-FR"/>
+              <a:t>Show the web interface to choose strategies</a:t>
+            </a:r>
+            <a:endParaRPr lang="en-GB"/>
+          </a:p>
+        </p:txBody>
+      </p:sp>
+    </p:spTree>
+    <p:extLst>
+      <p:ext uri="{BB962C8B-B14F-4D97-AF65-F5344CB8AC3E}">
+        <p14:creationId xmlns:p14="http://schemas.microsoft.com/office/powerpoint/2010/main" val="770528979"/>
+      </p:ext>
+    </p:extLst>
+  </p:cSld>
+  <p:clrMapOvr>
+    <a:masterClrMapping/>
+  </p:clrMapOvr>
+</p:sld>
+</file>
+
+<file path=ppt/slides/slide9.xml><?xml version="1.0" encoding="utf-8"?>
+<p:sld xmlns:a="http://schemas.openxmlformats.org/drawingml/2006/main" xmlns:r="http://schemas.openxmlformats.org/officeDocument/2006/relationships" xmlns:p="http://schemas.openxmlformats.org/presentationml/2006/main">
+  <p:cSld>
+    <p:bg>
+      <p:bgPr>
+        <a:gradFill rotWithShape="1">
+          <a:gsLst>
+            <a:gs pos="10000">
+              <a:schemeClr val="bg2">
+                <a:tint val="97000"/>
+                <a:hueMod val="92000"/>
+                <a:satMod val="169000"/>
+                <a:lumMod val="164000"/>
+              </a:schemeClr>
+            </a:gs>
+            <a:gs pos="100000">
+              <a:schemeClr val="bg2">
+                <a:shade val="96000"/>
+                <a:satMod val="120000"/>
+                <a:lumMod val="90000"/>
+              </a:schemeClr>
+            </a:gs>
+          </a:gsLst>
+          <a:lin ang="6120000" scaled="1"/>
+        </a:gradFill>
+        <a:effectLst/>
+      </p:bgPr>
+    </p:bg>
+    <p:spTree>
+      <p:nvGrpSpPr>
+        <p:cNvPr id="1" name=""/>
+        <p:cNvGrpSpPr/>
+        <p:nvPr/>
+      </p:nvGrpSpPr>
+      <p:grpSpPr>
+        <a:xfrm>
+          <a:off x="0" y="0"/>
+          <a:ext cx="0" cy="0"/>
+          <a:chOff x="0" y="0"/>
+          <a:chExt cx="0" cy="0"/>
+        </a:xfrm>
+      </p:grpSpPr>
+      <p:sp>
+        <p:nvSpPr>
+          <p:cNvPr id="2" name="Titre 1">
+            <a:extLst>
+              <a:ext uri="{FF2B5EF4-FFF2-40B4-BE49-F238E27FC236}">
+                <a16:creationId xmlns:a16="http://schemas.microsoft.com/office/drawing/2014/main" id="{3CDB8273-45A0-4A0F-905C-063E41E279EE}"/>
+              </a:ext>
+            </a:extLst>
+          </p:cNvPr>
+          <p:cNvSpPr>
+            <a:spLocks noGrp="1"/>
+          </p:cNvSpPr>
+          <p:nvPr>
+            <p:ph type="title"/>
+          </p:nvPr>
+        </p:nvSpPr>
+        <p:spPr>
+          <a:xfrm>
+            <a:off x="684212" y="4487332"/>
+            <a:ext cx="8534400" cy="1507067"/>
+          </a:xfrm>
+        </p:spPr>
+        <p:txBody>
+          <a:bodyPr>
+            <a:normAutofit/>
+          </a:bodyPr>
+          <a:lstStyle/>
+          <a:p>
+            <a:r>
+              <a:rPr lang="fr-FR"/>
+              <a:t>Conclusion</a:t>
+            </a:r>
+            <a:endParaRPr lang="en-GB" dirty="0"/>
+          </a:p>
+        </p:txBody>
+      </p:sp>
+      <p:graphicFrame>
+        <p:nvGraphicFramePr>
+          <p:cNvPr id="5" name="Espace réservé du contenu 2">
+            <a:extLst>
+              <a:ext uri="{FF2B5EF4-FFF2-40B4-BE49-F238E27FC236}">
+                <a16:creationId xmlns:a16="http://schemas.microsoft.com/office/drawing/2014/main" id="{9A2F4FC4-8E3A-4880-8CC3-29FF61F63AB1}"/>
+              </a:ext>
+            </a:extLst>
+          </p:cNvPr>
+          <p:cNvGraphicFramePr>
+            <a:graphicFrameLocks noGrp="1"/>
+          </p:cNvGraphicFramePr>
+          <p:nvPr>
+            <p:ph idx="1"/>
+            <p:extLst>
+              <p:ext uri="{D42A27DB-BD31-4B8C-83A1-F6EECF244321}">
+                <p14:modId xmlns:p14="http://schemas.microsoft.com/office/powerpoint/2010/main" val="208525868"/>
+              </p:ext>
+            </p:extLst>
+          </p:nvPr>
+        </p:nvGraphicFramePr>
+        <p:xfrm>
+          <a:off x="684212" y="685800"/>
+          <a:ext cx="10820399" cy="3614738"/>
+        </p:xfrm>
+        <a:graphic>
+          <a:graphicData uri="http://schemas.openxmlformats.org/drawingml/2006/diagram">
+            <dgm:relIds xmlns:dgm="http://schemas.openxmlformats.org/drawingml/2006/diagram" xmlns:r="http://schemas.openxmlformats.org/officeDocument/2006/relationships" r:dm="rId2" r:lo="rId3" r:qs="rId4" r:cs="rId5"/>
+          </a:graphicData>
+        </a:graphic>
+      </p:graphicFrame>
+    </p:spTree>
+    <p:extLst>
+      <p:ext uri="{BB962C8B-B14F-4D97-AF65-F5344CB8AC3E}">
+        <p14:creationId xmlns:p14="http://schemas.microsoft.com/office/powerpoint/2010/main" val="2526747130"/>
+      </p:ext>
+    </p:extLst>
+  </p:cSld>
+  <p:clrMapOvr>
+    <a:masterClrMapping/>
+  </p:clrMapOvr>
+</p:sld>
+</file>
+
 <file path=ppt/theme/theme1.xml><?xml version="1.0" encoding="utf-8"?>
 <a:theme xmlns:a="http://schemas.openxmlformats.org/drawingml/2006/main" name="Secteur">
   <a:themeElements>

</xml_diff>

<commit_message>
#12 Definitions of AI added on slides
</commit_message>
<xml_diff>
--- a/SAI_presentation.pptx
+++ b/SAI_presentation.pptx
@@ -6740,7 +6740,7 @@
             <a:fld id="{B61BEF0D-F0BB-DE4B-95CE-6DB70DBA9567}" type="datetimeFigureOut">
               <a:rPr lang="en-US" dirty="0"/>
               <a:pPr/>
-              <a:t>3/1/2020</a:t>
+              <a:t>3/2/2020</a:t>
             </a:fld>
             <a:endParaRPr lang="en-US" dirty="0"/>
           </a:p>
@@ -7173,7 +7173,7 @@
             <a:fld id="{B61BEF0D-F0BB-DE4B-95CE-6DB70DBA9567}" type="datetimeFigureOut">
               <a:rPr lang="en-US" dirty="0"/>
               <a:pPr/>
-              <a:t>3/1/2020</a:t>
+              <a:t>3/2/2020</a:t>
             </a:fld>
             <a:endParaRPr lang="en-US" dirty="0"/>
           </a:p>
@@ -7420,7 +7420,7 @@
             <a:fld id="{B61BEF0D-F0BB-DE4B-95CE-6DB70DBA9567}" type="datetimeFigureOut">
               <a:rPr lang="en-US" dirty="0"/>
               <a:pPr/>
-              <a:t>3/1/2020</a:t>
+              <a:t>3/2/2020</a:t>
             </a:fld>
             <a:endParaRPr lang="en-US" dirty="0"/>
           </a:p>
@@ -7725,7 +7725,7 @@
             <a:fld id="{B61BEF0D-F0BB-DE4B-95CE-6DB70DBA9567}" type="datetimeFigureOut">
               <a:rPr lang="en-US" dirty="0"/>
               <a:pPr/>
-              <a:t>3/1/2020</a:t>
+              <a:t>3/2/2020</a:t>
             </a:fld>
             <a:endParaRPr lang="en-US" dirty="0"/>
           </a:p>
@@ -8040,7 +8040,7 @@
             <a:fld id="{B61BEF0D-F0BB-DE4B-95CE-6DB70DBA9567}" type="datetimeFigureOut">
               <a:rPr lang="en-US" dirty="0"/>
               <a:pPr/>
-              <a:t>3/1/2020</a:t>
+              <a:t>3/2/2020</a:t>
             </a:fld>
             <a:endParaRPr lang="en-US" dirty="0"/>
           </a:p>
@@ -8339,7 +8339,7 @@
             <a:fld id="{B61BEF0D-F0BB-DE4B-95CE-6DB70DBA9567}" type="datetimeFigureOut">
               <a:rPr lang="en-US" dirty="0"/>
               <a:pPr/>
-              <a:t>3/1/2020</a:t>
+              <a:t>3/2/2020</a:t>
             </a:fld>
             <a:endParaRPr lang="en-US" dirty="0"/>
           </a:p>
@@ -8703,7 +8703,7 @@
             <a:fld id="{B61BEF0D-F0BB-DE4B-95CE-6DB70DBA9567}" type="datetimeFigureOut">
               <a:rPr lang="en-US" dirty="0"/>
               <a:pPr/>
-              <a:t>3/1/2020</a:t>
+              <a:t>3/2/2020</a:t>
             </a:fld>
             <a:endParaRPr lang="en-US" dirty="0"/>
           </a:p>
@@ -8874,7 +8874,7 @@
             <a:fld id="{B61BEF0D-F0BB-DE4B-95CE-6DB70DBA9567}" type="datetimeFigureOut">
               <a:rPr lang="en-US" dirty="0"/>
               <a:pPr/>
-              <a:t>3/1/2020</a:t>
+              <a:t>3/2/2020</a:t>
             </a:fld>
             <a:endParaRPr lang="en-US" dirty="0"/>
           </a:p>
@@ -9051,7 +9051,7 @@
             <a:fld id="{B61BEF0D-F0BB-DE4B-95CE-6DB70DBA9567}" type="datetimeFigureOut">
               <a:rPr lang="en-US" dirty="0"/>
               <a:pPr/>
-              <a:t>3/1/2020</a:t>
+              <a:t>3/2/2020</a:t>
             </a:fld>
             <a:endParaRPr lang="en-US" dirty="0"/>
           </a:p>
@@ -9218,7 +9218,7 @@
             <a:fld id="{B61BEF0D-F0BB-DE4B-95CE-6DB70DBA9567}" type="datetimeFigureOut">
               <a:rPr lang="en-US" dirty="0"/>
               <a:pPr/>
-              <a:t>3/1/2020</a:t>
+              <a:t>3/2/2020</a:t>
             </a:fld>
             <a:endParaRPr lang="en-US" dirty="0"/>
           </a:p>
@@ -9465,7 +9465,7 @@
             <a:fld id="{B61BEF0D-F0BB-DE4B-95CE-6DB70DBA9567}" type="datetimeFigureOut">
               <a:rPr lang="en-US" dirty="0"/>
               <a:pPr/>
-              <a:t>3/1/2020</a:t>
+              <a:t>3/2/2020</a:t>
             </a:fld>
             <a:endParaRPr lang="en-US" dirty="0"/>
           </a:p>
@@ -9698,7 +9698,7 @@
             <a:fld id="{B61BEF0D-F0BB-DE4B-95CE-6DB70DBA9567}" type="datetimeFigureOut">
               <a:rPr lang="en-US" dirty="0"/>
               <a:pPr/>
-              <a:t>3/1/2020</a:t>
+              <a:t>3/2/2020</a:t>
             </a:fld>
             <a:endParaRPr lang="en-US" dirty="0"/>
           </a:p>
@@ -10077,7 +10077,7 @@
             <a:fld id="{B61BEF0D-F0BB-DE4B-95CE-6DB70DBA9567}" type="datetimeFigureOut">
               <a:rPr lang="en-US" dirty="0"/>
               <a:pPr/>
-              <a:t>3/1/2020</a:t>
+              <a:t>3/2/2020</a:t>
             </a:fld>
             <a:endParaRPr lang="en-US" dirty="0"/>
           </a:p>
@@ -10192,7 +10192,7 @@
             <a:fld id="{B61BEF0D-F0BB-DE4B-95CE-6DB70DBA9567}" type="datetimeFigureOut">
               <a:rPr lang="en-US" dirty="0"/>
               <a:pPr/>
-              <a:t>3/1/2020</a:t>
+              <a:t>3/2/2020</a:t>
             </a:fld>
             <a:endParaRPr lang="en-US" dirty="0"/>
           </a:p>
@@ -10284,7 +10284,7 @@
             <a:fld id="{B61BEF0D-F0BB-DE4B-95CE-6DB70DBA9567}" type="datetimeFigureOut">
               <a:rPr lang="en-US" dirty="0"/>
               <a:pPr/>
-              <a:t>3/1/2020</a:t>
+              <a:t>3/2/2020</a:t>
             </a:fld>
             <a:endParaRPr lang="en-US" dirty="0"/>
           </a:p>
@@ -10536,7 +10536,7 @@
             <a:fld id="{B61BEF0D-F0BB-DE4B-95CE-6DB70DBA9567}" type="datetimeFigureOut">
               <a:rPr lang="en-US" dirty="0"/>
               <a:pPr/>
-              <a:t>3/1/2020</a:t>
+              <a:t>3/2/2020</a:t>
             </a:fld>
             <a:endParaRPr lang="en-US" dirty="0"/>
           </a:p>
@@ -10816,7 +10816,7 @@
             <a:fld id="{B61BEF0D-F0BB-DE4B-95CE-6DB70DBA9567}" type="datetimeFigureOut">
               <a:rPr lang="en-US" dirty="0"/>
               <a:pPr/>
-              <a:t>3/1/2020</a:t>
+              <a:t>3/2/2020</a:t>
             </a:fld>
             <a:endParaRPr lang="en-US" dirty="0"/>
           </a:p>
@@ -11219,7 +11219,7 @@
             <a:fld id="{B61BEF0D-F0BB-DE4B-95CE-6DB70DBA9567}" type="datetimeFigureOut">
               <a:rPr lang="en-US" dirty="0"/>
               <a:pPr/>
-              <a:t>3/1/2020</a:t>
+              <a:t>3/2/2020</a:t>
             </a:fld>
             <a:endParaRPr lang="en-US" dirty="0"/>
           </a:p>
@@ -14221,8 +14221,34 @@
         </p:nvSpPr>
         <p:spPr/>
         <p:txBody>
-          <a:bodyPr/>
+          <a:bodyPr>
+            <a:normAutofit lnSpcReduction="10000"/>
+          </a:bodyPr>
           <a:lstStyle/>
+          <a:p>
+            <a:r>
+              <a:rPr lang="en-GB" dirty="0"/>
+              <a:t>“Weak artificial intelligence (weak AI), is artificial intelligence that implements a limited part of mind, or as narrow AI, is focused on one narrow task. In John Searle's terms it “would be useful for testing hypothesis about minds, but would not actually be minds” “ from Wikipedia</a:t>
+            </a:r>
+          </a:p>
+          <a:p>
+            <a:r>
+              <a:rPr lang="en-GB" dirty="0"/>
+              <a:t> ”Strong artificial intelligence (strong AI) is the speculative intelligence of a machine that has the capacity to understand or learn any intellectual task that a human being </a:t>
+            </a:r>
+            <a:r>
+              <a:rPr lang="en-GB"/>
+              <a:t>can” from </a:t>
+            </a:r>
+            <a:r>
+              <a:rPr lang="en-GB" dirty="0" err="1"/>
+              <a:t>wikipedia</a:t>
+            </a:r>
+            <a:endParaRPr lang="en-GB" dirty="0"/>
+          </a:p>
+          <a:p>
+            <a:endParaRPr lang="en-GB" dirty="0"/>
+          </a:p>
           <a:p>
             <a:r>
               <a:rPr lang="fr-FR" dirty="0"/>
@@ -14230,17 +14256,6 @@
             </a:r>
             <a:r>
               <a:rPr lang="fr-FR" dirty="0" err="1"/>
-              <a:t>definitions</a:t>
-            </a:r>
-            <a:endParaRPr lang="fr-FR" dirty="0"/>
-          </a:p>
-          <a:p>
-            <a:r>
-              <a:rPr lang="fr-FR" dirty="0"/>
-              <a:t>Use </a:t>
-            </a:r>
-            <a:r>
-              <a:rPr lang="fr-FR"/>
               <a:t>schemas</a:t>
             </a:r>
             <a:endParaRPr lang="en-GB" dirty="0"/>

</xml_diff>

<commit_message>
#12 New structure of method explanation added on slides
</commit_message>
<xml_diff>
--- a/SAI_presentation.pptx
+++ b/SAI_presentation.pptx
@@ -14351,13 +14351,63 @@
           <a:lstStyle/>
           <a:p>
             <a:r>
+              <a:rPr lang="fr-FR" dirty="0"/>
+              <a:t>Policy:  </a:t>
+            </a:r>
+          </a:p>
+          <a:p>
+            <a:r>
+              <a:rPr lang="fr-FR" dirty="0"/>
+              <a:t>State value-fonction:</a:t>
+            </a:r>
+          </a:p>
+          <a:p>
+            <a:r>
               <a:rPr lang="fr-FR" dirty="0" err="1"/>
-              <a:t>Explain</a:t>
+              <a:t>Explains</a:t>
             </a:r>
             <a:r>
               <a:rPr lang="fr-FR" dirty="0"/>
-              <a:t> the basics</a:t>
-            </a:r>
+              <a:t> </a:t>
+            </a:r>
+            <a:r>
+              <a:rPr lang="fr-FR" dirty="0" err="1"/>
+              <a:t>that</a:t>
+            </a:r>
+            <a:r>
+              <a:rPr lang="fr-FR" dirty="0"/>
+              <a:t> </a:t>
+            </a:r>
+            <a:r>
+              <a:rPr lang="fr-FR" dirty="0" err="1"/>
+              <a:t>approach</a:t>
+            </a:r>
+            <a:r>
+              <a:rPr lang="fr-FR" dirty="0"/>
+              <a:t> </a:t>
+            </a:r>
+            <a:r>
+              <a:rPr lang="fr-FR" dirty="0" err="1"/>
+              <a:t>with</a:t>
+            </a:r>
+            <a:r>
+              <a:rPr lang="fr-FR" dirty="0"/>
+              <a:t> Q-</a:t>
+            </a:r>
+            <a:r>
+              <a:rPr lang="fr-FR"/>
+              <a:t>learning</a:t>
+            </a:r>
+            <a:endParaRPr lang="fr-FR" dirty="0"/>
+          </a:p>
+          <a:p>
+            <a:endParaRPr lang="fr-FR" dirty="0"/>
+          </a:p>
+          <a:p>
+            <a:pPr marL="0" indent="0">
+              <a:buNone/>
+            </a:pPr>
+            <a:endParaRPr lang="fr-FR" dirty="0"/>
           </a:p>
           <a:p>
             <a:r>
@@ -14375,6 +14425,29 @@
             <a:r>
               <a:rPr lang="fr-FR" dirty="0" err="1"/>
               <a:t>understand</a:t>
+            </a:r>
+            <a:endParaRPr lang="fr-FR" dirty="0"/>
+          </a:p>
+          <a:p>
+            <a:r>
+              <a:rPr lang="fr-FR" dirty="0" err="1"/>
+              <a:t>Explains</a:t>
+            </a:r>
+            <a:r>
+              <a:rPr lang="fr-FR" dirty="0"/>
+              <a:t> </a:t>
+            </a:r>
+            <a:r>
+              <a:rPr lang="fr-FR" dirty="0" err="1"/>
+              <a:t>with</a:t>
+            </a:r>
+            <a:r>
+              <a:rPr lang="fr-FR" dirty="0"/>
+              <a:t> simple </a:t>
+            </a:r>
+            <a:r>
+              <a:rPr lang="fr-FR" dirty="0" err="1"/>
+              <a:t>words</a:t>
             </a:r>
             <a:endParaRPr lang="en-GB" dirty="0"/>
           </a:p>

</xml_diff>

<commit_message>
#12 Paper on dynamic learning explanation added on slides
</commit_message>
<xml_diff>
--- a/SAI_presentation.pptx
+++ b/SAI_presentation.pptx
@@ -14549,22 +14549,46 @@
               <a:rPr lang="fr-FR" dirty="0" err="1"/>
               <a:t>research</a:t>
             </a:r>
-            <a:r>
-              <a:rPr lang="fr-FR" dirty="0"/>
-              <a:t> </a:t>
-            </a:r>
-            <a:r>
-              <a:rPr lang="fr-FR" dirty="0" err="1"/>
-              <a:t>with</a:t>
-            </a:r>
-            <a:r>
-              <a:rPr lang="fr-FR" dirty="0"/>
-              <a:t> </a:t>
-            </a:r>
-            <a:r>
-              <a:rPr lang="fr-FR"/>
-              <a:t>a citation</a:t>
-            </a:r>
+            <a:endParaRPr lang="fr-FR" dirty="0"/>
+          </a:p>
+          <a:p>
+            <a:r>
+              <a:rPr lang="en-GB" dirty="0"/>
+              <a:t>B. </a:t>
+            </a:r>
+            <a:r>
+              <a:rPr lang="en-GB" dirty="0" err="1"/>
+              <a:t>Lubars</a:t>
+            </a:r>
+            <a:r>
+              <a:rPr lang="en-GB" dirty="0"/>
+              <a:t>, </a:t>
+            </a:r>
+            <a:r>
+              <a:rPr lang="en-GB" dirty="0" err="1"/>
+              <a:t>Chenhao</a:t>
+            </a:r>
+            <a:r>
+              <a:rPr lang="en-GB" dirty="0"/>
+              <a:t> Tan, 2019, “Ask what AI can do, but what  AI should do: towards a framework of task </a:t>
+            </a:r>
+            <a:r>
+              <a:rPr lang="en-GB" dirty="0" err="1"/>
+              <a:t>delegability</a:t>
+            </a:r>
+            <a:r>
+              <a:rPr lang="en-GB" dirty="0"/>
+              <a:t>”, </a:t>
+            </a:r>
+            <a:r>
+              <a:rPr lang="en-GB" u="sng" dirty="0">
+                <a:hlinkClick r:id="rId2"/>
+              </a:rPr>
+              <a:t>https://arxiv.org/pdf/1902.03245v1.pdf</a:t>
+            </a:r>
+            <a:endParaRPr lang="en-GB" dirty="0"/>
+          </a:p>
+          <a:p>
             <a:endParaRPr lang="fr-FR" dirty="0"/>
           </a:p>
           <a:p>

</xml_diff>

<commit_message>
#12 Weak AI schema added on slides
</commit_message>
<xml_diff>
--- a/SAI_presentation.pptx
+++ b/SAI_presentation.pptx
@@ -6740,7 +6740,7 @@
             <a:fld id="{B61BEF0D-F0BB-DE4B-95CE-6DB70DBA9567}" type="datetimeFigureOut">
               <a:rPr lang="en-US" dirty="0"/>
               <a:pPr/>
-              <a:t>3/2/2020</a:t>
+              <a:t>3/3/2020</a:t>
             </a:fld>
             <a:endParaRPr lang="en-US" dirty="0"/>
           </a:p>
@@ -7173,7 +7173,7 @@
             <a:fld id="{B61BEF0D-F0BB-DE4B-95CE-6DB70DBA9567}" type="datetimeFigureOut">
               <a:rPr lang="en-US" dirty="0"/>
               <a:pPr/>
-              <a:t>3/2/2020</a:t>
+              <a:t>3/3/2020</a:t>
             </a:fld>
             <a:endParaRPr lang="en-US" dirty="0"/>
           </a:p>
@@ -7420,7 +7420,7 @@
             <a:fld id="{B61BEF0D-F0BB-DE4B-95CE-6DB70DBA9567}" type="datetimeFigureOut">
               <a:rPr lang="en-US" dirty="0"/>
               <a:pPr/>
-              <a:t>3/2/2020</a:t>
+              <a:t>3/3/2020</a:t>
             </a:fld>
             <a:endParaRPr lang="en-US" dirty="0"/>
           </a:p>
@@ -7725,7 +7725,7 @@
             <a:fld id="{B61BEF0D-F0BB-DE4B-95CE-6DB70DBA9567}" type="datetimeFigureOut">
               <a:rPr lang="en-US" dirty="0"/>
               <a:pPr/>
-              <a:t>3/2/2020</a:t>
+              <a:t>3/3/2020</a:t>
             </a:fld>
             <a:endParaRPr lang="en-US" dirty="0"/>
           </a:p>
@@ -8040,7 +8040,7 @@
             <a:fld id="{B61BEF0D-F0BB-DE4B-95CE-6DB70DBA9567}" type="datetimeFigureOut">
               <a:rPr lang="en-US" dirty="0"/>
               <a:pPr/>
-              <a:t>3/2/2020</a:t>
+              <a:t>3/3/2020</a:t>
             </a:fld>
             <a:endParaRPr lang="en-US" dirty="0"/>
           </a:p>
@@ -8339,7 +8339,7 @@
             <a:fld id="{B61BEF0D-F0BB-DE4B-95CE-6DB70DBA9567}" type="datetimeFigureOut">
               <a:rPr lang="en-US" dirty="0"/>
               <a:pPr/>
-              <a:t>3/2/2020</a:t>
+              <a:t>3/3/2020</a:t>
             </a:fld>
             <a:endParaRPr lang="en-US" dirty="0"/>
           </a:p>
@@ -8703,7 +8703,7 @@
             <a:fld id="{B61BEF0D-F0BB-DE4B-95CE-6DB70DBA9567}" type="datetimeFigureOut">
               <a:rPr lang="en-US" dirty="0"/>
               <a:pPr/>
-              <a:t>3/2/2020</a:t>
+              <a:t>3/3/2020</a:t>
             </a:fld>
             <a:endParaRPr lang="en-US" dirty="0"/>
           </a:p>
@@ -8874,7 +8874,7 @@
             <a:fld id="{B61BEF0D-F0BB-DE4B-95CE-6DB70DBA9567}" type="datetimeFigureOut">
               <a:rPr lang="en-US" dirty="0"/>
               <a:pPr/>
-              <a:t>3/2/2020</a:t>
+              <a:t>3/3/2020</a:t>
             </a:fld>
             <a:endParaRPr lang="en-US" dirty="0"/>
           </a:p>
@@ -9051,7 +9051,7 @@
             <a:fld id="{B61BEF0D-F0BB-DE4B-95CE-6DB70DBA9567}" type="datetimeFigureOut">
               <a:rPr lang="en-US" dirty="0"/>
               <a:pPr/>
-              <a:t>3/2/2020</a:t>
+              <a:t>3/3/2020</a:t>
             </a:fld>
             <a:endParaRPr lang="en-US" dirty="0"/>
           </a:p>
@@ -9218,7 +9218,7 @@
             <a:fld id="{B61BEF0D-F0BB-DE4B-95CE-6DB70DBA9567}" type="datetimeFigureOut">
               <a:rPr lang="en-US" dirty="0"/>
               <a:pPr/>
-              <a:t>3/2/2020</a:t>
+              <a:t>3/3/2020</a:t>
             </a:fld>
             <a:endParaRPr lang="en-US" dirty="0"/>
           </a:p>
@@ -9465,7 +9465,7 @@
             <a:fld id="{B61BEF0D-F0BB-DE4B-95CE-6DB70DBA9567}" type="datetimeFigureOut">
               <a:rPr lang="en-US" dirty="0"/>
               <a:pPr/>
-              <a:t>3/2/2020</a:t>
+              <a:t>3/3/2020</a:t>
             </a:fld>
             <a:endParaRPr lang="en-US" dirty="0"/>
           </a:p>
@@ -9698,7 +9698,7 @@
             <a:fld id="{B61BEF0D-F0BB-DE4B-95CE-6DB70DBA9567}" type="datetimeFigureOut">
               <a:rPr lang="en-US" dirty="0"/>
               <a:pPr/>
-              <a:t>3/2/2020</a:t>
+              <a:t>3/3/2020</a:t>
             </a:fld>
             <a:endParaRPr lang="en-US" dirty="0"/>
           </a:p>
@@ -10077,7 +10077,7 @@
             <a:fld id="{B61BEF0D-F0BB-DE4B-95CE-6DB70DBA9567}" type="datetimeFigureOut">
               <a:rPr lang="en-US" dirty="0"/>
               <a:pPr/>
-              <a:t>3/2/2020</a:t>
+              <a:t>3/3/2020</a:t>
             </a:fld>
             <a:endParaRPr lang="en-US" dirty="0"/>
           </a:p>
@@ -10192,7 +10192,7 @@
             <a:fld id="{B61BEF0D-F0BB-DE4B-95CE-6DB70DBA9567}" type="datetimeFigureOut">
               <a:rPr lang="en-US" dirty="0"/>
               <a:pPr/>
-              <a:t>3/2/2020</a:t>
+              <a:t>3/3/2020</a:t>
             </a:fld>
             <a:endParaRPr lang="en-US" dirty="0"/>
           </a:p>
@@ -10284,7 +10284,7 @@
             <a:fld id="{B61BEF0D-F0BB-DE4B-95CE-6DB70DBA9567}" type="datetimeFigureOut">
               <a:rPr lang="en-US" dirty="0"/>
               <a:pPr/>
-              <a:t>3/2/2020</a:t>
+              <a:t>3/3/2020</a:t>
             </a:fld>
             <a:endParaRPr lang="en-US" dirty="0"/>
           </a:p>
@@ -10536,7 +10536,7 @@
             <a:fld id="{B61BEF0D-F0BB-DE4B-95CE-6DB70DBA9567}" type="datetimeFigureOut">
               <a:rPr lang="en-US" dirty="0"/>
               <a:pPr/>
-              <a:t>3/2/2020</a:t>
+              <a:t>3/3/2020</a:t>
             </a:fld>
             <a:endParaRPr lang="en-US" dirty="0"/>
           </a:p>
@@ -10816,7 +10816,7 @@
             <a:fld id="{B61BEF0D-F0BB-DE4B-95CE-6DB70DBA9567}" type="datetimeFigureOut">
               <a:rPr lang="en-US" dirty="0"/>
               <a:pPr/>
-              <a:t>3/2/2020</a:t>
+              <a:t>3/3/2020</a:t>
             </a:fld>
             <a:endParaRPr lang="en-US" dirty="0"/>
           </a:p>
@@ -11219,7 +11219,7 @@
             <a:fld id="{B61BEF0D-F0BB-DE4B-95CE-6DB70DBA9567}" type="datetimeFigureOut">
               <a:rPr lang="en-US" dirty="0"/>
               <a:pPr/>
-              <a:t>3/2/2020</a:t>
+              <a:t>3/3/2020</a:t>
             </a:fld>
             <a:endParaRPr lang="en-US" dirty="0"/>
           </a:p>
@@ -14176,6 +14176,93 @@
       </p:grpSpPr>
       <p:sp>
         <p:nvSpPr>
+          <p:cNvPr id="9" name="Rectangle : coins arrondis 8">
+            <a:extLst>
+              <a:ext uri="{FF2B5EF4-FFF2-40B4-BE49-F238E27FC236}">
+                <a16:creationId xmlns:a16="http://schemas.microsoft.com/office/drawing/2014/main" id="{F1CFE77F-98E2-4A55-A3D6-33FBEF813D9F}"/>
+              </a:ext>
+            </a:extLst>
+          </p:cNvPr>
+          <p:cNvSpPr/>
+          <p:nvPr/>
+        </p:nvSpPr>
+        <p:spPr>
+          <a:xfrm>
+            <a:off x="62143" y="2574524"/>
+            <a:ext cx="4810579" cy="2974020"/>
+          </a:xfrm>
+          <a:prstGeom prst="roundRect">
+            <a:avLst/>
+          </a:prstGeom>
+          <a:solidFill>
+            <a:schemeClr val="accent1">
+              <a:lumMod val="60000"/>
+              <a:lumOff val="40000"/>
+            </a:schemeClr>
+          </a:solidFill>
+          <a:ln>
+            <a:solidFill>
+              <a:schemeClr val="accent1">
+                <a:lumMod val="60000"/>
+                <a:lumOff val="40000"/>
+              </a:schemeClr>
+            </a:solidFill>
+          </a:ln>
+        </p:spPr>
+        <p:style>
+          <a:lnRef idx="2">
+            <a:schemeClr val="accent1">
+              <a:shade val="50000"/>
+            </a:schemeClr>
+          </a:lnRef>
+          <a:fillRef idx="1">
+            <a:schemeClr val="accent1"/>
+          </a:fillRef>
+          <a:effectRef idx="0">
+            <a:schemeClr val="accent1"/>
+          </a:effectRef>
+          <a:fontRef idx="minor">
+            <a:schemeClr val="lt1"/>
+          </a:fontRef>
+        </p:style>
+        <p:txBody>
+          <a:bodyPr rtlCol="0" anchor="ctr"/>
+          <a:lstStyle/>
+          <a:p>
+            <a:endParaRPr lang="fr-FR" dirty="0"/>
+          </a:p>
+          <a:p>
+            <a:endParaRPr lang="fr-FR" dirty="0"/>
+          </a:p>
+          <a:p>
+            <a:endParaRPr lang="fr-FR" dirty="0"/>
+          </a:p>
+          <a:p>
+            <a:endParaRPr lang="fr-FR" dirty="0"/>
+          </a:p>
+          <a:p>
+            <a:endParaRPr lang="fr-FR" dirty="0"/>
+          </a:p>
+          <a:p>
+            <a:endParaRPr lang="fr-FR" dirty="0"/>
+          </a:p>
+          <a:p>
+            <a:endParaRPr lang="fr-FR" dirty="0"/>
+          </a:p>
+          <a:p>
+            <a:endParaRPr lang="fr-FR" dirty="0"/>
+          </a:p>
+          <a:p>
+            <a:r>
+              <a:rPr lang="fr-FR" dirty="0"/>
+              <a:t>Weak AI</a:t>
+            </a:r>
+            <a:endParaRPr lang="en-GB" dirty="0"/>
+          </a:p>
+        </p:txBody>
+      </p:sp>
+      <p:sp>
+        <p:nvSpPr>
           <p:cNvPr id="2" name="Titre 1">
             <a:extLst>
               <a:ext uri="{FF2B5EF4-FFF2-40B4-BE49-F238E27FC236}">
@@ -14190,7 +14277,12 @@
             <p:ph type="title"/>
           </p:nvPr>
         </p:nvSpPr>
-        <p:spPr/>
+        <p:spPr>
+          <a:xfrm>
+            <a:off x="684212" y="5241935"/>
+            <a:ext cx="8534400" cy="1507067"/>
+          </a:xfrm>
+        </p:spPr>
         <p:txBody>
           <a:bodyPr/>
           <a:lstStyle/>
@@ -14219,7 +14311,12 @@
             <p:ph idx="1"/>
           </p:nvPr>
         </p:nvSpPr>
-        <p:spPr/>
+        <p:spPr>
+          <a:xfrm>
+            <a:off x="684212" y="685800"/>
+            <a:ext cx="10989924" cy="2288219"/>
+          </a:xfrm>
+        </p:spPr>
         <p:txBody>
           <a:bodyPr>
             <a:normAutofit lnSpcReduction="10000"/>
@@ -14234,11 +14331,7 @@
           <a:p>
             <a:r>
               <a:rPr lang="en-GB" dirty="0"/>
-              <a:t> ”Strong artificial intelligence (strong AI) is the speculative intelligence of a machine that has the capacity to understand or learn any intellectual task that a human being </a:t>
-            </a:r>
-            <a:r>
-              <a:rPr lang="en-GB"/>
-              <a:t>can” from </a:t>
+              <a:t> ”Strong artificial intelligence (strong AI) is the speculative intelligence of a machine that has the capacity to understand or learn any intellectual task that a human being can” from </a:t>
             </a:r>
             <a:r>
               <a:rPr lang="en-GB" dirty="0" err="1"/>
@@ -14250,13 +14343,265 @@
             <a:endParaRPr lang="en-GB" dirty="0"/>
           </a:p>
           <a:p>
+            <a:endParaRPr lang="en-GB" dirty="0"/>
+          </a:p>
+        </p:txBody>
+      </p:sp>
+      <p:sp>
+        <p:nvSpPr>
+          <p:cNvPr id="4" name="Ellipse 3">
+            <a:extLst>
+              <a:ext uri="{FF2B5EF4-FFF2-40B4-BE49-F238E27FC236}">
+                <a16:creationId xmlns:a16="http://schemas.microsoft.com/office/drawing/2014/main" id="{AC80E051-2046-4C72-8127-9A9044A13D05}"/>
+              </a:ext>
+            </a:extLst>
+          </p:cNvPr>
+          <p:cNvSpPr/>
+          <p:nvPr/>
+        </p:nvSpPr>
+        <p:spPr>
+          <a:xfrm>
+            <a:off x="1920431" y="3718851"/>
+            <a:ext cx="728281" cy="723280"/>
+          </a:xfrm>
+          <a:prstGeom prst="ellipse">
+            <a:avLst/>
+          </a:prstGeom>
+          <a:solidFill>
+            <a:schemeClr val="accent1">
+              <a:lumMod val="40000"/>
+              <a:lumOff val="60000"/>
+            </a:schemeClr>
+          </a:solidFill>
+          <a:ln>
+            <a:solidFill>
+              <a:schemeClr val="accent1">
+                <a:lumMod val="40000"/>
+                <a:lumOff val="60000"/>
+              </a:schemeClr>
+            </a:solidFill>
+          </a:ln>
+        </p:spPr>
+        <p:style>
+          <a:lnRef idx="2">
+            <a:schemeClr val="accent1">
+              <a:shade val="50000"/>
+            </a:schemeClr>
+          </a:lnRef>
+          <a:fillRef idx="1">
+            <a:schemeClr val="accent1"/>
+          </a:fillRef>
+          <a:effectRef idx="0">
+            <a:schemeClr val="accent1"/>
+          </a:effectRef>
+          <a:fontRef idx="minor">
+            <a:schemeClr val="lt1"/>
+          </a:fontRef>
+        </p:style>
+        <p:txBody>
+          <a:bodyPr rtlCol="0" anchor="ctr"/>
+          <a:lstStyle/>
+          <a:p>
+            <a:pPr algn="ctr"/>
             <a:r>
               <a:rPr lang="fr-FR" dirty="0"/>
-              <a:t>Use </a:t>
+              <a:t>ML</a:t>
+            </a:r>
+            <a:endParaRPr lang="en-GB" dirty="0"/>
+          </a:p>
+        </p:txBody>
+      </p:sp>
+      <p:sp>
+        <p:nvSpPr>
+          <p:cNvPr id="6" name="Ellipse 5">
+            <a:extLst>
+              <a:ext uri="{FF2B5EF4-FFF2-40B4-BE49-F238E27FC236}">
+                <a16:creationId xmlns:a16="http://schemas.microsoft.com/office/drawing/2014/main" id="{5AFD6155-6201-4209-83BA-519691B23877}"/>
+              </a:ext>
+            </a:extLst>
+          </p:cNvPr>
+          <p:cNvSpPr/>
+          <p:nvPr/>
+        </p:nvSpPr>
+        <p:spPr>
+          <a:xfrm>
+            <a:off x="2759838" y="3303364"/>
+            <a:ext cx="1217359" cy="407078"/>
+          </a:xfrm>
+          <a:prstGeom prst="ellipse">
+            <a:avLst/>
+          </a:prstGeom>
+          <a:solidFill>
+            <a:schemeClr val="accent1">
+              <a:lumMod val="40000"/>
+              <a:lumOff val="60000"/>
+            </a:schemeClr>
+          </a:solidFill>
+          <a:ln>
+            <a:solidFill>
+              <a:schemeClr val="accent1">
+                <a:lumMod val="40000"/>
+                <a:lumOff val="60000"/>
+              </a:schemeClr>
+            </a:solidFill>
+          </a:ln>
+        </p:spPr>
+        <p:style>
+          <a:lnRef idx="2">
+            <a:schemeClr val="accent1">
+              <a:shade val="50000"/>
+            </a:schemeClr>
+          </a:lnRef>
+          <a:fillRef idx="1">
+            <a:schemeClr val="accent1"/>
+          </a:fillRef>
+          <a:effectRef idx="0">
+            <a:schemeClr val="accent1"/>
+          </a:effectRef>
+          <a:fontRef idx="minor">
+            <a:schemeClr val="lt1"/>
+          </a:fontRef>
+        </p:style>
+        <p:txBody>
+          <a:bodyPr rtlCol="0" anchor="ctr"/>
+          <a:lstStyle/>
+          <a:p>
+            <a:pPr algn="ctr"/>
+            <a:r>
+              <a:rPr lang="fr-FR" dirty="0"/>
+              <a:t>Vision</a:t>
+            </a:r>
+            <a:endParaRPr lang="en-GB" dirty="0"/>
+          </a:p>
+        </p:txBody>
+      </p:sp>
+      <p:sp>
+        <p:nvSpPr>
+          <p:cNvPr id="7" name="Ellipse 6">
+            <a:extLst>
+              <a:ext uri="{FF2B5EF4-FFF2-40B4-BE49-F238E27FC236}">
+                <a16:creationId xmlns:a16="http://schemas.microsoft.com/office/drawing/2014/main" id="{EC000436-8A5D-4F20-BE29-74EF1D1B49E0}"/>
+              </a:ext>
+            </a:extLst>
+          </p:cNvPr>
+          <p:cNvSpPr/>
+          <p:nvPr/>
+        </p:nvSpPr>
+        <p:spPr>
+          <a:xfrm>
+            <a:off x="140305" y="3208677"/>
+            <a:ext cx="1590841" cy="675306"/>
+          </a:xfrm>
+          <a:prstGeom prst="ellipse">
+            <a:avLst/>
+          </a:prstGeom>
+          <a:solidFill>
+            <a:schemeClr val="accent1">
+              <a:lumMod val="40000"/>
+              <a:lumOff val="60000"/>
+            </a:schemeClr>
+          </a:solidFill>
+          <a:ln>
+            <a:solidFill>
+              <a:schemeClr val="accent1">
+                <a:lumMod val="40000"/>
+                <a:lumOff val="60000"/>
+              </a:schemeClr>
+            </a:solidFill>
+          </a:ln>
+        </p:spPr>
+        <p:style>
+          <a:lnRef idx="2">
+            <a:schemeClr val="accent1">
+              <a:shade val="50000"/>
+            </a:schemeClr>
+          </a:lnRef>
+          <a:fillRef idx="1">
+            <a:schemeClr val="accent1"/>
+          </a:fillRef>
+          <a:effectRef idx="0">
+            <a:schemeClr val="accent1"/>
+          </a:effectRef>
+          <a:fontRef idx="minor">
+            <a:schemeClr val="lt1"/>
+          </a:fontRef>
+        </p:style>
+        <p:txBody>
+          <a:bodyPr rtlCol="0" anchor="ctr"/>
+          <a:lstStyle/>
+          <a:p>
+            <a:pPr algn="ctr"/>
+            <a:r>
+              <a:rPr lang="fr-FR" dirty="0"/>
+              <a:t>Speech</a:t>
+            </a:r>
+            <a:endParaRPr lang="en-GB" dirty="0"/>
+          </a:p>
+        </p:txBody>
+      </p:sp>
+      <p:sp>
+        <p:nvSpPr>
+          <p:cNvPr id="8" name="Ellipse 7">
+            <a:extLst>
+              <a:ext uri="{FF2B5EF4-FFF2-40B4-BE49-F238E27FC236}">
+                <a16:creationId xmlns:a16="http://schemas.microsoft.com/office/drawing/2014/main" id="{E7407A93-F21C-4FA3-9FD3-16783859255B}"/>
+              </a:ext>
+            </a:extLst>
+          </p:cNvPr>
+          <p:cNvSpPr/>
+          <p:nvPr/>
+        </p:nvSpPr>
+        <p:spPr>
+          <a:xfrm>
+            <a:off x="1516011" y="4628815"/>
+            <a:ext cx="1530131" cy="675306"/>
+          </a:xfrm>
+          <a:prstGeom prst="ellipse">
+            <a:avLst/>
+          </a:prstGeom>
+          <a:solidFill>
+            <a:schemeClr val="accent1">
+              <a:lumMod val="40000"/>
+              <a:lumOff val="60000"/>
+            </a:schemeClr>
+          </a:solidFill>
+          <a:ln>
+            <a:solidFill>
+              <a:schemeClr val="accent1">
+                <a:lumMod val="40000"/>
+                <a:lumOff val="60000"/>
+              </a:schemeClr>
+            </a:solidFill>
+          </a:ln>
+        </p:spPr>
+        <p:style>
+          <a:lnRef idx="2">
+            <a:schemeClr val="accent1">
+              <a:shade val="50000"/>
+            </a:schemeClr>
+          </a:lnRef>
+          <a:fillRef idx="1">
+            <a:schemeClr val="accent1"/>
+          </a:fillRef>
+          <a:effectRef idx="0">
+            <a:schemeClr val="accent1"/>
+          </a:effectRef>
+          <a:fontRef idx="minor">
+            <a:schemeClr val="lt1"/>
+          </a:fontRef>
+        </p:style>
+        <p:txBody>
+          <a:bodyPr rtlCol="0" anchor="ctr"/>
+          <a:lstStyle/>
+          <a:p>
+            <a:pPr algn="ctr"/>
+            <a:r>
+              <a:rPr lang="fr-FR" dirty="0"/>
+              <a:t>Expert </a:t>
             </a:r>
             <a:r>
               <a:rPr lang="fr-FR" dirty="0" err="1"/>
-              <a:t>schemas</a:t>
+              <a:t>systems</a:t>
             </a:r>
             <a:endParaRPr lang="en-GB" dirty="0"/>
           </a:p>

</xml_diff>

<commit_message>
#12 Strong AI schema added on slides
</commit_message>
<xml_diff>
--- a/SAI_presentation.pptx
+++ b/SAI_presentation.pptx
@@ -14188,7 +14188,7 @@
         </p:nvSpPr>
         <p:spPr>
           <a:xfrm>
-            <a:off x="62143" y="2574524"/>
+            <a:off x="665822" y="2574524"/>
             <a:ext cx="4810579" cy="2974020"/>
           </a:xfrm>
           <a:prstGeom prst="roundRect">
@@ -14331,11 +14331,11 @@
           <a:p>
             <a:r>
               <a:rPr lang="en-GB" dirty="0"/>
-              <a:t> ”Strong artificial intelligence (strong AI) is the speculative intelligence of a machine that has the capacity to understand or learn any intellectual task that a human being can” from </a:t>
-            </a:r>
-            <a:r>
-              <a:rPr lang="en-GB" dirty="0" err="1"/>
-              <a:t>wikipedia</a:t>
+              <a:t> ”Strong artificial intelligence (strong AI) is the speculative intelligence of a machine that has the capacity to understand or learn any intellectual task that a human being can” </a:t>
+            </a:r>
+            <a:r>
+              <a:rPr lang="en-GB"/>
+              <a:t>from Wikipedia</a:t>
             </a:r>
             <a:endParaRPr lang="en-GB" dirty="0"/>
           </a:p>
@@ -14361,7 +14361,7 @@
         </p:nvSpPr>
         <p:spPr>
           <a:xfrm>
-            <a:off x="1920431" y="3718851"/>
+            <a:off x="2524110" y="3718851"/>
             <a:ext cx="728281" cy="723280"/>
           </a:xfrm>
           <a:prstGeom prst="ellipse">
@@ -14425,7 +14425,7 @@
         </p:nvSpPr>
         <p:spPr>
           <a:xfrm>
-            <a:off x="2759838" y="3303364"/>
+            <a:off x="3363517" y="3303364"/>
             <a:ext cx="1217359" cy="407078"/>
           </a:xfrm>
           <a:prstGeom prst="ellipse">
@@ -14489,7 +14489,7 @@
         </p:nvSpPr>
         <p:spPr>
           <a:xfrm>
-            <a:off x="140305" y="3208677"/>
+            <a:off x="743984" y="3208677"/>
             <a:ext cx="1590841" cy="675306"/>
           </a:xfrm>
           <a:prstGeom prst="ellipse">
@@ -14553,7 +14553,7 @@
         </p:nvSpPr>
         <p:spPr>
           <a:xfrm>
-            <a:off x="1516011" y="4628815"/>
+            <a:off x="2119690" y="4628815"/>
             <a:ext cx="1530131" cy="675306"/>
           </a:xfrm>
           <a:prstGeom prst="ellipse">
@@ -14602,6 +14602,357 @@
             <a:r>
               <a:rPr lang="fr-FR" dirty="0" err="1"/>
               <a:t>systems</a:t>
+            </a:r>
+            <a:endParaRPr lang="en-GB" dirty="0"/>
+          </a:p>
+        </p:txBody>
+      </p:sp>
+      <p:sp>
+        <p:nvSpPr>
+          <p:cNvPr id="10" name="Rectangle : coins arrondis 9">
+            <a:extLst>
+              <a:ext uri="{FF2B5EF4-FFF2-40B4-BE49-F238E27FC236}">
+                <a16:creationId xmlns:a16="http://schemas.microsoft.com/office/drawing/2014/main" id="{6864F216-A0BE-4F8A-AF5F-A8A3582863B5}"/>
+              </a:ext>
+            </a:extLst>
+          </p:cNvPr>
+          <p:cNvSpPr/>
+          <p:nvPr/>
+        </p:nvSpPr>
+        <p:spPr>
+          <a:xfrm>
+            <a:off x="6819528" y="2574524"/>
+            <a:ext cx="4810579" cy="2974020"/>
+          </a:xfrm>
+          <a:prstGeom prst="roundRect">
+            <a:avLst/>
+          </a:prstGeom>
+          <a:solidFill>
+            <a:schemeClr val="accent1">
+              <a:lumMod val="60000"/>
+              <a:lumOff val="40000"/>
+            </a:schemeClr>
+          </a:solidFill>
+          <a:ln>
+            <a:solidFill>
+              <a:schemeClr val="accent1">
+                <a:lumMod val="60000"/>
+                <a:lumOff val="40000"/>
+              </a:schemeClr>
+            </a:solidFill>
+          </a:ln>
+        </p:spPr>
+        <p:style>
+          <a:lnRef idx="2">
+            <a:schemeClr val="accent1">
+              <a:shade val="50000"/>
+            </a:schemeClr>
+          </a:lnRef>
+          <a:fillRef idx="1">
+            <a:schemeClr val="accent1"/>
+          </a:fillRef>
+          <a:effectRef idx="0">
+            <a:schemeClr val="accent1"/>
+          </a:effectRef>
+          <a:fontRef idx="minor">
+            <a:schemeClr val="lt1"/>
+          </a:fontRef>
+        </p:style>
+        <p:txBody>
+          <a:bodyPr rtlCol="0" anchor="ctr"/>
+          <a:lstStyle/>
+          <a:p>
+            <a:endParaRPr lang="fr-FR" dirty="0"/>
+          </a:p>
+          <a:p>
+            <a:endParaRPr lang="fr-FR" dirty="0"/>
+          </a:p>
+          <a:p>
+            <a:endParaRPr lang="fr-FR" dirty="0"/>
+          </a:p>
+          <a:p>
+            <a:endParaRPr lang="fr-FR" dirty="0"/>
+          </a:p>
+          <a:p>
+            <a:endParaRPr lang="fr-FR" dirty="0"/>
+          </a:p>
+          <a:p>
+            <a:endParaRPr lang="fr-FR" dirty="0"/>
+          </a:p>
+          <a:p>
+            <a:endParaRPr lang="fr-FR" dirty="0"/>
+          </a:p>
+          <a:p>
+            <a:endParaRPr lang="fr-FR" dirty="0"/>
+          </a:p>
+          <a:p>
+            <a:r>
+              <a:rPr lang="fr-FR" dirty="0"/>
+              <a:t>Strong AI</a:t>
+            </a:r>
+            <a:endParaRPr lang="en-GB" dirty="0"/>
+          </a:p>
+        </p:txBody>
+      </p:sp>
+      <p:sp>
+        <p:nvSpPr>
+          <p:cNvPr id="11" name="Ellipse 10">
+            <a:extLst>
+              <a:ext uri="{FF2B5EF4-FFF2-40B4-BE49-F238E27FC236}">
+                <a16:creationId xmlns:a16="http://schemas.microsoft.com/office/drawing/2014/main" id="{1E61E1E7-8B05-4DFD-A2DC-A68656E0D4B6}"/>
+              </a:ext>
+            </a:extLst>
+          </p:cNvPr>
+          <p:cNvSpPr/>
+          <p:nvPr/>
+        </p:nvSpPr>
+        <p:spPr>
+          <a:xfrm>
+            <a:off x="7103871" y="4147662"/>
+            <a:ext cx="4378998" cy="859228"/>
+          </a:xfrm>
+          <a:prstGeom prst="ellipse">
+            <a:avLst/>
+          </a:prstGeom>
+          <a:solidFill>
+            <a:schemeClr val="accent1">
+              <a:lumMod val="40000"/>
+              <a:lumOff val="60000"/>
+            </a:schemeClr>
+          </a:solidFill>
+          <a:ln>
+            <a:solidFill>
+              <a:schemeClr val="accent1">
+                <a:lumMod val="40000"/>
+                <a:lumOff val="60000"/>
+              </a:schemeClr>
+            </a:solidFill>
+          </a:ln>
+        </p:spPr>
+        <p:style>
+          <a:lnRef idx="2">
+            <a:schemeClr val="accent1">
+              <a:shade val="50000"/>
+            </a:schemeClr>
+          </a:lnRef>
+          <a:fillRef idx="1">
+            <a:schemeClr val="accent1"/>
+          </a:fillRef>
+          <a:effectRef idx="0">
+            <a:schemeClr val="accent1"/>
+          </a:effectRef>
+          <a:fontRef idx="minor">
+            <a:schemeClr val="lt1"/>
+          </a:fontRef>
+        </p:style>
+        <p:txBody>
+          <a:bodyPr rtlCol="0" anchor="ctr"/>
+          <a:lstStyle/>
+          <a:p>
+            <a:pPr algn="ctr"/>
+            <a:r>
+              <a:rPr lang="fr-FR" sz="1400" dirty="0"/>
+              <a:t>Dynamic </a:t>
+            </a:r>
+            <a:r>
+              <a:rPr lang="fr-FR" sz="1400" dirty="0" err="1"/>
+              <a:t>Reinforcement</a:t>
+            </a:r>
+            <a:r>
+              <a:rPr lang="fr-FR" sz="1400" dirty="0"/>
+              <a:t> Learning</a:t>
+            </a:r>
+            <a:endParaRPr lang="en-GB" sz="1400" dirty="0"/>
+          </a:p>
+        </p:txBody>
+      </p:sp>
+      <p:sp>
+        <p:nvSpPr>
+          <p:cNvPr id="12" name="Ellipse 11">
+            <a:extLst>
+              <a:ext uri="{FF2B5EF4-FFF2-40B4-BE49-F238E27FC236}">
+                <a16:creationId xmlns:a16="http://schemas.microsoft.com/office/drawing/2014/main" id="{CEE491A8-5BFD-4C5F-B64C-AA1C691FAD2C}"/>
+              </a:ext>
+            </a:extLst>
+          </p:cNvPr>
+          <p:cNvSpPr/>
+          <p:nvPr/>
+        </p:nvSpPr>
+        <p:spPr>
+          <a:xfrm>
+            <a:off x="9898031" y="3332409"/>
+            <a:ext cx="1217359" cy="407078"/>
+          </a:xfrm>
+          <a:prstGeom prst="ellipse">
+            <a:avLst/>
+          </a:prstGeom>
+          <a:solidFill>
+            <a:schemeClr val="accent1">
+              <a:lumMod val="40000"/>
+              <a:lumOff val="60000"/>
+            </a:schemeClr>
+          </a:solidFill>
+          <a:ln>
+            <a:solidFill>
+              <a:schemeClr val="accent1">
+                <a:lumMod val="40000"/>
+                <a:lumOff val="60000"/>
+              </a:schemeClr>
+            </a:solidFill>
+          </a:ln>
+        </p:spPr>
+        <p:style>
+          <a:lnRef idx="2">
+            <a:schemeClr val="accent1">
+              <a:shade val="50000"/>
+            </a:schemeClr>
+          </a:lnRef>
+          <a:fillRef idx="1">
+            <a:schemeClr val="accent1"/>
+          </a:fillRef>
+          <a:effectRef idx="0">
+            <a:schemeClr val="accent1"/>
+          </a:effectRef>
+          <a:fontRef idx="minor">
+            <a:schemeClr val="lt1"/>
+          </a:fontRef>
+        </p:style>
+        <p:txBody>
+          <a:bodyPr rtlCol="0" anchor="ctr"/>
+          <a:lstStyle/>
+          <a:p>
+            <a:pPr algn="ctr"/>
+            <a:r>
+              <a:rPr lang="fr-FR" dirty="0"/>
+              <a:t>Vision</a:t>
+            </a:r>
+            <a:endParaRPr lang="en-GB" dirty="0"/>
+          </a:p>
+        </p:txBody>
+      </p:sp>
+      <p:sp>
+        <p:nvSpPr>
+          <p:cNvPr id="13" name="Ellipse 12">
+            <a:extLst>
+              <a:ext uri="{FF2B5EF4-FFF2-40B4-BE49-F238E27FC236}">
+                <a16:creationId xmlns:a16="http://schemas.microsoft.com/office/drawing/2014/main" id="{94631795-6C92-4516-9C0C-E09D0B888AA6}"/>
+              </a:ext>
+            </a:extLst>
+          </p:cNvPr>
+          <p:cNvSpPr/>
+          <p:nvPr/>
+        </p:nvSpPr>
+        <p:spPr>
+          <a:xfrm>
+            <a:off x="6965781" y="3288850"/>
+            <a:ext cx="1590841" cy="675306"/>
+          </a:xfrm>
+          <a:prstGeom prst="ellipse">
+            <a:avLst/>
+          </a:prstGeom>
+          <a:solidFill>
+            <a:schemeClr val="accent1">
+              <a:lumMod val="40000"/>
+              <a:lumOff val="60000"/>
+            </a:schemeClr>
+          </a:solidFill>
+          <a:ln>
+            <a:solidFill>
+              <a:schemeClr val="accent1">
+                <a:lumMod val="40000"/>
+                <a:lumOff val="60000"/>
+              </a:schemeClr>
+            </a:solidFill>
+          </a:ln>
+        </p:spPr>
+        <p:style>
+          <a:lnRef idx="2">
+            <a:schemeClr val="accent1">
+              <a:shade val="50000"/>
+            </a:schemeClr>
+          </a:lnRef>
+          <a:fillRef idx="1">
+            <a:schemeClr val="accent1"/>
+          </a:fillRef>
+          <a:effectRef idx="0">
+            <a:schemeClr val="accent1"/>
+          </a:effectRef>
+          <a:fontRef idx="minor">
+            <a:schemeClr val="lt1"/>
+          </a:fontRef>
+        </p:style>
+        <p:txBody>
+          <a:bodyPr rtlCol="0" anchor="ctr"/>
+          <a:lstStyle/>
+          <a:p>
+            <a:pPr algn="ctr"/>
+            <a:r>
+              <a:rPr lang="fr-FR" dirty="0"/>
+              <a:t>Speech</a:t>
+            </a:r>
+            <a:endParaRPr lang="en-GB" dirty="0"/>
+          </a:p>
+        </p:txBody>
+      </p:sp>
+      <p:sp>
+        <p:nvSpPr>
+          <p:cNvPr id="14" name="Ellipse 13">
+            <a:extLst>
+              <a:ext uri="{FF2B5EF4-FFF2-40B4-BE49-F238E27FC236}">
+                <a16:creationId xmlns:a16="http://schemas.microsoft.com/office/drawing/2014/main" id="{F7AE7EBD-FAB3-4FD3-BD2E-500D60D84FC4}"/>
+              </a:ext>
+            </a:extLst>
+          </p:cNvPr>
+          <p:cNvSpPr/>
+          <p:nvPr/>
+        </p:nvSpPr>
+        <p:spPr>
+          <a:xfrm>
+            <a:off x="8287927" y="2688196"/>
+            <a:ext cx="1873780" cy="675306"/>
+          </a:xfrm>
+          <a:prstGeom prst="ellipse">
+            <a:avLst/>
+          </a:prstGeom>
+          <a:solidFill>
+            <a:schemeClr val="accent1">
+              <a:lumMod val="40000"/>
+              <a:lumOff val="60000"/>
+            </a:schemeClr>
+          </a:solidFill>
+          <a:ln>
+            <a:solidFill>
+              <a:schemeClr val="accent1">
+                <a:lumMod val="40000"/>
+                <a:lumOff val="60000"/>
+              </a:schemeClr>
+            </a:solidFill>
+          </a:ln>
+        </p:spPr>
+        <p:style>
+          <a:lnRef idx="2">
+            <a:schemeClr val="accent1">
+              <a:shade val="50000"/>
+            </a:schemeClr>
+          </a:lnRef>
+          <a:fillRef idx="1">
+            <a:schemeClr val="accent1"/>
+          </a:fillRef>
+          <a:effectRef idx="0">
+            <a:schemeClr val="accent1"/>
+          </a:effectRef>
+          <a:fontRef idx="minor">
+            <a:schemeClr val="lt1"/>
+          </a:fontRef>
+        </p:style>
+        <p:txBody>
+          <a:bodyPr rtlCol="0" anchor="ctr"/>
+          <a:lstStyle/>
+          <a:p>
+            <a:pPr algn="ctr"/>
+            <a:r>
+              <a:rPr lang="fr-FR" dirty="0" err="1"/>
+              <a:t>Conscious</a:t>
             </a:r>
             <a:endParaRPr lang="en-GB" dirty="0"/>
           </a:p>

</xml_diff>

<commit_message>
#12 Adapted AI text color to schemas added on slides
</commit_message>
<xml_diff>
--- a/SAI_presentation.pptx
+++ b/SAI_presentation.pptx
@@ -14325,19 +14325,67 @@
           <a:p>
             <a:r>
               <a:rPr lang="en-GB" dirty="0"/>
-              <a:t>“Weak artificial intelligence (weak AI), is artificial intelligence that implements a limited part of mind, or as narrow AI, is focused on one narrow task. In John Searle's terms it “would be useful for testing hypothesis about minds, but would not actually be minds” “ from Wikipedia</a:t>
-            </a:r>
-          </a:p>
-          <a:p>
+              <a:t>“Weak artificial intelligence (weak AI), is artificial intelligence that implements a </a:t>
+            </a:r>
+            <a:r>
+              <a:rPr lang="en-GB" dirty="0">
+                <a:solidFill>
+                  <a:schemeClr val="accent1">
+                    <a:lumMod val="60000"/>
+                    <a:lumOff val="40000"/>
+                  </a:schemeClr>
+                </a:solidFill>
+              </a:rPr>
+              <a:t>limited part of mind</a:t>
+            </a:r>
             <a:r>
               <a:rPr lang="en-GB" dirty="0"/>
-              <a:t> ”Strong artificial intelligence (strong AI) is the speculative intelligence of a machine that has the capacity to understand or learn any intellectual task that a human being can” </a:t>
-            </a:r>
-            <a:r>
-              <a:rPr lang="en-GB"/>
-              <a:t>from Wikipedia</a:t>
-            </a:r>
-            <a:endParaRPr lang="en-GB" dirty="0"/>
+              <a:t>, or as narrow AI, is focused on </a:t>
+            </a:r>
+            <a:r>
+              <a:rPr lang="en-GB" dirty="0">
+                <a:solidFill>
+                  <a:schemeClr val="accent5">
+                    <a:lumMod val="75000"/>
+                  </a:schemeClr>
+                </a:solidFill>
+              </a:rPr>
+              <a:t>one narrow task</a:t>
+            </a:r>
+            <a:r>
+              <a:rPr lang="en-GB" dirty="0"/>
+              <a:t>. In John Searle's terms it “would be useful for testing hypothesis about minds, but would not actually be minds” “ from Wikipedia</a:t>
+            </a:r>
+          </a:p>
+          <a:p>
+            <a:r>
+              <a:rPr lang="en-GB" dirty="0"/>
+              <a:t> ”Strong artificial intelligence (strong AI) is the </a:t>
+            </a:r>
+            <a:r>
+              <a:rPr lang="en-GB" dirty="0">
+                <a:solidFill>
+                  <a:schemeClr val="accent2"/>
+                </a:solidFill>
+              </a:rPr>
+              <a:t>speculative intelligence of a machine that has the capacity</a:t>
+            </a:r>
+            <a:r>
+              <a:rPr lang="en-GB" dirty="0"/>
+              <a:t> to </a:t>
+            </a:r>
+            <a:r>
+              <a:rPr lang="en-GB" dirty="0">
+                <a:solidFill>
+                  <a:srgbClr val="FFFF00"/>
+                </a:solidFill>
+              </a:rPr>
+              <a:t>understand or learn any intellectual task that a human being can</a:t>
+            </a:r>
+            <a:r>
+              <a:rPr lang="en-GB" dirty="0"/>
+              <a:t>” from Wikipedia</a:t>
+            </a:r>
           </a:p>
           <a:p>
             <a:endParaRPr lang="en-GB" dirty="0"/>
@@ -14404,10 +14452,22 @@
           <a:p>
             <a:pPr algn="ctr"/>
             <a:r>
-              <a:rPr lang="fr-FR" dirty="0"/>
+              <a:rPr lang="fr-FR" dirty="0">
+                <a:solidFill>
+                  <a:schemeClr val="accent5">
+                    <a:lumMod val="75000"/>
+                  </a:schemeClr>
+                </a:solidFill>
+              </a:rPr>
               <a:t>ML</a:t>
             </a:r>
-            <a:endParaRPr lang="en-GB" dirty="0"/>
+            <a:endParaRPr lang="en-GB" dirty="0">
+              <a:solidFill>
+                <a:schemeClr val="accent5">
+                  <a:lumMod val="75000"/>
+                </a:schemeClr>
+              </a:solidFill>
+            </a:endParaRPr>
           </a:p>
         </p:txBody>
       </p:sp>
@@ -14596,14 +14656,35 @@
           <a:p>
             <a:pPr algn="ctr"/>
             <a:r>
-              <a:rPr lang="fr-FR" dirty="0"/>
+              <a:rPr lang="fr-FR" dirty="0">
+                <a:solidFill>
+                  <a:schemeClr val="accent1">
+                    <a:lumMod val="60000"/>
+                    <a:lumOff val="40000"/>
+                  </a:schemeClr>
+                </a:solidFill>
+              </a:rPr>
               <a:t>Expert </a:t>
             </a:r>
             <a:r>
-              <a:rPr lang="fr-FR" dirty="0" err="1"/>
+              <a:rPr lang="fr-FR" dirty="0" err="1">
+                <a:solidFill>
+                  <a:schemeClr val="accent1">
+                    <a:lumMod val="60000"/>
+                    <a:lumOff val="40000"/>
+                  </a:schemeClr>
+                </a:solidFill>
+              </a:rPr>
               <a:t>systems</a:t>
             </a:r>
-            <a:endParaRPr lang="en-GB" dirty="0"/>
+            <a:endParaRPr lang="en-GB" dirty="0">
+              <a:solidFill>
+                <a:schemeClr val="accent1">
+                  <a:lumMod val="60000"/>
+                  <a:lumOff val="40000"/>
+                </a:schemeClr>
+              </a:solidFill>
+            </a:endParaRPr>
           </a:p>
         </p:txBody>
       </p:sp>
@@ -14751,18 +14832,34 @@
           <a:p>
             <a:pPr algn="ctr"/>
             <a:r>
-              <a:rPr lang="fr-FR" sz="1400" dirty="0"/>
+              <a:rPr lang="fr-FR" sz="1400" dirty="0">
+                <a:solidFill>
+                  <a:srgbClr val="FFFF00"/>
+                </a:solidFill>
+              </a:rPr>
               <a:t>Dynamic </a:t>
             </a:r>
             <a:r>
-              <a:rPr lang="fr-FR" sz="1400" dirty="0" err="1"/>
+              <a:rPr lang="fr-FR" sz="1400" dirty="0" err="1">
+                <a:solidFill>
+                  <a:srgbClr val="FFFF00"/>
+                </a:solidFill>
+              </a:rPr>
               <a:t>Reinforcement</a:t>
             </a:r>
             <a:r>
-              <a:rPr lang="fr-FR" sz="1400" dirty="0"/>
+              <a:rPr lang="fr-FR" sz="1400" dirty="0">
+                <a:solidFill>
+                  <a:srgbClr val="FFFF00"/>
+                </a:solidFill>
+              </a:rPr>
               <a:t> Learning</a:t>
             </a:r>
-            <a:endParaRPr lang="en-GB" sz="1400" dirty="0"/>
+            <a:endParaRPr lang="en-GB" sz="1400" dirty="0">
+              <a:solidFill>
+                <a:srgbClr val="FFFF00"/>
+              </a:solidFill>
+            </a:endParaRPr>
           </a:p>
         </p:txBody>
       </p:sp>
@@ -14951,10 +15048,18 @@
           <a:p>
             <a:pPr algn="ctr"/>
             <a:r>
-              <a:rPr lang="fr-FR" dirty="0" err="1"/>
+              <a:rPr lang="fr-FR" dirty="0" err="1">
+                <a:solidFill>
+                  <a:schemeClr val="accent2"/>
+                </a:solidFill>
+              </a:rPr>
               <a:t>Conscious</a:t>
             </a:r>
-            <a:endParaRPr lang="en-GB" dirty="0"/>
+            <a:endParaRPr lang="en-GB" dirty="0">
+              <a:solidFill>
+                <a:schemeClr val="accent2"/>
+              </a:solidFill>
+            </a:endParaRPr>
           </a:p>
         </p:txBody>
       </p:sp>

</xml_diff>

<commit_message>
#12 Policy and state value explain on slides
</commit_message>
<xml_diff>
--- a/SAI_presentation.pptx
+++ b/SAI_presentation.pptx
@@ -6740,7 +6740,7 @@
             <a:fld id="{B61BEF0D-F0BB-DE4B-95CE-6DB70DBA9567}" type="datetimeFigureOut">
               <a:rPr lang="en-US" dirty="0"/>
               <a:pPr/>
-              <a:t>3/3/2020</a:t>
+              <a:t>3/4/2020</a:t>
             </a:fld>
             <a:endParaRPr lang="en-US" dirty="0"/>
           </a:p>
@@ -7173,7 +7173,7 @@
             <a:fld id="{B61BEF0D-F0BB-DE4B-95CE-6DB70DBA9567}" type="datetimeFigureOut">
               <a:rPr lang="en-US" dirty="0"/>
               <a:pPr/>
-              <a:t>3/3/2020</a:t>
+              <a:t>3/4/2020</a:t>
             </a:fld>
             <a:endParaRPr lang="en-US" dirty="0"/>
           </a:p>
@@ -7420,7 +7420,7 @@
             <a:fld id="{B61BEF0D-F0BB-DE4B-95CE-6DB70DBA9567}" type="datetimeFigureOut">
               <a:rPr lang="en-US" dirty="0"/>
               <a:pPr/>
-              <a:t>3/3/2020</a:t>
+              <a:t>3/4/2020</a:t>
             </a:fld>
             <a:endParaRPr lang="en-US" dirty="0"/>
           </a:p>
@@ -7725,7 +7725,7 @@
             <a:fld id="{B61BEF0D-F0BB-DE4B-95CE-6DB70DBA9567}" type="datetimeFigureOut">
               <a:rPr lang="en-US" dirty="0"/>
               <a:pPr/>
-              <a:t>3/3/2020</a:t>
+              <a:t>3/4/2020</a:t>
             </a:fld>
             <a:endParaRPr lang="en-US" dirty="0"/>
           </a:p>
@@ -8040,7 +8040,7 @@
             <a:fld id="{B61BEF0D-F0BB-DE4B-95CE-6DB70DBA9567}" type="datetimeFigureOut">
               <a:rPr lang="en-US" dirty="0"/>
               <a:pPr/>
-              <a:t>3/3/2020</a:t>
+              <a:t>3/4/2020</a:t>
             </a:fld>
             <a:endParaRPr lang="en-US" dirty="0"/>
           </a:p>
@@ -8339,7 +8339,7 @@
             <a:fld id="{B61BEF0D-F0BB-DE4B-95CE-6DB70DBA9567}" type="datetimeFigureOut">
               <a:rPr lang="en-US" dirty="0"/>
               <a:pPr/>
-              <a:t>3/3/2020</a:t>
+              <a:t>3/4/2020</a:t>
             </a:fld>
             <a:endParaRPr lang="en-US" dirty="0"/>
           </a:p>
@@ -8703,7 +8703,7 @@
             <a:fld id="{B61BEF0D-F0BB-DE4B-95CE-6DB70DBA9567}" type="datetimeFigureOut">
               <a:rPr lang="en-US" dirty="0"/>
               <a:pPr/>
-              <a:t>3/3/2020</a:t>
+              <a:t>3/4/2020</a:t>
             </a:fld>
             <a:endParaRPr lang="en-US" dirty="0"/>
           </a:p>
@@ -8874,7 +8874,7 @@
             <a:fld id="{B61BEF0D-F0BB-DE4B-95CE-6DB70DBA9567}" type="datetimeFigureOut">
               <a:rPr lang="en-US" dirty="0"/>
               <a:pPr/>
-              <a:t>3/3/2020</a:t>
+              <a:t>3/4/2020</a:t>
             </a:fld>
             <a:endParaRPr lang="en-US" dirty="0"/>
           </a:p>
@@ -9051,7 +9051,7 @@
             <a:fld id="{B61BEF0D-F0BB-DE4B-95CE-6DB70DBA9567}" type="datetimeFigureOut">
               <a:rPr lang="en-US" dirty="0"/>
               <a:pPr/>
-              <a:t>3/3/2020</a:t>
+              <a:t>3/4/2020</a:t>
             </a:fld>
             <a:endParaRPr lang="en-US" dirty="0"/>
           </a:p>
@@ -9218,7 +9218,7 @@
             <a:fld id="{B61BEF0D-F0BB-DE4B-95CE-6DB70DBA9567}" type="datetimeFigureOut">
               <a:rPr lang="en-US" dirty="0"/>
               <a:pPr/>
-              <a:t>3/3/2020</a:t>
+              <a:t>3/4/2020</a:t>
             </a:fld>
             <a:endParaRPr lang="en-US" dirty="0"/>
           </a:p>
@@ -9465,7 +9465,7 @@
             <a:fld id="{B61BEF0D-F0BB-DE4B-95CE-6DB70DBA9567}" type="datetimeFigureOut">
               <a:rPr lang="en-US" dirty="0"/>
               <a:pPr/>
-              <a:t>3/3/2020</a:t>
+              <a:t>3/4/2020</a:t>
             </a:fld>
             <a:endParaRPr lang="en-US" dirty="0"/>
           </a:p>
@@ -9698,7 +9698,7 @@
             <a:fld id="{B61BEF0D-F0BB-DE4B-95CE-6DB70DBA9567}" type="datetimeFigureOut">
               <a:rPr lang="en-US" dirty="0"/>
               <a:pPr/>
-              <a:t>3/3/2020</a:t>
+              <a:t>3/4/2020</a:t>
             </a:fld>
             <a:endParaRPr lang="en-US" dirty="0"/>
           </a:p>
@@ -10077,7 +10077,7 @@
             <a:fld id="{B61BEF0D-F0BB-DE4B-95CE-6DB70DBA9567}" type="datetimeFigureOut">
               <a:rPr lang="en-US" dirty="0"/>
               <a:pPr/>
-              <a:t>3/3/2020</a:t>
+              <a:t>3/4/2020</a:t>
             </a:fld>
             <a:endParaRPr lang="en-US" dirty="0"/>
           </a:p>
@@ -10192,7 +10192,7 @@
             <a:fld id="{B61BEF0D-F0BB-DE4B-95CE-6DB70DBA9567}" type="datetimeFigureOut">
               <a:rPr lang="en-US" dirty="0"/>
               <a:pPr/>
-              <a:t>3/3/2020</a:t>
+              <a:t>3/4/2020</a:t>
             </a:fld>
             <a:endParaRPr lang="en-US" dirty="0"/>
           </a:p>
@@ -10284,7 +10284,7 @@
             <a:fld id="{B61BEF0D-F0BB-DE4B-95CE-6DB70DBA9567}" type="datetimeFigureOut">
               <a:rPr lang="en-US" dirty="0"/>
               <a:pPr/>
-              <a:t>3/3/2020</a:t>
+              <a:t>3/4/2020</a:t>
             </a:fld>
             <a:endParaRPr lang="en-US" dirty="0"/>
           </a:p>
@@ -10536,7 +10536,7 @@
             <a:fld id="{B61BEF0D-F0BB-DE4B-95CE-6DB70DBA9567}" type="datetimeFigureOut">
               <a:rPr lang="en-US" dirty="0"/>
               <a:pPr/>
-              <a:t>3/3/2020</a:t>
+              <a:t>3/4/2020</a:t>
             </a:fld>
             <a:endParaRPr lang="en-US" dirty="0"/>
           </a:p>
@@ -10816,7 +10816,7 @@
             <a:fld id="{B61BEF0D-F0BB-DE4B-95CE-6DB70DBA9567}" type="datetimeFigureOut">
               <a:rPr lang="en-US" dirty="0"/>
               <a:pPr/>
-              <a:t>3/3/2020</a:t>
+              <a:t>3/4/2020</a:t>
             </a:fld>
             <a:endParaRPr lang="en-US" dirty="0"/>
           </a:p>
@@ -11219,7 +11219,7 @@
             <a:fld id="{B61BEF0D-F0BB-DE4B-95CE-6DB70DBA9567}" type="datetimeFigureOut">
               <a:rPr lang="en-US" dirty="0"/>
               <a:pPr/>
-              <a:t>3/3/2020</a:t>
+              <a:t>3/4/2020</a:t>
             </a:fld>
             <a:endParaRPr lang="en-US" dirty="0"/>
           </a:p>
@@ -15153,13 +15153,58 @@
           <a:p>
             <a:r>
               <a:rPr lang="fr-FR" dirty="0"/>
-              <a:t>Policy:  </a:t>
-            </a:r>
-          </a:p>
-          <a:p>
+              <a:t>Policy:  the </a:t>
+            </a:r>
+            <a:r>
+              <a:rPr lang="fr-FR" dirty="0" err="1"/>
+              <a:t>agent’s</a:t>
+            </a:r>
             <a:r>
               <a:rPr lang="fr-FR" dirty="0"/>
-              <a:t>State value-fonction:</a:t>
+              <a:t> action </a:t>
+            </a:r>
+            <a:r>
+              <a:rPr lang="fr-FR" dirty="0" err="1"/>
+              <a:t>selection</a:t>
+            </a:r>
+            <a:endParaRPr lang="fr-FR" dirty="0"/>
+          </a:p>
+          <a:p>
+            <a:r>
+              <a:rPr lang="fr-FR" dirty="0"/>
+              <a:t>State value-fonction: how « good » </a:t>
+            </a:r>
+            <a:r>
+              <a:rPr lang="fr-FR" dirty="0" err="1"/>
+              <a:t>it</a:t>
+            </a:r>
+            <a:r>
+              <a:rPr lang="fr-FR" dirty="0"/>
+              <a:t> </a:t>
+            </a:r>
+            <a:r>
+              <a:rPr lang="fr-FR" dirty="0" err="1"/>
+              <a:t>is</a:t>
+            </a:r>
+            <a:r>
+              <a:rPr lang="fr-FR" dirty="0"/>
+              <a:t> to </a:t>
+            </a:r>
+            <a:r>
+              <a:rPr lang="fr-FR" dirty="0" err="1"/>
+              <a:t>be</a:t>
+            </a:r>
+            <a:r>
+              <a:rPr lang="fr-FR" dirty="0"/>
+              <a:t> in a </a:t>
+            </a:r>
+            <a:r>
+              <a:rPr lang="fr-FR" dirty="0" err="1"/>
+              <a:t>given</a:t>
+            </a:r>
+            <a:r>
+              <a:rPr lang="fr-FR" dirty="0"/>
+              <a:t> state</a:t>
             </a:r>
           </a:p>
           <a:p>
@@ -15180,7 +15225,7 @@
               <a:t> </a:t>
             </a:r>
             <a:r>
-              <a:rPr lang="fr-FR" dirty="0" err="1"/>
+              <a:rPr lang="fr-FR"/>
               <a:t>approach</a:t>
             </a:r>
             <a:r>
@@ -15196,7 +15241,7 @@
               <a:t> Q-</a:t>
             </a:r>
             <a:r>
-              <a:rPr lang="fr-FR"/>
+              <a:rPr lang="fr-FR" dirty="0" err="1"/>
               <a:t>learning</a:t>
             </a:r>
             <a:endParaRPr lang="fr-FR" dirty="0"/>

</xml_diff>

<commit_message>
#12 Q learning formula added on slides
</commit_message>
<xml_diff>
--- a/SAI_presentation.pptx
+++ b/SAI_presentation.pptx
@@ -15146,14 +15146,21 @@
             <p:ph idx="1"/>
           </p:nvPr>
         </p:nvSpPr>
-        <p:spPr/>
+        <p:spPr>
+          <a:xfrm>
+            <a:off x="684212" y="685800"/>
+            <a:ext cx="11362786" cy="3615267"/>
+          </a:xfrm>
+        </p:spPr>
         <p:txBody>
-          <a:bodyPr/>
+          <a:bodyPr>
+            <a:normAutofit/>
+          </a:bodyPr>
           <a:lstStyle/>
           <a:p>
             <a:r>
               <a:rPr lang="fr-FR" dirty="0"/>
-              <a:t>Policy:  the </a:t>
+              <a:t>Policy (a):  the </a:t>
             </a:r>
             <a:r>
               <a:rPr lang="fr-FR" dirty="0" err="1"/>
@@ -15172,7 +15179,7 @@
           <a:p>
             <a:r>
               <a:rPr lang="fr-FR" dirty="0"/>
-              <a:t>State value-fonction: how « good » </a:t>
+              <a:t>State value-fonction (s): how « good » </a:t>
             </a:r>
             <a:r>
               <a:rPr lang="fr-FR" dirty="0" err="1"/>
@@ -15208,43 +15215,33 @@
             </a:r>
           </a:p>
           <a:p>
-            <a:r>
-              <a:rPr lang="fr-FR" dirty="0" err="1"/>
-              <a:t>Explains</a:t>
-            </a:r>
+            <a:pPr marL="0" indent="0">
+              <a:buNone/>
+            </a:pPr>
             <a:r>
               <a:rPr lang="fr-FR" dirty="0"/>
-              <a:t> </a:t>
-            </a:r>
-            <a:r>
-              <a:rPr lang="fr-FR" dirty="0" err="1"/>
-              <a:t>that</a:t>
-            </a:r>
-            <a:r>
-              <a:rPr lang="fr-FR" dirty="0"/>
-              <a:t> </a:t>
-            </a:r>
-            <a:r>
-              <a:rPr lang="fr-FR"/>
-              <a:t>approach</a:t>
-            </a:r>
-            <a:r>
-              <a:rPr lang="fr-FR" dirty="0"/>
-              <a:t> </a:t>
-            </a:r>
-            <a:r>
-              <a:rPr lang="fr-FR" dirty="0" err="1"/>
-              <a:t>with</a:t>
-            </a:r>
-            <a:r>
-              <a:rPr lang="fr-FR" dirty="0"/>
-              <a:t> Q-</a:t>
-            </a:r>
-            <a:r>
-              <a:rPr lang="fr-FR" dirty="0" err="1"/>
-              <a:t>learning</a:t>
-            </a:r>
-            <a:endParaRPr lang="fr-FR" dirty="0"/>
+              <a:t>					</a:t>
+            </a:r>
+            <a:r>
+              <a:rPr lang="fr-FR" sz="4000" b="1" dirty="0"/>
+              <a:t>Q(s, a) =  </a:t>
+            </a:r>
+            <a:r>
+              <a:rPr lang="fr-FR" sz="4000" b="1" dirty="0" err="1"/>
+              <a:t>sum</a:t>
+            </a:r>
+            <a:r>
+              <a:rPr lang="fr-FR" sz="4000" b="1" dirty="0"/>
+              <a:t>(prob of </a:t>
+            </a:r>
+            <a:r>
+              <a:rPr lang="fr-FR" sz="4000" b="1" dirty="0" err="1"/>
+              <a:t>each</a:t>
+            </a:r>
+            <a:r>
+              <a:rPr lang="fr-FR" sz="4000" b="1" dirty="0"/>
+              <a:t> state) </a:t>
+            </a:r>
           </a:p>
           <a:p>
             <a:endParaRPr lang="fr-FR" dirty="0"/>

</xml_diff>

<commit_message>
#12 Simple words to RL added on slides
</commit_message>
<xml_diff>
--- a/SAI_presentation.pptx
+++ b/SAI_presentation.pptx
@@ -15154,7 +15154,7 @@
         </p:spPr>
         <p:txBody>
           <a:bodyPr>
-            <a:normAutofit/>
+            <a:normAutofit lnSpcReduction="10000"/>
           </a:bodyPr>
           <a:lstStyle/>
           <a:p>
@@ -15273,8 +15273,44 @@
           </a:p>
           <a:p>
             <a:r>
+              <a:rPr lang="fr-FR" dirty="0"/>
+              <a:t>This formula </a:t>
+            </a:r>
+            <a:r>
               <a:rPr lang="fr-FR" dirty="0" err="1"/>
-              <a:t>Explains</a:t>
+              <a:t>give</a:t>
+            </a:r>
+            <a:r>
+              <a:rPr lang="fr-FR" dirty="0"/>
+              <a:t> us the power to </a:t>
+            </a:r>
+            <a:r>
+              <a:rPr lang="fr-FR" dirty="0" err="1"/>
+              <a:t>make</a:t>
+            </a:r>
+            <a:r>
+              <a:rPr lang="fr-FR" dirty="0"/>
+              <a:t> a </a:t>
+            </a:r>
+            <a:r>
+              <a:rPr lang="fr-FR" dirty="0" err="1"/>
+              <a:t>decision</a:t>
+            </a:r>
+            <a:r>
+              <a:rPr lang="fr-FR" dirty="0"/>
+              <a:t> for the </a:t>
+            </a:r>
+            <a:r>
+              <a:rPr lang="fr-FR" dirty="0" err="1"/>
+              <a:t>next</a:t>
+            </a:r>
+            <a:r>
+              <a:rPr lang="fr-FR" dirty="0"/>
+              <a:t> action </a:t>
+            </a:r>
+            <a:r>
+              <a:rPr lang="fr-FR" dirty="0" err="1"/>
+              <a:t>using</a:t>
             </a:r>
             <a:r>
               <a:rPr lang="fr-FR" dirty="0"/>
@@ -15282,15 +15318,11 @@
             </a:r>
             <a:r>
               <a:rPr lang="fr-FR" dirty="0" err="1"/>
-              <a:t>with</a:t>
-            </a:r>
-            <a:r>
-              <a:rPr lang="fr-FR" dirty="0"/>
-              <a:t> simple </a:t>
-            </a:r>
-            <a:r>
-              <a:rPr lang="fr-FR" dirty="0" err="1"/>
-              <a:t>words</a:t>
+              <a:t>random</a:t>
+            </a:r>
+            <a:r>
+              <a:rPr lang="fr-FR"/>
+              <a:t> training</a:t>
             </a:r>
             <a:endParaRPr lang="en-GB" dirty="0"/>
           </a:p>

</xml_diff>

<commit_message>
#12 Colors added to understand RL on slides
</commit_message>
<xml_diff>
--- a/SAI_presentation.pptx
+++ b/SAI_presentation.pptx
@@ -6740,7 +6740,7 @@
             <a:fld id="{B61BEF0D-F0BB-DE4B-95CE-6DB70DBA9567}" type="datetimeFigureOut">
               <a:rPr lang="en-US" dirty="0"/>
               <a:pPr/>
-              <a:t>3/4/2020</a:t>
+              <a:t>3/5/2020</a:t>
             </a:fld>
             <a:endParaRPr lang="en-US" dirty="0"/>
           </a:p>
@@ -7173,7 +7173,7 @@
             <a:fld id="{B61BEF0D-F0BB-DE4B-95CE-6DB70DBA9567}" type="datetimeFigureOut">
               <a:rPr lang="en-US" dirty="0"/>
               <a:pPr/>
-              <a:t>3/4/2020</a:t>
+              <a:t>3/5/2020</a:t>
             </a:fld>
             <a:endParaRPr lang="en-US" dirty="0"/>
           </a:p>
@@ -7420,7 +7420,7 @@
             <a:fld id="{B61BEF0D-F0BB-DE4B-95CE-6DB70DBA9567}" type="datetimeFigureOut">
               <a:rPr lang="en-US" dirty="0"/>
               <a:pPr/>
-              <a:t>3/4/2020</a:t>
+              <a:t>3/5/2020</a:t>
             </a:fld>
             <a:endParaRPr lang="en-US" dirty="0"/>
           </a:p>
@@ -7725,7 +7725,7 @@
             <a:fld id="{B61BEF0D-F0BB-DE4B-95CE-6DB70DBA9567}" type="datetimeFigureOut">
               <a:rPr lang="en-US" dirty="0"/>
               <a:pPr/>
-              <a:t>3/4/2020</a:t>
+              <a:t>3/5/2020</a:t>
             </a:fld>
             <a:endParaRPr lang="en-US" dirty="0"/>
           </a:p>
@@ -8040,7 +8040,7 @@
             <a:fld id="{B61BEF0D-F0BB-DE4B-95CE-6DB70DBA9567}" type="datetimeFigureOut">
               <a:rPr lang="en-US" dirty="0"/>
               <a:pPr/>
-              <a:t>3/4/2020</a:t>
+              <a:t>3/5/2020</a:t>
             </a:fld>
             <a:endParaRPr lang="en-US" dirty="0"/>
           </a:p>
@@ -8339,7 +8339,7 @@
             <a:fld id="{B61BEF0D-F0BB-DE4B-95CE-6DB70DBA9567}" type="datetimeFigureOut">
               <a:rPr lang="en-US" dirty="0"/>
               <a:pPr/>
-              <a:t>3/4/2020</a:t>
+              <a:t>3/5/2020</a:t>
             </a:fld>
             <a:endParaRPr lang="en-US" dirty="0"/>
           </a:p>
@@ -8703,7 +8703,7 @@
             <a:fld id="{B61BEF0D-F0BB-DE4B-95CE-6DB70DBA9567}" type="datetimeFigureOut">
               <a:rPr lang="en-US" dirty="0"/>
               <a:pPr/>
-              <a:t>3/4/2020</a:t>
+              <a:t>3/5/2020</a:t>
             </a:fld>
             <a:endParaRPr lang="en-US" dirty="0"/>
           </a:p>
@@ -8874,7 +8874,7 @@
             <a:fld id="{B61BEF0D-F0BB-DE4B-95CE-6DB70DBA9567}" type="datetimeFigureOut">
               <a:rPr lang="en-US" dirty="0"/>
               <a:pPr/>
-              <a:t>3/4/2020</a:t>
+              <a:t>3/5/2020</a:t>
             </a:fld>
             <a:endParaRPr lang="en-US" dirty="0"/>
           </a:p>
@@ -9051,7 +9051,7 @@
             <a:fld id="{B61BEF0D-F0BB-DE4B-95CE-6DB70DBA9567}" type="datetimeFigureOut">
               <a:rPr lang="en-US" dirty="0"/>
               <a:pPr/>
-              <a:t>3/4/2020</a:t>
+              <a:t>3/5/2020</a:t>
             </a:fld>
             <a:endParaRPr lang="en-US" dirty="0"/>
           </a:p>
@@ -9218,7 +9218,7 @@
             <a:fld id="{B61BEF0D-F0BB-DE4B-95CE-6DB70DBA9567}" type="datetimeFigureOut">
               <a:rPr lang="en-US" dirty="0"/>
               <a:pPr/>
-              <a:t>3/4/2020</a:t>
+              <a:t>3/5/2020</a:t>
             </a:fld>
             <a:endParaRPr lang="en-US" dirty="0"/>
           </a:p>
@@ -9465,7 +9465,7 @@
             <a:fld id="{B61BEF0D-F0BB-DE4B-95CE-6DB70DBA9567}" type="datetimeFigureOut">
               <a:rPr lang="en-US" dirty="0"/>
               <a:pPr/>
-              <a:t>3/4/2020</a:t>
+              <a:t>3/5/2020</a:t>
             </a:fld>
             <a:endParaRPr lang="en-US" dirty="0"/>
           </a:p>
@@ -9698,7 +9698,7 @@
             <a:fld id="{B61BEF0D-F0BB-DE4B-95CE-6DB70DBA9567}" type="datetimeFigureOut">
               <a:rPr lang="en-US" dirty="0"/>
               <a:pPr/>
-              <a:t>3/4/2020</a:t>
+              <a:t>3/5/2020</a:t>
             </a:fld>
             <a:endParaRPr lang="en-US" dirty="0"/>
           </a:p>
@@ -10077,7 +10077,7 @@
             <a:fld id="{B61BEF0D-F0BB-DE4B-95CE-6DB70DBA9567}" type="datetimeFigureOut">
               <a:rPr lang="en-US" dirty="0"/>
               <a:pPr/>
-              <a:t>3/4/2020</a:t>
+              <a:t>3/5/2020</a:t>
             </a:fld>
             <a:endParaRPr lang="en-US" dirty="0"/>
           </a:p>
@@ -10192,7 +10192,7 @@
             <a:fld id="{B61BEF0D-F0BB-DE4B-95CE-6DB70DBA9567}" type="datetimeFigureOut">
               <a:rPr lang="en-US" dirty="0"/>
               <a:pPr/>
-              <a:t>3/4/2020</a:t>
+              <a:t>3/5/2020</a:t>
             </a:fld>
             <a:endParaRPr lang="en-US" dirty="0"/>
           </a:p>
@@ -10284,7 +10284,7 @@
             <a:fld id="{B61BEF0D-F0BB-DE4B-95CE-6DB70DBA9567}" type="datetimeFigureOut">
               <a:rPr lang="en-US" dirty="0"/>
               <a:pPr/>
-              <a:t>3/4/2020</a:t>
+              <a:t>3/5/2020</a:t>
             </a:fld>
             <a:endParaRPr lang="en-US" dirty="0"/>
           </a:p>
@@ -10536,7 +10536,7 @@
             <a:fld id="{B61BEF0D-F0BB-DE4B-95CE-6DB70DBA9567}" type="datetimeFigureOut">
               <a:rPr lang="en-US" dirty="0"/>
               <a:pPr/>
-              <a:t>3/4/2020</a:t>
+              <a:t>3/5/2020</a:t>
             </a:fld>
             <a:endParaRPr lang="en-US" dirty="0"/>
           </a:p>
@@ -10816,7 +10816,7 @@
             <a:fld id="{B61BEF0D-F0BB-DE4B-95CE-6DB70DBA9567}" type="datetimeFigureOut">
               <a:rPr lang="en-US" dirty="0"/>
               <a:pPr/>
-              <a:t>3/4/2020</a:t>
+              <a:t>3/5/2020</a:t>
             </a:fld>
             <a:endParaRPr lang="en-US" dirty="0"/>
           </a:p>
@@ -11219,7 +11219,7 @@
             <a:fld id="{B61BEF0D-F0BB-DE4B-95CE-6DB70DBA9567}" type="datetimeFigureOut">
               <a:rPr lang="en-US" dirty="0"/>
               <a:pPr/>
-              <a:t>3/4/2020</a:t>
+              <a:t>3/5/2020</a:t>
             </a:fld>
             <a:endParaRPr lang="en-US" dirty="0"/>
           </a:p>
@@ -15159,8 +15159,16 @@
           <a:lstStyle/>
           <a:p>
             <a:r>
+              <a:rPr lang="fr-FR" b="1" dirty="0">
+                <a:solidFill>
+                  <a:srgbClr val="00B050"/>
+                </a:solidFill>
+              </a:rPr>
+              <a:t>Policy</a:t>
+            </a:r>
+            <a:r>
               <a:rPr lang="fr-FR" dirty="0"/>
-              <a:t>Policy (a):  the </a:t>
+              <a:t> :  the </a:t>
             </a:r>
             <a:r>
               <a:rPr lang="fr-FR" dirty="0" err="1"/>
@@ -15178,8 +15186,16 @@
           </a:p>
           <a:p>
             <a:r>
+              <a:rPr lang="fr-FR" b="1" dirty="0">
+                <a:solidFill>
+                  <a:srgbClr val="FFFF00"/>
+                </a:solidFill>
+              </a:rPr>
+              <a:t>State value-fonction </a:t>
+            </a:r>
+            <a:r>
               <a:rPr lang="fr-FR" dirty="0"/>
-              <a:t>State value-fonction (s): how « good » </a:t>
+              <a:t>: how « good » </a:t>
             </a:r>
             <a:r>
               <a:rPr lang="fr-FR" dirty="0" err="1"/>
@@ -15224,7 +15240,31 @@
             </a:r>
             <a:r>
               <a:rPr lang="fr-FR" sz="4000" b="1" dirty="0"/>
-              <a:t>Q(s, a) =  </a:t>
+              <a:t>Q(</a:t>
+            </a:r>
+            <a:r>
+              <a:rPr lang="fr-FR" sz="4000" b="1" dirty="0">
+                <a:solidFill>
+                  <a:srgbClr val="FFFF00"/>
+                </a:solidFill>
+              </a:rPr>
+              <a:t>s</a:t>
+            </a:r>
+            <a:r>
+              <a:rPr lang="fr-FR" sz="4000" b="1" dirty="0"/>
+              <a:t>, </a:t>
+            </a:r>
+            <a:r>
+              <a:rPr lang="fr-FR" sz="4000" b="1" dirty="0">
+                <a:solidFill>
+                  <a:srgbClr val="00B050"/>
+                </a:solidFill>
+              </a:rPr>
+              <a:t>a</a:t>
+            </a:r>
+            <a:r>
+              <a:rPr lang="fr-FR" sz="4000" b="1" dirty="0"/>
+              <a:t>) =  </a:t>
             </a:r>
             <a:r>
               <a:rPr lang="fr-FR" sz="4000" b="1" dirty="0" err="1"/>
@@ -15321,7 +15361,7 @@
               <a:t>random</a:t>
             </a:r>
             <a:r>
-              <a:rPr lang="fr-FR"/>
+              <a:rPr lang="fr-FR" dirty="0"/>
               <a:t> training</a:t>
             </a:r>
             <a:endParaRPr lang="en-GB" dirty="0"/>

</xml_diff>

<commit_message>
#12 Dynamic learning paper explain added on slides
</commit_message>
<xml_diff>
--- a/SAI_presentation.pptx
+++ b/SAI_presentation.pptx
@@ -15453,16 +15453,72 @@
           <a:lstStyle/>
           <a:p>
             <a:r>
-              <a:rPr lang="fr-FR" dirty="0" err="1"/>
-              <a:t>Explain</a:t>
-            </a:r>
-            <a:r>
               <a:rPr lang="fr-FR" dirty="0"/>
-              <a:t> the </a:t>
+              <a:t>This </a:t>
             </a:r>
             <a:r>
               <a:rPr lang="fr-FR" dirty="0" err="1"/>
               <a:t>research</a:t>
+            </a:r>
+            <a:r>
+              <a:rPr lang="fr-FR" dirty="0"/>
+              <a:t> show us </a:t>
+            </a:r>
+            <a:r>
+              <a:rPr lang="fr-FR" dirty="0" err="1"/>
+              <a:t>that</a:t>
+            </a:r>
+            <a:r>
+              <a:rPr lang="fr-FR" dirty="0"/>
+              <a:t> the AI </a:t>
+            </a:r>
+            <a:r>
+              <a:rPr lang="fr-FR" dirty="0" err="1"/>
+              <a:t>will</a:t>
+            </a:r>
+            <a:r>
+              <a:rPr lang="fr-FR" dirty="0"/>
+              <a:t> </a:t>
+            </a:r>
+            <a:r>
+              <a:rPr lang="fr-FR" dirty="0" err="1"/>
+              <a:t>learn</a:t>
+            </a:r>
+            <a:r>
+              <a:rPr lang="fr-FR" dirty="0"/>
+              <a:t> </a:t>
+            </a:r>
+            <a:r>
+              <a:rPr lang="fr-FR" dirty="0" err="1"/>
+              <a:t>better</a:t>
+            </a:r>
+            <a:r>
+              <a:rPr lang="fr-FR" dirty="0"/>
+              <a:t> </a:t>
+            </a:r>
+            <a:r>
+              <a:rPr lang="fr-FR" dirty="0" err="1"/>
+              <a:t>policy</a:t>
+            </a:r>
+            <a:r>
+              <a:rPr lang="fr-FR" dirty="0"/>
+              <a:t> </a:t>
+            </a:r>
+            <a:r>
+              <a:rPr lang="fr-FR" dirty="0" err="1"/>
+              <a:t>using</a:t>
+            </a:r>
+            <a:r>
+              <a:rPr lang="fr-FR" dirty="0"/>
+              <a:t> Human </a:t>
+            </a:r>
+            <a:r>
+              <a:rPr lang="fr-FR" dirty="0" err="1"/>
+              <a:t>decision</a:t>
+            </a:r>
+            <a:r>
+              <a:rPr lang="fr-FR"/>
+              <a:t>.</a:t>
             </a:r>
             <a:endParaRPr lang="fr-FR" dirty="0"/>
           </a:p>

</xml_diff>

<commit_message>
#12 Indication to explain RL added on slides
</commit_message>
<xml_diff>
--- a/SAI_presentation.pptx
+++ b/SAI_presentation.pptx
@@ -15309,6 +15309,26 @@
               <a:rPr lang="fr-FR" dirty="0" err="1"/>
               <a:t>understand</a:t>
             </a:r>
+            <a:r>
+              <a:rPr lang="fr-FR" dirty="0"/>
+              <a:t> (tic tac </a:t>
+            </a:r>
+            <a:r>
+              <a:rPr lang="fr-FR" dirty="0" err="1"/>
+              <a:t>toe</a:t>
+            </a:r>
+            <a:r>
+              <a:rPr lang="fr-FR" dirty="0"/>
+              <a:t> </a:t>
+            </a:r>
+            <a:r>
+              <a:rPr lang="fr-FR" dirty="0" err="1"/>
+              <a:t>example</a:t>
+            </a:r>
+            <a:r>
+              <a:rPr lang="fr-FR"/>
+              <a:t>)</a:t>
+            </a:r>
             <a:endParaRPr lang="fr-FR" dirty="0"/>
           </a:p>
           <a:p>

</xml_diff>

<commit_message>
#12 First try to build schema to dynamic learning added on slides
</commit_message>
<xml_diff>
--- a/SAI_presentation.pptx
+++ b/SAI_presentation.pptx
@@ -6740,7 +6740,7 @@
             <a:fld id="{B61BEF0D-F0BB-DE4B-95CE-6DB70DBA9567}" type="datetimeFigureOut">
               <a:rPr lang="en-US" dirty="0"/>
               <a:pPr/>
-              <a:t>3/5/2020</a:t>
+              <a:t>3/6/2020</a:t>
             </a:fld>
             <a:endParaRPr lang="en-US" dirty="0"/>
           </a:p>
@@ -7173,7 +7173,7 @@
             <a:fld id="{B61BEF0D-F0BB-DE4B-95CE-6DB70DBA9567}" type="datetimeFigureOut">
               <a:rPr lang="en-US" dirty="0"/>
               <a:pPr/>
-              <a:t>3/5/2020</a:t>
+              <a:t>3/6/2020</a:t>
             </a:fld>
             <a:endParaRPr lang="en-US" dirty="0"/>
           </a:p>
@@ -7420,7 +7420,7 @@
             <a:fld id="{B61BEF0D-F0BB-DE4B-95CE-6DB70DBA9567}" type="datetimeFigureOut">
               <a:rPr lang="en-US" dirty="0"/>
               <a:pPr/>
-              <a:t>3/5/2020</a:t>
+              <a:t>3/6/2020</a:t>
             </a:fld>
             <a:endParaRPr lang="en-US" dirty="0"/>
           </a:p>
@@ -7725,7 +7725,7 @@
             <a:fld id="{B61BEF0D-F0BB-DE4B-95CE-6DB70DBA9567}" type="datetimeFigureOut">
               <a:rPr lang="en-US" dirty="0"/>
               <a:pPr/>
-              <a:t>3/5/2020</a:t>
+              <a:t>3/6/2020</a:t>
             </a:fld>
             <a:endParaRPr lang="en-US" dirty="0"/>
           </a:p>
@@ -8040,7 +8040,7 @@
             <a:fld id="{B61BEF0D-F0BB-DE4B-95CE-6DB70DBA9567}" type="datetimeFigureOut">
               <a:rPr lang="en-US" dirty="0"/>
               <a:pPr/>
-              <a:t>3/5/2020</a:t>
+              <a:t>3/6/2020</a:t>
             </a:fld>
             <a:endParaRPr lang="en-US" dirty="0"/>
           </a:p>
@@ -8339,7 +8339,7 @@
             <a:fld id="{B61BEF0D-F0BB-DE4B-95CE-6DB70DBA9567}" type="datetimeFigureOut">
               <a:rPr lang="en-US" dirty="0"/>
               <a:pPr/>
-              <a:t>3/5/2020</a:t>
+              <a:t>3/6/2020</a:t>
             </a:fld>
             <a:endParaRPr lang="en-US" dirty="0"/>
           </a:p>
@@ -8703,7 +8703,7 @@
             <a:fld id="{B61BEF0D-F0BB-DE4B-95CE-6DB70DBA9567}" type="datetimeFigureOut">
               <a:rPr lang="en-US" dirty="0"/>
               <a:pPr/>
-              <a:t>3/5/2020</a:t>
+              <a:t>3/6/2020</a:t>
             </a:fld>
             <a:endParaRPr lang="en-US" dirty="0"/>
           </a:p>
@@ -8874,7 +8874,7 @@
             <a:fld id="{B61BEF0D-F0BB-DE4B-95CE-6DB70DBA9567}" type="datetimeFigureOut">
               <a:rPr lang="en-US" dirty="0"/>
               <a:pPr/>
-              <a:t>3/5/2020</a:t>
+              <a:t>3/6/2020</a:t>
             </a:fld>
             <a:endParaRPr lang="en-US" dirty="0"/>
           </a:p>
@@ -9051,7 +9051,7 @@
             <a:fld id="{B61BEF0D-F0BB-DE4B-95CE-6DB70DBA9567}" type="datetimeFigureOut">
               <a:rPr lang="en-US" dirty="0"/>
               <a:pPr/>
-              <a:t>3/5/2020</a:t>
+              <a:t>3/6/2020</a:t>
             </a:fld>
             <a:endParaRPr lang="en-US" dirty="0"/>
           </a:p>
@@ -9218,7 +9218,7 @@
             <a:fld id="{B61BEF0D-F0BB-DE4B-95CE-6DB70DBA9567}" type="datetimeFigureOut">
               <a:rPr lang="en-US" dirty="0"/>
               <a:pPr/>
-              <a:t>3/5/2020</a:t>
+              <a:t>3/6/2020</a:t>
             </a:fld>
             <a:endParaRPr lang="en-US" dirty="0"/>
           </a:p>
@@ -9465,7 +9465,7 @@
             <a:fld id="{B61BEF0D-F0BB-DE4B-95CE-6DB70DBA9567}" type="datetimeFigureOut">
               <a:rPr lang="en-US" dirty="0"/>
               <a:pPr/>
-              <a:t>3/5/2020</a:t>
+              <a:t>3/6/2020</a:t>
             </a:fld>
             <a:endParaRPr lang="en-US" dirty="0"/>
           </a:p>
@@ -9698,7 +9698,7 @@
             <a:fld id="{B61BEF0D-F0BB-DE4B-95CE-6DB70DBA9567}" type="datetimeFigureOut">
               <a:rPr lang="en-US" dirty="0"/>
               <a:pPr/>
-              <a:t>3/5/2020</a:t>
+              <a:t>3/6/2020</a:t>
             </a:fld>
             <a:endParaRPr lang="en-US" dirty="0"/>
           </a:p>
@@ -10077,7 +10077,7 @@
             <a:fld id="{B61BEF0D-F0BB-DE4B-95CE-6DB70DBA9567}" type="datetimeFigureOut">
               <a:rPr lang="en-US" dirty="0"/>
               <a:pPr/>
-              <a:t>3/5/2020</a:t>
+              <a:t>3/6/2020</a:t>
             </a:fld>
             <a:endParaRPr lang="en-US" dirty="0"/>
           </a:p>
@@ -10192,7 +10192,7 @@
             <a:fld id="{B61BEF0D-F0BB-DE4B-95CE-6DB70DBA9567}" type="datetimeFigureOut">
               <a:rPr lang="en-US" dirty="0"/>
               <a:pPr/>
-              <a:t>3/5/2020</a:t>
+              <a:t>3/6/2020</a:t>
             </a:fld>
             <a:endParaRPr lang="en-US" dirty="0"/>
           </a:p>
@@ -10284,7 +10284,7 @@
             <a:fld id="{B61BEF0D-F0BB-DE4B-95CE-6DB70DBA9567}" type="datetimeFigureOut">
               <a:rPr lang="en-US" dirty="0"/>
               <a:pPr/>
-              <a:t>3/5/2020</a:t>
+              <a:t>3/6/2020</a:t>
             </a:fld>
             <a:endParaRPr lang="en-US" dirty="0"/>
           </a:p>
@@ -10536,7 +10536,7 @@
             <a:fld id="{B61BEF0D-F0BB-DE4B-95CE-6DB70DBA9567}" type="datetimeFigureOut">
               <a:rPr lang="en-US" dirty="0"/>
               <a:pPr/>
-              <a:t>3/5/2020</a:t>
+              <a:t>3/6/2020</a:t>
             </a:fld>
             <a:endParaRPr lang="en-US" dirty="0"/>
           </a:p>
@@ -10816,7 +10816,7 @@
             <a:fld id="{B61BEF0D-F0BB-DE4B-95CE-6DB70DBA9567}" type="datetimeFigureOut">
               <a:rPr lang="en-US" dirty="0"/>
               <a:pPr/>
-              <a:t>3/5/2020</a:t>
+              <a:t>3/6/2020</a:t>
             </a:fld>
             <a:endParaRPr lang="en-US" dirty="0"/>
           </a:p>
@@ -11219,7 +11219,7 @@
             <a:fld id="{B61BEF0D-F0BB-DE4B-95CE-6DB70DBA9567}" type="datetimeFigureOut">
               <a:rPr lang="en-US" dirty="0"/>
               <a:pPr/>
-              <a:t>3/5/2020</a:t>
+              <a:t>3/6/2020</a:t>
             </a:fld>
             <a:endParaRPr lang="en-US" dirty="0"/>
           </a:p>
@@ -15537,10 +15537,9 @@
               <a:t>decision</a:t>
             </a:r>
             <a:r>
-              <a:rPr lang="fr-FR"/>
+              <a:rPr lang="fr-FR" dirty="0"/>
               <a:t>.</a:t>
             </a:r>
-            <a:endParaRPr lang="fr-FR" dirty="0"/>
           </a:p>
           <a:p>
             <a:r>
@@ -15583,25 +15582,159 @@
             <a:endParaRPr lang="fr-FR" dirty="0"/>
           </a:p>
           <a:p>
+            <a:endParaRPr lang="en-GB" dirty="0"/>
+          </a:p>
+          <a:p>
+            <a:endParaRPr lang="en-GB" dirty="0"/>
+          </a:p>
+        </p:txBody>
+      </p:sp>
+      <p:sp>
+        <p:nvSpPr>
+          <p:cNvPr id="4" name="Rectangle 3">
+            <a:extLst>
+              <a:ext uri="{FF2B5EF4-FFF2-40B4-BE49-F238E27FC236}">
+                <a16:creationId xmlns:a16="http://schemas.microsoft.com/office/drawing/2014/main" id="{001AFB83-D8C7-451F-B5B1-7CC8B478896D}"/>
+              </a:ext>
+            </a:extLst>
+          </p:cNvPr>
+          <p:cNvSpPr/>
+          <p:nvPr/>
+        </p:nvSpPr>
+        <p:spPr>
+          <a:xfrm>
+            <a:off x="2521262" y="3979173"/>
+            <a:ext cx="1882066" cy="807868"/>
+          </a:xfrm>
+          <a:prstGeom prst="rect">
+            <a:avLst/>
+          </a:prstGeom>
+        </p:spPr>
+        <p:style>
+          <a:lnRef idx="2">
+            <a:schemeClr val="accent1">
+              <a:shade val="50000"/>
+            </a:schemeClr>
+          </a:lnRef>
+          <a:fillRef idx="1">
+            <a:schemeClr val="accent1"/>
+          </a:fillRef>
+          <a:effectRef idx="0">
+            <a:schemeClr val="accent1"/>
+          </a:effectRef>
+          <a:fontRef idx="minor">
+            <a:schemeClr val="lt1"/>
+          </a:fontRef>
+        </p:style>
+        <p:txBody>
+          <a:bodyPr rtlCol="0" anchor="ctr"/>
+          <a:lstStyle/>
+          <a:p>
+            <a:pPr algn="ctr"/>
             <a:r>
               <a:rPr lang="fr-FR" dirty="0"/>
-              <a:t>Show a </a:t>
-            </a:r>
+              <a:t>Training</a:t>
+            </a:r>
+            <a:endParaRPr lang="en-GB" dirty="0"/>
+          </a:p>
+        </p:txBody>
+      </p:sp>
+      <p:sp>
+        <p:nvSpPr>
+          <p:cNvPr id="5" name="Rectangle 4">
+            <a:extLst>
+              <a:ext uri="{FF2B5EF4-FFF2-40B4-BE49-F238E27FC236}">
+                <a16:creationId xmlns:a16="http://schemas.microsoft.com/office/drawing/2014/main" id="{17A9BB1A-A8C4-4D45-BC88-08199D5EEEA7}"/>
+              </a:ext>
+            </a:extLst>
+          </p:cNvPr>
+          <p:cNvSpPr/>
+          <p:nvPr/>
+        </p:nvSpPr>
+        <p:spPr>
+          <a:xfrm>
+            <a:off x="5487884" y="3979173"/>
+            <a:ext cx="1882066" cy="807868"/>
+          </a:xfrm>
+          <a:prstGeom prst="rect">
+            <a:avLst/>
+          </a:prstGeom>
+        </p:spPr>
+        <p:style>
+          <a:lnRef idx="2">
+            <a:schemeClr val="accent1">
+              <a:shade val="50000"/>
+            </a:schemeClr>
+          </a:lnRef>
+          <a:fillRef idx="1">
+            <a:schemeClr val="accent1"/>
+          </a:fillRef>
+          <a:effectRef idx="0">
+            <a:schemeClr val="accent1"/>
+          </a:effectRef>
+          <a:fontRef idx="minor">
+            <a:schemeClr val="lt1"/>
+          </a:fontRef>
+        </p:style>
+        <p:txBody>
+          <a:bodyPr rtlCol="0" anchor="ctr"/>
+          <a:lstStyle/>
+          <a:p>
+            <a:pPr algn="ctr"/>
             <a:r>
               <a:rPr lang="fr-FR" dirty="0" err="1"/>
-              <a:t>schema</a:t>
-            </a:r>
+              <a:t>Decision</a:t>
+            </a:r>
+            <a:endParaRPr lang="en-GB" dirty="0"/>
+          </a:p>
+        </p:txBody>
+      </p:sp>
+      <p:sp>
+        <p:nvSpPr>
+          <p:cNvPr id="6" name="Rectangle 5">
+            <a:extLst>
+              <a:ext uri="{FF2B5EF4-FFF2-40B4-BE49-F238E27FC236}">
+                <a16:creationId xmlns:a16="http://schemas.microsoft.com/office/drawing/2014/main" id="{6FAEF210-ED99-45EF-8734-8925E9DED7C8}"/>
+              </a:ext>
+            </a:extLst>
+          </p:cNvPr>
+          <p:cNvSpPr/>
+          <p:nvPr/>
+        </p:nvSpPr>
+        <p:spPr>
+          <a:xfrm>
+            <a:off x="2521262" y="2842992"/>
+            <a:ext cx="1882066" cy="807868"/>
+          </a:xfrm>
+          <a:prstGeom prst="rect">
+            <a:avLst/>
+          </a:prstGeom>
+        </p:spPr>
+        <p:style>
+          <a:lnRef idx="2">
+            <a:schemeClr val="accent1">
+              <a:shade val="50000"/>
+            </a:schemeClr>
+          </a:lnRef>
+          <a:fillRef idx="1">
+            <a:schemeClr val="accent1"/>
+          </a:fillRef>
+          <a:effectRef idx="0">
+            <a:schemeClr val="accent1"/>
+          </a:effectRef>
+          <a:fontRef idx="minor">
+            <a:schemeClr val="lt1"/>
+          </a:fontRef>
+        </p:style>
+        <p:txBody>
+          <a:bodyPr rtlCol="0" anchor="ctr"/>
+          <a:lstStyle/>
+          <a:p>
+            <a:pPr algn="ctr"/>
             <a:r>
               <a:rPr lang="fr-FR" dirty="0"/>
-              <a:t> to </a:t>
-            </a:r>
-            <a:r>
-              <a:rPr lang="fr-FR" dirty="0" err="1"/>
-              <a:t>understand</a:t>
-            </a:r>
-            <a:endParaRPr lang="en-GB" dirty="0"/>
-          </a:p>
-          <a:p>
+              <a:t>Expert</a:t>
+            </a:r>
             <a:endParaRPr lang="en-GB" dirty="0"/>
           </a:p>
         </p:txBody>

</xml_diff>

<commit_message>
#12 Second try to build schema to dynamic learning using colors on slides
</commit_message>
<xml_diff>
--- a/SAI_presentation.pptx
+++ b/SAI_presentation.pptx
@@ -15490,50 +15490,124 @@
             </a:r>
             <a:r>
               <a:rPr lang="fr-FR" dirty="0"/>
-              <a:t> the AI </a:t>
+              <a:t> the </a:t>
+            </a:r>
+            <a:r>
+              <a:rPr lang="fr-FR" b="1" dirty="0">
+                <a:solidFill>
+                  <a:srgbClr val="00B050"/>
+                </a:solidFill>
+              </a:rPr>
+              <a:t>AI </a:t>
+            </a:r>
+            <a:r>
+              <a:rPr lang="fr-FR" b="1" dirty="0" err="1">
+                <a:solidFill>
+                  <a:srgbClr val="00B050"/>
+                </a:solidFill>
+              </a:rPr>
+              <a:t>will</a:t>
+            </a:r>
+            <a:r>
+              <a:rPr lang="fr-FR" b="1" dirty="0">
+                <a:solidFill>
+                  <a:srgbClr val="00B050"/>
+                </a:solidFill>
+              </a:rPr>
+              <a:t> </a:t>
+            </a:r>
+            <a:r>
+              <a:rPr lang="fr-FR" b="1" dirty="0" err="1">
+                <a:solidFill>
+                  <a:srgbClr val="00B050"/>
+                </a:solidFill>
+              </a:rPr>
+              <a:t>learn</a:t>
+            </a:r>
+            <a:r>
+              <a:rPr lang="fr-FR" b="1" dirty="0">
+                <a:solidFill>
+                  <a:srgbClr val="00B050"/>
+                </a:solidFill>
+              </a:rPr>
+              <a:t> </a:t>
+            </a:r>
+            <a:r>
+              <a:rPr lang="fr-FR" b="1" dirty="0" err="1">
+                <a:solidFill>
+                  <a:srgbClr val="00B050"/>
+                </a:solidFill>
+              </a:rPr>
+              <a:t>better</a:t>
+            </a:r>
+            <a:r>
+              <a:rPr lang="fr-FR" b="1" dirty="0">
+                <a:solidFill>
+                  <a:srgbClr val="00B050"/>
+                </a:solidFill>
+              </a:rPr>
+              <a:t> </a:t>
+            </a:r>
+            <a:r>
+              <a:rPr lang="fr-FR" b="1" dirty="0" err="1">
+                <a:solidFill>
+                  <a:srgbClr val="00B050"/>
+                </a:solidFill>
+              </a:rPr>
+              <a:t>policy</a:t>
+            </a:r>
+            <a:r>
+              <a:rPr lang="fr-FR" b="1" dirty="0">
+                <a:solidFill>
+                  <a:srgbClr val="00B050"/>
+                </a:solidFill>
+              </a:rPr>
+              <a:t> </a:t>
             </a:r>
             <a:r>
               <a:rPr lang="fr-FR" dirty="0" err="1"/>
-              <a:t>will</a:t>
+              <a:t>using</a:t>
             </a:r>
             <a:r>
               <a:rPr lang="fr-FR" dirty="0"/>
               <a:t> </a:t>
             </a:r>
             <a:r>
+              <a:rPr lang="fr-FR" b="1" dirty="0">
+                <a:solidFill>
+                  <a:srgbClr val="FFC000"/>
+                </a:solidFill>
+              </a:rPr>
+              <a:t>an expert </a:t>
+            </a:r>
+            <a:r>
+              <a:rPr lang="fr-FR" dirty="0"/>
+              <a:t>to </a:t>
+            </a:r>
+            <a:r>
               <a:rPr lang="fr-FR" dirty="0" err="1"/>
-              <a:t>learn</a:t>
+              <a:t>make</a:t>
             </a:r>
             <a:r>
               <a:rPr lang="fr-FR" dirty="0"/>
+              <a:t> a</a:t>
+            </a:r>
+            <a:r>
+              <a:rPr lang="fr-FR" b="1" dirty="0">
+                <a:solidFill>
+                  <a:srgbClr val="FFC000"/>
+                </a:solidFill>
+              </a:rPr>
               <a:t> </a:t>
             </a:r>
             <a:r>
-              <a:rPr lang="fr-FR" dirty="0" err="1"/>
-              <a:t>better</a:t>
-            </a:r>
-            <a:r>
-              <a:rPr lang="fr-FR" dirty="0"/>
-              <a:t> </a:t>
-            </a:r>
-            <a:r>
-              <a:rPr lang="fr-FR" dirty="0" err="1"/>
-              <a:t>policy</a:t>
-            </a:r>
-            <a:r>
-              <a:rPr lang="fr-FR" dirty="0"/>
-              <a:t> </a:t>
-            </a:r>
-            <a:r>
-              <a:rPr lang="fr-FR" dirty="0" err="1"/>
-              <a:t>using</a:t>
-            </a:r>
-            <a:r>
-              <a:rPr lang="fr-FR" dirty="0"/>
-              <a:t> Human </a:t>
-            </a:r>
-            <a:r>
-              <a:rPr lang="fr-FR" dirty="0" err="1"/>
+              <a:rPr lang="fr-FR" b="1" dirty="0" err="1">
+                <a:solidFill>
+                  <a:schemeClr val="accent2">
+                    <a:lumMod val="75000"/>
+                  </a:schemeClr>
+                </a:solidFill>
+              </a:rPr>
               <a:t>decision</a:t>
             </a:r>
             <a:r>
@@ -15609,6 +15683,18 @@
           <a:prstGeom prst="rect">
             <a:avLst/>
           </a:prstGeom>
+          <a:solidFill>
+            <a:schemeClr val="tx2">
+              <a:lumMod val="75000"/>
+            </a:schemeClr>
+          </a:solidFill>
+          <a:ln>
+            <a:solidFill>
+              <a:schemeClr val="tx2">
+                <a:lumMod val="50000"/>
+              </a:schemeClr>
+            </a:solidFill>
+          </a:ln>
         </p:spPr>
         <p:style>
           <a:lnRef idx="2">
@@ -15632,10 +15718,18 @@
           <a:p>
             <a:pPr algn="ctr"/>
             <a:r>
-              <a:rPr lang="fr-FR" dirty="0"/>
+              <a:rPr lang="fr-FR" b="1" dirty="0">
+                <a:solidFill>
+                  <a:srgbClr val="00B050"/>
+                </a:solidFill>
+              </a:rPr>
               <a:t>Training</a:t>
             </a:r>
-            <a:endParaRPr lang="en-GB" dirty="0"/>
+            <a:endParaRPr lang="en-GB" b="1" dirty="0">
+              <a:solidFill>
+                <a:srgbClr val="00B050"/>
+              </a:solidFill>
+            </a:endParaRPr>
           </a:p>
         </p:txBody>
       </p:sp>
@@ -15659,6 +15753,18 @@
           <a:prstGeom prst="rect">
             <a:avLst/>
           </a:prstGeom>
+          <a:solidFill>
+            <a:schemeClr val="tx2">
+              <a:lumMod val="75000"/>
+            </a:schemeClr>
+          </a:solidFill>
+          <a:ln>
+            <a:solidFill>
+              <a:schemeClr val="tx2">
+                <a:lumMod val="50000"/>
+              </a:schemeClr>
+            </a:solidFill>
+          </a:ln>
         </p:spPr>
         <p:style>
           <a:lnRef idx="2">
@@ -15682,10 +15788,22 @@
           <a:p>
             <a:pPr algn="ctr"/>
             <a:r>
-              <a:rPr lang="fr-FR" dirty="0" err="1"/>
+              <a:rPr lang="fr-FR" b="1" dirty="0" err="1">
+                <a:solidFill>
+                  <a:schemeClr val="accent2">
+                    <a:lumMod val="75000"/>
+                  </a:schemeClr>
+                </a:solidFill>
+              </a:rPr>
               <a:t>Decision</a:t>
             </a:r>
-            <a:endParaRPr lang="en-GB" dirty="0"/>
+            <a:endParaRPr lang="en-GB" b="1" dirty="0">
+              <a:solidFill>
+                <a:schemeClr val="accent2">
+                  <a:lumMod val="75000"/>
+                </a:schemeClr>
+              </a:solidFill>
+            </a:endParaRPr>
           </a:p>
         </p:txBody>
       </p:sp>
@@ -15709,6 +15827,18 @@
           <a:prstGeom prst="rect">
             <a:avLst/>
           </a:prstGeom>
+          <a:solidFill>
+            <a:schemeClr val="tx2">
+              <a:lumMod val="75000"/>
+            </a:schemeClr>
+          </a:solidFill>
+          <a:ln>
+            <a:solidFill>
+              <a:schemeClr val="tx2">
+                <a:lumMod val="50000"/>
+              </a:schemeClr>
+            </a:solidFill>
+          </a:ln>
         </p:spPr>
         <p:style>
           <a:lnRef idx="2">
@@ -15732,10 +15862,18 @@
           <a:p>
             <a:pPr algn="ctr"/>
             <a:r>
-              <a:rPr lang="fr-FR" dirty="0"/>
+              <a:rPr lang="fr-FR" b="1" dirty="0">
+                <a:solidFill>
+                  <a:srgbClr val="FFC000"/>
+                </a:solidFill>
+              </a:rPr>
               <a:t>Expert</a:t>
             </a:r>
-            <a:endParaRPr lang="en-GB" dirty="0"/>
+            <a:endParaRPr lang="en-GB" b="1" dirty="0">
+              <a:solidFill>
+                <a:srgbClr val="FFC000"/>
+              </a:solidFill>
+            </a:endParaRPr>
           </a:p>
         </p:txBody>
       </p:sp>

</xml_diff>

<commit_message>
#12 Second try to build schema to dynamic learning using arrows on slides
</commit_message>
<xml_diff>
--- a/SAI_presentation.pptx
+++ b/SAI_presentation.pptx
@@ -15821,7 +15821,7 @@
         </p:nvSpPr>
         <p:spPr>
           <a:xfrm>
-            <a:off x="2521262" y="2842992"/>
+            <a:off x="4004573" y="2771815"/>
             <a:ext cx="1882066" cy="807868"/>
           </a:xfrm>
           <a:prstGeom prst="rect">
@@ -15877,6 +15877,101 @@
           </a:p>
         </p:txBody>
       </p:sp>
+      <p:cxnSp>
+        <p:nvCxnSpPr>
+          <p:cNvPr id="7" name="Connecteur droit avec flèche 6">
+            <a:extLst>
+              <a:ext uri="{FF2B5EF4-FFF2-40B4-BE49-F238E27FC236}">
+                <a16:creationId xmlns:a16="http://schemas.microsoft.com/office/drawing/2014/main" id="{050A1325-F3BB-47A4-9B6C-7EBAFC746D3E}"/>
+              </a:ext>
+            </a:extLst>
+          </p:cNvPr>
+          <p:cNvCxnSpPr>
+            <a:cxnSpLocks/>
+            <a:endCxn id="5" idx="1"/>
+          </p:cNvCxnSpPr>
+          <p:nvPr/>
+        </p:nvCxnSpPr>
+        <p:spPr>
+          <a:xfrm>
+            <a:off x="4483223" y="4383107"/>
+            <a:ext cx="1004661" cy="0"/>
+          </a:xfrm>
+          <a:prstGeom prst="straightConnector1">
+            <a:avLst/>
+          </a:prstGeom>
+          <a:ln w="76200">
+            <a:solidFill>
+              <a:schemeClr val="accent1">
+                <a:lumMod val="50000"/>
+                <a:alpha val="60000"/>
+              </a:schemeClr>
+            </a:solidFill>
+            <a:tailEnd type="triangle"/>
+          </a:ln>
+        </p:spPr>
+        <p:style>
+          <a:lnRef idx="1">
+            <a:schemeClr val="accent1"/>
+          </a:lnRef>
+          <a:fillRef idx="0">
+            <a:schemeClr val="accent1"/>
+          </a:fillRef>
+          <a:effectRef idx="0">
+            <a:schemeClr val="accent1"/>
+          </a:effectRef>
+          <a:fontRef idx="minor">
+            <a:schemeClr val="tx1"/>
+          </a:fontRef>
+        </p:style>
+      </p:cxnSp>
+      <p:cxnSp>
+        <p:nvCxnSpPr>
+          <p:cNvPr id="12" name="Connecteur droit avec flèche 11">
+            <a:extLst>
+              <a:ext uri="{FF2B5EF4-FFF2-40B4-BE49-F238E27FC236}">
+                <a16:creationId xmlns:a16="http://schemas.microsoft.com/office/drawing/2014/main" id="{6BB9BBF3-45E0-4229-BB34-DEBEF07CBB5B}"/>
+              </a:ext>
+            </a:extLst>
+          </p:cNvPr>
+          <p:cNvCxnSpPr>
+            <a:cxnSpLocks/>
+          </p:cNvCxnSpPr>
+          <p:nvPr/>
+        </p:nvCxnSpPr>
+        <p:spPr>
+          <a:xfrm>
+            <a:off x="4985553" y="3657600"/>
+            <a:ext cx="0" cy="579600"/>
+          </a:xfrm>
+          <a:prstGeom prst="straightConnector1">
+            <a:avLst/>
+          </a:prstGeom>
+          <a:ln w="76200">
+            <a:solidFill>
+              <a:schemeClr val="accent1">
+                <a:lumMod val="50000"/>
+                <a:alpha val="60000"/>
+              </a:schemeClr>
+            </a:solidFill>
+            <a:tailEnd type="triangle"/>
+          </a:ln>
+        </p:spPr>
+        <p:style>
+          <a:lnRef idx="1">
+            <a:schemeClr val="accent1"/>
+          </a:lnRef>
+          <a:fillRef idx="0">
+            <a:schemeClr val="accent1"/>
+          </a:fillRef>
+          <a:effectRef idx="0">
+            <a:schemeClr val="accent1"/>
+          </a:effectRef>
+          <a:fontRef idx="minor">
+            <a:schemeClr val="tx1"/>
+          </a:fontRef>
+        </p:style>
+      </p:cxnSp>
     </p:spTree>
     <p:extLst>
       <p:ext uri="{BB962C8B-B14F-4D97-AF65-F5344CB8AC3E}">

</xml_diff>

<commit_message>
#12 Issue hard to deploy added on slides
</commit_message>
<xml_diff>
--- a/SAI_presentation.pptx
+++ b/SAI_presentation.pptx
@@ -11,13 +11,14 @@
     <p:sldId id="267" r:id="rId5"/>
     <p:sldId id="268" r:id="rId6"/>
     <p:sldId id="258" r:id="rId7"/>
-    <p:sldId id="259" r:id="rId8"/>
-    <p:sldId id="260" r:id="rId9"/>
-    <p:sldId id="261" r:id="rId10"/>
-    <p:sldId id="265" r:id="rId11"/>
-    <p:sldId id="262" r:id="rId12"/>
-    <p:sldId id="264" r:id="rId13"/>
-    <p:sldId id="263" r:id="rId14"/>
+    <p:sldId id="269" r:id="rId8"/>
+    <p:sldId id="259" r:id="rId9"/>
+    <p:sldId id="260" r:id="rId10"/>
+    <p:sldId id="261" r:id="rId11"/>
+    <p:sldId id="265" r:id="rId12"/>
+    <p:sldId id="262" r:id="rId13"/>
+    <p:sldId id="264" r:id="rId14"/>
+    <p:sldId id="263" r:id="rId15"/>
   </p:sldIdLst>
   <p:sldSz cx="12192000" cy="6858000"/>
   <p:notesSz cx="6858000" cy="9144000"/>
@@ -6740,7 +6741,7 @@
             <a:fld id="{B61BEF0D-F0BB-DE4B-95CE-6DB70DBA9567}" type="datetimeFigureOut">
               <a:rPr lang="en-US" dirty="0"/>
               <a:pPr/>
-              <a:t>3/6/2020</a:t>
+              <a:t>3/7/2020</a:t>
             </a:fld>
             <a:endParaRPr lang="en-US" dirty="0"/>
           </a:p>
@@ -7173,7 +7174,7 @@
             <a:fld id="{B61BEF0D-F0BB-DE4B-95CE-6DB70DBA9567}" type="datetimeFigureOut">
               <a:rPr lang="en-US" dirty="0"/>
               <a:pPr/>
-              <a:t>3/6/2020</a:t>
+              <a:t>3/7/2020</a:t>
             </a:fld>
             <a:endParaRPr lang="en-US" dirty="0"/>
           </a:p>
@@ -7420,7 +7421,7 @@
             <a:fld id="{B61BEF0D-F0BB-DE4B-95CE-6DB70DBA9567}" type="datetimeFigureOut">
               <a:rPr lang="en-US" dirty="0"/>
               <a:pPr/>
-              <a:t>3/6/2020</a:t>
+              <a:t>3/7/2020</a:t>
             </a:fld>
             <a:endParaRPr lang="en-US" dirty="0"/>
           </a:p>
@@ -7725,7 +7726,7 @@
             <a:fld id="{B61BEF0D-F0BB-DE4B-95CE-6DB70DBA9567}" type="datetimeFigureOut">
               <a:rPr lang="en-US" dirty="0"/>
               <a:pPr/>
-              <a:t>3/6/2020</a:t>
+              <a:t>3/7/2020</a:t>
             </a:fld>
             <a:endParaRPr lang="en-US" dirty="0"/>
           </a:p>
@@ -8040,7 +8041,7 @@
             <a:fld id="{B61BEF0D-F0BB-DE4B-95CE-6DB70DBA9567}" type="datetimeFigureOut">
               <a:rPr lang="en-US" dirty="0"/>
               <a:pPr/>
-              <a:t>3/6/2020</a:t>
+              <a:t>3/7/2020</a:t>
             </a:fld>
             <a:endParaRPr lang="en-US" dirty="0"/>
           </a:p>
@@ -8339,7 +8340,7 @@
             <a:fld id="{B61BEF0D-F0BB-DE4B-95CE-6DB70DBA9567}" type="datetimeFigureOut">
               <a:rPr lang="en-US" dirty="0"/>
               <a:pPr/>
-              <a:t>3/6/2020</a:t>
+              <a:t>3/7/2020</a:t>
             </a:fld>
             <a:endParaRPr lang="en-US" dirty="0"/>
           </a:p>
@@ -8703,7 +8704,7 @@
             <a:fld id="{B61BEF0D-F0BB-DE4B-95CE-6DB70DBA9567}" type="datetimeFigureOut">
               <a:rPr lang="en-US" dirty="0"/>
               <a:pPr/>
-              <a:t>3/6/2020</a:t>
+              <a:t>3/7/2020</a:t>
             </a:fld>
             <a:endParaRPr lang="en-US" dirty="0"/>
           </a:p>
@@ -8874,7 +8875,7 @@
             <a:fld id="{B61BEF0D-F0BB-DE4B-95CE-6DB70DBA9567}" type="datetimeFigureOut">
               <a:rPr lang="en-US" dirty="0"/>
               <a:pPr/>
-              <a:t>3/6/2020</a:t>
+              <a:t>3/7/2020</a:t>
             </a:fld>
             <a:endParaRPr lang="en-US" dirty="0"/>
           </a:p>
@@ -9051,7 +9052,7 @@
             <a:fld id="{B61BEF0D-F0BB-DE4B-95CE-6DB70DBA9567}" type="datetimeFigureOut">
               <a:rPr lang="en-US" dirty="0"/>
               <a:pPr/>
-              <a:t>3/6/2020</a:t>
+              <a:t>3/7/2020</a:t>
             </a:fld>
             <a:endParaRPr lang="en-US" dirty="0"/>
           </a:p>
@@ -9218,7 +9219,7 @@
             <a:fld id="{B61BEF0D-F0BB-DE4B-95CE-6DB70DBA9567}" type="datetimeFigureOut">
               <a:rPr lang="en-US" dirty="0"/>
               <a:pPr/>
-              <a:t>3/6/2020</a:t>
+              <a:t>3/7/2020</a:t>
             </a:fld>
             <a:endParaRPr lang="en-US" dirty="0"/>
           </a:p>
@@ -9465,7 +9466,7 @@
             <a:fld id="{B61BEF0D-F0BB-DE4B-95CE-6DB70DBA9567}" type="datetimeFigureOut">
               <a:rPr lang="en-US" dirty="0"/>
               <a:pPr/>
-              <a:t>3/6/2020</a:t>
+              <a:t>3/7/2020</a:t>
             </a:fld>
             <a:endParaRPr lang="en-US" dirty="0"/>
           </a:p>
@@ -9698,7 +9699,7 @@
             <a:fld id="{B61BEF0D-F0BB-DE4B-95CE-6DB70DBA9567}" type="datetimeFigureOut">
               <a:rPr lang="en-US" dirty="0"/>
               <a:pPr/>
-              <a:t>3/6/2020</a:t>
+              <a:t>3/7/2020</a:t>
             </a:fld>
             <a:endParaRPr lang="en-US" dirty="0"/>
           </a:p>
@@ -10077,7 +10078,7 @@
             <a:fld id="{B61BEF0D-F0BB-DE4B-95CE-6DB70DBA9567}" type="datetimeFigureOut">
               <a:rPr lang="en-US" dirty="0"/>
               <a:pPr/>
-              <a:t>3/6/2020</a:t>
+              <a:t>3/7/2020</a:t>
             </a:fld>
             <a:endParaRPr lang="en-US" dirty="0"/>
           </a:p>
@@ -10192,7 +10193,7 @@
             <a:fld id="{B61BEF0D-F0BB-DE4B-95CE-6DB70DBA9567}" type="datetimeFigureOut">
               <a:rPr lang="en-US" dirty="0"/>
               <a:pPr/>
-              <a:t>3/6/2020</a:t>
+              <a:t>3/7/2020</a:t>
             </a:fld>
             <a:endParaRPr lang="en-US" dirty="0"/>
           </a:p>
@@ -10284,7 +10285,7 @@
             <a:fld id="{B61BEF0D-F0BB-DE4B-95CE-6DB70DBA9567}" type="datetimeFigureOut">
               <a:rPr lang="en-US" dirty="0"/>
               <a:pPr/>
-              <a:t>3/6/2020</a:t>
+              <a:t>3/7/2020</a:t>
             </a:fld>
             <a:endParaRPr lang="en-US" dirty="0"/>
           </a:p>
@@ -10536,7 +10537,7 @@
             <a:fld id="{B61BEF0D-F0BB-DE4B-95CE-6DB70DBA9567}" type="datetimeFigureOut">
               <a:rPr lang="en-US" dirty="0"/>
               <a:pPr/>
-              <a:t>3/6/2020</a:t>
+              <a:t>3/7/2020</a:t>
             </a:fld>
             <a:endParaRPr lang="en-US" dirty="0"/>
           </a:p>
@@ -10816,7 +10817,7 @@
             <a:fld id="{B61BEF0D-F0BB-DE4B-95CE-6DB70DBA9567}" type="datetimeFigureOut">
               <a:rPr lang="en-US" dirty="0"/>
               <a:pPr/>
-              <a:t>3/6/2020</a:t>
+              <a:t>3/7/2020</a:t>
             </a:fld>
             <a:endParaRPr lang="en-US" dirty="0"/>
           </a:p>
@@ -11219,7 +11220,7 @@
             <a:fld id="{B61BEF0D-F0BB-DE4B-95CE-6DB70DBA9567}" type="datetimeFigureOut">
               <a:rPr lang="en-US" dirty="0"/>
               <a:pPr/>
-              <a:t>3/6/2020</a:t>
+              <a:t>3/7/2020</a:t>
             </a:fld>
             <a:endParaRPr lang="en-US" dirty="0"/>
           </a:p>
@@ -12019,6 +12020,128 @@
 <file path=ppt/slides/slide10.xml><?xml version="1.0" encoding="utf-8"?>
 <p:sld xmlns:a="http://schemas.openxmlformats.org/drawingml/2006/main" xmlns:r="http://schemas.openxmlformats.org/officeDocument/2006/relationships" xmlns:p="http://schemas.openxmlformats.org/presentationml/2006/main">
   <p:cSld>
+    <p:bg>
+      <p:bgPr>
+        <a:gradFill rotWithShape="1">
+          <a:gsLst>
+            <a:gs pos="10000">
+              <a:schemeClr val="bg2">
+                <a:tint val="97000"/>
+                <a:hueMod val="92000"/>
+                <a:satMod val="169000"/>
+                <a:lumMod val="164000"/>
+              </a:schemeClr>
+            </a:gs>
+            <a:gs pos="100000">
+              <a:schemeClr val="bg2">
+                <a:shade val="96000"/>
+                <a:satMod val="120000"/>
+                <a:lumMod val="90000"/>
+              </a:schemeClr>
+            </a:gs>
+          </a:gsLst>
+          <a:lin ang="6120000" scaled="1"/>
+        </a:gradFill>
+        <a:effectLst/>
+      </p:bgPr>
+    </p:bg>
+    <p:spTree>
+      <p:nvGrpSpPr>
+        <p:cNvPr id="1" name=""/>
+        <p:cNvGrpSpPr/>
+        <p:nvPr/>
+      </p:nvGrpSpPr>
+      <p:grpSpPr>
+        <a:xfrm>
+          <a:off x="0" y="0"/>
+          <a:ext cx="0" cy="0"/>
+          <a:chOff x="0" y="0"/>
+          <a:chExt cx="0" cy="0"/>
+        </a:xfrm>
+      </p:grpSpPr>
+      <p:sp>
+        <p:nvSpPr>
+          <p:cNvPr id="2" name="Titre 1">
+            <a:extLst>
+              <a:ext uri="{FF2B5EF4-FFF2-40B4-BE49-F238E27FC236}">
+                <a16:creationId xmlns:a16="http://schemas.microsoft.com/office/drawing/2014/main" id="{3CDB8273-45A0-4A0F-905C-063E41E279EE}"/>
+              </a:ext>
+            </a:extLst>
+          </p:cNvPr>
+          <p:cNvSpPr>
+            <a:spLocks noGrp="1"/>
+          </p:cNvSpPr>
+          <p:nvPr>
+            <p:ph type="title"/>
+          </p:nvPr>
+        </p:nvSpPr>
+        <p:spPr>
+          <a:xfrm>
+            <a:off x="684212" y="4487332"/>
+            <a:ext cx="8534400" cy="1507067"/>
+          </a:xfrm>
+        </p:spPr>
+        <p:txBody>
+          <a:bodyPr>
+            <a:normAutofit/>
+          </a:bodyPr>
+          <a:lstStyle/>
+          <a:p>
+            <a:r>
+              <a:rPr lang="fr-FR"/>
+              <a:t>Conclusion</a:t>
+            </a:r>
+            <a:endParaRPr lang="en-GB" dirty="0"/>
+          </a:p>
+        </p:txBody>
+      </p:sp>
+      <p:graphicFrame>
+        <p:nvGraphicFramePr>
+          <p:cNvPr id="5" name="Espace réservé du contenu 2">
+            <a:extLst>
+              <a:ext uri="{FF2B5EF4-FFF2-40B4-BE49-F238E27FC236}">
+                <a16:creationId xmlns:a16="http://schemas.microsoft.com/office/drawing/2014/main" id="{9A2F4FC4-8E3A-4880-8CC3-29FF61F63AB1}"/>
+              </a:ext>
+            </a:extLst>
+          </p:cNvPr>
+          <p:cNvGraphicFramePr>
+            <a:graphicFrameLocks noGrp="1"/>
+          </p:cNvGraphicFramePr>
+          <p:nvPr>
+            <p:ph idx="1"/>
+            <p:extLst>
+              <p:ext uri="{D42A27DB-BD31-4B8C-83A1-F6EECF244321}">
+                <p14:modId xmlns:p14="http://schemas.microsoft.com/office/powerpoint/2010/main" val="208525868"/>
+              </p:ext>
+            </p:extLst>
+          </p:nvPr>
+        </p:nvGraphicFramePr>
+        <p:xfrm>
+          <a:off x="684212" y="685800"/>
+          <a:ext cx="10820399" cy="3614738"/>
+        </p:xfrm>
+        <a:graphic>
+          <a:graphicData uri="http://schemas.openxmlformats.org/drawingml/2006/diagram">
+            <dgm:relIds xmlns:dgm="http://schemas.openxmlformats.org/drawingml/2006/diagram" xmlns:r="http://schemas.openxmlformats.org/officeDocument/2006/relationships" r:dm="rId2" r:lo="rId3" r:qs="rId4" r:cs="rId5"/>
+          </a:graphicData>
+        </a:graphic>
+      </p:graphicFrame>
+    </p:spTree>
+    <p:extLst>
+      <p:ext uri="{BB962C8B-B14F-4D97-AF65-F5344CB8AC3E}">
+        <p14:creationId xmlns:p14="http://schemas.microsoft.com/office/powerpoint/2010/main" val="2526747130"/>
+      </p:ext>
+    </p:extLst>
+  </p:cSld>
+  <p:clrMapOvr>
+    <a:masterClrMapping/>
+  </p:clrMapOvr>
+</p:sld>
+</file>
+
+<file path=ppt/slides/slide11.xml><?xml version="1.0" encoding="utf-8"?>
+<p:sld xmlns:a="http://schemas.openxmlformats.org/drawingml/2006/main" xmlns:r="http://schemas.openxmlformats.org/officeDocument/2006/relationships" xmlns:p="http://schemas.openxmlformats.org/presentationml/2006/main">
+  <p:cSld>
     <p:spTree>
       <p:nvGrpSpPr>
         <p:cNvPr id="1" name=""/>
@@ -12196,7 +12319,7 @@
 </p:sld>
 </file>
 
-<file path=ppt/slides/slide11.xml><?xml version="1.0" encoding="utf-8"?>
+<file path=ppt/slides/slide12.xml><?xml version="1.0" encoding="utf-8"?>
 <p:sld xmlns:a="http://schemas.openxmlformats.org/drawingml/2006/main" xmlns:r="http://schemas.openxmlformats.org/officeDocument/2006/relationships" xmlns:p="http://schemas.openxmlformats.org/presentationml/2006/main">
   <p:cSld>
     <p:spTree>
@@ -12949,7 +13072,7 @@
 </p:sld>
 </file>
 
-<file path=ppt/slides/slide12.xml><?xml version="1.0" encoding="utf-8"?>
+<file path=ppt/slides/slide13.xml><?xml version="1.0" encoding="utf-8"?>
 <p:sld xmlns:a="http://schemas.openxmlformats.org/drawingml/2006/main" xmlns:r="http://schemas.openxmlformats.org/officeDocument/2006/relationships" xmlns:p="http://schemas.openxmlformats.org/presentationml/2006/main">
   <p:cSld>
     <p:spTree>
@@ -13490,7 +13613,7 @@
 </p:sld>
 </file>
 
-<file path=ppt/slides/slide13.xml><?xml version="1.0" encoding="utf-8"?>
+<file path=ppt/slides/slide14.xml><?xml version="1.0" encoding="utf-8"?>
 <p:sld xmlns:a="http://schemas.openxmlformats.org/drawingml/2006/main" xmlns:r="http://schemas.openxmlformats.org/officeDocument/2006/relationships" xmlns:p="http://schemas.openxmlformats.org/presentationml/2006/main">
   <p:cSld>
     <p:spTree>
@@ -16290,6 +16413,136 @@
 <file path=ppt/slides/slide7.xml><?xml version="1.0" encoding="utf-8"?>
 <p:sld xmlns:a="http://schemas.openxmlformats.org/drawingml/2006/main" xmlns:r="http://schemas.openxmlformats.org/officeDocument/2006/relationships" xmlns:p="http://schemas.openxmlformats.org/presentationml/2006/main">
   <p:cSld>
+    <p:spTree>
+      <p:nvGrpSpPr>
+        <p:cNvPr id="1" name=""/>
+        <p:cNvGrpSpPr/>
+        <p:nvPr/>
+      </p:nvGrpSpPr>
+      <p:grpSpPr>
+        <a:xfrm>
+          <a:off x="0" y="0"/>
+          <a:ext cx="0" cy="0"/>
+          <a:chOff x="0" y="0"/>
+          <a:chExt cx="0" cy="0"/>
+        </a:xfrm>
+      </p:grpSpPr>
+      <p:sp>
+        <p:nvSpPr>
+          <p:cNvPr id="2" name="Titre 1">
+            <a:extLst>
+              <a:ext uri="{FF2B5EF4-FFF2-40B4-BE49-F238E27FC236}">
+                <a16:creationId xmlns:a16="http://schemas.microsoft.com/office/drawing/2014/main" id="{3EF1CC8A-0E88-49C8-A8F5-3DF150718C98}"/>
+              </a:ext>
+            </a:extLst>
+          </p:cNvPr>
+          <p:cNvSpPr>
+            <a:spLocks noGrp="1"/>
+          </p:cNvSpPr>
+          <p:nvPr>
+            <p:ph type="title"/>
+          </p:nvPr>
+        </p:nvSpPr>
+        <p:spPr/>
+        <p:txBody>
+          <a:bodyPr/>
+          <a:lstStyle/>
+          <a:p>
+            <a:r>
+              <a:rPr lang="fr-FR" dirty="0"/>
+              <a:t>Hard to </a:t>
+            </a:r>
+            <a:r>
+              <a:rPr lang="fr-FR" dirty="0" err="1"/>
+              <a:t>deploy</a:t>
+            </a:r>
+            <a:endParaRPr lang="en-GB" dirty="0"/>
+          </a:p>
+        </p:txBody>
+      </p:sp>
+      <p:sp>
+        <p:nvSpPr>
+          <p:cNvPr id="3" name="Espace réservé du contenu 2">
+            <a:extLst>
+              <a:ext uri="{FF2B5EF4-FFF2-40B4-BE49-F238E27FC236}">
+                <a16:creationId xmlns:a16="http://schemas.microsoft.com/office/drawing/2014/main" id="{A715B977-D044-4124-B0FA-225274B6F4B7}"/>
+              </a:ext>
+            </a:extLst>
+          </p:cNvPr>
+          <p:cNvSpPr>
+            <a:spLocks noGrp="1"/>
+          </p:cNvSpPr>
+          <p:nvPr>
+            <p:ph idx="1"/>
+          </p:nvPr>
+        </p:nvSpPr>
+        <p:spPr/>
+        <p:txBody>
+          <a:bodyPr/>
+          <a:lstStyle/>
+          <a:p>
+            <a:r>
+              <a:rPr lang="fr-FR" dirty="0"/>
+              <a:t>Need to test </a:t>
+            </a:r>
+            <a:r>
+              <a:rPr lang="fr-FR" dirty="0" err="1"/>
+              <a:t>mic</a:t>
+            </a:r>
+            <a:r>
+              <a:rPr lang="fr-FR" dirty="0"/>
+              <a:t> and </a:t>
+            </a:r>
+            <a:r>
+              <a:rPr lang="fr-FR" dirty="0" err="1"/>
+              <a:t>screenshot</a:t>
+            </a:r>
+            <a:r>
+              <a:rPr lang="fr-FR" dirty="0"/>
+              <a:t> in </a:t>
+            </a:r>
+            <a:r>
+              <a:rPr lang="fr-FR" dirty="0" err="1"/>
+              <a:t>every</a:t>
+            </a:r>
+            <a:r>
+              <a:rPr lang="fr-FR" dirty="0"/>
+              <a:t> support</a:t>
+            </a:r>
+          </a:p>
+          <a:p>
+            <a:r>
+              <a:rPr lang="fr-FR" dirty="0" err="1"/>
+              <a:t>Schema</a:t>
+            </a:r>
+            <a:r>
+              <a:rPr lang="fr-FR" dirty="0"/>
+              <a:t> to </a:t>
+            </a:r>
+            <a:r>
+              <a:rPr lang="fr-FR"/>
+              <a:t>understand </a:t>
+            </a:r>
+            <a:endParaRPr lang="en-GB" dirty="0"/>
+          </a:p>
+        </p:txBody>
+      </p:sp>
+    </p:spTree>
+    <p:extLst>
+      <p:ext uri="{BB962C8B-B14F-4D97-AF65-F5344CB8AC3E}">
+        <p14:creationId xmlns:p14="http://schemas.microsoft.com/office/powerpoint/2010/main" val="2219832683"/>
+      </p:ext>
+    </p:extLst>
+  </p:cSld>
+  <p:clrMapOvr>
+    <a:masterClrMapping/>
+  </p:clrMapOvr>
+</p:sld>
+</file>
+
+<file path=ppt/slides/slide8.xml><?xml version="1.0" encoding="utf-8"?>
+<p:sld xmlns:a="http://schemas.openxmlformats.org/drawingml/2006/main" xmlns:r="http://schemas.openxmlformats.org/officeDocument/2006/relationships" xmlns:p="http://schemas.openxmlformats.org/presentationml/2006/main">
+  <p:cSld>
     <p:bg>
       <p:bgPr>
         <a:gradFill rotWithShape="1">
@@ -16584,7 +16837,7 @@
 </p:sld>
 </file>
 
-<file path=ppt/slides/slide8.xml><?xml version="1.0" encoding="utf-8"?>
+<file path=ppt/slides/slide9.xml><?xml version="1.0" encoding="utf-8"?>
 <p:sld xmlns:a="http://schemas.openxmlformats.org/drawingml/2006/main" xmlns:r="http://schemas.openxmlformats.org/officeDocument/2006/relationships" xmlns:p="http://schemas.openxmlformats.org/presentationml/2006/main">
   <p:cSld>
     <p:spTree>
@@ -16669,128 +16922,6 @@
     <p:extLst>
       <p:ext uri="{BB962C8B-B14F-4D97-AF65-F5344CB8AC3E}">
         <p14:creationId xmlns:p14="http://schemas.microsoft.com/office/powerpoint/2010/main" val="770528979"/>
-      </p:ext>
-    </p:extLst>
-  </p:cSld>
-  <p:clrMapOvr>
-    <a:masterClrMapping/>
-  </p:clrMapOvr>
-</p:sld>
-</file>
-
-<file path=ppt/slides/slide9.xml><?xml version="1.0" encoding="utf-8"?>
-<p:sld xmlns:a="http://schemas.openxmlformats.org/drawingml/2006/main" xmlns:r="http://schemas.openxmlformats.org/officeDocument/2006/relationships" xmlns:p="http://schemas.openxmlformats.org/presentationml/2006/main">
-  <p:cSld>
-    <p:bg>
-      <p:bgPr>
-        <a:gradFill rotWithShape="1">
-          <a:gsLst>
-            <a:gs pos="10000">
-              <a:schemeClr val="bg2">
-                <a:tint val="97000"/>
-                <a:hueMod val="92000"/>
-                <a:satMod val="169000"/>
-                <a:lumMod val="164000"/>
-              </a:schemeClr>
-            </a:gs>
-            <a:gs pos="100000">
-              <a:schemeClr val="bg2">
-                <a:shade val="96000"/>
-                <a:satMod val="120000"/>
-                <a:lumMod val="90000"/>
-              </a:schemeClr>
-            </a:gs>
-          </a:gsLst>
-          <a:lin ang="6120000" scaled="1"/>
-        </a:gradFill>
-        <a:effectLst/>
-      </p:bgPr>
-    </p:bg>
-    <p:spTree>
-      <p:nvGrpSpPr>
-        <p:cNvPr id="1" name=""/>
-        <p:cNvGrpSpPr/>
-        <p:nvPr/>
-      </p:nvGrpSpPr>
-      <p:grpSpPr>
-        <a:xfrm>
-          <a:off x="0" y="0"/>
-          <a:ext cx="0" cy="0"/>
-          <a:chOff x="0" y="0"/>
-          <a:chExt cx="0" cy="0"/>
-        </a:xfrm>
-      </p:grpSpPr>
-      <p:sp>
-        <p:nvSpPr>
-          <p:cNvPr id="2" name="Titre 1">
-            <a:extLst>
-              <a:ext uri="{FF2B5EF4-FFF2-40B4-BE49-F238E27FC236}">
-                <a16:creationId xmlns:a16="http://schemas.microsoft.com/office/drawing/2014/main" id="{3CDB8273-45A0-4A0F-905C-063E41E279EE}"/>
-              </a:ext>
-            </a:extLst>
-          </p:cNvPr>
-          <p:cNvSpPr>
-            <a:spLocks noGrp="1"/>
-          </p:cNvSpPr>
-          <p:nvPr>
-            <p:ph type="title"/>
-          </p:nvPr>
-        </p:nvSpPr>
-        <p:spPr>
-          <a:xfrm>
-            <a:off x="684212" y="4487332"/>
-            <a:ext cx="8534400" cy="1507067"/>
-          </a:xfrm>
-        </p:spPr>
-        <p:txBody>
-          <a:bodyPr>
-            <a:normAutofit/>
-          </a:bodyPr>
-          <a:lstStyle/>
-          <a:p>
-            <a:r>
-              <a:rPr lang="fr-FR"/>
-              <a:t>Conclusion</a:t>
-            </a:r>
-            <a:endParaRPr lang="en-GB" dirty="0"/>
-          </a:p>
-        </p:txBody>
-      </p:sp>
-      <p:graphicFrame>
-        <p:nvGraphicFramePr>
-          <p:cNvPr id="5" name="Espace réservé du contenu 2">
-            <a:extLst>
-              <a:ext uri="{FF2B5EF4-FFF2-40B4-BE49-F238E27FC236}">
-                <a16:creationId xmlns:a16="http://schemas.microsoft.com/office/drawing/2014/main" id="{9A2F4FC4-8E3A-4880-8CC3-29FF61F63AB1}"/>
-              </a:ext>
-            </a:extLst>
-          </p:cNvPr>
-          <p:cNvGraphicFramePr>
-            <a:graphicFrameLocks noGrp="1"/>
-          </p:cNvGraphicFramePr>
-          <p:nvPr>
-            <p:ph idx="1"/>
-            <p:extLst>
-              <p:ext uri="{D42A27DB-BD31-4B8C-83A1-F6EECF244321}">
-                <p14:modId xmlns:p14="http://schemas.microsoft.com/office/powerpoint/2010/main" val="208525868"/>
-              </p:ext>
-            </p:extLst>
-          </p:nvPr>
-        </p:nvGraphicFramePr>
-        <p:xfrm>
-          <a:off x="684212" y="685800"/>
-          <a:ext cx="10820399" cy="3614738"/>
-        </p:xfrm>
-        <a:graphic>
-          <a:graphicData uri="http://schemas.openxmlformats.org/drawingml/2006/diagram">
-            <dgm:relIds xmlns:dgm="http://schemas.openxmlformats.org/drawingml/2006/diagram" xmlns:r="http://schemas.openxmlformats.org/officeDocument/2006/relationships" r:dm="rId2" r:lo="rId3" r:qs="rId4" r:cs="rId5"/>
-          </a:graphicData>
-        </a:graphic>
-      </p:graphicFrame>
-    </p:spTree>
-    <p:extLst>
-      <p:ext uri="{BB962C8B-B14F-4D97-AF65-F5344CB8AC3E}">
-        <p14:creationId xmlns:p14="http://schemas.microsoft.com/office/powerpoint/2010/main" val="2526747130"/>
       </p:ext>
     </p:extLst>
   </p:cSld>

</xml_diff>

<commit_message>
#12 Issue simulate the brain added on slides
</commit_message>
<xml_diff>
--- a/SAI_presentation.pptx
+++ b/SAI_presentation.pptx
@@ -12,13 +12,14 @@
     <p:sldId id="268" r:id="rId6"/>
     <p:sldId id="258" r:id="rId7"/>
     <p:sldId id="269" r:id="rId8"/>
-    <p:sldId id="259" r:id="rId9"/>
-    <p:sldId id="260" r:id="rId10"/>
-    <p:sldId id="261" r:id="rId11"/>
-    <p:sldId id="265" r:id="rId12"/>
-    <p:sldId id="262" r:id="rId13"/>
-    <p:sldId id="264" r:id="rId14"/>
-    <p:sldId id="263" r:id="rId15"/>
+    <p:sldId id="270" r:id="rId9"/>
+    <p:sldId id="259" r:id="rId10"/>
+    <p:sldId id="260" r:id="rId11"/>
+    <p:sldId id="261" r:id="rId12"/>
+    <p:sldId id="265" r:id="rId13"/>
+    <p:sldId id="262" r:id="rId14"/>
+    <p:sldId id="264" r:id="rId15"/>
+    <p:sldId id="263" r:id="rId16"/>
   </p:sldIdLst>
   <p:sldSz cx="12192000" cy="6858000"/>
   <p:notesSz cx="6858000" cy="9144000"/>
@@ -12020,6 +12021,100 @@
 <file path=ppt/slides/slide10.xml><?xml version="1.0" encoding="utf-8"?>
 <p:sld xmlns:a="http://schemas.openxmlformats.org/drawingml/2006/main" xmlns:r="http://schemas.openxmlformats.org/officeDocument/2006/relationships" xmlns:p="http://schemas.openxmlformats.org/presentationml/2006/main">
   <p:cSld>
+    <p:spTree>
+      <p:nvGrpSpPr>
+        <p:cNvPr id="1" name=""/>
+        <p:cNvGrpSpPr/>
+        <p:nvPr/>
+      </p:nvGrpSpPr>
+      <p:grpSpPr>
+        <a:xfrm>
+          <a:off x="0" y="0"/>
+          <a:ext cx="0" cy="0"/>
+          <a:chOff x="0" y="0"/>
+          <a:chExt cx="0" cy="0"/>
+        </a:xfrm>
+      </p:grpSpPr>
+      <p:sp>
+        <p:nvSpPr>
+          <p:cNvPr id="2" name="Titre 1">
+            <a:extLst>
+              <a:ext uri="{FF2B5EF4-FFF2-40B4-BE49-F238E27FC236}">
+                <a16:creationId xmlns:a16="http://schemas.microsoft.com/office/drawing/2014/main" id="{643ACCC2-1572-47D7-9E8E-170E100F9348}"/>
+              </a:ext>
+            </a:extLst>
+          </p:cNvPr>
+          <p:cNvSpPr>
+            <a:spLocks noGrp="1"/>
+          </p:cNvSpPr>
+          <p:nvPr>
+            <p:ph type="title"/>
+          </p:nvPr>
+        </p:nvSpPr>
+        <p:spPr/>
+        <p:txBody>
+          <a:bodyPr/>
+          <a:lstStyle/>
+          <a:p>
+            <a:r>
+              <a:rPr lang="fr-FR" dirty="0" err="1"/>
+              <a:t>Result</a:t>
+            </a:r>
+            <a:endParaRPr lang="en-GB" dirty="0"/>
+          </a:p>
+        </p:txBody>
+      </p:sp>
+      <p:sp>
+        <p:nvSpPr>
+          <p:cNvPr id="3" name="Espace réservé du contenu 2">
+            <a:extLst>
+              <a:ext uri="{FF2B5EF4-FFF2-40B4-BE49-F238E27FC236}">
+                <a16:creationId xmlns:a16="http://schemas.microsoft.com/office/drawing/2014/main" id="{7528B972-5B40-4B83-A687-4553853739D3}"/>
+              </a:ext>
+            </a:extLst>
+          </p:cNvPr>
+          <p:cNvSpPr>
+            <a:spLocks noGrp="1"/>
+          </p:cNvSpPr>
+          <p:nvPr>
+            <p:ph idx="1"/>
+          </p:nvPr>
+        </p:nvSpPr>
+        <p:spPr/>
+        <p:txBody>
+          <a:bodyPr/>
+          <a:lstStyle/>
+          <a:p>
+            <a:r>
+              <a:rPr lang="fr-FR"/>
+              <a:t>Show a graph with the strategies learn with a little picture</a:t>
+            </a:r>
+          </a:p>
+          <a:p>
+            <a:r>
+              <a:rPr lang="fr-FR"/>
+              <a:t>Show the web interface to choose strategies</a:t>
+            </a:r>
+            <a:endParaRPr lang="en-GB"/>
+          </a:p>
+        </p:txBody>
+      </p:sp>
+    </p:spTree>
+    <p:extLst>
+      <p:ext uri="{BB962C8B-B14F-4D97-AF65-F5344CB8AC3E}">
+        <p14:creationId xmlns:p14="http://schemas.microsoft.com/office/powerpoint/2010/main" val="770528979"/>
+      </p:ext>
+    </p:extLst>
+  </p:cSld>
+  <p:clrMapOvr>
+    <a:masterClrMapping/>
+  </p:clrMapOvr>
+</p:sld>
+</file>
+
+<file path=ppt/slides/slide11.xml><?xml version="1.0" encoding="utf-8"?>
+<p:sld xmlns:a="http://schemas.openxmlformats.org/drawingml/2006/main" xmlns:r="http://schemas.openxmlformats.org/officeDocument/2006/relationships" xmlns:p="http://schemas.openxmlformats.org/presentationml/2006/main">
+  <p:cSld>
     <p:bg>
       <p:bgPr>
         <a:gradFill rotWithShape="1">
@@ -12139,7 +12234,7 @@
 </p:sld>
 </file>
 
-<file path=ppt/slides/slide11.xml><?xml version="1.0" encoding="utf-8"?>
+<file path=ppt/slides/slide12.xml><?xml version="1.0" encoding="utf-8"?>
 <p:sld xmlns:a="http://schemas.openxmlformats.org/drawingml/2006/main" xmlns:r="http://schemas.openxmlformats.org/officeDocument/2006/relationships" xmlns:p="http://schemas.openxmlformats.org/presentationml/2006/main">
   <p:cSld>
     <p:spTree>
@@ -12319,7 +12414,7 @@
 </p:sld>
 </file>
 
-<file path=ppt/slides/slide12.xml><?xml version="1.0" encoding="utf-8"?>
+<file path=ppt/slides/slide13.xml><?xml version="1.0" encoding="utf-8"?>
 <p:sld xmlns:a="http://schemas.openxmlformats.org/drawingml/2006/main" xmlns:r="http://schemas.openxmlformats.org/officeDocument/2006/relationships" xmlns:p="http://schemas.openxmlformats.org/presentationml/2006/main">
   <p:cSld>
     <p:spTree>
@@ -13072,7 +13167,7 @@
 </p:sld>
 </file>
 
-<file path=ppt/slides/slide13.xml><?xml version="1.0" encoding="utf-8"?>
+<file path=ppt/slides/slide14.xml><?xml version="1.0" encoding="utf-8"?>
 <p:sld xmlns:a="http://schemas.openxmlformats.org/drawingml/2006/main" xmlns:r="http://schemas.openxmlformats.org/officeDocument/2006/relationships" xmlns:p="http://schemas.openxmlformats.org/presentationml/2006/main">
   <p:cSld>
     <p:spTree>
@@ -13613,7 +13708,7 @@
 </p:sld>
 </file>
 
-<file path=ppt/slides/slide14.xml><?xml version="1.0" encoding="utf-8"?>
+<file path=ppt/slides/slide15.xml><?xml version="1.0" encoding="utf-8"?>
 <p:sld xmlns:a="http://schemas.openxmlformats.org/drawingml/2006/main" xmlns:r="http://schemas.openxmlformats.org/officeDocument/2006/relationships" xmlns:p="http://schemas.openxmlformats.org/presentationml/2006/main">
   <p:cSld>
     <p:spTree>
@@ -16543,6 +16638,162 @@
 <file path=ppt/slides/slide8.xml><?xml version="1.0" encoding="utf-8"?>
 <p:sld xmlns:a="http://schemas.openxmlformats.org/drawingml/2006/main" xmlns:r="http://schemas.openxmlformats.org/officeDocument/2006/relationships" xmlns:p="http://schemas.openxmlformats.org/presentationml/2006/main">
   <p:cSld>
+    <p:spTree>
+      <p:nvGrpSpPr>
+        <p:cNvPr id="1" name=""/>
+        <p:cNvGrpSpPr/>
+        <p:nvPr/>
+      </p:nvGrpSpPr>
+      <p:grpSpPr>
+        <a:xfrm>
+          <a:off x="0" y="0"/>
+          <a:ext cx="0" cy="0"/>
+          <a:chOff x="0" y="0"/>
+          <a:chExt cx="0" cy="0"/>
+        </a:xfrm>
+      </p:grpSpPr>
+      <p:sp>
+        <p:nvSpPr>
+          <p:cNvPr id="2" name="Titre 1">
+            <a:extLst>
+              <a:ext uri="{FF2B5EF4-FFF2-40B4-BE49-F238E27FC236}">
+                <a16:creationId xmlns:a16="http://schemas.microsoft.com/office/drawing/2014/main" id="{22B5C4A5-BF9E-47ED-A092-6F3A182FA5C8}"/>
+              </a:ext>
+            </a:extLst>
+          </p:cNvPr>
+          <p:cNvSpPr>
+            <a:spLocks noGrp="1"/>
+          </p:cNvSpPr>
+          <p:nvPr>
+            <p:ph type="title"/>
+          </p:nvPr>
+        </p:nvSpPr>
+        <p:spPr/>
+        <p:txBody>
+          <a:bodyPr/>
+          <a:lstStyle/>
+          <a:p>
+            <a:r>
+              <a:rPr lang="fr-FR" dirty="0" err="1"/>
+              <a:t>Simulate</a:t>
+            </a:r>
+            <a:r>
+              <a:rPr lang="fr-FR" dirty="0"/>
+              <a:t> the </a:t>
+            </a:r>
+            <a:r>
+              <a:rPr lang="fr-FR" dirty="0" err="1"/>
+              <a:t>brain</a:t>
+            </a:r>
+            <a:endParaRPr lang="en-GB" dirty="0"/>
+          </a:p>
+        </p:txBody>
+      </p:sp>
+      <p:sp>
+        <p:nvSpPr>
+          <p:cNvPr id="3" name="Espace réservé du contenu 2">
+            <a:extLst>
+              <a:ext uri="{FF2B5EF4-FFF2-40B4-BE49-F238E27FC236}">
+                <a16:creationId xmlns:a16="http://schemas.microsoft.com/office/drawing/2014/main" id="{868CEF82-D586-476A-8139-F86F1D271B1F}"/>
+              </a:ext>
+            </a:extLst>
+          </p:cNvPr>
+          <p:cNvSpPr>
+            <a:spLocks noGrp="1"/>
+          </p:cNvSpPr>
+          <p:nvPr>
+            <p:ph idx="1"/>
+          </p:nvPr>
+        </p:nvSpPr>
+        <p:spPr/>
+        <p:txBody>
+          <a:bodyPr/>
+          <a:lstStyle/>
+          <a:p>
+            <a:r>
+              <a:rPr lang="fr-FR" dirty="0"/>
+              <a:t>A </a:t>
+            </a:r>
+            <a:r>
+              <a:rPr lang="fr-FR" dirty="0" err="1"/>
+              <a:t>human</a:t>
+            </a:r>
+            <a:r>
+              <a:rPr lang="fr-FR" dirty="0"/>
+              <a:t> </a:t>
+            </a:r>
+            <a:r>
+              <a:rPr lang="fr-FR" dirty="0" err="1"/>
+              <a:t>sleep</a:t>
+            </a:r>
+            <a:r>
+              <a:rPr lang="fr-FR" dirty="0"/>
+              <a:t> to </a:t>
+            </a:r>
+            <a:r>
+              <a:rPr lang="fr-FR" dirty="0" err="1"/>
+              <a:t>organize</a:t>
+            </a:r>
+            <a:r>
+              <a:rPr lang="fr-FR" dirty="0"/>
+              <a:t> </a:t>
+            </a:r>
+            <a:r>
+              <a:rPr lang="fr-FR" dirty="0" err="1"/>
+              <a:t>it</a:t>
+            </a:r>
+            <a:r>
+              <a:rPr lang="fr-FR" dirty="0"/>
+              <a:t> memory</a:t>
+            </a:r>
+          </a:p>
+          <a:p>
+            <a:r>
+              <a:rPr lang="fr-FR" dirty="0"/>
+              <a:t>So do SAI </a:t>
+            </a:r>
+            <a:r>
+              <a:rPr lang="fr-FR" dirty="0" err="1"/>
+              <a:t>need</a:t>
+            </a:r>
+            <a:r>
+              <a:rPr lang="fr-FR" dirty="0"/>
+              <a:t> to</a:t>
+            </a:r>
+          </a:p>
+          <a:p>
+            <a:r>
+              <a:rPr lang="fr-FR" dirty="0" err="1"/>
+              <a:t>Schema</a:t>
+            </a:r>
+            <a:r>
+              <a:rPr lang="fr-FR" dirty="0"/>
+              <a:t> to </a:t>
+            </a:r>
+            <a:r>
+              <a:rPr lang="fr-FR"/>
+              <a:t>explain</a:t>
+            </a:r>
+            <a:endParaRPr lang="en-GB"/>
+          </a:p>
+        </p:txBody>
+      </p:sp>
+    </p:spTree>
+    <p:extLst>
+      <p:ext uri="{BB962C8B-B14F-4D97-AF65-F5344CB8AC3E}">
+        <p14:creationId xmlns:p14="http://schemas.microsoft.com/office/powerpoint/2010/main" val="2885582855"/>
+      </p:ext>
+    </p:extLst>
+  </p:cSld>
+  <p:clrMapOvr>
+    <a:masterClrMapping/>
+  </p:clrMapOvr>
+</p:sld>
+</file>
+
+<file path=ppt/slides/slide9.xml><?xml version="1.0" encoding="utf-8"?>
+<p:sld xmlns:a="http://schemas.openxmlformats.org/drawingml/2006/main" xmlns:r="http://schemas.openxmlformats.org/officeDocument/2006/relationships" xmlns:p="http://schemas.openxmlformats.org/presentationml/2006/main">
+  <p:cSld>
     <p:bg>
       <p:bgPr>
         <a:gradFill rotWithShape="1">
@@ -16828,100 +17079,6 @@
     <p:extLst>
       <p:ext uri="{BB962C8B-B14F-4D97-AF65-F5344CB8AC3E}">
         <p14:creationId xmlns:p14="http://schemas.microsoft.com/office/powerpoint/2010/main" val="701313445"/>
-      </p:ext>
-    </p:extLst>
-  </p:cSld>
-  <p:clrMapOvr>
-    <a:masterClrMapping/>
-  </p:clrMapOvr>
-</p:sld>
-</file>
-
-<file path=ppt/slides/slide9.xml><?xml version="1.0" encoding="utf-8"?>
-<p:sld xmlns:a="http://schemas.openxmlformats.org/drawingml/2006/main" xmlns:r="http://schemas.openxmlformats.org/officeDocument/2006/relationships" xmlns:p="http://schemas.openxmlformats.org/presentationml/2006/main">
-  <p:cSld>
-    <p:spTree>
-      <p:nvGrpSpPr>
-        <p:cNvPr id="1" name=""/>
-        <p:cNvGrpSpPr/>
-        <p:nvPr/>
-      </p:nvGrpSpPr>
-      <p:grpSpPr>
-        <a:xfrm>
-          <a:off x="0" y="0"/>
-          <a:ext cx="0" cy="0"/>
-          <a:chOff x="0" y="0"/>
-          <a:chExt cx="0" cy="0"/>
-        </a:xfrm>
-      </p:grpSpPr>
-      <p:sp>
-        <p:nvSpPr>
-          <p:cNvPr id="2" name="Titre 1">
-            <a:extLst>
-              <a:ext uri="{FF2B5EF4-FFF2-40B4-BE49-F238E27FC236}">
-                <a16:creationId xmlns:a16="http://schemas.microsoft.com/office/drawing/2014/main" id="{643ACCC2-1572-47D7-9E8E-170E100F9348}"/>
-              </a:ext>
-            </a:extLst>
-          </p:cNvPr>
-          <p:cNvSpPr>
-            <a:spLocks noGrp="1"/>
-          </p:cNvSpPr>
-          <p:nvPr>
-            <p:ph type="title"/>
-          </p:nvPr>
-        </p:nvSpPr>
-        <p:spPr/>
-        <p:txBody>
-          <a:bodyPr/>
-          <a:lstStyle/>
-          <a:p>
-            <a:r>
-              <a:rPr lang="fr-FR" dirty="0" err="1"/>
-              <a:t>Result</a:t>
-            </a:r>
-            <a:endParaRPr lang="en-GB" dirty="0"/>
-          </a:p>
-        </p:txBody>
-      </p:sp>
-      <p:sp>
-        <p:nvSpPr>
-          <p:cNvPr id="3" name="Espace réservé du contenu 2">
-            <a:extLst>
-              <a:ext uri="{FF2B5EF4-FFF2-40B4-BE49-F238E27FC236}">
-                <a16:creationId xmlns:a16="http://schemas.microsoft.com/office/drawing/2014/main" id="{7528B972-5B40-4B83-A687-4553853739D3}"/>
-              </a:ext>
-            </a:extLst>
-          </p:cNvPr>
-          <p:cNvSpPr>
-            <a:spLocks noGrp="1"/>
-          </p:cNvSpPr>
-          <p:nvPr>
-            <p:ph idx="1"/>
-          </p:nvPr>
-        </p:nvSpPr>
-        <p:spPr/>
-        <p:txBody>
-          <a:bodyPr/>
-          <a:lstStyle/>
-          <a:p>
-            <a:r>
-              <a:rPr lang="fr-FR"/>
-              <a:t>Show a graph with the strategies learn with a little picture</a:t>
-            </a:r>
-          </a:p>
-          <a:p>
-            <a:r>
-              <a:rPr lang="fr-FR"/>
-              <a:t>Show the web interface to choose strategies</a:t>
-            </a:r>
-            <a:endParaRPr lang="en-GB"/>
-          </a:p>
-        </p:txBody>
-      </p:sp>
-    </p:spTree>
-    <p:extLst>
-      <p:ext uri="{BB962C8B-B14F-4D97-AF65-F5344CB8AC3E}">
-        <p14:creationId xmlns:p14="http://schemas.microsoft.com/office/powerpoint/2010/main" val="770528979"/>
       </p:ext>
     </p:extLst>
   </p:cSld>

</xml_diff>

<commit_message>
#12 Issue add a reward added on slides
</commit_message>
<xml_diff>
--- a/SAI_presentation.pptx
+++ b/SAI_presentation.pptx
@@ -13,13 +13,14 @@
     <p:sldId id="258" r:id="rId7"/>
     <p:sldId id="269" r:id="rId8"/>
     <p:sldId id="270" r:id="rId9"/>
-    <p:sldId id="259" r:id="rId10"/>
-    <p:sldId id="260" r:id="rId11"/>
-    <p:sldId id="261" r:id="rId12"/>
-    <p:sldId id="265" r:id="rId13"/>
-    <p:sldId id="262" r:id="rId14"/>
-    <p:sldId id="264" r:id="rId15"/>
-    <p:sldId id="263" r:id="rId16"/>
+    <p:sldId id="271" r:id="rId10"/>
+    <p:sldId id="259" r:id="rId11"/>
+    <p:sldId id="260" r:id="rId12"/>
+    <p:sldId id="261" r:id="rId13"/>
+    <p:sldId id="265" r:id="rId14"/>
+    <p:sldId id="262" r:id="rId15"/>
+    <p:sldId id="264" r:id="rId16"/>
+    <p:sldId id="263" r:id="rId17"/>
   </p:sldIdLst>
   <p:sldSz cx="12192000" cy="6858000"/>
   <p:notesSz cx="6858000" cy="9144000"/>
@@ -12021,6 +12022,303 @@
 <file path=ppt/slides/slide10.xml><?xml version="1.0" encoding="utf-8"?>
 <p:sld xmlns:a="http://schemas.openxmlformats.org/drawingml/2006/main" xmlns:r="http://schemas.openxmlformats.org/officeDocument/2006/relationships" xmlns:p="http://schemas.openxmlformats.org/presentationml/2006/main">
   <p:cSld>
+    <p:bg>
+      <p:bgPr>
+        <a:gradFill rotWithShape="1">
+          <a:gsLst>
+            <a:gs pos="10000">
+              <a:schemeClr val="bg2">
+                <a:tint val="97000"/>
+                <a:hueMod val="92000"/>
+                <a:satMod val="169000"/>
+                <a:lumMod val="164000"/>
+              </a:schemeClr>
+            </a:gs>
+            <a:gs pos="100000">
+              <a:schemeClr val="bg2">
+                <a:shade val="96000"/>
+                <a:satMod val="120000"/>
+                <a:lumMod val="90000"/>
+              </a:schemeClr>
+            </a:gs>
+          </a:gsLst>
+          <a:lin ang="6120000" scaled="1"/>
+        </a:gradFill>
+        <a:effectLst/>
+      </p:bgPr>
+    </p:bg>
+    <p:spTree>
+      <p:nvGrpSpPr>
+        <p:cNvPr id="1" name=""/>
+        <p:cNvGrpSpPr/>
+        <p:nvPr/>
+      </p:nvGrpSpPr>
+      <p:grpSpPr>
+        <a:xfrm>
+          <a:off x="0" y="0"/>
+          <a:ext cx="0" cy="0"/>
+          <a:chOff x="0" y="0"/>
+          <a:chExt cx="0" cy="0"/>
+        </a:xfrm>
+      </p:grpSpPr>
+      <p:sp useBgFill="1">
+        <p:nvSpPr>
+          <p:cNvPr id="23" name="Rectangle 7">
+            <a:extLst>
+              <a:ext uri="{FF2B5EF4-FFF2-40B4-BE49-F238E27FC236}">
+                <a16:creationId xmlns:a16="http://schemas.microsoft.com/office/drawing/2014/main" id="{7509B08A-C1EC-478C-86AF-60ADE06D9BBB}"/>
+              </a:ext>
+              <a:ext uri="{C183D7F6-B498-43B3-948B-1728B52AA6E4}">
+                <adec:decorative xmlns:adec="http://schemas.microsoft.com/office/drawing/2017/decorative" val="1"/>
+              </a:ext>
+            </a:extLst>
+          </p:cNvPr>
+          <p:cNvSpPr>
+            <a:spLocks noGrp="1" noRot="1" noChangeAspect="1" noMove="1" noResize="1" noEditPoints="1" noAdjustHandles="1" noChangeArrowheads="1" noChangeShapeType="1" noTextEdit="1"/>
+          </p:cNvSpPr>
+          <p:nvPr>
+            <p:extLst>
+              <p:ext uri="{386F3935-93C4-4BCD-93E2-E3B085C9AB24}">
+                <p16:designElem xmlns:p16="http://schemas.microsoft.com/office/powerpoint/2015/main" val="1"/>
+              </p:ext>
+            </p:extLst>
+          </p:nvPr>
+        </p:nvSpPr>
+        <p:spPr>
+          <a:xfrm>
+            <a:off x="0" y="0"/>
+            <a:ext cx="12192000" cy="6858000"/>
+          </a:xfrm>
+          <a:prstGeom prst="rect">
+            <a:avLst/>
+          </a:prstGeom>
+          <a:ln>
+            <a:noFill/>
+          </a:ln>
+        </p:spPr>
+        <p:style>
+          <a:lnRef idx="2">
+            <a:schemeClr val="accent1">
+              <a:shade val="50000"/>
+            </a:schemeClr>
+          </a:lnRef>
+          <a:fillRef idx="1">
+            <a:schemeClr val="accent1"/>
+          </a:fillRef>
+          <a:effectRef idx="0">
+            <a:schemeClr val="accent1"/>
+          </a:effectRef>
+          <a:fontRef idx="minor">
+            <a:schemeClr val="lt1"/>
+          </a:fontRef>
+        </p:style>
+        <p:txBody>
+          <a:bodyPr rtlCol="0" anchor="ctr"/>
+          <a:lstStyle/>
+          <a:p>
+            <a:pPr algn="ctr"/>
+            <a:endParaRPr lang="en-US"/>
+          </a:p>
+        </p:txBody>
+      </p:sp>
+      <p:sp>
+        <p:nvSpPr>
+          <p:cNvPr id="2" name="Titre 1">
+            <a:extLst>
+              <a:ext uri="{FF2B5EF4-FFF2-40B4-BE49-F238E27FC236}">
+                <a16:creationId xmlns:a16="http://schemas.microsoft.com/office/drawing/2014/main" id="{E286FAAA-D668-42B4-9647-5ECEBD96BC52}"/>
+              </a:ext>
+            </a:extLst>
+          </p:cNvPr>
+          <p:cNvSpPr>
+            <a:spLocks noGrp="1"/>
+          </p:cNvSpPr>
+          <p:nvPr>
+            <p:ph type="title"/>
+          </p:nvPr>
+        </p:nvSpPr>
+        <p:spPr>
+          <a:xfrm>
+            <a:off x="640290" y="685800"/>
+            <a:ext cx="4818656" cy="4603749"/>
+          </a:xfrm>
+        </p:spPr>
+        <p:txBody>
+          <a:bodyPr>
+            <a:normAutofit/>
+          </a:bodyPr>
+          <a:lstStyle/>
+          <a:p>
+            <a:pPr algn="r"/>
+            <a:r>
+              <a:rPr lang="fr-FR" sz="5200"/>
+              <a:t>Solutions</a:t>
+            </a:r>
+            <a:endParaRPr lang="en-GB" sz="5200"/>
+          </a:p>
+        </p:txBody>
+      </p:sp>
+      <p:sp>
+        <p:nvSpPr>
+          <p:cNvPr id="10" name="Rectangle 9">
+            <a:extLst>
+              <a:ext uri="{FF2B5EF4-FFF2-40B4-BE49-F238E27FC236}">
+                <a16:creationId xmlns:a16="http://schemas.microsoft.com/office/drawing/2014/main" id="{221CC330-4259-4C32-BF8B-5FE13FFABB3A}"/>
+              </a:ext>
+              <a:ext uri="{C183D7F6-B498-43B3-948B-1728B52AA6E4}">
+                <adec:decorative xmlns:adec="http://schemas.microsoft.com/office/drawing/2017/decorative" val="1"/>
+              </a:ext>
+            </a:extLst>
+          </p:cNvPr>
+          <p:cNvSpPr>
+            <a:spLocks noGrp="1" noRot="1" noChangeAspect="1" noMove="1" noResize="1" noEditPoints="1" noAdjustHandles="1" noChangeArrowheads="1" noChangeShapeType="1" noTextEdit="1"/>
+          </p:cNvSpPr>
+          <p:nvPr>
+            <p:extLst>
+              <p:ext uri="{386F3935-93C4-4BCD-93E2-E3B085C9AB24}">
+                <p16:designElem xmlns:p16="http://schemas.microsoft.com/office/powerpoint/2015/main" val="1"/>
+              </p:ext>
+            </p:extLst>
+          </p:nvPr>
+        </p:nvSpPr>
+        <p:spPr>
+          <a:xfrm>
+            <a:off x="6095999" y="0"/>
+            <a:ext cx="6096001" cy="6858000"/>
+          </a:xfrm>
+          <a:prstGeom prst="rect">
+            <a:avLst/>
+          </a:prstGeom>
+          <a:solidFill>
+            <a:schemeClr val="bg2">
+              <a:alpha val="97000"/>
+            </a:schemeClr>
+          </a:solidFill>
+          <a:ln>
+            <a:noFill/>
+          </a:ln>
+          <a:effectLst/>
+        </p:spPr>
+        <p:style>
+          <a:lnRef idx="2">
+            <a:schemeClr val="accent1">
+              <a:shade val="50000"/>
+            </a:schemeClr>
+          </a:lnRef>
+          <a:fillRef idx="1001">
+            <a:schemeClr val="dk2"/>
+          </a:fillRef>
+          <a:effectRef idx="0">
+            <a:schemeClr val="accent1"/>
+          </a:effectRef>
+          <a:fontRef idx="minor">
+            <a:schemeClr val="lt1"/>
+          </a:fontRef>
+        </p:style>
+        <p:txBody>
+          <a:bodyPr rtlCol="0" anchor="ctr"/>
+          <a:lstStyle/>
+          <a:p>
+            <a:pPr algn="ctr"/>
+            <a:endParaRPr lang="en-US"/>
+          </a:p>
+        </p:txBody>
+      </p:sp>
+      <p:sp>
+        <p:nvSpPr>
+          <p:cNvPr id="3" name="Espace réservé du contenu 2">
+            <a:extLst>
+              <a:ext uri="{FF2B5EF4-FFF2-40B4-BE49-F238E27FC236}">
+                <a16:creationId xmlns:a16="http://schemas.microsoft.com/office/drawing/2014/main" id="{128178D9-55E1-4BEF-84B2-EF38491DA27C}"/>
+              </a:ext>
+            </a:extLst>
+          </p:cNvPr>
+          <p:cNvSpPr>
+            <a:spLocks noGrp="1"/>
+          </p:cNvSpPr>
+          <p:nvPr>
+            <p:ph idx="1"/>
+          </p:nvPr>
+        </p:nvSpPr>
+        <p:spPr>
+          <a:xfrm>
+            <a:off x="6625651" y="685800"/>
+            <a:ext cx="4878959" cy="4603750"/>
+          </a:xfrm>
+        </p:spPr>
+        <p:txBody>
+          <a:bodyPr>
+            <a:normAutofit/>
+          </a:bodyPr>
+          <a:lstStyle/>
+          <a:p>
+            <a:r>
+              <a:rPr lang="fr-FR">
+                <a:solidFill>
+                  <a:schemeClr val="tx1"/>
+                </a:solidFill>
+              </a:rPr>
+              <a:t>Create SAI with pyinstaller for multiplatform</a:t>
+            </a:r>
+          </a:p>
+          <a:p>
+            <a:r>
+              <a:rPr lang="fr-FR">
+                <a:solidFill>
+                  <a:schemeClr val="tx1"/>
+                </a:solidFill>
+              </a:rPr>
+              <a:t>Launch a scan that remove duplicate screenshot and order them by interesting strategie</a:t>
+            </a:r>
+          </a:p>
+          <a:p>
+            <a:r>
+              <a:rPr lang="fr-FR">
+                <a:solidFill>
+                  <a:schemeClr val="tx1"/>
+                </a:solidFill>
+              </a:rPr>
+              <a:t>Increment the reward if there was difference between images</a:t>
+            </a:r>
+          </a:p>
+          <a:p>
+            <a:r>
+              <a:rPr lang="fr-FR">
+                <a:solidFill>
+                  <a:schemeClr val="tx1"/>
+                </a:solidFill>
+              </a:rPr>
+              <a:t>Create a web page with the strategies learned</a:t>
+            </a:r>
+          </a:p>
+          <a:p>
+            <a:r>
+              <a:rPr lang="fr-FR">
+                <a:solidFill>
+                  <a:schemeClr val="tx1"/>
+                </a:solidFill>
+              </a:rPr>
+              <a:t>Create a web interface or a vocal controller to order strategies</a:t>
+            </a:r>
+          </a:p>
+        </p:txBody>
+      </p:sp>
+    </p:spTree>
+    <p:extLst>
+      <p:ext uri="{BB962C8B-B14F-4D97-AF65-F5344CB8AC3E}">
+        <p14:creationId xmlns:p14="http://schemas.microsoft.com/office/powerpoint/2010/main" val="701313445"/>
+      </p:ext>
+    </p:extLst>
+  </p:cSld>
+  <p:clrMapOvr>
+    <a:masterClrMapping/>
+  </p:clrMapOvr>
+</p:sld>
+</file>
+
+<file path=ppt/slides/slide11.xml><?xml version="1.0" encoding="utf-8"?>
+<p:sld xmlns:a="http://schemas.openxmlformats.org/drawingml/2006/main" xmlns:r="http://schemas.openxmlformats.org/officeDocument/2006/relationships" xmlns:p="http://schemas.openxmlformats.org/presentationml/2006/main">
+  <p:cSld>
     <p:spTree>
       <p:nvGrpSpPr>
         <p:cNvPr id="1" name=""/>
@@ -12112,7 +12410,7 @@
 </p:sld>
 </file>
 
-<file path=ppt/slides/slide11.xml><?xml version="1.0" encoding="utf-8"?>
+<file path=ppt/slides/slide12.xml><?xml version="1.0" encoding="utf-8"?>
 <p:sld xmlns:a="http://schemas.openxmlformats.org/drawingml/2006/main" xmlns:r="http://schemas.openxmlformats.org/officeDocument/2006/relationships" xmlns:p="http://schemas.openxmlformats.org/presentationml/2006/main">
   <p:cSld>
     <p:bg>
@@ -12234,7 +12532,7 @@
 </p:sld>
 </file>
 
-<file path=ppt/slides/slide12.xml><?xml version="1.0" encoding="utf-8"?>
+<file path=ppt/slides/slide13.xml><?xml version="1.0" encoding="utf-8"?>
 <p:sld xmlns:a="http://schemas.openxmlformats.org/drawingml/2006/main" xmlns:r="http://schemas.openxmlformats.org/officeDocument/2006/relationships" xmlns:p="http://schemas.openxmlformats.org/presentationml/2006/main">
   <p:cSld>
     <p:spTree>
@@ -12414,7 +12712,7 @@
 </p:sld>
 </file>
 
-<file path=ppt/slides/slide13.xml><?xml version="1.0" encoding="utf-8"?>
+<file path=ppt/slides/slide14.xml><?xml version="1.0" encoding="utf-8"?>
 <p:sld xmlns:a="http://schemas.openxmlformats.org/drawingml/2006/main" xmlns:r="http://schemas.openxmlformats.org/officeDocument/2006/relationships" xmlns:p="http://schemas.openxmlformats.org/presentationml/2006/main">
   <p:cSld>
     <p:spTree>
@@ -13167,7 +13465,7 @@
 </p:sld>
 </file>
 
-<file path=ppt/slides/slide14.xml><?xml version="1.0" encoding="utf-8"?>
+<file path=ppt/slides/slide15.xml><?xml version="1.0" encoding="utf-8"?>
 <p:sld xmlns:a="http://schemas.openxmlformats.org/drawingml/2006/main" xmlns:r="http://schemas.openxmlformats.org/officeDocument/2006/relationships" xmlns:p="http://schemas.openxmlformats.org/presentationml/2006/main">
   <p:cSld>
     <p:spTree>
@@ -13708,7 +14006,7 @@
 </p:sld>
 </file>
 
-<file path=ppt/slides/slide15.xml><?xml version="1.0" encoding="utf-8"?>
+<file path=ppt/slides/slide16.xml><?xml version="1.0" encoding="utf-8"?>
 <p:sld xmlns:a="http://schemas.openxmlformats.org/drawingml/2006/main" xmlns:r="http://schemas.openxmlformats.org/officeDocument/2006/relationships" xmlns:p="http://schemas.openxmlformats.org/presentationml/2006/main">
   <p:cSld>
     <p:spTree>
@@ -16794,31 +17092,6 @@
 <file path=ppt/slides/slide9.xml><?xml version="1.0" encoding="utf-8"?>
 <p:sld xmlns:a="http://schemas.openxmlformats.org/drawingml/2006/main" xmlns:r="http://schemas.openxmlformats.org/officeDocument/2006/relationships" xmlns:p="http://schemas.openxmlformats.org/presentationml/2006/main">
   <p:cSld>
-    <p:bg>
-      <p:bgPr>
-        <a:gradFill rotWithShape="1">
-          <a:gsLst>
-            <a:gs pos="10000">
-              <a:schemeClr val="bg2">
-                <a:tint val="97000"/>
-                <a:hueMod val="92000"/>
-                <a:satMod val="169000"/>
-                <a:lumMod val="164000"/>
-              </a:schemeClr>
-            </a:gs>
-            <a:gs pos="100000">
-              <a:schemeClr val="bg2">
-                <a:shade val="96000"/>
-                <a:satMod val="120000"/>
-                <a:lumMod val="90000"/>
-              </a:schemeClr>
-            </a:gs>
-          </a:gsLst>
-          <a:lin ang="6120000" scaled="1"/>
-        </a:gradFill>
-        <a:effectLst/>
-      </p:bgPr>
-    </p:bg>
     <p:spTree>
       <p:nvGrpSpPr>
         <p:cNvPr id="1" name=""/>
@@ -16833,72 +17106,12 @@
           <a:chExt cx="0" cy="0"/>
         </a:xfrm>
       </p:grpSpPr>
-      <p:sp useBgFill="1">
-        <p:nvSpPr>
-          <p:cNvPr id="23" name="Rectangle 7">
-            <a:extLst>
-              <a:ext uri="{FF2B5EF4-FFF2-40B4-BE49-F238E27FC236}">
-                <a16:creationId xmlns:a16="http://schemas.microsoft.com/office/drawing/2014/main" id="{7509B08A-C1EC-478C-86AF-60ADE06D9BBB}"/>
-              </a:ext>
-              <a:ext uri="{C183D7F6-B498-43B3-948B-1728B52AA6E4}">
-                <adec:decorative xmlns:adec="http://schemas.microsoft.com/office/drawing/2017/decorative" val="1"/>
-              </a:ext>
-            </a:extLst>
-          </p:cNvPr>
-          <p:cNvSpPr>
-            <a:spLocks noGrp="1" noRot="1" noChangeAspect="1" noMove="1" noResize="1" noEditPoints="1" noAdjustHandles="1" noChangeArrowheads="1" noChangeShapeType="1" noTextEdit="1"/>
-          </p:cNvSpPr>
-          <p:nvPr>
-            <p:extLst>
-              <p:ext uri="{386F3935-93C4-4BCD-93E2-E3B085C9AB24}">
-                <p16:designElem xmlns:p16="http://schemas.microsoft.com/office/powerpoint/2015/main" val="1"/>
-              </p:ext>
-            </p:extLst>
-          </p:nvPr>
-        </p:nvSpPr>
-        <p:spPr>
-          <a:xfrm>
-            <a:off x="0" y="0"/>
-            <a:ext cx="12192000" cy="6858000"/>
-          </a:xfrm>
-          <a:prstGeom prst="rect">
-            <a:avLst/>
-          </a:prstGeom>
-          <a:ln>
-            <a:noFill/>
-          </a:ln>
-        </p:spPr>
-        <p:style>
-          <a:lnRef idx="2">
-            <a:schemeClr val="accent1">
-              <a:shade val="50000"/>
-            </a:schemeClr>
-          </a:lnRef>
-          <a:fillRef idx="1">
-            <a:schemeClr val="accent1"/>
-          </a:fillRef>
-          <a:effectRef idx="0">
-            <a:schemeClr val="accent1"/>
-          </a:effectRef>
-          <a:fontRef idx="minor">
-            <a:schemeClr val="lt1"/>
-          </a:fontRef>
-        </p:style>
-        <p:txBody>
-          <a:bodyPr rtlCol="0" anchor="ctr"/>
-          <a:lstStyle/>
-          <a:p>
-            <a:pPr algn="ctr"/>
-            <a:endParaRPr lang="en-US"/>
-          </a:p>
-        </p:txBody>
-      </p:sp>
       <p:sp>
         <p:nvSpPr>
           <p:cNvPr id="2" name="Titre 1">
             <a:extLst>
               <a:ext uri="{FF2B5EF4-FFF2-40B4-BE49-F238E27FC236}">
-                <a16:creationId xmlns:a16="http://schemas.microsoft.com/office/drawing/2014/main" id="{E286FAAA-D668-42B4-9647-5ECEBD96BC52}"/>
+                <a16:creationId xmlns:a16="http://schemas.microsoft.com/office/drawing/2014/main" id="{9EE18481-A455-44BD-AD4D-5787A0C4DC9F}"/>
               </a:ext>
             </a:extLst>
           </p:cNvPr>
@@ -16909,90 +17122,24 @@
             <p:ph type="title"/>
           </p:nvPr>
         </p:nvSpPr>
-        <p:spPr>
-          <a:xfrm>
-            <a:off x="640290" y="685800"/>
-            <a:ext cx="4818656" cy="4603749"/>
-          </a:xfrm>
-        </p:spPr>
+        <p:spPr/>
         <p:txBody>
-          <a:bodyPr>
-            <a:normAutofit/>
-          </a:bodyPr>
+          <a:bodyPr/>
           <a:lstStyle/>
           <a:p>
-            <a:pPr algn="r"/>
-            <a:r>
-              <a:rPr lang="fr-FR" sz="5200"/>
-              <a:t>Solutions</a:t>
-            </a:r>
-            <a:endParaRPr lang="en-GB" sz="5200"/>
-          </a:p>
-        </p:txBody>
-      </p:sp>
-      <p:sp>
-        <p:nvSpPr>
-          <p:cNvPr id="10" name="Rectangle 9">
-            <a:extLst>
-              <a:ext uri="{FF2B5EF4-FFF2-40B4-BE49-F238E27FC236}">
-                <a16:creationId xmlns:a16="http://schemas.microsoft.com/office/drawing/2014/main" id="{221CC330-4259-4C32-BF8B-5FE13FFABB3A}"/>
-              </a:ext>
-              <a:ext uri="{C183D7F6-B498-43B3-948B-1728B52AA6E4}">
-                <adec:decorative xmlns:adec="http://schemas.microsoft.com/office/drawing/2017/decorative" val="1"/>
-              </a:ext>
-            </a:extLst>
-          </p:cNvPr>
-          <p:cNvSpPr>
-            <a:spLocks noGrp="1" noRot="1" noChangeAspect="1" noMove="1" noResize="1" noEditPoints="1" noAdjustHandles="1" noChangeArrowheads="1" noChangeShapeType="1" noTextEdit="1"/>
-          </p:cNvSpPr>
-          <p:nvPr>
-            <p:extLst>
-              <p:ext uri="{386F3935-93C4-4BCD-93E2-E3B085C9AB24}">
-                <p16:designElem xmlns:p16="http://schemas.microsoft.com/office/powerpoint/2015/main" val="1"/>
-              </p:ext>
-            </p:extLst>
-          </p:nvPr>
-        </p:nvSpPr>
-        <p:spPr>
-          <a:xfrm>
-            <a:off x="6095999" y="0"/>
-            <a:ext cx="6096001" cy="6858000"/>
-          </a:xfrm>
-          <a:prstGeom prst="rect">
-            <a:avLst/>
-          </a:prstGeom>
-          <a:solidFill>
-            <a:schemeClr val="bg2">
-              <a:alpha val="97000"/>
-            </a:schemeClr>
-          </a:solidFill>
-          <a:ln>
-            <a:noFill/>
-          </a:ln>
-          <a:effectLst/>
-        </p:spPr>
-        <p:style>
-          <a:lnRef idx="2">
-            <a:schemeClr val="accent1">
-              <a:shade val="50000"/>
-            </a:schemeClr>
-          </a:lnRef>
-          <a:fillRef idx="1001">
-            <a:schemeClr val="dk2"/>
-          </a:fillRef>
-          <a:effectRef idx="0">
-            <a:schemeClr val="accent1"/>
-          </a:effectRef>
-          <a:fontRef idx="minor">
-            <a:schemeClr val="lt1"/>
-          </a:fontRef>
-        </p:style>
-        <p:txBody>
-          <a:bodyPr rtlCol="0" anchor="ctr"/>
-          <a:lstStyle/>
-          <a:p>
-            <a:pPr algn="ctr"/>
-            <a:endParaRPr lang="en-US"/>
+            <a:r>
+              <a:rPr lang="fr-FR" dirty="0" err="1"/>
+              <a:t>Add</a:t>
+            </a:r>
+            <a:r>
+              <a:rPr lang="fr-FR" dirty="0"/>
+              <a:t> a </a:t>
+            </a:r>
+            <a:r>
+              <a:rPr lang="fr-FR" dirty="0" err="1"/>
+              <a:t>reward</a:t>
+            </a:r>
+            <a:endParaRPr lang="en-GB" dirty="0"/>
           </a:p>
         </p:txBody>
       </p:sp>
@@ -17001,7 +17148,7 @@
           <p:cNvPr id="3" name="Espace réservé du contenu 2">
             <a:extLst>
               <a:ext uri="{FF2B5EF4-FFF2-40B4-BE49-F238E27FC236}">
-                <a16:creationId xmlns:a16="http://schemas.microsoft.com/office/drawing/2014/main" id="{128178D9-55E1-4BEF-84B2-EF38491DA27C}"/>
+                <a16:creationId xmlns:a16="http://schemas.microsoft.com/office/drawing/2014/main" id="{46812B09-29C0-4173-89F9-C37DB57FBC45}"/>
               </a:ext>
             </a:extLst>
           </p:cNvPr>
@@ -17012,73 +17159,77 @@
             <p:ph idx="1"/>
           </p:nvPr>
         </p:nvSpPr>
-        <p:spPr>
-          <a:xfrm>
-            <a:off x="6625651" y="685800"/>
-            <a:ext cx="4878959" cy="4603750"/>
-          </a:xfrm>
-        </p:spPr>
+        <p:spPr/>
         <p:txBody>
-          <a:bodyPr>
-            <a:normAutofit/>
-          </a:bodyPr>
+          <a:bodyPr/>
           <a:lstStyle/>
           <a:p>
             <a:r>
-              <a:rPr lang="fr-FR">
-                <a:solidFill>
-                  <a:schemeClr val="tx1"/>
-                </a:solidFill>
-              </a:rPr>
-              <a:t>Create SAI with pyinstaller for multiplatform</a:t>
-            </a:r>
-          </a:p>
-          <a:p>
-            <a:r>
-              <a:rPr lang="fr-FR">
-                <a:solidFill>
-                  <a:schemeClr val="tx1"/>
-                </a:solidFill>
-              </a:rPr>
-              <a:t>Launch a scan that remove duplicate screenshot and order them by interesting strategie</a:t>
-            </a:r>
-          </a:p>
-          <a:p>
-            <a:r>
-              <a:rPr lang="fr-FR">
-                <a:solidFill>
-                  <a:schemeClr val="tx1"/>
-                </a:solidFill>
-              </a:rPr>
-              <a:t>Increment the reward if there was difference between images</a:t>
-            </a:r>
-          </a:p>
-          <a:p>
-            <a:r>
-              <a:rPr lang="fr-FR">
-                <a:solidFill>
-                  <a:schemeClr val="tx1"/>
-                </a:solidFill>
-              </a:rPr>
-              <a:t>Create a web page with the strategies learned</a:t>
-            </a:r>
-          </a:p>
-          <a:p>
-            <a:r>
-              <a:rPr lang="fr-FR">
-                <a:solidFill>
-                  <a:schemeClr val="tx1"/>
-                </a:solidFill>
-              </a:rPr>
-              <a:t>Create a web interface or a vocal controller to order strategies</a:t>
-            </a:r>
+              <a:rPr lang="fr-FR" dirty="0"/>
+              <a:t>The </a:t>
+            </a:r>
+            <a:r>
+              <a:rPr lang="fr-FR" dirty="0" err="1"/>
+              <a:t>reward</a:t>
+            </a:r>
+            <a:r>
+              <a:rPr lang="fr-FR" dirty="0"/>
+              <a:t> </a:t>
+            </a:r>
+            <a:r>
+              <a:rPr lang="fr-FR" dirty="0" err="1"/>
+              <a:t>will</a:t>
+            </a:r>
+            <a:r>
+              <a:rPr lang="fr-FR" dirty="0"/>
+              <a:t> impact the </a:t>
+            </a:r>
+            <a:r>
+              <a:rPr lang="fr-FR" dirty="0" err="1"/>
+              <a:t>next</a:t>
+            </a:r>
+            <a:r>
+              <a:rPr lang="fr-FR" dirty="0"/>
+              <a:t> </a:t>
+            </a:r>
+            <a:r>
+              <a:rPr lang="fr-FR" dirty="0" err="1"/>
+              <a:t>decision</a:t>
+            </a:r>
+            <a:r>
+              <a:rPr lang="fr-FR" dirty="0"/>
+              <a:t> for SAI</a:t>
+            </a:r>
+          </a:p>
+          <a:p>
+            <a:r>
+              <a:rPr lang="fr-FR" dirty="0" err="1"/>
+              <a:t>Explain</a:t>
+            </a:r>
+            <a:r>
+              <a:rPr lang="fr-FR" dirty="0"/>
+              <a:t> </a:t>
+            </a:r>
+            <a:r>
+              <a:rPr lang="fr-FR" dirty="0" err="1"/>
+              <a:t>with</a:t>
+            </a:r>
+            <a:r>
+              <a:rPr lang="fr-FR" dirty="0"/>
+              <a:t> a </a:t>
+            </a:r>
+            <a:r>
+              <a:rPr lang="fr-FR"/>
+              <a:t>schema</a:t>
+            </a:r>
+            <a:endParaRPr lang="en-GB"/>
           </a:p>
         </p:txBody>
       </p:sp>
     </p:spTree>
     <p:extLst>
       <p:ext uri="{BB962C8B-B14F-4D97-AF65-F5344CB8AC3E}">
-        <p14:creationId xmlns:p14="http://schemas.microsoft.com/office/powerpoint/2010/main" val="701313445"/>
+        <p14:creationId xmlns:p14="http://schemas.microsoft.com/office/powerpoint/2010/main" val="1766098369"/>
       </p:ext>
     </p:extLst>
   </p:cSld>

</xml_diff>

<commit_message>
#12 SAI everytime added on slides
</commit_message>
<xml_diff>
--- a/SAI_presentation.pptx
+++ b/SAI_presentation.pptx
@@ -14,13 +14,14 @@
     <p:sldId id="269" r:id="rId8"/>
     <p:sldId id="270" r:id="rId9"/>
     <p:sldId id="271" r:id="rId10"/>
-    <p:sldId id="259" r:id="rId11"/>
-    <p:sldId id="260" r:id="rId12"/>
-    <p:sldId id="261" r:id="rId13"/>
-    <p:sldId id="265" r:id="rId14"/>
-    <p:sldId id="262" r:id="rId15"/>
-    <p:sldId id="264" r:id="rId16"/>
-    <p:sldId id="263" r:id="rId17"/>
+    <p:sldId id="272" r:id="rId11"/>
+    <p:sldId id="259" r:id="rId12"/>
+    <p:sldId id="260" r:id="rId13"/>
+    <p:sldId id="261" r:id="rId14"/>
+    <p:sldId id="265" r:id="rId15"/>
+    <p:sldId id="262" r:id="rId16"/>
+    <p:sldId id="264" r:id="rId17"/>
+    <p:sldId id="263" r:id="rId18"/>
   </p:sldIdLst>
   <p:sldSz cx="12192000" cy="6858000"/>
   <p:notesSz cx="6858000" cy="9144000"/>
@@ -6743,7 +6744,7 @@
             <a:fld id="{B61BEF0D-F0BB-DE4B-95CE-6DB70DBA9567}" type="datetimeFigureOut">
               <a:rPr lang="en-US" dirty="0"/>
               <a:pPr/>
-              <a:t>3/7/2020</a:t>
+              <a:t>3/8/2020</a:t>
             </a:fld>
             <a:endParaRPr lang="en-US" dirty="0"/>
           </a:p>
@@ -7176,7 +7177,7 @@
             <a:fld id="{B61BEF0D-F0BB-DE4B-95CE-6DB70DBA9567}" type="datetimeFigureOut">
               <a:rPr lang="en-US" dirty="0"/>
               <a:pPr/>
-              <a:t>3/7/2020</a:t>
+              <a:t>3/8/2020</a:t>
             </a:fld>
             <a:endParaRPr lang="en-US" dirty="0"/>
           </a:p>
@@ -7423,7 +7424,7 @@
             <a:fld id="{B61BEF0D-F0BB-DE4B-95CE-6DB70DBA9567}" type="datetimeFigureOut">
               <a:rPr lang="en-US" dirty="0"/>
               <a:pPr/>
-              <a:t>3/7/2020</a:t>
+              <a:t>3/8/2020</a:t>
             </a:fld>
             <a:endParaRPr lang="en-US" dirty="0"/>
           </a:p>
@@ -7728,7 +7729,7 @@
             <a:fld id="{B61BEF0D-F0BB-DE4B-95CE-6DB70DBA9567}" type="datetimeFigureOut">
               <a:rPr lang="en-US" dirty="0"/>
               <a:pPr/>
-              <a:t>3/7/2020</a:t>
+              <a:t>3/8/2020</a:t>
             </a:fld>
             <a:endParaRPr lang="en-US" dirty="0"/>
           </a:p>
@@ -8043,7 +8044,7 @@
             <a:fld id="{B61BEF0D-F0BB-DE4B-95CE-6DB70DBA9567}" type="datetimeFigureOut">
               <a:rPr lang="en-US" dirty="0"/>
               <a:pPr/>
-              <a:t>3/7/2020</a:t>
+              <a:t>3/8/2020</a:t>
             </a:fld>
             <a:endParaRPr lang="en-US" dirty="0"/>
           </a:p>
@@ -8342,7 +8343,7 @@
             <a:fld id="{B61BEF0D-F0BB-DE4B-95CE-6DB70DBA9567}" type="datetimeFigureOut">
               <a:rPr lang="en-US" dirty="0"/>
               <a:pPr/>
-              <a:t>3/7/2020</a:t>
+              <a:t>3/8/2020</a:t>
             </a:fld>
             <a:endParaRPr lang="en-US" dirty="0"/>
           </a:p>
@@ -8706,7 +8707,7 @@
             <a:fld id="{B61BEF0D-F0BB-DE4B-95CE-6DB70DBA9567}" type="datetimeFigureOut">
               <a:rPr lang="en-US" dirty="0"/>
               <a:pPr/>
-              <a:t>3/7/2020</a:t>
+              <a:t>3/8/2020</a:t>
             </a:fld>
             <a:endParaRPr lang="en-US" dirty="0"/>
           </a:p>
@@ -8877,7 +8878,7 @@
             <a:fld id="{B61BEF0D-F0BB-DE4B-95CE-6DB70DBA9567}" type="datetimeFigureOut">
               <a:rPr lang="en-US" dirty="0"/>
               <a:pPr/>
-              <a:t>3/7/2020</a:t>
+              <a:t>3/8/2020</a:t>
             </a:fld>
             <a:endParaRPr lang="en-US" dirty="0"/>
           </a:p>
@@ -9054,7 +9055,7 @@
             <a:fld id="{B61BEF0D-F0BB-DE4B-95CE-6DB70DBA9567}" type="datetimeFigureOut">
               <a:rPr lang="en-US" dirty="0"/>
               <a:pPr/>
-              <a:t>3/7/2020</a:t>
+              <a:t>3/8/2020</a:t>
             </a:fld>
             <a:endParaRPr lang="en-US" dirty="0"/>
           </a:p>
@@ -9221,7 +9222,7 @@
             <a:fld id="{B61BEF0D-F0BB-DE4B-95CE-6DB70DBA9567}" type="datetimeFigureOut">
               <a:rPr lang="en-US" dirty="0"/>
               <a:pPr/>
-              <a:t>3/7/2020</a:t>
+              <a:t>3/8/2020</a:t>
             </a:fld>
             <a:endParaRPr lang="en-US" dirty="0"/>
           </a:p>
@@ -9468,7 +9469,7 @@
             <a:fld id="{B61BEF0D-F0BB-DE4B-95CE-6DB70DBA9567}" type="datetimeFigureOut">
               <a:rPr lang="en-US" dirty="0"/>
               <a:pPr/>
-              <a:t>3/7/2020</a:t>
+              <a:t>3/8/2020</a:t>
             </a:fld>
             <a:endParaRPr lang="en-US" dirty="0"/>
           </a:p>
@@ -9701,7 +9702,7 @@
             <a:fld id="{B61BEF0D-F0BB-DE4B-95CE-6DB70DBA9567}" type="datetimeFigureOut">
               <a:rPr lang="en-US" dirty="0"/>
               <a:pPr/>
-              <a:t>3/7/2020</a:t>
+              <a:t>3/8/2020</a:t>
             </a:fld>
             <a:endParaRPr lang="en-US" dirty="0"/>
           </a:p>
@@ -10080,7 +10081,7 @@
             <a:fld id="{B61BEF0D-F0BB-DE4B-95CE-6DB70DBA9567}" type="datetimeFigureOut">
               <a:rPr lang="en-US" dirty="0"/>
               <a:pPr/>
-              <a:t>3/7/2020</a:t>
+              <a:t>3/8/2020</a:t>
             </a:fld>
             <a:endParaRPr lang="en-US" dirty="0"/>
           </a:p>
@@ -10195,7 +10196,7 @@
             <a:fld id="{B61BEF0D-F0BB-DE4B-95CE-6DB70DBA9567}" type="datetimeFigureOut">
               <a:rPr lang="en-US" dirty="0"/>
               <a:pPr/>
-              <a:t>3/7/2020</a:t>
+              <a:t>3/8/2020</a:t>
             </a:fld>
             <a:endParaRPr lang="en-US" dirty="0"/>
           </a:p>
@@ -10287,7 +10288,7 @@
             <a:fld id="{B61BEF0D-F0BB-DE4B-95CE-6DB70DBA9567}" type="datetimeFigureOut">
               <a:rPr lang="en-US" dirty="0"/>
               <a:pPr/>
-              <a:t>3/7/2020</a:t>
+              <a:t>3/8/2020</a:t>
             </a:fld>
             <a:endParaRPr lang="en-US" dirty="0"/>
           </a:p>
@@ -10539,7 +10540,7 @@
             <a:fld id="{B61BEF0D-F0BB-DE4B-95CE-6DB70DBA9567}" type="datetimeFigureOut">
               <a:rPr lang="en-US" dirty="0"/>
               <a:pPr/>
-              <a:t>3/7/2020</a:t>
+              <a:t>3/8/2020</a:t>
             </a:fld>
             <a:endParaRPr lang="en-US" dirty="0"/>
           </a:p>
@@ -10819,7 +10820,7 @@
             <a:fld id="{B61BEF0D-F0BB-DE4B-95CE-6DB70DBA9567}" type="datetimeFigureOut">
               <a:rPr lang="en-US" dirty="0"/>
               <a:pPr/>
-              <a:t>3/7/2020</a:t>
+              <a:t>3/8/2020</a:t>
             </a:fld>
             <a:endParaRPr lang="en-US" dirty="0"/>
           </a:p>
@@ -11222,7 +11223,7 @@
             <a:fld id="{B61BEF0D-F0BB-DE4B-95CE-6DB70DBA9567}" type="datetimeFigureOut">
               <a:rPr lang="en-US" dirty="0"/>
               <a:pPr/>
-              <a:t>3/7/2020</a:t>
+              <a:t>3/8/2020</a:t>
             </a:fld>
             <a:endParaRPr lang="en-US" dirty="0"/>
           </a:p>
@@ -12022,6 +12023,209 @@
 <file path=ppt/slides/slide10.xml><?xml version="1.0" encoding="utf-8"?>
 <p:sld xmlns:a="http://schemas.openxmlformats.org/drawingml/2006/main" xmlns:r="http://schemas.openxmlformats.org/officeDocument/2006/relationships" xmlns:p="http://schemas.openxmlformats.org/presentationml/2006/main">
   <p:cSld>
+    <p:spTree>
+      <p:nvGrpSpPr>
+        <p:cNvPr id="1" name=""/>
+        <p:cNvGrpSpPr/>
+        <p:nvPr/>
+      </p:nvGrpSpPr>
+      <p:grpSpPr>
+        <a:xfrm>
+          <a:off x="0" y="0"/>
+          <a:ext cx="0" cy="0"/>
+          <a:chOff x="0" y="0"/>
+          <a:chExt cx="0" cy="0"/>
+        </a:xfrm>
+      </p:grpSpPr>
+      <p:sp>
+        <p:nvSpPr>
+          <p:cNvPr id="2" name="Titre 1">
+            <a:extLst>
+              <a:ext uri="{FF2B5EF4-FFF2-40B4-BE49-F238E27FC236}">
+                <a16:creationId xmlns:a16="http://schemas.microsoft.com/office/drawing/2014/main" id="{22965269-F56B-485C-9491-09F62BD887E9}"/>
+              </a:ext>
+            </a:extLst>
+          </p:cNvPr>
+          <p:cNvSpPr>
+            <a:spLocks noGrp="1"/>
+          </p:cNvSpPr>
+          <p:nvPr>
+            <p:ph type="title"/>
+          </p:nvPr>
+        </p:nvSpPr>
+        <p:spPr/>
+        <p:txBody>
+          <a:bodyPr/>
+          <a:lstStyle/>
+          <a:p>
+            <a:r>
+              <a:rPr lang="fr-FR" dirty="0"/>
+              <a:t>SAI </a:t>
+            </a:r>
+            <a:r>
+              <a:rPr lang="fr-FR" dirty="0" err="1"/>
+              <a:t>everytime</a:t>
+            </a:r>
+            <a:endParaRPr lang="en-GB" dirty="0"/>
+          </a:p>
+        </p:txBody>
+      </p:sp>
+      <p:sp>
+        <p:nvSpPr>
+          <p:cNvPr id="3" name="Espace réservé du contenu 2">
+            <a:extLst>
+              <a:ext uri="{FF2B5EF4-FFF2-40B4-BE49-F238E27FC236}">
+                <a16:creationId xmlns:a16="http://schemas.microsoft.com/office/drawing/2014/main" id="{8B6D93B1-8384-47F9-818D-27D3F4A94675}"/>
+              </a:ext>
+            </a:extLst>
+          </p:cNvPr>
+          <p:cNvSpPr>
+            <a:spLocks noGrp="1"/>
+          </p:cNvSpPr>
+          <p:nvPr>
+            <p:ph idx="1"/>
+          </p:nvPr>
+        </p:nvSpPr>
+        <p:spPr/>
+        <p:txBody>
+          <a:bodyPr/>
+          <a:lstStyle/>
+          <a:p>
+            <a:r>
+              <a:rPr lang="fr-FR" dirty="0"/>
+              <a:t>SAI </a:t>
+            </a:r>
+            <a:r>
+              <a:rPr lang="fr-FR" dirty="0" err="1"/>
+              <a:t>need</a:t>
+            </a:r>
+            <a:r>
+              <a:rPr lang="fr-FR" dirty="0"/>
+              <a:t> to </a:t>
+            </a:r>
+            <a:r>
+              <a:rPr lang="fr-FR" dirty="0" err="1"/>
+              <a:t>be</a:t>
+            </a:r>
+            <a:r>
+              <a:rPr lang="fr-FR" dirty="0"/>
+              <a:t> launch </a:t>
+            </a:r>
+            <a:r>
+              <a:rPr lang="fr-FR" dirty="0" err="1"/>
+              <a:t>everytime</a:t>
+            </a:r>
+            <a:r>
+              <a:rPr lang="fr-FR" dirty="0"/>
+              <a:t> the computer </a:t>
+            </a:r>
+            <a:r>
+              <a:rPr lang="fr-FR" dirty="0" err="1"/>
+              <a:t>is</a:t>
+            </a:r>
+            <a:r>
+              <a:rPr lang="fr-FR" dirty="0"/>
+              <a:t> up, </a:t>
+            </a:r>
+            <a:r>
+              <a:rPr lang="fr-FR" dirty="0" err="1"/>
+              <a:t>it</a:t>
+            </a:r>
+            <a:r>
+              <a:rPr lang="fr-FR" dirty="0"/>
+              <a:t> </a:t>
+            </a:r>
+            <a:r>
+              <a:rPr lang="fr-FR" dirty="0" err="1"/>
+              <a:t>needs</a:t>
+            </a:r>
+            <a:r>
+              <a:rPr lang="fr-FR" dirty="0"/>
+              <a:t> to run as a daemon </a:t>
+            </a:r>
+            <a:r>
+              <a:rPr lang="fr-FR" dirty="0" err="1"/>
+              <a:t>that</a:t>
+            </a:r>
+            <a:r>
+              <a:rPr lang="fr-FR" dirty="0"/>
+              <a:t> use the </a:t>
+            </a:r>
+            <a:r>
+              <a:rPr lang="fr-FR" dirty="0" err="1"/>
+              <a:t>mic</a:t>
+            </a:r>
+            <a:r>
+              <a:rPr lang="fr-FR" dirty="0"/>
+              <a:t> and let the </a:t>
+            </a:r>
+            <a:r>
+              <a:rPr lang="fr-FR" dirty="0" err="1"/>
+              <a:t>mic</a:t>
+            </a:r>
+            <a:r>
+              <a:rPr lang="fr-FR" dirty="0"/>
+              <a:t> for </a:t>
+            </a:r>
+            <a:r>
+              <a:rPr lang="fr-FR" dirty="0" err="1"/>
+              <a:t>another</a:t>
+            </a:r>
+            <a:r>
+              <a:rPr lang="fr-FR" dirty="0"/>
+              <a:t> application if </a:t>
+            </a:r>
+            <a:r>
+              <a:rPr lang="fr-FR" dirty="0" err="1"/>
+              <a:t>its</a:t>
+            </a:r>
+            <a:r>
+              <a:rPr lang="fr-FR" dirty="0"/>
+              <a:t> </a:t>
+            </a:r>
+            <a:r>
+              <a:rPr lang="fr-FR" dirty="0" err="1"/>
+              <a:t>need</a:t>
+            </a:r>
+            <a:endParaRPr lang="fr-FR" dirty="0"/>
+          </a:p>
+          <a:p>
+            <a:r>
+              <a:rPr lang="fr-FR" dirty="0"/>
+              <a:t>A </a:t>
+            </a:r>
+            <a:r>
+              <a:rPr lang="fr-FR" dirty="0" err="1"/>
+              <a:t>schema</a:t>
+            </a:r>
+            <a:r>
+              <a:rPr lang="fr-FR" dirty="0"/>
+              <a:t> to </a:t>
+            </a:r>
+            <a:r>
+              <a:rPr lang="fr-FR"/>
+              <a:t>explain</a:t>
+            </a:r>
+            <a:endParaRPr lang="en-GB"/>
+          </a:p>
+        </p:txBody>
+      </p:sp>
+    </p:spTree>
+    <p:extLst>
+      <p:ext uri="{BB962C8B-B14F-4D97-AF65-F5344CB8AC3E}">
+        <p14:creationId xmlns:p14="http://schemas.microsoft.com/office/powerpoint/2010/main" val="289160787"/>
+      </p:ext>
+    </p:extLst>
+  </p:cSld>
+  <p:clrMapOvr>
+    <a:masterClrMapping/>
+  </p:clrMapOvr>
+</p:sld>
+</file>
+
+<file path=ppt/slides/slide11.xml><?xml version="1.0" encoding="utf-8"?>
+<p:sld xmlns:a="http://schemas.openxmlformats.org/drawingml/2006/main" xmlns:r="http://schemas.openxmlformats.org/officeDocument/2006/relationships" xmlns:p="http://schemas.openxmlformats.org/presentationml/2006/main">
+  <p:cSld>
     <p:bg>
       <p:bgPr>
         <a:gradFill rotWithShape="1">
@@ -12316,7 +12520,7 @@
 </p:sld>
 </file>
 
-<file path=ppt/slides/slide11.xml><?xml version="1.0" encoding="utf-8"?>
+<file path=ppt/slides/slide12.xml><?xml version="1.0" encoding="utf-8"?>
 <p:sld xmlns:a="http://schemas.openxmlformats.org/drawingml/2006/main" xmlns:r="http://schemas.openxmlformats.org/officeDocument/2006/relationships" xmlns:p="http://schemas.openxmlformats.org/presentationml/2006/main">
   <p:cSld>
     <p:spTree>
@@ -12410,7 +12614,7 @@
 </p:sld>
 </file>
 
-<file path=ppt/slides/slide12.xml><?xml version="1.0" encoding="utf-8"?>
+<file path=ppt/slides/slide13.xml><?xml version="1.0" encoding="utf-8"?>
 <p:sld xmlns:a="http://schemas.openxmlformats.org/drawingml/2006/main" xmlns:r="http://schemas.openxmlformats.org/officeDocument/2006/relationships" xmlns:p="http://schemas.openxmlformats.org/presentationml/2006/main">
   <p:cSld>
     <p:bg>
@@ -12532,7 +12736,7 @@
 </p:sld>
 </file>
 
-<file path=ppt/slides/slide13.xml><?xml version="1.0" encoding="utf-8"?>
+<file path=ppt/slides/slide14.xml><?xml version="1.0" encoding="utf-8"?>
 <p:sld xmlns:a="http://schemas.openxmlformats.org/drawingml/2006/main" xmlns:r="http://schemas.openxmlformats.org/officeDocument/2006/relationships" xmlns:p="http://schemas.openxmlformats.org/presentationml/2006/main">
   <p:cSld>
     <p:spTree>
@@ -12712,7 +12916,7 @@
 </p:sld>
 </file>
 
-<file path=ppt/slides/slide14.xml><?xml version="1.0" encoding="utf-8"?>
+<file path=ppt/slides/slide15.xml><?xml version="1.0" encoding="utf-8"?>
 <p:sld xmlns:a="http://schemas.openxmlformats.org/drawingml/2006/main" xmlns:r="http://schemas.openxmlformats.org/officeDocument/2006/relationships" xmlns:p="http://schemas.openxmlformats.org/presentationml/2006/main">
   <p:cSld>
     <p:spTree>
@@ -13465,7 +13669,7 @@
 </p:sld>
 </file>
 
-<file path=ppt/slides/slide15.xml><?xml version="1.0" encoding="utf-8"?>
+<file path=ppt/slides/slide16.xml><?xml version="1.0" encoding="utf-8"?>
 <p:sld xmlns:a="http://schemas.openxmlformats.org/drawingml/2006/main" xmlns:r="http://schemas.openxmlformats.org/officeDocument/2006/relationships" xmlns:p="http://schemas.openxmlformats.org/presentationml/2006/main">
   <p:cSld>
     <p:spTree>
@@ -14006,7 +14210,7 @@
 </p:sld>
 </file>
 
-<file path=ppt/slides/slide16.xml><?xml version="1.0" encoding="utf-8"?>
+<file path=ppt/slides/slide17.xml><?xml version="1.0" encoding="utf-8"?>
 <p:sld xmlns:a="http://schemas.openxmlformats.org/drawingml/2006/main" xmlns:r="http://schemas.openxmlformats.org/officeDocument/2006/relationships" xmlns:p="http://schemas.openxmlformats.org/presentationml/2006/main">
   <p:cSld>
     <p:spTree>

</xml_diff>

<commit_message>
#12 Issues updated on slides
</commit_message>
<xml_diff>
--- a/SAI_presentation.pptx
+++ b/SAI_presentation.pptx
@@ -16939,54 +16939,337 @@
           <a:lstStyle/>
           <a:p>
             <a:r>
+              <a:rPr lang="fr-FR" dirty="0">
+                <a:solidFill>
+                  <a:schemeClr val="tx1"/>
+                </a:solidFill>
+              </a:rPr>
+              <a:t>Hard to </a:t>
+            </a:r>
+            <a:r>
+              <a:rPr lang="fr-FR" dirty="0" err="1">
+                <a:solidFill>
+                  <a:schemeClr val="tx1"/>
+                </a:solidFill>
+              </a:rPr>
+              <a:t>deploy</a:t>
+            </a:r>
+            <a:endParaRPr lang="fr-FR" dirty="0">
+              <a:solidFill>
+                <a:schemeClr val="tx1"/>
+              </a:solidFill>
+            </a:endParaRPr>
+          </a:p>
+          <a:p>
+            <a:r>
+              <a:rPr lang="fr-FR" dirty="0" err="1">
+                <a:solidFill>
+                  <a:schemeClr val="tx1"/>
+                </a:solidFill>
+              </a:rPr>
+              <a:t>Simulate</a:t>
+            </a:r>
+            <a:r>
+              <a:rPr lang="fr-FR" dirty="0">
+                <a:solidFill>
+                  <a:schemeClr val="tx1"/>
+                </a:solidFill>
+              </a:rPr>
+              <a:t> the </a:t>
+            </a:r>
+            <a:r>
+              <a:rPr lang="fr-FR" dirty="0" err="1">
+                <a:solidFill>
+                  <a:schemeClr val="tx1"/>
+                </a:solidFill>
+              </a:rPr>
+              <a:t>brain</a:t>
+            </a:r>
+            <a:r>
+              <a:rPr lang="fr-FR" dirty="0">
+                <a:solidFill>
+                  <a:schemeClr val="tx1"/>
+                </a:solidFill>
+              </a:rPr>
+              <a:t> </a:t>
+            </a:r>
+            <a:r>
+              <a:rPr lang="fr-FR" dirty="0" err="1">
+                <a:solidFill>
+                  <a:schemeClr val="tx1"/>
+                </a:solidFill>
+              </a:rPr>
+              <a:t>behavior</a:t>
+            </a:r>
+            <a:r>
+              <a:rPr lang="fr-FR" dirty="0">
+                <a:solidFill>
+                  <a:schemeClr val="tx1"/>
+                </a:solidFill>
+              </a:rPr>
+              <a:t> </a:t>
+            </a:r>
+            <a:r>
+              <a:rPr lang="fr-FR" dirty="0" err="1">
+                <a:solidFill>
+                  <a:schemeClr val="tx1"/>
+                </a:solidFill>
+              </a:rPr>
+              <a:t>during</a:t>
+            </a:r>
+            <a:r>
+              <a:rPr lang="fr-FR" dirty="0">
+                <a:solidFill>
+                  <a:schemeClr val="tx1"/>
+                </a:solidFill>
+              </a:rPr>
+              <a:t> </a:t>
+            </a:r>
+            <a:r>
+              <a:rPr lang="fr-FR" dirty="0" err="1">
+                <a:solidFill>
+                  <a:schemeClr val="tx1"/>
+                </a:solidFill>
+              </a:rPr>
+              <a:t>sleep</a:t>
+            </a:r>
+            <a:r>
+              <a:rPr lang="fr-FR" dirty="0">
+                <a:solidFill>
+                  <a:schemeClr val="tx1"/>
+                </a:solidFill>
+              </a:rPr>
+              <a:t> (sort/</a:t>
+            </a:r>
+            <a:r>
+              <a:rPr lang="fr-FR" dirty="0" err="1">
+                <a:solidFill>
+                  <a:schemeClr val="tx1"/>
+                </a:solidFill>
+              </a:rPr>
+              <a:t>compress</a:t>
+            </a:r>
+            <a:r>
+              <a:rPr lang="fr-FR" dirty="0">
+                <a:solidFill>
+                  <a:schemeClr val="tx1"/>
+                </a:solidFill>
+              </a:rPr>
+              <a:t>/</a:t>
+            </a:r>
+            <a:r>
+              <a:rPr lang="fr-FR" dirty="0" err="1">
+                <a:solidFill>
+                  <a:schemeClr val="tx1"/>
+                </a:solidFill>
+              </a:rPr>
+              <a:t>delete</a:t>
+            </a:r>
+            <a:r>
+              <a:rPr lang="fr-FR" dirty="0">
+                <a:solidFill>
+                  <a:schemeClr val="tx1"/>
+                </a:solidFill>
+              </a:rPr>
+              <a:t> data)</a:t>
+            </a:r>
+          </a:p>
+          <a:p>
+            <a:r>
+              <a:rPr lang="fr-FR" dirty="0" err="1">
+                <a:solidFill>
+                  <a:schemeClr val="tx1"/>
+                </a:solidFill>
+              </a:rPr>
+              <a:t>Add</a:t>
+            </a:r>
+            <a:r>
+              <a:rPr lang="fr-FR" dirty="0">
+                <a:solidFill>
+                  <a:schemeClr val="tx1"/>
+                </a:solidFill>
+              </a:rPr>
+              <a:t> a </a:t>
+            </a:r>
+            <a:r>
+              <a:rPr lang="fr-FR" dirty="0" err="1">
+                <a:solidFill>
+                  <a:schemeClr val="tx1"/>
+                </a:solidFill>
+              </a:rPr>
+              <a:t>reward</a:t>
+            </a:r>
+            <a:r>
+              <a:rPr lang="fr-FR" dirty="0">
+                <a:solidFill>
+                  <a:schemeClr val="tx1"/>
+                </a:solidFill>
+              </a:rPr>
+              <a:t> (</a:t>
+            </a:r>
+            <a:r>
+              <a:rPr lang="fr-FR" dirty="0" err="1">
+                <a:solidFill>
+                  <a:schemeClr val="tx1"/>
+                </a:solidFill>
+              </a:rPr>
+              <a:t>seems</a:t>
+            </a:r>
+            <a:r>
+              <a:rPr lang="fr-FR" dirty="0">
+                <a:solidFill>
+                  <a:schemeClr val="tx1"/>
+                </a:solidFill>
+              </a:rPr>
+              <a:t> like RL, </a:t>
+            </a:r>
+            <a:r>
+              <a:rPr lang="fr-FR" dirty="0" err="1">
+                <a:solidFill>
+                  <a:schemeClr val="tx1"/>
+                </a:solidFill>
+              </a:rPr>
+              <a:t>pheromon</a:t>
+            </a:r>
+            <a:r>
+              <a:rPr lang="fr-FR" dirty="0">
+                <a:solidFill>
+                  <a:schemeClr val="tx1"/>
+                </a:solidFill>
+              </a:rPr>
+              <a:t>)</a:t>
+            </a:r>
+          </a:p>
+          <a:p>
+            <a:r>
+              <a:rPr lang="fr-FR" dirty="0">
+                <a:solidFill>
+                  <a:schemeClr val="tx1"/>
+                </a:solidFill>
+              </a:rPr>
+              <a:t>Launch the SAI </a:t>
+            </a:r>
+            <a:r>
+              <a:rPr lang="fr-FR" dirty="0" err="1">
+                <a:solidFill>
+                  <a:schemeClr val="tx1"/>
+                </a:solidFill>
+              </a:rPr>
+              <a:t>each</a:t>
+            </a:r>
+            <a:r>
+              <a:rPr lang="fr-FR" dirty="0">
+                <a:solidFill>
+                  <a:schemeClr val="tx1"/>
+                </a:solidFill>
+              </a:rPr>
+              <a:t> </a:t>
+            </a:r>
+            <a:r>
+              <a:rPr lang="fr-FR" dirty="0" err="1">
+                <a:solidFill>
+                  <a:schemeClr val="tx1"/>
+                </a:solidFill>
+              </a:rPr>
+              <a:t>day</a:t>
+            </a:r>
+            <a:r>
+              <a:rPr lang="fr-FR" dirty="0">
+                <a:solidFill>
+                  <a:schemeClr val="tx1"/>
+                </a:solidFill>
+              </a:rPr>
+              <a:t>, </a:t>
+            </a:r>
+            <a:r>
+              <a:rPr lang="fr-FR" dirty="0" err="1">
+                <a:solidFill>
+                  <a:schemeClr val="tx1"/>
+                </a:solidFill>
+              </a:rPr>
+              <a:t>it</a:t>
+            </a:r>
+            <a:r>
+              <a:rPr lang="fr-FR" dirty="0">
+                <a:solidFill>
+                  <a:schemeClr val="tx1"/>
+                </a:solidFill>
+              </a:rPr>
+              <a:t> </a:t>
+            </a:r>
+            <a:r>
+              <a:rPr lang="fr-FR" dirty="0" err="1">
+                <a:solidFill>
+                  <a:schemeClr val="tx1"/>
+                </a:solidFill>
+              </a:rPr>
+              <a:t>will</a:t>
+            </a:r>
+            <a:r>
+              <a:rPr lang="fr-FR" dirty="0">
+                <a:solidFill>
+                  <a:schemeClr val="tx1"/>
+                </a:solidFill>
+              </a:rPr>
+              <a:t> </a:t>
+            </a:r>
+            <a:r>
+              <a:rPr lang="fr-FR" dirty="0" err="1">
+                <a:solidFill>
+                  <a:schemeClr val="tx1"/>
+                </a:solidFill>
+              </a:rPr>
+              <a:t>give</a:t>
+            </a:r>
+            <a:r>
+              <a:rPr lang="fr-FR" dirty="0">
+                <a:solidFill>
+                  <a:schemeClr val="tx1"/>
+                </a:solidFill>
+              </a:rPr>
+              <a:t> a report of </a:t>
+            </a:r>
+            <a:r>
+              <a:rPr lang="fr-FR" dirty="0" err="1">
+                <a:solidFill>
+                  <a:schemeClr val="tx1"/>
+                </a:solidFill>
+              </a:rPr>
+              <a:t>what</a:t>
+            </a:r>
+            <a:r>
+              <a:rPr lang="fr-FR" dirty="0">
+                <a:solidFill>
+                  <a:schemeClr val="tx1"/>
+                </a:solidFill>
+              </a:rPr>
+              <a:t> </a:t>
+            </a:r>
+            <a:r>
+              <a:rPr lang="fr-FR" dirty="0" err="1">
+                <a:solidFill>
+                  <a:schemeClr val="tx1"/>
+                </a:solidFill>
+              </a:rPr>
+              <a:t>it</a:t>
+            </a:r>
+            <a:r>
+              <a:rPr lang="fr-FR" dirty="0">
+                <a:solidFill>
+                  <a:schemeClr val="tx1"/>
+                </a:solidFill>
+              </a:rPr>
+              <a:t> </a:t>
+            </a:r>
+            <a:r>
               <a:rPr lang="fr-FR">
                 <a:solidFill>
                   <a:schemeClr val="tx1"/>
                 </a:solidFill>
               </a:rPr>
-              <a:t>Hard to deploy</a:t>
-            </a:r>
-          </a:p>
-          <a:p>
-            <a:r>
-              <a:rPr lang="fr-FR">
-                <a:solidFill>
-                  <a:schemeClr val="tx1"/>
-                </a:solidFill>
-              </a:rPr>
-              <a:t>Simulate the brain behavior during sleep (sort/compress/delete data)</a:t>
-            </a:r>
-          </a:p>
-          <a:p>
-            <a:r>
-              <a:rPr lang="fr-FR">
-                <a:solidFill>
-                  <a:schemeClr val="tx1"/>
-                </a:solidFill>
-              </a:rPr>
-              <a:t>Add a reward (seems like RL, pheromon)</a:t>
-            </a:r>
-          </a:p>
-          <a:p>
-            <a:r>
-              <a:rPr lang="fr-FR">
-                <a:solidFill>
-                  <a:schemeClr val="tx1"/>
-                </a:solidFill>
-              </a:rPr>
-              <a:t>Launch the SAI each day, it will give a report of what it learned</a:t>
-            </a:r>
-          </a:p>
-          <a:p>
-            <a:r>
-              <a:rPr lang="fr-FR">
-                <a:solidFill>
-                  <a:schemeClr val="tx1"/>
-                </a:solidFill>
-              </a:rPr>
-              <a:t>Sort what SAI learned</a:t>
-            </a:r>
-            <a:endParaRPr lang="en-GB">
+              <a:t>learned</a:t>
+            </a:r>
+            <a:endParaRPr lang="en-GB" dirty="0">
               <a:solidFill>
                 <a:schemeClr val="tx1"/>
               </a:solidFill>

</xml_diff>

<commit_message>
#12 Issues synthesis added on slides
</commit_message>
<xml_diff>
--- a/SAI_presentation.pptx
+++ b/SAI_presentation.pptx
@@ -15,13 +15,14 @@
     <p:sldId id="270" r:id="rId9"/>
     <p:sldId id="271" r:id="rId10"/>
     <p:sldId id="272" r:id="rId11"/>
-    <p:sldId id="259" r:id="rId12"/>
-    <p:sldId id="260" r:id="rId13"/>
-    <p:sldId id="261" r:id="rId14"/>
-    <p:sldId id="265" r:id="rId15"/>
-    <p:sldId id="262" r:id="rId16"/>
-    <p:sldId id="264" r:id="rId17"/>
-    <p:sldId id="263" r:id="rId18"/>
+    <p:sldId id="273" r:id="rId12"/>
+    <p:sldId id="259" r:id="rId13"/>
+    <p:sldId id="260" r:id="rId14"/>
+    <p:sldId id="261" r:id="rId15"/>
+    <p:sldId id="265" r:id="rId16"/>
+    <p:sldId id="262" r:id="rId17"/>
+    <p:sldId id="264" r:id="rId18"/>
+    <p:sldId id="263" r:id="rId19"/>
   </p:sldIdLst>
   <p:sldSz cx="12192000" cy="6858000"/>
   <p:notesSz cx="6858000" cy="9144000"/>
@@ -12226,6 +12227,113 @@
 <file path=ppt/slides/slide11.xml><?xml version="1.0" encoding="utf-8"?>
 <p:sld xmlns:a="http://schemas.openxmlformats.org/drawingml/2006/main" xmlns:r="http://schemas.openxmlformats.org/officeDocument/2006/relationships" xmlns:p="http://schemas.openxmlformats.org/presentationml/2006/main">
   <p:cSld>
+    <p:spTree>
+      <p:nvGrpSpPr>
+        <p:cNvPr id="1" name=""/>
+        <p:cNvGrpSpPr/>
+        <p:nvPr/>
+      </p:nvGrpSpPr>
+      <p:grpSpPr>
+        <a:xfrm>
+          <a:off x="0" y="0"/>
+          <a:ext cx="0" cy="0"/>
+          <a:chOff x="0" y="0"/>
+          <a:chExt cx="0" cy="0"/>
+        </a:xfrm>
+      </p:grpSpPr>
+      <p:sp>
+        <p:nvSpPr>
+          <p:cNvPr id="2" name="Titre 1">
+            <a:extLst>
+              <a:ext uri="{FF2B5EF4-FFF2-40B4-BE49-F238E27FC236}">
+                <a16:creationId xmlns:a16="http://schemas.microsoft.com/office/drawing/2014/main" id="{C4DC637E-2BCF-46A5-AAB2-8D5832E6F96F}"/>
+              </a:ext>
+            </a:extLst>
+          </p:cNvPr>
+          <p:cNvSpPr>
+            <a:spLocks noGrp="1"/>
+          </p:cNvSpPr>
+          <p:nvPr>
+            <p:ph type="title"/>
+          </p:nvPr>
+        </p:nvSpPr>
+        <p:spPr/>
+        <p:txBody>
+          <a:bodyPr/>
+          <a:lstStyle/>
+          <a:p>
+            <a:r>
+              <a:rPr lang="fr-FR" dirty="0"/>
+              <a:t>Issues</a:t>
+            </a:r>
+            <a:endParaRPr lang="en-GB" dirty="0"/>
+          </a:p>
+        </p:txBody>
+      </p:sp>
+      <p:sp>
+        <p:nvSpPr>
+          <p:cNvPr id="3" name="Espace réservé du contenu 2">
+            <a:extLst>
+              <a:ext uri="{FF2B5EF4-FFF2-40B4-BE49-F238E27FC236}">
+                <a16:creationId xmlns:a16="http://schemas.microsoft.com/office/drawing/2014/main" id="{1A557666-F24F-405D-A07F-C9648E2EE10F}"/>
+              </a:ext>
+            </a:extLst>
+          </p:cNvPr>
+          <p:cNvSpPr>
+            <a:spLocks noGrp="1"/>
+          </p:cNvSpPr>
+          <p:nvPr>
+            <p:ph idx="1"/>
+          </p:nvPr>
+        </p:nvSpPr>
+        <p:spPr/>
+        <p:txBody>
+          <a:bodyPr/>
+          <a:lstStyle/>
+          <a:p>
+            <a:r>
+              <a:rPr lang="fr-FR" dirty="0"/>
+              <a:t>Issues </a:t>
+            </a:r>
+            <a:r>
+              <a:rPr lang="fr-FR" dirty="0" err="1"/>
+              <a:t>synthesis</a:t>
+            </a:r>
+            <a:endParaRPr lang="fr-FR" dirty="0"/>
+          </a:p>
+          <a:p>
+            <a:r>
+              <a:rPr lang="fr-FR" dirty="0"/>
+              <a:t>Use a </a:t>
+            </a:r>
+            <a:r>
+              <a:rPr lang="fr-FR" dirty="0" err="1"/>
+              <a:t>complex</a:t>
+            </a:r>
+            <a:r>
+              <a:rPr lang="fr-FR"/>
+              <a:t> shema</a:t>
+            </a:r>
+            <a:endParaRPr lang="en-GB" dirty="0"/>
+          </a:p>
+        </p:txBody>
+      </p:sp>
+    </p:spTree>
+    <p:extLst>
+      <p:ext uri="{BB962C8B-B14F-4D97-AF65-F5344CB8AC3E}">
+        <p14:creationId xmlns:p14="http://schemas.microsoft.com/office/powerpoint/2010/main" val="2039711715"/>
+      </p:ext>
+    </p:extLst>
+  </p:cSld>
+  <p:clrMapOvr>
+    <a:masterClrMapping/>
+  </p:clrMapOvr>
+</p:sld>
+</file>
+
+<file path=ppt/slides/slide12.xml><?xml version="1.0" encoding="utf-8"?>
+<p:sld xmlns:a="http://schemas.openxmlformats.org/drawingml/2006/main" xmlns:r="http://schemas.openxmlformats.org/officeDocument/2006/relationships" xmlns:p="http://schemas.openxmlformats.org/presentationml/2006/main">
+  <p:cSld>
     <p:bg>
       <p:bgPr>
         <a:gradFill rotWithShape="1">
@@ -12520,7 +12628,7 @@
 </p:sld>
 </file>
 
-<file path=ppt/slides/slide12.xml><?xml version="1.0" encoding="utf-8"?>
+<file path=ppt/slides/slide13.xml><?xml version="1.0" encoding="utf-8"?>
 <p:sld xmlns:a="http://schemas.openxmlformats.org/drawingml/2006/main" xmlns:r="http://schemas.openxmlformats.org/officeDocument/2006/relationships" xmlns:p="http://schemas.openxmlformats.org/presentationml/2006/main">
   <p:cSld>
     <p:spTree>
@@ -12614,7 +12722,7 @@
 </p:sld>
 </file>
 
-<file path=ppt/slides/slide13.xml><?xml version="1.0" encoding="utf-8"?>
+<file path=ppt/slides/slide14.xml><?xml version="1.0" encoding="utf-8"?>
 <p:sld xmlns:a="http://schemas.openxmlformats.org/drawingml/2006/main" xmlns:r="http://schemas.openxmlformats.org/officeDocument/2006/relationships" xmlns:p="http://schemas.openxmlformats.org/presentationml/2006/main">
   <p:cSld>
     <p:bg>
@@ -12736,7 +12844,7 @@
 </p:sld>
 </file>
 
-<file path=ppt/slides/slide14.xml><?xml version="1.0" encoding="utf-8"?>
+<file path=ppt/slides/slide15.xml><?xml version="1.0" encoding="utf-8"?>
 <p:sld xmlns:a="http://schemas.openxmlformats.org/drawingml/2006/main" xmlns:r="http://schemas.openxmlformats.org/officeDocument/2006/relationships" xmlns:p="http://schemas.openxmlformats.org/presentationml/2006/main">
   <p:cSld>
     <p:spTree>
@@ -12916,7 +13024,7 @@
 </p:sld>
 </file>
 
-<file path=ppt/slides/slide15.xml><?xml version="1.0" encoding="utf-8"?>
+<file path=ppt/slides/slide16.xml><?xml version="1.0" encoding="utf-8"?>
 <p:sld xmlns:a="http://schemas.openxmlformats.org/drawingml/2006/main" xmlns:r="http://schemas.openxmlformats.org/officeDocument/2006/relationships" xmlns:p="http://schemas.openxmlformats.org/presentationml/2006/main">
   <p:cSld>
     <p:spTree>
@@ -13669,7 +13777,7 @@
 </p:sld>
 </file>
 
-<file path=ppt/slides/slide16.xml><?xml version="1.0" encoding="utf-8"?>
+<file path=ppt/slides/slide17.xml><?xml version="1.0" encoding="utf-8"?>
 <p:sld xmlns:a="http://schemas.openxmlformats.org/drawingml/2006/main" xmlns:r="http://schemas.openxmlformats.org/officeDocument/2006/relationships" xmlns:p="http://schemas.openxmlformats.org/presentationml/2006/main">
   <p:cSld>
     <p:spTree>
@@ -14210,7 +14318,7 @@
 </p:sld>
 </file>
 
-<file path=ppt/slides/slide17.xml><?xml version="1.0" encoding="utf-8"?>
+<file path=ppt/slides/slide18.xml><?xml version="1.0" encoding="utf-8"?>
 <p:sld xmlns:a="http://schemas.openxmlformats.org/drawingml/2006/main" xmlns:r="http://schemas.openxmlformats.org/officeDocument/2006/relationships" xmlns:p="http://schemas.openxmlformats.org/presentationml/2006/main">
   <p:cSld>
     <p:spTree>

</xml_diff>

<commit_message>
#12 Solution with pyinstaller added on slides
</commit_message>
<xml_diff>
--- a/SAI_presentation.pptx
+++ b/SAI_presentation.pptx
@@ -17,12 +17,13 @@
     <p:sldId id="272" r:id="rId11"/>
     <p:sldId id="273" r:id="rId12"/>
     <p:sldId id="259" r:id="rId13"/>
-    <p:sldId id="260" r:id="rId14"/>
-    <p:sldId id="261" r:id="rId15"/>
-    <p:sldId id="265" r:id="rId16"/>
-    <p:sldId id="262" r:id="rId17"/>
-    <p:sldId id="264" r:id="rId18"/>
-    <p:sldId id="263" r:id="rId19"/>
+    <p:sldId id="274" r:id="rId14"/>
+    <p:sldId id="260" r:id="rId15"/>
+    <p:sldId id="261" r:id="rId16"/>
+    <p:sldId id="265" r:id="rId17"/>
+    <p:sldId id="262" r:id="rId18"/>
+    <p:sldId id="264" r:id="rId19"/>
+    <p:sldId id="263" r:id="rId20"/>
   </p:sldIdLst>
   <p:sldSz cx="12192000" cy="6858000"/>
   <p:notesSz cx="6858000" cy="9144000"/>
@@ -6745,7 +6746,7 @@
             <a:fld id="{B61BEF0D-F0BB-DE4B-95CE-6DB70DBA9567}" type="datetimeFigureOut">
               <a:rPr lang="en-US" dirty="0"/>
               <a:pPr/>
-              <a:t>3/8/2020</a:t>
+              <a:t>3/9/2020</a:t>
             </a:fld>
             <a:endParaRPr lang="en-US" dirty="0"/>
           </a:p>
@@ -7178,7 +7179,7 @@
             <a:fld id="{B61BEF0D-F0BB-DE4B-95CE-6DB70DBA9567}" type="datetimeFigureOut">
               <a:rPr lang="en-US" dirty="0"/>
               <a:pPr/>
-              <a:t>3/8/2020</a:t>
+              <a:t>3/9/2020</a:t>
             </a:fld>
             <a:endParaRPr lang="en-US" dirty="0"/>
           </a:p>
@@ -7425,7 +7426,7 @@
             <a:fld id="{B61BEF0D-F0BB-DE4B-95CE-6DB70DBA9567}" type="datetimeFigureOut">
               <a:rPr lang="en-US" dirty="0"/>
               <a:pPr/>
-              <a:t>3/8/2020</a:t>
+              <a:t>3/9/2020</a:t>
             </a:fld>
             <a:endParaRPr lang="en-US" dirty="0"/>
           </a:p>
@@ -7730,7 +7731,7 @@
             <a:fld id="{B61BEF0D-F0BB-DE4B-95CE-6DB70DBA9567}" type="datetimeFigureOut">
               <a:rPr lang="en-US" dirty="0"/>
               <a:pPr/>
-              <a:t>3/8/2020</a:t>
+              <a:t>3/9/2020</a:t>
             </a:fld>
             <a:endParaRPr lang="en-US" dirty="0"/>
           </a:p>
@@ -8045,7 +8046,7 @@
             <a:fld id="{B61BEF0D-F0BB-DE4B-95CE-6DB70DBA9567}" type="datetimeFigureOut">
               <a:rPr lang="en-US" dirty="0"/>
               <a:pPr/>
-              <a:t>3/8/2020</a:t>
+              <a:t>3/9/2020</a:t>
             </a:fld>
             <a:endParaRPr lang="en-US" dirty="0"/>
           </a:p>
@@ -8344,7 +8345,7 @@
             <a:fld id="{B61BEF0D-F0BB-DE4B-95CE-6DB70DBA9567}" type="datetimeFigureOut">
               <a:rPr lang="en-US" dirty="0"/>
               <a:pPr/>
-              <a:t>3/8/2020</a:t>
+              <a:t>3/9/2020</a:t>
             </a:fld>
             <a:endParaRPr lang="en-US" dirty="0"/>
           </a:p>
@@ -8708,7 +8709,7 @@
             <a:fld id="{B61BEF0D-F0BB-DE4B-95CE-6DB70DBA9567}" type="datetimeFigureOut">
               <a:rPr lang="en-US" dirty="0"/>
               <a:pPr/>
-              <a:t>3/8/2020</a:t>
+              <a:t>3/9/2020</a:t>
             </a:fld>
             <a:endParaRPr lang="en-US" dirty="0"/>
           </a:p>
@@ -8879,7 +8880,7 @@
             <a:fld id="{B61BEF0D-F0BB-DE4B-95CE-6DB70DBA9567}" type="datetimeFigureOut">
               <a:rPr lang="en-US" dirty="0"/>
               <a:pPr/>
-              <a:t>3/8/2020</a:t>
+              <a:t>3/9/2020</a:t>
             </a:fld>
             <a:endParaRPr lang="en-US" dirty="0"/>
           </a:p>
@@ -9056,7 +9057,7 @@
             <a:fld id="{B61BEF0D-F0BB-DE4B-95CE-6DB70DBA9567}" type="datetimeFigureOut">
               <a:rPr lang="en-US" dirty="0"/>
               <a:pPr/>
-              <a:t>3/8/2020</a:t>
+              <a:t>3/9/2020</a:t>
             </a:fld>
             <a:endParaRPr lang="en-US" dirty="0"/>
           </a:p>
@@ -9223,7 +9224,7 @@
             <a:fld id="{B61BEF0D-F0BB-DE4B-95CE-6DB70DBA9567}" type="datetimeFigureOut">
               <a:rPr lang="en-US" dirty="0"/>
               <a:pPr/>
-              <a:t>3/8/2020</a:t>
+              <a:t>3/9/2020</a:t>
             </a:fld>
             <a:endParaRPr lang="en-US" dirty="0"/>
           </a:p>
@@ -9470,7 +9471,7 @@
             <a:fld id="{B61BEF0D-F0BB-DE4B-95CE-6DB70DBA9567}" type="datetimeFigureOut">
               <a:rPr lang="en-US" dirty="0"/>
               <a:pPr/>
-              <a:t>3/8/2020</a:t>
+              <a:t>3/9/2020</a:t>
             </a:fld>
             <a:endParaRPr lang="en-US" dirty="0"/>
           </a:p>
@@ -9703,7 +9704,7 @@
             <a:fld id="{B61BEF0D-F0BB-DE4B-95CE-6DB70DBA9567}" type="datetimeFigureOut">
               <a:rPr lang="en-US" dirty="0"/>
               <a:pPr/>
-              <a:t>3/8/2020</a:t>
+              <a:t>3/9/2020</a:t>
             </a:fld>
             <a:endParaRPr lang="en-US" dirty="0"/>
           </a:p>
@@ -10082,7 +10083,7 @@
             <a:fld id="{B61BEF0D-F0BB-DE4B-95CE-6DB70DBA9567}" type="datetimeFigureOut">
               <a:rPr lang="en-US" dirty="0"/>
               <a:pPr/>
-              <a:t>3/8/2020</a:t>
+              <a:t>3/9/2020</a:t>
             </a:fld>
             <a:endParaRPr lang="en-US" dirty="0"/>
           </a:p>
@@ -10197,7 +10198,7 @@
             <a:fld id="{B61BEF0D-F0BB-DE4B-95CE-6DB70DBA9567}" type="datetimeFigureOut">
               <a:rPr lang="en-US" dirty="0"/>
               <a:pPr/>
-              <a:t>3/8/2020</a:t>
+              <a:t>3/9/2020</a:t>
             </a:fld>
             <a:endParaRPr lang="en-US" dirty="0"/>
           </a:p>
@@ -10289,7 +10290,7 @@
             <a:fld id="{B61BEF0D-F0BB-DE4B-95CE-6DB70DBA9567}" type="datetimeFigureOut">
               <a:rPr lang="en-US" dirty="0"/>
               <a:pPr/>
-              <a:t>3/8/2020</a:t>
+              <a:t>3/9/2020</a:t>
             </a:fld>
             <a:endParaRPr lang="en-US" dirty="0"/>
           </a:p>
@@ -10541,7 +10542,7 @@
             <a:fld id="{B61BEF0D-F0BB-DE4B-95CE-6DB70DBA9567}" type="datetimeFigureOut">
               <a:rPr lang="en-US" dirty="0"/>
               <a:pPr/>
-              <a:t>3/8/2020</a:t>
+              <a:t>3/9/2020</a:t>
             </a:fld>
             <a:endParaRPr lang="en-US" dirty="0"/>
           </a:p>
@@ -10821,7 +10822,7 @@
             <a:fld id="{B61BEF0D-F0BB-DE4B-95CE-6DB70DBA9567}" type="datetimeFigureOut">
               <a:rPr lang="en-US" dirty="0"/>
               <a:pPr/>
-              <a:t>3/8/2020</a:t>
+              <a:t>3/9/2020</a:t>
             </a:fld>
             <a:endParaRPr lang="en-US" dirty="0"/>
           </a:p>
@@ -11224,7 +11225,7 @@
             <a:fld id="{B61BEF0D-F0BB-DE4B-95CE-6DB70DBA9567}" type="datetimeFigureOut">
               <a:rPr lang="en-US" dirty="0"/>
               <a:pPr/>
-              <a:t>3/8/2020</a:t>
+              <a:t>3/9/2020</a:t>
             </a:fld>
             <a:endParaRPr lang="en-US" dirty="0"/>
           </a:p>
@@ -12650,6 +12651,141 @@
           <p:cNvPr id="2" name="Titre 1">
             <a:extLst>
               <a:ext uri="{FF2B5EF4-FFF2-40B4-BE49-F238E27FC236}">
+                <a16:creationId xmlns:a16="http://schemas.microsoft.com/office/drawing/2014/main" id="{3A345F8F-D253-4F3B-8984-2D2310B3CDA5}"/>
+              </a:ext>
+            </a:extLst>
+          </p:cNvPr>
+          <p:cNvSpPr>
+            <a:spLocks noGrp="1"/>
+          </p:cNvSpPr>
+          <p:nvPr>
+            <p:ph type="title"/>
+          </p:nvPr>
+        </p:nvSpPr>
+        <p:spPr/>
+        <p:txBody>
+          <a:bodyPr/>
+          <a:lstStyle/>
+          <a:p>
+            <a:r>
+              <a:rPr lang="fr-FR" dirty="0" err="1"/>
+              <a:t>Pyinstaller</a:t>
+            </a:r>
+            <a:endParaRPr lang="en-GB" dirty="0"/>
+          </a:p>
+        </p:txBody>
+      </p:sp>
+      <p:sp>
+        <p:nvSpPr>
+          <p:cNvPr id="3" name="Espace réservé du contenu 2">
+            <a:extLst>
+              <a:ext uri="{FF2B5EF4-FFF2-40B4-BE49-F238E27FC236}">
+                <a16:creationId xmlns:a16="http://schemas.microsoft.com/office/drawing/2014/main" id="{53970EB4-9339-4AA4-BF41-10FEA9FA384E}"/>
+              </a:ext>
+            </a:extLst>
+          </p:cNvPr>
+          <p:cNvSpPr>
+            <a:spLocks noGrp="1"/>
+          </p:cNvSpPr>
+          <p:nvPr>
+            <p:ph idx="1"/>
+          </p:nvPr>
+        </p:nvSpPr>
+        <p:spPr/>
+        <p:txBody>
+          <a:bodyPr/>
+          <a:lstStyle/>
+          <a:p>
+            <a:r>
+              <a:rPr lang="fr-FR" dirty="0" err="1"/>
+              <a:t>We</a:t>
+            </a:r>
+            <a:r>
+              <a:rPr lang="fr-FR" dirty="0"/>
+              <a:t> </a:t>
+            </a:r>
+            <a:r>
+              <a:rPr lang="fr-FR" dirty="0" err="1"/>
+              <a:t>choose</a:t>
+            </a:r>
+            <a:r>
+              <a:rPr lang="fr-FR" dirty="0"/>
+              <a:t> to use </a:t>
+            </a:r>
+            <a:r>
+              <a:rPr lang="fr-FR" dirty="0" err="1"/>
+              <a:t>pyinstaller</a:t>
+            </a:r>
+            <a:r>
+              <a:rPr lang="fr-FR" dirty="0"/>
+              <a:t> to </a:t>
+            </a:r>
+            <a:r>
+              <a:rPr lang="fr-FR" dirty="0" err="1"/>
+              <a:t>deploy</a:t>
+            </a:r>
+            <a:r>
+              <a:rPr lang="fr-FR" dirty="0"/>
+              <a:t> SAI </a:t>
+            </a:r>
+            <a:r>
+              <a:rPr lang="fr-FR"/>
+              <a:t>on Windows and OS X</a:t>
+            </a:r>
+            <a:endParaRPr lang="fr-FR" dirty="0"/>
+          </a:p>
+          <a:p>
+            <a:r>
+              <a:rPr lang="fr-FR" dirty="0" err="1"/>
+              <a:t>Schema</a:t>
+            </a:r>
+            <a:r>
+              <a:rPr lang="fr-FR" dirty="0"/>
+              <a:t> to </a:t>
+            </a:r>
+            <a:r>
+              <a:rPr lang="fr-FR" dirty="0" err="1"/>
+              <a:t>explain</a:t>
+            </a:r>
+            <a:endParaRPr lang="en-GB" dirty="0"/>
+          </a:p>
+        </p:txBody>
+      </p:sp>
+    </p:spTree>
+    <p:extLst>
+      <p:ext uri="{BB962C8B-B14F-4D97-AF65-F5344CB8AC3E}">
+        <p14:creationId xmlns:p14="http://schemas.microsoft.com/office/powerpoint/2010/main" val="3090106205"/>
+      </p:ext>
+    </p:extLst>
+  </p:cSld>
+  <p:clrMapOvr>
+    <a:masterClrMapping/>
+  </p:clrMapOvr>
+</p:sld>
+</file>
+
+<file path=ppt/slides/slide14.xml><?xml version="1.0" encoding="utf-8"?>
+<p:sld xmlns:a="http://schemas.openxmlformats.org/drawingml/2006/main" xmlns:r="http://schemas.openxmlformats.org/officeDocument/2006/relationships" xmlns:p="http://schemas.openxmlformats.org/presentationml/2006/main">
+  <p:cSld>
+    <p:spTree>
+      <p:nvGrpSpPr>
+        <p:cNvPr id="1" name=""/>
+        <p:cNvGrpSpPr/>
+        <p:nvPr/>
+      </p:nvGrpSpPr>
+      <p:grpSpPr>
+        <a:xfrm>
+          <a:off x="0" y="0"/>
+          <a:ext cx="0" cy="0"/>
+          <a:chOff x="0" y="0"/>
+          <a:chExt cx="0" cy="0"/>
+        </a:xfrm>
+      </p:grpSpPr>
+      <p:sp>
+        <p:nvSpPr>
+          <p:cNvPr id="2" name="Titre 1">
+            <a:extLst>
+              <a:ext uri="{FF2B5EF4-FFF2-40B4-BE49-F238E27FC236}">
                 <a16:creationId xmlns:a16="http://schemas.microsoft.com/office/drawing/2014/main" id="{643ACCC2-1572-47D7-9E8E-170E100F9348}"/>
               </a:ext>
             </a:extLst>
@@ -12722,7 +12858,7 @@
 </p:sld>
 </file>
 
-<file path=ppt/slides/slide14.xml><?xml version="1.0" encoding="utf-8"?>
+<file path=ppt/slides/slide15.xml><?xml version="1.0" encoding="utf-8"?>
 <p:sld xmlns:a="http://schemas.openxmlformats.org/drawingml/2006/main" xmlns:r="http://schemas.openxmlformats.org/officeDocument/2006/relationships" xmlns:p="http://schemas.openxmlformats.org/presentationml/2006/main">
   <p:cSld>
     <p:bg>
@@ -12844,7 +12980,7 @@
 </p:sld>
 </file>
 
-<file path=ppt/slides/slide15.xml><?xml version="1.0" encoding="utf-8"?>
+<file path=ppt/slides/slide16.xml><?xml version="1.0" encoding="utf-8"?>
 <p:sld xmlns:a="http://schemas.openxmlformats.org/drawingml/2006/main" xmlns:r="http://schemas.openxmlformats.org/officeDocument/2006/relationships" xmlns:p="http://schemas.openxmlformats.org/presentationml/2006/main">
   <p:cSld>
     <p:spTree>
@@ -13024,7 +13160,7 @@
 </p:sld>
 </file>
 
-<file path=ppt/slides/slide16.xml><?xml version="1.0" encoding="utf-8"?>
+<file path=ppt/slides/slide17.xml><?xml version="1.0" encoding="utf-8"?>
 <p:sld xmlns:a="http://schemas.openxmlformats.org/drawingml/2006/main" xmlns:r="http://schemas.openxmlformats.org/officeDocument/2006/relationships" xmlns:p="http://schemas.openxmlformats.org/presentationml/2006/main">
   <p:cSld>
     <p:spTree>
@@ -13777,7 +13913,7 @@
 </p:sld>
 </file>
 
-<file path=ppt/slides/slide17.xml><?xml version="1.0" encoding="utf-8"?>
+<file path=ppt/slides/slide18.xml><?xml version="1.0" encoding="utf-8"?>
 <p:sld xmlns:a="http://schemas.openxmlformats.org/drawingml/2006/main" xmlns:r="http://schemas.openxmlformats.org/officeDocument/2006/relationships" xmlns:p="http://schemas.openxmlformats.org/presentationml/2006/main">
   <p:cSld>
     <p:spTree>
@@ -14318,7 +14454,7 @@
 </p:sld>
 </file>
 
-<file path=ppt/slides/slide18.xml><?xml version="1.0" encoding="utf-8"?>
+<file path=ppt/slides/slide19.xml><?xml version="1.0" encoding="utf-8"?>
 <p:sld xmlns:a="http://schemas.openxmlformats.org/drawingml/2006/main" xmlns:r="http://schemas.openxmlformats.org/officeDocument/2006/relationships" xmlns:p="http://schemas.openxmlformats.org/presentationml/2006/main">
   <p:cSld>
     <p:spTree>

</xml_diff>

<commit_message>
#12 Future works updated on slides
</commit_message>
<xml_diff>
--- a/SAI_presentation.pptx
+++ b/SAI_presentation.pptx
@@ -18,12 +18,13 @@
     <p:sldId id="273" r:id="rId12"/>
     <p:sldId id="259" r:id="rId13"/>
     <p:sldId id="274" r:id="rId14"/>
-    <p:sldId id="260" r:id="rId15"/>
-    <p:sldId id="261" r:id="rId16"/>
-    <p:sldId id="265" r:id="rId17"/>
-    <p:sldId id="262" r:id="rId18"/>
-    <p:sldId id="264" r:id="rId19"/>
-    <p:sldId id="263" r:id="rId20"/>
+    <p:sldId id="275" r:id="rId15"/>
+    <p:sldId id="260" r:id="rId16"/>
+    <p:sldId id="261" r:id="rId17"/>
+    <p:sldId id="265" r:id="rId18"/>
+    <p:sldId id="262" r:id="rId19"/>
+    <p:sldId id="264" r:id="rId20"/>
+    <p:sldId id="263" r:id="rId21"/>
   </p:sldIdLst>
   <p:sldSz cx="12192000" cy="6858000"/>
   <p:notesSz cx="6858000" cy="9144000"/>
@@ -2468,10 +2469,38 @@
         <a:lstStyle/>
         <a:p>
           <a:r>
-            <a:rPr lang="fr-FR"/>
-            <a:t>The SAI will looks like the human teacher at the beginning</a:t>
+            <a:rPr lang="fr-FR" dirty="0"/>
+            <a:t>The SAI </a:t>
           </a:r>
-          <a:endParaRPr lang="en-US"/>
+          <a:r>
+            <a:rPr lang="fr-FR" dirty="0" err="1"/>
+            <a:t>will</a:t>
+          </a:r>
+          <a:r>
+            <a:rPr lang="fr-FR" dirty="0"/>
+            <a:t> looks like the </a:t>
+          </a:r>
+          <a:r>
+            <a:rPr lang="fr-FR" dirty="0" err="1"/>
+            <a:t>human</a:t>
+          </a:r>
+          <a:r>
+            <a:rPr lang="fr-FR" dirty="0"/>
+            <a:t> </a:t>
+          </a:r>
+          <a:r>
+            <a:rPr lang="fr-FR" dirty="0" err="1"/>
+            <a:t>teacher</a:t>
+          </a:r>
+          <a:r>
+            <a:rPr lang="fr-FR" dirty="0"/>
+            <a:t> at the </a:t>
+          </a:r>
+          <a:r>
+            <a:rPr lang="fr-FR" dirty="0" err="1"/>
+            <a:t>beginning</a:t>
+          </a:r>
+          <a:endParaRPr lang="en-US" dirty="0"/>
         </a:p>
       </dgm:t>
     </dgm:pt>
@@ -2505,10 +2534,50 @@
         <a:lstStyle/>
         <a:p>
           <a:r>
-            <a:rPr lang="fr-FR"/>
-            <a:t>After a threshold it will learn alone</a:t>
+            <a:rPr lang="fr-FR" dirty="0" err="1"/>
+            <a:t>After</a:t>
           </a:r>
-          <a:endParaRPr lang="en-US"/>
+          <a:r>
+            <a:rPr lang="fr-FR" dirty="0"/>
+            <a:t> a </a:t>
+          </a:r>
+          <a:r>
+            <a:rPr lang="fr-FR" dirty="0" err="1"/>
+            <a:t>threshold</a:t>
+          </a:r>
+          <a:r>
+            <a:rPr lang="fr-FR" dirty="0"/>
+            <a:t> </a:t>
+          </a:r>
+          <a:r>
+            <a:rPr lang="fr-FR" dirty="0" err="1"/>
+            <a:t>it</a:t>
+          </a:r>
+          <a:r>
+            <a:rPr lang="fr-FR" dirty="0"/>
+            <a:t> </a:t>
+          </a:r>
+          <a:r>
+            <a:rPr lang="fr-FR" dirty="0" err="1"/>
+            <a:t>will</a:t>
+          </a:r>
+          <a:r>
+            <a:rPr lang="fr-FR" dirty="0"/>
+            <a:t> </a:t>
+          </a:r>
+          <a:r>
+            <a:rPr lang="fr-FR" dirty="0" err="1"/>
+            <a:t>learn</a:t>
+          </a:r>
+          <a:r>
+            <a:rPr lang="fr-FR" dirty="0"/>
+            <a:t> </a:t>
+          </a:r>
+          <a:r>
+            <a:rPr lang="fr-FR" dirty="0" err="1"/>
+            <a:t>alone</a:t>
+          </a:r>
+          <a:endParaRPr lang="en-US" dirty="0"/>
         </a:p>
       </dgm:t>
     </dgm:pt>
@@ -2542,10 +2611,38 @@
         <a:lstStyle/>
         <a:p>
           <a:r>
-            <a:rPr lang="fr-FR"/>
-            <a:t>Self learn need to be implemented</a:t>
+            <a:rPr lang="fr-FR" dirty="0"/>
+            <a:t>Self </a:t>
           </a:r>
-          <a:endParaRPr lang="en-US"/>
+          <a:r>
+            <a:rPr lang="fr-FR" dirty="0" err="1"/>
+            <a:t>learn</a:t>
+          </a:r>
+          <a:r>
+            <a:rPr lang="fr-FR" dirty="0"/>
+            <a:t> </a:t>
+          </a:r>
+          <a:r>
+            <a:rPr lang="fr-FR" dirty="0" err="1"/>
+            <a:t>need</a:t>
+          </a:r>
+          <a:r>
+            <a:rPr lang="fr-FR" dirty="0"/>
+            <a:t> to </a:t>
+          </a:r>
+          <a:r>
+            <a:rPr lang="fr-FR" dirty="0" err="1"/>
+            <a:t>be</a:t>
+          </a:r>
+          <a:r>
+            <a:rPr lang="fr-FR" dirty="0"/>
+            <a:t> </a:t>
+          </a:r>
+          <a:r>
+            <a:rPr lang="fr-FR" dirty="0" err="1"/>
+            <a:t>implemented</a:t>
+          </a:r>
+          <a:endParaRPr lang="en-US" dirty="0"/>
         </a:p>
       </dgm:t>
     </dgm:pt>
@@ -3749,10 +3846,38 @@
             <a:buNone/>
           </a:pPr>
           <a:r>
-            <a:rPr lang="fr-FR" sz="1500" kern="1200"/>
-            <a:t>The SAI will looks like the human teacher at the beginning</a:t>
+            <a:rPr lang="fr-FR" sz="1500" kern="1200" dirty="0"/>
+            <a:t>The SAI </a:t>
           </a:r>
-          <a:endParaRPr lang="en-US" sz="1500" kern="1200"/>
+          <a:r>
+            <a:rPr lang="fr-FR" sz="1500" kern="1200" dirty="0" err="1"/>
+            <a:t>will</a:t>
+          </a:r>
+          <a:r>
+            <a:rPr lang="fr-FR" sz="1500" kern="1200" dirty="0"/>
+            <a:t> looks like the </a:t>
+          </a:r>
+          <a:r>
+            <a:rPr lang="fr-FR" sz="1500" kern="1200" dirty="0" err="1"/>
+            <a:t>human</a:t>
+          </a:r>
+          <a:r>
+            <a:rPr lang="fr-FR" sz="1500" kern="1200" dirty="0"/>
+            <a:t> </a:t>
+          </a:r>
+          <a:r>
+            <a:rPr lang="fr-FR" sz="1500" kern="1200" dirty="0" err="1"/>
+            <a:t>teacher</a:t>
+          </a:r>
+          <a:r>
+            <a:rPr lang="fr-FR" sz="1500" kern="1200" dirty="0"/>
+            <a:t> at the </a:t>
+          </a:r>
+          <a:r>
+            <a:rPr lang="fr-FR" sz="1500" kern="1200" dirty="0" err="1"/>
+            <a:t>beginning</a:t>
+          </a:r>
+          <a:endParaRPr lang="en-US" sz="1500" kern="1200" dirty="0"/>
         </a:p>
       </dsp:txBody>
       <dsp:txXfrm>
@@ -3898,10 +4023,50 @@
             <a:buNone/>
           </a:pPr>
           <a:r>
-            <a:rPr lang="fr-FR" sz="1500" kern="1200"/>
-            <a:t>After a threshold it will learn alone</a:t>
+            <a:rPr lang="fr-FR" sz="1500" kern="1200" dirty="0" err="1"/>
+            <a:t>After</a:t>
           </a:r>
-          <a:endParaRPr lang="en-US" sz="1500" kern="1200"/>
+          <a:r>
+            <a:rPr lang="fr-FR" sz="1500" kern="1200" dirty="0"/>
+            <a:t> a </a:t>
+          </a:r>
+          <a:r>
+            <a:rPr lang="fr-FR" sz="1500" kern="1200" dirty="0" err="1"/>
+            <a:t>threshold</a:t>
+          </a:r>
+          <a:r>
+            <a:rPr lang="fr-FR" sz="1500" kern="1200" dirty="0"/>
+            <a:t> </a:t>
+          </a:r>
+          <a:r>
+            <a:rPr lang="fr-FR" sz="1500" kern="1200" dirty="0" err="1"/>
+            <a:t>it</a:t>
+          </a:r>
+          <a:r>
+            <a:rPr lang="fr-FR" sz="1500" kern="1200" dirty="0"/>
+            <a:t> </a:t>
+          </a:r>
+          <a:r>
+            <a:rPr lang="fr-FR" sz="1500" kern="1200" dirty="0" err="1"/>
+            <a:t>will</a:t>
+          </a:r>
+          <a:r>
+            <a:rPr lang="fr-FR" sz="1500" kern="1200" dirty="0"/>
+            <a:t> </a:t>
+          </a:r>
+          <a:r>
+            <a:rPr lang="fr-FR" sz="1500" kern="1200" dirty="0" err="1"/>
+            <a:t>learn</a:t>
+          </a:r>
+          <a:r>
+            <a:rPr lang="fr-FR" sz="1500" kern="1200" dirty="0"/>
+            <a:t> </a:t>
+          </a:r>
+          <a:r>
+            <a:rPr lang="fr-FR" sz="1500" kern="1200" dirty="0" err="1"/>
+            <a:t>alone</a:t>
+          </a:r>
+          <a:endParaRPr lang="en-US" sz="1500" kern="1200" dirty="0"/>
         </a:p>
       </dsp:txBody>
       <dsp:txXfrm>
@@ -4047,10 +4212,38 @@
             <a:buNone/>
           </a:pPr>
           <a:r>
-            <a:rPr lang="fr-FR" sz="1500" kern="1200"/>
-            <a:t>Self learn need to be implemented</a:t>
+            <a:rPr lang="fr-FR" sz="1500" kern="1200" dirty="0"/>
+            <a:t>Self </a:t>
           </a:r>
-          <a:endParaRPr lang="en-US" sz="1500" kern="1200"/>
+          <a:r>
+            <a:rPr lang="fr-FR" sz="1500" kern="1200" dirty="0" err="1"/>
+            <a:t>learn</a:t>
+          </a:r>
+          <a:r>
+            <a:rPr lang="fr-FR" sz="1500" kern="1200" dirty="0"/>
+            <a:t> </a:t>
+          </a:r>
+          <a:r>
+            <a:rPr lang="fr-FR" sz="1500" kern="1200" dirty="0" err="1"/>
+            <a:t>need</a:t>
+          </a:r>
+          <a:r>
+            <a:rPr lang="fr-FR" sz="1500" kern="1200" dirty="0"/>
+            <a:t> to </a:t>
+          </a:r>
+          <a:r>
+            <a:rPr lang="fr-FR" sz="1500" kern="1200" dirty="0" err="1"/>
+            <a:t>be</a:t>
+          </a:r>
+          <a:r>
+            <a:rPr lang="fr-FR" sz="1500" kern="1200" dirty="0"/>
+            <a:t> </a:t>
+          </a:r>
+          <a:r>
+            <a:rPr lang="fr-FR" sz="1500" kern="1200" dirty="0" err="1"/>
+            <a:t>implemented</a:t>
+          </a:r>
+          <a:endParaRPr lang="en-US" sz="1500" kern="1200" dirty="0"/>
         </a:p>
       </dsp:txBody>
       <dsp:txXfrm>
@@ -12566,53 +12759,409 @@
           <a:lstStyle/>
           <a:p>
             <a:r>
-              <a:rPr lang="fr-FR">
+              <a:rPr lang="fr-FR" dirty="0" err="1">
                 <a:solidFill>
                   <a:schemeClr val="tx1"/>
                 </a:solidFill>
               </a:rPr>
-              <a:t>Create SAI with pyinstaller for multiplatform</a:t>
-            </a:r>
-          </a:p>
-          <a:p>
-            <a:r>
-              <a:rPr lang="fr-FR">
+              <a:t>Create</a:t>
+            </a:r>
+            <a:r>
+              <a:rPr lang="fr-FR" dirty="0">
                 <a:solidFill>
                   <a:schemeClr val="tx1"/>
                 </a:solidFill>
               </a:rPr>
-              <a:t>Launch a scan that remove duplicate screenshot and order them by interesting strategie</a:t>
-            </a:r>
-          </a:p>
-          <a:p>
-            <a:r>
-              <a:rPr lang="fr-FR">
+              <a:t> SAI </a:t>
+            </a:r>
+            <a:r>
+              <a:rPr lang="fr-FR" dirty="0" err="1">
                 <a:solidFill>
                   <a:schemeClr val="tx1"/>
                 </a:solidFill>
               </a:rPr>
-              <a:t>Increment the reward if there was difference between images</a:t>
-            </a:r>
-          </a:p>
-          <a:p>
-            <a:r>
-              <a:rPr lang="fr-FR">
+              <a:t>with</a:t>
+            </a:r>
+            <a:r>
+              <a:rPr lang="fr-FR" dirty="0">
                 <a:solidFill>
                   <a:schemeClr val="tx1"/>
                 </a:solidFill>
               </a:rPr>
-              <a:t>Create a web page with the strategies learned</a:t>
-            </a:r>
-          </a:p>
-          <a:p>
-            <a:r>
-              <a:rPr lang="fr-FR">
+              <a:t> </a:t>
+            </a:r>
+            <a:r>
+              <a:rPr lang="fr-FR" dirty="0" err="1">
                 <a:solidFill>
                   <a:schemeClr val="tx1"/>
                 </a:solidFill>
               </a:rPr>
-              <a:t>Create a web interface or a vocal controller to order strategies</a:t>
-            </a:r>
+              <a:t>pyinstaller</a:t>
+            </a:r>
+            <a:r>
+              <a:rPr lang="fr-FR" dirty="0">
+                <a:solidFill>
+                  <a:schemeClr val="tx1"/>
+                </a:solidFill>
+              </a:rPr>
+              <a:t> for </a:t>
+            </a:r>
+            <a:r>
+              <a:rPr lang="fr-FR" dirty="0" err="1">
+                <a:solidFill>
+                  <a:schemeClr val="tx1"/>
+                </a:solidFill>
+              </a:rPr>
+              <a:t>multiplatform</a:t>
+            </a:r>
+            <a:endParaRPr lang="fr-FR" dirty="0">
+              <a:solidFill>
+                <a:schemeClr val="tx1"/>
+              </a:solidFill>
+            </a:endParaRPr>
+          </a:p>
+          <a:p>
+            <a:r>
+              <a:rPr lang="fr-FR" dirty="0">
+                <a:solidFill>
+                  <a:schemeClr val="tx1"/>
+                </a:solidFill>
+              </a:rPr>
+              <a:t>Launch a scan </a:t>
+            </a:r>
+            <a:r>
+              <a:rPr lang="fr-FR" dirty="0" err="1">
+                <a:solidFill>
+                  <a:schemeClr val="tx1"/>
+                </a:solidFill>
+              </a:rPr>
+              <a:t>that</a:t>
+            </a:r>
+            <a:r>
+              <a:rPr lang="fr-FR" dirty="0">
+                <a:solidFill>
+                  <a:schemeClr val="tx1"/>
+                </a:solidFill>
+              </a:rPr>
+              <a:t> </a:t>
+            </a:r>
+            <a:r>
+              <a:rPr lang="fr-FR" dirty="0" err="1">
+                <a:solidFill>
+                  <a:schemeClr val="tx1"/>
+                </a:solidFill>
+              </a:rPr>
+              <a:t>remove</a:t>
+            </a:r>
+            <a:r>
+              <a:rPr lang="fr-FR" dirty="0">
+                <a:solidFill>
+                  <a:schemeClr val="tx1"/>
+                </a:solidFill>
+              </a:rPr>
+              <a:t> duplicate </a:t>
+            </a:r>
+            <a:r>
+              <a:rPr lang="fr-FR" dirty="0" err="1">
+                <a:solidFill>
+                  <a:schemeClr val="tx1"/>
+                </a:solidFill>
+              </a:rPr>
+              <a:t>screenshot</a:t>
+            </a:r>
+            <a:r>
+              <a:rPr lang="fr-FR" dirty="0">
+                <a:solidFill>
+                  <a:schemeClr val="tx1"/>
+                </a:solidFill>
+              </a:rPr>
+              <a:t> and </a:t>
+            </a:r>
+            <a:r>
+              <a:rPr lang="fr-FR" dirty="0" err="1">
+                <a:solidFill>
+                  <a:schemeClr val="tx1"/>
+                </a:solidFill>
+              </a:rPr>
+              <a:t>order</a:t>
+            </a:r>
+            <a:r>
+              <a:rPr lang="fr-FR" dirty="0">
+                <a:solidFill>
+                  <a:schemeClr val="tx1"/>
+                </a:solidFill>
+              </a:rPr>
+              <a:t> </a:t>
+            </a:r>
+            <a:r>
+              <a:rPr lang="fr-FR" dirty="0" err="1">
+                <a:solidFill>
+                  <a:schemeClr val="tx1"/>
+                </a:solidFill>
+              </a:rPr>
+              <a:t>them</a:t>
+            </a:r>
+            <a:r>
+              <a:rPr lang="fr-FR" dirty="0">
+                <a:solidFill>
+                  <a:schemeClr val="tx1"/>
+                </a:solidFill>
+              </a:rPr>
+              <a:t> by </a:t>
+            </a:r>
+            <a:r>
+              <a:rPr lang="fr-FR" dirty="0" err="1">
+                <a:solidFill>
+                  <a:schemeClr val="tx1"/>
+                </a:solidFill>
+              </a:rPr>
+              <a:t>interesting</a:t>
+            </a:r>
+            <a:r>
+              <a:rPr lang="fr-FR" dirty="0">
+                <a:solidFill>
+                  <a:schemeClr val="tx1"/>
+                </a:solidFill>
+              </a:rPr>
+              <a:t> </a:t>
+            </a:r>
+            <a:r>
+              <a:rPr lang="fr-FR" dirty="0" err="1">
+                <a:solidFill>
+                  <a:schemeClr val="tx1"/>
+                </a:solidFill>
+              </a:rPr>
+              <a:t>strategie</a:t>
+            </a:r>
+            <a:endParaRPr lang="fr-FR" dirty="0">
+              <a:solidFill>
+                <a:schemeClr val="tx1"/>
+              </a:solidFill>
+            </a:endParaRPr>
+          </a:p>
+          <a:p>
+            <a:r>
+              <a:rPr lang="fr-FR" dirty="0" err="1">
+                <a:solidFill>
+                  <a:schemeClr val="tx1"/>
+                </a:solidFill>
+              </a:rPr>
+              <a:t>Increment</a:t>
+            </a:r>
+            <a:r>
+              <a:rPr lang="fr-FR" dirty="0">
+                <a:solidFill>
+                  <a:schemeClr val="tx1"/>
+                </a:solidFill>
+              </a:rPr>
+              <a:t> the </a:t>
+            </a:r>
+            <a:r>
+              <a:rPr lang="fr-FR" dirty="0" err="1">
+                <a:solidFill>
+                  <a:schemeClr val="tx1"/>
+                </a:solidFill>
+              </a:rPr>
+              <a:t>reward</a:t>
+            </a:r>
+            <a:r>
+              <a:rPr lang="fr-FR" dirty="0">
+                <a:solidFill>
+                  <a:schemeClr val="tx1"/>
+                </a:solidFill>
+              </a:rPr>
+              <a:t> if </a:t>
+            </a:r>
+            <a:r>
+              <a:rPr lang="fr-FR" dirty="0" err="1">
+                <a:solidFill>
+                  <a:schemeClr val="tx1"/>
+                </a:solidFill>
+              </a:rPr>
+              <a:t>there</a:t>
+            </a:r>
+            <a:r>
+              <a:rPr lang="fr-FR" dirty="0">
+                <a:solidFill>
+                  <a:schemeClr val="tx1"/>
+                </a:solidFill>
+              </a:rPr>
+              <a:t> </a:t>
+            </a:r>
+            <a:r>
+              <a:rPr lang="fr-FR" dirty="0" err="1">
+                <a:solidFill>
+                  <a:schemeClr val="tx1"/>
+                </a:solidFill>
+              </a:rPr>
+              <a:t>was</a:t>
+            </a:r>
+            <a:r>
+              <a:rPr lang="fr-FR" dirty="0">
+                <a:solidFill>
+                  <a:schemeClr val="tx1"/>
+                </a:solidFill>
+              </a:rPr>
+              <a:t> </a:t>
+            </a:r>
+            <a:r>
+              <a:rPr lang="fr-FR" dirty="0" err="1">
+                <a:solidFill>
+                  <a:schemeClr val="tx1"/>
+                </a:solidFill>
+              </a:rPr>
+              <a:t>difference</a:t>
+            </a:r>
+            <a:r>
+              <a:rPr lang="fr-FR" dirty="0">
+                <a:solidFill>
+                  <a:schemeClr val="tx1"/>
+                </a:solidFill>
+              </a:rPr>
+              <a:t> </a:t>
+            </a:r>
+            <a:r>
+              <a:rPr lang="fr-FR" dirty="0" err="1">
+                <a:solidFill>
+                  <a:schemeClr val="tx1"/>
+                </a:solidFill>
+              </a:rPr>
+              <a:t>between</a:t>
+            </a:r>
+            <a:r>
+              <a:rPr lang="fr-FR" dirty="0">
+                <a:solidFill>
+                  <a:schemeClr val="tx1"/>
+                </a:solidFill>
+              </a:rPr>
+              <a:t> images</a:t>
+            </a:r>
+          </a:p>
+          <a:p>
+            <a:r>
+              <a:rPr lang="fr-FR" dirty="0" err="1">
+                <a:solidFill>
+                  <a:schemeClr val="tx1"/>
+                </a:solidFill>
+              </a:rPr>
+              <a:t>Create</a:t>
+            </a:r>
+            <a:r>
+              <a:rPr lang="fr-FR" dirty="0">
+                <a:solidFill>
+                  <a:schemeClr val="tx1"/>
+                </a:solidFill>
+              </a:rPr>
+              <a:t> a web page </a:t>
+            </a:r>
+            <a:r>
+              <a:rPr lang="fr-FR" dirty="0" err="1">
+                <a:solidFill>
+                  <a:schemeClr val="tx1"/>
+                </a:solidFill>
+              </a:rPr>
+              <a:t>with</a:t>
+            </a:r>
+            <a:r>
+              <a:rPr lang="fr-FR" dirty="0">
+                <a:solidFill>
+                  <a:schemeClr val="tx1"/>
+                </a:solidFill>
+              </a:rPr>
+              <a:t> the </a:t>
+            </a:r>
+            <a:r>
+              <a:rPr lang="fr-FR" dirty="0" err="1">
+                <a:solidFill>
+                  <a:schemeClr val="tx1"/>
+                </a:solidFill>
+              </a:rPr>
+              <a:t>strategies</a:t>
+            </a:r>
+            <a:r>
+              <a:rPr lang="fr-FR" dirty="0">
+                <a:solidFill>
+                  <a:schemeClr val="tx1"/>
+                </a:solidFill>
+              </a:rPr>
+              <a:t> </a:t>
+            </a:r>
+            <a:r>
+              <a:rPr lang="fr-FR" dirty="0" err="1">
+                <a:solidFill>
+                  <a:schemeClr val="tx1"/>
+                </a:solidFill>
+              </a:rPr>
+              <a:t>learned</a:t>
+            </a:r>
+            <a:endParaRPr lang="fr-FR" dirty="0">
+              <a:solidFill>
+                <a:schemeClr val="tx1"/>
+              </a:solidFill>
+            </a:endParaRPr>
+          </a:p>
+          <a:p>
+            <a:r>
+              <a:rPr lang="fr-FR" dirty="0" err="1">
+                <a:solidFill>
+                  <a:schemeClr val="tx1"/>
+                </a:solidFill>
+              </a:rPr>
+              <a:t>Create</a:t>
+            </a:r>
+            <a:r>
+              <a:rPr lang="fr-FR" dirty="0">
+                <a:solidFill>
+                  <a:schemeClr val="tx1"/>
+                </a:solidFill>
+              </a:rPr>
+              <a:t> a web interface or a vocal </a:t>
+            </a:r>
+            <a:r>
+              <a:rPr lang="fr-FR" dirty="0" err="1">
+                <a:solidFill>
+                  <a:schemeClr val="tx1"/>
+                </a:solidFill>
+              </a:rPr>
+              <a:t>controller</a:t>
+            </a:r>
+            <a:r>
+              <a:rPr lang="fr-FR" dirty="0">
+                <a:solidFill>
+                  <a:schemeClr val="tx1"/>
+                </a:solidFill>
+              </a:rPr>
+              <a:t> to </a:t>
+            </a:r>
+            <a:r>
+              <a:rPr lang="fr-FR" dirty="0" err="1">
+                <a:solidFill>
+                  <a:schemeClr val="tx1"/>
+                </a:solidFill>
+              </a:rPr>
+              <a:t>order</a:t>
+            </a:r>
+            <a:r>
+              <a:rPr lang="fr-FR" dirty="0">
+                <a:solidFill>
+                  <a:schemeClr val="tx1"/>
+                </a:solidFill>
+              </a:rPr>
+              <a:t> </a:t>
+            </a:r>
+            <a:r>
+              <a:rPr lang="fr-FR" dirty="0" err="1">
+                <a:solidFill>
+                  <a:schemeClr val="tx1"/>
+                </a:solidFill>
+              </a:rPr>
+              <a:t>strategies</a:t>
+            </a:r>
+            <a:endParaRPr lang="fr-FR" dirty="0">
+              <a:solidFill>
+                <a:schemeClr val="tx1"/>
+              </a:solidFill>
+            </a:endParaRPr>
           </a:p>
         </p:txBody>
       </p:sp>
@@ -12786,6 +13335,86 @@
           <p:cNvPr id="2" name="Titre 1">
             <a:extLst>
               <a:ext uri="{FF2B5EF4-FFF2-40B4-BE49-F238E27FC236}">
+                <a16:creationId xmlns:a16="http://schemas.microsoft.com/office/drawing/2014/main" id="{92D545E4-A5D0-4F16-BD8E-4521F1C661DC}"/>
+              </a:ext>
+            </a:extLst>
+          </p:cNvPr>
+          <p:cNvSpPr>
+            <a:spLocks noGrp="1"/>
+          </p:cNvSpPr>
+          <p:nvPr>
+            <p:ph type="title"/>
+          </p:nvPr>
+        </p:nvSpPr>
+        <p:spPr/>
+        <p:txBody>
+          <a:bodyPr/>
+          <a:lstStyle/>
+          <a:p>
+            <a:endParaRPr lang="en-GB"/>
+          </a:p>
+        </p:txBody>
+      </p:sp>
+      <p:sp>
+        <p:nvSpPr>
+          <p:cNvPr id="3" name="Espace réservé du contenu 2">
+            <a:extLst>
+              <a:ext uri="{FF2B5EF4-FFF2-40B4-BE49-F238E27FC236}">
+                <a16:creationId xmlns:a16="http://schemas.microsoft.com/office/drawing/2014/main" id="{5B99CC49-DE21-41E0-9844-8CC20E5BB507}"/>
+              </a:ext>
+            </a:extLst>
+          </p:cNvPr>
+          <p:cNvSpPr>
+            <a:spLocks noGrp="1"/>
+          </p:cNvSpPr>
+          <p:nvPr>
+            <p:ph idx="1"/>
+          </p:nvPr>
+        </p:nvSpPr>
+        <p:spPr/>
+        <p:txBody>
+          <a:bodyPr/>
+          <a:lstStyle/>
+          <a:p>
+            <a:endParaRPr lang="en-GB"/>
+          </a:p>
+        </p:txBody>
+      </p:sp>
+    </p:spTree>
+    <p:extLst>
+      <p:ext uri="{BB962C8B-B14F-4D97-AF65-F5344CB8AC3E}">
+        <p14:creationId xmlns:p14="http://schemas.microsoft.com/office/powerpoint/2010/main" val="1111033551"/>
+      </p:ext>
+    </p:extLst>
+  </p:cSld>
+  <p:clrMapOvr>
+    <a:masterClrMapping/>
+  </p:clrMapOvr>
+</p:sld>
+</file>
+
+<file path=ppt/slides/slide15.xml><?xml version="1.0" encoding="utf-8"?>
+<p:sld xmlns:a="http://schemas.openxmlformats.org/drawingml/2006/main" xmlns:r="http://schemas.openxmlformats.org/officeDocument/2006/relationships" xmlns:p="http://schemas.openxmlformats.org/presentationml/2006/main">
+  <p:cSld>
+    <p:spTree>
+      <p:nvGrpSpPr>
+        <p:cNvPr id="1" name=""/>
+        <p:cNvGrpSpPr/>
+        <p:nvPr/>
+      </p:nvGrpSpPr>
+      <p:grpSpPr>
+        <a:xfrm>
+          <a:off x="0" y="0"/>
+          <a:ext cx="0" cy="0"/>
+          <a:chOff x="0" y="0"/>
+          <a:chExt cx="0" cy="0"/>
+        </a:xfrm>
+      </p:grpSpPr>
+      <p:sp>
+        <p:nvSpPr>
+          <p:cNvPr id="2" name="Titre 1">
+            <a:extLst>
+              <a:ext uri="{FF2B5EF4-FFF2-40B4-BE49-F238E27FC236}">
                 <a16:creationId xmlns:a16="http://schemas.microsoft.com/office/drawing/2014/main" id="{643ACCC2-1572-47D7-9E8E-170E100F9348}"/>
               </a:ext>
             </a:extLst>
@@ -12858,7 +13487,7 @@
 </p:sld>
 </file>
 
-<file path=ppt/slides/slide15.xml><?xml version="1.0" encoding="utf-8"?>
+<file path=ppt/slides/slide16.xml><?xml version="1.0" encoding="utf-8"?>
 <p:sld xmlns:a="http://schemas.openxmlformats.org/drawingml/2006/main" xmlns:r="http://schemas.openxmlformats.org/officeDocument/2006/relationships" xmlns:p="http://schemas.openxmlformats.org/presentationml/2006/main">
   <p:cSld>
     <p:bg>
@@ -12952,7 +13581,7 @@
             <p:ph idx="1"/>
             <p:extLst>
               <p:ext uri="{D42A27DB-BD31-4B8C-83A1-F6EECF244321}">
-                <p14:modId xmlns:p14="http://schemas.microsoft.com/office/powerpoint/2010/main" val="208525868"/>
+                <p14:modId xmlns:p14="http://schemas.microsoft.com/office/powerpoint/2010/main" val="779853592"/>
               </p:ext>
             </p:extLst>
           </p:nvPr>
@@ -12980,7 +13609,7 @@
 </p:sld>
 </file>
 
-<file path=ppt/slides/slide16.xml><?xml version="1.0" encoding="utf-8"?>
+<file path=ppt/slides/slide17.xml><?xml version="1.0" encoding="utf-8"?>
 <p:sld xmlns:a="http://schemas.openxmlformats.org/drawingml/2006/main" xmlns:r="http://schemas.openxmlformats.org/officeDocument/2006/relationships" xmlns:p="http://schemas.openxmlformats.org/presentationml/2006/main">
   <p:cSld>
     <p:spTree>
@@ -13140,10 +13769,23 @@
               <a:t>virtual</a:t>
             </a:r>
             <a:r>
-              <a:rPr lang="fr-FR"/>
+              <a:rPr lang="fr-FR" dirty="0"/>
               <a:t> assistant</a:t>
             </a:r>
-            <a:endParaRPr lang="en-GB"/>
+          </a:p>
+          <a:p>
+            <a:r>
+              <a:rPr lang="en-GB" dirty="0"/>
+              <a:t>Create SAI with </a:t>
+            </a:r>
+            <a:r>
+              <a:rPr lang="en-GB" dirty="0" err="1"/>
+              <a:t>kivy</a:t>
+            </a:r>
+            <a:r>
+              <a:rPr lang="en-GB" dirty="0"/>
+              <a:t> for multiapplication</a:t>
+            </a:r>
           </a:p>
         </p:txBody>
       </p:sp>
@@ -13160,7 +13802,7 @@
 </p:sld>
 </file>
 
-<file path=ppt/slides/slide17.xml><?xml version="1.0" encoding="utf-8"?>
+<file path=ppt/slides/slide18.xml><?xml version="1.0" encoding="utf-8"?>
 <p:sld xmlns:a="http://schemas.openxmlformats.org/drawingml/2006/main" xmlns:r="http://schemas.openxmlformats.org/officeDocument/2006/relationships" xmlns:p="http://schemas.openxmlformats.org/presentationml/2006/main">
   <p:cSld>
     <p:spTree>
@@ -13913,7 +14555,7 @@
 </p:sld>
 </file>
 
-<file path=ppt/slides/slide18.xml><?xml version="1.0" encoding="utf-8"?>
+<file path=ppt/slides/slide19.xml><?xml version="1.0" encoding="utf-8"?>
 <p:sld xmlns:a="http://schemas.openxmlformats.org/drawingml/2006/main" xmlns:r="http://schemas.openxmlformats.org/officeDocument/2006/relationships" xmlns:p="http://schemas.openxmlformats.org/presentationml/2006/main">
   <p:cSld>
     <p:spTree>
@@ -14445,110 +15087,6 @@
     <p:extLst>
       <p:ext uri="{BB962C8B-B14F-4D97-AF65-F5344CB8AC3E}">
         <p14:creationId xmlns:p14="http://schemas.microsoft.com/office/powerpoint/2010/main" val="2112816624"/>
-      </p:ext>
-    </p:extLst>
-  </p:cSld>
-  <p:clrMapOvr>
-    <a:masterClrMapping/>
-  </p:clrMapOvr>
-</p:sld>
-</file>
-
-<file path=ppt/slides/slide19.xml><?xml version="1.0" encoding="utf-8"?>
-<p:sld xmlns:a="http://schemas.openxmlformats.org/drawingml/2006/main" xmlns:r="http://schemas.openxmlformats.org/officeDocument/2006/relationships" xmlns:p="http://schemas.openxmlformats.org/presentationml/2006/main">
-  <p:cSld>
-    <p:spTree>
-      <p:nvGrpSpPr>
-        <p:cNvPr id="1" name=""/>
-        <p:cNvGrpSpPr/>
-        <p:nvPr/>
-      </p:nvGrpSpPr>
-      <p:grpSpPr>
-        <a:xfrm>
-          <a:off x="0" y="0"/>
-          <a:ext cx="0" cy="0"/>
-          <a:chOff x="0" y="0"/>
-          <a:chExt cx="0" cy="0"/>
-        </a:xfrm>
-      </p:grpSpPr>
-      <p:sp>
-        <p:nvSpPr>
-          <p:cNvPr id="2" name="Titre 1">
-            <a:extLst>
-              <a:ext uri="{FF2B5EF4-FFF2-40B4-BE49-F238E27FC236}">
-                <a16:creationId xmlns:a16="http://schemas.microsoft.com/office/drawing/2014/main" id="{60A45B33-4349-4205-A596-A72ABD8F0A69}"/>
-              </a:ext>
-            </a:extLst>
-          </p:cNvPr>
-          <p:cNvSpPr>
-            <a:spLocks noGrp="1"/>
-          </p:cNvSpPr>
-          <p:nvPr>
-            <p:ph type="title"/>
-          </p:nvPr>
-        </p:nvSpPr>
-        <p:spPr>
-          <a:xfrm>
-            <a:off x="684212" y="4487332"/>
-            <a:ext cx="8534400" cy="1507067"/>
-          </a:xfrm>
-        </p:spPr>
-        <p:txBody>
-          <a:bodyPr/>
-          <a:lstStyle/>
-          <a:p>
-            <a:r>
-              <a:rPr lang="fr-FR"/>
-              <a:t>Sources</a:t>
-            </a:r>
-            <a:endParaRPr lang="en-GB" dirty="0"/>
-          </a:p>
-        </p:txBody>
-      </p:sp>
-      <p:sp>
-        <p:nvSpPr>
-          <p:cNvPr id="3" name="Espace réservé du contenu 2">
-            <a:extLst>
-              <a:ext uri="{FF2B5EF4-FFF2-40B4-BE49-F238E27FC236}">
-                <a16:creationId xmlns:a16="http://schemas.microsoft.com/office/drawing/2014/main" id="{825892DE-953F-4021-9EA2-14E93075BB41}"/>
-              </a:ext>
-            </a:extLst>
-          </p:cNvPr>
-          <p:cNvSpPr>
-            <a:spLocks noGrp="1"/>
-          </p:cNvSpPr>
-          <p:nvPr>
-            <p:ph idx="1"/>
-          </p:nvPr>
-        </p:nvSpPr>
-        <p:spPr>
-          <a:xfrm>
-            <a:off x="684212" y="685800"/>
-            <a:ext cx="8534400" cy="3615267"/>
-          </a:xfrm>
-        </p:spPr>
-        <p:txBody>
-          <a:bodyPr/>
-          <a:lstStyle/>
-          <a:p>
-            <a:r>
-              <a:rPr lang="fr-FR"/>
-              <a:t>Annexe prototype: </a:t>
-            </a:r>
-            <a:r>
-              <a:rPr lang="en-GB">
-                <a:hlinkClick r:id="rId2"/>
-              </a:rPr>
-              <a:t>https://www.draw.io/</a:t>
-            </a:r>
-            <a:endParaRPr lang="en-GB" dirty="0"/>
-          </a:p>
-        </p:txBody>
-      </p:sp>
-    </p:spTree>
-    <p:extLst>
-      <p:ext uri="{BB962C8B-B14F-4D97-AF65-F5344CB8AC3E}">
-        <p14:creationId xmlns:p14="http://schemas.microsoft.com/office/powerpoint/2010/main" val="1489863068"/>
       </p:ext>
     </p:extLst>
   </p:cSld>
@@ -15121,6 +15659,110 @@
 </p:sld>
 </file>
 
+<file path=ppt/slides/slide20.xml><?xml version="1.0" encoding="utf-8"?>
+<p:sld xmlns:a="http://schemas.openxmlformats.org/drawingml/2006/main" xmlns:r="http://schemas.openxmlformats.org/officeDocument/2006/relationships" xmlns:p="http://schemas.openxmlformats.org/presentationml/2006/main">
+  <p:cSld>
+    <p:spTree>
+      <p:nvGrpSpPr>
+        <p:cNvPr id="1" name=""/>
+        <p:cNvGrpSpPr/>
+        <p:nvPr/>
+      </p:nvGrpSpPr>
+      <p:grpSpPr>
+        <a:xfrm>
+          <a:off x="0" y="0"/>
+          <a:ext cx="0" cy="0"/>
+          <a:chOff x="0" y="0"/>
+          <a:chExt cx="0" cy="0"/>
+        </a:xfrm>
+      </p:grpSpPr>
+      <p:sp>
+        <p:nvSpPr>
+          <p:cNvPr id="2" name="Titre 1">
+            <a:extLst>
+              <a:ext uri="{FF2B5EF4-FFF2-40B4-BE49-F238E27FC236}">
+                <a16:creationId xmlns:a16="http://schemas.microsoft.com/office/drawing/2014/main" id="{60A45B33-4349-4205-A596-A72ABD8F0A69}"/>
+              </a:ext>
+            </a:extLst>
+          </p:cNvPr>
+          <p:cNvSpPr>
+            <a:spLocks noGrp="1"/>
+          </p:cNvSpPr>
+          <p:nvPr>
+            <p:ph type="title"/>
+          </p:nvPr>
+        </p:nvSpPr>
+        <p:spPr>
+          <a:xfrm>
+            <a:off x="684212" y="4487332"/>
+            <a:ext cx="8534400" cy="1507067"/>
+          </a:xfrm>
+        </p:spPr>
+        <p:txBody>
+          <a:bodyPr/>
+          <a:lstStyle/>
+          <a:p>
+            <a:r>
+              <a:rPr lang="fr-FR"/>
+              <a:t>Sources</a:t>
+            </a:r>
+            <a:endParaRPr lang="en-GB" dirty="0"/>
+          </a:p>
+        </p:txBody>
+      </p:sp>
+      <p:sp>
+        <p:nvSpPr>
+          <p:cNvPr id="3" name="Espace réservé du contenu 2">
+            <a:extLst>
+              <a:ext uri="{FF2B5EF4-FFF2-40B4-BE49-F238E27FC236}">
+                <a16:creationId xmlns:a16="http://schemas.microsoft.com/office/drawing/2014/main" id="{825892DE-953F-4021-9EA2-14E93075BB41}"/>
+              </a:ext>
+            </a:extLst>
+          </p:cNvPr>
+          <p:cNvSpPr>
+            <a:spLocks noGrp="1"/>
+          </p:cNvSpPr>
+          <p:nvPr>
+            <p:ph idx="1"/>
+          </p:nvPr>
+        </p:nvSpPr>
+        <p:spPr>
+          <a:xfrm>
+            <a:off x="684212" y="685800"/>
+            <a:ext cx="8534400" cy="3615267"/>
+          </a:xfrm>
+        </p:spPr>
+        <p:txBody>
+          <a:bodyPr/>
+          <a:lstStyle/>
+          <a:p>
+            <a:r>
+              <a:rPr lang="fr-FR"/>
+              <a:t>Annexe prototype: </a:t>
+            </a:r>
+            <a:r>
+              <a:rPr lang="en-GB">
+                <a:hlinkClick r:id="rId2"/>
+              </a:rPr>
+              <a:t>https://www.draw.io/</a:t>
+            </a:r>
+            <a:endParaRPr lang="en-GB" dirty="0"/>
+          </a:p>
+        </p:txBody>
+      </p:sp>
+    </p:spTree>
+    <p:extLst>
+      <p:ext uri="{BB962C8B-B14F-4D97-AF65-F5344CB8AC3E}">
+        <p14:creationId xmlns:p14="http://schemas.microsoft.com/office/powerpoint/2010/main" val="1489863068"/>
+      </p:ext>
+    </p:extLst>
+  </p:cSld>
+  <p:clrMapOvr>
+    <a:masterClrMapping/>
+  </p:clrMapOvr>
+</p:sld>
+</file>
+
 <file path=ppt/slides/slide3.xml><?xml version="1.0" encoding="utf-8"?>
 <p:sld xmlns:a="http://schemas.openxmlformats.org/drawingml/2006/main" xmlns:r="http://schemas.openxmlformats.org/officeDocument/2006/relationships" xmlns:p="http://schemas.openxmlformats.org/presentationml/2006/main">
   <p:cSld>

</xml_diff>

<commit_message>
#12 Clean and strategy added on slides
</commit_message>
<xml_diff>
--- a/SAI_presentation.pptx
+++ b/SAI_presentation.pptx
@@ -13351,7 +13351,11 @@
           <a:bodyPr/>
           <a:lstStyle/>
           <a:p>
-            <a:endParaRPr lang="en-GB"/>
+            <a:r>
+              <a:rPr lang="fr-FR"/>
+              <a:t>Clean and Strategy</a:t>
+            </a:r>
+            <a:endParaRPr lang="en-GB" dirty="0"/>
           </a:p>
         </p:txBody>
       </p:sp>
@@ -13376,7 +13380,87 @@
           <a:bodyPr/>
           <a:lstStyle/>
           <a:p>
-            <a:endParaRPr lang="en-GB"/>
+            <a:r>
+              <a:rPr lang="fr-FR" dirty="0"/>
+              <a:t>Method </a:t>
+            </a:r>
+            <a:r>
+              <a:rPr lang="fr-FR" dirty="0" err="1"/>
+              <a:t>used</a:t>
+            </a:r>
+            <a:r>
+              <a:rPr lang="fr-FR" dirty="0"/>
+              <a:t> to </a:t>
+            </a:r>
+            <a:r>
+              <a:rPr lang="fr-FR" dirty="0" err="1"/>
+              <a:t>remove</a:t>
+            </a:r>
+            <a:r>
+              <a:rPr lang="fr-FR" dirty="0"/>
+              <a:t> duplicate scan</a:t>
+            </a:r>
+          </a:p>
+          <a:p>
+            <a:r>
+              <a:rPr lang="fr-FR" dirty="0"/>
+              <a:t>Method </a:t>
+            </a:r>
+            <a:r>
+              <a:rPr lang="fr-FR" dirty="0" err="1"/>
+              <a:t>used</a:t>
+            </a:r>
+            <a:r>
+              <a:rPr lang="fr-FR" dirty="0"/>
+              <a:t> to </a:t>
+            </a:r>
+            <a:r>
+              <a:rPr lang="fr-FR" dirty="0" err="1"/>
+              <a:t>order</a:t>
+            </a:r>
+            <a:r>
+              <a:rPr lang="fr-FR" dirty="0"/>
+              <a:t> </a:t>
+            </a:r>
+            <a:r>
+              <a:rPr lang="fr-FR" dirty="0" err="1"/>
+              <a:t>them</a:t>
+            </a:r>
+            <a:r>
+              <a:rPr lang="fr-FR" dirty="0"/>
+              <a:t> by </a:t>
+            </a:r>
+            <a:r>
+              <a:rPr lang="fr-FR" dirty="0" err="1"/>
+              <a:t>strategie</a:t>
+            </a:r>
+            <a:endParaRPr lang="fr-FR" dirty="0"/>
+          </a:p>
+          <a:p>
+            <a:r>
+              <a:rPr lang="fr-FR" dirty="0" err="1"/>
+              <a:t>Explain</a:t>
+            </a:r>
+            <a:r>
+              <a:rPr lang="fr-FR" dirty="0"/>
+              <a:t> </a:t>
+            </a:r>
+            <a:r>
+              <a:rPr lang="fr-FR" dirty="0" err="1"/>
+              <a:t>with</a:t>
+            </a:r>
+            <a:r>
+              <a:rPr lang="fr-FR" dirty="0"/>
+              <a:t> a </a:t>
+            </a:r>
+            <a:r>
+              <a:rPr lang="fr-FR" dirty="0" err="1"/>
+              <a:t>schema</a:t>
+            </a:r>
+            <a:endParaRPr lang="fr-FR" dirty="0"/>
+          </a:p>
+          <a:p>
+            <a:endParaRPr lang="en-GB" dirty="0"/>
           </a:p>
         </p:txBody>
       </p:sp>

</xml_diff>

<commit_message>
#12 Difference between images added on slides
</commit_message>
<xml_diff>
--- a/SAI_presentation.pptx
+++ b/SAI_presentation.pptx
@@ -19,12 +19,13 @@
     <p:sldId id="259" r:id="rId13"/>
     <p:sldId id="274" r:id="rId14"/>
     <p:sldId id="275" r:id="rId15"/>
-    <p:sldId id="260" r:id="rId16"/>
-    <p:sldId id="261" r:id="rId17"/>
-    <p:sldId id="265" r:id="rId18"/>
-    <p:sldId id="262" r:id="rId19"/>
-    <p:sldId id="264" r:id="rId20"/>
-    <p:sldId id="263" r:id="rId21"/>
+    <p:sldId id="276" r:id="rId16"/>
+    <p:sldId id="260" r:id="rId17"/>
+    <p:sldId id="261" r:id="rId18"/>
+    <p:sldId id="265" r:id="rId19"/>
+    <p:sldId id="262" r:id="rId20"/>
+    <p:sldId id="264" r:id="rId21"/>
+    <p:sldId id="263" r:id="rId22"/>
   </p:sldIdLst>
   <p:sldSz cx="12192000" cy="6858000"/>
   <p:notesSz cx="6858000" cy="9144000"/>
@@ -6939,7 +6940,7 @@
             <a:fld id="{B61BEF0D-F0BB-DE4B-95CE-6DB70DBA9567}" type="datetimeFigureOut">
               <a:rPr lang="en-US" dirty="0"/>
               <a:pPr/>
-              <a:t>3/9/2020</a:t>
+              <a:t>3/10/2020</a:t>
             </a:fld>
             <a:endParaRPr lang="en-US" dirty="0"/>
           </a:p>
@@ -7372,7 +7373,7 @@
             <a:fld id="{B61BEF0D-F0BB-DE4B-95CE-6DB70DBA9567}" type="datetimeFigureOut">
               <a:rPr lang="en-US" dirty="0"/>
               <a:pPr/>
-              <a:t>3/9/2020</a:t>
+              <a:t>3/10/2020</a:t>
             </a:fld>
             <a:endParaRPr lang="en-US" dirty="0"/>
           </a:p>
@@ -7619,7 +7620,7 @@
             <a:fld id="{B61BEF0D-F0BB-DE4B-95CE-6DB70DBA9567}" type="datetimeFigureOut">
               <a:rPr lang="en-US" dirty="0"/>
               <a:pPr/>
-              <a:t>3/9/2020</a:t>
+              <a:t>3/10/2020</a:t>
             </a:fld>
             <a:endParaRPr lang="en-US" dirty="0"/>
           </a:p>
@@ -7924,7 +7925,7 @@
             <a:fld id="{B61BEF0D-F0BB-DE4B-95CE-6DB70DBA9567}" type="datetimeFigureOut">
               <a:rPr lang="en-US" dirty="0"/>
               <a:pPr/>
-              <a:t>3/9/2020</a:t>
+              <a:t>3/10/2020</a:t>
             </a:fld>
             <a:endParaRPr lang="en-US" dirty="0"/>
           </a:p>
@@ -8239,7 +8240,7 @@
             <a:fld id="{B61BEF0D-F0BB-DE4B-95CE-6DB70DBA9567}" type="datetimeFigureOut">
               <a:rPr lang="en-US" dirty="0"/>
               <a:pPr/>
-              <a:t>3/9/2020</a:t>
+              <a:t>3/10/2020</a:t>
             </a:fld>
             <a:endParaRPr lang="en-US" dirty="0"/>
           </a:p>
@@ -8538,7 +8539,7 @@
             <a:fld id="{B61BEF0D-F0BB-DE4B-95CE-6DB70DBA9567}" type="datetimeFigureOut">
               <a:rPr lang="en-US" dirty="0"/>
               <a:pPr/>
-              <a:t>3/9/2020</a:t>
+              <a:t>3/10/2020</a:t>
             </a:fld>
             <a:endParaRPr lang="en-US" dirty="0"/>
           </a:p>
@@ -8902,7 +8903,7 @@
             <a:fld id="{B61BEF0D-F0BB-DE4B-95CE-6DB70DBA9567}" type="datetimeFigureOut">
               <a:rPr lang="en-US" dirty="0"/>
               <a:pPr/>
-              <a:t>3/9/2020</a:t>
+              <a:t>3/10/2020</a:t>
             </a:fld>
             <a:endParaRPr lang="en-US" dirty="0"/>
           </a:p>
@@ -9073,7 +9074,7 @@
             <a:fld id="{B61BEF0D-F0BB-DE4B-95CE-6DB70DBA9567}" type="datetimeFigureOut">
               <a:rPr lang="en-US" dirty="0"/>
               <a:pPr/>
-              <a:t>3/9/2020</a:t>
+              <a:t>3/10/2020</a:t>
             </a:fld>
             <a:endParaRPr lang="en-US" dirty="0"/>
           </a:p>
@@ -9250,7 +9251,7 @@
             <a:fld id="{B61BEF0D-F0BB-DE4B-95CE-6DB70DBA9567}" type="datetimeFigureOut">
               <a:rPr lang="en-US" dirty="0"/>
               <a:pPr/>
-              <a:t>3/9/2020</a:t>
+              <a:t>3/10/2020</a:t>
             </a:fld>
             <a:endParaRPr lang="en-US" dirty="0"/>
           </a:p>
@@ -9417,7 +9418,7 @@
             <a:fld id="{B61BEF0D-F0BB-DE4B-95CE-6DB70DBA9567}" type="datetimeFigureOut">
               <a:rPr lang="en-US" dirty="0"/>
               <a:pPr/>
-              <a:t>3/9/2020</a:t>
+              <a:t>3/10/2020</a:t>
             </a:fld>
             <a:endParaRPr lang="en-US" dirty="0"/>
           </a:p>
@@ -9664,7 +9665,7 @@
             <a:fld id="{B61BEF0D-F0BB-DE4B-95CE-6DB70DBA9567}" type="datetimeFigureOut">
               <a:rPr lang="en-US" dirty="0"/>
               <a:pPr/>
-              <a:t>3/9/2020</a:t>
+              <a:t>3/10/2020</a:t>
             </a:fld>
             <a:endParaRPr lang="en-US" dirty="0"/>
           </a:p>
@@ -9897,7 +9898,7 @@
             <a:fld id="{B61BEF0D-F0BB-DE4B-95CE-6DB70DBA9567}" type="datetimeFigureOut">
               <a:rPr lang="en-US" dirty="0"/>
               <a:pPr/>
-              <a:t>3/9/2020</a:t>
+              <a:t>3/10/2020</a:t>
             </a:fld>
             <a:endParaRPr lang="en-US" dirty="0"/>
           </a:p>
@@ -10276,7 +10277,7 @@
             <a:fld id="{B61BEF0D-F0BB-DE4B-95CE-6DB70DBA9567}" type="datetimeFigureOut">
               <a:rPr lang="en-US" dirty="0"/>
               <a:pPr/>
-              <a:t>3/9/2020</a:t>
+              <a:t>3/10/2020</a:t>
             </a:fld>
             <a:endParaRPr lang="en-US" dirty="0"/>
           </a:p>
@@ -10391,7 +10392,7 @@
             <a:fld id="{B61BEF0D-F0BB-DE4B-95CE-6DB70DBA9567}" type="datetimeFigureOut">
               <a:rPr lang="en-US" dirty="0"/>
               <a:pPr/>
-              <a:t>3/9/2020</a:t>
+              <a:t>3/10/2020</a:t>
             </a:fld>
             <a:endParaRPr lang="en-US" dirty="0"/>
           </a:p>
@@ -10483,7 +10484,7 @@
             <a:fld id="{B61BEF0D-F0BB-DE4B-95CE-6DB70DBA9567}" type="datetimeFigureOut">
               <a:rPr lang="en-US" dirty="0"/>
               <a:pPr/>
-              <a:t>3/9/2020</a:t>
+              <a:t>3/10/2020</a:t>
             </a:fld>
             <a:endParaRPr lang="en-US" dirty="0"/>
           </a:p>
@@ -10735,7 +10736,7 @@
             <a:fld id="{B61BEF0D-F0BB-DE4B-95CE-6DB70DBA9567}" type="datetimeFigureOut">
               <a:rPr lang="en-US" dirty="0"/>
               <a:pPr/>
-              <a:t>3/9/2020</a:t>
+              <a:t>3/10/2020</a:t>
             </a:fld>
             <a:endParaRPr lang="en-US" dirty="0"/>
           </a:p>
@@ -11015,7 +11016,7 @@
             <a:fld id="{B61BEF0D-F0BB-DE4B-95CE-6DB70DBA9567}" type="datetimeFigureOut">
               <a:rPr lang="en-US" dirty="0"/>
               <a:pPr/>
-              <a:t>3/9/2020</a:t>
+              <a:t>3/10/2020</a:t>
             </a:fld>
             <a:endParaRPr lang="en-US" dirty="0"/>
           </a:p>
@@ -11418,7 +11419,7 @@
             <a:fld id="{B61BEF0D-F0BB-DE4B-95CE-6DB70DBA9567}" type="datetimeFigureOut">
               <a:rPr lang="en-US" dirty="0"/>
               <a:pPr/>
-              <a:t>3/9/2020</a:t>
+              <a:t>3/10/2020</a:t>
             </a:fld>
             <a:endParaRPr lang="en-US" dirty="0"/>
           </a:p>
@@ -13499,6 +13500,185 @@
           <p:cNvPr id="2" name="Titre 1">
             <a:extLst>
               <a:ext uri="{FF2B5EF4-FFF2-40B4-BE49-F238E27FC236}">
+                <a16:creationId xmlns:a16="http://schemas.microsoft.com/office/drawing/2014/main" id="{73F253BD-1F85-4113-B77A-999D8DBEC881}"/>
+              </a:ext>
+            </a:extLst>
+          </p:cNvPr>
+          <p:cNvSpPr>
+            <a:spLocks noGrp="1"/>
+          </p:cNvSpPr>
+          <p:nvPr>
+            <p:ph type="title"/>
+          </p:nvPr>
+        </p:nvSpPr>
+        <p:spPr/>
+        <p:txBody>
+          <a:bodyPr/>
+          <a:lstStyle/>
+          <a:p>
+            <a:r>
+              <a:rPr lang="fr-FR" dirty="0" err="1"/>
+              <a:t>Difference</a:t>
+            </a:r>
+            <a:r>
+              <a:rPr lang="fr-FR" dirty="0"/>
+              <a:t> </a:t>
+            </a:r>
+            <a:r>
+              <a:rPr lang="fr-FR" dirty="0" err="1"/>
+              <a:t>between</a:t>
+            </a:r>
+            <a:r>
+              <a:rPr lang="fr-FR" dirty="0"/>
+              <a:t> images</a:t>
+            </a:r>
+            <a:endParaRPr lang="en-GB" dirty="0"/>
+          </a:p>
+        </p:txBody>
+      </p:sp>
+      <p:sp>
+        <p:nvSpPr>
+          <p:cNvPr id="3" name="Espace réservé du contenu 2">
+            <a:extLst>
+              <a:ext uri="{FF2B5EF4-FFF2-40B4-BE49-F238E27FC236}">
+                <a16:creationId xmlns:a16="http://schemas.microsoft.com/office/drawing/2014/main" id="{5AD76F7E-2C59-4EEC-8FFE-513BCEB9FD72}"/>
+              </a:ext>
+            </a:extLst>
+          </p:cNvPr>
+          <p:cNvSpPr>
+            <a:spLocks noGrp="1"/>
+          </p:cNvSpPr>
+          <p:nvPr>
+            <p:ph idx="1"/>
+          </p:nvPr>
+        </p:nvSpPr>
+        <p:spPr/>
+        <p:txBody>
+          <a:bodyPr/>
+          <a:lstStyle/>
+          <a:p>
+            <a:r>
+              <a:rPr lang="fr-FR" dirty="0" err="1"/>
+              <a:t>Create</a:t>
+            </a:r>
+            <a:r>
+              <a:rPr lang="fr-FR" dirty="0"/>
+              <a:t> a </a:t>
+            </a:r>
+            <a:r>
+              <a:rPr lang="fr-FR" dirty="0" err="1"/>
+              <a:t>strategy</a:t>
+            </a:r>
+            <a:r>
+              <a:rPr lang="fr-FR" dirty="0"/>
+              <a:t> </a:t>
+            </a:r>
+            <a:r>
+              <a:rPr lang="fr-FR" dirty="0" err="1"/>
+              <a:t>when</a:t>
+            </a:r>
+            <a:r>
+              <a:rPr lang="fr-FR" dirty="0"/>
+              <a:t> </a:t>
+            </a:r>
+            <a:r>
+              <a:rPr lang="fr-FR" dirty="0" err="1"/>
+              <a:t>some</a:t>
+            </a:r>
+            <a:r>
+              <a:rPr lang="fr-FR" dirty="0"/>
+              <a:t> images are </a:t>
+            </a:r>
+            <a:r>
+              <a:rPr lang="fr-FR" dirty="0" err="1"/>
+              <a:t>really</a:t>
+            </a:r>
+            <a:r>
+              <a:rPr lang="fr-FR" dirty="0"/>
+              <a:t> </a:t>
+            </a:r>
+            <a:r>
+              <a:rPr lang="fr-FR" dirty="0" err="1"/>
+              <a:t>different</a:t>
+            </a:r>
+            <a:r>
+              <a:rPr lang="fr-FR" dirty="0"/>
+              <a:t> </a:t>
+            </a:r>
+            <a:r>
+              <a:rPr lang="fr-FR" dirty="0" err="1"/>
+              <a:t>using</a:t>
+            </a:r>
+            <a:r>
+              <a:rPr lang="fr-FR" dirty="0"/>
+              <a:t> a </a:t>
+            </a:r>
+            <a:r>
+              <a:rPr lang="fr-FR" dirty="0" err="1"/>
+              <a:t>threshold</a:t>
+            </a:r>
+            <a:endParaRPr lang="fr-FR" dirty="0"/>
+          </a:p>
+          <a:p>
+            <a:r>
+              <a:rPr lang="fr-FR" dirty="0" err="1"/>
+              <a:t>Explain</a:t>
+            </a:r>
+            <a:r>
+              <a:rPr lang="fr-FR" dirty="0"/>
+              <a:t> </a:t>
+            </a:r>
+            <a:r>
+              <a:rPr lang="fr-FR" dirty="0" err="1"/>
+              <a:t>with</a:t>
+            </a:r>
+            <a:r>
+              <a:rPr lang="fr-FR" dirty="0"/>
+              <a:t> a </a:t>
+            </a:r>
+            <a:r>
+              <a:rPr lang="fr-FR"/>
+              <a:t>schema</a:t>
+            </a:r>
+            <a:endParaRPr lang="en-GB"/>
+          </a:p>
+        </p:txBody>
+      </p:sp>
+    </p:spTree>
+    <p:extLst>
+      <p:ext uri="{BB962C8B-B14F-4D97-AF65-F5344CB8AC3E}">
+        <p14:creationId xmlns:p14="http://schemas.microsoft.com/office/powerpoint/2010/main" val="4208273751"/>
+      </p:ext>
+    </p:extLst>
+  </p:cSld>
+  <p:clrMapOvr>
+    <a:masterClrMapping/>
+  </p:clrMapOvr>
+</p:sld>
+</file>
+
+<file path=ppt/slides/slide16.xml><?xml version="1.0" encoding="utf-8"?>
+<p:sld xmlns:a="http://schemas.openxmlformats.org/drawingml/2006/main" xmlns:r="http://schemas.openxmlformats.org/officeDocument/2006/relationships" xmlns:p="http://schemas.openxmlformats.org/presentationml/2006/main">
+  <p:cSld>
+    <p:spTree>
+      <p:nvGrpSpPr>
+        <p:cNvPr id="1" name=""/>
+        <p:cNvGrpSpPr/>
+        <p:nvPr/>
+      </p:nvGrpSpPr>
+      <p:grpSpPr>
+        <a:xfrm>
+          <a:off x="0" y="0"/>
+          <a:ext cx="0" cy="0"/>
+          <a:chOff x="0" y="0"/>
+          <a:chExt cx="0" cy="0"/>
+        </a:xfrm>
+      </p:grpSpPr>
+      <p:sp>
+        <p:nvSpPr>
+          <p:cNvPr id="2" name="Titre 1">
+            <a:extLst>
+              <a:ext uri="{FF2B5EF4-FFF2-40B4-BE49-F238E27FC236}">
                 <a16:creationId xmlns:a16="http://schemas.microsoft.com/office/drawing/2014/main" id="{643ACCC2-1572-47D7-9E8E-170E100F9348}"/>
               </a:ext>
             </a:extLst>
@@ -13571,7 +13751,7 @@
 </p:sld>
 </file>
 
-<file path=ppt/slides/slide16.xml><?xml version="1.0" encoding="utf-8"?>
+<file path=ppt/slides/slide17.xml><?xml version="1.0" encoding="utf-8"?>
 <p:sld xmlns:a="http://schemas.openxmlformats.org/drawingml/2006/main" xmlns:r="http://schemas.openxmlformats.org/officeDocument/2006/relationships" xmlns:p="http://schemas.openxmlformats.org/presentationml/2006/main">
   <p:cSld>
     <p:bg>
@@ -13693,7 +13873,7 @@
 </p:sld>
 </file>
 
-<file path=ppt/slides/slide17.xml><?xml version="1.0" encoding="utf-8"?>
+<file path=ppt/slides/slide18.xml><?xml version="1.0" encoding="utf-8"?>
 <p:sld xmlns:a="http://schemas.openxmlformats.org/drawingml/2006/main" xmlns:r="http://schemas.openxmlformats.org/officeDocument/2006/relationships" xmlns:p="http://schemas.openxmlformats.org/presentationml/2006/main">
   <p:cSld>
     <p:spTree>
@@ -13886,7 +14066,7 @@
 </p:sld>
 </file>
 
-<file path=ppt/slides/slide18.xml><?xml version="1.0" encoding="utf-8"?>
+<file path=ppt/slides/slide19.xml><?xml version="1.0" encoding="utf-8"?>
 <p:sld xmlns:a="http://schemas.openxmlformats.org/drawingml/2006/main" xmlns:r="http://schemas.openxmlformats.org/officeDocument/2006/relationships" xmlns:p="http://schemas.openxmlformats.org/presentationml/2006/main">
   <p:cSld>
     <p:spTree>
@@ -14639,547 +14819,6 @@
 </p:sld>
 </file>
 
-<file path=ppt/slides/slide19.xml><?xml version="1.0" encoding="utf-8"?>
-<p:sld xmlns:a="http://schemas.openxmlformats.org/drawingml/2006/main" xmlns:r="http://schemas.openxmlformats.org/officeDocument/2006/relationships" xmlns:p="http://schemas.openxmlformats.org/presentationml/2006/main">
-  <p:cSld>
-    <p:spTree>
-      <p:nvGrpSpPr>
-        <p:cNvPr id="1" name=""/>
-        <p:cNvGrpSpPr/>
-        <p:nvPr/>
-      </p:nvGrpSpPr>
-      <p:grpSpPr>
-        <a:xfrm>
-          <a:off x="0" y="0"/>
-          <a:ext cx="0" cy="0"/>
-          <a:chOff x="0" y="0"/>
-          <a:chExt cx="0" cy="0"/>
-        </a:xfrm>
-      </p:grpSpPr>
-      <p:sp>
-        <p:nvSpPr>
-          <p:cNvPr id="2" name="Titre 1">
-            <a:extLst>
-              <a:ext uri="{FF2B5EF4-FFF2-40B4-BE49-F238E27FC236}">
-                <a16:creationId xmlns:a16="http://schemas.microsoft.com/office/drawing/2014/main" id="{C3A47323-C1D5-4FF9-968A-64ABFA3C1E18}"/>
-              </a:ext>
-            </a:extLst>
-          </p:cNvPr>
-          <p:cNvSpPr>
-            <a:spLocks noGrp="1"/>
-          </p:cNvSpPr>
-          <p:nvPr>
-            <p:ph type="title"/>
-          </p:nvPr>
-        </p:nvSpPr>
-        <p:spPr/>
-        <p:txBody>
-          <a:bodyPr/>
-          <a:lstStyle/>
-          <a:p>
-            <a:r>
-              <a:rPr lang="fr-FR" dirty="0"/>
-              <a:t>Annexe</a:t>
-            </a:r>
-            <a:endParaRPr lang="en-GB" dirty="0"/>
-          </a:p>
-        </p:txBody>
-      </p:sp>
-      <p:pic>
-        <p:nvPicPr>
-          <p:cNvPr id="16" name="Espace réservé du contenu 15">
-            <a:extLst>
-              <a:ext uri="{FF2B5EF4-FFF2-40B4-BE49-F238E27FC236}">
-                <a16:creationId xmlns:a16="http://schemas.microsoft.com/office/drawing/2014/main" id="{B2C4B2A4-24E6-4EA7-8EF4-F1B0389A247E}"/>
-              </a:ext>
-            </a:extLst>
-          </p:cNvPr>
-          <p:cNvPicPr>
-            <a:picLocks noGrp="1" noChangeAspect="1"/>
-          </p:cNvPicPr>
-          <p:nvPr>
-            <p:ph idx="1"/>
-          </p:nvPr>
-        </p:nvPicPr>
-        <p:blipFill>
-          <a:blip r:embed="rId2"/>
-          <a:stretch>
-            <a:fillRect/>
-          </a:stretch>
-        </p:blipFill>
-        <p:spPr>
-          <a:xfrm>
-            <a:off x="7839108" y="2560399"/>
-            <a:ext cx="1314450" cy="600075"/>
-          </a:xfrm>
-          <a:prstGeom prst="rect">
-            <a:avLst/>
-          </a:prstGeom>
-        </p:spPr>
-      </p:pic>
-      <p:sp>
-        <p:nvSpPr>
-          <p:cNvPr id="4" name="ZoneTexte 3">
-            <a:extLst>
-              <a:ext uri="{FF2B5EF4-FFF2-40B4-BE49-F238E27FC236}">
-                <a16:creationId xmlns:a16="http://schemas.microsoft.com/office/drawing/2014/main" id="{308043D7-F2FD-4D07-9420-385AA37319FD}"/>
-              </a:ext>
-            </a:extLst>
-          </p:cNvPr>
-          <p:cNvSpPr txBox="1"/>
-          <p:nvPr/>
-        </p:nvSpPr>
-        <p:spPr>
-          <a:xfrm>
-            <a:off x="499481" y="348122"/>
-            <a:ext cx="1754006" cy="369332"/>
-          </a:xfrm>
-          <a:prstGeom prst="rect">
-            <a:avLst/>
-          </a:prstGeom>
-          <a:noFill/>
-        </p:spPr>
-        <p:txBody>
-          <a:bodyPr wrap="none" rtlCol="0">
-            <a:spAutoFit/>
-          </a:bodyPr>
-          <a:lstStyle/>
-          <a:p>
-            <a:r>
-              <a:rPr lang="fr-FR" dirty="0"/>
-              <a:t>The prototype</a:t>
-            </a:r>
-            <a:endParaRPr lang="en-GB" dirty="0"/>
-          </a:p>
-        </p:txBody>
-      </p:sp>
-      <p:cxnSp>
-        <p:nvCxnSpPr>
-          <p:cNvPr id="5" name="Connecteur droit avec flèche 4">
-            <a:extLst>
-              <a:ext uri="{FF2B5EF4-FFF2-40B4-BE49-F238E27FC236}">
-                <a16:creationId xmlns:a16="http://schemas.microsoft.com/office/drawing/2014/main" id="{76B2BD43-8A32-4F05-90EE-F4CBE6F6B3AC}"/>
-              </a:ext>
-            </a:extLst>
-          </p:cNvPr>
-          <p:cNvCxnSpPr>
-            <a:cxnSpLocks/>
-          </p:cNvCxnSpPr>
-          <p:nvPr/>
-        </p:nvCxnSpPr>
-        <p:spPr>
-          <a:xfrm>
-            <a:off x="6384258" y="989988"/>
-            <a:ext cx="1526233" cy="1340211"/>
-          </a:xfrm>
-          <a:prstGeom prst="straightConnector1">
-            <a:avLst/>
-          </a:prstGeom>
-          <a:ln w="76200">
-            <a:solidFill>
-              <a:schemeClr val="accent1">
-                <a:lumMod val="60000"/>
-                <a:lumOff val="40000"/>
-                <a:alpha val="60000"/>
-              </a:schemeClr>
-            </a:solidFill>
-            <a:tailEnd type="triangle"/>
-          </a:ln>
-        </p:spPr>
-        <p:style>
-          <a:lnRef idx="1">
-            <a:schemeClr val="accent1"/>
-          </a:lnRef>
-          <a:fillRef idx="0">
-            <a:schemeClr val="accent1"/>
-          </a:fillRef>
-          <a:effectRef idx="0">
-            <a:schemeClr val="accent1"/>
-          </a:effectRef>
-          <a:fontRef idx="minor">
-            <a:schemeClr val="tx1"/>
-          </a:fontRef>
-        </p:style>
-      </p:cxnSp>
-      <p:cxnSp>
-        <p:nvCxnSpPr>
-          <p:cNvPr id="6" name="Connecteur droit avec flèche 5">
-            <a:extLst>
-              <a:ext uri="{FF2B5EF4-FFF2-40B4-BE49-F238E27FC236}">
-                <a16:creationId xmlns:a16="http://schemas.microsoft.com/office/drawing/2014/main" id="{4FB2FE4C-19EC-481B-8A75-3B52BCC715A8}"/>
-              </a:ext>
-            </a:extLst>
-          </p:cNvPr>
-          <p:cNvCxnSpPr>
-            <a:cxnSpLocks/>
-          </p:cNvCxnSpPr>
-          <p:nvPr/>
-        </p:nvCxnSpPr>
-        <p:spPr>
-          <a:xfrm>
-            <a:off x="5678751" y="1145219"/>
-            <a:ext cx="0" cy="1606626"/>
-          </a:xfrm>
-          <a:prstGeom prst="straightConnector1">
-            <a:avLst/>
-          </a:prstGeom>
-          <a:ln w="76200">
-            <a:solidFill>
-              <a:schemeClr val="accent1">
-                <a:lumMod val="60000"/>
-                <a:lumOff val="40000"/>
-                <a:alpha val="60000"/>
-              </a:schemeClr>
-            </a:solidFill>
-            <a:tailEnd type="triangle"/>
-          </a:ln>
-        </p:spPr>
-        <p:style>
-          <a:lnRef idx="1">
-            <a:schemeClr val="accent1"/>
-          </a:lnRef>
-          <a:fillRef idx="0">
-            <a:schemeClr val="accent1"/>
-          </a:fillRef>
-          <a:effectRef idx="0">
-            <a:schemeClr val="accent1"/>
-          </a:effectRef>
-          <a:fontRef idx="minor">
-            <a:schemeClr val="tx1"/>
-          </a:fontRef>
-        </p:style>
-      </p:cxnSp>
-      <p:cxnSp>
-        <p:nvCxnSpPr>
-          <p:cNvPr id="7" name="Connecteur droit avec flèche 6">
-            <a:extLst>
-              <a:ext uri="{FF2B5EF4-FFF2-40B4-BE49-F238E27FC236}">
-                <a16:creationId xmlns:a16="http://schemas.microsoft.com/office/drawing/2014/main" id="{5B6CFAE7-3CE4-4665-8A62-A74E96029C14}"/>
-              </a:ext>
-            </a:extLst>
-          </p:cNvPr>
-          <p:cNvCxnSpPr>
-            <a:cxnSpLocks/>
-          </p:cNvCxnSpPr>
-          <p:nvPr/>
-        </p:nvCxnSpPr>
-        <p:spPr>
-          <a:xfrm flipH="1">
-            <a:off x="3426782" y="989988"/>
-            <a:ext cx="1617845" cy="1380680"/>
-          </a:xfrm>
-          <a:prstGeom prst="straightConnector1">
-            <a:avLst/>
-          </a:prstGeom>
-          <a:ln w="76200">
-            <a:solidFill>
-              <a:schemeClr val="accent1">
-                <a:lumMod val="60000"/>
-                <a:lumOff val="40000"/>
-                <a:alpha val="60000"/>
-              </a:schemeClr>
-            </a:solidFill>
-            <a:tailEnd type="triangle"/>
-          </a:ln>
-        </p:spPr>
-        <p:style>
-          <a:lnRef idx="1">
-            <a:schemeClr val="accent1"/>
-          </a:lnRef>
-          <a:fillRef idx="0">
-            <a:schemeClr val="accent1"/>
-          </a:fillRef>
-          <a:effectRef idx="0">
-            <a:schemeClr val="accent1"/>
-          </a:effectRef>
-          <a:fontRef idx="minor">
-            <a:schemeClr val="tx1"/>
-          </a:fontRef>
-        </p:style>
-      </p:cxnSp>
-      <p:sp>
-        <p:nvSpPr>
-          <p:cNvPr id="8" name="ZoneTexte 7">
-            <a:extLst>
-              <a:ext uri="{FF2B5EF4-FFF2-40B4-BE49-F238E27FC236}">
-                <a16:creationId xmlns:a16="http://schemas.microsoft.com/office/drawing/2014/main" id="{9035EBA5-A191-4017-9BC3-68668EEEC5A6}"/>
-              </a:ext>
-            </a:extLst>
-          </p:cNvPr>
-          <p:cNvSpPr txBox="1"/>
-          <p:nvPr/>
-        </p:nvSpPr>
-        <p:spPr>
-          <a:xfrm>
-            <a:off x="2077435" y="3279624"/>
-            <a:ext cx="928459" cy="369332"/>
-          </a:xfrm>
-          <a:prstGeom prst="rect">
-            <a:avLst/>
-          </a:prstGeom>
-          <a:noFill/>
-        </p:spPr>
-        <p:txBody>
-          <a:bodyPr wrap="none" rtlCol="0">
-            <a:spAutoFit/>
-          </a:bodyPr>
-          <a:lstStyle/>
-          <a:p>
-            <a:r>
-              <a:rPr lang="fr-FR" b="1" dirty="0">
-                <a:solidFill>
-                  <a:schemeClr val="bg1"/>
-                </a:solidFill>
-                <a:latin typeface="Times New Roman" panose="02020603050405020304" pitchFamily="18" charset="0"/>
-                <a:cs typeface="Times New Roman" panose="02020603050405020304" pitchFamily="18" charset="0"/>
-              </a:rPr>
-              <a:t>Actions</a:t>
-            </a:r>
-            <a:endParaRPr lang="en-GB" b="1" dirty="0">
-              <a:solidFill>
-                <a:schemeClr val="bg1"/>
-              </a:solidFill>
-              <a:latin typeface="Times New Roman" panose="02020603050405020304" pitchFamily="18" charset="0"/>
-              <a:cs typeface="Times New Roman" panose="02020603050405020304" pitchFamily="18" charset="0"/>
-            </a:endParaRPr>
-          </a:p>
-        </p:txBody>
-      </p:sp>
-      <p:sp>
-        <p:nvSpPr>
-          <p:cNvPr id="9" name="ZoneTexte 8">
-            <a:extLst>
-              <a:ext uri="{FF2B5EF4-FFF2-40B4-BE49-F238E27FC236}">
-                <a16:creationId xmlns:a16="http://schemas.microsoft.com/office/drawing/2014/main" id="{BC7F6B83-CFA6-428A-9163-505D9408D6D0}"/>
-              </a:ext>
-            </a:extLst>
-          </p:cNvPr>
-          <p:cNvSpPr txBox="1"/>
-          <p:nvPr/>
-        </p:nvSpPr>
-        <p:spPr>
-          <a:xfrm>
-            <a:off x="5221551" y="4030132"/>
-            <a:ext cx="941283" cy="369332"/>
-          </a:xfrm>
-          <a:prstGeom prst="rect">
-            <a:avLst/>
-          </a:prstGeom>
-          <a:noFill/>
-        </p:spPr>
-        <p:txBody>
-          <a:bodyPr wrap="none" rtlCol="0">
-            <a:spAutoFit/>
-          </a:bodyPr>
-          <a:lstStyle/>
-          <a:p>
-            <a:r>
-              <a:rPr lang="fr-FR" b="1" dirty="0" err="1">
-                <a:solidFill>
-                  <a:srgbClr val="92D050"/>
-                </a:solidFill>
-                <a:latin typeface="Times New Roman" panose="02020603050405020304" pitchFamily="18" charset="0"/>
-                <a:cs typeface="Times New Roman" panose="02020603050405020304" pitchFamily="18" charset="0"/>
-              </a:rPr>
-              <a:t>Sensors</a:t>
-            </a:r>
-            <a:endParaRPr lang="en-GB" b="1" dirty="0">
-              <a:solidFill>
-                <a:srgbClr val="92D050"/>
-              </a:solidFill>
-              <a:latin typeface="Times New Roman" panose="02020603050405020304" pitchFamily="18" charset="0"/>
-              <a:cs typeface="Times New Roman" panose="02020603050405020304" pitchFamily="18" charset="0"/>
-            </a:endParaRPr>
-          </a:p>
-        </p:txBody>
-      </p:sp>
-      <p:sp>
-        <p:nvSpPr>
-          <p:cNvPr id="10" name="ZoneTexte 9">
-            <a:extLst>
-              <a:ext uri="{FF2B5EF4-FFF2-40B4-BE49-F238E27FC236}">
-                <a16:creationId xmlns:a16="http://schemas.microsoft.com/office/drawing/2014/main" id="{9A0D750E-6B64-4F6A-9699-6D981AE0E69F}"/>
-              </a:ext>
-            </a:extLst>
-          </p:cNvPr>
-          <p:cNvSpPr txBox="1"/>
-          <p:nvPr/>
-        </p:nvSpPr>
-        <p:spPr>
-          <a:xfrm>
-            <a:off x="8239377" y="3279624"/>
-            <a:ext cx="1270541" cy="369332"/>
-          </a:xfrm>
-          <a:prstGeom prst="rect">
-            <a:avLst/>
-          </a:prstGeom>
-          <a:noFill/>
-        </p:spPr>
-        <p:txBody>
-          <a:bodyPr wrap="none" rtlCol="0">
-            <a:spAutoFit/>
-          </a:bodyPr>
-          <a:lstStyle/>
-          <a:p>
-            <a:r>
-              <a:rPr lang="fr-FR" b="1" dirty="0">
-                <a:solidFill>
-                  <a:schemeClr val="accent6">
-                    <a:lumMod val="40000"/>
-                    <a:lumOff val="60000"/>
-                  </a:schemeClr>
-                </a:solidFill>
-                <a:latin typeface="Times New Roman" panose="02020603050405020304" pitchFamily="18" charset="0"/>
-                <a:cs typeface="Times New Roman" panose="02020603050405020304" pitchFamily="18" charset="0"/>
-              </a:rPr>
-              <a:t>Ressources</a:t>
-            </a:r>
-            <a:endParaRPr lang="en-GB" b="1" dirty="0">
-              <a:solidFill>
-                <a:schemeClr val="accent6">
-                  <a:lumMod val="40000"/>
-                  <a:lumOff val="60000"/>
-                </a:schemeClr>
-              </a:solidFill>
-              <a:latin typeface="Times New Roman" panose="02020603050405020304" pitchFamily="18" charset="0"/>
-              <a:cs typeface="Times New Roman" panose="02020603050405020304" pitchFamily="18" charset="0"/>
-            </a:endParaRPr>
-          </a:p>
-        </p:txBody>
-      </p:sp>
-      <p:pic>
-        <p:nvPicPr>
-          <p:cNvPr id="12" name="Image 11">
-            <a:extLst>
-              <a:ext uri="{FF2B5EF4-FFF2-40B4-BE49-F238E27FC236}">
-                <a16:creationId xmlns:a16="http://schemas.microsoft.com/office/drawing/2014/main" id="{460BFFBA-E30E-4BA2-B5A0-8B77D3024A79}"/>
-              </a:ext>
-            </a:extLst>
-          </p:cNvPr>
-          <p:cNvPicPr>
-            <a:picLocks noChangeAspect="1"/>
-          </p:cNvPicPr>
-          <p:nvPr/>
-        </p:nvPicPr>
-        <p:blipFill>
-          <a:blip r:embed="rId3"/>
-          <a:stretch>
-            <a:fillRect/>
-          </a:stretch>
-        </p:blipFill>
-        <p:spPr>
-          <a:xfrm>
-            <a:off x="4979375" y="218769"/>
-            <a:ext cx="1333500" cy="619125"/>
-          </a:xfrm>
-          <a:prstGeom prst="rect">
-            <a:avLst/>
-          </a:prstGeom>
-        </p:spPr>
-      </p:pic>
-      <p:pic>
-        <p:nvPicPr>
-          <p:cNvPr id="13" name="Image 12">
-            <a:extLst>
-              <a:ext uri="{FF2B5EF4-FFF2-40B4-BE49-F238E27FC236}">
-                <a16:creationId xmlns:a16="http://schemas.microsoft.com/office/drawing/2014/main" id="{26956F3D-9551-4FC1-8071-92FE32D0ABE2}"/>
-              </a:ext>
-            </a:extLst>
-          </p:cNvPr>
-          <p:cNvPicPr>
-            <a:picLocks noChangeAspect="1"/>
-          </p:cNvPicPr>
-          <p:nvPr/>
-        </p:nvPicPr>
-        <p:blipFill>
-          <a:blip r:embed="rId4"/>
-          <a:stretch>
-            <a:fillRect/>
-          </a:stretch>
-        </p:blipFill>
-        <p:spPr>
-          <a:xfrm>
-            <a:off x="2102807" y="2514600"/>
-            <a:ext cx="1323975" cy="609600"/>
-          </a:xfrm>
-          <a:prstGeom prst="rect">
-            <a:avLst/>
-          </a:prstGeom>
-        </p:spPr>
-      </p:pic>
-      <p:pic>
-        <p:nvPicPr>
-          <p:cNvPr id="15" name="Image 14">
-            <a:extLst>
-              <a:ext uri="{FF2B5EF4-FFF2-40B4-BE49-F238E27FC236}">
-                <a16:creationId xmlns:a16="http://schemas.microsoft.com/office/drawing/2014/main" id="{492195D9-84DC-4159-939B-CED361C5BBCD}"/>
-              </a:ext>
-            </a:extLst>
-          </p:cNvPr>
-          <p:cNvPicPr>
-            <a:picLocks noChangeAspect="1"/>
-          </p:cNvPicPr>
-          <p:nvPr/>
-        </p:nvPicPr>
-        <p:blipFill>
-          <a:blip r:embed="rId5"/>
-          <a:stretch>
-            <a:fillRect/>
-          </a:stretch>
-        </p:blipFill>
-        <p:spPr>
-          <a:xfrm>
-            <a:off x="4235704" y="3279623"/>
-            <a:ext cx="1314450" cy="600075"/>
-          </a:xfrm>
-          <a:prstGeom prst="rect">
-            <a:avLst/>
-          </a:prstGeom>
-        </p:spPr>
-      </p:pic>
-      <p:pic>
-        <p:nvPicPr>
-          <p:cNvPr id="3" name="Image 2">
-            <a:extLst>
-              <a:ext uri="{FF2B5EF4-FFF2-40B4-BE49-F238E27FC236}">
-                <a16:creationId xmlns:a16="http://schemas.microsoft.com/office/drawing/2014/main" id="{4D792693-4505-4101-BD7F-57D56B4C40E6}"/>
-              </a:ext>
-            </a:extLst>
-          </p:cNvPr>
-          <p:cNvPicPr>
-            <a:picLocks noChangeAspect="1"/>
-          </p:cNvPicPr>
-          <p:nvPr/>
-        </p:nvPicPr>
-        <p:blipFill>
-          <a:blip r:embed="rId6"/>
-          <a:stretch>
-            <a:fillRect/>
-          </a:stretch>
-        </p:blipFill>
-        <p:spPr>
-          <a:xfrm>
-            <a:off x="5832925" y="3279624"/>
-            <a:ext cx="1314450" cy="600075"/>
-          </a:xfrm>
-          <a:prstGeom prst="rect">
-            <a:avLst/>
-          </a:prstGeom>
-        </p:spPr>
-      </p:pic>
-    </p:spTree>
-    <p:extLst>
-      <p:ext uri="{BB962C8B-B14F-4D97-AF65-F5344CB8AC3E}">
-        <p14:creationId xmlns:p14="http://schemas.microsoft.com/office/powerpoint/2010/main" val="2112816624"/>
-      </p:ext>
-    </p:extLst>
-  </p:cSld>
-  <p:clrMapOvr>
-    <a:masterClrMapping/>
-  </p:clrMapOvr>
-</p:sld>
-</file>
-
 <file path=ppt/slides/slide2.xml><?xml version="1.0" encoding="utf-8"?>
 <p:sld xmlns:a="http://schemas.openxmlformats.org/drawingml/2006/main" xmlns:r="http://schemas.openxmlformats.org/officeDocument/2006/relationships" xmlns:p="http://schemas.openxmlformats.org/presentationml/2006/main">
   <p:cSld>
@@ -15765,6 +15404,547 @@
           <p:cNvPr id="2" name="Titre 1">
             <a:extLst>
               <a:ext uri="{FF2B5EF4-FFF2-40B4-BE49-F238E27FC236}">
+                <a16:creationId xmlns:a16="http://schemas.microsoft.com/office/drawing/2014/main" id="{C3A47323-C1D5-4FF9-968A-64ABFA3C1E18}"/>
+              </a:ext>
+            </a:extLst>
+          </p:cNvPr>
+          <p:cNvSpPr>
+            <a:spLocks noGrp="1"/>
+          </p:cNvSpPr>
+          <p:nvPr>
+            <p:ph type="title"/>
+          </p:nvPr>
+        </p:nvSpPr>
+        <p:spPr/>
+        <p:txBody>
+          <a:bodyPr/>
+          <a:lstStyle/>
+          <a:p>
+            <a:r>
+              <a:rPr lang="fr-FR" dirty="0"/>
+              <a:t>Annexe</a:t>
+            </a:r>
+            <a:endParaRPr lang="en-GB" dirty="0"/>
+          </a:p>
+        </p:txBody>
+      </p:sp>
+      <p:pic>
+        <p:nvPicPr>
+          <p:cNvPr id="16" name="Espace réservé du contenu 15">
+            <a:extLst>
+              <a:ext uri="{FF2B5EF4-FFF2-40B4-BE49-F238E27FC236}">
+                <a16:creationId xmlns:a16="http://schemas.microsoft.com/office/drawing/2014/main" id="{B2C4B2A4-24E6-4EA7-8EF4-F1B0389A247E}"/>
+              </a:ext>
+            </a:extLst>
+          </p:cNvPr>
+          <p:cNvPicPr>
+            <a:picLocks noGrp="1" noChangeAspect="1"/>
+          </p:cNvPicPr>
+          <p:nvPr>
+            <p:ph idx="1"/>
+          </p:nvPr>
+        </p:nvPicPr>
+        <p:blipFill>
+          <a:blip r:embed="rId2"/>
+          <a:stretch>
+            <a:fillRect/>
+          </a:stretch>
+        </p:blipFill>
+        <p:spPr>
+          <a:xfrm>
+            <a:off x="7839108" y="2560399"/>
+            <a:ext cx="1314450" cy="600075"/>
+          </a:xfrm>
+          <a:prstGeom prst="rect">
+            <a:avLst/>
+          </a:prstGeom>
+        </p:spPr>
+      </p:pic>
+      <p:sp>
+        <p:nvSpPr>
+          <p:cNvPr id="4" name="ZoneTexte 3">
+            <a:extLst>
+              <a:ext uri="{FF2B5EF4-FFF2-40B4-BE49-F238E27FC236}">
+                <a16:creationId xmlns:a16="http://schemas.microsoft.com/office/drawing/2014/main" id="{308043D7-F2FD-4D07-9420-385AA37319FD}"/>
+              </a:ext>
+            </a:extLst>
+          </p:cNvPr>
+          <p:cNvSpPr txBox="1"/>
+          <p:nvPr/>
+        </p:nvSpPr>
+        <p:spPr>
+          <a:xfrm>
+            <a:off x="499481" y="348122"/>
+            <a:ext cx="1754006" cy="369332"/>
+          </a:xfrm>
+          <a:prstGeom prst="rect">
+            <a:avLst/>
+          </a:prstGeom>
+          <a:noFill/>
+        </p:spPr>
+        <p:txBody>
+          <a:bodyPr wrap="none" rtlCol="0">
+            <a:spAutoFit/>
+          </a:bodyPr>
+          <a:lstStyle/>
+          <a:p>
+            <a:r>
+              <a:rPr lang="fr-FR" dirty="0"/>
+              <a:t>The prototype</a:t>
+            </a:r>
+            <a:endParaRPr lang="en-GB" dirty="0"/>
+          </a:p>
+        </p:txBody>
+      </p:sp>
+      <p:cxnSp>
+        <p:nvCxnSpPr>
+          <p:cNvPr id="5" name="Connecteur droit avec flèche 4">
+            <a:extLst>
+              <a:ext uri="{FF2B5EF4-FFF2-40B4-BE49-F238E27FC236}">
+                <a16:creationId xmlns:a16="http://schemas.microsoft.com/office/drawing/2014/main" id="{76B2BD43-8A32-4F05-90EE-F4CBE6F6B3AC}"/>
+              </a:ext>
+            </a:extLst>
+          </p:cNvPr>
+          <p:cNvCxnSpPr>
+            <a:cxnSpLocks/>
+          </p:cNvCxnSpPr>
+          <p:nvPr/>
+        </p:nvCxnSpPr>
+        <p:spPr>
+          <a:xfrm>
+            <a:off x="6384258" y="989988"/>
+            <a:ext cx="1526233" cy="1340211"/>
+          </a:xfrm>
+          <a:prstGeom prst="straightConnector1">
+            <a:avLst/>
+          </a:prstGeom>
+          <a:ln w="76200">
+            <a:solidFill>
+              <a:schemeClr val="accent1">
+                <a:lumMod val="60000"/>
+                <a:lumOff val="40000"/>
+                <a:alpha val="60000"/>
+              </a:schemeClr>
+            </a:solidFill>
+            <a:tailEnd type="triangle"/>
+          </a:ln>
+        </p:spPr>
+        <p:style>
+          <a:lnRef idx="1">
+            <a:schemeClr val="accent1"/>
+          </a:lnRef>
+          <a:fillRef idx="0">
+            <a:schemeClr val="accent1"/>
+          </a:fillRef>
+          <a:effectRef idx="0">
+            <a:schemeClr val="accent1"/>
+          </a:effectRef>
+          <a:fontRef idx="minor">
+            <a:schemeClr val="tx1"/>
+          </a:fontRef>
+        </p:style>
+      </p:cxnSp>
+      <p:cxnSp>
+        <p:nvCxnSpPr>
+          <p:cNvPr id="6" name="Connecteur droit avec flèche 5">
+            <a:extLst>
+              <a:ext uri="{FF2B5EF4-FFF2-40B4-BE49-F238E27FC236}">
+                <a16:creationId xmlns:a16="http://schemas.microsoft.com/office/drawing/2014/main" id="{4FB2FE4C-19EC-481B-8A75-3B52BCC715A8}"/>
+              </a:ext>
+            </a:extLst>
+          </p:cNvPr>
+          <p:cNvCxnSpPr>
+            <a:cxnSpLocks/>
+          </p:cNvCxnSpPr>
+          <p:nvPr/>
+        </p:nvCxnSpPr>
+        <p:spPr>
+          <a:xfrm>
+            <a:off x="5678751" y="1145219"/>
+            <a:ext cx="0" cy="1606626"/>
+          </a:xfrm>
+          <a:prstGeom prst="straightConnector1">
+            <a:avLst/>
+          </a:prstGeom>
+          <a:ln w="76200">
+            <a:solidFill>
+              <a:schemeClr val="accent1">
+                <a:lumMod val="60000"/>
+                <a:lumOff val="40000"/>
+                <a:alpha val="60000"/>
+              </a:schemeClr>
+            </a:solidFill>
+            <a:tailEnd type="triangle"/>
+          </a:ln>
+        </p:spPr>
+        <p:style>
+          <a:lnRef idx="1">
+            <a:schemeClr val="accent1"/>
+          </a:lnRef>
+          <a:fillRef idx="0">
+            <a:schemeClr val="accent1"/>
+          </a:fillRef>
+          <a:effectRef idx="0">
+            <a:schemeClr val="accent1"/>
+          </a:effectRef>
+          <a:fontRef idx="minor">
+            <a:schemeClr val="tx1"/>
+          </a:fontRef>
+        </p:style>
+      </p:cxnSp>
+      <p:cxnSp>
+        <p:nvCxnSpPr>
+          <p:cNvPr id="7" name="Connecteur droit avec flèche 6">
+            <a:extLst>
+              <a:ext uri="{FF2B5EF4-FFF2-40B4-BE49-F238E27FC236}">
+                <a16:creationId xmlns:a16="http://schemas.microsoft.com/office/drawing/2014/main" id="{5B6CFAE7-3CE4-4665-8A62-A74E96029C14}"/>
+              </a:ext>
+            </a:extLst>
+          </p:cNvPr>
+          <p:cNvCxnSpPr>
+            <a:cxnSpLocks/>
+          </p:cNvCxnSpPr>
+          <p:nvPr/>
+        </p:nvCxnSpPr>
+        <p:spPr>
+          <a:xfrm flipH="1">
+            <a:off x="3426782" y="989988"/>
+            <a:ext cx="1617845" cy="1380680"/>
+          </a:xfrm>
+          <a:prstGeom prst="straightConnector1">
+            <a:avLst/>
+          </a:prstGeom>
+          <a:ln w="76200">
+            <a:solidFill>
+              <a:schemeClr val="accent1">
+                <a:lumMod val="60000"/>
+                <a:lumOff val="40000"/>
+                <a:alpha val="60000"/>
+              </a:schemeClr>
+            </a:solidFill>
+            <a:tailEnd type="triangle"/>
+          </a:ln>
+        </p:spPr>
+        <p:style>
+          <a:lnRef idx="1">
+            <a:schemeClr val="accent1"/>
+          </a:lnRef>
+          <a:fillRef idx="0">
+            <a:schemeClr val="accent1"/>
+          </a:fillRef>
+          <a:effectRef idx="0">
+            <a:schemeClr val="accent1"/>
+          </a:effectRef>
+          <a:fontRef idx="minor">
+            <a:schemeClr val="tx1"/>
+          </a:fontRef>
+        </p:style>
+      </p:cxnSp>
+      <p:sp>
+        <p:nvSpPr>
+          <p:cNvPr id="8" name="ZoneTexte 7">
+            <a:extLst>
+              <a:ext uri="{FF2B5EF4-FFF2-40B4-BE49-F238E27FC236}">
+                <a16:creationId xmlns:a16="http://schemas.microsoft.com/office/drawing/2014/main" id="{9035EBA5-A191-4017-9BC3-68668EEEC5A6}"/>
+              </a:ext>
+            </a:extLst>
+          </p:cNvPr>
+          <p:cNvSpPr txBox="1"/>
+          <p:nvPr/>
+        </p:nvSpPr>
+        <p:spPr>
+          <a:xfrm>
+            <a:off x="2077435" y="3279624"/>
+            <a:ext cx="928459" cy="369332"/>
+          </a:xfrm>
+          <a:prstGeom prst="rect">
+            <a:avLst/>
+          </a:prstGeom>
+          <a:noFill/>
+        </p:spPr>
+        <p:txBody>
+          <a:bodyPr wrap="none" rtlCol="0">
+            <a:spAutoFit/>
+          </a:bodyPr>
+          <a:lstStyle/>
+          <a:p>
+            <a:r>
+              <a:rPr lang="fr-FR" b="1" dirty="0">
+                <a:solidFill>
+                  <a:schemeClr val="bg1"/>
+                </a:solidFill>
+                <a:latin typeface="Times New Roman" panose="02020603050405020304" pitchFamily="18" charset="0"/>
+                <a:cs typeface="Times New Roman" panose="02020603050405020304" pitchFamily="18" charset="0"/>
+              </a:rPr>
+              <a:t>Actions</a:t>
+            </a:r>
+            <a:endParaRPr lang="en-GB" b="1" dirty="0">
+              <a:solidFill>
+                <a:schemeClr val="bg1"/>
+              </a:solidFill>
+              <a:latin typeface="Times New Roman" panose="02020603050405020304" pitchFamily="18" charset="0"/>
+              <a:cs typeface="Times New Roman" panose="02020603050405020304" pitchFamily="18" charset="0"/>
+            </a:endParaRPr>
+          </a:p>
+        </p:txBody>
+      </p:sp>
+      <p:sp>
+        <p:nvSpPr>
+          <p:cNvPr id="9" name="ZoneTexte 8">
+            <a:extLst>
+              <a:ext uri="{FF2B5EF4-FFF2-40B4-BE49-F238E27FC236}">
+                <a16:creationId xmlns:a16="http://schemas.microsoft.com/office/drawing/2014/main" id="{BC7F6B83-CFA6-428A-9163-505D9408D6D0}"/>
+              </a:ext>
+            </a:extLst>
+          </p:cNvPr>
+          <p:cNvSpPr txBox="1"/>
+          <p:nvPr/>
+        </p:nvSpPr>
+        <p:spPr>
+          <a:xfrm>
+            <a:off x="5221551" y="4030132"/>
+            <a:ext cx="941283" cy="369332"/>
+          </a:xfrm>
+          <a:prstGeom prst="rect">
+            <a:avLst/>
+          </a:prstGeom>
+          <a:noFill/>
+        </p:spPr>
+        <p:txBody>
+          <a:bodyPr wrap="none" rtlCol="0">
+            <a:spAutoFit/>
+          </a:bodyPr>
+          <a:lstStyle/>
+          <a:p>
+            <a:r>
+              <a:rPr lang="fr-FR" b="1" dirty="0" err="1">
+                <a:solidFill>
+                  <a:srgbClr val="92D050"/>
+                </a:solidFill>
+                <a:latin typeface="Times New Roman" panose="02020603050405020304" pitchFamily="18" charset="0"/>
+                <a:cs typeface="Times New Roman" panose="02020603050405020304" pitchFamily="18" charset="0"/>
+              </a:rPr>
+              <a:t>Sensors</a:t>
+            </a:r>
+            <a:endParaRPr lang="en-GB" b="1" dirty="0">
+              <a:solidFill>
+                <a:srgbClr val="92D050"/>
+              </a:solidFill>
+              <a:latin typeface="Times New Roman" panose="02020603050405020304" pitchFamily="18" charset="0"/>
+              <a:cs typeface="Times New Roman" panose="02020603050405020304" pitchFamily="18" charset="0"/>
+            </a:endParaRPr>
+          </a:p>
+        </p:txBody>
+      </p:sp>
+      <p:sp>
+        <p:nvSpPr>
+          <p:cNvPr id="10" name="ZoneTexte 9">
+            <a:extLst>
+              <a:ext uri="{FF2B5EF4-FFF2-40B4-BE49-F238E27FC236}">
+                <a16:creationId xmlns:a16="http://schemas.microsoft.com/office/drawing/2014/main" id="{9A0D750E-6B64-4F6A-9699-6D981AE0E69F}"/>
+              </a:ext>
+            </a:extLst>
+          </p:cNvPr>
+          <p:cNvSpPr txBox="1"/>
+          <p:nvPr/>
+        </p:nvSpPr>
+        <p:spPr>
+          <a:xfrm>
+            <a:off x="8239377" y="3279624"/>
+            <a:ext cx="1270541" cy="369332"/>
+          </a:xfrm>
+          <a:prstGeom prst="rect">
+            <a:avLst/>
+          </a:prstGeom>
+          <a:noFill/>
+        </p:spPr>
+        <p:txBody>
+          <a:bodyPr wrap="none" rtlCol="0">
+            <a:spAutoFit/>
+          </a:bodyPr>
+          <a:lstStyle/>
+          <a:p>
+            <a:r>
+              <a:rPr lang="fr-FR" b="1" dirty="0">
+                <a:solidFill>
+                  <a:schemeClr val="accent6">
+                    <a:lumMod val="40000"/>
+                    <a:lumOff val="60000"/>
+                  </a:schemeClr>
+                </a:solidFill>
+                <a:latin typeface="Times New Roman" panose="02020603050405020304" pitchFamily="18" charset="0"/>
+                <a:cs typeface="Times New Roman" panose="02020603050405020304" pitchFamily="18" charset="0"/>
+              </a:rPr>
+              <a:t>Ressources</a:t>
+            </a:r>
+            <a:endParaRPr lang="en-GB" b="1" dirty="0">
+              <a:solidFill>
+                <a:schemeClr val="accent6">
+                  <a:lumMod val="40000"/>
+                  <a:lumOff val="60000"/>
+                </a:schemeClr>
+              </a:solidFill>
+              <a:latin typeface="Times New Roman" panose="02020603050405020304" pitchFamily="18" charset="0"/>
+              <a:cs typeface="Times New Roman" panose="02020603050405020304" pitchFamily="18" charset="0"/>
+            </a:endParaRPr>
+          </a:p>
+        </p:txBody>
+      </p:sp>
+      <p:pic>
+        <p:nvPicPr>
+          <p:cNvPr id="12" name="Image 11">
+            <a:extLst>
+              <a:ext uri="{FF2B5EF4-FFF2-40B4-BE49-F238E27FC236}">
+                <a16:creationId xmlns:a16="http://schemas.microsoft.com/office/drawing/2014/main" id="{460BFFBA-E30E-4BA2-B5A0-8B77D3024A79}"/>
+              </a:ext>
+            </a:extLst>
+          </p:cNvPr>
+          <p:cNvPicPr>
+            <a:picLocks noChangeAspect="1"/>
+          </p:cNvPicPr>
+          <p:nvPr/>
+        </p:nvPicPr>
+        <p:blipFill>
+          <a:blip r:embed="rId3"/>
+          <a:stretch>
+            <a:fillRect/>
+          </a:stretch>
+        </p:blipFill>
+        <p:spPr>
+          <a:xfrm>
+            <a:off x="4979375" y="218769"/>
+            <a:ext cx="1333500" cy="619125"/>
+          </a:xfrm>
+          <a:prstGeom prst="rect">
+            <a:avLst/>
+          </a:prstGeom>
+        </p:spPr>
+      </p:pic>
+      <p:pic>
+        <p:nvPicPr>
+          <p:cNvPr id="13" name="Image 12">
+            <a:extLst>
+              <a:ext uri="{FF2B5EF4-FFF2-40B4-BE49-F238E27FC236}">
+                <a16:creationId xmlns:a16="http://schemas.microsoft.com/office/drawing/2014/main" id="{26956F3D-9551-4FC1-8071-92FE32D0ABE2}"/>
+              </a:ext>
+            </a:extLst>
+          </p:cNvPr>
+          <p:cNvPicPr>
+            <a:picLocks noChangeAspect="1"/>
+          </p:cNvPicPr>
+          <p:nvPr/>
+        </p:nvPicPr>
+        <p:blipFill>
+          <a:blip r:embed="rId4"/>
+          <a:stretch>
+            <a:fillRect/>
+          </a:stretch>
+        </p:blipFill>
+        <p:spPr>
+          <a:xfrm>
+            <a:off x="2102807" y="2514600"/>
+            <a:ext cx="1323975" cy="609600"/>
+          </a:xfrm>
+          <a:prstGeom prst="rect">
+            <a:avLst/>
+          </a:prstGeom>
+        </p:spPr>
+      </p:pic>
+      <p:pic>
+        <p:nvPicPr>
+          <p:cNvPr id="15" name="Image 14">
+            <a:extLst>
+              <a:ext uri="{FF2B5EF4-FFF2-40B4-BE49-F238E27FC236}">
+                <a16:creationId xmlns:a16="http://schemas.microsoft.com/office/drawing/2014/main" id="{492195D9-84DC-4159-939B-CED361C5BBCD}"/>
+              </a:ext>
+            </a:extLst>
+          </p:cNvPr>
+          <p:cNvPicPr>
+            <a:picLocks noChangeAspect="1"/>
+          </p:cNvPicPr>
+          <p:nvPr/>
+        </p:nvPicPr>
+        <p:blipFill>
+          <a:blip r:embed="rId5"/>
+          <a:stretch>
+            <a:fillRect/>
+          </a:stretch>
+        </p:blipFill>
+        <p:spPr>
+          <a:xfrm>
+            <a:off x="4235704" y="3279623"/>
+            <a:ext cx="1314450" cy="600075"/>
+          </a:xfrm>
+          <a:prstGeom prst="rect">
+            <a:avLst/>
+          </a:prstGeom>
+        </p:spPr>
+      </p:pic>
+      <p:pic>
+        <p:nvPicPr>
+          <p:cNvPr id="3" name="Image 2">
+            <a:extLst>
+              <a:ext uri="{FF2B5EF4-FFF2-40B4-BE49-F238E27FC236}">
+                <a16:creationId xmlns:a16="http://schemas.microsoft.com/office/drawing/2014/main" id="{4D792693-4505-4101-BD7F-57D56B4C40E6}"/>
+              </a:ext>
+            </a:extLst>
+          </p:cNvPr>
+          <p:cNvPicPr>
+            <a:picLocks noChangeAspect="1"/>
+          </p:cNvPicPr>
+          <p:nvPr/>
+        </p:nvPicPr>
+        <p:blipFill>
+          <a:blip r:embed="rId6"/>
+          <a:stretch>
+            <a:fillRect/>
+          </a:stretch>
+        </p:blipFill>
+        <p:spPr>
+          <a:xfrm>
+            <a:off x="5832925" y="3279624"/>
+            <a:ext cx="1314450" cy="600075"/>
+          </a:xfrm>
+          <a:prstGeom prst="rect">
+            <a:avLst/>
+          </a:prstGeom>
+        </p:spPr>
+      </p:pic>
+    </p:spTree>
+    <p:extLst>
+      <p:ext uri="{BB962C8B-B14F-4D97-AF65-F5344CB8AC3E}">
+        <p14:creationId xmlns:p14="http://schemas.microsoft.com/office/powerpoint/2010/main" val="2112816624"/>
+      </p:ext>
+    </p:extLst>
+  </p:cSld>
+  <p:clrMapOvr>
+    <a:masterClrMapping/>
+  </p:clrMapOvr>
+</p:sld>
+</file>
+
+<file path=ppt/slides/slide21.xml><?xml version="1.0" encoding="utf-8"?>
+<p:sld xmlns:a="http://schemas.openxmlformats.org/drawingml/2006/main" xmlns:r="http://schemas.openxmlformats.org/officeDocument/2006/relationships" xmlns:p="http://schemas.openxmlformats.org/presentationml/2006/main">
+  <p:cSld>
+    <p:spTree>
+      <p:nvGrpSpPr>
+        <p:cNvPr id="1" name=""/>
+        <p:cNvGrpSpPr/>
+        <p:nvPr/>
+      </p:nvGrpSpPr>
+      <p:grpSpPr>
+        <a:xfrm>
+          <a:off x="0" y="0"/>
+          <a:ext cx="0" cy="0"/>
+          <a:chOff x="0" y="0"/>
+          <a:chExt cx="0" cy="0"/>
+        </a:xfrm>
+      </p:grpSpPr>
+      <p:sp>
+        <p:nvSpPr>
+          <p:cNvPr id="2" name="Titre 1">
+            <a:extLst>
+              <a:ext uri="{FF2B5EF4-FFF2-40B4-BE49-F238E27FC236}">
                 <a16:creationId xmlns:a16="http://schemas.microsoft.com/office/drawing/2014/main" id="{60A45B33-4349-4205-A596-A72ABD8F0A69}"/>
               </a:ext>
             </a:extLst>

</xml_diff>

<commit_message>
#12 Strategy learning added on slides
</commit_message>
<xml_diff>
--- a/SAI_presentation.pptx
+++ b/SAI_presentation.pptx
@@ -20,12 +20,13 @@
     <p:sldId id="274" r:id="rId14"/>
     <p:sldId id="275" r:id="rId15"/>
     <p:sldId id="276" r:id="rId16"/>
-    <p:sldId id="260" r:id="rId17"/>
-    <p:sldId id="261" r:id="rId18"/>
-    <p:sldId id="265" r:id="rId19"/>
-    <p:sldId id="262" r:id="rId20"/>
-    <p:sldId id="264" r:id="rId21"/>
-    <p:sldId id="263" r:id="rId22"/>
+    <p:sldId id="277" r:id="rId17"/>
+    <p:sldId id="260" r:id="rId18"/>
+    <p:sldId id="261" r:id="rId19"/>
+    <p:sldId id="265" r:id="rId20"/>
+    <p:sldId id="262" r:id="rId21"/>
+    <p:sldId id="264" r:id="rId22"/>
+    <p:sldId id="263" r:id="rId23"/>
   </p:sldIdLst>
   <p:sldSz cx="12192000" cy="6858000"/>
   <p:notesSz cx="6858000" cy="9144000"/>
@@ -13679,6 +13680,188 @@
           <p:cNvPr id="2" name="Titre 1">
             <a:extLst>
               <a:ext uri="{FF2B5EF4-FFF2-40B4-BE49-F238E27FC236}">
+                <a16:creationId xmlns:a16="http://schemas.microsoft.com/office/drawing/2014/main" id="{089CF4B4-AB53-4D2D-828B-D4BAF1BD4348}"/>
+              </a:ext>
+            </a:extLst>
+          </p:cNvPr>
+          <p:cNvSpPr>
+            <a:spLocks noGrp="1"/>
+          </p:cNvSpPr>
+          <p:nvPr>
+            <p:ph type="title"/>
+          </p:nvPr>
+        </p:nvSpPr>
+        <p:spPr/>
+        <p:txBody>
+          <a:bodyPr/>
+          <a:lstStyle/>
+          <a:p>
+            <a:r>
+              <a:rPr lang="fr-FR" dirty="0" err="1"/>
+              <a:t>Strategy</a:t>
+            </a:r>
+            <a:r>
+              <a:rPr lang="fr-FR" dirty="0"/>
+              <a:t> </a:t>
+            </a:r>
+            <a:r>
+              <a:rPr lang="fr-FR" dirty="0" err="1"/>
+              <a:t>learning</a:t>
+            </a:r>
+            <a:endParaRPr lang="en-GB" dirty="0"/>
+          </a:p>
+        </p:txBody>
+      </p:sp>
+      <p:sp>
+        <p:nvSpPr>
+          <p:cNvPr id="3" name="Espace réservé du contenu 2">
+            <a:extLst>
+              <a:ext uri="{FF2B5EF4-FFF2-40B4-BE49-F238E27FC236}">
+                <a16:creationId xmlns:a16="http://schemas.microsoft.com/office/drawing/2014/main" id="{F93A2F86-BF71-4592-BA0E-8194E747B9CE}"/>
+              </a:ext>
+            </a:extLst>
+          </p:cNvPr>
+          <p:cNvSpPr>
+            <a:spLocks noGrp="1"/>
+          </p:cNvSpPr>
+          <p:nvPr>
+            <p:ph idx="1"/>
+          </p:nvPr>
+        </p:nvSpPr>
+        <p:spPr/>
+        <p:txBody>
+          <a:bodyPr/>
+          <a:lstStyle/>
+          <a:p>
+            <a:r>
+              <a:rPr lang="fr-FR" dirty="0"/>
+              <a:t>The web page </a:t>
+            </a:r>
+            <a:r>
+              <a:rPr lang="fr-FR" dirty="0" err="1"/>
+              <a:t>will</a:t>
+            </a:r>
+            <a:r>
+              <a:rPr lang="fr-FR" dirty="0"/>
+              <a:t> </a:t>
+            </a:r>
+            <a:r>
+              <a:rPr lang="fr-FR" dirty="0" err="1"/>
+              <a:t>allow</a:t>
+            </a:r>
+            <a:r>
+              <a:rPr lang="fr-FR" dirty="0"/>
+              <a:t> the user to </a:t>
+            </a:r>
+            <a:r>
+              <a:rPr lang="fr-FR" dirty="0" err="1"/>
+              <a:t>choose</a:t>
+            </a:r>
+            <a:r>
+              <a:rPr lang="fr-FR" dirty="0"/>
+              <a:t> the best </a:t>
+            </a:r>
+            <a:r>
+              <a:rPr lang="fr-FR" dirty="0" err="1"/>
+              <a:t>way</a:t>
+            </a:r>
+            <a:r>
+              <a:rPr lang="fr-FR" dirty="0"/>
+              <a:t> SAI </a:t>
+            </a:r>
+            <a:r>
+              <a:rPr lang="fr-FR" dirty="0" err="1"/>
+              <a:t>will</a:t>
+            </a:r>
+            <a:r>
+              <a:rPr lang="fr-FR" dirty="0"/>
+              <a:t> </a:t>
+            </a:r>
+            <a:r>
+              <a:rPr lang="fr-FR" dirty="0" err="1"/>
+              <a:t>understand</a:t>
+            </a:r>
+            <a:r>
+              <a:rPr lang="fr-FR" dirty="0"/>
+              <a:t> how </a:t>
+            </a:r>
+            <a:r>
+              <a:rPr lang="fr-FR" dirty="0" err="1"/>
+              <a:t>it</a:t>
+            </a:r>
+            <a:r>
+              <a:rPr lang="fr-FR" dirty="0"/>
+              <a:t> </a:t>
+            </a:r>
+            <a:r>
+              <a:rPr lang="fr-FR" dirty="0" err="1"/>
+              <a:t>needs</a:t>
+            </a:r>
+            <a:r>
+              <a:rPr lang="fr-FR" dirty="0"/>
+              <a:t> to do</a:t>
+            </a:r>
+          </a:p>
+          <a:p>
+            <a:r>
+              <a:rPr lang="fr-FR" dirty="0" err="1"/>
+              <a:t>Explain</a:t>
+            </a:r>
+            <a:r>
+              <a:rPr lang="fr-FR" dirty="0"/>
+              <a:t> </a:t>
+            </a:r>
+            <a:r>
+              <a:rPr lang="fr-FR" dirty="0" err="1"/>
+              <a:t>with</a:t>
+            </a:r>
+            <a:r>
+              <a:rPr lang="fr-FR" dirty="0"/>
+              <a:t> a </a:t>
+            </a:r>
+            <a:r>
+              <a:rPr lang="fr-FR"/>
+              <a:t>schema</a:t>
+            </a:r>
+            <a:endParaRPr lang="en-GB"/>
+          </a:p>
+        </p:txBody>
+      </p:sp>
+    </p:spTree>
+    <p:extLst>
+      <p:ext uri="{BB962C8B-B14F-4D97-AF65-F5344CB8AC3E}">
+        <p14:creationId xmlns:p14="http://schemas.microsoft.com/office/powerpoint/2010/main" val="3361873828"/>
+      </p:ext>
+    </p:extLst>
+  </p:cSld>
+  <p:clrMapOvr>
+    <a:masterClrMapping/>
+  </p:clrMapOvr>
+</p:sld>
+</file>
+
+<file path=ppt/slides/slide17.xml><?xml version="1.0" encoding="utf-8"?>
+<p:sld xmlns:a="http://schemas.openxmlformats.org/drawingml/2006/main" xmlns:r="http://schemas.openxmlformats.org/officeDocument/2006/relationships" xmlns:p="http://schemas.openxmlformats.org/presentationml/2006/main">
+  <p:cSld>
+    <p:spTree>
+      <p:nvGrpSpPr>
+        <p:cNvPr id="1" name=""/>
+        <p:cNvGrpSpPr/>
+        <p:nvPr/>
+      </p:nvGrpSpPr>
+      <p:grpSpPr>
+        <a:xfrm>
+          <a:off x="0" y="0"/>
+          <a:ext cx="0" cy="0"/>
+          <a:chOff x="0" y="0"/>
+          <a:chExt cx="0" cy="0"/>
+        </a:xfrm>
+      </p:grpSpPr>
+      <p:sp>
+        <p:nvSpPr>
+          <p:cNvPr id="2" name="Titre 1">
+            <a:extLst>
+              <a:ext uri="{FF2B5EF4-FFF2-40B4-BE49-F238E27FC236}">
                 <a16:creationId xmlns:a16="http://schemas.microsoft.com/office/drawing/2014/main" id="{643ACCC2-1572-47D7-9E8E-170E100F9348}"/>
               </a:ext>
             </a:extLst>
@@ -13751,7 +13934,7 @@
 </p:sld>
 </file>
 
-<file path=ppt/slides/slide17.xml><?xml version="1.0" encoding="utf-8"?>
+<file path=ppt/slides/slide18.xml><?xml version="1.0" encoding="utf-8"?>
 <p:sld xmlns:a="http://schemas.openxmlformats.org/drawingml/2006/main" xmlns:r="http://schemas.openxmlformats.org/officeDocument/2006/relationships" xmlns:p="http://schemas.openxmlformats.org/presentationml/2006/main">
   <p:cSld>
     <p:bg>
@@ -13873,7 +14056,7 @@
 </p:sld>
 </file>
 
-<file path=ppt/slides/slide18.xml><?xml version="1.0" encoding="utf-8"?>
+<file path=ppt/slides/slide19.xml><?xml version="1.0" encoding="utf-8"?>
 <p:sld xmlns:a="http://schemas.openxmlformats.org/drawingml/2006/main" xmlns:r="http://schemas.openxmlformats.org/officeDocument/2006/relationships" xmlns:p="http://schemas.openxmlformats.org/presentationml/2006/main">
   <p:cSld>
     <p:spTree>
@@ -14066,7 +14249,570 @@
 </p:sld>
 </file>
 
-<file path=ppt/slides/slide19.xml><?xml version="1.0" encoding="utf-8"?>
+<file path=ppt/slides/slide2.xml><?xml version="1.0" encoding="utf-8"?>
+<p:sld xmlns:a="http://schemas.openxmlformats.org/drawingml/2006/main" xmlns:r="http://schemas.openxmlformats.org/officeDocument/2006/relationships" xmlns:p="http://schemas.openxmlformats.org/presentationml/2006/main">
+  <p:cSld>
+    <p:bg>
+      <p:bgPr>
+        <a:gradFill rotWithShape="1">
+          <a:gsLst>
+            <a:gs pos="0">
+              <a:schemeClr val="bg2">
+                <a:tint val="97000"/>
+                <a:hueMod val="92000"/>
+                <a:satMod val="169000"/>
+                <a:lumMod val="164000"/>
+              </a:schemeClr>
+            </a:gs>
+            <a:gs pos="100000">
+              <a:schemeClr val="bg2">
+                <a:shade val="96000"/>
+                <a:satMod val="120000"/>
+                <a:lumMod val="90000"/>
+              </a:schemeClr>
+            </a:gs>
+          </a:gsLst>
+          <a:path path="circle">
+            <a:fillToRect b="100000"/>
+          </a:path>
+        </a:gradFill>
+        <a:effectLst/>
+      </p:bgPr>
+    </p:bg>
+    <p:spTree>
+      <p:nvGrpSpPr>
+        <p:cNvPr id="1" name=""/>
+        <p:cNvGrpSpPr/>
+        <p:nvPr/>
+      </p:nvGrpSpPr>
+      <p:grpSpPr>
+        <a:xfrm>
+          <a:off x="0" y="0"/>
+          <a:ext cx="0" cy="0"/>
+          <a:chOff x="0" y="0"/>
+          <a:chExt cx="0" cy="0"/>
+        </a:xfrm>
+      </p:grpSpPr>
+      <p:sp>
+        <p:nvSpPr>
+          <p:cNvPr id="10" name="Rectangle 9">
+            <a:extLst>
+              <a:ext uri="{FF2B5EF4-FFF2-40B4-BE49-F238E27FC236}">
+                <a16:creationId xmlns:a16="http://schemas.microsoft.com/office/drawing/2014/main" id="{2C33F367-76E5-4D2A-96B1-4FD443CDD1CF}"/>
+              </a:ext>
+              <a:ext uri="{C183D7F6-B498-43B3-948B-1728B52AA6E4}">
+                <adec:decorative xmlns:adec="http://schemas.microsoft.com/office/drawing/2017/decorative" val="1"/>
+              </a:ext>
+            </a:extLst>
+          </p:cNvPr>
+          <p:cNvSpPr>
+            <a:spLocks noGrp="1" noRot="1" noChangeAspect="1" noMove="1" noResize="1" noEditPoints="1" noAdjustHandles="1" noChangeArrowheads="1" noChangeShapeType="1" noTextEdit="1"/>
+          </p:cNvSpPr>
+          <p:nvPr>
+            <p:extLst>
+              <p:ext uri="{386F3935-93C4-4BCD-93E2-E3B085C9AB24}">
+                <p16:designElem xmlns:p16="http://schemas.microsoft.com/office/powerpoint/2015/main" val="1"/>
+              </p:ext>
+            </p:extLst>
+          </p:nvPr>
+        </p:nvSpPr>
+        <p:spPr>
+          <a:xfrm>
+            <a:off x="0" y="0"/>
+            <a:ext cx="12192000" cy="6858000"/>
+          </a:xfrm>
+          <a:prstGeom prst="rect">
+            <a:avLst/>
+          </a:prstGeom>
+          <a:gradFill>
+            <a:gsLst>
+              <a:gs pos="10000">
+                <a:schemeClr val="dk2">
+                  <a:tint val="97000"/>
+                  <a:hueMod val="92000"/>
+                  <a:satMod val="169000"/>
+                  <a:lumMod val="164000"/>
+                </a:schemeClr>
+              </a:gs>
+              <a:gs pos="100000">
+                <a:schemeClr val="dk2">
+                  <a:shade val="96000"/>
+                  <a:satMod val="120000"/>
+                  <a:lumMod val="90000"/>
+                </a:schemeClr>
+              </a:gs>
+            </a:gsLst>
+            <a:lin ang="6120000" scaled="1"/>
+          </a:gradFill>
+          <a:ln>
+            <a:noFill/>
+          </a:ln>
+        </p:spPr>
+        <p:style>
+          <a:lnRef idx="2">
+            <a:schemeClr val="accent1">
+              <a:shade val="50000"/>
+            </a:schemeClr>
+          </a:lnRef>
+          <a:fillRef idx="1002">
+            <a:schemeClr val="dk2"/>
+          </a:fillRef>
+          <a:effectRef idx="0">
+            <a:schemeClr val="accent1"/>
+          </a:effectRef>
+          <a:fontRef idx="minor">
+            <a:schemeClr val="lt1"/>
+          </a:fontRef>
+        </p:style>
+        <p:txBody>
+          <a:bodyPr rtlCol="0" anchor="ctr"/>
+          <a:lstStyle/>
+          <a:p>
+            <a:pPr algn="ctr"/>
+            <a:endParaRPr lang="en-US"/>
+          </a:p>
+        </p:txBody>
+      </p:sp>
+      <p:sp>
+        <p:nvSpPr>
+          <p:cNvPr id="12" name="Snip Diagonal Corner Rectangle 21">
+            <a:extLst>
+              <a:ext uri="{FF2B5EF4-FFF2-40B4-BE49-F238E27FC236}">
+                <a16:creationId xmlns:a16="http://schemas.microsoft.com/office/drawing/2014/main" id="{6F769419-3E73-449D-B62A-0CDEC946A679}"/>
+              </a:ext>
+              <a:ext uri="{C183D7F6-B498-43B3-948B-1728B52AA6E4}">
+                <adec:decorative xmlns:adec="http://schemas.microsoft.com/office/drawing/2017/decorative" val="1"/>
+              </a:ext>
+            </a:extLst>
+          </p:cNvPr>
+          <p:cNvSpPr>
+            <a:spLocks noGrp="1" noRot="1" noChangeAspect="1" noMove="1" noResize="1" noEditPoints="1" noAdjustHandles="1" noChangeArrowheads="1" noChangeShapeType="1" noTextEdit="1"/>
+          </p:cNvSpPr>
+          <p:nvPr>
+            <p:extLst>
+              <p:ext uri="{386F3935-93C4-4BCD-93E2-E3B085C9AB24}">
+                <p16:designElem xmlns:p16="http://schemas.microsoft.com/office/powerpoint/2015/main" val="1"/>
+              </p:ext>
+            </p:extLst>
+          </p:nvPr>
+        </p:nvSpPr>
+        <p:spPr>
+          <a:xfrm>
+            <a:off x="0" y="-2"/>
+            <a:ext cx="8129873" cy="6858002"/>
+          </a:xfrm>
+          <a:prstGeom prst="snip2DiagRect">
+            <a:avLst>
+              <a:gd name="adj1" fmla="val 0"/>
+              <a:gd name="adj2" fmla="val 0"/>
+            </a:avLst>
+          </a:prstGeom>
+          <a:solidFill>
+            <a:schemeClr val="bg1">
+              <a:alpha val="0"/>
+            </a:schemeClr>
+          </a:solidFill>
+          <a:ln>
+            <a:noFill/>
+          </a:ln>
+          <a:effectLst/>
+        </p:spPr>
+        <p:style>
+          <a:lnRef idx="2">
+            <a:schemeClr val="accent1">
+              <a:shade val="50000"/>
+            </a:schemeClr>
+          </a:lnRef>
+          <a:fillRef idx="1">
+            <a:schemeClr val="accent1"/>
+          </a:fillRef>
+          <a:effectRef idx="0">
+            <a:schemeClr val="accent1"/>
+          </a:effectRef>
+          <a:fontRef idx="minor">
+            <a:schemeClr val="lt1"/>
+          </a:fontRef>
+        </p:style>
+        <p:txBody>
+          <a:bodyPr rtlCol="0" anchor="ctr"/>
+          <a:lstStyle/>
+          <a:p>
+            <a:pPr algn="ctr"/>
+            <a:endParaRPr lang="en-US"/>
+          </a:p>
+        </p:txBody>
+      </p:sp>
+      <p:grpSp>
+        <p:nvGrpSpPr>
+          <p:cNvPr id="14" name="Group 13">
+            <a:extLst>
+              <a:ext uri="{FF2B5EF4-FFF2-40B4-BE49-F238E27FC236}">
+                <a16:creationId xmlns:a16="http://schemas.microsoft.com/office/drawing/2014/main" id="{A6515200-42F9-488F-9895-6CDBCD1E87C8}"/>
+              </a:ext>
+              <a:ext uri="{C183D7F6-B498-43B3-948B-1728B52AA6E4}">
+                <adec:decorative xmlns:adec="http://schemas.microsoft.com/office/drawing/2017/decorative" val="1"/>
+              </a:ext>
+            </a:extLst>
+          </p:cNvPr>
+          <p:cNvGrpSpPr>
+            <a:grpSpLocks noGrp="1" noUngrp="1" noRot="1" noChangeAspect="1" noMove="1" noResize="1"/>
+          </p:cNvGrpSpPr>
+          <p:nvPr>
+            <p:extLst>
+              <p:ext uri="{386F3935-93C4-4BCD-93E2-E3B085C9AB24}">
+                <p16:designElem xmlns:p16="http://schemas.microsoft.com/office/powerpoint/2015/main" val="1"/>
+              </p:ext>
+            </p:extLst>
+          </p:nvPr>
+        </p:nvGrpSpPr>
+        <p:grpSpPr>
+          <a:xfrm>
+            <a:off x="9206969" y="2963333"/>
+            <a:ext cx="2981858" cy="3208867"/>
+            <a:chOff x="9206969" y="2963333"/>
+            <a:chExt cx="2981858" cy="3208867"/>
+          </a:xfrm>
+        </p:grpSpPr>
+        <p:cxnSp>
+          <p:nvCxnSpPr>
+            <p:cNvPr id="15" name="Straight Connector 14">
+              <a:extLst>
+                <a:ext uri="{FF2B5EF4-FFF2-40B4-BE49-F238E27FC236}">
+                  <a16:creationId xmlns:a16="http://schemas.microsoft.com/office/drawing/2014/main" id="{43185F0E-78D5-4C2D-9239-D3515B448837}"/>
+                </a:ext>
+                <a:ext uri="{C183D7F6-B498-43B3-948B-1728B52AA6E4}">
+                  <adec:decorative xmlns:adec="http://schemas.microsoft.com/office/drawing/2017/decorative" val="1"/>
+                </a:ext>
+              </a:extLst>
+            </p:cNvPr>
+            <p:cNvCxnSpPr/>
+            <p:nvPr>
+              <p:extLst>
+                <p:ext uri="{386F3935-93C4-4BCD-93E2-E3B085C9AB24}">
+                  <p16:designElem xmlns:p16="http://schemas.microsoft.com/office/powerpoint/2015/main" val="1"/>
+                </p:ext>
+              </p:extLst>
+            </p:nvPr>
+          </p:nvCxnSpPr>
+          <p:spPr>
+            <a:xfrm flipH="1">
+              <a:off x="11276012" y="2963333"/>
+              <a:ext cx="912814" cy="912812"/>
+            </a:xfrm>
+            <a:prstGeom prst="line">
+              <a:avLst/>
+            </a:prstGeom>
+            <a:ln w="9525">
+              <a:solidFill>
+                <a:srgbClr val="FFFFFF"/>
+              </a:solidFill>
+            </a:ln>
+          </p:spPr>
+          <p:style>
+            <a:lnRef idx="2">
+              <a:schemeClr val="accent1"/>
+            </a:lnRef>
+            <a:fillRef idx="0">
+              <a:schemeClr val="accent1"/>
+            </a:fillRef>
+            <a:effectRef idx="1">
+              <a:schemeClr val="accent1"/>
+            </a:effectRef>
+            <a:fontRef idx="minor">
+              <a:schemeClr val="tx1"/>
+            </a:fontRef>
+          </p:style>
+        </p:cxnSp>
+        <p:cxnSp>
+          <p:nvCxnSpPr>
+            <p:cNvPr id="16" name="Straight Connector 15">
+              <a:extLst>
+                <a:ext uri="{FF2B5EF4-FFF2-40B4-BE49-F238E27FC236}">
+                  <a16:creationId xmlns:a16="http://schemas.microsoft.com/office/drawing/2014/main" id="{D5BD9142-FF9C-4EED-A027-18D095481BB8}"/>
+                </a:ext>
+                <a:ext uri="{C183D7F6-B498-43B3-948B-1728B52AA6E4}">
+                  <adec:decorative xmlns:adec="http://schemas.microsoft.com/office/drawing/2017/decorative" val="1"/>
+                </a:ext>
+              </a:extLst>
+            </p:cNvPr>
+            <p:cNvCxnSpPr/>
+            <p:nvPr>
+              <p:extLst>
+                <p:ext uri="{386F3935-93C4-4BCD-93E2-E3B085C9AB24}">
+                  <p16:designElem xmlns:p16="http://schemas.microsoft.com/office/powerpoint/2015/main" val="1"/>
+                </p:ext>
+              </p:extLst>
+            </p:nvPr>
+          </p:nvCxnSpPr>
+          <p:spPr>
+            <a:xfrm flipH="1">
+              <a:off x="9206969" y="3190344"/>
+              <a:ext cx="2981857" cy="2981856"/>
+            </a:xfrm>
+            <a:prstGeom prst="line">
+              <a:avLst/>
+            </a:prstGeom>
+            <a:ln w="9525">
+              <a:solidFill>
+                <a:srgbClr val="FFFFFF"/>
+              </a:solidFill>
+            </a:ln>
+          </p:spPr>
+          <p:style>
+            <a:lnRef idx="2">
+              <a:schemeClr val="accent1"/>
+            </a:lnRef>
+            <a:fillRef idx="0">
+              <a:schemeClr val="accent1"/>
+            </a:fillRef>
+            <a:effectRef idx="1">
+              <a:schemeClr val="accent1"/>
+            </a:effectRef>
+            <a:fontRef idx="minor">
+              <a:schemeClr val="tx1"/>
+            </a:fontRef>
+          </p:style>
+        </p:cxnSp>
+        <p:cxnSp>
+          <p:nvCxnSpPr>
+            <p:cNvPr id="17" name="Straight Connector 16">
+              <a:extLst>
+                <a:ext uri="{FF2B5EF4-FFF2-40B4-BE49-F238E27FC236}">
+                  <a16:creationId xmlns:a16="http://schemas.microsoft.com/office/drawing/2014/main" id="{42F547D3-9752-4481-B3A8-50E08610B8EC}"/>
+                </a:ext>
+                <a:ext uri="{C183D7F6-B498-43B3-948B-1728B52AA6E4}">
+                  <adec:decorative xmlns:adec="http://schemas.microsoft.com/office/drawing/2017/decorative" val="1"/>
+                </a:ext>
+              </a:extLst>
+            </p:cNvPr>
+            <p:cNvCxnSpPr/>
+            <p:nvPr>
+              <p:extLst>
+                <p:ext uri="{386F3935-93C4-4BCD-93E2-E3B085C9AB24}">
+                  <p16:designElem xmlns:p16="http://schemas.microsoft.com/office/powerpoint/2015/main" val="1"/>
+                </p:ext>
+              </p:extLst>
+            </p:nvPr>
+          </p:nvCxnSpPr>
+          <p:spPr>
+            <a:xfrm flipH="1">
+              <a:off x="10292292" y="3285067"/>
+              <a:ext cx="1896534" cy="1896533"/>
+            </a:xfrm>
+            <a:prstGeom prst="line">
+              <a:avLst/>
+            </a:prstGeom>
+            <a:ln w="9525">
+              <a:solidFill>
+                <a:srgbClr val="FFFFFF"/>
+              </a:solidFill>
+            </a:ln>
+          </p:spPr>
+          <p:style>
+            <a:lnRef idx="2">
+              <a:schemeClr val="accent1"/>
+            </a:lnRef>
+            <a:fillRef idx="0">
+              <a:schemeClr val="accent1"/>
+            </a:fillRef>
+            <a:effectRef idx="1">
+              <a:schemeClr val="accent1"/>
+            </a:effectRef>
+            <a:fontRef idx="minor">
+              <a:schemeClr val="tx1"/>
+            </a:fontRef>
+          </p:style>
+        </p:cxnSp>
+        <p:cxnSp>
+          <p:nvCxnSpPr>
+            <p:cNvPr id="18" name="Straight Connector 17">
+              <a:extLst>
+                <a:ext uri="{FF2B5EF4-FFF2-40B4-BE49-F238E27FC236}">
+                  <a16:creationId xmlns:a16="http://schemas.microsoft.com/office/drawing/2014/main" id="{F1999C2F-3D0D-4813-9696-83630A6FEABD}"/>
+                </a:ext>
+                <a:ext uri="{C183D7F6-B498-43B3-948B-1728B52AA6E4}">
+                  <adec:decorative xmlns:adec="http://schemas.microsoft.com/office/drawing/2017/decorative" val="1"/>
+                </a:ext>
+              </a:extLst>
+            </p:cNvPr>
+            <p:cNvCxnSpPr/>
+            <p:nvPr>
+              <p:extLst>
+                <p:ext uri="{386F3935-93C4-4BCD-93E2-E3B085C9AB24}">
+                  <p16:designElem xmlns:p16="http://schemas.microsoft.com/office/powerpoint/2015/main" val="1"/>
+                </p:ext>
+              </p:extLst>
+            </p:nvPr>
+          </p:nvCxnSpPr>
+          <p:spPr>
+            <a:xfrm flipH="1">
+              <a:off x="10443103" y="3131080"/>
+              <a:ext cx="1745722" cy="1745720"/>
+            </a:xfrm>
+            <a:prstGeom prst="line">
+              <a:avLst/>
+            </a:prstGeom>
+            <a:ln w="28575">
+              <a:solidFill>
+                <a:srgbClr val="FFFFFF"/>
+              </a:solidFill>
+            </a:ln>
+          </p:spPr>
+          <p:style>
+            <a:lnRef idx="2">
+              <a:schemeClr val="accent1"/>
+            </a:lnRef>
+            <a:fillRef idx="0">
+              <a:schemeClr val="accent1"/>
+            </a:fillRef>
+            <a:effectRef idx="1">
+              <a:schemeClr val="accent1"/>
+            </a:effectRef>
+            <a:fontRef idx="minor">
+              <a:schemeClr val="tx1"/>
+            </a:fontRef>
+          </p:style>
+        </p:cxnSp>
+        <p:cxnSp>
+          <p:nvCxnSpPr>
+            <p:cNvPr id="19" name="Straight Connector 18">
+              <a:extLst>
+                <a:ext uri="{FF2B5EF4-FFF2-40B4-BE49-F238E27FC236}">
+                  <a16:creationId xmlns:a16="http://schemas.microsoft.com/office/drawing/2014/main" id="{EC737390-C9CA-456B-9F40-D7A76EA242E7}"/>
+                </a:ext>
+                <a:ext uri="{C183D7F6-B498-43B3-948B-1728B52AA6E4}">
+                  <adec:decorative xmlns:adec="http://schemas.microsoft.com/office/drawing/2017/decorative" val="1"/>
+                </a:ext>
+              </a:extLst>
+            </p:cNvPr>
+            <p:cNvCxnSpPr/>
+            <p:nvPr>
+              <p:extLst>
+                <p:ext uri="{386F3935-93C4-4BCD-93E2-E3B085C9AB24}">
+                  <p16:designElem xmlns:p16="http://schemas.microsoft.com/office/powerpoint/2015/main" val="1"/>
+                </p:ext>
+              </p:extLst>
+            </p:nvPr>
+          </p:nvCxnSpPr>
+          <p:spPr>
+            <a:xfrm flipH="1">
+              <a:off x="10918826" y="3683001"/>
+              <a:ext cx="1270001" cy="1269999"/>
+            </a:xfrm>
+            <a:prstGeom prst="line">
+              <a:avLst/>
+            </a:prstGeom>
+            <a:ln w="28575">
+              <a:solidFill>
+                <a:srgbClr val="FFFFFF"/>
+              </a:solidFill>
+            </a:ln>
+          </p:spPr>
+          <p:style>
+            <a:lnRef idx="2">
+              <a:schemeClr val="accent1"/>
+            </a:lnRef>
+            <a:fillRef idx="0">
+              <a:schemeClr val="accent1"/>
+            </a:fillRef>
+            <a:effectRef idx="1">
+              <a:schemeClr val="accent1"/>
+            </a:effectRef>
+            <a:fontRef idx="minor">
+              <a:schemeClr val="tx1"/>
+            </a:fontRef>
+          </p:style>
+        </p:cxnSp>
+      </p:grpSp>
+      <p:sp>
+        <p:nvSpPr>
+          <p:cNvPr id="2" name="Titre 1">
+            <a:extLst>
+              <a:ext uri="{FF2B5EF4-FFF2-40B4-BE49-F238E27FC236}">
+                <a16:creationId xmlns:a16="http://schemas.microsoft.com/office/drawing/2014/main" id="{91F2D697-AEBD-4258-8341-1E8F9EDF1DFB}"/>
+              </a:ext>
+            </a:extLst>
+          </p:cNvPr>
+          <p:cNvSpPr>
+            <a:spLocks noGrp="1"/>
+          </p:cNvSpPr>
+          <p:nvPr>
+            <p:ph type="title"/>
+          </p:nvPr>
+        </p:nvSpPr>
+        <p:spPr>
+          <a:xfrm>
+            <a:off x="8588661" y="941424"/>
+            <a:ext cx="3043896" cy="3248611"/>
+          </a:xfrm>
+        </p:spPr>
+        <p:txBody>
+          <a:bodyPr>
+            <a:normAutofit/>
+          </a:bodyPr>
+          <a:lstStyle/>
+          <a:p>
+            <a:r>
+              <a:rPr lang="fr-FR" sz="3100">
+                <a:solidFill>
+                  <a:srgbClr val="FFFFFF"/>
+                </a:solidFill>
+              </a:rPr>
+              <a:t>Environment</a:t>
+            </a:r>
+            <a:endParaRPr lang="en-GB" sz="3100">
+              <a:solidFill>
+                <a:srgbClr val="FFFFFF"/>
+              </a:solidFill>
+            </a:endParaRPr>
+          </a:p>
+        </p:txBody>
+      </p:sp>
+      <p:graphicFrame>
+        <p:nvGraphicFramePr>
+          <p:cNvPr id="5" name="Espace réservé du contenu 2">
+            <a:extLst>
+              <a:ext uri="{FF2B5EF4-FFF2-40B4-BE49-F238E27FC236}">
+                <a16:creationId xmlns:a16="http://schemas.microsoft.com/office/drawing/2014/main" id="{9C052EF2-23D5-4840-B6B1-5F32104F68AC}"/>
+              </a:ext>
+            </a:extLst>
+          </p:cNvPr>
+          <p:cNvGraphicFramePr>
+            <a:graphicFrameLocks noGrp="1"/>
+          </p:cNvGraphicFramePr>
+          <p:nvPr>
+            <p:ph idx="1"/>
+            <p:extLst>
+              <p:ext uri="{D42A27DB-BD31-4B8C-83A1-F6EECF244321}">
+                <p14:modId xmlns:p14="http://schemas.microsoft.com/office/powerpoint/2010/main" val="3871919060"/>
+              </p:ext>
+            </p:extLst>
+          </p:nvPr>
+        </p:nvGraphicFramePr>
+        <p:xfrm>
+          <a:off x="940645" y="941424"/>
+          <a:ext cx="6190459" cy="4768713"/>
+        </p:xfrm>
+        <a:graphic>
+          <a:graphicData uri="http://schemas.openxmlformats.org/drawingml/2006/diagram">
+            <dgm:relIds xmlns:dgm="http://schemas.openxmlformats.org/drawingml/2006/diagram" xmlns:r="http://schemas.openxmlformats.org/officeDocument/2006/relationships" r:dm="rId2" r:lo="rId3" r:qs="rId4" r:cs="rId5"/>
+          </a:graphicData>
+        </a:graphic>
+      </p:graphicFrame>
+    </p:spTree>
+    <p:extLst>
+      <p:ext uri="{BB962C8B-B14F-4D97-AF65-F5344CB8AC3E}">
+        <p14:creationId xmlns:p14="http://schemas.microsoft.com/office/powerpoint/2010/main" val="602710572"/>
+      </p:ext>
+    </p:extLst>
+  </p:cSld>
+  <p:clrMapOvr>
+    <a:masterClrMapping/>
+  </p:clrMapOvr>
+</p:sld>
+</file>
+
+<file path=ppt/slides/slide20.xml><?xml version="1.0" encoding="utf-8"?>
 <p:sld xmlns:a="http://schemas.openxmlformats.org/drawingml/2006/main" xmlns:r="http://schemas.openxmlformats.org/officeDocument/2006/relationships" xmlns:p="http://schemas.openxmlformats.org/presentationml/2006/main">
   <p:cSld>
     <p:spTree>
@@ -14819,570 +15565,7 @@
 </p:sld>
 </file>
 
-<file path=ppt/slides/slide2.xml><?xml version="1.0" encoding="utf-8"?>
-<p:sld xmlns:a="http://schemas.openxmlformats.org/drawingml/2006/main" xmlns:r="http://schemas.openxmlformats.org/officeDocument/2006/relationships" xmlns:p="http://schemas.openxmlformats.org/presentationml/2006/main">
-  <p:cSld>
-    <p:bg>
-      <p:bgPr>
-        <a:gradFill rotWithShape="1">
-          <a:gsLst>
-            <a:gs pos="0">
-              <a:schemeClr val="bg2">
-                <a:tint val="97000"/>
-                <a:hueMod val="92000"/>
-                <a:satMod val="169000"/>
-                <a:lumMod val="164000"/>
-              </a:schemeClr>
-            </a:gs>
-            <a:gs pos="100000">
-              <a:schemeClr val="bg2">
-                <a:shade val="96000"/>
-                <a:satMod val="120000"/>
-                <a:lumMod val="90000"/>
-              </a:schemeClr>
-            </a:gs>
-          </a:gsLst>
-          <a:path path="circle">
-            <a:fillToRect b="100000"/>
-          </a:path>
-        </a:gradFill>
-        <a:effectLst/>
-      </p:bgPr>
-    </p:bg>
-    <p:spTree>
-      <p:nvGrpSpPr>
-        <p:cNvPr id="1" name=""/>
-        <p:cNvGrpSpPr/>
-        <p:nvPr/>
-      </p:nvGrpSpPr>
-      <p:grpSpPr>
-        <a:xfrm>
-          <a:off x="0" y="0"/>
-          <a:ext cx="0" cy="0"/>
-          <a:chOff x="0" y="0"/>
-          <a:chExt cx="0" cy="0"/>
-        </a:xfrm>
-      </p:grpSpPr>
-      <p:sp>
-        <p:nvSpPr>
-          <p:cNvPr id="10" name="Rectangle 9">
-            <a:extLst>
-              <a:ext uri="{FF2B5EF4-FFF2-40B4-BE49-F238E27FC236}">
-                <a16:creationId xmlns:a16="http://schemas.microsoft.com/office/drawing/2014/main" id="{2C33F367-76E5-4D2A-96B1-4FD443CDD1CF}"/>
-              </a:ext>
-              <a:ext uri="{C183D7F6-B498-43B3-948B-1728B52AA6E4}">
-                <adec:decorative xmlns:adec="http://schemas.microsoft.com/office/drawing/2017/decorative" val="1"/>
-              </a:ext>
-            </a:extLst>
-          </p:cNvPr>
-          <p:cNvSpPr>
-            <a:spLocks noGrp="1" noRot="1" noChangeAspect="1" noMove="1" noResize="1" noEditPoints="1" noAdjustHandles="1" noChangeArrowheads="1" noChangeShapeType="1" noTextEdit="1"/>
-          </p:cNvSpPr>
-          <p:nvPr>
-            <p:extLst>
-              <p:ext uri="{386F3935-93C4-4BCD-93E2-E3B085C9AB24}">
-                <p16:designElem xmlns:p16="http://schemas.microsoft.com/office/powerpoint/2015/main" val="1"/>
-              </p:ext>
-            </p:extLst>
-          </p:nvPr>
-        </p:nvSpPr>
-        <p:spPr>
-          <a:xfrm>
-            <a:off x="0" y="0"/>
-            <a:ext cx="12192000" cy="6858000"/>
-          </a:xfrm>
-          <a:prstGeom prst="rect">
-            <a:avLst/>
-          </a:prstGeom>
-          <a:gradFill>
-            <a:gsLst>
-              <a:gs pos="10000">
-                <a:schemeClr val="dk2">
-                  <a:tint val="97000"/>
-                  <a:hueMod val="92000"/>
-                  <a:satMod val="169000"/>
-                  <a:lumMod val="164000"/>
-                </a:schemeClr>
-              </a:gs>
-              <a:gs pos="100000">
-                <a:schemeClr val="dk2">
-                  <a:shade val="96000"/>
-                  <a:satMod val="120000"/>
-                  <a:lumMod val="90000"/>
-                </a:schemeClr>
-              </a:gs>
-            </a:gsLst>
-            <a:lin ang="6120000" scaled="1"/>
-          </a:gradFill>
-          <a:ln>
-            <a:noFill/>
-          </a:ln>
-        </p:spPr>
-        <p:style>
-          <a:lnRef idx="2">
-            <a:schemeClr val="accent1">
-              <a:shade val="50000"/>
-            </a:schemeClr>
-          </a:lnRef>
-          <a:fillRef idx="1002">
-            <a:schemeClr val="dk2"/>
-          </a:fillRef>
-          <a:effectRef idx="0">
-            <a:schemeClr val="accent1"/>
-          </a:effectRef>
-          <a:fontRef idx="minor">
-            <a:schemeClr val="lt1"/>
-          </a:fontRef>
-        </p:style>
-        <p:txBody>
-          <a:bodyPr rtlCol="0" anchor="ctr"/>
-          <a:lstStyle/>
-          <a:p>
-            <a:pPr algn="ctr"/>
-            <a:endParaRPr lang="en-US"/>
-          </a:p>
-        </p:txBody>
-      </p:sp>
-      <p:sp>
-        <p:nvSpPr>
-          <p:cNvPr id="12" name="Snip Diagonal Corner Rectangle 21">
-            <a:extLst>
-              <a:ext uri="{FF2B5EF4-FFF2-40B4-BE49-F238E27FC236}">
-                <a16:creationId xmlns:a16="http://schemas.microsoft.com/office/drawing/2014/main" id="{6F769419-3E73-449D-B62A-0CDEC946A679}"/>
-              </a:ext>
-              <a:ext uri="{C183D7F6-B498-43B3-948B-1728B52AA6E4}">
-                <adec:decorative xmlns:adec="http://schemas.microsoft.com/office/drawing/2017/decorative" val="1"/>
-              </a:ext>
-            </a:extLst>
-          </p:cNvPr>
-          <p:cNvSpPr>
-            <a:spLocks noGrp="1" noRot="1" noChangeAspect="1" noMove="1" noResize="1" noEditPoints="1" noAdjustHandles="1" noChangeArrowheads="1" noChangeShapeType="1" noTextEdit="1"/>
-          </p:cNvSpPr>
-          <p:nvPr>
-            <p:extLst>
-              <p:ext uri="{386F3935-93C4-4BCD-93E2-E3B085C9AB24}">
-                <p16:designElem xmlns:p16="http://schemas.microsoft.com/office/powerpoint/2015/main" val="1"/>
-              </p:ext>
-            </p:extLst>
-          </p:nvPr>
-        </p:nvSpPr>
-        <p:spPr>
-          <a:xfrm>
-            <a:off x="0" y="-2"/>
-            <a:ext cx="8129873" cy="6858002"/>
-          </a:xfrm>
-          <a:prstGeom prst="snip2DiagRect">
-            <a:avLst>
-              <a:gd name="adj1" fmla="val 0"/>
-              <a:gd name="adj2" fmla="val 0"/>
-            </a:avLst>
-          </a:prstGeom>
-          <a:solidFill>
-            <a:schemeClr val="bg1">
-              <a:alpha val="0"/>
-            </a:schemeClr>
-          </a:solidFill>
-          <a:ln>
-            <a:noFill/>
-          </a:ln>
-          <a:effectLst/>
-        </p:spPr>
-        <p:style>
-          <a:lnRef idx="2">
-            <a:schemeClr val="accent1">
-              <a:shade val="50000"/>
-            </a:schemeClr>
-          </a:lnRef>
-          <a:fillRef idx="1">
-            <a:schemeClr val="accent1"/>
-          </a:fillRef>
-          <a:effectRef idx="0">
-            <a:schemeClr val="accent1"/>
-          </a:effectRef>
-          <a:fontRef idx="minor">
-            <a:schemeClr val="lt1"/>
-          </a:fontRef>
-        </p:style>
-        <p:txBody>
-          <a:bodyPr rtlCol="0" anchor="ctr"/>
-          <a:lstStyle/>
-          <a:p>
-            <a:pPr algn="ctr"/>
-            <a:endParaRPr lang="en-US"/>
-          </a:p>
-        </p:txBody>
-      </p:sp>
-      <p:grpSp>
-        <p:nvGrpSpPr>
-          <p:cNvPr id="14" name="Group 13">
-            <a:extLst>
-              <a:ext uri="{FF2B5EF4-FFF2-40B4-BE49-F238E27FC236}">
-                <a16:creationId xmlns:a16="http://schemas.microsoft.com/office/drawing/2014/main" id="{A6515200-42F9-488F-9895-6CDBCD1E87C8}"/>
-              </a:ext>
-              <a:ext uri="{C183D7F6-B498-43B3-948B-1728B52AA6E4}">
-                <adec:decorative xmlns:adec="http://schemas.microsoft.com/office/drawing/2017/decorative" val="1"/>
-              </a:ext>
-            </a:extLst>
-          </p:cNvPr>
-          <p:cNvGrpSpPr>
-            <a:grpSpLocks noGrp="1" noUngrp="1" noRot="1" noChangeAspect="1" noMove="1" noResize="1"/>
-          </p:cNvGrpSpPr>
-          <p:nvPr>
-            <p:extLst>
-              <p:ext uri="{386F3935-93C4-4BCD-93E2-E3B085C9AB24}">
-                <p16:designElem xmlns:p16="http://schemas.microsoft.com/office/powerpoint/2015/main" val="1"/>
-              </p:ext>
-            </p:extLst>
-          </p:nvPr>
-        </p:nvGrpSpPr>
-        <p:grpSpPr>
-          <a:xfrm>
-            <a:off x="9206969" y="2963333"/>
-            <a:ext cx="2981858" cy="3208867"/>
-            <a:chOff x="9206969" y="2963333"/>
-            <a:chExt cx="2981858" cy="3208867"/>
-          </a:xfrm>
-        </p:grpSpPr>
-        <p:cxnSp>
-          <p:nvCxnSpPr>
-            <p:cNvPr id="15" name="Straight Connector 14">
-              <a:extLst>
-                <a:ext uri="{FF2B5EF4-FFF2-40B4-BE49-F238E27FC236}">
-                  <a16:creationId xmlns:a16="http://schemas.microsoft.com/office/drawing/2014/main" id="{43185F0E-78D5-4C2D-9239-D3515B448837}"/>
-                </a:ext>
-                <a:ext uri="{C183D7F6-B498-43B3-948B-1728B52AA6E4}">
-                  <adec:decorative xmlns:adec="http://schemas.microsoft.com/office/drawing/2017/decorative" val="1"/>
-                </a:ext>
-              </a:extLst>
-            </p:cNvPr>
-            <p:cNvCxnSpPr/>
-            <p:nvPr>
-              <p:extLst>
-                <p:ext uri="{386F3935-93C4-4BCD-93E2-E3B085C9AB24}">
-                  <p16:designElem xmlns:p16="http://schemas.microsoft.com/office/powerpoint/2015/main" val="1"/>
-                </p:ext>
-              </p:extLst>
-            </p:nvPr>
-          </p:nvCxnSpPr>
-          <p:spPr>
-            <a:xfrm flipH="1">
-              <a:off x="11276012" y="2963333"/>
-              <a:ext cx="912814" cy="912812"/>
-            </a:xfrm>
-            <a:prstGeom prst="line">
-              <a:avLst/>
-            </a:prstGeom>
-            <a:ln w="9525">
-              <a:solidFill>
-                <a:srgbClr val="FFFFFF"/>
-              </a:solidFill>
-            </a:ln>
-          </p:spPr>
-          <p:style>
-            <a:lnRef idx="2">
-              <a:schemeClr val="accent1"/>
-            </a:lnRef>
-            <a:fillRef idx="0">
-              <a:schemeClr val="accent1"/>
-            </a:fillRef>
-            <a:effectRef idx="1">
-              <a:schemeClr val="accent1"/>
-            </a:effectRef>
-            <a:fontRef idx="minor">
-              <a:schemeClr val="tx1"/>
-            </a:fontRef>
-          </p:style>
-        </p:cxnSp>
-        <p:cxnSp>
-          <p:nvCxnSpPr>
-            <p:cNvPr id="16" name="Straight Connector 15">
-              <a:extLst>
-                <a:ext uri="{FF2B5EF4-FFF2-40B4-BE49-F238E27FC236}">
-                  <a16:creationId xmlns:a16="http://schemas.microsoft.com/office/drawing/2014/main" id="{D5BD9142-FF9C-4EED-A027-18D095481BB8}"/>
-                </a:ext>
-                <a:ext uri="{C183D7F6-B498-43B3-948B-1728B52AA6E4}">
-                  <adec:decorative xmlns:adec="http://schemas.microsoft.com/office/drawing/2017/decorative" val="1"/>
-                </a:ext>
-              </a:extLst>
-            </p:cNvPr>
-            <p:cNvCxnSpPr/>
-            <p:nvPr>
-              <p:extLst>
-                <p:ext uri="{386F3935-93C4-4BCD-93E2-E3B085C9AB24}">
-                  <p16:designElem xmlns:p16="http://schemas.microsoft.com/office/powerpoint/2015/main" val="1"/>
-                </p:ext>
-              </p:extLst>
-            </p:nvPr>
-          </p:nvCxnSpPr>
-          <p:spPr>
-            <a:xfrm flipH="1">
-              <a:off x="9206969" y="3190344"/>
-              <a:ext cx="2981857" cy="2981856"/>
-            </a:xfrm>
-            <a:prstGeom prst="line">
-              <a:avLst/>
-            </a:prstGeom>
-            <a:ln w="9525">
-              <a:solidFill>
-                <a:srgbClr val="FFFFFF"/>
-              </a:solidFill>
-            </a:ln>
-          </p:spPr>
-          <p:style>
-            <a:lnRef idx="2">
-              <a:schemeClr val="accent1"/>
-            </a:lnRef>
-            <a:fillRef idx="0">
-              <a:schemeClr val="accent1"/>
-            </a:fillRef>
-            <a:effectRef idx="1">
-              <a:schemeClr val="accent1"/>
-            </a:effectRef>
-            <a:fontRef idx="minor">
-              <a:schemeClr val="tx1"/>
-            </a:fontRef>
-          </p:style>
-        </p:cxnSp>
-        <p:cxnSp>
-          <p:nvCxnSpPr>
-            <p:cNvPr id="17" name="Straight Connector 16">
-              <a:extLst>
-                <a:ext uri="{FF2B5EF4-FFF2-40B4-BE49-F238E27FC236}">
-                  <a16:creationId xmlns:a16="http://schemas.microsoft.com/office/drawing/2014/main" id="{42F547D3-9752-4481-B3A8-50E08610B8EC}"/>
-                </a:ext>
-                <a:ext uri="{C183D7F6-B498-43B3-948B-1728B52AA6E4}">
-                  <adec:decorative xmlns:adec="http://schemas.microsoft.com/office/drawing/2017/decorative" val="1"/>
-                </a:ext>
-              </a:extLst>
-            </p:cNvPr>
-            <p:cNvCxnSpPr/>
-            <p:nvPr>
-              <p:extLst>
-                <p:ext uri="{386F3935-93C4-4BCD-93E2-E3B085C9AB24}">
-                  <p16:designElem xmlns:p16="http://schemas.microsoft.com/office/powerpoint/2015/main" val="1"/>
-                </p:ext>
-              </p:extLst>
-            </p:nvPr>
-          </p:nvCxnSpPr>
-          <p:spPr>
-            <a:xfrm flipH="1">
-              <a:off x="10292292" y="3285067"/>
-              <a:ext cx="1896534" cy="1896533"/>
-            </a:xfrm>
-            <a:prstGeom prst="line">
-              <a:avLst/>
-            </a:prstGeom>
-            <a:ln w="9525">
-              <a:solidFill>
-                <a:srgbClr val="FFFFFF"/>
-              </a:solidFill>
-            </a:ln>
-          </p:spPr>
-          <p:style>
-            <a:lnRef idx="2">
-              <a:schemeClr val="accent1"/>
-            </a:lnRef>
-            <a:fillRef idx="0">
-              <a:schemeClr val="accent1"/>
-            </a:fillRef>
-            <a:effectRef idx="1">
-              <a:schemeClr val="accent1"/>
-            </a:effectRef>
-            <a:fontRef idx="minor">
-              <a:schemeClr val="tx1"/>
-            </a:fontRef>
-          </p:style>
-        </p:cxnSp>
-        <p:cxnSp>
-          <p:nvCxnSpPr>
-            <p:cNvPr id="18" name="Straight Connector 17">
-              <a:extLst>
-                <a:ext uri="{FF2B5EF4-FFF2-40B4-BE49-F238E27FC236}">
-                  <a16:creationId xmlns:a16="http://schemas.microsoft.com/office/drawing/2014/main" id="{F1999C2F-3D0D-4813-9696-83630A6FEABD}"/>
-                </a:ext>
-                <a:ext uri="{C183D7F6-B498-43B3-948B-1728B52AA6E4}">
-                  <adec:decorative xmlns:adec="http://schemas.microsoft.com/office/drawing/2017/decorative" val="1"/>
-                </a:ext>
-              </a:extLst>
-            </p:cNvPr>
-            <p:cNvCxnSpPr/>
-            <p:nvPr>
-              <p:extLst>
-                <p:ext uri="{386F3935-93C4-4BCD-93E2-E3B085C9AB24}">
-                  <p16:designElem xmlns:p16="http://schemas.microsoft.com/office/powerpoint/2015/main" val="1"/>
-                </p:ext>
-              </p:extLst>
-            </p:nvPr>
-          </p:nvCxnSpPr>
-          <p:spPr>
-            <a:xfrm flipH="1">
-              <a:off x="10443103" y="3131080"/>
-              <a:ext cx="1745722" cy="1745720"/>
-            </a:xfrm>
-            <a:prstGeom prst="line">
-              <a:avLst/>
-            </a:prstGeom>
-            <a:ln w="28575">
-              <a:solidFill>
-                <a:srgbClr val="FFFFFF"/>
-              </a:solidFill>
-            </a:ln>
-          </p:spPr>
-          <p:style>
-            <a:lnRef idx="2">
-              <a:schemeClr val="accent1"/>
-            </a:lnRef>
-            <a:fillRef idx="0">
-              <a:schemeClr val="accent1"/>
-            </a:fillRef>
-            <a:effectRef idx="1">
-              <a:schemeClr val="accent1"/>
-            </a:effectRef>
-            <a:fontRef idx="minor">
-              <a:schemeClr val="tx1"/>
-            </a:fontRef>
-          </p:style>
-        </p:cxnSp>
-        <p:cxnSp>
-          <p:nvCxnSpPr>
-            <p:cNvPr id="19" name="Straight Connector 18">
-              <a:extLst>
-                <a:ext uri="{FF2B5EF4-FFF2-40B4-BE49-F238E27FC236}">
-                  <a16:creationId xmlns:a16="http://schemas.microsoft.com/office/drawing/2014/main" id="{EC737390-C9CA-456B-9F40-D7A76EA242E7}"/>
-                </a:ext>
-                <a:ext uri="{C183D7F6-B498-43B3-948B-1728B52AA6E4}">
-                  <adec:decorative xmlns:adec="http://schemas.microsoft.com/office/drawing/2017/decorative" val="1"/>
-                </a:ext>
-              </a:extLst>
-            </p:cNvPr>
-            <p:cNvCxnSpPr/>
-            <p:nvPr>
-              <p:extLst>
-                <p:ext uri="{386F3935-93C4-4BCD-93E2-E3B085C9AB24}">
-                  <p16:designElem xmlns:p16="http://schemas.microsoft.com/office/powerpoint/2015/main" val="1"/>
-                </p:ext>
-              </p:extLst>
-            </p:nvPr>
-          </p:nvCxnSpPr>
-          <p:spPr>
-            <a:xfrm flipH="1">
-              <a:off x="10918826" y="3683001"/>
-              <a:ext cx="1270001" cy="1269999"/>
-            </a:xfrm>
-            <a:prstGeom prst="line">
-              <a:avLst/>
-            </a:prstGeom>
-            <a:ln w="28575">
-              <a:solidFill>
-                <a:srgbClr val="FFFFFF"/>
-              </a:solidFill>
-            </a:ln>
-          </p:spPr>
-          <p:style>
-            <a:lnRef idx="2">
-              <a:schemeClr val="accent1"/>
-            </a:lnRef>
-            <a:fillRef idx="0">
-              <a:schemeClr val="accent1"/>
-            </a:fillRef>
-            <a:effectRef idx="1">
-              <a:schemeClr val="accent1"/>
-            </a:effectRef>
-            <a:fontRef idx="minor">
-              <a:schemeClr val="tx1"/>
-            </a:fontRef>
-          </p:style>
-        </p:cxnSp>
-      </p:grpSp>
-      <p:sp>
-        <p:nvSpPr>
-          <p:cNvPr id="2" name="Titre 1">
-            <a:extLst>
-              <a:ext uri="{FF2B5EF4-FFF2-40B4-BE49-F238E27FC236}">
-                <a16:creationId xmlns:a16="http://schemas.microsoft.com/office/drawing/2014/main" id="{91F2D697-AEBD-4258-8341-1E8F9EDF1DFB}"/>
-              </a:ext>
-            </a:extLst>
-          </p:cNvPr>
-          <p:cNvSpPr>
-            <a:spLocks noGrp="1"/>
-          </p:cNvSpPr>
-          <p:nvPr>
-            <p:ph type="title"/>
-          </p:nvPr>
-        </p:nvSpPr>
-        <p:spPr>
-          <a:xfrm>
-            <a:off x="8588661" y="941424"/>
-            <a:ext cx="3043896" cy="3248611"/>
-          </a:xfrm>
-        </p:spPr>
-        <p:txBody>
-          <a:bodyPr>
-            <a:normAutofit/>
-          </a:bodyPr>
-          <a:lstStyle/>
-          <a:p>
-            <a:r>
-              <a:rPr lang="fr-FR" sz="3100">
-                <a:solidFill>
-                  <a:srgbClr val="FFFFFF"/>
-                </a:solidFill>
-              </a:rPr>
-              <a:t>Environment</a:t>
-            </a:r>
-            <a:endParaRPr lang="en-GB" sz="3100">
-              <a:solidFill>
-                <a:srgbClr val="FFFFFF"/>
-              </a:solidFill>
-            </a:endParaRPr>
-          </a:p>
-        </p:txBody>
-      </p:sp>
-      <p:graphicFrame>
-        <p:nvGraphicFramePr>
-          <p:cNvPr id="5" name="Espace réservé du contenu 2">
-            <a:extLst>
-              <a:ext uri="{FF2B5EF4-FFF2-40B4-BE49-F238E27FC236}">
-                <a16:creationId xmlns:a16="http://schemas.microsoft.com/office/drawing/2014/main" id="{9C052EF2-23D5-4840-B6B1-5F32104F68AC}"/>
-              </a:ext>
-            </a:extLst>
-          </p:cNvPr>
-          <p:cNvGraphicFramePr>
-            <a:graphicFrameLocks noGrp="1"/>
-          </p:cNvGraphicFramePr>
-          <p:nvPr>
-            <p:ph idx="1"/>
-            <p:extLst>
-              <p:ext uri="{D42A27DB-BD31-4B8C-83A1-F6EECF244321}">
-                <p14:modId xmlns:p14="http://schemas.microsoft.com/office/powerpoint/2010/main" val="3871919060"/>
-              </p:ext>
-            </p:extLst>
-          </p:nvPr>
-        </p:nvGraphicFramePr>
-        <p:xfrm>
-          <a:off x="940645" y="941424"/>
-          <a:ext cx="6190459" cy="4768713"/>
-        </p:xfrm>
-        <a:graphic>
-          <a:graphicData uri="http://schemas.openxmlformats.org/drawingml/2006/diagram">
-            <dgm:relIds xmlns:dgm="http://schemas.openxmlformats.org/drawingml/2006/diagram" xmlns:r="http://schemas.openxmlformats.org/officeDocument/2006/relationships" r:dm="rId2" r:lo="rId3" r:qs="rId4" r:cs="rId5"/>
-          </a:graphicData>
-        </a:graphic>
-      </p:graphicFrame>
-    </p:spTree>
-    <p:extLst>
-      <p:ext uri="{BB962C8B-B14F-4D97-AF65-F5344CB8AC3E}">
-        <p14:creationId xmlns:p14="http://schemas.microsoft.com/office/powerpoint/2010/main" val="602710572"/>
-      </p:ext>
-    </p:extLst>
-  </p:cSld>
-  <p:clrMapOvr>
-    <a:masterClrMapping/>
-  </p:clrMapOvr>
-</p:sld>
-</file>
-
-<file path=ppt/slides/slide20.xml><?xml version="1.0" encoding="utf-8"?>
+<file path=ppt/slides/slide21.xml><?xml version="1.0" encoding="utf-8"?>
 <p:sld xmlns:a="http://schemas.openxmlformats.org/drawingml/2006/main" xmlns:r="http://schemas.openxmlformats.org/officeDocument/2006/relationships" xmlns:p="http://schemas.openxmlformats.org/presentationml/2006/main">
   <p:cSld>
     <p:spTree>
@@ -15923,7 +16106,7 @@
 </p:sld>
 </file>
 
-<file path=ppt/slides/slide21.xml><?xml version="1.0" encoding="utf-8"?>
+<file path=ppt/slides/slide22.xml><?xml version="1.0" encoding="utf-8"?>
 <p:sld xmlns:a="http://schemas.openxmlformats.org/drawingml/2006/main" xmlns:r="http://schemas.openxmlformats.org/officeDocument/2006/relationships" xmlns:p="http://schemas.openxmlformats.org/presentationml/2006/main">
   <p:cSld>
     <p:spTree>

</xml_diff>

<commit_message>
#12 Web page added on slides
</commit_message>
<xml_diff>
--- a/SAI_presentation.pptx
+++ b/SAI_presentation.pptx
@@ -20,13 +20,14 @@
     <p:sldId id="274" r:id="rId14"/>
     <p:sldId id="275" r:id="rId15"/>
     <p:sldId id="276" r:id="rId16"/>
-    <p:sldId id="277" r:id="rId17"/>
-    <p:sldId id="260" r:id="rId18"/>
-    <p:sldId id="261" r:id="rId19"/>
-    <p:sldId id="265" r:id="rId20"/>
-    <p:sldId id="262" r:id="rId21"/>
-    <p:sldId id="264" r:id="rId22"/>
-    <p:sldId id="263" r:id="rId23"/>
+    <p:sldId id="278" r:id="rId17"/>
+    <p:sldId id="277" r:id="rId18"/>
+    <p:sldId id="260" r:id="rId19"/>
+    <p:sldId id="261" r:id="rId20"/>
+    <p:sldId id="265" r:id="rId21"/>
+    <p:sldId id="262" r:id="rId22"/>
+    <p:sldId id="264" r:id="rId23"/>
+    <p:sldId id="263" r:id="rId24"/>
   </p:sldIdLst>
   <p:sldSz cx="12192000" cy="6858000"/>
   <p:notesSz cx="6858000" cy="9144000"/>
@@ -13680,6 +13681,145 @@
           <p:cNvPr id="2" name="Titre 1">
             <a:extLst>
               <a:ext uri="{FF2B5EF4-FFF2-40B4-BE49-F238E27FC236}">
+                <a16:creationId xmlns:a16="http://schemas.microsoft.com/office/drawing/2014/main" id="{C341764B-6001-4A87-B677-0F7F3AFD8F0F}"/>
+              </a:ext>
+            </a:extLst>
+          </p:cNvPr>
+          <p:cNvSpPr>
+            <a:spLocks noGrp="1"/>
+          </p:cNvSpPr>
+          <p:nvPr>
+            <p:ph type="title"/>
+          </p:nvPr>
+        </p:nvSpPr>
+        <p:spPr/>
+        <p:txBody>
+          <a:bodyPr/>
+          <a:lstStyle/>
+          <a:p>
+            <a:r>
+              <a:rPr lang="fr-FR" dirty="0"/>
+              <a:t>Web page</a:t>
+            </a:r>
+            <a:endParaRPr lang="en-GB" dirty="0"/>
+          </a:p>
+        </p:txBody>
+      </p:sp>
+      <p:sp>
+        <p:nvSpPr>
+          <p:cNvPr id="3" name="Espace réservé du contenu 2">
+            <a:extLst>
+              <a:ext uri="{FF2B5EF4-FFF2-40B4-BE49-F238E27FC236}">
+                <a16:creationId xmlns:a16="http://schemas.microsoft.com/office/drawing/2014/main" id="{D3695AE4-7733-4B0C-9C6A-328D9BF71E68}"/>
+              </a:ext>
+            </a:extLst>
+          </p:cNvPr>
+          <p:cNvSpPr>
+            <a:spLocks noGrp="1"/>
+          </p:cNvSpPr>
+          <p:nvPr>
+            <p:ph idx="1"/>
+          </p:nvPr>
+        </p:nvSpPr>
+        <p:spPr/>
+        <p:txBody>
+          <a:bodyPr/>
+          <a:lstStyle/>
+          <a:p>
+            <a:r>
+              <a:rPr lang="fr-FR" dirty="0"/>
+              <a:t>The web page </a:t>
+            </a:r>
+            <a:r>
+              <a:rPr lang="fr-FR" dirty="0" err="1"/>
+              <a:t>will</a:t>
+            </a:r>
+            <a:r>
+              <a:rPr lang="fr-FR" dirty="0"/>
+              <a:t> show us all the </a:t>
+            </a:r>
+            <a:r>
+              <a:rPr lang="fr-FR" dirty="0" err="1"/>
+              <a:t>strategies</a:t>
+            </a:r>
+            <a:r>
+              <a:rPr lang="fr-FR" dirty="0"/>
+              <a:t> SAI record </a:t>
+            </a:r>
+            <a:r>
+              <a:rPr lang="fr-FR" dirty="0" err="1"/>
+              <a:t>during</a:t>
+            </a:r>
+            <a:r>
+              <a:rPr lang="fr-FR" dirty="0"/>
+              <a:t> the </a:t>
+            </a:r>
+            <a:r>
+              <a:rPr lang="fr-FR" dirty="0" err="1"/>
+              <a:t>day</a:t>
+            </a:r>
+            <a:endParaRPr lang="fr-FR" dirty="0"/>
+          </a:p>
+          <a:p>
+            <a:r>
+              <a:rPr lang="fr-FR" dirty="0" err="1"/>
+              <a:t>Explain</a:t>
+            </a:r>
+            <a:r>
+              <a:rPr lang="fr-FR" dirty="0"/>
+              <a:t> </a:t>
+            </a:r>
+            <a:r>
+              <a:rPr lang="fr-FR" dirty="0" err="1"/>
+              <a:t>with</a:t>
+            </a:r>
+            <a:r>
+              <a:rPr lang="fr-FR" dirty="0"/>
+              <a:t> a </a:t>
+            </a:r>
+            <a:r>
+              <a:rPr lang="fr-FR"/>
+              <a:t>schema</a:t>
+            </a:r>
+            <a:endParaRPr lang="en-GB"/>
+          </a:p>
+        </p:txBody>
+      </p:sp>
+    </p:spTree>
+    <p:extLst>
+      <p:ext uri="{BB962C8B-B14F-4D97-AF65-F5344CB8AC3E}">
+        <p14:creationId xmlns:p14="http://schemas.microsoft.com/office/powerpoint/2010/main" val="3444838072"/>
+      </p:ext>
+    </p:extLst>
+  </p:cSld>
+  <p:clrMapOvr>
+    <a:masterClrMapping/>
+  </p:clrMapOvr>
+</p:sld>
+</file>
+
+<file path=ppt/slides/slide17.xml><?xml version="1.0" encoding="utf-8"?>
+<p:sld xmlns:a="http://schemas.openxmlformats.org/drawingml/2006/main" xmlns:r="http://schemas.openxmlformats.org/officeDocument/2006/relationships" xmlns:p="http://schemas.openxmlformats.org/presentationml/2006/main">
+  <p:cSld>
+    <p:spTree>
+      <p:nvGrpSpPr>
+        <p:cNvPr id="1" name=""/>
+        <p:cNvGrpSpPr/>
+        <p:nvPr/>
+      </p:nvGrpSpPr>
+      <p:grpSpPr>
+        <a:xfrm>
+          <a:off x="0" y="0"/>
+          <a:ext cx="0" cy="0"/>
+          <a:chOff x="0" y="0"/>
+          <a:chExt cx="0" cy="0"/>
+        </a:xfrm>
+      </p:grpSpPr>
+      <p:sp>
+        <p:nvSpPr>
+          <p:cNvPr id="2" name="Titre 1">
+            <a:extLst>
+              <a:ext uri="{FF2B5EF4-FFF2-40B4-BE49-F238E27FC236}">
                 <a16:creationId xmlns:a16="http://schemas.microsoft.com/office/drawing/2014/main" id="{089CF4B4-AB53-4D2D-828B-D4BAF1BD4348}"/>
               </a:ext>
             </a:extLst>
@@ -13840,7 +13980,7 @@
 </p:sld>
 </file>
 
-<file path=ppt/slides/slide17.xml><?xml version="1.0" encoding="utf-8"?>
+<file path=ppt/slides/slide18.xml><?xml version="1.0" encoding="utf-8"?>
 <p:sld xmlns:a="http://schemas.openxmlformats.org/drawingml/2006/main" xmlns:r="http://schemas.openxmlformats.org/officeDocument/2006/relationships" xmlns:p="http://schemas.openxmlformats.org/presentationml/2006/main">
   <p:cSld>
     <p:spTree>
@@ -13934,7 +14074,7 @@
 </p:sld>
 </file>
 
-<file path=ppt/slides/slide18.xml><?xml version="1.0" encoding="utf-8"?>
+<file path=ppt/slides/slide19.xml><?xml version="1.0" encoding="utf-8"?>
 <p:sld xmlns:a="http://schemas.openxmlformats.org/drawingml/2006/main" xmlns:r="http://schemas.openxmlformats.org/officeDocument/2006/relationships" xmlns:p="http://schemas.openxmlformats.org/presentationml/2006/main">
   <p:cSld>
     <p:bg>
@@ -14047,199 +14187,6 @@
     <p:extLst>
       <p:ext uri="{BB962C8B-B14F-4D97-AF65-F5344CB8AC3E}">
         <p14:creationId xmlns:p14="http://schemas.microsoft.com/office/powerpoint/2010/main" val="2526747130"/>
-      </p:ext>
-    </p:extLst>
-  </p:cSld>
-  <p:clrMapOvr>
-    <a:masterClrMapping/>
-  </p:clrMapOvr>
-</p:sld>
-</file>
-
-<file path=ppt/slides/slide19.xml><?xml version="1.0" encoding="utf-8"?>
-<p:sld xmlns:a="http://schemas.openxmlformats.org/drawingml/2006/main" xmlns:r="http://schemas.openxmlformats.org/officeDocument/2006/relationships" xmlns:p="http://schemas.openxmlformats.org/presentationml/2006/main">
-  <p:cSld>
-    <p:spTree>
-      <p:nvGrpSpPr>
-        <p:cNvPr id="1" name=""/>
-        <p:cNvGrpSpPr/>
-        <p:nvPr/>
-      </p:nvGrpSpPr>
-      <p:grpSpPr>
-        <a:xfrm>
-          <a:off x="0" y="0"/>
-          <a:ext cx="0" cy="0"/>
-          <a:chOff x="0" y="0"/>
-          <a:chExt cx="0" cy="0"/>
-        </a:xfrm>
-      </p:grpSpPr>
-      <p:sp>
-        <p:nvSpPr>
-          <p:cNvPr id="2" name="Titre 1">
-            <a:extLst>
-              <a:ext uri="{FF2B5EF4-FFF2-40B4-BE49-F238E27FC236}">
-                <a16:creationId xmlns:a16="http://schemas.microsoft.com/office/drawing/2014/main" id="{50C2AE22-9CDD-4DF4-8855-8950B74A3C2C}"/>
-              </a:ext>
-            </a:extLst>
-          </p:cNvPr>
-          <p:cNvSpPr>
-            <a:spLocks noGrp="1"/>
-          </p:cNvSpPr>
-          <p:nvPr>
-            <p:ph type="title"/>
-          </p:nvPr>
-        </p:nvSpPr>
-        <p:spPr/>
-        <p:txBody>
-          <a:bodyPr/>
-          <a:lstStyle/>
-          <a:p>
-            <a:r>
-              <a:rPr lang="fr-FR" dirty="0"/>
-              <a:t>Future </a:t>
-            </a:r>
-            <a:r>
-              <a:rPr lang="fr-FR" dirty="0" err="1"/>
-              <a:t>work</a:t>
-            </a:r>
-            <a:endParaRPr lang="en-GB" dirty="0"/>
-          </a:p>
-        </p:txBody>
-      </p:sp>
-      <p:sp>
-        <p:nvSpPr>
-          <p:cNvPr id="3" name="Espace réservé du contenu 2">
-            <a:extLst>
-              <a:ext uri="{FF2B5EF4-FFF2-40B4-BE49-F238E27FC236}">
-                <a16:creationId xmlns:a16="http://schemas.microsoft.com/office/drawing/2014/main" id="{72E4D2C1-E7EB-4B25-A95A-5210D44CC2AA}"/>
-              </a:ext>
-            </a:extLst>
-          </p:cNvPr>
-          <p:cNvSpPr>
-            <a:spLocks noGrp="1"/>
-          </p:cNvSpPr>
-          <p:nvPr>
-            <p:ph idx="1"/>
-          </p:nvPr>
-        </p:nvSpPr>
-        <p:spPr/>
-        <p:txBody>
-          <a:bodyPr/>
-          <a:lstStyle/>
-          <a:p>
-            <a:r>
-              <a:rPr lang="fr-FR" dirty="0"/>
-              <a:t>Virtual assistant launch </a:t>
-            </a:r>
-            <a:r>
-              <a:rPr lang="fr-FR" dirty="0" err="1"/>
-              <a:t>every</a:t>
-            </a:r>
-            <a:r>
-              <a:rPr lang="fr-FR" dirty="0"/>
-              <a:t> time the computer </a:t>
-            </a:r>
-            <a:r>
-              <a:rPr lang="fr-FR" dirty="0" err="1"/>
-              <a:t>is</a:t>
-            </a:r>
-            <a:r>
-              <a:rPr lang="fr-FR" dirty="0"/>
-              <a:t> up</a:t>
-            </a:r>
-          </a:p>
-          <a:p>
-            <a:r>
-              <a:rPr lang="fr-FR" dirty="0" err="1"/>
-              <a:t>Generate</a:t>
-            </a:r>
-            <a:r>
-              <a:rPr lang="fr-FR" dirty="0"/>
-              <a:t> a </a:t>
-            </a:r>
-            <a:r>
-              <a:rPr lang="fr-FR" dirty="0" err="1"/>
-              <a:t>voice</a:t>
-            </a:r>
-            <a:r>
-              <a:rPr lang="fr-FR" dirty="0"/>
-              <a:t> for the </a:t>
-            </a:r>
-            <a:r>
-              <a:rPr lang="fr-FR" dirty="0" err="1"/>
-              <a:t>virtual</a:t>
-            </a:r>
-            <a:r>
-              <a:rPr lang="fr-FR" dirty="0"/>
-              <a:t> assistant to </a:t>
-            </a:r>
-            <a:r>
-              <a:rPr lang="fr-FR" dirty="0" err="1"/>
-              <a:t>communicate</a:t>
-            </a:r>
-            <a:r>
-              <a:rPr lang="fr-FR" dirty="0"/>
-              <a:t> </a:t>
-            </a:r>
-            <a:r>
-              <a:rPr lang="fr-FR" dirty="0" err="1"/>
-              <a:t>with</a:t>
-            </a:r>
-            <a:r>
-              <a:rPr lang="fr-FR" dirty="0"/>
-              <a:t> the user</a:t>
-            </a:r>
-          </a:p>
-          <a:p>
-            <a:r>
-              <a:rPr lang="fr-FR" dirty="0"/>
-              <a:t>Profiling </a:t>
-            </a:r>
-            <a:r>
-              <a:rPr lang="fr-FR" dirty="0" err="1"/>
-              <a:t>each</a:t>
-            </a:r>
-            <a:r>
-              <a:rPr lang="fr-FR" dirty="0"/>
-              <a:t> user </a:t>
-            </a:r>
-            <a:r>
-              <a:rPr lang="fr-FR" dirty="0" err="1"/>
-              <a:t>that</a:t>
-            </a:r>
-            <a:r>
-              <a:rPr lang="fr-FR" dirty="0"/>
-              <a:t> use the </a:t>
-            </a:r>
-            <a:r>
-              <a:rPr lang="fr-FR" dirty="0" err="1"/>
-              <a:t>virtual</a:t>
-            </a:r>
-            <a:r>
-              <a:rPr lang="fr-FR" dirty="0"/>
-              <a:t> assistant</a:t>
-            </a:r>
-          </a:p>
-          <a:p>
-            <a:r>
-              <a:rPr lang="en-GB" dirty="0"/>
-              <a:t>Create SAI with </a:t>
-            </a:r>
-            <a:r>
-              <a:rPr lang="en-GB" dirty="0" err="1"/>
-              <a:t>kivy</a:t>
-            </a:r>
-            <a:r>
-              <a:rPr lang="en-GB" dirty="0"/>
-              <a:t> for multiapplication</a:t>
-            </a:r>
-          </a:p>
-        </p:txBody>
-      </p:sp>
-    </p:spTree>
-    <p:extLst>
-      <p:ext uri="{BB962C8B-B14F-4D97-AF65-F5344CB8AC3E}">
-        <p14:creationId xmlns:p14="http://schemas.microsoft.com/office/powerpoint/2010/main" val="4010460576"/>
       </p:ext>
     </p:extLst>
   </p:cSld>
@@ -14813,6 +14760,199 @@
 </file>
 
 <file path=ppt/slides/slide20.xml><?xml version="1.0" encoding="utf-8"?>
+<p:sld xmlns:a="http://schemas.openxmlformats.org/drawingml/2006/main" xmlns:r="http://schemas.openxmlformats.org/officeDocument/2006/relationships" xmlns:p="http://schemas.openxmlformats.org/presentationml/2006/main">
+  <p:cSld>
+    <p:spTree>
+      <p:nvGrpSpPr>
+        <p:cNvPr id="1" name=""/>
+        <p:cNvGrpSpPr/>
+        <p:nvPr/>
+      </p:nvGrpSpPr>
+      <p:grpSpPr>
+        <a:xfrm>
+          <a:off x="0" y="0"/>
+          <a:ext cx="0" cy="0"/>
+          <a:chOff x="0" y="0"/>
+          <a:chExt cx="0" cy="0"/>
+        </a:xfrm>
+      </p:grpSpPr>
+      <p:sp>
+        <p:nvSpPr>
+          <p:cNvPr id="2" name="Titre 1">
+            <a:extLst>
+              <a:ext uri="{FF2B5EF4-FFF2-40B4-BE49-F238E27FC236}">
+                <a16:creationId xmlns:a16="http://schemas.microsoft.com/office/drawing/2014/main" id="{50C2AE22-9CDD-4DF4-8855-8950B74A3C2C}"/>
+              </a:ext>
+            </a:extLst>
+          </p:cNvPr>
+          <p:cNvSpPr>
+            <a:spLocks noGrp="1"/>
+          </p:cNvSpPr>
+          <p:nvPr>
+            <p:ph type="title"/>
+          </p:nvPr>
+        </p:nvSpPr>
+        <p:spPr/>
+        <p:txBody>
+          <a:bodyPr/>
+          <a:lstStyle/>
+          <a:p>
+            <a:r>
+              <a:rPr lang="fr-FR" dirty="0"/>
+              <a:t>Future </a:t>
+            </a:r>
+            <a:r>
+              <a:rPr lang="fr-FR" dirty="0" err="1"/>
+              <a:t>work</a:t>
+            </a:r>
+            <a:endParaRPr lang="en-GB" dirty="0"/>
+          </a:p>
+        </p:txBody>
+      </p:sp>
+      <p:sp>
+        <p:nvSpPr>
+          <p:cNvPr id="3" name="Espace réservé du contenu 2">
+            <a:extLst>
+              <a:ext uri="{FF2B5EF4-FFF2-40B4-BE49-F238E27FC236}">
+                <a16:creationId xmlns:a16="http://schemas.microsoft.com/office/drawing/2014/main" id="{72E4D2C1-E7EB-4B25-A95A-5210D44CC2AA}"/>
+              </a:ext>
+            </a:extLst>
+          </p:cNvPr>
+          <p:cNvSpPr>
+            <a:spLocks noGrp="1"/>
+          </p:cNvSpPr>
+          <p:nvPr>
+            <p:ph idx="1"/>
+          </p:nvPr>
+        </p:nvSpPr>
+        <p:spPr/>
+        <p:txBody>
+          <a:bodyPr/>
+          <a:lstStyle/>
+          <a:p>
+            <a:r>
+              <a:rPr lang="fr-FR" dirty="0"/>
+              <a:t>Virtual assistant launch </a:t>
+            </a:r>
+            <a:r>
+              <a:rPr lang="fr-FR" dirty="0" err="1"/>
+              <a:t>every</a:t>
+            </a:r>
+            <a:r>
+              <a:rPr lang="fr-FR" dirty="0"/>
+              <a:t> time the computer </a:t>
+            </a:r>
+            <a:r>
+              <a:rPr lang="fr-FR" dirty="0" err="1"/>
+              <a:t>is</a:t>
+            </a:r>
+            <a:r>
+              <a:rPr lang="fr-FR" dirty="0"/>
+              <a:t> up</a:t>
+            </a:r>
+          </a:p>
+          <a:p>
+            <a:r>
+              <a:rPr lang="fr-FR" dirty="0" err="1"/>
+              <a:t>Generate</a:t>
+            </a:r>
+            <a:r>
+              <a:rPr lang="fr-FR" dirty="0"/>
+              <a:t> a </a:t>
+            </a:r>
+            <a:r>
+              <a:rPr lang="fr-FR" dirty="0" err="1"/>
+              <a:t>voice</a:t>
+            </a:r>
+            <a:r>
+              <a:rPr lang="fr-FR" dirty="0"/>
+              <a:t> for the </a:t>
+            </a:r>
+            <a:r>
+              <a:rPr lang="fr-FR" dirty="0" err="1"/>
+              <a:t>virtual</a:t>
+            </a:r>
+            <a:r>
+              <a:rPr lang="fr-FR" dirty="0"/>
+              <a:t> assistant to </a:t>
+            </a:r>
+            <a:r>
+              <a:rPr lang="fr-FR" dirty="0" err="1"/>
+              <a:t>communicate</a:t>
+            </a:r>
+            <a:r>
+              <a:rPr lang="fr-FR" dirty="0"/>
+              <a:t> </a:t>
+            </a:r>
+            <a:r>
+              <a:rPr lang="fr-FR" dirty="0" err="1"/>
+              <a:t>with</a:t>
+            </a:r>
+            <a:r>
+              <a:rPr lang="fr-FR" dirty="0"/>
+              <a:t> the user</a:t>
+            </a:r>
+          </a:p>
+          <a:p>
+            <a:r>
+              <a:rPr lang="fr-FR" dirty="0"/>
+              <a:t>Profiling </a:t>
+            </a:r>
+            <a:r>
+              <a:rPr lang="fr-FR" dirty="0" err="1"/>
+              <a:t>each</a:t>
+            </a:r>
+            <a:r>
+              <a:rPr lang="fr-FR" dirty="0"/>
+              <a:t> user </a:t>
+            </a:r>
+            <a:r>
+              <a:rPr lang="fr-FR" dirty="0" err="1"/>
+              <a:t>that</a:t>
+            </a:r>
+            <a:r>
+              <a:rPr lang="fr-FR" dirty="0"/>
+              <a:t> use the </a:t>
+            </a:r>
+            <a:r>
+              <a:rPr lang="fr-FR" dirty="0" err="1"/>
+              <a:t>virtual</a:t>
+            </a:r>
+            <a:r>
+              <a:rPr lang="fr-FR" dirty="0"/>
+              <a:t> assistant</a:t>
+            </a:r>
+          </a:p>
+          <a:p>
+            <a:r>
+              <a:rPr lang="en-GB" dirty="0"/>
+              <a:t>Create SAI with </a:t>
+            </a:r>
+            <a:r>
+              <a:rPr lang="en-GB" dirty="0" err="1"/>
+              <a:t>kivy</a:t>
+            </a:r>
+            <a:r>
+              <a:rPr lang="en-GB" dirty="0"/>
+              <a:t> for multiapplication</a:t>
+            </a:r>
+          </a:p>
+        </p:txBody>
+      </p:sp>
+    </p:spTree>
+    <p:extLst>
+      <p:ext uri="{BB962C8B-B14F-4D97-AF65-F5344CB8AC3E}">
+        <p14:creationId xmlns:p14="http://schemas.microsoft.com/office/powerpoint/2010/main" val="4010460576"/>
+      </p:ext>
+    </p:extLst>
+  </p:cSld>
+  <p:clrMapOvr>
+    <a:masterClrMapping/>
+  </p:clrMapOvr>
+</p:sld>
+</file>
+
+<file path=ppt/slides/slide21.xml><?xml version="1.0" encoding="utf-8"?>
 <p:sld xmlns:a="http://schemas.openxmlformats.org/drawingml/2006/main" xmlns:r="http://schemas.openxmlformats.org/officeDocument/2006/relationships" xmlns:p="http://schemas.openxmlformats.org/presentationml/2006/main">
   <p:cSld>
     <p:spTree>
@@ -15565,7 +15705,7 @@
 </p:sld>
 </file>
 
-<file path=ppt/slides/slide21.xml><?xml version="1.0" encoding="utf-8"?>
+<file path=ppt/slides/slide22.xml><?xml version="1.0" encoding="utf-8"?>
 <p:sld xmlns:a="http://schemas.openxmlformats.org/drawingml/2006/main" xmlns:r="http://schemas.openxmlformats.org/officeDocument/2006/relationships" xmlns:p="http://schemas.openxmlformats.org/presentationml/2006/main">
   <p:cSld>
     <p:spTree>
@@ -16106,7 +16246,7 @@
 </p:sld>
 </file>
 
-<file path=ppt/slides/slide22.xml><?xml version="1.0" encoding="utf-8"?>
+<file path=ppt/slides/slide23.xml><?xml version="1.0" encoding="utf-8"?>
 <p:sld xmlns:a="http://schemas.openxmlformats.org/drawingml/2006/main" xmlns:r="http://schemas.openxmlformats.org/officeDocument/2006/relationships" xmlns:p="http://schemas.openxmlformats.org/presentationml/2006/main">
   <p:cSld>
     <p:spTree>

</xml_diff>

<commit_message>
#12 Logos added on issues slides
</commit_message>
<xml_diff>
--- a/SAI_presentation.pptx
+++ b/SAI_presentation.pptx
@@ -6942,7 +6942,7 @@
             <a:fld id="{B61BEF0D-F0BB-DE4B-95CE-6DB70DBA9567}" type="datetimeFigureOut">
               <a:rPr lang="en-US" dirty="0"/>
               <a:pPr/>
-              <a:t>3/10/2020</a:t>
+              <a:t>3/11/2020</a:t>
             </a:fld>
             <a:endParaRPr lang="en-US" dirty="0"/>
           </a:p>
@@ -7375,7 +7375,7 @@
             <a:fld id="{B61BEF0D-F0BB-DE4B-95CE-6DB70DBA9567}" type="datetimeFigureOut">
               <a:rPr lang="en-US" dirty="0"/>
               <a:pPr/>
-              <a:t>3/10/2020</a:t>
+              <a:t>3/11/2020</a:t>
             </a:fld>
             <a:endParaRPr lang="en-US" dirty="0"/>
           </a:p>
@@ -7622,7 +7622,7 @@
             <a:fld id="{B61BEF0D-F0BB-DE4B-95CE-6DB70DBA9567}" type="datetimeFigureOut">
               <a:rPr lang="en-US" dirty="0"/>
               <a:pPr/>
-              <a:t>3/10/2020</a:t>
+              <a:t>3/11/2020</a:t>
             </a:fld>
             <a:endParaRPr lang="en-US" dirty="0"/>
           </a:p>
@@ -7927,7 +7927,7 @@
             <a:fld id="{B61BEF0D-F0BB-DE4B-95CE-6DB70DBA9567}" type="datetimeFigureOut">
               <a:rPr lang="en-US" dirty="0"/>
               <a:pPr/>
-              <a:t>3/10/2020</a:t>
+              <a:t>3/11/2020</a:t>
             </a:fld>
             <a:endParaRPr lang="en-US" dirty="0"/>
           </a:p>
@@ -8242,7 +8242,7 @@
             <a:fld id="{B61BEF0D-F0BB-DE4B-95CE-6DB70DBA9567}" type="datetimeFigureOut">
               <a:rPr lang="en-US" dirty="0"/>
               <a:pPr/>
-              <a:t>3/10/2020</a:t>
+              <a:t>3/11/2020</a:t>
             </a:fld>
             <a:endParaRPr lang="en-US" dirty="0"/>
           </a:p>
@@ -8541,7 +8541,7 @@
             <a:fld id="{B61BEF0D-F0BB-DE4B-95CE-6DB70DBA9567}" type="datetimeFigureOut">
               <a:rPr lang="en-US" dirty="0"/>
               <a:pPr/>
-              <a:t>3/10/2020</a:t>
+              <a:t>3/11/2020</a:t>
             </a:fld>
             <a:endParaRPr lang="en-US" dirty="0"/>
           </a:p>
@@ -8905,7 +8905,7 @@
             <a:fld id="{B61BEF0D-F0BB-DE4B-95CE-6DB70DBA9567}" type="datetimeFigureOut">
               <a:rPr lang="en-US" dirty="0"/>
               <a:pPr/>
-              <a:t>3/10/2020</a:t>
+              <a:t>3/11/2020</a:t>
             </a:fld>
             <a:endParaRPr lang="en-US" dirty="0"/>
           </a:p>
@@ -9076,7 +9076,7 @@
             <a:fld id="{B61BEF0D-F0BB-DE4B-95CE-6DB70DBA9567}" type="datetimeFigureOut">
               <a:rPr lang="en-US" dirty="0"/>
               <a:pPr/>
-              <a:t>3/10/2020</a:t>
+              <a:t>3/11/2020</a:t>
             </a:fld>
             <a:endParaRPr lang="en-US" dirty="0"/>
           </a:p>
@@ -9253,7 +9253,7 @@
             <a:fld id="{B61BEF0D-F0BB-DE4B-95CE-6DB70DBA9567}" type="datetimeFigureOut">
               <a:rPr lang="en-US" dirty="0"/>
               <a:pPr/>
-              <a:t>3/10/2020</a:t>
+              <a:t>3/11/2020</a:t>
             </a:fld>
             <a:endParaRPr lang="en-US" dirty="0"/>
           </a:p>
@@ -9420,7 +9420,7 @@
             <a:fld id="{B61BEF0D-F0BB-DE4B-95CE-6DB70DBA9567}" type="datetimeFigureOut">
               <a:rPr lang="en-US" dirty="0"/>
               <a:pPr/>
-              <a:t>3/10/2020</a:t>
+              <a:t>3/11/2020</a:t>
             </a:fld>
             <a:endParaRPr lang="en-US" dirty="0"/>
           </a:p>
@@ -9667,7 +9667,7 @@
             <a:fld id="{B61BEF0D-F0BB-DE4B-95CE-6DB70DBA9567}" type="datetimeFigureOut">
               <a:rPr lang="en-US" dirty="0"/>
               <a:pPr/>
-              <a:t>3/10/2020</a:t>
+              <a:t>3/11/2020</a:t>
             </a:fld>
             <a:endParaRPr lang="en-US" dirty="0"/>
           </a:p>
@@ -9900,7 +9900,7 @@
             <a:fld id="{B61BEF0D-F0BB-DE4B-95CE-6DB70DBA9567}" type="datetimeFigureOut">
               <a:rPr lang="en-US" dirty="0"/>
               <a:pPr/>
-              <a:t>3/10/2020</a:t>
+              <a:t>3/11/2020</a:t>
             </a:fld>
             <a:endParaRPr lang="en-US" dirty="0"/>
           </a:p>
@@ -10279,7 +10279,7 @@
             <a:fld id="{B61BEF0D-F0BB-DE4B-95CE-6DB70DBA9567}" type="datetimeFigureOut">
               <a:rPr lang="en-US" dirty="0"/>
               <a:pPr/>
-              <a:t>3/10/2020</a:t>
+              <a:t>3/11/2020</a:t>
             </a:fld>
             <a:endParaRPr lang="en-US" dirty="0"/>
           </a:p>
@@ -10394,7 +10394,7 @@
             <a:fld id="{B61BEF0D-F0BB-DE4B-95CE-6DB70DBA9567}" type="datetimeFigureOut">
               <a:rPr lang="en-US" dirty="0"/>
               <a:pPr/>
-              <a:t>3/10/2020</a:t>
+              <a:t>3/11/2020</a:t>
             </a:fld>
             <a:endParaRPr lang="en-US" dirty="0"/>
           </a:p>
@@ -10486,7 +10486,7 @@
             <a:fld id="{B61BEF0D-F0BB-DE4B-95CE-6DB70DBA9567}" type="datetimeFigureOut">
               <a:rPr lang="en-US" dirty="0"/>
               <a:pPr/>
-              <a:t>3/10/2020</a:t>
+              <a:t>3/11/2020</a:t>
             </a:fld>
             <a:endParaRPr lang="en-US" dirty="0"/>
           </a:p>
@@ -10738,7 +10738,7 @@
             <a:fld id="{B61BEF0D-F0BB-DE4B-95CE-6DB70DBA9567}" type="datetimeFigureOut">
               <a:rPr lang="en-US" dirty="0"/>
               <a:pPr/>
-              <a:t>3/10/2020</a:t>
+              <a:t>3/11/2020</a:t>
             </a:fld>
             <a:endParaRPr lang="en-US" dirty="0"/>
           </a:p>
@@ -11018,7 +11018,7 @@
             <a:fld id="{B61BEF0D-F0BB-DE4B-95CE-6DB70DBA9567}" type="datetimeFigureOut">
               <a:rPr lang="en-US" dirty="0"/>
               <a:pPr/>
-              <a:t>3/10/2020</a:t>
+              <a:t>3/11/2020</a:t>
             </a:fld>
             <a:endParaRPr lang="en-US" dirty="0"/>
           </a:p>
@@ -11421,7 +11421,7 @@
             <a:fld id="{B61BEF0D-F0BB-DE4B-95CE-6DB70DBA9567}" type="datetimeFigureOut">
               <a:rPr lang="en-US" dirty="0"/>
               <a:pPr/>
-              <a:t>3/10/2020</a:t>
+              <a:t>3/11/2020</a:t>
             </a:fld>
             <a:endParaRPr lang="en-US" dirty="0"/>
           </a:p>
@@ -18880,6 +18880,147 @@
           </a:p>
         </p:txBody>
       </p:sp>
+      <p:pic>
+        <p:nvPicPr>
+          <p:cNvPr id="1028" name="Picture 4" descr="RÃ©sultat de recherche d'images pour &quot;windows 10 logo png&quot;">
+            <a:extLst>
+              <a:ext uri="{FF2B5EF4-FFF2-40B4-BE49-F238E27FC236}">
+                <a16:creationId xmlns:a16="http://schemas.microsoft.com/office/drawing/2014/main" id="{B943F35D-1A7B-4E6C-8DA1-3CCE1CDD91D5}"/>
+              </a:ext>
+            </a:extLst>
+          </p:cNvPr>
+          <p:cNvPicPr>
+            <a:picLocks noChangeAspect="1" noChangeArrowheads="1"/>
+          </p:cNvPicPr>
+          <p:nvPr/>
+        </p:nvPicPr>
+        <p:blipFill>
+          <a:blip r:embed="rId2">
+            <a:extLst>
+              <a:ext uri="{28A0092B-C50C-407E-A947-70E740481C1C}">
+                <a14:useLocalDpi xmlns:a14="http://schemas.microsoft.com/office/drawing/2010/main" val="0"/>
+              </a:ext>
+            </a:extLst>
+          </a:blip>
+          <a:srcRect/>
+          <a:stretch>
+            <a:fillRect/>
+          </a:stretch>
+        </p:blipFill>
+        <p:spPr bwMode="auto">
+          <a:xfrm>
+            <a:off x="2819400" y="3028950"/>
+            <a:ext cx="2028825" cy="2028825"/>
+          </a:xfrm>
+          <a:prstGeom prst="rect">
+            <a:avLst/>
+          </a:prstGeom>
+          <a:noFill/>
+          <a:extLst>
+            <a:ext uri="{909E8E84-426E-40DD-AFC4-6F175D3DCCD1}">
+              <a14:hiddenFill xmlns:a14="http://schemas.microsoft.com/office/drawing/2010/main">
+                <a:solidFill>
+                  <a:srgbClr val="FFFFFF"/>
+                </a:solidFill>
+              </a14:hiddenFill>
+            </a:ext>
+          </a:extLst>
+        </p:spPr>
+      </p:pic>
+      <p:pic>
+        <p:nvPicPr>
+          <p:cNvPr id="1030" name="Picture 6" descr="RÃ©sultat de recherche d'images pour &quot;OS X logo png&quot;">
+            <a:extLst>
+              <a:ext uri="{FF2B5EF4-FFF2-40B4-BE49-F238E27FC236}">
+                <a16:creationId xmlns:a16="http://schemas.microsoft.com/office/drawing/2014/main" id="{D260BE88-B9FC-4A76-8DD5-E827CBD8AD1A}"/>
+              </a:ext>
+            </a:extLst>
+          </p:cNvPr>
+          <p:cNvPicPr>
+            <a:picLocks noChangeAspect="1" noChangeArrowheads="1"/>
+          </p:cNvPicPr>
+          <p:nvPr/>
+        </p:nvPicPr>
+        <p:blipFill>
+          <a:blip r:embed="rId3">
+            <a:extLst>
+              <a:ext uri="{28A0092B-C50C-407E-A947-70E740481C1C}">
+                <a14:useLocalDpi xmlns:a14="http://schemas.microsoft.com/office/drawing/2010/main" val="0"/>
+              </a:ext>
+            </a:extLst>
+          </a:blip>
+          <a:srcRect/>
+          <a:stretch>
+            <a:fillRect/>
+          </a:stretch>
+        </p:blipFill>
+        <p:spPr bwMode="auto">
+          <a:xfrm>
+            <a:off x="5410200" y="3102502"/>
+            <a:ext cx="3455326" cy="1384830"/>
+          </a:xfrm>
+          <a:prstGeom prst="rect">
+            <a:avLst/>
+          </a:prstGeom>
+          <a:noFill/>
+          <a:extLst>
+            <a:ext uri="{909E8E84-426E-40DD-AFC4-6F175D3DCCD1}">
+              <a14:hiddenFill xmlns:a14="http://schemas.microsoft.com/office/drawing/2010/main">
+                <a:solidFill>
+                  <a:srgbClr val="FFFFFF"/>
+                </a:solidFill>
+              </a14:hiddenFill>
+            </a:ext>
+          </a:extLst>
+        </p:spPr>
+      </p:pic>
+      <p:pic>
+        <p:nvPicPr>
+          <p:cNvPr id="1032" name="Picture 8" descr="RÃ©sultat de recherche d'images pour &quot;linux logo png&quot;">
+            <a:extLst>
+              <a:ext uri="{FF2B5EF4-FFF2-40B4-BE49-F238E27FC236}">
+                <a16:creationId xmlns:a16="http://schemas.microsoft.com/office/drawing/2014/main" id="{BC3CBF51-4965-4D4A-967C-39BDD21829A6}"/>
+              </a:ext>
+            </a:extLst>
+          </p:cNvPr>
+          <p:cNvPicPr>
+            <a:picLocks noChangeAspect="1" noChangeArrowheads="1"/>
+          </p:cNvPicPr>
+          <p:nvPr/>
+        </p:nvPicPr>
+        <p:blipFill>
+          <a:blip r:embed="rId4">
+            <a:extLst>
+              <a:ext uri="{28A0092B-C50C-407E-A947-70E740481C1C}">
+                <a14:useLocalDpi xmlns:a14="http://schemas.microsoft.com/office/drawing/2010/main" val="0"/>
+              </a:ext>
+            </a:extLst>
+          </a:blip>
+          <a:srcRect/>
+          <a:stretch>
+            <a:fillRect/>
+          </a:stretch>
+        </p:blipFill>
+        <p:spPr bwMode="auto">
+          <a:xfrm>
+            <a:off x="9564204" y="3028950"/>
+            <a:ext cx="1981684" cy="2295525"/>
+          </a:xfrm>
+          <a:prstGeom prst="rect">
+            <a:avLst/>
+          </a:prstGeom>
+          <a:noFill/>
+          <a:extLst>
+            <a:ext uri="{909E8E84-426E-40DD-AFC4-6F175D3DCCD1}">
+              <a14:hiddenFill xmlns:a14="http://schemas.microsoft.com/office/drawing/2010/main">
+                <a:solidFill>
+                  <a:srgbClr val="FFFFFF"/>
+                </a:solidFill>
+              </a14:hiddenFill>
+            </a:ext>
+          </a:extLst>
+        </p:spPr>
+      </p:pic>
     </p:spTree>
     <p:extLst>
       <p:ext uri="{BB962C8B-B14F-4D97-AF65-F5344CB8AC3E}">

</xml_diff>

<commit_message>
#12 Logos from ppt added on issues slides
</commit_message>
<xml_diff>
--- a/SAI_presentation.pptx
+++ b/SAI_presentation.pptx
@@ -18910,7 +18910,7 @@
         <p:spPr bwMode="auto">
           <a:xfrm>
             <a:off x="2819400" y="3028950"/>
-            <a:ext cx="2028825" cy="2028825"/>
+            <a:ext cx="1272117" cy="1272117"/>
           </a:xfrm>
           <a:prstGeom prst="rect">
             <a:avLst/>
@@ -18956,8 +18956,8 @@
         </p:blipFill>
         <p:spPr bwMode="auto">
           <a:xfrm>
-            <a:off x="5410200" y="3102502"/>
-            <a:ext cx="3455326" cy="1384830"/>
+            <a:off x="4842029" y="3102502"/>
+            <a:ext cx="2359679" cy="945715"/>
           </a:xfrm>
           <a:prstGeom prst="rect">
             <a:avLst/>
@@ -19003,8 +19003,8 @@
         </p:blipFill>
         <p:spPr bwMode="auto">
           <a:xfrm>
-            <a:off x="9564204" y="3028950"/>
-            <a:ext cx="1981684" cy="2295525"/>
+            <a:off x="7952220" y="2720352"/>
+            <a:ext cx="1525401" cy="1766980"/>
           </a:xfrm>
           <a:prstGeom prst="rect">
             <a:avLst/>
@@ -19019,6 +19019,78 @@
               </a14:hiddenFill>
             </a:ext>
           </a:extLst>
+        </p:spPr>
+      </p:pic>
+      <p:pic>
+        <p:nvPicPr>
+          <p:cNvPr id="5" name="Graphique 4" descr="Caméra vidéo">
+            <a:extLst>
+              <a:ext uri="{FF2B5EF4-FFF2-40B4-BE49-F238E27FC236}">
+                <a16:creationId xmlns:a16="http://schemas.microsoft.com/office/drawing/2014/main" id="{5E7BB6DA-FEFB-472E-90E6-C5753B78828E}"/>
+              </a:ext>
+            </a:extLst>
+          </p:cNvPr>
+          <p:cNvPicPr>
+            <a:picLocks noChangeAspect="1"/>
+          </p:cNvPicPr>
+          <p:nvPr/>
+        </p:nvPicPr>
+        <p:blipFill>
+          <a:blip r:embed="rId5">
+            <a:extLst>
+              <a:ext uri="{96DAC541-7B7A-43D3-8B79-37D633B846F1}">
+                <asvg:svgBlip xmlns:asvg="http://schemas.microsoft.com/office/drawing/2016/SVG/main" r:embed="rId6"/>
+              </a:ext>
+            </a:extLst>
+          </a:blip>
+          <a:stretch>
+            <a:fillRect/>
+          </a:stretch>
+        </p:blipFill>
+        <p:spPr>
+          <a:xfrm>
+            <a:off x="7345020" y="1213285"/>
+            <a:ext cx="914400" cy="914400"/>
+          </a:xfrm>
+          <a:prstGeom prst="rect">
+            <a:avLst/>
+          </a:prstGeom>
+        </p:spPr>
+      </p:pic>
+      <p:pic>
+        <p:nvPicPr>
+          <p:cNvPr id="7" name="Graphique 6" descr="Microphone">
+            <a:extLst>
+              <a:ext uri="{FF2B5EF4-FFF2-40B4-BE49-F238E27FC236}">
+                <a16:creationId xmlns:a16="http://schemas.microsoft.com/office/drawing/2014/main" id="{1CFBF61F-E947-4CCD-8C33-2B8DE915A526}"/>
+              </a:ext>
+            </a:extLst>
+          </p:cNvPr>
+          <p:cNvPicPr>
+            <a:picLocks noChangeAspect="1"/>
+          </p:cNvPicPr>
+          <p:nvPr/>
+        </p:nvPicPr>
+        <p:blipFill>
+          <a:blip r:embed="rId7">
+            <a:extLst>
+              <a:ext uri="{96DAC541-7B7A-43D3-8B79-37D633B846F1}">
+                <asvg:svgBlip xmlns:asvg="http://schemas.microsoft.com/office/drawing/2016/SVG/main" r:embed="rId8"/>
+              </a:ext>
+            </a:extLst>
+          </a:blip>
+          <a:stretch>
+            <a:fillRect/>
+          </a:stretch>
+        </p:blipFill>
+        <p:spPr>
+          <a:xfrm>
+            <a:off x="7495020" y="1363285"/>
+            <a:ext cx="914400" cy="914400"/>
+          </a:xfrm>
+          <a:prstGeom prst="rect">
+            <a:avLst/>
+          </a:prstGeom>
         </p:spPr>
       </p:pic>
     </p:spTree>

</xml_diff>

<commit_message>
#12 Boxes for logos added on issues slides
</commit_message>
<xml_diff>
--- a/SAI_presentation.pptx
+++ b/SAI_presentation.pptx
@@ -18782,6 +18782,98 @@
       </p:grpSpPr>
       <p:sp>
         <p:nvSpPr>
+          <p:cNvPr id="6" name="Rectangle 5">
+            <a:extLst>
+              <a:ext uri="{FF2B5EF4-FFF2-40B4-BE49-F238E27FC236}">
+                <a16:creationId xmlns:a16="http://schemas.microsoft.com/office/drawing/2014/main" id="{183AA359-6AC9-4C7D-A2F7-3C815F26ED45}"/>
+              </a:ext>
+            </a:extLst>
+          </p:cNvPr>
+          <p:cNvSpPr/>
+          <p:nvPr/>
+        </p:nvSpPr>
+        <p:spPr>
+          <a:xfrm>
+            <a:off x="3923930" y="3719744"/>
+            <a:ext cx="4456590" cy="1367161"/>
+          </a:xfrm>
+          <a:prstGeom prst="rect">
+            <a:avLst/>
+          </a:prstGeom>
+        </p:spPr>
+        <p:style>
+          <a:lnRef idx="2">
+            <a:schemeClr val="accent1">
+              <a:shade val="50000"/>
+            </a:schemeClr>
+          </a:lnRef>
+          <a:fillRef idx="1">
+            <a:schemeClr val="accent1"/>
+          </a:fillRef>
+          <a:effectRef idx="0">
+            <a:schemeClr val="accent1"/>
+          </a:effectRef>
+          <a:fontRef idx="minor">
+            <a:schemeClr val="lt1"/>
+          </a:fontRef>
+        </p:style>
+        <p:txBody>
+          <a:bodyPr rtlCol="0" anchor="ctr"/>
+          <a:lstStyle/>
+          <a:p>
+            <a:pPr algn="ctr"/>
+            <a:endParaRPr lang="en-GB" dirty="0"/>
+          </a:p>
+        </p:txBody>
+      </p:sp>
+      <p:sp>
+        <p:nvSpPr>
+          <p:cNvPr id="4" name="Rectangle 3">
+            <a:extLst>
+              <a:ext uri="{FF2B5EF4-FFF2-40B4-BE49-F238E27FC236}">
+                <a16:creationId xmlns:a16="http://schemas.microsoft.com/office/drawing/2014/main" id="{5FE974CB-A904-49AA-B075-49D66F427928}"/>
+              </a:ext>
+            </a:extLst>
+          </p:cNvPr>
+          <p:cNvSpPr/>
+          <p:nvPr/>
+        </p:nvSpPr>
+        <p:spPr>
+          <a:xfrm>
+            <a:off x="2465032" y="1683189"/>
+            <a:ext cx="8072761" cy="1953245"/>
+          </a:xfrm>
+          <a:prstGeom prst="rect">
+            <a:avLst/>
+          </a:prstGeom>
+        </p:spPr>
+        <p:style>
+          <a:lnRef idx="2">
+            <a:schemeClr val="accent1">
+              <a:shade val="50000"/>
+            </a:schemeClr>
+          </a:lnRef>
+          <a:fillRef idx="1">
+            <a:schemeClr val="accent1"/>
+          </a:fillRef>
+          <a:effectRef idx="0">
+            <a:schemeClr val="accent1"/>
+          </a:effectRef>
+          <a:fontRef idx="minor">
+            <a:schemeClr val="lt1"/>
+          </a:fontRef>
+        </p:style>
+        <p:txBody>
+          <a:bodyPr rtlCol="0" anchor="ctr"/>
+          <a:lstStyle/>
+          <a:p>
+            <a:pPr algn="ctr"/>
+            <a:endParaRPr lang="en-GB"/>
+          </a:p>
+        </p:txBody>
+      </p:sp>
+      <p:sp>
+        <p:nvSpPr>
           <p:cNvPr id="2" name="Titre 1">
             <a:extLst>
               <a:ext uri="{FF2B5EF4-FFF2-40B4-BE49-F238E27FC236}">
@@ -18873,9 +18965,30 @@
               <a:t> to </a:t>
             </a:r>
             <a:r>
-              <a:rPr lang="fr-FR"/>
-              <a:t>understand </a:t>
-            </a:r>
+              <a:rPr lang="fr-FR" dirty="0" err="1"/>
+              <a:t>understand</a:t>
+            </a:r>
+            <a:r>
+              <a:rPr lang="fr-FR" dirty="0"/>
+              <a:t> </a:t>
+            </a:r>
+          </a:p>
+          <a:p>
+            <a:endParaRPr lang="fr-FR" dirty="0"/>
+          </a:p>
+          <a:p>
+            <a:endParaRPr lang="fr-FR" dirty="0"/>
+          </a:p>
+          <a:p>
+            <a:endParaRPr lang="fr-FR" dirty="0"/>
+          </a:p>
+          <a:p>
+            <a:endParaRPr lang="fr-FR" dirty="0"/>
+          </a:p>
+          <a:p>
+            <a:endParaRPr lang="fr-FR" dirty="0"/>
+          </a:p>
+          <a:p>
             <a:endParaRPr lang="en-GB" dirty="0"/>
           </a:p>
         </p:txBody>
@@ -18909,7 +19022,7 @@
         </p:blipFill>
         <p:spPr bwMode="auto">
           <a:xfrm>
-            <a:off x="2819400" y="3028950"/>
+            <a:off x="2882946" y="2033588"/>
             <a:ext cx="1272117" cy="1272117"/>
           </a:xfrm>
           <a:prstGeom prst="rect">
@@ -18956,7 +19069,7 @@
         </p:blipFill>
         <p:spPr bwMode="auto">
           <a:xfrm>
-            <a:off x="4842029" y="3102502"/>
+            <a:off x="7678987" y="2186953"/>
             <a:ext cx="2359679" cy="945715"/>
           </a:xfrm>
           <a:prstGeom prst="rect">
@@ -19003,7 +19116,7 @@
         </p:blipFill>
         <p:spPr bwMode="auto">
           <a:xfrm>
-            <a:off x="7952220" y="2720352"/>
+            <a:off x="5597105" y="1683189"/>
             <a:ext cx="1525401" cy="1766980"/>
           </a:xfrm>
           <a:prstGeom prst="rect">
@@ -19049,7 +19162,7 @@
         </p:blipFill>
         <p:spPr>
           <a:xfrm>
-            <a:off x="7345020" y="1213285"/>
+            <a:off x="4951412" y="3843867"/>
             <a:ext cx="914400" cy="914400"/>
           </a:xfrm>
           <a:prstGeom prst="rect">
@@ -19085,7 +19198,7 @@
         </p:blipFill>
         <p:spPr>
           <a:xfrm>
-            <a:off x="7495020" y="1363285"/>
+            <a:off x="6326190" y="3843867"/>
             <a:ext cx="914400" cy="914400"/>
           </a:xfrm>
           <a:prstGeom prst="rect">

</xml_diff>

<commit_message>
#12 Boxes placements updated on issues slides
</commit_message>
<xml_diff>
--- a/SAI_presentation.pptx
+++ b/SAI_presentation.pptx
@@ -6942,7 +6942,7 @@
             <a:fld id="{B61BEF0D-F0BB-DE4B-95CE-6DB70DBA9567}" type="datetimeFigureOut">
               <a:rPr lang="en-US" dirty="0"/>
               <a:pPr/>
-              <a:t>3/12/2020</a:t>
+              <a:t>3/13/2020</a:t>
             </a:fld>
             <a:endParaRPr lang="en-US" dirty="0"/>
           </a:p>
@@ -7375,7 +7375,7 @@
             <a:fld id="{B61BEF0D-F0BB-DE4B-95CE-6DB70DBA9567}" type="datetimeFigureOut">
               <a:rPr lang="en-US" dirty="0"/>
               <a:pPr/>
-              <a:t>3/12/2020</a:t>
+              <a:t>3/13/2020</a:t>
             </a:fld>
             <a:endParaRPr lang="en-US" dirty="0"/>
           </a:p>
@@ -7622,7 +7622,7 @@
             <a:fld id="{B61BEF0D-F0BB-DE4B-95CE-6DB70DBA9567}" type="datetimeFigureOut">
               <a:rPr lang="en-US" dirty="0"/>
               <a:pPr/>
-              <a:t>3/12/2020</a:t>
+              <a:t>3/13/2020</a:t>
             </a:fld>
             <a:endParaRPr lang="en-US" dirty="0"/>
           </a:p>
@@ -7927,7 +7927,7 @@
             <a:fld id="{B61BEF0D-F0BB-DE4B-95CE-6DB70DBA9567}" type="datetimeFigureOut">
               <a:rPr lang="en-US" dirty="0"/>
               <a:pPr/>
-              <a:t>3/12/2020</a:t>
+              <a:t>3/13/2020</a:t>
             </a:fld>
             <a:endParaRPr lang="en-US" dirty="0"/>
           </a:p>
@@ -8242,7 +8242,7 @@
             <a:fld id="{B61BEF0D-F0BB-DE4B-95CE-6DB70DBA9567}" type="datetimeFigureOut">
               <a:rPr lang="en-US" dirty="0"/>
               <a:pPr/>
-              <a:t>3/12/2020</a:t>
+              <a:t>3/13/2020</a:t>
             </a:fld>
             <a:endParaRPr lang="en-US" dirty="0"/>
           </a:p>
@@ -8541,7 +8541,7 @@
             <a:fld id="{B61BEF0D-F0BB-DE4B-95CE-6DB70DBA9567}" type="datetimeFigureOut">
               <a:rPr lang="en-US" dirty="0"/>
               <a:pPr/>
-              <a:t>3/12/2020</a:t>
+              <a:t>3/13/2020</a:t>
             </a:fld>
             <a:endParaRPr lang="en-US" dirty="0"/>
           </a:p>
@@ -8905,7 +8905,7 @@
             <a:fld id="{B61BEF0D-F0BB-DE4B-95CE-6DB70DBA9567}" type="datetimeFigureOut">
               <a:rPr lang="en-US" dirty="0"/>
               <a:pPr/>
-              <a:t>3/12/2020</a:t>
+              <a:t>3/13/2020</a:t>
             </a:fld>
             <a:endParaRPr lang="en-US" dirty="0"/>
           </a:p>
@@ -9076,7 +9076,7 @@
             <a:fld id="{B61BEF0D-F0BB-DE4B-95CE-6DB70DBA9567}" type="datetimeFigureOut">
               <a:rPr lang="en-US" dirty="0"/>
               <a:pPr/>
-              <a:t>3/12/2020</a:t>
+              <a:t>3/13/2020</a:t>
             </a:fld>
             <a:endParaRPr lang="en-US" dirty="0"/>
           </a:p>
@@ -9253,7 +9253,7 @@
             <a:fld id="{B61BEF0D-F0BB-DE4B-95CE-6DB70DBA9567}" type="datetimeFigureOut">
               <a:rPr lang="en-US" dirty="0"/>
               <a:pPr/>
-              <a:t>3/12/2020</a:t>
+              <a:t>3/13/2020</a:t>
             </a:fld>
             <a:endParaRPr lang="en-US" dirty="0"/>
           </a:p>
@@ -9420,7 +9420,7 @@
             <a:fld id="{B61BEF0D-F0BB-DE4B-95CE-6DB70DBA9567}" type="datetimeFigureOut">
               <a:rPr lang="en-US" dirty="0"/>
               <a:pPr/>
-              <a:t>3/12/2020</a:t>
+              <a:t>3/13/2020</a:t>
             </a:fld>
             <a:endParaRPr lang="en-US" dirty="0"/>
           </a:p>
@@ -9667,7 +9667,7 @@
             <a:fld id="{B61BEF0D-F0BB-DE4B-95CE-6DB70DBA9567}" type="datetimeFigureOut">
               <a:rPr lang="en-US" dirty="0"/>
               <a:pPr/>
-              <a:t>3/12/2020</a:t>
+              <a:t>3/13/2020</a:t>
             </a:fld>
             <a:endParaRPr lang="en-US" dirty="0"/>
           </a:p>
@@ -9900,7 +9900,7 @@
             <a:fld id="{B61BEF0D-F0BB-DE4B-95CE-6DB70DBA9567}" type="datetimeFigureOut">
               <a:rPr lang="en-US" dirty="0"/>
               <a:pPr/>
-              <a:t>3/12/2020</a:t>
+              <a:t>3/13/2020</a:t>
             </a:fld>
             <a:endParaRPr lang="en-US" dirty="0"/>
           </a:p>
@@ -10279,7 +10279,7 @@
             <a:fld id="{B61BEF0D-F0BB-DE4B-95CE-6DB70DBA9567}" type="datetimeFigureOut">
               <a:rPr lang="en-US" dirty="0"/>
               <a:pPr/>
-              <a:t>3/12/2020</a:t>
+              <a:t>3/13/2020</a:t>
             </a:fld>
             <a:endParaRPr lang="en-US" dirty="0"/>
           </a:p>
@@ -10394,7 +10394,7 @@
             <a:fld id="{B61BEF0D-F0BB-DE4B-95CE-6DB70DBA9567}" type="datetimeFigureOut">
               <a:rPr lang="en-US" dirty="0"/>
               <a:pPr/>
-              <a:t>3/12/2020</a:t>
+              <a:t>3/13/2020</a:t>
             </a:fld>
             <a:endParaRPr lang="en-US" dirty="0"/>
           </a:p>
@@ -10486,7 +10486,7 @@
             <a:fld id="{B61BEF0D-F0BB-DE4B-95CE-6DB70DBA9567}" type="datetimeFigureOut">
               <a:rPr lang="en-US" dirty="0"/>
               <a:pPr/>
-              <a:t>3/12/2020</a:t>
+              <a:t>3/13/2020</a:t>
             </a:fld>
             <a:endParaRPr lang="en-US" dirty="0"/>
           </a:p>
@@ -10738,7 +10738,7 @@
             <a:fld id="{B61BEF0D-F0BB-DE4B-95CE-6DB70DBA9567}" type="datetimeFigureOut">
               <a:rPr lang="en-US" dirty="0"/>
               <a:pPr/>
-              <a:t>3/12/2020</a:t>
+              <a:t>3/13/2020</a:t>
             </a:fld>
             <a:endParaRPr lang="en-US" dirty="0"/>
           </a:p>
@@ -11018,7 +11018,7 @@
             <a:fld id="{B61BEF0D-F0BB-DE4B-95CE-6DB70DBA9567}" type="datetimeFigureOut">
               <a:rPr lang="en-US" dirty="0"/>
               <a:pPr/>
-              <a:t>3/12/2020</a:t>
+              <a:t>3/13/2020</a:t>
             </a:fld>
             <a:endParaRPr lang="en-US" dirty="0"/>
           </a:p>
@@ -11421,7 +11421,7 @@
             <a:fld id="{B61BEF0D-F0BB-DE4B-95CE-6DB70DBA9567}" type="datetimeFigureOut">
               <a:rPr lang="en-US" dirty="0"/>
               <a:pPr/>
-              <a:t>3/12/2020</a:t>
+              <a:t>3/13/2020</a:t>
             </a:fld>
             <a:endParaRPr lang="en-US" dirty="0"/>
           </a:p>
@@ -18794,8 +18794,8 @@
         </p:nvSpPr>
         <p:spPr>
           <a:xfrm>
-            <a:off x="3923930" y="3719744"/>
-            <a:ext cx="4456590" cy="1367161"/>
+            <a:off x="5527786" y="1683190"/>
+            <a:ext cx="988424" cy="3232955"/>
           </a:xfrm>
           <a:prstGeom prst="rect">
             <a:avLst/>
@@ -18840,8 +18840,8 @@
         </p:nvSpPr>
         <p:spPr>
           <a:xfrm>
-            <a:off x="2465032" y="1683189"/>
-            <a:ext cx="8072761" cy="1953245"/>
+            <a:off x="2465033" y="1683189"/>
+            <a:ext cx="620806" cy="3232956"/>
           </a:xfrm>
           <a:prstGeom prst="rect">
             <a:avLst/>
@@ -18962,16 +18962,91 @@
           </a:p>
           <a:p>
             <a:r>
-              <a:rPr lang="fr-FR"/>
-              <a:t>We need to add an adapter that translate the data from the mic and the screen</a:t>
-            </a:r>
-          </a:p>
-          <a:p>
-            <a:r>
-              <a:rPr lang="fr-FR"/>
-              <a:t>This adapter will detect the os before interpreting inputs</a:t>
-            </a:r>
-            <a:endParaRPr lang="fr-FR" dirty="0"/>
+              <a:rPr lang="fr-FR" dirty="0" err="1"/>
+              <a:t>We</a:t>
+            </a:r>
+            <a:r>
+              <a:rPr lang="fr-FR" dirty="0"/>
+              <a:t> </a:t>
+            </a:r>
+            <a:r>
+              <a:rPr lang="fr-FR" dirty="0" err="1"/>
+              <a:t>need</a:t>
+            </a:r>
+            <a:r>
+              <a:rPr lang="fr-FR" dirty="0"/>
+              <a:t> to </a:t>
+            </a:r>
+            <a:r>
+              <a:rPr lang="fr-FR" dirty="0" err="1"/>
+              <a:t>add</a:t>
+            </a:r>
+            <a:r>
+              <a:rPr lang="fr-FR" dirty="0"/>
+              <a:t> an adapter </a:t>
+            </a:r>
+            <a:r>
+              <a:rPr lang="fr-FR" dirty="0" err="1"/>
+              <a:t>that</a:t>
+            </a:r>
+            <a:r>
+              <a:rPr lang="fr-FR" dirty="0"/>
+              <a:t> translate the data </a:t>
+            </a:r>
+            <a:r>
+              <a:rPr lang="fr-FR" dirty="0" err="1"/>
+              <a:t>from</a:t>
+            </a:r>
+            <a:r>
+              <a:rPr lang="fr-FR" dirty="0"/>
+              <a:t> the </a:t>
+            </a:r>
+            <a:r>
+              <a:rPr lang="fr-FR" dirty="0" err="1"/>
+              <a:t>mic</a:t>
+            </a:r>
+            <a:r>
+              <a:rPr lang="fr-FR" dirty="0"/>
+              <a:t> and the screen</a:t>
+            </a:r>
+          </a:p>
+          <a:p>
+            <a:r>
+              <a:rPr lang="fr-FR" dirty="0"/>
+              <a:t>This adapter </a:t>
+            </a:r>
+            <a:r>
+              <a:rPr lang="fr-FR" dirty="0" err="1"/>
+              <a:t>will</a:t>
+            </a:r>
+            <a:r>
+              <a:rPr lang="fr-FR" dirty="0"/>
+              <a:t> </a:t>
+            </a:r>
+            <a:r>
+              <a:rPr lang="fr-FR" dirty="0" err="1"/>
+              <a:t>detect</a:t>
+            </a:r>
+            <a:r>
+              <a:rPr lang="fr-FR" dirty="0"/>
+              <a:t> the os </a:t>
+            </a:r>
+            <a:r>
+              <a:rPr lang="fr-FR" dirty="0" err="1"/>
+              <a:t>before</a:t>
+            </a:r>
+            <a:r>
+              <a:rPr lang="fr-FR" dirty="0"/>
+              <a:t> </a:t>
+            </a:r>
+            <a:r>
+              <a:rPr lang="fr-FR" dirty="0" err="1"/>
+              <a:t>interpreting</a:t>
+            </a:r>
+            <a:r>
+              <a:rPr lang="fr-FR" dirty="0"/>
+              <a:t> inputs</a:t>
+            </a:r>
           </a:p>
           <a:p>
             <a:endParaRPr lang="fr-FR" dirty="0"/>
@@ -19022,8 +19097,8 @@
         </p:blipFill>
         <p:spPr bwMode="auto">
           <a:xfrm>
-            <a:off x="2882946" y="2033588"/>
-            <a:ext cx="1272117" cy="1272117"/>
+            <a:off x="676867" y="1689264"/>
+            <a:ext cx="854553" cy="854553"/>
           </a:xfrm>
           <a:prstGeom prst="rect">
             <a:avLst/>
@@ -19069,8 +19144,8 @@
         </p:blipFill>
         <p:spPr bwMode="auto">
           <a:xfrm>
-            <a:off x="7678987" y="2186953"/>
-            <a:ext cx="2359679" cy="945715"/>
+            <a:off x="576926" y="4013969"/>
+            <a:ext cx="1181100" cy="473363"/>
           </a:xfrm>
           <a:prstGeom prst="rect">
             <a:avLst/>
@@ -19116,8 +19191,8 @@
         </p:blipFill>
         <p:spPr bwMode="auto">
           <a:xfrm>
-            <a:off x="5597105" y="1683189"/>
-            <a:ext cx="1525401" cy="1766980"/>
+            <a:off x="633302" y="2642799"/>
+            <a:ext cx="898118" cy="1040354"/>
           </a:xfrm>
           <a:prstGeom prst="rect">
             <a:avLst/>
@@ -19162,7 +19237,7 @@
         </p:blipFill>
         <p:spPr>
           <a:xfrm>
-            <a:off x="4951412" y="3843867"/>
+            <a:off x="4506100" y="2123664"/>
             <a:ext cx="914400" cy="914400"/>
           </a:xfrm>
           <a:prstGeom prst="rect">
@@ -19198,7 +19273,7 @@
         </p:blipFill>
         <p:spPr>
           <a:xfrm>
-            <a:off x="6326190" y="3843867"/>
+            <a:off x="4506100" y="3299667"/>
             <a:ext cx="914400" cy="914400"/>
           </a:xfrm>
           <a:prstGeom prst="rect">

</xml_diff>

<commit_message>
#12 Boxes colors updated on issues slides
</commit_message>
<xml_diff>
--- a/SAI_presentation.pptx
+++ b/SAI_presentation.pptx
@@ -18795,11 +18795,25 @@
         <p:spPr>
           <a:xfrm>
             <a:off x="5527786" y="1683190"/>
-            <a:ext cx="988424" cy="3232955"/>
+            <a:ext cx="620807" cy="3232956"/>
           </a:xfrm>
           <a:prstGeom prst="rect">
             <a:avLst/>
           </a:prstGeom>
+          <a:solidFill>
+            <a:schemeClr val="tx2">
+              <a:lumMod val="60000"/>
+              <a:lumOff val="40000"/>
+            </a:schemeClr>
+          </a:solidFill>
+          <a:ln>
+            <a:solidFill>
+              <a:schemeClr val="tx2">
+                <a:lumMod val="60000"/>
+                <a:lumOff val="40000"/>
+              </a:schemeClr>
+            </a:solidFill>
+          </a:ln>
         </p:spPr>
         <p:style>
           <a:lnRef idx="2">
@@ -18846,6 +18860,20 @@
           <a:prstGeom prst="rect">
             <a:avLst/>
           </a:prstGeom>
+          <a:solidFill>
+            <a:schemeClr val="tx2">
+              <a:lumMod val="60000"/>
+              <a:lumOff val="40000"/>
+            </a:schemeClr>
+          </a:solidFill>
+          <a:ln>
+            <a:solidFill>
+              <a:schemeClr val="tx2">
+                <a:lumMod val="60000"/>
+                <a:lumOff val="40000"/>
+              </a:schemeClr>
+            </a:solidFill>
+          </a:ln>
         </p:spPr>
         <p:style>
           <a:lnRef idx="2">

</xml_diff>

<commit_message>
#12 Boxes colors linked with text on issues slides
</commit_message>
<xml_diff>
--- a/SAI_presentation.pptx
+++ b/SAI_presentation.pptx
@@ -18801,17 +18801,11 @@
             <a:avLst/>
           </a:prstGeom>
           <a:solidFill>
-            <a:schemeClr val="tx2">
-              <a:lumMod val="60000"/>
-              <a:lumOff val="40000"/>
-            </a:schemeClr>
+            <a:srgbClr val="00B050"/>
           </a:solidFill>
           <a:ln>
             <a:solidFill>
-              <a:schemeClr val="tx2">
-                <a:lumMod val="60000"/>
-                <a:lumOff val="40000"/>
-              </a:schemeClr>
+              <a:srgbClr val="00B050"/>
             </a:solidFill>
           </a:ln>
         </p:spPr>
@@ -18861,17 +18855,11 @@
             <a:avLst/>
           </a:prstGeom>
           <a:solidFill>
-            <a:schemeClr val="tx2">
-              <a:lumMod val="60000"/>
-              <a:lumOff val="40000"/>
-            </a:schemeClr>
+            <a:srgbClr val="FFFF00"/>
           </a:solidFill>
           <a:ln>
             <a:solidFill>
-              <a:schemeClr val="tx2">
-                <a:lumMod val="60000"/>
-                <a:lumOff val="40000"/>
-              </a:schemeClr>
+              <a:srgbClr val="FFFF00"/>
             </a:solidFill>
           </a:ln>
         </p:spPr>
@@ -18985,7 +18973,15 @@
             </a:r>
             <a:r>
               <a:rPr lang="fr-FR" dirty="0"/>
-              <a:t> support</a:t>
+              <a:t> </a:t>
+            </a:r>
+            <a:r>
+              <a:rPr lang="fr-FR" b="1" dirty="0">
+                <a:solidFill>
+                  <a:srgbClr val="FFFF00"/>
+                </a:solidFill>
+              </a:rPr>
+              <a:t>operating system</a:t>
             </a:r>
           </a:p>
           <a:p>
@@ -19073,7 +19069,15 @@
             </a:r>
             <a:r>
               <a:rPr lang="fr-FR" dirty="0"/>
-              <a:t> inputs</a:t>
+              <a:t> </a:t>
+            </a:r>
+            <a:r>
+              <a:rPr lang="fr-FR" b="1" dirty="0">
+                <a:solidFill>
+                  <a:srgbClr val="00B050"/>
+                </a:solidFill>
+              </a:rPr>
+              <a:t>inputs</a:t>
             </a:r>
           </a:p>
           <a:p>

</xml_diff>

<commit_message>
#12 Boxes colors updated on solutions on issues slides
</commit_message>
<xml_diff>
--- a/SAI_presentation.pptx
+++ b/SAI_presentation.pptx
@@ -6942,7 +6942,7 @@
             <a:fld id="{B61BEF0D-F0BB-DE4B-95CE-6DB70DBA9567}" type="datetimeFigureOut">
               <a:rPr lang="en-US" dirty="0"/>
               <a:pPr/>
-              <a:t>3/13/2020</a:t>
+              <a:t>3/14/2020</a:t>
             </a:fld>
             <a:endParaRPr lang="en-US" dirty="0"/>
           </a:p>
@@ -7375,7 +7375,7 @@
             <a:fld id="{B61BEF0D-F0BB-DE4B-95CE-6DB70DBA9567}" type="datetimeFigureOut">
               <a:rPr lang="en-US" dirty="0"/>
               <a:pPr/>
-              <a:t>3/13/2020</a:t>
+              <a:t>3/14/2020</a:t>
             </a:fld>
             <a:endParaRPr lang="en-US" dirty="0"/>
           </a:p>
@@ -7622,7 +7622,7 @@
             <a:fld id="{B61BEF0D-F0BB-DE4B-95CE-6DB70DBA9567}" type="datetimeFigureOut">
               <a:rPr lang="en-US" dirty="0"/>
               <a:pPr/>
-              <a:t>3/13/2020</a:t>
+              <a:t>3/14/2020</a:t>
             </a:fld>
             <a:endParaRPr lang="en-US" dirty="0"/>
           </a:p>
@@ -7927,7 +7927,7 @@
             <a:fld id="{B61BEF0D-F0BB-DE4B-95CE-6DB70DBA9567}" type="datetimeFigureOut">
               <a:rPr lang="en-US" dirty="0"/>
               <a:pPr/>
-              <a:t>3/13/2020</a:t>
+              <a:t>3/14/2020</a:t>
             </a:fld>
             <a:endParaRPr lang="en-US" dirty="0"/>
           </a:p>
@@ -8242,7 +8242,7 @@
             <a:fld id="{B61BEF0D-F0BB-DE4B-95CE-6DB70DBA9567}" type="datetimeFigureOut">
               <a:rPr lang="en-US" dirty="0"/>
               <a:pPr/>
-              <a:t>3/13/2020</a:t>
+              <a:t>3/14/2020</a:t>
             </a:fld>
             <a:endParaRPr lang="en-US" dirty="0"/>
           </a:p>
@@ -8541,7 +8541,7 @@
             <a:fld id="{B61BEF0D-F0BB-DE4B-95CE-6DB70DBA9567}" type="datetimeFigureOut">
               <a:rPr lang="en-US" dirty="0"/>
               <a:pPr/>
-              <a:t>3/13/2020</a:t>
+              <a:t>3/14/2020</a:t>
             </a:fld>
             <a:endParaRPr lang="en-US" dirty="0"/>
           </a:p>
@@ -8905,7 +8905,7 @@
             <a:fld id="{B61BEF0D-F0BB-DE4B-95CE-6DB70DBA9567}" type="datetimeFigureOut">
               <a:rPr lang="en-US" dirty="0"/>
               <a:pPr/>
-              <a:t>3/13/2020</a:t>
+              <a:t>3/14/2020</a:t>
             </a:fld>
             <a:endParaRPr lang="en-US" dirty="0"/>
           </a:p>
@@ -9076,7 +9076,7 @@
             <a:fld id="{B61BEF0D-F0BB-DE4B-95CE-6DB70DBA9567}" type="datetimeFigureOut">
               <a:rPr lang="en-US" dirty="0"/>
               <a:pPr/>
-              <a:t>3/13/2020</a:t>
+              <a:t>3/14/2020</a:t>
             </a:fld>
             <a:endParaRPr lang="en-US" dirty="0"/>
           </a:p>
@@ -9253,7 +9253,7 @@
             <a:fld id="{B61BEF0D-F0BB-DE4B-95CE-6DB70DBA9567}" type="datetimeFigureOut">
               <a:rPr lang="en-US" dirty="0"/>
               <a:pPr/>
-              <a:t>3/13/2020</a:t>
+              <a:t>3/14/2020</a:t>
             </a:fld>
             <a:endParaRPr lang="en-US" dirty="0"/>
           </a:p>
@@ -9420,7 +9420,7 @@
             <a:fld id="{B61BEF0D-F0BB-DE4B-95CE-6DB70DBA9567}" type="datetimeFigureOut">
               <a:rPr lang="en-US" dirty="0"/>
               <a:pPr/>
-              <a:t>3/13/2020</a:t>
+              <a:t>3/14/2020</a:t>
             </a:fld>
             <a:endParaRPr lang="en-US" dirty="0"/>
           </a:p>
@@ -9667,7 +9667,7 @@
             <a:fld id="{B61BEF0D-F0BB-DE4B-95CE-6DB70DBA9567}" type="datetimeFigureOut">
               <a:rPr lang="en-US" dirty="0"/>
               <a:pPr/>
-              <a:t>3/13/2020</a:t>
+              <a:t>3/14/2020</a:t>
             </a:fld>
             <a:endParaRPr lang="en-US" dirty="0"/>
           </a:p>
@@ -9900,7 +9900,7 @@
             <a:fld id="{B61BEF0D-F0BB-DE4B-95CE-6DB70DBA9567}" type="datetimeFigureOut">
               <a:rPr lang="en-US" dirty="0"/>
               <a:pPr/>
-              <a:t>3/13/2020</a:t>
+              <a:t>3/14/2020</a:t>
             </a:fld>
             <a:endParaRPr lang="en-US" dirty="0"/>
           </a:p>
@@ -10279,7 +10279,7 @@
             <a:fld id="{B61BEF0D-F0BB-DE4B-95CE-6DB70DBA9567}" type="datetimeFigureOut">
               <a:rPr lang="en-US" dirty="0"/>
               <a:pPr/>
-              <a:t>3/13/2020</a:t>
+              <a:t>3/14/2020</a:t>
             </a:fld>
             <a:endParaRPr lang="en-US" dirty="0"/>
           </a:p>
@@ -10394,7 +10394,7 @@
             <a:fld id="{B61BEF0D-F0BB-DE4B-95CE-6DB70DBA9567}" type="datetimeFigureOut">
               <a:rPr lang="en-US" dirty="0"/>
               <a:pPr/>
-              <a:t>3/13/2020</a:t>
+              <a:t>3/14/2020</a:t>
             </a:fld>
             <a:endParaRPr lang="en-US" dirty="0"/>
           </a:p>
@@ -10486,7 +10486,7 @@
             <a:fld id="{B61BEF0D-F0BB-DE4B-95CE-6DB70DBA9567}" type="datetimeFigureOut">
               <a:rPr lang="en-US" dirty="0"/>
               <a:pPr/>
-              <a:t>3/13/2020</a:t>
+              <a:t>3/14/2020</a:t>
             </a:fld>
             <a:endParaRPr lang="en-US" dirty="0"/>
           </a:p>
@@ -10738,7 +10738,7 @@
             <a:fld id="{B61BEF0D-F0BB-DE4B-95CE-6DB70DBA9567}" type="datetimeFigureOut">
               <a:rPr lang="en-US" dirty="0"/>
               <a:pPr/>
-              <a:t>3/13/2020</a:t>
+              <a:t>3/14/2020</a:t>
             </a:fld>
             <a:endParaRPr lang="en-US" dirty="0"/>
           </a:p>
@@ -11018,7 +11018,7 @@
             <a:fld id="{B61BEF0D-F0BB-DE4B-95CE-6DB70DBA9567}" type="datetimeFigureOut">
               <a:rPr lang="en-US" dirty="0"/>
               <a:pPr/>
-              <a:t>3/13/2020</a:t>
+              <a:t>3/14/2020</a:t>
             </a:fld>
             <a:endParaRPr lang="en-US" dirty="0"/>
           </a:p>
@@ -11421,7 +11421,7 @@
             <a:fld id="{B61BEF0D-F0BB-DE4B-95CE-6DB70DBA9567}" type="datetimeFigureOut">
               <a:rPr lang="en-US" dirty="0"/>
               <a:pPr/>
-              <a:t>3/13/2020</a:t>
+              <a:t>3/14/2020</a:t>
             </a:fld>
             <a:endParaRPr lang="en-US" dirty="0"/>
           </a:p>
@@ -13303,6 +13303,114 @@
           </a:p>
         </p:txBody>
       </p:sp>
+      <p:sp>
+        <p:nvSpPr>
+          <p:cNvPr id="4" name="Rectangle 3">
+            <a:extLst>
+              <a:ext uri="{FF2B5EF4-FFF2-40B4-BE49-F238E27FC236}">
+                <a16:creationId xmlns:a16="http://schemas.microsoft.com/office/drawing/2014/main" id="{A810C1CD-F941-464D-B834-8C57EAE14EBD}"/>
+              </a:ext>
+            </a:extLst>
+          </p:cNvPr>
+          <p:cNvSpPr/>
+          <p:nvPr/>
+        </p:nvSpPr>
+        <p:spPr>
+          <a:xfrm>
+            <a:off x="7551895" y="2870855"/>
+            <a:ext cx="620807" cy="3232956"/>
+          </a:xfrm>
+          <a:prstGeom prst="rect">
+            <a:avLst/>
+          </a:prstGeom>
+          <a:solidFill>
+            <a:srgbClr val="00B050"/>
+          </a:solidFill>
+          <a:ln>
+            <a:solidFill>
+              <a:srgbClr val="00B050"/>
+            </a:solidFill>
+          </a:ln>
+        </p:spPr>
+        <p:style>
+          <a:lnRef idx="2">
+            <a:schemeClr val="accent1">
+              <a:shade val="50000"/>
+            </a:schemeClr>
+          </a:lnRef>
+          <a:fillRef idx="1">
+            <a:schemeClr val="accent1"/>
+          </a:fillRef>
+          <a:effectRef idx="0">
+            <a:schemeClr val="accent1"/>
+          </a:effectRef>
+          <a:fontRef idx="minor">
+            <a:schemeClr val="lt1"/>
+          </a:fontRef>
+        </p:style>
+        <p:txBody>
+          <a:bodyPr rtlCol="0" anchor="ctr"/>
+          <a:lstStyle/>
+          <a:p>
+            <a:pPr algn="ctr"/>
+            <a:endParaRPr lang="en-GB" dirty="0"/>
+          </a:p>
+        </p:txBody>
+      </p:sp>
+      <p:sp>
+        <p:nvSpPr>
+          <p:cNvPr id="5" name="Rectangle 4">
+            <a:extLst>
+              <a:ext uri="{FF2B5EF4-FFF2-40B4-BE49-F238E27FC236}">
+                <a16:creationId xmlns:a16="http://schemas.microsoft.com/office/drawing/2014/main" id="{017A18ED-A5B0-4D0F-8A49-69AF7BB05528}"/>
+              </a:ext>
+            </a:extLst>
+          </p:cNvPr>
+          <p:cNvSpPr/>
+          <p:nvPr/>
+        </p:nvSpPr>
+        <p:spPr>
+          <a:xfrm>
+            <a:off x="4489142" y="2870854"/>
+            <a:ext cx="620806" cy="3232956"/>
+          </a:xfrm>
+          <a:prstGeom prst="rect">
+            <a:avLst/>
+          </a:prstGeom>
+          <a:solidFill>
+            <a:srgbClr val="FFFF00"/>
+          </a:solidFill>
+          <a:ln>
+            <a:solidFill>
+              <a:srgbClr val="FFFF00"/>
+            </a:solidFill>
+          </a:ln>
+        </p:spPr>
+        <p:style>
+          <a:lnRef idx="2">
+            <a:schemeClr val="accent1">
+              <a:shade val="50000"/>
+            </a:schemeClr>
+          </a:lnRef>
+          <a:fillRef idx="1">
+            <a:schemeClr val="accent1"/>
+          </a:fillRef>
+          <a:effectRef idx="0">
+            <a:schemeClr val="accent1"/>
+          </a:effectRef>
+          <a:fontRef idx="minor">
+            <a:schemeClr val="lt1"/>
+          </a:fontRef>
+        </p:style>
+        <p:txBody>
+          <a:bodyPr rtlCol="0" anchor="ctr"/>
+          <a:lstStyle/>
+          <a:p>
+            <a:pPr algn="ctr"/>
+            <a:endParaRPr lang="en-GB" dirty="0"/>
+          </a:p>
+        </p:txBody>
+      </p:sp>
     </p:spTree>
     <p:extLst>
       <p:ext uri="{BB962C8B-B14F-4D97-AF65-F5344CB8AC3E}">
@@ -18782,114 +18890,6 @@
       </p:grpSpPr>
       <p:sp>
         <p:nvSpPr>
-          <p:cNvPr id="6" name="Rectangle 5">
-            <a:extLst>
-              <a:ext uri="{FF2B5EF4-FFF2-40B4-BE49-F238E27FC236}">
-                <a16:creationId xmlns:a16="http://schemas.microsoft.com/office/drawing/2014/main" id="{183AA359-6AC9-4C7D-A2F7-3C815F26ED45}"/>
-              </a:ext>
-            </a:extLst>
-          </p:cNvPr>
-          <p:cNvSpPr/>
-          <p:nvPr/>
-        </p:nvSpPr>
-        <p:spPr>
-          <a:xfrm>
-            <a:off x="5527786" y="1683190"/>
-            <a:ext cx="620807" cy="3232956"/>
-          </a:xfrm>
-          <a:prstGeom prst="rect">
-            <a:avLst/>
-          </a:prstGeom>
-          <a:solidFill>
-            <a:srgbClr val="00B050"/>
-          </a:solidFill>
-          <a:ln>
-            <a:solidFill>
-              <a:srgbClr val="00B050"/>
-            </a:solidFill>
-          </a:ln>
-        </p:spPr>
-        <p:style>
-          <a:lnRef idx="2">
-            <a:schemeClr val="accent1">
-              <a:shade val="50000"/>
-            </a:schemeClr>
-          </a:lnRef>
-          <a:fillRef idx="1">
-            <a:schemeClr val="accent1"/>
-          </a:fillRef>
-          <a:effectRef idx="0">
-            <a:schemeClr val="accent1"/>
-          </a:effectRef>
-          <a:fontRef idx="minor">
-            <a:schemeClr val="lt1"/>
-          </a:fontRef>
-        </p:style>
-        <p:txBody>
-          <a:bodyPr rtlCol="0" anchor="ctr"/>
-          <a:lstStyle/>
-          <a:p>
-            <a:pPr algn="ctr"/>
-            <a:endParaRPr lang="en-GB" dirty="0"/>
-          </a:p>
-        </p:txBody>
-      </p:sp>
-      <p:sp>
-        <p:nvSpPr>
-          <p:cNvPr id="4" name="Rectangle 3">
-            <a:extLst>
-              <a:ext uri="{FF2B5EF4-FFF2-40B4-BE49-F238E27FC236}">
-                <a16:creationId xmlns:a16="http://schemas.microsoft.com/office/drawing/2014/main" id="{5FE974CB-A904-49AA-B075-49D66F427928}"/>
-              </a:ext>
-            </a:extLst>
-          </p:cNvPr>
-          <p:cNvSpPr/>
-          <p:nvPr/>
-        </p:nvSpPr>
-        <p:spPr>
-          <a:xfrm>
-            <a:off x="2465033" y="1683189"/>
-            <a:ext cx="620806" cy="3232956"/>
-          </a:xfrm>
-          <a:prstGeom prst="rect">
-            <a:avLst/>
-          </a:prstGeom>
-          <a:solidFill>
-            <a:srgbClr val="FFFF00"/>
-          </a:solidFill>
-          <a:ln>
-            <a:solidFill>
-              <a:srgbClr val="FFFF00"/>
-            </a:solidFill>
-          </a:ln>
-        </p:spPr>
-        <p:style>
-          <a:lnRef idx="2">
-            <a:schemeClr val="accent1">
-              <a:shade val="50000"/>
-            </a:schemeClr>
-          </a:lnRef>
-          <a:fillRef idx="1">
-            <a:schemeClr val="accent1"/>
-          </a:fillRef>
-          <a:effectRef idx="0">
-            <a:schemeClr val="accent1"/>
-          </a:effectRef>
-          <a:fontRef idx="minor">
-            <a:schemeClr val="lt1"/>
-          </a:fontRef>
-        </p:style>
-        <p:txBody>
-          <a:bodyPr rtlCol="0" anchor="ctr"/>
-          <a:lstStyle/>
-          <a:p>
-            <a:pPr algn="ctr"/>
-            <a:endParaRPr lang="en-GB"/>
-          </a:p>
-        </p:txBody>
-      </p:sp>
-      <p:sp>
-        <p:nvSpPr>
           <p:cNvPr id="2" name="Titre 1">
             <a:extLst>
               <a:ext uri="{FF2B5EF4-FFF2-40B4-BE49-F238E27FC236}">

</xml_diff>

<commit_message>
#12 Question  icon added on issues slides
</commit_message>
<xml_diff>
--- a/SAI_presentation.pptx
+++ b/SAI_presentation.pptx
@@ -19313,6 +19313,42 @@
           </a:prstGeom>
         </p:spPr>
       </p:pic>
+      <p:pic>
+        <p:nvPicPr>
+          <p:cNvPr id="6" name="Graphique 5" descr="Point d’interrogation">
+            <a:extLst>
+              <a:ext uri="{FF2B5EF4-FFF2-40B4-BE49-F238E27FC236}">
+                <a16:creationId xmlns:a16="http://schemas.microsoft.com/office/drawing/2014/main" id="{A3D3B2FE-2C60-47C8-AADB-CFB77679DFA3}"/>
+              </a:ext>
+            </a:extLst>
+          </p:cNvPr>
+          <p:cNvPicPr>
+            <a:picLocks noChangeAspect="1"/>
+          </p:cNvPicPr>
+          <p:nvPr/>
+        </p:nvPicPr>
+        <p:blipFill>
+          <a:blip r:embed="rId9">
+            <a:extLst>
+              <a:ext uri="{96DAC541-7B7A-43D3-8B79-37D633B846F1}">
+                <asvg:svgBlip xmlns:asvg="http://schemas.microsoft.com/office/drawing/2016/SVG/main" r:embed="rId10"/>
+              </a:ext>
+            </a:extLst>
+          </a:blip>
+          <a:stretch>
+            <a:fillRect/>
+          </a:stretch>
+        </p:blipFill>
+        <p:spPr>
+          <a:xfrm>
+            <a:off x="2425747" y="2642799"/>
+            <a:ext cx="914400" cy="914400"/>
+          </a:xfrm>
+          <a:prstGeom prst="rect">
+            <a:avLst/>
+          </a:prstGeom>
+        </p:spPr>
+      </p:pic>
     </p:spTree>
     <p:extLst>
       <p:ext uri="{BB962C8B-B14F-4D97-AF65-F5344CB8AC3E}">

</xml_diff>

<commit_message>
#12 Arrows icon added on issues slides
</commit_message>
<xml_diff>
--- a/SAI_presentation.pptx
+++ b/SAI_presentation.pptx
@@ -19341,7 +19341,7 @@
         </p:blipFill>
         <p:spPr>
           <a:xfrm>
-            <a:off x="2425747" y="2642799"/>
+            <a:off x="2407822" y="2874887"/>
             <a:ext cx="914400" cy="914400"/>
           </a:xfrm>
           <a:prstGeom prst="rect">
@@ -19349,6 +19349,98 @@
           </a:prstGeom>
         </p:spPr>
       </p:pic>
+      <p:sp>
+        <p:nvSpPr>
+          <p:cNvPr id="4" name="Flèche : droite 3">
+            <a:extLst>
+              <a:ext uri="{FF2B5EF4-FFF2-40B4-BE49-F238E27FC236}">
+                <a16:creationId xmlns:a16="http://schemas.microsoft.com/office/drawing/2014/main" id="{60E24E58-C620-46F4-9417-00126E57DE76}"/>
+              </a:ext>
+            </a:extLst>
+          </p:cNvPr>
+          <p:cNvSpPr/>
+          <p:nvPr/>
+        </p:nvSpPr>
+        <p:spPr>
+          <a:xfrm rot="9501193">
+            <a:off x="3395033" y="2707187"/>
+            <a:ext cx="978408" cy="484632"/>
+          </a:xfrm>
+          <a:prstGeom prst="rightArrow">
+            <a:avLst/>
+          </a:prstGeom>
+        </p:spPr>
+        <p:style>
+          <a:lnRef idx="2">
+            <a:schemeClr val="accent1">
+              <a:shade val="50000"/>
+            </a:schemeClr>
+          </a:lnRef>
+          <a:fillRef idx="1">
+            <a:schemeClr val="accent1"/>
+          </a:fillRef>
+          <a:effectRef idx="0">
+            <a:schemeClr val="accent1"/>
+          </a:effectRef>
+          <a:fontRef idx="minor">
+            <a:schemeClr val="lt1"/>
+          </a:fontRef>
+        </p:style>
+        <p:txBody>
+          <a:bodyPr rtlCol="0" anchor="ctr"/>
+          <a:lstStyle/>
+          <a:p>
+            <a:pPr algn="ctr"/>
+            <a:endParaRPr lang="en-GB"/>
+          </a:p>
+        </p:txBody>
+      </p:sp>
+      <p:sp>
+        <p:nvSpPr>
+          <p:cNvPr id="11" name="Flèche : droite 10">
+            <a:extLst>
+              <a:ext uri="{FF2B5EF4-FFF2-40B4-BE49-F238E27FC236}">
+                <a16:creationId xmlns:a16="http://schemas.microsoft.com/office/drawing/2014/main" id="{2EEE9E33-C5E1-485E-A8DC-AF5E95E6AC41}"/>
+              </a:ext>
+            </a:extLst>
+          </p:cNvPr>
+          <p:cNvSpPr/>
+          <p:nvPr/>
+        </p:nvSpPr>
+        <p:spPr>
+          <a:xfrm rot="12465652">
+            <a:off x="3393360" y="3611430"/>
+            <a:ext cx="978408" cy="484632"/>
+          </a:xfrm>
+          <a:prstGeom prst="rightArrow">
+            <a:avLst/>
+          </a:prstGeom>
+        </p:spPr>
+        <p:style>
+          <a:lnRef idx="2">
+            <a:schemeClr val="accent1">
+              <a:shade val="50000"/>
+            </a:schemeClr>
+          </a:lnRef>
+          <a:fillRef idx="1">
+            <a:schemeClr val="accent1"/>
+          </a:fillRef>
+          <a:effectRef idx="0">
+            <a:schemeClr val="accent1"/>
+          </a:effectRef>
+          <a:fontRef idx="minor">
+            <a:schemeClr val="lt1"/>
+          </a:fontRef>
+        </p:style>
+        <p:txBody>
+          <a:bodyPr rtlCol="0" anchor="ctr"/>
+          <a:lstStyle/>
+          <a:p>
+            <a:pPr algn="ctr"/>
+            <a:endParaRPr lang="en-GB"/>
+          </a:p>
+        </p:txBody>
+      </p:sp>
     </p:spTree>
     <p:extLst>
       <p:ext uri="{BB962C8B-B14F-4D97-AF65-F5344CB8AC3E}">

</xml_diff>

<commit_message>
#12 Icons position updated on issues slides
</commit_message>
<xml_diff>
--- a/SAI_presentation.pptx
+++ b/SAI_presentation.pptx
@@ -6942,7 +6942,7 @@
             <a:fld id="{B61BEF0D-F0BB-DE4B-95CE-6DB70DBA9567}" type="datetimeFigureOut">
               <a:rPr lang="en-US" dirty="0"/>
               <a:pPr/>
-              <a:t>3/14/2020</a:t>
+              <a:t>3/15/2020</a:t>
             </a:fld>
             <a:endParaRPr lang="en-US" dirty="0"/>
           </a:p>
@@ -7375,7 +7375,7 @@
             <a:fld id="{B61BEF0D-F0BB-DE4B-95CE-6DB70DBA9567}" type="datetimeFigureOut">
               <a:rPr lang="en-US" dirty="0"/>
               <a:pPr/>
-              <a:t>3/14/2020</a:t>
+              <a:t>3/15/2020</a:t>
             </a:fld>
             <a:endParaRPr lang="en-US" dirty="0"/>
           </a:p>
@@ -7622,7 +7622,7 @@
             <a:fld id="{B61BEF0D-F0BB-DE4B-95CE-6DB70DBA9567}" type="datetimeFigureOut">
               <a:rPr lang="en-US" dirty="0"/>
               <a:pPr/>
-              <a:t>3/14/2020</a:t>
+              <a:t>3/15/2020</a:t>
             </a:fld>
             <a:endParaRPr lang="en-US" dirty="0"/>
           </a:p>
@@ -7927,7 +7927,7 @@
             <a:fld id="{B61BEF0D-F0BB-DE4B-95CE-6DB70DBA9567}" type="datetimeFigureOut">
               <a:rPr lang="en-US" dirty="0"/>
               <a:pPr/>
-              <a:t>3/14/2020</a:t>
+              <a:t>3/15/2020</a:t>
             </a:fld>
             <a:endParaRPr lang="en-US" dirty="0"/>
           </a:p>
@@ -8242,7 +8242,7 @@
             <a:fld id="{B61BEF0D-F0BB-DE4B-95CE-6DB70DBA9567}" type="datetimeFigureOut">
               <a:rPr lang="en-US" dirty="0"/>
               <a:pPr/>
-              <a:t>3/14/2020</a:t>
+              <a:t>3/15/2020</a:t>
             </a:fld>
             <a:endParaRPr lang="en-US" dirty="0"/>
           </a:p>
@@ -8541,7 +8541,7 @@
             <a:fld id="{B61BEF0D-F0BB-DE4B-95CE-6DB70DBA9567}" type="datetimeFigureOut">
               <a:rPr lang="en-US" dirty="0"/>
               <a:pPr/>
-              <a:t>3/14/2020</a:t>
+              <a:t>3/15/2020</a:t>
             </a:fld>
             <a:endParaRPr lang="en-US" dirty="0"/>
           </a:p>
@@ -8905,7 +8905,7 @@
             <a:fld id="{B61BEF0D-F0BB-DE4B-95CE-6DB70DBA9567}" type="datetimeFigureOut">
               <a:rPr lang="en-US" dirty="0"/>
               <a:pPr/>
-              <a:t>3/14/2020</a:t>
+              <a:t>3/15/2020</a:t>
             </a:fld>
             <a:endParaRPr lang="en-US" dirty="0"/>
           </a:p>
@@ -9076,7 +9076,7 @@
             <a:fld id="{B61BEF0D-F0BB-DE4B-95CE-6DB70DBA9567}" type="datetimeFigureOut">
               <a:rPr lang="en-US" dirty="0"/>
               <a:pPr/>
-              <a:t>3/14/2020</a:t>
+              <a:t>3/15/2020</a:t>
             </a:fld>
             <a:endParaRPr lang="en-US" dirty="0"/>
           </a:p>
@@ -9253,7 +9253,7 @@
             <a:fld id="{B61BEF0D-F0BB-DE4B-95CE-6DB70DBA9567}" type="datetimeFigureOut">
               <a:rPr lang="en-US" dirty="0"/>
               <a:pPr/>
-              <a:t>3/14/2020</a:t>
+              <a:t>3/15/2020</a:t>
             </a:fld>
             <a:endParaRPr lang="en-US" dirty="0"/>
           </a:p>
@@ -9420,7 +9420,7 @@
             <a:fld id="{B61BEF0D-F0BB-DE4B-95CE-6DB70DBA9567}" type="datetimeFigureOut">
               <a:rPr lang="en-US" dirty="0"/>
               <a:pPr/>
-              <a:t>3/14/2020</a:t>
+              <a:t>3/15/2020</a:t>
             </a:fld>
             <a:endParaRPr lang="en-US" dirty="0"/>
           </a:p>
@@ -9667,7 +9667,7 @@
             <a:fld id="{B61BEF0D-F0BB-DE4B-95CE-6DB70DBA9567}" type="datetimeFigureOut">
               <a:rPr lang="en-US" dirty="0"/>
               <a:pPr/>
-              <a:t>3/14/2020</a:t>
+              <a:t>3/15/2020</a:t>
             </a:fld>
             <a:endParaRPr lang="en-US" dirty="0"/>
           </a:p>
@@ -9900,7 +9900,7 @@
             <a:fld id="{B61BEF0D-F0BB-DE4B-95CE-6DB70DBA9567}" type="datetimeFigureOut">
               <a:rPr lang="en-US" dirty="0"/>
               <a:pPr/>
-              <a:t>3/14/2020</a:t>
+              <a:t>3/15/2020</a:t>
             </a:fld>
             <a:endParaRPr lang="en-US" dirty="0"/>
           </a:p>
@@ -10279,7 +10279,7 @@
             <a:fld id="{B61BEF0D-F0BB-DE4B-95CE-6DB70DBA9567}" type="datetimeFigureOut">
               <a:rPr lang="en-US" dirty="0"/>
               <a:pPr/>
-              <a:t>3/14/2020</a:t>
+              <a:t>3/15/2020</a:t>
             </a:fld>
             <a:endParaRPr lang="en-US" dirty="0"/>
           </a:p>
@@ -10394,7 +10394,7 @@
             <a:fld id="{B61BEF0D-F0BB-DE4B-95CE-6DB70DBA9567}" type="datetimeFigureOut">
               <a:rPr lang="en-US" dirty="0"/>
               <a:pPr/>
-              <a:t>3/14/2020</a:t>
+              <a:t>3/15/2020</a:t>
             </a:fld>
             <a:endParaRPr lang="en-US" dirty="0"/>
           </a:p>
@@ -10486,7 +10486,7 @@
             <a:fld id="{B61BEF0D-F0BB-DE4B-95CE-6DB70DBA9567}" type="datetimeFigureOut">
               <a:rPr lang="en-US" dirty="0"/>
               <a:pPr/>
-              <a:t>3/14/2020</a:t>
+              <a:t>3/15/2020</a:t>
             </a:fld>
             <a:endParaRPr lang="en-US" dirty="0"/>
           </a:p>
@@ -10738,7 +10738,7 @@
             <a:fld id="{B61BEF0D-F0BB-DE4B-95CE-6DB70DBA9567}" type="datetimeFigureOut">
               <a:rPr lang="en-US" dirty="0"/>
               <a:pPr/>
-              <a:t>3/14/2020</a:t>
+              <a:t>3/15/2020</a:t>
             </a:fld>
             <a:endParaRPr lang="en-US" dirty="0"/>
           </a:p>
@@ -11018,7 +11018,7 @@
             <a:fld id="{B61BEF0D-F0BB-DE4B-95CE-6DB70DBA9567}" type="datetimeFigureOut">
               <a:rPr lang="en-US" dirty="0"/>
               <a:pPr/>
-              <a:t>3/14/2020</a:t>
+              <a:t>3/15/2020</a:t>
             </a:fld>
             <a:endParaRPr lang="en-US" dirty="0"/>
           </a:p>
@@ -11421,7 +11421,7 @@
             <a:fld id="{B61BEF0D-F0BB-DE4B-95CE-6DB70DBA9567}" type="datetimeFigureOut">
               <a:rPr lang="en-US" dirty="0"/>
               <a:pPr/>
-              <a:t>3/14/2020</a:t>
+              <a:t>3/15/2020</a:t>
             </a:fld>
             <a:endParaRPr lang="en-US" dirty="0"/>
           </a:p>
@@ -19129,7 +19129,7 @@
         </p:blipFill>
         <p:spPr bwMode="auto">
           <a:xfrm>
-            <a:off x="676867" y="1689264"/>
+            <a:off x="5541838" y="1580125"/>
             <a:ext cx="854553" cy="854553"/>
           </a:xfrm>
           <a:prstGeom prst="rect">
@@ -19176,7 +19176,7 @@
         </p:blipFill>
         <p:spPr bwMode="auto">
           <a:xfrm>
-            <a:off x="576926" y="4013969"/>
+            <a:off x="5441897" y="3904830"/>
             <a:ext cx="1181100" cy="473363"/>
           </a:xfrm>
           <a:prstGeom prst="rect">
@@ -19223,7 +19223,7 @@
         </p:blipFill>
         <p:spPr bwMode="auto">
           <a:xfrm>
-            <a:off x="633302" y="2642799"/>
+            <a:off x="5498273" y="2533660"/>
             <a:ext cx="898118" cy="1040354"/>
           </a:xfrm>
           <a:prstGeom prst="rect">
@@ -19269,7 +19269,7 @@
         </p:blipFill>
         <p:spPr>
           <a:xfrm>
-            <a:off x="4506100" y="2123664"/>
+            <a:off x="836364" y="1810757"/>
             <a:ext cx="914400" cy="914400"/>
           </a:xfrm>
           <a:prstGeom prst="rect">
@@ -19305,7 +19305,7 @@
         </p:blipFill>
         <p:spPr>
           <a:xfrm>
-            <a:off x="4506100" y="3299667"/>
+            <a:off x="857233" y="3116814"/>
             <a:ext cx="914400" cy="914400"/>
           </a:xfrm>
           <a:prstGeom prst="rect">
@@ -19341,7 +19341,7 @@
         </p:blipFill>
         <p:spPr>
           <a:xfrm>
-            <a:off x="2407822" y="2874887"/>
+            <a:off x="3177753" y="2533660"/>
             <a:ext cx="914400" cy="914400"/>
           </a:xfrm>
           <a:prstGeom prst="rect">
@@ -19362,8 +19362,8 @@
           <p:nvPr/>
         </p:nvSpPr>
         <p:spPr>
-          <a:xfrm rot="9501193">
-            <a:off x="3395033" y="2707187"/>
+          <a:xfrm rot="1192363">
+            <a:off x="2166072" y="2419824"/>
             <a:ext cx="978408" cy="484632"/>
           </a:xfrm>
           <a:prstGeom prst="rightArrow">
@@ -19408,8 +19408,8 @@
           <p:nvPr/>
         </p:nvSpPr>
         <p:spPr>
-          <a:xfrm rot="12465652">
-            <a:off x="3393360" y="3611430"/>
+          <a:xfrm rot="20407754">
+            <a:off x="2146108" y="3205690"/>
             <a:ext cx="978408" cy="484632"/>
           </a:xfrm>
           <a:prstGeom prst="rightArrow">

</xml_diff>

<commit_message>
#12 New arrows added on issues slides
</commit_message>
<xml_diff>
--- a/SAI_presentation.pptx
+++ b/SAI_presentation.pptx
@@ -19129,7 +19129,7 @@
         </p:blipFill>
         <p:spPr bwMode="auto">
           <a:xfrm>
-            <a:off x="5541838" y="1580125"/>
+            <a:off x="5215593" y="1689264"/>
             <a:ext cx="854553" cy="854553"/>
           </a:xfrm>
           <a:prstGeom prst="rect">
@@ -19176,7 +19176,7 @@
         </p:blipFill>
         <p:spPr bwMode="auto">
           <a:xfrm>
-            <a:off x="5441897" y="3904830"/>
+            <a:off x="5115652" y="4013969"/>
             <a:ext cx="1181100" cy="473363"/>
           </a:xfrm>
           <a:prstGeom prst="rect">
@@ -19223,7 +19223,7 @@
         </p:blipFill>
         <p:spPr bwMode="auto">
           <a:xfrm>
-            <a:off x="5498273" y="2533660"/>
+            <a:off x="5172028" y="2642799"/>
             <a:ext cx="898118" cy="1040354"/>
           </a:xfrm>
           <a:prstGeom prst="rect">
@@ -19341,7 +19341,7 @@
         </p:blipFill>
         <p:spPr>
           <a:xfrm>
-            <a:off x="3177753" y="2533660"/>
+            <a:off x="3026620" y="2598041"/>
             <a:ext cx="914400" cy="914400"/>
           </a:xfrm>
           <a:prstGeom prst="rect">
@@ -19410,6 +19410,144 @@
         <p:spPr>
           <a:xfrm rot="20407754">
             <a:off x="2146108" y="3205690"/>
+            <a:ext cx="978408" cy="484632"/>
+          </a:xfrm>
+          <a:prstGeom prst="rightArrow">
+            <a:avLst/>
+          </a:prstGeom>
+        </p:spPr>
+        <p:style>
+          <a:lnRef idx="2">
+            <a:schemeClr val="accent1">
+              <a:shade val="50000"/>
+            </a:schemeClr>
+          </a:lnRef>
+          <a:fillRef idx="1">
+            <a:schemeClr val="accent1"/>
+          </a:fillRef>
+          <a:effectRef idx="0">
+            <a:schemeClr val="accent1"/>
+          </a:effectRef>
+          <a:fontRef idx="minor">
+            <a:schemeClr val="lt1"/>
+          </a:fontRef>
+        </p:style>
+        <p:txBody>
+          <a:bodyPr rtlCol="0" anchor="ctr"/>
+          <a:lstStyle/>
+          <a:p>
+            <a:pPr algn="ctr"/>
+            <a:endParaRPr lang="en-GB"/>
+          </a:p>
+        </p:txBody>
+      </p:sp>
+      <p:sp>
+        <p:nvSpPr>
+          <p:cNvPr id="12" name="Flèche : droite 11">
+            <a:extLst>
+              <a:ext uri="{FF2B5EF4-FFF2-40B4-BE49-F238E27FC236}">
+                <a16:creationId xmlns:a16="http://schemas.microsoft.com/office/drawing/2014/main" id="{B1161E6E-B388-4907-BA7E-7A35F22C52B3}"/>
+              </a:ext>
+            </a:extLst>
+          </p:cNvPr>
+          <p:cNvSpPr/>
+          <p:nvPr/>
+        </p:nvSpPr>
+        <p:spPr>
+          <a:xfrm rot="1192363">
+            <a:off x="3919765" y="3528256"/>
+            <a:ext cx="978408" cy="484632"/>
+          </a:xfrm>
+          <a:prstGeom prst="rightArrow">
+            <a:avLst/>
+          </a:prstGeom>
+        </p:spPr>
+        <p:style>
+          <a:lnRef idx="2">
+            <a:schemeClr val="accent1">
+              <a:shade val="50000"/>
+            </a:schemeClr>
+          </a:lnRef>
+          <a:fillRef idx="1">
+            <a:schemeClr val="accent1"/>
+          </a:fillRef>
+          <a:effectRef idx="0">
+            <a:schemeClr val="accent1"/>
+          </a:effectRef>
+          <a:fontRef idx="minor">
+            <a:schemeClr val="lt1"/>
+          </a:fontRef>
+        </p:style>
+        <p:txBody>
+          <a:bodyPr rtlCol="0" anchor="ctr"/>
+          <a:lstStyle/>
+          <a:p>
+            <a:pPr algn="ctr"/>
+            <a:endParaRPr lang="en-GB"/>
+          </a:p>
+        </p:txBody>
+      </p:sp>
+      <p:sp>
+        <p:nvSpPr>
+          <p:cNvPr id="13" name="Flèche : droite 12">
+            <a:extLst>
+              <a:ext uri="{FF2B5EF4-FFF2-40B4-BE49-F238E27FC236}">
+                <a16:creationId xmlns:a16="http://schemas.microsoft.com/office/drawing/2014/main" id="{47C70D6E-52A3-4A95-8C00-68EFB4FE86BC}"/>
+              </a:ext>
+            </a:extLst>
+          </p:cNvPr>
+          <p:cNvSpPr/>
+          <p:nvPr/>
+        </p:nvSpPr>
+        <p:spPr>
+          <a:xfrm rot="20407754">
+            <a:off x="3994257" y="2201469"/>
+            <a:ext cx="978408" cy="484632"/>
+          </a:xfrm>
+          <a:prstGeom prst="rightArrow">
+            <a:avLst/>
+          </a:prstGeom>
+        </p:spPr>
+        <p:style>
+          <a:lnRef idx="2">
+            <a:schemeClr val="accent1">
+              <a:shade val="50000"/>
+            </a:schemeClr>
+          </a:lnRef>
+          <a:fillRef idx="1">
+            <a:schemeClr val="accent1"/>
+          </a:fillRef>
+          <a:effectRef idx="0">
+            <a:schemeClr val="accent1"/>
+          </a:effectRef>
+          <a:fontRef idx="minor">
+            <a:schemeClr val="lt1"/>
+          </a:fontRef>
+        </p:style>
+        <p:txBody>
+          <a:bodyPr rtlCol="0" anchor="ctr"/>
+          <a:lstStyle/>
+          <a:p>
+            <a:pPr algn="ctr"/>
+            <a:endParaRPr lang="en-GB"/>
+          </a:p>
+        </p:txBody>
+      </p:sp>
+      <p:sp>
+        <p:nvSpPr>
+          <p:cNvPr id="14" name="Flèche : droite 13">
+            <a:extLst>
+              <a:ext uri="{FF2B5EF4-FFF2-40B4-BE49-F238E27FC236}">
+                <a16:creationId xmlns:a16="http://schemas.microsoft.com/office/drawing/2014/main" id="{64166315-10C4-4FE2-A07A-1ACA040B73BE}"/>
+              </a:ext>
+            </a:extLst>
+          </p:cNvPr>
+          <p:cNvSpPr/>
+          <p:nvPr/>
+        </p:nvSpPr>
+        <p:spPr>
+          <a:xfrm>
+            <a:off x="4069824" y="2861342"/>
             <a:ext cx="978408" cy="484632"/>
           </a:xfrm>
           <a:prstGeom prst="rightArrow">

</xml_diff>

<commit_message>
#12 New colors added on issues slides
</commit_message>
<xml_diff>
--- a/SAI_presentation.pptx
+++ b/SAI_presentation.pptx
@@ -19007,7 +19007,19 @@
             </a:r>
             <a:r>
               <a:rPr lang="fr-FR" dirty="0"/>
-              <a:t> an adapter </a:t>
+              <a:t> an </a:t>
+            </a:r>
+            <a:r>
+              <a:rPr lang="fr-FR" b="1" dirty="0">
+                <a:solidFill>
+                  <a:srgbClr val="FFC000"/>
+                </a:solidFill>
+              </a:rPr>
+              <a:t>adapter</a:t>
+            </a:r>
+            <a:r>
+              <a:rPr lang="fr-FR" dirty="0"/>
+              <a:t> </a:t>
             </a:r>
             <a:r>
               <a:rPr lang="fr-FR" dirty="0" err="1"/>
@@ -19176,7 +19188,7 @@
         </p:blipFill>
         <p:spPr bwMode="auto">
           <a:xfrm>
-            <a:off x="5115652" y="4013969"/>
+            <a:off x="5049635" y="4042634"/>
             <a:ext cx="1181100" cy="473363"/>
           </a:xfrm>
           <a:prstGeom prst="rect">
@@ -19369,6 +19381,14 @@
           <a:prstGeom prst="rightArrow">
             <a:avLst/>
           </a:prstGeom>
+          <a:solidFill>
+            <a:srgbClr val="00B050"/>
+          </a:solidFill>
+          <a:ln>
+            <a:solidFill>
+              <a:srgbClr val="00B050"/>
+            </a:solidFill>
+          </a:ln>
         </p:spPr>
         <p:style>
           <a:lnRef idx="2">
@@ -19415,6 +19435,14 @@
           <a:prstGeom prst="rightArrow">
             <a:avLst/>
           </a:prstGeom>
+          <a:solidFill>
+            <a:srgbClr val="00B050"/>
+          </a:solidFill>
+          <a:ln>
+            <a:solidFill>
+              <a:srgbClr val="00B050"/>
+            </a:solidFill>
+          </a:ln>
         </p:spPr>
         <p:style>
           <a:lnRef idx="2">
@@ -19461,6 +19489,14 @@
           <a:prstGeom prst="rightArrow">
             <a:avLst/>
           </a:prstGeom>
+          <a:solidFill>
+            <a:srgbClr val="FFFF00"/>
+          </a:solidFill>
+          <a:ln>
+            <a:solidFill>
+              <a:srgbClr val="FFFF00"/>
+            </a:solidFill>
+          </a:ln>
         </p:spPr>
         <p:style>
           <a:lnRef idx="2">
@@ -19507,6 +19543,14 @@
           <a:prstGeom prst="rightArrow">
             <a:avLst/>
           </a:prstGeom>
+          <a:solidFill>
+            <a:srgbClr val="FFFF00"/>
+          </a:solidFill>
+          <a:ln>
+            <a:solidFill>
+              <a:srgbClr val="FFFF00"/>
+            </a:solidFill>
+          </a:ln>
         </p:spPr>
         <p:style>
           <a:lnRef idx="2">
@@ -19553,6 +19597,14 @@
           <a:prstGeom prst="rightArrow">
             <a:avLst/>
           </a:prstGeom>
+          <a:solidFill>
+            <a:srgbClr val="FFFF00"/>
+          </a:solidFill>
+          <a:ln>
+            <a:solidFill>
+              <a:srgbClr val="FFFF00"/>
+            </a:solidFill>
+          </a:ln>
         </p:spPr>
         <p:style>
           <a:lnRef idx="2">

</xml_diff>

<commit_message>
#12 Icons for human added on issues slides
</commit_message>
<xml_diff>
--- a/SAI_presentation.pptx
+++ b/SAI_presentation.pptx
@@ -6942,7 +6942,7 @@
             <a:fld id="{B61BEF0D-F0BB-DE4B-95CE-6DB70DBA9567}" type="datetimeFigureOut">
               <a:rPr lang="en-US" dirty="0"/>
               <a:pPr/>
-              <a:t>3/15/2020</a:t>
+              <a:t>3/16/2020</a:t>
             </a:fld>
             <a:endParaRPr lang="en-US" dirty="0"/>
           </a:p>
@@ -7375,7 +7375,7 @@
             <a:fld id="{B61BEF0D-F0BB-DE4B-95CE-6DB70DBA9567}" type="datetimeFigureOut">
               <a:rPr lang="en-US" dirty="0"/>
               <a:pPr/>
-              <a:t>3/15/2020</a:t>
+              <a:t>3/16/2020</a:t>
             </a:fld>
             <a:endParaRPr lang="en-US" dirty="0"/>
           </a:p>
@@ -7622,7 +7622,7 @@
             <a:fld id="{B61BEF0D-F0BB-DE4B-95CE-6DB70DBA9567}" type="datetimeFigureOut">
               <a:rPr lang="en-US" dirty="0"/>
               <a:pPr/>
-              <a:t>3/15/2020</a:t>
+              <a:t>3/16/2020</a:t>
             </a:fld>
             <a:endParaRPr lang="en-US" dirty="0"/>
           </a:p>
@@ -7927,7 +7927,7 @@
             <a:fld id="{B61BEF0D-F0BB-DE4B-95CE-6DB70DBA9567}" type="datetimeFigureOut">
               <a:rPr lang="en-US" dirty="0"/>
               <a:pPr/>
-              <a:t>3/15/2020</a:t>
+              <a:t>3/16/2020</a:t>
             </a:fld>
             <a:endParaRPr lang="en-US" dirty="0"/>
           </a:p>
@@ -8242,7 +8242,7 @@
             <a:fld id="{B61BEF0D-F0BB-DE4B-95CE-6DB70DBA9567}" type="datetimeFigureOut">
               <a:rPr lang="en-US" dirty="0"/>
               <a:pPr/>
-              <a:t>3/15/2020</a:t>
+              <a:t>3/16/2020</a:t>
             </a:fld>
             <a:endParaRPr lang="en-US" dirty="0"/>
           </a:p>
@@ -8541,7 +8541,7 @@
             <a:fld id="{B61BEF0D-F0BB-DE4B-95CE-6DB70DBA9567}" type="datetimeFigureOut">
               <a:rPr lang="en-US" dirty="0"/>
               <a:pPr/>
-              <a:t>3/15/2020</a:t>
+              <a:t>3/16/2020</a:t>
             </a:fld>
             <a:endParaRPr lang="en-US" dirty="0"/>
           </a:p>
@@ -8905,7 +8905,7 @@
             <a:fld id="{B61BEF0D-F0BB-DE4B-95CE-6DB70DBA9567}" type="datetimeFigureOut">
               <a:rPr lang="en-US" dirty="0"/>
               <a:pPr/>
-              <a:t>3/15/2020</a:t>
+              <a:t>3/16/2020</a:t>
             </a:fld>
             <a:endParaRPr lang="en-US" dirty="0"/>
           </a:p>
@@ -9076,7 +9076,7 @@
             <a:fld id="{B61BEF0D-F0BB-DE4B-95CE-6DB70DBA9567}" type="datetimeFigureOut">
               <a:rPr lang="en-US" dirty="0"/>
               <a:pPr/>
-              <a:t>3/15/2020</a:t>
+              <a:t>3/16/2020</a:t>
             </a:fld>
             <a:endParaRPr lang="en-US" dirty="0"/>
           </a:p>
@@ -9253,7 +9253,7 @@
             <a:fld id="{B61BEF0D-F0BB-DE4B-95CE-6DB70DBA9567}" type="datetimeFigureOut">
               <a:rPr lang="en-US" dirty="0"/>
               <a:pPr/>
-              <a:t>3/15/2020</a:t>
+              <a:t>3/16/2020</a:t>
             </a:fld>
             <a:endParaRPr lang="en-US" dirty="0"/>
           </a:p>
@@ -9420,7 +9420,7 @@
             <a:fld id="{B61BEF0D-F0BB-DE4B-95CE-6DB70DBA9567}" type="datetimeFigureOut">
               <a:rPr lang="en-US" dirty="0"/>
               <a:pPr/>
-              <a:t>3/15/2020</a:t>
+              <a:t>3/16/2020</a:t>
             </a:fld>
             <a:endParaRPr lang="en-US" dirty="0"/>
           </a:p>
@@ -9667,7 +9667,7 @@
             <a:fld id="{B61BEF0D-F0BB-DE4B-95CE-6DB70DBA9567}" type="datetimeFigureOut">
               <a:rPr lang="en-US" dirty="0"/>
               <a:pPr/>
-              <a:t>3/15/2020</a:t>
+              <a:t>3/16/2020</a:t>
             </a:fld>
             <a:endParaRPr lang="en-US" dirty="0"/>
           </a:p>
@@ -9900,7 +9900,7 @@
             <a:fld id="{B61BEF0D-F0BB-DE4B-95CE-6DB70DBA9567}" type="datetimeFigureOut">
               <a:rPr lang="en-US" dirty="0"/>
               <a:pPr/>
-              <a:t>3/15/2020</a:t>
+              <a:t>3/16/2020</a:t>
             </a:fld>
             <a:endParaRPr lang="en-US" dirty="0"/>
           </a:p>
@@ -10279,7 +10279,7 @@
             <a:fld id="{B61BEF0D-F0BB-DE4B-95CE-6DB70DBA9567}" type="datetimeFigureOut">
               <a:rPr lang="en-US" dirty="0"/>
               <a:pPr/>
-              <a:t>3/15/2020</a:t>
+              <a:t>3/16/2020</a:t>
             </a:fld>
             <a:endParaRPr lang="en-US" dirty="0"/>
           </a:p>
@@ -10394,7 +10394,7 @@
             <a:fld id="{B61BEF0D-F0BB-DE4B-95CE-6DB70DBA9567}" type="datetimeFigureOut">
               <a:rPr lang="en-US" dirty="0"/>
               <a:pPr/>
-              <a:t>3/15/2020</a:t>
+              <a:t>3/16/2020</a:t>
             </a:fld>
             <a:endParaRPr lang="en-US" dirty="0"/>
           </a:p>
@@ -10486,7 +10486,7 @@
             <a:fld id="{B61BEF0D-F0BB-DE4B-95CE-6DB70DBA9567}" type="datetimeFigureOut">
               <a:rPr lang="en-US" dirty="0"/>
               <a:pPr/>
-              <a:t>3/15/2020</a:t>
+              <a:t>3/16/2020</a:t>
             </a:fld>
             <a:endParaRPr lang="en-US" dirty="0"/>
           </a:p>
@@ -10738,7 +10738,7 @@
             <a:fld id="{B61BEF0D-F0BB-DE4B-95CE-6DB70DBA9567}" type="datetimeFigureOut">
               <a:rPr lang="en-US" dirty="0"/>
               <a:pPr/>
-              <a:t>3/15/2020</a:t>
+              <a:t>3/16/2020</a:t>
             </a:fld>
             <a:endParaRPr lang="en-US" dirty="0"/>
           </a:p>
@@ -11018,7 +11018,7 @@
             <a:fld id="{B61BEF0D-F0BB-DE4B-95CE-6DB70DBA9567}" type="datetimeFigureOut">
               <a:rPr lang="en-US" dirty="0"/>
               <a:pPr/>
-              <a:t>3/15/2020</a:t>
+              <a:t>3/16/2020</a:t>
             </a:fld>
             <a:endParaRPr lang="en-US" dirty="0"/>
           </a:p>
@@ -11421,7 +11421,7 @@
             <a:fld id="{B61BEF0D-F0BB-DE4B-95CE-6DB70DBA9567}" type="datetimeFigureOut">
               <a:rPr lang="en-US" dirty="0"/>
               <a:pPr/>
-              <a:t>3/15/2020</a:t>
+              <a:t>3/16/2020</a:t>
             </a:fld>
             <a:endParaRPr lang="en-US" dirty="0"/>
           </a:p>
@@ -19794,6 +19794,78 @@
           </a:p>
         </p:txBody>
       </p:sp>
+      <p:pic>
+        <p:nvPicPr>
+          <p:cNvPr id="5" name="Graphique 4" descr="Cerveau">
+            <a:extLst>
+              <a:ext uri="{FF2B5EF4-FFF2-40B4-BE49-F238E27FC236}">
+                <a16:creationId xmlns:a16="http://schemas.microsoft.com/office/drawing/2014/main" id="{454DE4F6-EA57-4830-884A-EAC8768B7135}"/>
+              </a:ext>
+            </a:extLst>
+          </p:cNvPr>
+          <p:cNvPicPr>
+            <a:picLocks noChangeAspect="1"/>
+          </p:cNvPicPr>
+          <p:nvPr/>
+        </p:nvPicPr>
+        <p:blipFill>
+          <a:blip r:embed="rId2">
+            <a:extLst>
+              <a:ext uri="{96DAC541-7B7A-43D3-8B79-37D633B846F1}">
+                <asvg:svgBlip xmlns:asvg="http://schemas.microsoft.com/office/drawing/2016/SVG/main" r:embed="rId3"/>
+              </a:ext>
+            </a:extLst>
+          </a:blip>
+          <a:stretch>
+            <a:fillRect/>
+          </a:stretch>
+        </p:blipFill>
+        <p:spPr>
+          <a:xfrm>
+            <a:off x="1647825" y="3714750"/>
+            <a:ext cx="914400" cy="914400"/>
+          </a:xfrm>
+          <a:prstGeom prst="rect">
+            <a:avLst/>
+          </a:prstGeom>
+        </p:spPr>
+      </p:pic>
+      <p:pic>
+        <p:nvPicPr>
+          <p:cNvPr id="7" name="Graphique 6" descr="Lune et étoiles">
+            <a:extLst>
+              <a:ext uri="{FF2B5EF4-FFF2-40B4-BE49-F238E27FC236}">
+                <a16:creationId xmlns:a16="http://schemas.microsoft.com/office/drawing/2014/main" id="{23C90920-7244-4B47-810F-267E693071C2}"/>
+              </a:ext>
+            </a:extLst>
+          </p:cNvPr>
+          <p:cNvPicPr>
+            <a:picLocks noChangeAspect="1"/>
+          </p:cNvPicPr>
+          <p:nvPr/>
+        </p:nvPicPr>
+        <p:blipFill>
+          <a:blip r:embed="rId4">
+            <a:extLst>
+              <a:ext uri="{96DAC541-7B7A-43D3-8B79-37D633B846F1}">
+                <asvg:svgBlip xmlns:asvg="http://schemas.microsoft.com/office/drawing/2016/SVG/main" r:embed="rId5"/>
+              </a:ext>
+            </a:extLst>
+          </a:blip>
+          <a:stretch>
+            <a:fillRect/>
+          </a:stretch>
+        </p:blipFill>
+        <p:spPr>
+          <a:xfrm>
+            <a:off x="2973388" y="3843867"/>
+            <a:ext cx="914400" cy="914400"/>
+          </a:xfrm>
+          <a:prstGeom prst="rect">
+            <a:avLst/>
+          </a:prstGeom>
+        </p:spPr>
+      </p:pic>
     </p:spTree>
     <p:extLst>
       <p:ext uri="{BB962C8B-B14F-4D97-AF65-F5344CB8AC3E}">

</xml_diff>

<commit_message>
#12 Icons for compress added on issues slides
</commit_message>
<xml_diff>
--- a/SAI_presentation.pptx
+++ b/SAI_presentation.pptx
@@ -19866,6 +19866,78 @@
           </a:prstGeom>
         </p:spPr>
       </p:pic>
+      <p:pic>
+        <p:nvPicPr>
+          <p:cNvPr id="6" name="Graphique 5" descr="Boîte">
+            <a:extLst>
+              <a:ext uri="{FF2B5EF4-FFF2-40B4-BE49-F238E27FC236}">
+                <a16:creationId xmlns:a16="http://schemas.microsoft.com/office/drawing/2014/main" id="{9DFBB98E-3DE0-4BB3-8D08-0E32063C2F5B}"/>
+              </a:ext>
+            </a:extLst>
+          </p:cNvPr>
+          <p:cNvPicPr>
+            <a:picLocks noChangeAspect="1"/>
+          </p:cNvPicPr>
+          <p:nvPr/>
+        </p:nvPicPr>
+        <p:blipFill>
+          <a:blip r:embed="rId6">
+            <a:extLst>
+              <a:ext uri="{96DAC541-7B7A-43D3-8B79-37D633B846F1}">
+                <asvg:svgBlip xmlns:asvg="http://schemas.microsoft.com/office/drawing/2016/SVG/main" r:embed="rId7"/>
+              </a:ext>
+            </a:extLst>
+          </a:blip>
+          <a:stretch>
+            <a:fillRect/>
+          </a:stretch>
+        </p:blipFill>
+        <p:spPr>
+          <a:xfrm>
+            <a:off x="6329364" y="4030132"/>
+            <a:ext cx="914400" cy="914400"/>
+          </a:xfrm>
+          <a:prstGeom prst="rect">
+            <a:avLst/>
+          </a:prstGeom>
+        </p:spPr>
+      </p:pic>
+      <p:pic>
+        <p:nvPicPr>
+          <p:cNvPr id="9" name="Graphique 8" descr="Document">
+            <a:extLst>
+              <a:ext uri="{FF2B5EF4-FFF2-40B4-BE49-F238E27FC236}">
+                <a16:creationId xmlns:a16="http://schemas.microsoft.com/office/drawing/2014/main" id="{E6C969EA-E39F-4CA8-AD50-B155FF824B98}"/>
+              </a:ext>
+            </a:extLst>
+          </p:cNvPr>
+          <p:cNvPicPr>
+            <a:picLocks noChangeAspect="1"/>
+          </p:cNvPicPr>
+          <p:nvPr/>
+        </p:nvPicPr>
+        <p:blipFill>
+          <a:blip r:embed="rId8">
+            <a:extLst>
+              <a:ext uri="{96DAC541-7B7A-43D3-8B79-37D633B846F1}">
+                <asvg:svgBlip xmlns:asvg="http://schemas.microsoft.com/office/drawing/2016/SVG/main" r:embed="rId9"/>
+              </a:ext>
+            </a:extLst>
+          </a:blip>
+          <a:stretch>
+            <a:fillRect/>
+          </a:stretch>
+        </p:blipFill>
+        <p:spPr>
+          <a:xfrm>
+            <a:off x="7582089" y="4171950"/>
+            <a:ext cx="914400" cy="914400"/>
+          </a:xfrm>
+          <a:prstGeom prst="rect">
+            <a:avLst/>
+          </a:prstGeom>
+        </p:spPr>
+      </p:pic>
     </p:spTree>
     <p:extLst>
       <p:ext uri="{BB962C8B-B14F-4D97-AF65-F5344CB8AC3E}">

</xml_diff>

<commit_message>
#12 Icons for organize memory added on issues slides
</commit_message>
<xml_diff>
--- a/SAI_presentation.pptx
+++ b/SAI_presentation.pptx
@@ -19938,6 +19938,78 @@
           </a:prstGeom>
         </p:spPr>
       </p:pic>
+      <p:pic>
+        <p:nvPicPr>
+          <p:cNvPr id="8" name="Graphique 7" descr="Pièces de puzzle">
+            <a:extLst>
+              <a:ext uri="{FF2B5EF4-FFF2-40B4-BE49-F238E27FC236}">
+                <a16:creationId xmlns:a16="http://schemas.microsoft.com/office/drawing/2014/main" id="{6D238D58-E40D-4257-968C-10CF54D64EF5}"/>
+              </a:ext>
+            </a:extLst>
+          </p:cNvPr>
+          <p:cNvPicPr>
+            <a:picLocks noChangeAspect="1"/>
+          </p:cNvPicPr>
+          <p:nvPr/>
+        </p:nvPicPr>
+        <p:blipFill>
+          <a:blip r:embed="rId10">
+            <a:extLst>
+              <a:ext uri="{96DAC541-7B7A-43D3-8B79-37D633B846F1}">
+                <asvg:svgBlip xmlns:asvg="http://schemas.microsoft.com/office/drawing/2016/SVG/main" r:embed="rId11"/>
+              </a:ext>
+            </a:extLst>
+          </a:blip>
+          <a:stretch>
+            <a:fillRect/>
+          </a:stretch>
+        </p:blipFill>
+        <p:spPr>
+          <a:xfrm>
+            <a:off x="4298951" y="3236667"/>
+            <a:ext cx="914400" cy="914400"/>
+          </a:xfrm>
+          <a:prstGeom prst="rect">
+            <a:avLst/>
+          </a:prstGeom>
+        </p:spPr>
+      </p:pic>
+      <p:pic>
+        <p:nvPicPr>
+          <p:cNvPr id="11" name="Graphique 10" descr="Cerveau dans une tête">
+            <a:extLst>
+              <a:ext uri="{FF2B5EF4-FFF2-40B4-BE49-F238E27FC236}">
+                <a16:creationId xmlns:a16="http://schemas.microsoft.com/office/drawing/2014/main" id="{DDC4FD58-98D6-456B-B5A5-B0E8A309C696}"/>
+              </a:ext>
+            </a:extLst>
+          </p:cNvPr>
+          <p:cNvPicPr>
+            <a:picLocks noChangeAspect="1"/>
+          </p:cNvPicPr>
+          <p:nvPr/>
+        </p:nvPicPr>
+        <p:blipFill>
+          <a:blip r:embed="rId12">
+            <a:extLst>
+              <a:ext uri="{96DAC541-7B7A-43D3-8B79-37D633B846F1}">
+                <asvg:svgBlip xmlns:asvg="http://schemas.microsoft.com/office/drawing/2016/SVG/main" r:embed="rId13"/>
+              </a:ext>
+            </a:extLst>
+          </a:blip>
+          <a:stretch>
+            <a:fillRect/>
+          </a:stretch>
+        </p:blipFill>
+        <p:spPr>
+          <a:xfrm>
+            <a:off x="5117213" y="3790437"/>
+            <a:ext cx="914400" cy="914400"/>
+          </a:xfrm>
+          <a:prstGeom prst="rect">
+            <a:avLst/>
+          </a:prstGeom>
+        </p:spPr>
+      </p:pic>
     </p:spTree>
     <p:extLst>
       <p:ext uri="{BB962C8B-B14F-4D97-AF65-F5344CB8AC3E}">

</xml_diff>

<commit_message>
#12 Icons ordered for sai sleep on issues slides
</commit_message>
<xml_diff>
--- a/SAI_presentation.pptx
+++ b/SAI_presentation.pptx
@@ -6942,7 +6942,7 @@
             <a:fld id="{B61BEF0D-F0BB-DE4B-95CE-6DB70DBA9567}" type="datetimeFigureOut">
               <a:rPr lang="en-US" dirty="0"/>
               <a:pPr/>
-              <a:t>3/16/2020</a:t>
+              <a:t>3/17/2020</a:t>
             </a:fld>
             <a:endParaRPr lang="en-US" dirty="0"/>
           </a:p>
@@ -7375,7 +7375,7 @@
             <a:fld id="{B61BEF0D-F0BB-DE4B-95CE-6DB70DBA9567}" type="datetimeFigureOut">
               <a:rPr lang="en-US" dirty="0"/>
               <a:pPr/>
-              <a:t>3/16/2020</a:t>
+              <a:t>3/17/2020</a:t>
             </a:fld>
             <a:endParaRPr lang="en-US" dirty="0"/>
           </a:p>
@@ -7622,7 +7622,7 @@
             <a:fld id="{B61BEF0D-F0BB-DE4B-95CE-6DB70DBA9567}" type="datetimeFigureOut">
               <a:rPr lang="en-US" dirty="0"/>
               <a:pPr/>
-              <a:t>3/16/2020</a:t>
+              <a:t>3/17/2020</a:t>
             </a:fld>
             <a:endParaRPr lang="en-US" dirty="0"/>
           </a:p>
@@ -7927,7 +7927,7 @@
             <a:fld id="{B61BEF0D-F0BB-DE4B-95CE-6DB70DBA9567}" type="datetimeFigureOut">
               <a:rPr lang="en-US" dirty="0"/>
               <a:pPr/>
-              <a:t>3/16/2020</a:t>
+              <a:t>3/17/2020</a:t>
             </a:fld>
             <a:endParaRPr lang="en-US" dirty="0"/>
           </a:p>
@@ -8242,7 +8242,7 @@
             <a:fld id="{B61BEF0D-F0BB-DE4B-95CE-6DB70DBA9567}" type="datetimeFigureOut">
               <a:rPr lang="en-US" dirty="0"/>
               <a:pPr/>
-              <a:t>3/16/2020</a:t>
+              <a:t>3/17/2020</a:t>
             </a:fld>
             <a:endParaRPr lang="en-US" dirty="0"/>
           </a:p>
@@ -8541,7 +8541,7 @@
             <a:fld id="{B61BEF0D-F0BB-DE4B-95CE-6DB70DBA9567}" type="datetimeFigureOut">
               <a:rPr lang="en-US" dirty="0"/>
               <a:pPr/>
-              <a:t>3/16/2020</a:t>
+              <a:t>3/17/2020</a:t>
             </a:fld>
             <a:endParaRPr lang="en-US" dirty="0"/>
           </a:p>
@@ -8905,7 +8905,7 @@
             <a:fld id="{B61BEF0D-F0BB-DE4B-95CE-6DB70DBA9567}" type="datetimeFigureOut">
               <a:rPr lang="en-US" dirty="0"/>
               <a:pPr/>
-              <a:t>3/16/2020</a:t>
+              <a:t>3/17/2020</a:t>
             </a:fld>
             <a:endParaRPr lang="en-US" dirty="0"/>
           </a:p>
@@ -9076,7 +9076,7 @@
             <a:fld id="{B61BEF0D-F0BB-DE4B-95CE-6DB70DBA9567}" type="datetimeFigureOut">
               <a:rPr lang="en-US" dirty="0"/>
               <a:pPr/>
-              <a:t>3/16/2020</a:t>
+              <a:t>3/17/2020</a:t>
             </a:fld>
             <a:endParaRPr lang="en-US" dirty="0"/>
           </a:p>
@@ -9253,7 +9253,7 @@
             <a:fld id="{B61BEF0D-F0BB-DE4B-95CE-6DB70DBA9567}" type="datetimeFigureOut">
               <a:rPr lang="en-US" dirty="0"/>
               <a:pPr/>
-              <a:t>3/16/2020</a:t>
+              <a:t>3/17/2020</a:t>
             </a:fld>
             <a:endParaRPr lang="en-US" dirty="0"/>
           </a:p>
@@ -9420,7 +9420,7 @@
             <a:fld id="{B61BEF0D-F0BB-DE4B-95CE-6DB70DBA9567}" type="datetimeFigureOut">
               <a:rPr lang="en-US" dirty="0"/>
               <a:pPr/>
-              <a:t>3/16/2020</a:t>
+              <a:t>3/17/2020</a:t>
             </a:fld>
             <a:endParaRPr lang="en-US" dirty="0"/>
           </a:p>
@@ -9667,7 +9667,7 @@
             <a:fld id="{B61BEF0D-F0BB-DE4B-95CE-6DB70DBA9567}" type="datetimeFigureOut">
               <a:rPr lang="en-US" dirty="0"/>
               <a:pPr/>
-              <a:t>3/16/2020</a:t>
+              <a:t>3/17/2020</a:t>
             </a:fld>
             <a:endParaRPr lang="en-US" dirty="0"/>
           </a:p>
@@ -9900,7 +9900,7 @@
             <a:fld id="{B61BEF0D-F0BB-DE4B-95CE-6DB70DBA9567}" type="datetimeFigureOut">
               <a:rPr lang="en-US" dirty="0"/>
               <a:pPr/>
-              <a:t>3/16/2020</a:t>
+              <a:t>3/17/2020</a:t>
             </a:fld>
             <a:endParaRPr lang="en-US" dirty="0"/>
           </a:p>
@@ -10279,7 +10279,7 @@
             <a:fld id="{B61BEF0D-F0BB-DE4B-95CE-6DB70DBA9567}" type="datetimeFigureOut">
               <a:rPr lang="en-US" dirty="0"/>
               <a:pPr/>
-              <a:t>3/16/2020</a:t>
+              <a:t>3/17/2020</a:t>
             </a:fld>
             <a:endParaRPr lang="en-US" dirty="0"/>
           </a:p>
@@ -10394,7 +10394,7 @@
             <a:fld id="{B61BEF0D-F0BB-DE4B-95CE-6DB70DBA9567}" type="datetimeFigureOut">
               <a:rPr lang="en-US" dirty="0"/>
               <a:pPr/>
-              <a:t>3/16/2020</a:t>
+              <a:t>3/17/2020</a:t>
             </a:fld>
             <a:endParaRPr lang="en-US" dirty="0"/>
           </a:p>
@@ -10486,7 +10486,7 @@
             <a:fld id="{B61BEF0D-F0BB-DE4B-95CE-6DB70DBA9567}" type="datetimeFigureOut">
               <a:rPr lang="en-US" dirty="0"/>
               <a:pPr/>
-              <a:t>3/16/2020</a:t>
+              <a:t>3/17/2020</a:t>
             </a:fld>
             <a:endParaRPr lang="en-US" dirty="0"/>
           </a:p>
@@ -10738,7 +10738,7 @@
             <a:fld id="{B61BEF0D-F0BB-DE4B-95CE-6DB70DBA9567}" type="datetimeFigureOut">
               <a:rPr lang="en-US" dirty="0"/>
               <a:pPr/>
-              <a:t>3/16/2020</a:t>
+              <a:t>3/17/2020</a:t>
             </a:fld>
             <a:endParaRPr lang="en-US" dirty="0"/>
           </a:p>
@@ -11018,7 +11018,7 @@
             <a:fld id="{B61BEF0D-F0BB-DE4B-95CE-6DB70DBA9567}" type="datetimeFigureOut">
               <a:rPr lang="en-US" dirty="0"/>
               <a:pPr/>
-              <a:t>3/16/2020</a:t>
+              <a:t>3/17/2020</a:t>
             </a:fld>
             <a:endParaRPr lang="en-US" dirty="0"/>
           </a:p>
@@ -11421,7 +11421,7 @@
             <a:fld id="{B61BEF0D-F0BB-DE4B-95CE-6DB70DBA9567}" type="datetimeFigureOut">
               <a:rPr lang="en-US" dirty="0"/>
               <a:pPr/>
-              <a:t>3/16/2020</a:t>
+              <a:t>3/17/2020</a:t>
             </a:fld>
             <a:endParaRPr lang="en-US" dirty="0"/>
           </a:p>
@@ -19822,7 +19822,7 @@
         </p:blipFill>
         <p:spPr>
           <a:xfrm>
-            <a:off x="1647825" y="3714750"/>
+            <a:off x="6227620" y="3794485"/>
             <a:ext cx="914400" cy="914400"/>
           </a:xfrm>
           <a:prstGeom prst="rect">
@@ -19858,7 +19858,7 @@
         </p:blipFill>
         <p:spPr>
           <a:xfrm>
-            <a:off x="2973388" y="3843867"/>
+            <a:off x="2468479" y="3843867"/>
             <a:ext cx="914400" cy="914400"/>
           </a:xfrm>
           <a:prstGeom prst="rect">
@@ -19894,7 +19894,7 @@
         </p:blipFill>
         <p:spPr>
           <a:xfrm>
-            <a:off x="6329364" y="4030132"/>
+            <a:off x="9791077" y="3794485"/>
             <a:ext cx="914400" cy="914400"/>
           </a:xfrm>
           <a:prstGeom prst="rect">
@@ -19930,7 +19930,7 @@
         </p:blipFill>
         <p:spPr>
           <a:xfrm>
-            <a:off x="7582089" y="4171950"/>
+            <a:off x="7903975" y="3794485"/>
             <a:ext cx="914400" cy="914400"/>
           </a:xfrm>
           <a:prstGeom prst="rect">
@@ -19966,7 +19966,7 @@
         </p:blipFill>
         <p:spPr>
           <a:xfrm>
-            <a:off x="4298951" y="3236667"/>
+            <a:off x="4412544" y="3794485"/>
             <a:ext cx="914400" cy="914400"/>
           </a:xfrm>
           <a:prstGeom prst="rect">
@@ -20002,7 +20002,7 @@
         </p:blipFill>
         <p:spPr>
           <a:xfrm>
-            <a:off x="5117213" y="3790437"/>
+            <a:off x="684212" y="3843867"/>
             <a:ext cx="914400" cy="914400"/>
           </a:xfrm>
           <a:prstGeom prst="rect">

</xml_diff>

<commit_message>
#12 Arrows added for sai sleep on issues slides
</commit_message>
<xml_diff>
--- a/SAI_presentation.pptx
+++ b/SAI_presentation.pptx
@@ -20010,6 +20010,236 @@
           </a:prstGeom>
         </p:spPr>
       </p:pic>
+      <p:sp>
+        <p:nvSpPr>
+          <p:cNvPr id="4" name="Flèche : droite 3">
+            <a:extLst>
+              <a:ext uri="{FF2B5EF4-FFF2-40B4-BE49-F238E27FC236}">
+                <a16:creationId xmlns:a16="http://schemas.microsoft.com/office/drawing/2014/main" id="{8BF9777A-04D4-4CD2-A522-88F8A8F2D461}"/>
+              </a:ext>
+            </a:extLst>
+          </p:cNvPr>
+          <p:cNvSpPr/>
+          <p:nvPr/>
+        </p:nvSpPr>
+        <p:spPr>
+          <a:xfrm>
+            <a:off x="1638115" y="4183025"/>
+            <a:ext cx="682949" cy="262055"/>
+          </a:xfrm>
+          <a:prstGeom prst="rightArrow">
+            <a:avLst/>
+          </a:prstGeom>
+        </p:spPr>
+        <p:style>
+          <a:lnRef idx="2">
+            <a:schemeClr val="accent1">
+              <a:shade val="50000"/>
+            </a:schemeClr>
+          </a:lnRef>
+          <a:fillRef idx="1">
+            <a:schemeClr val="accent1"/>
+          </a:fillRef>
+          <a:effectRef idx="0">
+            <a:schemeClr val="accent1"/>
+          </a:effectRef>
+          <a:fontRef idx="minor">
+            <a:schemeClr val="lt1"/>
+          </a:fontRef>
+        </p:style>
+        <p:txBody>
+          <a:bodyPr rtlCol="0" anchor="ctr"/>
+          <a:lstStyle/>
+          <a:p>
+            <a:pPr algn="ctr"/>
+            <a:endParaRPr lang="en-GB"/>
+          </a:p>
+        </p:txBody>
+      </p:sp>
+      <p:sp>
+        <p:nvSpPr>
+          <p:cNvPr id="12" name="Flèche : droite 11">
+            <a:extLst>
+              <a:ext uri="{FF2B5EF4-FFF2-40B4-BE49-F238E27FC236}">
+                <a16:creationId xmlns:a16="http://schemas.microsoft.com/office/drawing/2014/main" id="{F633A220-CB68-4338-9646-BF4448EBDD92}"/>
+              </a:ext>
+            </a:extLst>
+          </p:cNvPr>
+          <p:cNvSpPr/>
+          <p:nvPr/>
+        </p:nvSpPr>
+        <p:spPr>
+          <a:xfrm>
+            <a:off x="3511868" y="4201766"/>
+            <a:ext cx="682949" cy="262055"/>
+          </a:xfrm>
+          <a:prstGeom prst="rightArrow">
+            <a:avLst/>
+          </a:prstGeom>
+        </p:spPr>
+        <p:style>
+          <a:lnRef idx="2">
+            <a:schemeClr val="accent1">
+              <a:shade val="50000"/>
+            </a:schemeClr>
+          </a:lnRef>
+          <a:fillRef idx="1">
+            <a:schemeClr val="accent1"/>
+          </a:fillRef>
+          <a:effectRef idx="0">
+            <a:schemeClr val="accent1"/>
+          </a:effectRef>
+          <a:fontRef idx="minor">
+            <a:schemeClr val="lt1"/>
+          </a:fontRef>
+        </p:style>
+        <p:txBody>
+          <a:bodyPr rtlCol="0" anchor="ctr"/>
+          <a:lstStyle/>
+          <a:p>
+            <a:pPr algn="ctr"/>
+            <a:endParaRPr lang="en-GB"/>
+          </a:p>
+        </p:txBody>
+      </p:sp>
+      <p:sp>
+        <p:nvSpPr>
+          <p:cNvPr id="13" name="Flèche : droite 12">
+            <a:extLst>
+              <a:ext uri="{FF2B5EF4-FFF2-40B4-BE49-F238E27FC236}">
+                <a16:creationId xmlns:a16="http://schemas.microsoft.com/office/drawing/2014/main" id="{2C3EA434-20D4-4851-978F-9F12469037C6}"/>
+              </a:ext>
+            </a:extLst>
+          </p:cNvPr>
+          <p:cNvSpPr/>
+          <p:nvPr/>
+        </p:nvSpPr>
+        <p:spPr>
+          <a:xfrm>
+            <a:off x="5366447" y="4193550"/>
+            <a:ext cx="682949" cy="262055"/>
+          </a:xfrm>
+          <a:prstGeom prst="rightArrow">
+            <a:avLst/>
+          </a:prstGeom>
+        </p:spPr>
+        <p:style>
+          <a:lnRef idx="2">
+            <a:schemeClr val="accent1">
+              <a:shade val="50000"/>
+            </a:schemeClr>
+          </a:lnRef>
+          <a:fillRef idx="1">
+            <a:schemeClr val="accent1"/>
+          </a:fillRef>
+          <a:effectRef idx="0">
+            <a:schemeClr val="accent1"/>
+          </a:effectRef>
+          <a:fontRef idx="minor">
+            <a:schemeClr val="lt1"/>
+          </a:fontRef>
+        </p:style>
+        <p:txBody>
+          <a:bodyPr rtlCol="0" anchor="ctr"/>
+          <a:lstStyle/>
+          <a:p>
+            <a:pPr algn="ctr"/>
+            <a:endParaRPr lang="en-GB"/>
+          </a:p>
+        </p:txBody>
+      </p:sp>
+      <p:sp>
+        <p:nvSpPr>
+          <p:cNvPr id="14" name="Flèche : droite 13">
+            <a:extLst>
+              <a:ext uri="{FF2B5EF4-FFF2-40B4-BE49-F238E27FC236}">
+                <a16:creationId xmlns:a16="http://schemas.microsoft.com/office/drawing/2014/main" id="{579E44C8-6EA1-4371-8D46-74C35AB4445F}"/>
+              </a:ext>
+            </a:extLst>
+          </p:cNvPr>
+          <p:cNvSpPr/>
+          <p:nvPr/>
+        </p:nvSpPr>
+        <p:spPr>
+          <a:xfrm>
+            <a:off x="7162263" y="4183025"/>
+            <a:ext cx="682949" cy="262055"/>
+          </a:xfrm>
+          <a:prstGeom prst="rightArrow">
+            <a:avLst/>
+          </a:prstGeom>
+        </p:spPr>
+        <p:style>
+          <a:lnRef idx="2">
+            <a:schemeClr val="accent1">
+              <a:shade val="50000"/>
+            </a:schemeClr>
+          </a:lnRef>
+          <a:fillRef idx="1">
+            <a:schemeClr val="accent1"/>
+          </a:fillRef>
+          <a:effectRef idx="0">
+            <a:schemeClr val="accent1"/>
+          </a:effectRef>
+          <a:fontRef idx="minor">
+            <a:schemeClr val="lt1"/>
+          </a:fontRef>
+        </p:style>
+        <p:txBody>
+          <a:bodyPr rtlCol="0" anchor="ctr"/>
+          <a:lstStyle/>
+          <a:p>
+            <a:pPr algn="ctr"/>
+            <a:endParaRPr lang="en-GB"/>
+          </a:p>
+        </p:txBody>
+      </p:sp>
+      <p:sp>
+        <p:nvSpPr>
+          <p:cNvPr id="15" name="Flèche : droite 14">
+            <a:extLst>
+              <a:ext uri="{FF2B5EF4-FFF2-40B4-BE49-F238E27FC236}">
+                <a16:creationId xmlns:a16="http://schemas.microsoft.com/office/drawing/2014/main" id="{3CFAC59C-390C-434A-B3D5-A407AD8778EF}"/>
+              </a:ext>
+            </a:extLst>
+          </p:cNvPr>
+          <p:cNvSpPr/>
+          <p:nvPr/>
+        </p:nvSpPr>
+        <p:spPr>
+          <a:xfrm>
+            <a:off x="8876245" y="4170039"/>
+            <a:ext cx="682949" cy="262055"/>
+          </a:xfrm>
+          <a:prstGeom prst="rightArrow">
+            <a:avLst/>
+          </a:prstGeom>
+        </p:spPr>
+        <p:style>
+          <a:lnRef idx="2">
+            <a:schemeClr val="accent1">
+              <a:shade val="50000"/>
+            </a:schemeClr>
+          </a:lnRef>
+          <a:fillRef idx="1">
+            <a:schemeClr val="accent1"/>
+          </a:fillRef>
+          <a:effectRef idx="0">
+            <a:schemeClr val="accent1"/>
+          </a:effectRef>
+          <a:fontRef idx="minor">
+            <a:schemeClr val="lt1"/>
+          </a:fontRef>
+        </p:style>
+        <p:txBody>
+          <a:bodyPr rtlCol="0" anchor="ctr"/>
+          <a:lstStyle/>
+          <a:p>
+            <a:pPr algn="ctr"/>
+            <a:endParaRPr lang="en-GB"/>
+          </a:p>
+        </p:txBody>
+      </p:sp>
     </p:spTree>
     <p:extLst>
       <p:ext uri="{BB962C8B-B14F-4D97-AF65-F5344CB8AC3E}">

</xml_diff>

<commit_message>
#12 Colors updated for sai sleep on issues slides
</commit_message>
<xml_diff>
--- a/SAI_presentation.pptx
+++ b/SAI_presentation.pptx
@@ -19724,8 +19724,48 @@
               <a:t>A </a:t>
             </a:r>
             <a:r>
-              <a:rPr lang="fr-FR" dirty="0" err="1"/>
+              <a:rPr lang="fr-FR" b="1" dirty="0" err="1">
+                <a:solidFill>
+                  <a:srgbClr val="0070C0"/>
+                </a:solidFill>
+              </a:rPr>
               <a:t>human</a:t>
+            </a:r>
+            <a:r>
+              <a:rPr lang="fr-FR" b="1" dirty="0">
+                <a:solidFill>
+                  <a:srgbClr val="0070C0"/>
+                </a:solidFill>
+              </a:rPr>
+              <a:t> </a:t>
+            </a:r>
+            <a:r>
+              <a:rPr lang="fr-FR" b="1" dirty="0" err="1">
+                <a:solidFill>
+                  <a:srgbClr val="92D050"/>
+                </a:solidFill>
+              </a:rPr>
+              <a:t>sleep</a:t>
+            </a:r>
+            <a:r>
+              <a:rPr lang="fr-FR" b="1" dirty="0">
+                <a:solidFill>
+                  <a:srgbClr val="0070C0"/>
+                </a:solidFill>
+              </a:rPr>
+              <a:t> </a:t>
+            </a:r>
+            <a:r>
+              <a:rPr lang="fr-FR" dirty="0"/>
+              <a:t>to </a:t>
+            </a:r>
+            <a:r>
+              <a:rPr lang="fr-FR" b="1" dirty="0" err="1">
+                <a:solidFill>
+                  <a:srgbClr val="002060"/>
+                </a:solidFill>
+              </a:rPr>
+              <a:t>organize</a:t>
             </a:r>
             <a:r>
               <a:rPr lang="fr-FR" dirty="0"/>
@@ -19733,7 +19773,102 @@
             </a:r>
             <a:r>
               <a:rPr lang="fr-FR" dirty="0" err="1"/>
-              <a:t>sleep</a:t>
+              <a:t>it</a:t>
+            </a:r>
+            <a:r>
+              <a:rPr lang="fr-FR" dirty="0"/>
+              <a:t> memory</a:t>
+            </a:r>
+          </a:p>
+          <a:p>
+            <a:r>
+              <a:rPr lang="fr-FR" dirty="0"/>
+              <a:t>So do </a:t>
+            </a:r>
+            <a:r>
+              <a:rPr lang="fr-FR" b="1" dirty="0">
+                <a:solidFill>
+                  <a:srgbClr val="FFC000"/>
+                </a:solidFill>
+              </a:rPr>
+              <a:t>SAI</a:t>
+            </a:r>
+            <a:r>
+              <a:rPr lang="fr-FR" dirty="0"/>
+              <a:t> </a:t>
+            </a:r>
+            <a:r>
+              <a:rPr lang="fr-FR" dirty="0" err="1"/>
+              <a:t>need</a:t>
+            </a:r>
+            <a:r>
+              <a:rPr lang="fr-FR" dirty="0"/>
+              <a:t> to</a:t>
+            </a:r>
+          </a:p>
+          <a:p>
+            <a:r>
+              <a:rPr lang="fr-FR" dirty="0"/>
+              <a:t>It </a:t>
+            </a:r>
+            <a:r>
+              <a:rPr lang="fr-FR" dirty="0" err="1"/>
+              <a:t>will</a:t>
+            </a:r>
+            <a:r>
+              <a:rPr lang="fr-FR" dirty="0"/>
+              <a:t> </a:t>
+            </a:r>
+            <a:r>
+              <a:rPr lang="fr-FR" b="1" dirty="0" err="1">
+                <a:solidFill>
+                  <a:schemeClr val="accent6">
+                    <a:lumMod val="75000"/>
+                  </a:schemeClr>
+                </a:solidFill>
+              </a:rPr>
+              <a:t>compress</a:t>
+            </a:r>
+            <a:r>
+              <a:rPr lang="fr-FR" dirty="0"/>
+              <a:t> </a:t>
+            </a:r>
+            <a:r>
+              <a:rPr lang="fr-FR" b="1" dirty="0">
+                <a:solidFill>
+                  <a:schemeClr val="accent3">
+                    <a:lumMod val="60000"/>
+                    <a:lumOff val="40000"/>
+                  </a:schemeClr>
+                </a:solidFill>
+              </a:rPr>
+              <a:t>data</a:t>
+            </a:r>
+            <a:r>
+              <a:rPr lang="fr-FR" dirty="0"/>
+              <a:t> as </a:t>
+            </a:r>
+            <a:r>
+              <a:rPr lang="fr-FR" dirty="0" err="1"/>
+              <a:t>much</a:t>
+            </a:r>
+            <a:r>
+              <a:rPr lang="fr-FR" dirty="0"/>
+              <a:t> as </a:t>
+            </a:r>
+            <a:r>
+              <a:rPr lang="fr-FR" dirty="0" err="1"/>
+              <a:t>he</a:t>
+            </a:r>
+            <a:r>
+              <a:rPr lang="fr-FR" dirty="0"/>
+              <a:t> can</a:t>
+            </a:r>
+          </a:p>
+          <a:p>
+            <a:r>
+              <a:rPr lang="fr-FR" dirty="0" err="1"/>
+              <a:t>Schema</a:t>
             </a:r>
             <a:r>
               <a:rPr lang="fr-FR" dirty="0"/>
@@ -19741,56 +19876,9 @@
             </a:r>
             <a:r>
               <a:rPr lang="fr-FR" dirty="0" err="1"/>
-              <a:t>organize</a:t>
-            </a:r>
-            <a:r>
-              <a:rPr lang="fr-FR" dirty="0"/>
-              <a:t> </a:t>
-            </a:r>
-            <a:r>
-              <a:rPr lang="fr-FR" dirty="0" err="1"/>
-              <a:t>it</a:t>
-            </a:r>
-            <a:r>
-              <a:rPr lang="fr-FR" dirty="0"/>
-              <a:t> memory</a:t>
-            </a:r>
-          </a:p>
-          <a:p>
-            <a:r>
-              <a:rPr lang="fr-FR" dirty="0"/>
-              <a:t>So do SAI </a:t>
-            </a:r>
-            <a:r>
-              <a:rPr lang="fr-FR" err="1"/>
-              <a:t>need</a:t>
-            </a:r>
-            <a:r>
-              <a:rPr lang="fr-FR"/>
-              <a:t> to</a:t>
-            </a:r>
-          </a:p>
-          <a:p>
-            <a:r>
-              <a:rPr lang="fr-FR"/>
-              <a:t>It will compress data as much as he can</a:t>
-            </a:r>
-            <a:endParaRPr lang="fr-FR" dirty="0"/>
-          </a:p>
-          <a:p>
-            <a:r>
-              <a:rPr lang="fr-FR" dirty="0" err="1"/>
-              <a:t>Schema</a:t>
-            </a:r>
-            <a:r>
-              <a:rPr lang="fr-FR" dirty="0"/>
-              <a:t> to </a:t>
-            </a:r>
-            <a:r>
-              <a:rPr lang="fr-FR"/>
               <a:t>explain</a:t>
             </a:r>
-            <a:endParaRPr lang="en-GB"/>
+            <a:endParaRPr lang="en-GB" dirty="0"/>
           </a:p>
         </p:txBody>
       </p:sp>

</xml_diff>

<commit_message>
#12 Reward icon added on issues slides
</commit_message>
<xml_diff>
--- a/SAI_presentation.pptx
+++ b/SAI_presentation.pptx
@@ -6942,7 +6942,7 @@
             <a:fld id="{B61BEF0D-F0BB-DE4B-95CE-6DB70DBA9567}" type="datetimeFigureOut">
               <a:rPr lang="en-US" dirty="0"/>
               <a:pPr/>
-              <a:t>3/17/2020</a:t>
+              <a:t>3/18/2020</a:t>
             </a:fld>
             <a:endParaRPr lang="en-US" dirty="0"/>
           </a:p>
@@ -7375,7 +7375,7 @@
             <a:fld id="{B61BEF0D-F0BB-DE4B-95CE-6DB70DBA9567}" type="datetimeFigureOut">
               <a:rPr lang="en-US" dirty="0"/>
               <a:pPr/>
-              <a:t>3/17/2020</a:t>
+              <a:t>3/18/2020</a:t>
             </a:fld>
             <a:endParaRPr lang="en-US" dirty="0"/>
           </a:p>
@@ -7622,7 +7622,7 @@
             <a:fld id="{B61BEF0D-F0BB-DE4B-95CE-6DB70DBA9567}" type="datetimeFigureOut">
               <a:rPr lang="en-US" dirty="0"/>
               <a:pPr/>
-              <a:t>3/17/2020</a:t>
+              <a:t>3/18/2020</a:t>
             </a:fld>
             <a:endParaRPr lang="en-US" dirty="0"/>
           </a:p>
@@ -7927,7 +7927,7 @@
             <a:fld id="{B61BEF0D-F0BB-DE4B-95CE-6DB70DBA9567}" type="datetimeFigureOut">
               <a:rPr lang="en-US" dirty="0"/>
               <a:pPr/>
-              <a:t>3/17/2020</a:t>
+              <a:t>3/18/2020</a:t>
             </a:fld>
             <a:endParaRPr lang="en-US" dirty="0"/>
           </a:p>
@@ -8242,7 +8242,7 @@
             <a:fld id="{B61BEF0D-F0BB-DE4B-95CE-6DB70DBA9567}" type="datetimeFigureOut">
               <a:rPr lang="en-US" dirty="0"/>
               <a:pPr/>
-              <a:t>3/17/2020</a:t>
+              <a:t>3/18/2020</a:t>
             </a:fld>
             <a:endParaRPr lang="en-US" dirty="0"/>
           </a:p>
@@ -8541,7 +8541,7 @@
             <a:fld id="{B61BEF0D-F0BB-DE4B-95CE-6DB70DBA9567}" type="datetimeFigureOut">
               <a:rPr lang="en-US" dirty="0"/>
               <a:pPr/>
-              <a:t>3/17/2020</a:t>
+              <a:t>3/18/2020</a:t>
             </a:fld>
             <a:endParaRPr lang="en-US" dirty="0"/>
           </a:p>
@@ -8905,7 +8905,7 @@
             <a:fld id="{B61BEF0D-F0BB-DE4B-95CE-6DB70DBA9567}" type="datetimeFigureOut">
               <a:rPr lang="en-US" dirty="0"/>
               <a:pPr/>
-              <a:t>3/17/2020</a:t>
+              <a:t>3/18/2020</a:t>
             </a:fld>
             <a:endParaRPr lang="en-US" dirty="0"/>
           </a:p>
@@ -9076,7 +9076,7 @@
             <a:fld id="{B61BEF0D-F0BB-DE4B-95CE-6DB70DBA9567}" type="datetimeFigureOut">
               <a:rPr lang="en-US" dirty="0"/>
               <a:pPr/>
-              <a:t>3/17/2020</a:t>
+              <a:t>3/18/2020</a:t>
             </a:fld>
             <a:endParaRPr lang="en-US" dirty="0"/>
           </a:p>
@@ -9253,7 +9253,7 @@
             <a:fld id="{B61BEF0D-F0BB-DE4B-95CE-6DB70DBA9567}" type="datetimeFigureOut">
               <a:rPr lang="en-US" dirty="0"/>
               <a:pPr/>
-              <a:t>3/17/2020</a:t>
+              <a:t>3/18/2020</a:t>
             </a:fld>
             <a:endParaRPr lang="en-US" dirty="0"/>
           </a:p>
@@ -9420,7 +9420,7 @@
             <a:fld id="{B61BEF0D-F0BB-DE4B-95CE-6DB70DBA9567}" type="datetimeFigureOut">
               <a:rPr lang="en-US" dirty="0"/>
               <a:pPr/>
-              <a:t>3/17/2020</a:t>
+              <a:t>3/18/2020</a:t>
             </a:fld>
             <a:endParaRPr lang="en-US" dirty="0"/>
           </a:p>
@@ -9667,7 +9667,7 @@
             <a:fld id="{B61BEF0D-F0BB-DE4B-95CE-6DB70DBA9567}" type="datetimeFigureOut">
               <a:rPr lang="en-US" dirty="0"/>
               <a:pPr/>
-              <a:t>3/17/2020</a:t>
+              <a:t>3/18/2020</a:t>
             </a:fld>
             <a:endParaRPr lang="en-US" dirty="0"/>
           </a:p>
@@ -9900,7 +9900,7 @@
             <a:fld id="{B61BEF0D-F0BB-DE4B-95CE-6DB70DBA9567}" type="datetimeFigureOut">
               <a:rPr lang="en-US" dirty="0"/>
               <a:pPr/>
-              <a:t>3/17/2020</a:t>
+              <a:t>3/18/2020</a:t>
             </a:fld>
             <a:endParaRPr lang="en-US" dirty="0"/>
           </a:p>
@@ -10279,7 +10279,7 @@
             <a:fld id="{B61BEF0D-F0BB-DE4B-95CE-6DB70DBA9567}" type="datetimeFigureOut">
               <a:rPr lang="en-US" dirty="0"/>
               <a:pPr/>
-              <a:t>3/17/2020</a:t>
+              <a:t>3/18/2020</a:t>
             </a:fld>
             <a:endParaRPr lang="en-US" dirty="0"/>
           </a:p>
@@ -10394,7 +10394,7 @@
             <a:fld id="{B61BEF0D-F0BB-DE4B-95CE-6DB70DBA9567}" type="datetimeFigureOut">
               <a:rPr lang="en-US" dirty="0"/>
               <a:pPr/>
-              <a:t>3/17/2020</a:t>
+              <a:t>3/18/2020</a:t>
             </a:fld>
             <a:endParaRPr lang="en-US" dirty="0"/>
           </a:p>
@@ -10486,7 +10486,7 @@
             <a:fld id="{B61BEF0D-F0BB-DE4B-95CE-6DB70DBA9567}" type="datetimeFigureOut">
               <a:rPr lang="en-US" dirty="0"/>
               <a:pPr/>
-              <a:t>3/17/2020</a:t>
+              <a:t>3/18/2020</a:t>
             </a:fld>
             <a:endParaRPr lang="en-US" dirty="0"/>
           </a:p>
@@ -10738,7 +10738,7 @@
             <a:fld id="{B61BEF0D-F0BB-DE4B-95CE-6DB70DBA9567}" type="datetimeFigureOut">
               <a:rPr lang="en-US" dirty="0"/>
               <a:pPr/>
-              <a:t>3/17/2020</a:t>
+              <a:t>3/18/2020</a:t>
             </a:fld>
             <a:endParaRPr lang="en-US" dirty="0"/>
           </a:p>
@@ -11018,7 +11018,7 @@
             <a:fld id="{B61BEF0D-F0BB-DE4B-95CE-6DB70DBA9567}" type="datetimeFigureOut">
               <a:rPr lang="en-US" dirty="0"/>
               <a:pPr/>
-              <a:t>3/17/2020</a:t>
+              <a:t>3/18/2020</a:t>
             </a:fld>
             <a:endParaRPr lang="en-US" dirty="0"/>
           </a:p>
@@ -11421,7 +11421,7 @@
             <a:fld id="{B61BEF0D-F0BB-DE4B-95CE-6DB70DBA9567}" type="datetimeFigureOut">
               <a:rPr lang="en-US" dirty="0"/>
               <a:pPr/>
-              <a:t>3/17/2020</a:t>
+              <a:t>3/18/2020</a:t>
             </a:fld>
             <a:endParaRPr lang="en-US" dirty="0"/>
           </a:p>
@@ -19141,7 +19141,7 @@
         </p:blipFill>
         <p:spPr bwMode="auto">
           <a:xfrm>
-            <a:off x="5215593" y="1689264"/>
+            <a:off x="7097659" y="1943391"/>
             <a:ext cx="854553" cy="854553"/>
           </a:xfrm>
           <a:prstGeom prst="rect">
@@ -19188,7 +19188,7 @@
         </p:blipFill>
         <p:spPr bwMode="auto">
           <a:xfrm>
-            <a:off x="5049635" y="4042634"/>
+            <a:off x="6931701" y="4296761"/>
             <a:ext cx="1181100" cy="473363"/>
           </a:xfrm>
           <a:prstGeom prst="rect">
@@ -19235,7 +19235,7 @@
         </p:blipFill>
         <p:spPr bwMode="auto">
           <a:xfrm>
-            <a:off x="5172028" y="2642799"/>
+            <a:off x="7054094" y="2896926"/>
             <a:ext cx="898118" cy="1040354"/>
           </a:xfrm>
           <a:prstGeom prst="rect">
@@ -19281,7 +19281,7 @@
         </p:blipFill>
         <p:spPr>
           <a:xfrm>
-            <a:off x="836364" y="1810757"/>
+            <a:off x="2718430" y="2064884"/>
             <a:ext cx="914400" cy="914400"/>
           </a:xfrm>
           <a:prstGeom prst="rect">
@@ -19317,7 +19317,7 @@
         </p:blipFill>
         <p:spPr>
           <a:xfrm>
-            <a:off x="857233" y="3116814"/>
+            <a:off x="2739299" y="3370941"/>
             <a:ext cx="914400" cy="914400"/>
           </a:xfrm>
           <a:prstGeom prst="rect">
@@ -19353,7 +19353,7 @@
         </p:blipFill>
         <p:spPr>
           <a:xfrm>
-            <a:off x="3026620" y="2598041"/>
+            <a:off x="4908686" y="2852168"/>
             <a:ext cx="914400" cy="914400"/>
           </a:xfrm>
           <a:prstGeom prst="rect">
@@ -19375,7 +19375,7 @@
         </p:nvSpPr>
         <p:spPr>
           <a:xfrm rot="1192363">
-            <a:off x="2166072" y="2419824"/>
+            <a:off x="4048138" y="2673951"/>
             <a:ext cx="978408" cy="484632"/>
           </a:xfrm>
           <a:prstGeom prst="rightArrow">
@@ -19429,7 +19429,7 @@
         </p:nvSpPr>
         <p:spPr>
           <a:xfrm rot="20407754">
-            <a:off x="2146108" y="3205690"/>
+            <a:off x="4028174" y="3459817"/>
             <a:ext cx="978408" cy="484632"/>
           </a:xfrm>
           <a:prstGeom prst="rightArrow">
@@ -19483,7 +19483,7 @@
         </p:nvSpPr>
         <p:spPr>
           <a:xfrm rot="1192363">
-            <a:off x="3919765" y="3528256"/>
+            <a:off x="5801831" y="3782383"/>
             <a:ext cx="978408" cy="484632"/>
           </a:xfrm>
           <a:prstGeom prst="rightArrow">
@@ -19537,7 +19537,7 @@
         </p:nvSpPr>
         <p:spPr>
           <a:xfrm rot="20407754">
-            <a:off x="3994257" y="2201469"/>
+            <a:off x="5876323" y="2455596"/>
             <a:ext cx="978408" cy="484632"/>
           </a:xfrm>
           <a:prstGeom prst="rightArrow">
@@ -19591,7 +19591,7 @@
         </p:nvSpPr>
         <p:spPr>
           <a:xfrm>
-            <a:off x="4069824" y="2861342"/>
+            <a:off x="5951890" y="3115469"/>
             <a:ext cx="978408" cy="484632"/>
           </a:xfrm>
           <a:prstGeom prst="rightArrow">
@@ -19783,7 +19783,15 @@
           <a:p>
             <a:r>
               <a:rPr lang="fr-FR" dirty="0"/>
-              <a:t>So do </a:t>
+              <a:t>So </a:t>
+            </a:r>
+            <a:r>
+              <a:rPr lang="fr-FR" dirty="0" err="1"/>
+              <a:t>does</a:t>
+            </a:r>
+            <a:r>
+              <a:rPr lang="fr-FR" dirty="0"/>
+              <a:t> </a:t>
             </a:r>
             <a:r>
               <a:rPr lang="fr-FR" b="1" dirty="0">
@@ -19864,21 +19872,6 @@
               <a:rPr lang="fr-FR" dirty="0"/>
               <a:t> can</a:t>
             </a:r>
-          </a:p>
-          <a:p>
-            <a:r>
-              <a:rPr lang="fr-FR" dirty="0" err="1"/>
-              <a:t>Schema</a:t>
-            </a:r>
-            <a:r>
-              <a:rPr lang="fr-FR" dirty="0"/>
-              <a:t> to </a:t>
-            </a:r>
-            <a:r>
-              <a:rPr lang="fr-FR" dirty="0" err="1"/>
-              <a:t>explain</a:t>
-            </a:r>
-            <a:endParaRPr lang="en-GB" dirty="0"/>
           </a:p>
         </p:txBody>
       </p:sp>
@@ -20478,6 +20471,42 @@
           </a:p>
         </p:txBody>
       </p:sp>
+      <p:pic>
+        <p:nvPicPr>
+          <p:cNvPr id="5" name="Graphique 4" descr="Dollar">
+            <a:extLst>
+              <a:ext uri="{FF2B5EF4-FFF2-40B4-BE49-F238E27FC236}">
+                <a16:creationId xmlns:a16="http://schemas.microsoft.com/office/drawing/2014/main" id="{191997C7-9880-4DA0-95F2-183E247ACA00}"/>
+              </a:ext>
+            </a:extLst>
+          </p:cNvPr>
+          <p:cNvPicPr>
+            <a:picLocks noChangeAspect="1"/>
+          </p:cNvPicPr>
+          <p:nvPr/>
+        </p:nvPicPr>
+        <p:blipFill>
+          <a:blip r:embed="rId2">
+            <a:extLst>
+              <a:ext uri="{96DAC541-7B7A-43D3-8B79-37D633B846F1}">
+                <asvg:svgBlip xmlns:asvg="http://schemas.microsoft.com/office/drawing/2016/SVG/main" r:embed="rId3"/>
+              </a:ext>
+            </a:extLst>
+          </a:blip>
+          <a:stretch>
+            <a:fillRect/>
+          </a:stretch>
+        </p:blipFill>
+        <p:spPr>
+          <a:xfrm>
+            <a:off x="1582738" y="3386667"/>
+            <a:ext cx="914400" cy="914400"/>
+          </a:xfrm>
+          <a:prstGeom prst="rect">
+            <a:avLst/>
+          </a:prstGeom>
+        </p:spPr>
+      </p:pic>
     </p:spTree>
     <p:extLst>
       <p:ext uri="{BB962C8B-B14F-4D97-AF65-F5344CB8AC3E}">

</xml_diff>

<commit_message>
#12 Next decision of SAI icons added on issues slides
</commit_message>
<xml_diff>
--- a/SAI_presentation.pptx
+++ b/SAI_presentation.pptx
@@ -20507,6 +20507,78 @@
           </a:prstGeom>
         </p:spPr>
       </p:pic>
+      <p:pic>
+        <p:nvPicPr>
+          <p:cNvPr id="6" name="Graphique 5" descr="Graphique à barres">
+            <a:extLst>
+              <a:ext uri="{FF2B5EF4-FFF2-40B4-BE49-F238E27FC236}">
+                <a16:creationId xmlns:a16="http://schemas.microsoft.com/office/drawing/2014/main" id="{3F723DAA-8A25-4819-AF6A-4254DD4B563F}"/>
+              </a:ext>
+            </a:extLst>
+          </p:cNvPr>
+          <p:cNvPicPr>
+            <a:picLocks noChangeAspect="1"/>
+          </p:cNvPicPr>
+          <p:nvPr/>
+        </p:nvPicPr>
+        <p:blipFill>
+          <a:blip r:embed="rId4">
+            <a:extLst>
+              <a:ext uri="{96DAC541-7B7A-43D3-8B79-37D633B846F1}">
+                <asvg:svgBlip xmlns:asvg="http://schemas.microsoft.com/office/drawing/2016/SVG/main" r:embed="rId5"/>
+              </a:ext>
+            </a:extLst>
+          </a:blip>
+          <a:stretch>
+            <a:fillRect/>
+          </a:stretch>
+        </p:blipFill>
+        <p:spPr>
+          <a:xfrm>
+            <a:off x="3395664" y="3367617"/>
+            <a:ext cx="914400" cy="914400"/>
+          </a:xfrm>
+          <a:prstGeom prst="rect">
+            <a:avLst/>
+          </a:prstGeom>
+        </p:spPr>
+      </p:pic>
+      <p:pic>
+        <p:nvPicPr>
+          <p:cNvPr id="8" name="Graphique 7" descr="Tête avec engrenages">
+            <a:extLst>
+              <a:ext uri="{FF2B5EF4-FFF2-40B4-BE49-F238E27FC236}">
+                <a16:creationId xmlns:a16="http://schemas.microsoft.com/office/drawing/2014/main" id="{9B70B60E-543B-4AA9-BC06-5FC88F318CE0}"/>
+              </a:ext>
+            </a:extLst>
+          </p:cNvPr>
+          <p:cNvPicPr>
+            <a:picLocks noChangeAspect="1"/>
+          </p:cNvPicPr>
+          <p:nvPr/>
+        </p:nvPicPr>
+        <p:blipFill>
+          <a:blip r:embed="rId6">
+            <a:extLst>
+              <a:ext uri="{96DAC541-7B7A-43D3-8B79-37D633B846F1}">
+                <asvg:svgBlip xmlns:asvg="http://schemas.microsoft.com/office/drawing/2016/SVG/main" r:embed="rId7"/>
+              </a:ext>
+            </a:extLst>
+          </a:blip>
+          <a:stretch>
+            <a:fillRect/>
+          </a:stretch>
+        </p:blipFill>
+        <p:spPr>
+          <a:xfrm>
+            <a:off x="5392738" y="3399367"/>
+            <a:ext cx="914400" cy="914400"/>
+          </a:xfrm>
+          <a:prstGeom prst="rect">
+            <a:avLst/>
+          </a:prstGeom>
+        </p:spPr>
+      </p:pic>
     </p:spTree>
     <p:extLst>
       <p:ext uri="{BB962C8B-B14F-4D97-AF65-F5344CB8AC3E}">

</xml_diff>

<commit_message>
#12 Colors added for reward on issues slides
</commit_message>
<xml_diff>
--- a/SAI_presentation.pptx
+++ b/SAI_presentation.pptx
@@ -20414,7 +20414,14 @@
               <a:t>The </a:t>
             </a:r>
             <a:r>
-              <a:rPr lang="fr-FR" dirty="0" err="1"/>
+              <a:rPr lang="fr-FR" b="1" dirty="0" err="1">
+                <a:solidFill>
+                  <a:schemeClr val="accent4">
+                    <a:lumMod val="60000"/>
+                    <a:lumOff val="40000"/>
+                  </a:schemeClr>
+                </a:solidFill>
+              </a:rPr>
               <a:t>reward</a:t>
             </a:r>
             <a:r>
@@ -20430,8 +20437,55 @@
               <a:t> impact the </a:t>
             </a:r>
             <a:r>
+              <a:rPr lang="fr-FR" b="1" dirty="0" err="1">
+                <a:solidFill>
+                  <a:schemeClr val="tx2">
+                    <a:lumMod val="40000"/>
+                    <a:lumOff val="60000"/>
+                  </a:schemeClr>
+                </a:solidFill>
+              </a:rPr>
+              <a:t>next</a:t>
+            </a:r>
+            <a:r>
+              <a:rPr lang="fr-FR" b="1" dirty="0">
+                <a:solidFill>
+                  <a:schemeClr val="tx2">
+                    <a:lumMod val="40000"/>
+                    <a:lumOff val="60000"/>
+                  </a:schemeClr>
+                </a:solidFill>
+              </a:rPr>
+              <a:t> </a:t>
+            </a:r>
+            <a:r>
+              <a:rPr lang="fr-FR" b="1" dirty="0" err="1">
+                <a:solidFill>
+                  <a:schemeClr val="tx2">
+                    <a:lumMod val="40000"/>
+                    <a:lumOff val="60000"/>
+                  </a:schemeClr>
+                </a:solidFill>
+              </a:rPr>
+              <a:t>decision</a:t>
+            </a:r>
+            <a:r>
+              <a:rPr lang="fr-FR" dirty="0"/>
+              <a:t> for </a:t>
+            </a:r>
+            <a:r>
+              <a:rPr lang="fr-FR" b="1" dirty="0">
+                <a:solidFill>
+                  <a:srgbClr val="FFC000"/>
+                </a:solidFill>
+              </a:rPr>
+              <a:t>SAI</a:t>
+            </a:r>
+          </a:p>
+          <a:p>
+            <a:r>
               <a:rPr lang="fr-FR" dirty="0" err="1"/>
-              <a:t>next</a:t>
+              <a:t>Explain</a:t>
             </a:r>
             <a:r>
               <a:rPr lang="fr-FR" dirty="0"/>
@@ -20439,24 +20493,6 @@
             </a:r>
             <a:r>
               <a:rPr lang="fr-FR" dirty="0" err="1"/>
-              <a:t>decision</a:t>
-            </a:r>
-            <a:r>
-              <a:rPr lang="fr-FR" dirty="0"/>
-              <a:t> for SAI</a:t>
-            </a:r>
-          </a:p>
-          <a:p>
-            <a:r>
-              <a:rPr lang="fr-FR" dirty="0" err="1"/>
-              <a:t>Explain</a:t>
-            </a:r>
-            <a:r>
-              <a:rPr lang="fr-FR" dirty="0"/>
-              <a:t> </a:t>
-            </a:r>
-            <a:r>
-              <a:rPr lang="fr-FR" dirty="0" err="1"/>
               <a:t>with</a:t>
             </a:r>
             <a:r>
@@ -20464,10 +20500,10 @@
               <a:t> a </a:t>
             </a:r>
             <a:r>
-              <a:rPr lang="fr-FR"/>
+              <a:rPr lang="fr-FR" dirty="0" err="1"/>
               <a:t>schema</a:t>
             </a:r>
-            <a:endParaRPr lang="en-GB"/>
+            <a:endParaRPr lang="en-GB" dirty="0"/>
           </a:p>
         </p:txBody>
       </p:sp>

</xml_diff>

<commit_message>
#12 Arrows added for reward on issues slides
</commit_message>
<xml_diff>
--- a/SAI_presentation.pptx
+++ b/SAI_presentation.pptx
@@ -6942,7 +6942,7 @@
             <a:fld id="{B61BEF0D-F0BB-DE4B-95CE-6DB70DBA9567}" type="datetimeFigureOut">
               <a:rPr lang="en-US" dirty="0"/>
               <a:pPr/>
-              <a:t>3/18/2020</a:t>
+              <a:t>3/19/2020</a:t>
             </a:fld>
             <a:endParaRPr lang="en-US" dirty="0"/>
           </a:p>
@@ -7375,7 +7375,7 @@
             <a:fld id="{B61BEF0D-F0BB-DE4B-95CE-6DB70DBA9567}" type="datetimeFigureOut">
               <a:rPr lang="en-US" dirty="0"/>
               <a:pPr/>
-              <a:t>3/18/2020</a:t>
+              <a:t>3/19/2020</a:t>
             </a:fld>
             <a:endParaRPr lang="en-US" dirty="0"/>
           </a:p>
@@ -7622,7 +7622,7 @@
             <a:fld id="{B61BEF0D-F0BB-DE4B-95CE-6DB70DBA9567}" type="datetimeFigureOut">
               <a:rPr lang="en-US" dirty="0"/>
               <a:pPr/>
-              <a:t>3/18/2020</a:t>
+              <a:t>3/19/2020</a:t>
             </a:fld>
             <a:endParaRPr lang="en-US" dirty="0"/>
           </a:p>
@@ -7927,7 +7927,7 @@
             <a:fld id="{B61BEF0D-F0BB-DE4B-95CE-6DB70DBA9567}" type="datetimeFigureOut">
               <a:rPr lang="en-US" dirty="0"/>
               <a:pPr/>
-              <a:t>3/18/2020</a:t>
+              <a:t>3/19/2020</a:t>
             </a:fld>
             <a:endParaRPr lang="en-US" dirty="0"/>
           </a:p>
@@ -8242,7 +8242,7 @@
             <a:fld id="{B61BEF0D-F0BB-DE4B-95CE-6DB70DBA9567}" type="datetimeFigureOut">
               <a:rPr lang="en-US" dirty="0"/>
               <a:pPr/>
-              <a:t>3/18/2020</a:t>
+              <a:t>3/19/2020</a:t>
             </a:fld>
             <a:endParaRPr lang="en-US" dirty="0"/>
           </a:p>
@@ -8541,7 +8541,7 @@
             <a:fld id="{B61BEF0D-F0BB-DE4B-95CE-6DB70DBA9567}" type="datetimeFigureOut">
               <a:rPr lang="en-US" dirty="0"/>
               <a:pPr/>
-              <a:t>3/18/2020</a:t>
+              <a:t>3/19/2020</a:t>
             </a:fld>
             <a:endParaRPr lang="en-US" dirty="0"/>
           </a:p>
@@ -8905,7 +8905,7 @@
             <a:fld id="{B61BEF0D-F0BB-DE4B-95CE-6DB70DBA9567}" type="datetimeFigureOut">
               <a:rPr lang="en-US" dirty="0"/>
               <a:pPr/>
-              <a:t>3/18/2020</a:t>
+              <a:t>3/19/2020</a:t>
             </a:fld>
             <a:endParaRPr lang="en-US" dirty="0"/>
           </a:p>
@@ -9076,7 +9076,7 @@
             <a:fld id="{B61BEF0D-F0BB-DE4B-95CE-6DB70DBA9567}" type="datetimeFigureOut">
               <a:rPr lang="en-US" dirty="0"/>
               <a:pPr/>
-              <a:t>3/18/2020</a:t>
+              <a:t>3/19/2020</a:t>
             </a:fld>
             <a:endParaRPr lang="en-US" dirty="0"/>
           </a:p>
@@ -9253,7 +9253,7 @@
             <a:fld id="{B61BEF0D-F0BB-DE4B-95CE-6DB70DBA9567}" type="datetimeFigureOut">
               <a:rPr lang="en-US" dirty="0"/>
               <a:pPr/>
-              <a:t>3/18/2020</a:t>
+              <a:t>3/19/2020</a:t>
             </a:fld>
             <a:endParaRPr lang="en-US" dirty="0"/>
           </a:p>
@@ -9420,7 +9420,7 @@
             <a:fld id="{B61BEF0D-F0BB-DE4B-95CE-6DB70DBA9567}" type="datetimeFigureOut">
               <a:rPr lang="en-US" dirty="0"/>
               <a:pPr/>
-              <a:t>3/18/2020</a:t>
+              <a:t>3/19/2020</a:t>
             </a:fld>
             <a:endParaRPr lang="en-US" dirty="0"/>
           </a:p>
@@ -9667,7 +9667,7 @@
             <a:fld id="{B61BEF0D-F0BB-DE4B-95CE-6DB70DBA9567}" type="datetimeFigureOut">
               <a:rPr lang="en-US" dirty="0"/>
               <a:pPr/>
-              <a:t>3/18/2020</a:t>
+              <a:t>3/19/2020</a:t>
             </a:fld>
             <a:endParaRPr lang="en-US" dirty="0"/>
           </a:p>
@@ -9900,7 +9900,7 @@
             <a:fld id="{B61BEF0D-F0BB-DE4B-95CE-6DB70DBA9567}" type="datetimeFigureOut">
               <a:rPr lang="en-US" dirty="0"/>
               <a:pPr/>
-              <a:t>3/18/2020</a:t>
+              <a:t>3/19/2020</a:t>
             </a:fld>
             <a:endParaRPr lang="en-US" dirty="0"/>
           </a:p>
@@ -10279,7 +10279,7 @@
             <a:fld id="{B61BEF0D-F0BB-DE4B-95CE-6DB70DBA9567}" type="datetimeFigureOut">
               <a:rPr lang="en-US" dirty="0"/>
               <a:pPr/>
-              <a:t>3/18/2020</a:t>
+              <a:t>3/19/2020</a:t>
             </a:fld>
             <a:endParaRPr lang="en-US" dirty="0"/>
           </a:p>
@@ -10394,7 +10394,7 @@
             <a:fld id="{B61BEF0D-F0BB-DE4B-95CE-6DB70DBA9567}" type="datetimeFigureOut">
               <a:rPr lang="en-US" dirty="0"/>
               <a:pPr/>
-              <a:t>3/18/2020</a:t>
+              <a:t>3/19/2020</a:t>
             </a:fld>
             <a:endParaRPr lang="en-US" dirty="0"/>
           </a:p>
@@ -10486,7 +10486,7 @@
             <a:fld id="{B61BEF0D-F0BB-DE4B-95CE-6DB70DBA9567}" type="datetimeFigureOut">
               <a:rPr lang="en-US" dirty="0"/>
               <a:pPr/>
-              <a:t>3/18/2020</a:t>
+              <a:t>3/19/2020</a:t>
             </a:fld>
             <a:endParaRPr lang="en-US" dirty="0"/>
           </a:p>
@@ -10738,7 +10738,7 @@
             <a:fld id="{B61BEF0D-F0BB-DE4B-95CE-6DB70DBA9567}" type="datetimeFigureOut">
               <a:rPr lang="en-US" dirty="0"/>
               <a:pPr/>
-              <a:t>3/18/2020</a:t>
+              <a:t>3/19/2020</a:t>
             </a:fld>
             <a:endParaRPr lang="en-US" dirty="0"/>
           </a:p>
@@ -11018,7 +11018,7 @@
             <a:fld id="{B61BEF0D-F0BB-DE4B-95CE-6DB70DBA9567}" type="datetimeFigureOut">
               <a:rPr lang="en-US" dirty="0"/>
               <a:pPr/>
-              <a:t>3/18/2020</a:t>
+              <a:t>3/19/2020</a:t>
             </a:fld>
             <a:endParaRPr lang="en-US" dirty="0"/>
           </a:p>
@@ -11421,7 +11421,7 @@
             <a:fld id="{B61BEF0D-F0BB-DE4B-95CE-6DB70DBA9567}" type="datetimeFigureOut">
               <a:rPr lang="en-US" dirty="0"/>
               <a:pPr/>
-              <a:t>3/18/2020</a:t>
+              <a:t>3/19/2020</a:t>
             </a:fld>
             <a:endParaRPr lang="en-US" dirty="0"/>
           </a:p>
@@ -20535,7 +20535,7 @@
         </p:blipFill>
         <p:spPr>
           <a:xfrm>
-            <a:off x="1582738" y="3386667"/>
+            <a:off x="4681806" y="2481589"/>
             <a:ext cx="914400" cy="914400"/>
           </a:xfrm>
           <a:prstGeom prst="rect">
@@ -20571,7 +20571,7 @@
         </p:blipFill>
         <p:spPr>
           <a:xfrm>
-            <a:off x="3395664" y="3367617"/>
+            <a:off x="6609381" y="3669458"/>
             <a:ext cx="914400" cy="914400"/>
           </a:xfrm>
           <a:prstGeom prst="rect">
@@ -20607,7 +20607,7 @@
         </p:blipFill>
         <p:spPr>
           <a:xfrm>
-            <a:off x="5392738" y="3399367"/>
+            <a:off x="2973388" y="3669458"/>
             <a:ext cx="914400" cy="914400"/>
           </a:xfrm>
           <a:prstGeom prst="rect">
@@ -20615,6 +20615,98 @@
           </a:prstGeom>
         </p:spPr>
       </p:pic>
+      <p:sp>
+        <p:nvSpPr>
+          <p:cNvPr id="4" name="Flèche : droite 3">
+            <a:extLst>
+              <a:ext uri="{FF2B5EF4-FFF2-40B4-BE49-F238E27FC236}">
+                <a16:creationId xmlns:a16="http://schemas.microsoft.com/office/drawing/2014/main" id="{7E7500BF-E373-41AD-B704-18015206972B}"/>
+              </a:ext>
+            </a:extLst>
+          </p:cNvPr>
+          <p:cNvSpPr/>
+          <p:nvPr/>
+        </p:nvSpPr>
+        <p:spPr>
+          <a:xfrm>
+            <a:off x="4214336" y="3946321"/>
+            <a:ext cx="2068497" cy="360674"/>
+          </a:xfrm>
+          <a:prstGeom prst="rightArrow">
+            <a:avLst/>
+          </a:prstGeom>
+        </p:spPr>
+        <p:style>
+          <a:lnRef idx="2">
+            <a:schemeClr val="accent1">
+              <a:shade val="50000"/>
+            </a:schemeClr>
+          </a:lnRef>
+          <a:fillRef idx="1">
+            <a:schemeClr val="accent1"/>
+          </a:fillRef>
+          <a:effectRef idx="0">
+            <a:schemeClr val="accent1"/>
+          </a:effectRef>
+          <a:fontRef idx="minor">
+            <a:schemeClr val="lt1"/>
+          </a:fontRef>
+        </p:style>
+        <p:txBody>
+          <a:bodyPr rtlCol="0" anchor="ctr"/>
+          <a:lstStyle/>
+          <a:p>
+            <a:pPr algn="ctr"/>
+            <a:endParaRPr lang="en-GB"/>
+          </a:p>
+        </p:txBody>
+      </p:sp>
+      <p:sp>
+        <p:nvSpPr>
+          <p:cNvPr id="7" name="Flèche : bas 6">
+            <a:extLst>
+              <a:ext uri="{FF2B5EF4-FFF2-40B4-BE49-F238E27FC236}">
+                <a16:creationId xmlns:a16="http://schemas.microsoft.com/office/drawing/2014/main" id="{DEA3F0E8-3642-4CB8-B662-D7DCB05AB946}"/>
+              </a:ext>
+            </a:extLst>
+          </p:cNvPr>
+          <p:cNvSpPr/>
+          <p:nvPr/>
+        </p:nvSpPr>
+        <p:spPr>
+          <a:xfrm>
+            <a:off x="4988085" y="3533313"/>
+            <a:ext cx="301841" cy="407080"/>
+          </a:xfrm>
+          <a:prstGeom prst="downArrow">
+            <a:avLst/>
+          </a:prstGeom>
+        </p:spPr>
+        <p:style>
+          <a:lnRef idx="2">
+            <a:schemeClr val="accent1">
+              <a:shade val="50000"/>
+            </a:schemeClr>
+          </a:lnRef>
+          <a:fillRef idx="1">
+            <a:schemeClr val="accent1"/>
+          </a:fillRef>
+          <a:effectRef idx="0">
+            <a:schemeClr val="accent1"/>
+          </a:effectRef>
+          <a:fontRef idx="minor">
+            <a:schemeClr val="lt1"/>
+          </a:fontRef>
+        </p:style>
+        <p:txBody>
+          <a:bodyPr rtlCol="0" anchor="ctr"/>
+          <a:lstStyle/>
+          <a:p>
+            <a:pPr algn="ctr"/>
+            <a:endParaRPr lang="en-GB"/>
+          </a:p>
+        </p:txBody>
+      </p:sp>
     </p:spTree>
     <p:extLst>
       <p:ext uri="{BB962C8B-B14F-4D97-AF65-F5344CB8AC3E}">

</xml_diff>

<commit_message>
#12 Icons added for robust SAI on issues slides
</commit_message>
<xml_diff>
--- a/SAI_presentation.pptx
+++ b/SAI_presentation.pptx
@@ -12408,6 +12408,114 @@
           </a:p>
         </p:txBody>
       </p:sp>
+      <p:pic>
+        <p:nvPicPr>
+          <p:cNvPr id="5" name="Graphique 4" descr="Ordinateur">
+            <a:extLst>
+              <a:ext uri="{FF2B5EF4-FFF2-40B4-BE49-F238E27FC236}">
+                <a16:creationId xmlns:a16="http://schemas.microsoft.com/office/drawing/2014/main" id="{64D4E488-440D-4802-8148-FCF9C098ED48}"/>
+              </a:ext>
+            </a:extLst>
+          </p:cNvPr>
+          <p:cNvPicPr>
+            <a:picLocks noChangeAspect="1"/>
+          </p:cNvPicPr>
+          <p:nvPr/>
+        </p:nvPicPr>
+        <p:blipFill>
+          <a:blip r:embed="rId2">
+            <a:extLst>
+              <a:ext uri="{96DAC541-7B7A-43D3-8B79-37D633B846F1}">
+                <asvg:svgBlip xmlns:asvg="http://schemas.microsoft.com/office/drawing/2016/SVG/main" r:embed="rId3"/>
+              </a:ext>
+            </a:extLst>
+          </a:blip>
+          <a:stretch>
+            <a:fillRect/>
+          </a:stretch>
+        </p:blipFill>
+        <p:spPr>
+          <a:xfrm>
+            <a:off x="4348164" y="4545539"/>
+            <a:ext cx="914400" cy="914400"/>
+          </a:xfrm>
+          <a:prstGeom prst="rect">
+            <a:avLst/>
+          </a:prstGeom>
+        </p:spPr>
+      </p:pic>
+      <p:pic>
+        <p:nvPicPr>
+          <p:cNvPr id="7" name="Graphique 6" descr="Micro de radio">
+            <a:extLst>
+              <a:ext uri="{FF2B5EF4-FFF2-40B4-BE49-F238E27FC236}">
+                <a16:creationId xmlns:a16="http://schemas.microsoft.com/office/drawing/2014/main" id="{CB7E0AAE-5A37-4CED-8BAA-BFE865BE2E78}"/>
+              </a:ext>
+            </a:extLst>
+          </p:cNvPr>
+          <p:cNvPicPr>
+            <a:picLocks noChangeAspect="1"/>
+          </p:cNvPicPr>
+          <p:nvPr/>
+        </p:nvPicPr>
+        <p:blipFill>
+          <a:blip r:embed="rId4">
+            <a:extLst>
+              <a:ext uri="{96DAC541-7B7A-43D3-8B79-37D633B846F1}">
+                <asvg:svgBlip xmlns:asvg="http://schemas.microsoft.com/office/drawing/2016/SVG/main" r:embed="rId5"/>
+              </a:ext>
+            </a:extLst>
+          </a:blip>
+          <a:stretch>
+            <a:fillRect/>
+          </a:stretch>
+        </p:blipFill>
+        <p:spPr>
+          <a:xfrm>
+            <a:off x="6627812" y="3631139"/>
+            <a:ext cx="914400" cy="914400"/>
+          </a:xfrm>
+          <a:prstGeom prst="rect">
+            <a:avLst/>
+          </a:prstGeom>
+        </p:spPr>
+      </p:pic>
+      <p:pic>
+        <p:nvPicPr>
+          <p:cNvPr id="8" name="Graphique 7" descr="Tête avec engrenages">
+            <a:extLst>
+              <a:ext uri="{FF2B5EF4-FFF2-40B4-BE49-F238E27FC236}">
+                <a16:creationId xmlns:a16="http://schemas.microsoft.com/office/drawing/2014/main" id="{39673A69-588D-486B-BD6C-8823312BAC93}"/>
+              </a:ext>
+            </a:extLst>
+          </p:cNvPr>
+          <p:cNvPicPr>
+            <a:picLocks noChangeAspect="1"/>
+          </p:cNvPicPr>
+          <p:nvPr/>
+        </p:nvPicPr>
+        <p:blipFill>
+          <a:blip r:embed="rId6">
+            <a:extLst>
+              <a:ext uri="{96DAC541-7B7A-43D3-8B79-37D633B846F1}">
+                <asvg:svgBlip xmlns:asvg="http://schemas.microsoft.com/office/drawing/2016/SVG/main" r:embed="rId7"/>
+              </a:ext>
+            </a:extLst>
+          </a:blip>
+          <a:stretch>
+            <a:fillRect/>
+          </a:stretch>
+        </p:blipFill>
+        <p:spPr>
+          <a:xfrm>
+            <a:off x="4494212" y="3134254"/>
+            <a:ext cx="914400" cy="914400"/>
+          </a:xfrm>
+          <a:prstGeom prst="rect">
+            <a:avLst/>
+          </a:prstGeom>
+        </p:spPr>
+      </p:pic>
     </p:spTree>
     <p:extLst>
       <p:ext uri="{BB962C8B-B14F-4D97-AF65-F5344CB8AC3E}">

</xml_diff>

<commit_message>
#12 Colors added for robust SAI on issues slides
</commit_message>
<xml_diff>
--- a/SAI_presentation.pptx
+++ b/SAI_presentation.pptx
@@ -12290,8 +12290,16 @@
           <a:lstStyle/>
           <a:p>
             <a:r>
+              <a:rPr lang="fr-FR" b="1" dirty="0">
+                <a:solidFill>
+                  <a:srgbClr val="FFC000"/>
+                </a:solidFill>
+              </a:rPr>
+              <a:t>SAI</a:t>
+            </a:r>
+            <a:r>
               <a:rPr lang="fr-FR" dirty="0"/>
-              <a:t>SAI </a:t>
+              <a:t> </a:t>
             </a:r>
             <a:r>
               <a:rPr lang="fr-FR" dirty="0" err="1"/>
@@ -12315,7 +12323,19 @@
             </a:r>
             <a:r>
               <a:rPr lang="fr-FR" dirty="0"/>
-              <a:t> the computer </a:t>
+              <a:t> the </a:t>
+            </a:r>
+            <a:r>
+              <a:rPr lang="fr-FR" b="1" dirty="0">
+                <a:solidFill>
+                  <a:srgbClr val="00B050"/>
+                </a:solidFill>
+              </a:rPr>
+              <a:t>computer</a:t>
+            </a:r>
+            <a:r>
+              <a:rPr lang="fr-FR" dirty="0"/>
+              <a:t> </a:t>
             </a:r>
             <a:r>
               <a:rPr lang="fr-FR" dirty="0" err="1"/>
@@ -12350,7 +12370,11 @@
               <a:t> use the </a:t>
             </a:r>
             <a:r>
-              <a:rPr lang="fr-FR" dirty="0" err="1"/>
+              <a:rPr lang="fr-FR" b="1" dirty="0" err="1">
+                <a:solidFill>
+                  <a:srgbClr val="002060"/>
+                </a:solidFill>
+              </a:rPr>
               <a:t>mic</a:t>
             </a:r>
             <a:r>
@@ -12358,7 +12382,11 @@
               <a:t> and let the </a:t>
             </a:r>
             <a:r>
-              <a:rPr lang="fr-FR" dirty="0" err="1"/>
+              <a:rPr lang="fr-FR" b="1" dirty="0" err="1">
+                <a:solidFill>
+                  <a:srgbClr val="002060"/>
+                </a:solidFill>
+              </a:rPr>
               <a:t>mic</a:t>
             </a:r>
             <a:r>
@@ -12401,10 +12429,10 @@
               <a:t> to </a:t>
             </a:r>
             <a:r>
-              <a:rPr lang="fr-FR"/>
+              <a:rPr lang="fr-FR" dirty="0" err="1"/>
               <a:t>explain</a:t>
             </a:r>
-            <a:endParaRPr lang="en-GB"/>
+            <a:endParaRPr lang="en-GB" dirty="0"/>
           </a:p>
         </p:txBody>
       </p:sp>
@@ -12436,7 +12464,7 @@
         </p:blipFill>
         <p:spPr>
           <a:xfrm>
-            <a:off x="4348164" y="4545539"/>
+            <a:off x="4494212" y="4487332"/>
             <a:ext cx="914400" cy="914400"/>
           </a:xfrm>
           <a:prstGeom prst="rect">

</xml_diff>

<commit_message>
#12 Icons for mic managing added for robust SAI on issues slides
</commit_message>
<xml_diff>
--- a/SAI_presentation.pptx
+++ b/SAI_presentation.pptx
@@ -6942,7 +6942,7 @@
             <a:fld id="{B61BEF0D-F0BB-DE4B-95CE-6DB70DBA9567}" type="datetimeFigureOut">
               <a:rPr lang="en-US" dirty="0"/>
               <a:pPr/>
-              <a:t>3/19/2020</a:t>
+              <a:t>3/20/2020</a:t>
             </a:fld>
             <a:endParaRPr lang="en-US" dirty="0"/>
           </a:p>
@@ -7375,7 +7375,7 @@
             <a:fld id="{B61BEF0D-F0BB-DE4B-95CE-6DB70DBA9567}" type="datetimeFigureOut">
               <a:rPr lang="en-US" dirty="0"/>
               <a:pPr/>
-              <a:t>3/19/2020</a:t>
+              <a:t>3/20/2020</a:t>
             </a:fld>
             <a:endParaRPr lang="en-US" dirty="0"/>
           </a:p>
@@ -7622,7 +7622,7 @@
             <a:fld id="{B61BEF0D-F0BB-DE4B-95CE-6DB70DBA9567}" type="datetimeFigureOut">
               <a:rPr lang="en-US" dirty="0"/>
               <a:pPr/>
-              <a:t>3/19/2020</a:t>
+              <a:t>3/20/2020</a:t>
             </a:fld>
             <a:endParaRPr lang="en-US" dirty="0"/>
           </a:p>
@@ -7927,7 +7927,7 @@
             <a:fld id="{B61BEF0D-F0BB-DE4B-95CE-6DB70DBA9567}" type="datetimeFigureOut">
               <a:rPr lang="en-US" dirty="0"/>
               <a:pPr/>
-              <a:t>3/19/2020</a:t>
+              <a:t>3/20/2020</a:t>
             </a:fld>
             <a:endParaRPr lang="en-US" dirty="0"/>
           </a:p>
@@ -8242,7 +8242,7 @@
             <a:fld id="{B61BEF0D-F0BB-DE4B-95CE-6DB70DBA9567}" type="datetimeFigureOut">
               <a:rPr lang="en-US" dirty="0"/>
               <a:pPr/>
-              <a:t>3/19/2020</a:t>
+              <a:t>3/20/2020</a:t>
             </a:fld>
             <a:endParaRPr lang="en-US" dirty="0"/>
           </a:p>
@@ -8541,7 +8541,7 @@
             <a:fld id="{B61BEF0D-F0BB-DE4B-95CE-6DB70DBA9567}" type="datetimeFigureOut">
               <a:rPr lang="en-US" dirty="0"/>
               <a:pPr/>
-              <a:t>3/19/2020</a:t>
+              <a:t>3/20/2020</a:t>
             </a:fld>
             <a:endParaRPr lang="en-US" dirty="0"/>
           </a:p>
@@ -8905,7 +8905,7 @@
             <a:fld id="{B61BEF0D-F0BB-DE4B-95CE-6DB70DBA9567}" type="datetimeFigureOut">
               <a:rPr lang="en-US" dirty="0"/>
               <a:pPr/>
-              <a:t>3/19/2020</a:t>
+              <a:t>3/20/2020</a:t>
             </a:fld>
             <a:endParaRPr lang="en-US" dirty="0"/>
           </a:p>
@@ -9076,7 +9076,7 @@
             <a:fld id="{B61BEF0D-F0BB-DE4B-95CE-6DB70DBA9567}" type="datetimeFigureOut">
               <a:rPr lang="en-US" dirty="0"/>
               <a:pPr/>
-              <a:t>3/19/2020</a:t>
+              <a:t>3/20/2020</a:t>
             </a:fld>
             <a:endParaRPr lang="en-US" dirty="0"/>
           </a:p>
@@ -9253,7 +9253,7 @@
             <a:fld id="{B61BEF0D-F0BB-DE4B-95CE-6DB70DBA9567}" type="datetimeFigureOut">
               <a:rPr lang="en-US" dirty="0"/>
               <a:pPr/>
-              <a:t>3/19/2020</a:t>
+              <a:t>3/20/2020</a:t>
             </a:fld>
             <a:endParaRPr lang="en-US" dirty="0"/>
           </a:p>
@@ -9420,7 +9420,7 @@
             <a:fld id="{B61BEF0D-F0BB-DE4B-95CE-6DB70DBA9567}" type="datetimeFigureOut">
               <a:rPr lang="en-US" dirty="0"/>
               <a:pPr/>
-              <a:t>3/19/2020</a:t>
+              <a:t>3/20/2020</a:t>
             </a:fld>
             <a:endParaRPr lang="en-US" dirty="0"/>
           </a:p>
@@ -9667,7 +9667,7 @@
             <a:fld id="{B61BEF0D-F0BB-DE4B-95CE-6DB70DBA9567}" type="datetimeFigureOut">
               <a:rPr lang="en-US" dirty="0"/>
               <a:pPr/>
-              <a:t>3/19/2020</a:t>
+              <a:t>3/20/2020</a:t>
             </a:fld>
             <a:endParaRPr lang="en-US" dirty="0"/>
           </a:p>
@@ -9900,7 +9900,7 @@
             <a:fld id="{B61BEF0D-F0BB-DE4B-95CE-6DB70DBA9567}" type="datetimeFigureOut">
               <a:rPr lang="en-US" dirty="0"/>
               <a:pPr/>
-              <a:t>3/19/2020</a:t>
+              <a:t>3/20/2020</a:t>
             </a:fld>
             <a:endParaRPr lang="en-US" dirty="0"/>
           </a:p>
@@ -10279,7 +10279,7 @@
             <a:fld id="{B61BEF0D-F0BB-DE4B-95CE-6DB70DBA9567}" type="datetimeFigureOut">
               <a:rPr lang="en-US" dirty="0"/>
               <a:pPr/>
-              <a:t>3/19/2020</a:t>
+              <a:t>3/20/2020</a:t>
             </a:fld>
             <a:endParaRPr lang="en-US" dirty="0"/>
           </a:p>
@@ -10394,7 +10394,7 @@
             <a:fld id="{B61BEF0D-F0BB-DE4B-95CE-6DB70DBA9567}" type="datetimeFigureOut">
               <a:rPr lang="en-US" dirty="0"/>
               <a:pPr/>
-              <a:t>3/19/2020</a:t>
+              <a:t>3/20/2020</a:t>
             </a:fld>
             <a:endParaRPr lang="en-US" dirty="0"/>
           </a:p>
@@ -10486,7 +10486,7 @@
             <a:fld id="{B61BEF0D-F0BB-DE4B-95CE-6DB70DBA9567}" type="datetimeFigureOut">
               <a:rPr lang="en-US" dirty="0"/>
               <a:pPr/>
-              <a:t>3/19/2020</a:t>
+              <a:t>3/20/2020</a:t>
             </a:fld>
             <a:endParaRPr lang="en-US" dirty="0"/>
           </a:p>
@@ -10738,7 +10738,7 @@
             <a:fld id="{B61BEF0D-F0BB-DE4B-95CE-6DB70DBA9567}" type="datetimeFigureOut">
               <a:rPr lang="en-US" dirty="0"/>
               <a:pPr/>
-              <a:t>3/19/2020</a:t>
+              <a:t>3/20/2020</a:t>
             </a:fld>
             <a:endParaRPr lang="en-US" dirty="0"/>
           </a:p>
@@ -11018,7 +11018,7 @@
             <a:fld id="{B61BEF0D-F0BB-DE4B-95CE-6DB70DBA9567}" type="datetimeFigureOut">
               <a:rPr lang="en-US" dirty="0"/>
               <a:pPr/>
-              <a:t>3/19/2020</a:t>
+              <a:t>3/20/2020</a:t>
             </a:fld>
             <a:endParaRPr lang="en-US" dirty="0"/>
           </a:p>
@@ -11421,7 +11421,7 @@
             <a:fld id="{B61BEF0D-F0BB-DE4B-95CE-6DB70DBA9567}" type="datetimeFigureOut">
               <a:rPr lang="en-US" dirty="0"/>
               <a:pPr/>
-              <a:t>3/19/2020</a:t>
+              <a:t>3/20/2020</a:t>
             </a:fld>
             <a:endParaRPr lang="en-US" dirty="0"/>
           </a:p>
@@ -12464,7 +12464,7 @@
         </p:blipFill>
         <p:spPr>
           <a:xfrm>
-            <a:off x="4494212" y="4487332"/>
+            <a:off x="3430589" y="3479800"/>
             <a:ext cx="914400" cy="914400"/>
           </a:xfrm>
           <a:prstGeom prst="rect">
@@ -12500,7 +12500,7 @@
         </p:blipFill>
         <p:spPr>
           <a:xfrm>
-            <a:off x="6627812" y="3631139"/>
+            <a:off x="6825885" y="4030132"/>
             <a:ext cx="914400" cy="914400"/>
           </a:xfrm>
           <a:prstGeom prst="rect">
@@ -12536,7 +12536,79 @@
         </p:blipFill>
         <p:spPr>
           <a:xfrm>
-            <a:off x="4494212" y="3134254"/>
+            <a:off x="5564189" y="3631139"/>
+            <a:ext cx="914400" cy="914400"/>
+          </a:xfrm>
+          <a:prstGeom prst="rect">
+            <a:avLst/>
+          </a:prstGeom>
+        </p:spPr>
+      </p:pic>
+      <p:pic>
+        <p:nvPicPr>
+          <p:cNvPr id="6" name="Graphique 5" descr="Parole">
+            <a:extLst>
+              <a:ext uri="{FF2B5EF4-FFF2-40B4-BE49-F238E27FC236}">
+                <a16:creationId xmlns:a16="http://schemas.microsoft.com/office/drawing/2014/main" id="{8F292A96-33FC-427A-87E4-5F58A0D6032F}"/>
+              </a:ext>
+            </a:extLst>
+          </p:cNvPr>
+          <p:cNvPicPr>
+            <a:picLocks noChangeAspect="1"/>
+          </p:cNvPicPr>
+          <p:nvPr/>
+        </p:nvPicPr>
+        <p:blipFill>
+          <a:blip r:embed="rId8">
+            <a:extLst>
+              <a:ext uri="{96DAC541-7B7A-43D3-8B79-37D633B846F1}">
+                <asvg:svgBlip xmlns:asvg="http://schemas.microsoft.com/office/drawing/2016/SVG/main" r:embed="rId9"/>
+              </a:ext>
+            </a:extLst>
+          </a:blip>
+          <a:stretch>
+            <a:fillRect/>
+          </a:stretch>
+        </p:blipFill>
+        <p:spPr>
+          <a:xfrm>
+            <a:off x="8550070" y="3433234"/>
+            <a:ext cx="914400" cy="914400"/>
+          </a:xfrm>
+          <a:prstGeom prst="rect">
+            <a:avLst/>
+          </a:prstGeom>
+        </p:spPr>
+      </p:pic>
+      <p:pic>
+        <p:nvPicPr>
+          <p:cNvPr id="10" name="Graphique 9" descr="Notation musicale">
+            <a:extLst>
+              <a:ext uri="{FF2B5EF4-FFF2-40B4-BE49-F238E27FC236}">
+                <a16:creationId xmlns:a16="http://schemas.microsoft.com/office/drawing/2014/main" id="{351F199E-152F-45C7-92F5-9CBB67E3B8D5}"/>
+              </a:ext>
+            </a:extLst>
+          </p:cNvPr>
+          <p:cNvPicPr>
+            <a:picLocks noChangeAspect="1"/>
+          </p:cNvPicPr>
+          <p:nvPr/>
+        </p:nvPicPr>
+        <p:blipFill>
+          <a:blip r:embed="rId10">
+            <a:extLst>
+              <a:ext uri="{96DAC541-7B7A-43D3-8B79-37D633B846F1}">
+                <asvg:svgBlip xmlns:asvg="http://schemas.microsoft.com/office/drawing/2016/SVG/main" r:embed="rId11"/>
+              </a:ext>
+            </a:extLst>
+          </a:blip>
+          <a:stretch>
+            <a:fillRect/>
+          </a:stretch>
+        </p:blipFill>
+        <p:spPr>
+          <a:xfrm>
+            <a:off x="8582464" y="5023643"/>
             <a:ext cx="914400" cy="914400"/>
           </a:xfrm>
           <a:prstGeom prst="rect">

</xml_diff>

<commit_message>
#12 Icons for mic managing colors updated for robust SAI on issues slides
</commit_message>
<xml_diff>
--- a/SAI_presentation.pptx
+++ b/SAI_presentation.pptx
@@ -12378,8 +12378,62 @@
               <a:t>mic</a:t>
             </a:r>
             <a:r>
+              <a:rPr lang="fr-FR" b="1" dirty="0">
+                <a:solidFill>
+                  <a:srgbClr val="002060"/>
+                </a:solidFill>
+              </a:rPr>
+              <a:t> </a:t>
+            </a:r>
+            <a:r>
+              <a:rPr lang="fr-FR" dirty="0">
+                <a:solidFill>
+                  <a:srgbClr val="002060"/>
+                </a:solidFill>
+              </a:rPr>
+              <a:t>to </a:t>
+            </a:r>
+            <a:r>
+              <a:rPr lang="fr-FR" dirty="0" err="1">
+                <a:solidFill>
+                  <a:srgbClr val="002060"/>
+                </a:solidFill>
+              </a:rPr>
+              <a:t>listen</a:t>
+            </a:r>
+            <a:r>
+              <a:rPr lang="fr-FR" dirty="0">
+                <a:solidFill>
+                  <a:srgbClr val="002060"/>
+                </a:solidFill>
+              </a:rPr>
+              <a:t> </a:t>
+            </a:r>
+            <a:r>
+              <a:rPr lang="fr-FR" b="1" dirty="0">
+                <a:solidFill>
+                  <a:schemeClr val="accent6">
+                    <a:lumMod val="60000"/>
+                    <a:lumOff val="40000"/>
+                  </a:schemeClr>
+                </a:solidFill>
+              </a:rPr>
+              <a:t>a command</a:t>
+            </a:r>
+            <a:r>
+              <a:rPr lang="fr-FR" dirty="0">
+                <a:solidFill>
+                  <a:schemeClr val="accent6">
+                    <a:lumMod val="60000"/>
+                    <a:lumOff val="40000"/>
+                  </a:schemeClr>
+                </a:solidFill>
+              </a:rPr>
+              <a:t> </a:t>
+            </a:r>
+            <a:r>
               <a:rPr lang="fr-FR" dirty="0"/>
-              <a:t> and let the </a:t>
+              <a:t>and let the </a:t>
             </a:r>
             <a:r>
               <a:rPr lang="fr-FR" b="1" dirty="0" err="1">
@@ -12394,12 +12448,24 @@
               <a:t> for </a:t>
             </a:r>
             <a:r>
-              <a:rPr lang="fr-FR" dirty="0" err="1"/>
+              <a:rPr lang="fr-FR" b="1" dirty="0" err="1">
+                <a:solidFill>
+                  <a:srgbClr val="FFFF00"/>
+                </a:solidFill>
+              </a:rPr>
               <a:t>another</a:t>
             </a:r>
             <a:r>
+              <a:rPr lang="fr-FR" b="1" dirty="0">
+                <a:solidFill>
+                  <a:srgbClr val="FFFF00"/>
+                </a:solidFill>
+              </a:rPr>
+              <a:t> application</a:t>
+            </a:r>
+            <a:r>
               <a:rPr lang="fr-FR" dirty="0"/>
-              <a:t> application if </a:t>
+              <a:t> if </a:t>
             </a:r>
             <a:r>
               <a:rPr lang="fr-FR" dirty="0" err="1"/>

</xml_diff>

<commit_message>
#12 Arrows added for robust SAI on issues slides
</commit_message>
<xml_diff>
--- a/SAI_presentation.pptx
+++ b/SAI_presentation.pptx
@@ -12530,7 +12530,7 @@
         </p:blipFill>
         <p:spPr>
           <a:xfrm>
-            <a:off x="3430589" y="3479800"/>
+            <a:off x="4733632" y="3979334"/>
             <a:ext cx="914400" cy="914400"/>
           </a:xfrm>
           <a:prstGeom prst="rect">
@@ -12602,7 +12602,7 @@
         </p:blipFill>
         <p:spPr>
           <a:xfrm>
-            <a:off x="5564189" y="3631139"/>
+            <a:off x="5354629" y="2725945"/>
             <a:ext cx="914400" cy="914400"/>
           </a:xfrm>
           <a:prstGeom prst="rect">
@@ -12674,7 +12674,7 @@
         </p:blipFill>
         <p:spPr>
           <a:xfrm>
-            <a:off x="8582464" y="5023643"/>
+            <a:off x="5153091" y="5079999"/>
             <a:ext cx="914400" cy="914400"/>
           </a:xfrm>
           <a:prstGeom prst="rect">
@@ -12682,6 +12682,236 @@
           </a:prstGeom>
         </p:spPr>
       </p:pic>
+      <p:sp>
+        <p:nvSpPr>
+          <p:cNvPr id="4" name="Flèche : bas 3">
+            <a:extLst>
+              <a:ext uri="{FF2B5EF4-FFF2-40B4-BE49-F238E27FC236}">
+                <a16:creationId xmlns:a16="http://schemas.microsoft.com/office/drawing/2014/main" id="{D59CD8F2-10B5-4F53-88AF-2BCFC611260F}"/>
+              </a:ext>
+            </a:extLst>
+          </p:cNvPr>
+          <p:cNvSpPr/>
+          <p:nvPr/>
+        </p:nvSpPr>
+        <p:spPr>
+          <a:xfrm rot="3732868">
+            <a:off x="7993698" y="3766190"/>
+            <a:ext cx="204210" cy="669928"/>
+          </a:xfrm>
+          <a:prstGeom prst="downArrow">
+            <a:avLst/>
+          </a:prstGeom>
+        </p:spPr>
+        <p:style>
+          <a:lnRef idx="2">
+            <a:schemeClr val="accent1">
+              <a:shade val="50000"/>
+            </a:schemeClr>
+          </a:lnRef>
+          <a:fillRef idx="1">
+            <a:schemeClr val="accent1"/>
+          </a:fillRef>
+          <a:effectRef idx="0">
+            <a:schemeClr val="accent1"/>
+          </a:effectRef>
+          <a:fontRef idx="minor">
+            <a:schemeClr val="lt1"/>
+          </a:fontRef>
+        </p:style>
+        <p:txBody>
+          <a:bodyPr rtlCol="0" anchor="ctr"/>
+          <a:lstStyle/>
+          <a:p>
+            <a:pPr algn="ctr"/>
+            <a:endParaRPr lang="en-GB"/>
+          </a:p>
+        </p:txBody>
+      </p:sp>
+      <p:sp>
+        <p:nvSpPr>
+          <p:cNvPr id="12" name="Flèche : bas 11">
+            <a:extLst>
+              <a:ext uri="{FF2B5EF4-FFF2-40B4-BE49-F238E27FC236}">
+                <a16:creationId xmlns:a16="http://schemas.microsoft.com/office/drawing/2014/main" id="{236D4982-8480-4DA2-8513-EE88FF8C0975}"/>
+              </a:ext>
+            </a:extLst>
+          </p:cNvPr>
+          <p:cNvSpPr/>
+          <p:nvPr/>
+        </p:nvSpPr>
+        <p:spPr>
+          <a:xfrm rot="14618119">
+            <a:off x="6344583" y="4761969"/>
+            <a:ext cx="204210" cy="669928"/>
+          </a:xfrm>
+          <a:prstGeom prst="downArrow">
+            <a:avLst/>
+          </a:prstGeom>
+        </p:spPr>
+        <p:style>
+          <a:lnRef idx="2">
+            <a:schemeClr val="accent1">
+              <a:shade val="50000"/>
+            </a:schemeClr>
+          </a:lnRef>
+          <a:fillRef idx="1">
+            <a:schemeClr val="accent1"/>
+          </a:fillRef>
+          <a:effectRef idx="0">
+            <a:schemeClr val="accent1"/>
+          </a:effectRef>
+          <a:fontRef idx="minor">
+            <a:schemeClr val="lt1"/>
+          </a:fontRef>
+        </p:style>
+        <p:txBody>
+          <a:bodyPr rtlCol="0" anchor="ctr"/>
+          <a:lstStyle/>
+          <a:p>
+            <a:pPr algn="ctr"/>
+            <a:endParaRPr lang="en-GB"/>
+          </a:p>
+        </p:txBody>
+      </p:sp>
+      <p:sp>
+        <p:nvSpPr>
+          <p:cNvPr id="13" name="Flèche : bas 12">
+            <a:extLst>
+              <a:ext uri="{FF2B5EF4-FFF2-40B4-BE49-F238E27FC236}">
+                <a16:creationId xmlns:a16="http://schemas.microsoft.com/office/drawing/2014/main" id="{C4A2AA50-047C-4245-B443-A5571DC2DB86}"/>
+              </a:ext>
+            </a:extLst>
+          </p:cNvPr>
+          <p:cNvSpPr/>
+          <p:nvPr/>
+        </p:nvSpPr>
+        <p:spPr>
+          <a:xfrm rot="5400000">
+            <a:off x="6188552" y="4132840"/>
+            <a:ext cx="204210" cy="669928"/>
+          </a:xfrm>
+          <a:prstGeom prst="downArrow">
+            <a:avLst/>
+          </a:prstGeom>
+        </p:spPr>
+        <p:style>
+          <a:lnRef idx="2">
+            <a:schemeClr val="accent1">
+              <a:shade val="50000"/>
+            </a:schemeClr>
+          </a:lnRef>
+          <a:fillRef idx="1">
+            <a:schemeClr val="accent1"/>
+          </a:fillRef>
+          <a:effectRef idx="0">
+            <a:schemeClr val="accent1"/>
+          </a:effectRef>
+          <a:fontRef idx="minor">
+            <a:schemeClr val="lt1"/>
+          </a:fontRef>
+        </p:style>
+        <p:txBody>
+          <a:bodyPr rtlCol="0" anchor="ctr"/>
+          <a:lstStyle/>
+          <a:p>
+            <a:pPr algn="ctr"/>
+            <a:endParaRPr lang="en-GB"/>
+          </a:p>
+        </p:txBody>
+      </p:sp>
+      <p:sp>
+        <p:nvSpPr>
+          <p:cNvPr id="14" name="Flèche : bas 13">
+            <a:extLst>
+              <a:ext uri="{FF2B5EF4-FFF2-40B4-BE49-F238E27FC236}">
+                <a16:creationId xmlns:a16="http://schemas.microsoft.com/office/drawing/2014/main" id="{D4836C54-A49D-49D7-814B-300210671829}"/>
+              </a:ext>
+            </a:extLst>
+          </p:cNvPr>
+          <p:cNvSpPr/>
+          <p:nvPr/>
+        </p:nvSpPr>
+        <p:spPr>
+          <a:xfrm rot="7014157">
+            <a:off x="6423387" y="3553355"/>
+            <a:ext cx="204210" cy="669928"/>
+          </a:xfrm>
+          <a:prstGeom prst="downArrow">
+            <a:avLst/>
+          </a:prstGeom>
+        </p:spPr>
+        <p:style>
+          <a:lnRef idx="2">
+            <a:schemeClr val="accent1">
+              <a:shade val="50000"/>
+            </a:schemeClr>
+          </a:lnRef>
+          <a:fillRef idx="1">
+            <a:schemeClr val="accent1"/>
+          </a:fillRef>
+          <a:effectRef idx="0">
+            <a:schemeClr val="accent1"/>
+          </a:effectRef>
+          <a:fontRef idx="minor">
+            <a:schemeClr val="lt1"/>
+          </a:fontRef>
+        </p:style>
+        <p:txBody>
+          <a:bodyPr rtlCol="0" anchor="ctr"/>
+          <a:lstStyle/>
+          <a:p>
+            <a:pPr algn="ctr"/>
+            <a:endParaRPr lang="en-GB"/>
+          </a:p>
+        </p:txBody>
+      </p:sp>
+      <p:sp>
+        <p:nvSpPr>
+          <p:cNvPr id="15" name="Flèche : bas 14">
+            <a:extLst>
+              <a:ext uri="{FF2B5EF4-FFF2-40B4-BE49-F238E27FC236}">
+                <a16:creationId xmlns:a16="http://schemas.microsoft.com/office/drawing/2014/main" id="{6544CD3B-E89F-4550-BD5A-FEECA0CF36CC}"/>
+              </a:ext>
+            </a:extLst>
+          </p:cNvPr>
+          <p:cNvSpPr/>
+          <p:nvPr/>
+        </p:nvSpPr>
+        <p:spPr>
+          <a:xfrm rot="1747778">
+            <a:off x="5088727" y="3305381"/>
+            <a:ext cx="204210" cy="669928"/>
+          </a:xfrm>
+          <a:prstGeom prst="downArrow">
+            <a:avLst/>
+          </a:prstGeom>
+        </p:spPr>
+        <p:style>
+          <a:lnRef idx="2">
+            <a:schemeClr val="accent1">
+              <a:shade val="50000"/>
+            </a:schemeClr>
+          </a:lnRef>
+          <a:fillRef idx="1">
+            <a:schemeClr val="accent1"/>
+          </a:fillRef>
+          <a:effectRef idx="0">
+            <a:schemeClr val="accent1"/>
+          </a:effectRef>
+          <a:fontRef idx="minor">
+            <a:schemeClr val="lt1"/>
+          </a:fontRef>
+        </p:style>
+        <p:txBody>
+          <a:bodyPr rtlCol="0" anchor="ctr"/>
+          <a:lstStyle/>
+          <a:p>
+            <a:pPr algn="ctr"/>
+            <a:endParaRPr lang="en-GB"/>
+          </a:p>
+        </p:txBody>
+      </p:sp>
     </p:spTree>
     <p:extLst>
       <p:ext uri="{BB962C8B-B14F-4D97-AF65-F5344CB8AC3E}">

</xml_diff>

<commit_message>
#12 Complex schema added on issue slides
</commit_message>
<xml_diff>
--- a/SAI_presentation.pptx
+++ b/SAI_presentation.pptx
@@ -13074,29 +13074,1621 @@
             <a:endParaRPr lang="fr-FR" dirty="0"/>
           </a:p>
           <a:p>
+            <a:pPr marL="0" indent="0">
+              <a:buNone/>
+            </a:pPr>
             <a:endParaRPr lang="fr-FR" dirty="0"/>
           </a:p>
           <a:p>
+            <a:pPr marL="0" indent="0">
+              <a:buNone/>
+            </a:pPr>
             <a:endParaRPr lang="fr-FR" dirty="0"/>
           </a:p>
           <a:p>
-            <a:r>
-              <a:rPr lang="fr-FR" dirty="0"/>
-              <a:t>Use a </a:t>
-            </a:r>
-            <a:r>
-              <a:rPr lang="fr-FR" dirty="0" err="1"/>
-              <a:t>complex</a:t>
-            </a:r>
-            <a:r>
-              <a:rPr lang="fr-FR" dirty="0"/>
-              <a:t> </a:t>
-            </a:r>
-            <a:r>
-              <a:rPr lang="fr-FR" dirty="0" err="1"/>
-              <a:t>shema</a:t>
-            </a:r>
-            <a:endParaRPr lang="en-GB" dirty="0"/>
+            <a:pPr marL="0" indent="0">
+              <a:buNone/>
+            </a:pPr>
+            <a:endParaRPr lang="fr-FR" dirty="0"/>
+          </a:p>
+          <a:p>
+            <a:pPr marL="0" indent="0">
+              <a:buNone/>
+            </a:pPr>
+            <a:endParaRPr lang="fr-FR" dirty="0"/>
+          </a:p>
+          <a:p>
+            <a:pPr marL="0" indent="0">
+              <a:buNone/>
+            </a:pPr>
+            <a:endParaRPr lang="fr-FR" dirty="0"/>
+          </a:p>
+          <a:p>
+            <a:pPr marL="0" indent="0">
+              <a:buNone/>
+            </a:pPr>
+            <a:endParaRPr lang="fr-FR" dirty="0"/>
+          </a:p>
+          <a:p>
+            <a:pPr marL="0" indent="0">
+              <a:buNone/>
+            </a:pPr>
+            <a:endParaRPr lang="fr-FR" dirty="0"/>
+          </a:p>
+        </p:txBody>
+      </p:sp>
+      <p:pic>
+        <p:nvPicPr>
+          <p:cNvPr id="4" name="Picture 4" descr="RÃ©sultat de recherche d'images pour &quot;windows 10 logo png&quot;">
+            <a:extLst>
+              <a:ext uri="{FF2B5EF4-FFF2-40B4-BE49-F238E27FC236}">
+                <a16:creationId xmlns:a16="http://schemas.microsoft.com/office/drawing/2014/main" id="{632D05D3-115B-4FB4-B6ED-F7E67B154C9D}"/>
+              </a:ext>
+            </a:extLst>
+          </p:cNvPr>
+          <p:cNvPicPr>
+            <a:picLocks noChangeAspect="1" noChangeArrowheads="1"/>
+          </p:cNvPicPr>
+          <p:nvPr/>
+        </p:nvPicPr>
+        <p:blipFill>
+          <a:blip r:embed="rId2">
+            <a:extLst>
+              <a:ext uri="{28A0092B-C50C-407E-A947-70E740481C1C}">
+                <a14:useLocalDpi xmlns:a14="http://schemas.microsoft.com/office/drawing/2010/main" val="0"/>
+              </a:ext>
+            </a:extLst>
+          </a:blip>
+          <a:srcRect/>
+          <a:stretch>
+            <a:fillRect/>
+          </a:stretch>
+        </p:blipFill>
+        <p:spPr bwMode="auto">
+          <a:xfrm>
+            <a:off x="4629668" y="1832143"/>
+            <a:ext cx="854553" cy="854553"/>
+          </a:xfrm>
+          <a:prstGeom prst="rect">
+            <a:avLst/>
+          </a:prstGeom>
+          <a:noFill/>
+          <a:extLst>
+            <a:ext uri="{909E8E84-426E-40DD-AFC4-6F175D3DCCD1}">
+              <a14:hiddenFill xmlns:a14="http://schemas.microsoft.com/office/drawing/2010/main">
+                <a:solidFill>
+                  <a:srgbClr val="FFFFFF"/>
+                </a:solidFill>
+              </a14:hiddenFill>
+            </a:ext>
+          </a:extLst>
+        </p:spPr>
+      </p:pic>
+      <p:pic>
+        <p:nvPicPr>
+          <p:cNvPr id="5" name="Picture 6" descr="RÃ©sultat de recherche d'images pour &quot;OS X logo png&quot;">
+            <a:extLst>
+              <a:ext uri="{FF2B5EF4-FFF2-40B4-BE49-F238E27FC236}">
+                <a16:creationId xmlns:a16="http://schemas.microsoft.com/office/drawing/2014/main" id="{80D051A5-2BC3-4D6F-A43B-29BDC899F4C6}"/>
+              </a:ext>
+            </a:extLst>
+          </p:cNvPr>
+          <p:cNvPicPr>
+            <a:picLocks noChangeAspect="1" noChangeArrowheads="1"/>
+          </p:cNvPicPr>
+          <p:nvPr/>
+        </p:nvPicPr>
+        <p:blipFill>
+          <a:blip r:embed="rId3">
+            <a:extLst>
+              <a:ext uri="{28A0092B-C50C-407E-A947-70E740481C1C}">
+                <a14:useLocalDpi xmlns:a14="http://schemas.microsoft.com/office/drawing/2010/main" val="0"/>
+              </a:ext>
+            </a:extLst>
+          </a:blip>
+          <a:srcRect/>
+          <a:stretch>
+            <a:fillRect/>
+          </a:stretch>
+        </p:blipFill>
+        <p:spPr bwMode="auto">
+          <a:xfrm>
+            <a:off x="4463710" y="4185513"/>
+            <a:ext cx="1181100" cy="473363"/>
+          </a:xfrm>
+          <a:prstGeom prst="rect">
+            <a:avLst/>
+          </a:prstGeom>
+          <a:noFill/>
+          <a:extLst>
+            <a:ext uri="{909E8E84-426E-40DD-AFC4-6F175D3DCCD1}">
+              <a14:hiddenFill xmlns:a14="http://schemas.microsoft.com/office/drawing/2010/main">
+                <a:solidFill>
+                  <a:srgbClr val="FFFFFF"/>
+                </a:solidFill>
+              </a14:hiddenFill>
+            </a:ext>
+          </a:extLst>
+        </p:spPr>
+      </p:pic>
+      <p:pic>
+        <p:nvPicPr>
+          <p:cNvPr id="6" name="Picture 8" descr="RÃ©sultat de recherche d'images pour &quot;linux logo png&quot;">
+            <a:extLst>
+              <a:ext uri="{FF2B5EF4-FFF2-40B4-BE49-F238E27FC236}">
+                <a16:creationId xmlns:a16="http://schemas.microsoft.com/office/drawing/2014/main" id="{A148C457-3235-4D1D-9F09-6B2FCB96A1CC}"/>
+              </a:ext>
+            </a:extLst>
+          </p:cNvPr>
+          <p:cNvPicPr>
+            <a:picLocks noChangeAspect="1" noChangeArrowheads="1"/>
+          </p:cNvPicPr>
+          <p:nvPr/>
+        </p:nvPicPr>
+        <p:blipFill>
+          <a:blip r:embed="rId4">
+            <a:extLst>
+              <a:ext uri="{28A0092B-C50C-407E-A947-70E740481C1C}">
+                <a14:useLocalDpi xmlns:a14="http://schemas.microsoft.com/office/drawing/2010/main" val="0"/>
+              </a:ext>
+            </a:extLst>
+          </a:blip>
+          <a:srcRect/>
+          <a:stretch>
+            <a:fillRect/>
+          </a:stretch>
+        </p:blipFill>
+        <p:spPr bwMode="auto">
+          <a:xfrm>
+            <a:off x="4586103" y="2785678"/>
+            <a:ext cx="898118" cy="1040354"/>
+          </a:xfrm>
+          <a:prstGeom prst="rect">
+            <a:avLst/>
+          </a:prstGeom>
+          <a:noFill/>
+          <a:extLst>
+            <a:ext uri="{909E8E84-426E-40DD-AFC4-6F175D3DCCD1}">
+              <a14:hiddenFill xmlns:a14="http://schemas.microsoft.com/office/drawing/2010/main">
+                <a:solidFill>
+                  <a:srgbClr val="FFFFFF"/>
+                </a:solidFill>
+              </a14:hiddenFill>
+            </a:ext>
+          </a:extLst>
+        </p:spPr>
+      </p:pic>
+      <p:pic>
+        <p:nvPicPr>
+          <p:cNvPr id="7" name="Graphique 6" descr="Caméra vidéo">
+            <a:extLst>
+              <a:ext uri="{FF2B5EF4-FFF2-40B4-BE49-F238E27FC236}">
+                <a16:creationId xmlns:a16="http://schemas.microsoft.com/office/drawing/2014/main" id="{43091EBC-6029-4FE6-8BFE-766AAE91E08B}"/>
+              </a:ext>
+            </a:extLst>
+          </p:cNvPr>
+          <p:cNvPicPr>
+            <a:picLocks noChangeAspect="1"/>
+          </p:cNvPicPr>
+          <p:nvPr/>
+        </p:nvPicPr>
+        <p:blipFill>
+          <a:blip r:embed="rId5">
+            <a:extLst>
+              <a:ext uri="{96DAC541-7B7A-43D3-8B79-37D633B846F1}">
+                <asvg:svgBlip xmlns:asvg="http://schemas.microsoft.com/office/drawing/2016/SVG/main" r:embed="rId6"/>
+              </a:ext>
+            </a:extLst>
+          </a:blip>
+          <a:stretch>
+            <a:fillRect/>
+          </a:stretch>
+        </p:blipFill>
+        <p:spPr>
+          <a:xfrm>
+            <a:off x="250439" y="1953636"/>
+            <a:ext cx="914400" cy="914400"/>
+          </a:xfrm>
+          <a:prstGeom prst="rect">
+            <a:avLst/>
+          </a:prstGeom>
+        </p:spPr>
+      </p:pic>
+      <p:pic>
+        <p:nvPicPr>
+          <p:cNvPr id="8" name="Graphique 7" descr="Microphone">
+            <a:extLst>
+              <a:ext uri="{FF2B5EF4-FFF2-40B4-BE49-F238E27FC236}">
+                <a16:creationId xmlns:a16="http://schemas.microsoft.com/office/drawing/2014/main" id="{992F8A9B-EF21-446F-8788-3BAC5BC9B88D}"/>
+              </a:ext>
+            </a:extLst>
+          </p:cNvPr>
+          <p:cNvPicPr>
+            <a:picLocks noChangeAspect="1"/>
+          </p:cNvPicPr>
+          <p:nvPr/>
+        </p:nvPicPr>
+        <p:blipFill>
+          <a:blip r:embed="rId7">
+            <a:extLst>
+              <a:ext uri="{96DAC541-7B7A-43D3-8B79-37D633B846F1}">
+                <asvg:svgBlip xmlns:asvg="http://schemas.microsoft.com/office/drawing/2016/SVG/main" r:embed="rId8"/>
+              </a:ext>
+            </a:extLst>
+          </a:blip>
+          <a:stretch>
+            <a:fillRect/>
+          </a:stretch>
+        </p:blipFill>
+        <p:spPr>
+          <a:xfrm>
+            <a:off x="271308" y="3259693"/>
+            <a:ext cx="914400" cy="914400"/>
+          </a:xfrm>
+          <a:prstGeom prst="rect">
+            <a:avLst/>
+          </a:prstGeom>
+        </p:spPr>
+      </p:pic>
+      <p:pic>
+        <p:nvPicPr>
+          <p:cNvPr id="9" name="Graphique 8" descr="Point d’interrogation">
+            <a:extLst>
+              <a:ext uri="{FF2B5EF4-FFF2-40B4-BE49-F238E27FC236}">
+                <a16:creationId xmlns:a16="http://schemas.microsoft.com/office/drawing/2014/main" id="{2762E42A-769B-4598-B22B-96B8AA4DB7BC}"/>
+              </a:ext>
+            </a:extLst>
+          </p:cNvPr>
+          <p:cNvPicPr>
+            <a:picLocks noChangeAspect="1"/>
+          </p:cNvPicPr>
+          <p:nvPr/>
+        </p:nvPicPr>
+        <p:blipFill>
+          <a:blip r:embed="rId9">
+            <a:extLst>
+              <a:ext uri="{96DAC541-7B7A-43D3-8B79-37D633B846F1}">
+                <asvg:svgBlip xmlns:asvg="http://schemas.microsoft.com/office/drawing/2016/SVG/main" r:embed="rId10"/>
+              </a:ext>
+            </a:extLst>
+          </a:blip>
+          <a:stretch>
+            <a:fillRect/>
+          </a:stretch>
+        </p:blipFill>
+        <p:spPr>
+          <a:xfrm>
+            <a:off x="2440695" y="2740920"/>
+            <a:ext cx="914400" cy="914400"/>
+          </a:xfrm>
+          <a:prstGeom prst="rect">
+            <a:avLst/>
+          </a:prstGeom>
+        </p:spPr>
+      </p:pic>
+      <p:sp>
+        <p:nvSpPr>
+          <p:cNvPr id="10" name="Flèche : droite 9">
+            <a:extLst>
+              <a:ext uri="{FF2B5EF4-FFF2-40B4-BE49-F238E27FC236}">
+                <a16:creationId xmlns:a16="http://schemas.microsoft.com/office/drawing/2014/main" id="{B70BF090-360F-43DC-B4D7-774920498776}"/>
+              </a:ext>
+            </a:extLst>
+          </p:cNvPr>
+          <p:cNvSpPr/>
+          <p:nvPr/>
+        </p:nvSpPr>
+        <p:spPr>
+          <a:xfrm rot="1192363">
+            <a:off x="1580147" y="2562703"/>
+            <a:ext cx="978408" cy="484632"/>
+          </a:xfrm>
+          <a:prstGeom prst="rightArrow">
+            <a:avLst/>
+          </a:prstGeom>
+          <a:solidFill>
+            <a:srgbClr val="00B050"/>
+          </a:solidFill>
+          <a:ln>
+            <a:solidFill>
+              <a:srgbClr val="00B050"/>
+            </a:solidFill>
+          </a:ln>
+        </p:spPr>
+        <p:style>
+          <a:lnRef idx="2">
+            <a:schemeClr val="accent1">
+              <a:shade val="50000"/>
+            </a:schemeClr>
+          </a:lnRef>
+          <a:fillRef idx="1">
+            <a:schemeClr val="accent1"/>
+          </a:fillRef>
+          <a:effectRef idx="0">
+            <a:schemeClr val="accent1"/>
+          </a:effectRef>
+          <a:fontRef idx="minor">
+            <a:schemeClr val="lt1"/>
+          </a:fontRef>
+        </p:style>
+        <p:txBody>
+          <a:bodyPr rtlCol="0" anchor="ctr"/>
+          <a:lstStyle/>
+          <a:p>
+            <a:pPr algn="ctr"/>
+            <a:endParaRPr lang="en-GB"/>
+          </a:p>
+        </p:txBody>
+      </p:sp>
+      <p:sp>
+        <p:nvSpPr>
+          <p:cNvPr id="11" name="Flèche : droite 10">
+            <a:extLst>
+              <a:ext uri="{FF2B5EF4-FFF2-40B4-BE49-F238E27FC236}">
+                <a16:creationId xmlns:a16="http://schemas.microsoft.com/office/drawing/2014/main" id="{B8AFC977-6531-442E-A5B9-DA0B24E59AFD}"/>
+              </a:ext>
+            </a:extLst>
+          </p:cNvPr>
+          <p:cNvSpPr/>
+          <p:nvPr/>
+        </p:nvSpPr>
+        <p:spPr>
+          <a:xfrm rot="20407754">
+            <a:off x="1560183" y="3348569"/>
+            <a:ext cx="978408" cy="484632"/>
+          </a:xfrm>
+          <a:prstGeom prst="rightArrow">
+            <a:avLst/>
+          </a:prstGeom>
+          <a:solidFill>
+            <a:srgbClr val="00B050"/>
+          </a:solidFill>
+          <a:ln>
+            <a:solidFill>
+              <a:srgbClr val="00B050"/>
+            </a:solidFill>
+          </a:ln>
+        </p:spPr>
+        <p:style>
+          <a:lnRef idx="2">
+            <a:schemeClr val="accent1">
+              <a:shade val="50000"/>
+            </a:schemeClr>
+          </a:lnRef>
+          <a:fillRef idx="1">
+            <a:schemeClr val="accent1"/>
+          </a:fillRef>
+          <a:effectRef idx="0">
+            <a:schemeClr val="accent1"/>
+          </a:effectRef>
+          <a:fontRef idx="minor">
+            <a:schemeClr val="lt1"/>
+          </a:fontRef>
+        </p:style>
+        <p:txBody>
+          <a:bodyPr rtlCol="0" anchor="ctr"/>
+          <a:lstStyle/>
+          <a:p>
+            <a:pPr algn="ctr"/>
+            <a:endParaRPr lang="en-GB"/>
+          </a:p>
+        </p:txBody>
+      </p:sp>
+      <p:sp>
+        <p:nvSpPr>
+          <p:cNvPr id="12" name="Flèche : droite 11">
+            <a:extLst>
+              <a:ext uri="{FF2B5EF4-FFF2-40B4-BE49-F238E27FC236}">
+                <a16:creationId xmlns:a16="http://schemas.microsoft.com/office/drawing/2014/main" id="{7C69BADA-3DA2-43B8-8669-0F30035EAC88}"/>
+              </a:ext>
+            </a:extLst>
+          </p:cNvPr>
+          <p:cNvSpPr/>
+          <p:nvPr/>
+        </p:nvSpPr>
+        <p:spPr>
+          <a:xfrm rot="1192363">
+            <a:off x="3333840" y="3671135"/>
+            <a:ext cx="978408" cy="484632"/>
+          </a:xfrm>
+          <a:prstGeom prst="rightArrow">
+            <a:avLst/>
+          </a:prstGeom>
+          <a:solidFill>
+            <a:srgbClr val="FFFF00"/>
+          </a:solidFill>
+          <a:ln>
+            <a:solidFill>
+              <a:srgbClr val="FFFF00"/>
+            </a:solidFill>
+          </a:ln>
+        </p:spPr>
+        <p:style>
+          <a:lnRef idx="2">
+            <a:schemeClr val="accent1">
+              <a:shade val="50000"/>
+            </a:schemeClr>
+          </a:lnRef>
+          <a:fillRef idx="1">
+            <a:schemeClr val="accent1"/>
+          </a:fillRef>
+          <a:effectRef idx="0">
+            <a:schemeClr val="accent1"/>
+          </a:effectRef>
+          <a:fontRef idx="minor">
+            <a:schemeClr val="lt1"/>
+          </a:fontRef>
+        </p:style>
+        <p:txBody>
+          <a:bodyPr rtlCol="0" anchor="ctr"/>
+          <a:lstStyle/>
+          <a:p>
+            <a:pPr algn="ctr"/>
+            <a:endParaRPr lang="en-GB"/>
+          </a:p>
+        </p:txBody>
+      </p:sp>
+      <p:sp>
+        <p:nvSpPr>
+          <p:cNvPr id="13" name="Flèche : droite 12">
+            <a:extLst>
+              <a:ext uri="{FF2B5EF4-FFF2-40B4-BE49-F238E27FC236}">
+                <a16:creationId xmlns:a16="http://schemas.microsoft.com/office/drawing/2014/main" id="{6C40359D-0D88-4C05-971C-778A79DE12CD}"/>
+              </a:ext>
+            </a:extLst>
+          </p:cNvPr>
+          <p:cNvSpPr/>
+          <p:nvPr/>
+        </p:nvSpPr>
+        <p:spPr>
+          <a:xfrm rot="20407754">
+            <a:off x="3408332" y="2344348"/>
+            <a:ext cx="978408" cy="484632"/>
+          </a:xfrm>
+          <a:prstGeom prst="rightArrow">
+            <a:avLst/>
+          </a:prstGeom>
+          <a:solidFill>
+            <a:srgbClr val="FFFF00"/>
+          </a:solidFill>
+          <a:ln>
+            <a:solidFill>
+              <a:srgbClr val="FFFF00"/>
+            </a:solidFill>
+          </a:ln>
+        </p:spPr>
+        <p:style>
+          <a:lnRef idx="2">
+            <a:schemeClr val="accent1">
+              <a:shade val="50000"/>
+            </a:schemeClr>
+          </a:lnRef>
+          <a:fillRef idx="1">
+            <a:schemeClr val="accent1"/>
+          </a:fillRef>
+          <a:effectRef idx="0">
+            <a:schemeClr val="accent1"/>
+          </a:effectRef>
+          <a:fontRef idx="minor">
+            <a:schemeClr val="lt1"/>
+          </a:fontRef>
+        </p:style>
+        <p:txBody>
+          <a:bodyPr rtlCol="0" anchor="ctr"/>
+          <a:lstStyle/>
+          <a:p>
+            <a:pPr algn="ctr"/>
+            <a:endParaRPr lang="en-GB"/>
+          </a:p>
+        </p:txBody>
+      </p:sp>
+      <p:sp>
+        <p:nvSpPr>
+          <p:cNvPr id="14" name="Flèche : droite 13">
+            <a:extLst>
+              <a:ext uri="{FF2B5EF4-FFF2-40B4-BE49-F238E27FC236}">
+                <a16:creationId xmlns:a16="http://schemas.microsoft.com/office/drawing/2014/main" id="{1893519D-CD55-44F8-9CB4-2C8D5DC8702E}"/>
+              </a:ext>
+            </a:extLst>
+          </p:cNvPr>
+          <p:cNvSpPr/>
+          <p:nvPr/>
+        </p:nvSpPr>
+        <p:spPr>
+          <a:xfrm>
+            <a:off x="3483899" y="3004221"/>
+            <a:ext cx="978408" cy="484632"/>
+          </a:xfrm>
+          <a:prstGeom prst="rightArrow">
+            <a:avLst/>
+          </a:prstGeom>
+          <a:solidFill>
+            <a:srgbClr val="FFFF00"/>
+          </a:solidFill>
+          <a:ln>
+            <a:solidFill>
+              <a:srgbClr val="FFFF00"/>
+            </a:solidFill>
+          </a:ln>
+        </p:spPr>
+        <p:style>
+          <a:lnRef idx="2">
+            <a:schemeClr val="accent1">
+              <a:shade val="50000"/>
+            </a:schemeClr>
+          </a:lnRef>
+          <a:fillRef idx="1">
+            <a:schemeClr val="accent1"/>
+          </a:fillRef>
+          <a:effectRef idx="0">
+            <a:schemeClr val="accent1"/>
+          </a:effectRef>
+          <a:fontRef idx="minor">
+            <a:schemeClr val="lt1"/>
+          </a:fontRef>
+        </p:style>
+        <p:txBody>
+          <a:bodyPr rtlCol="0" anchor="ctr"/>
+          <a:lstStyle/>
+          <a:p>
+            <a:pPr algn="ctr"/>
+            <a:endParaRPr lang="en-GB"/>
+          </a:p>
+        </p:txBody>
+      </p:sp>
+      <p:pic>
+        <p:nvPicPr>
+          <p:cNvPr id="15" name="Graphique 14" descr="Cerveau">
+            <a:extLst>
+              <a:ext uri="{FF2B5EF4-FFF2-40B4-BE49-F238E27FC236}">
+                <a16:creationId xmlns:a16="http://schemas.microsoft.com/office/drawing/2014/main" id="{EF3E0705-CA69-47CF-9260-C3B2ADD6B378}"/>
+              </a:ext>
+            </a:extLst>
+          </p:cNvPr>
+          <p:cNvPicPr>
+            <a:picLocks noChangeAspect="1"/>
+          </p:cNvPicPr>
+          <p:nvPr/>
+        </p:nvPicPr>
+        <p:blipFill>
+          <a:blip r:embed="rId11">
+            <a:extLst>
+              <a:ext uri="{96DAC541-7B7A-43D3-8B79-37D633B846F1}">
+                <asvg:svgBlip xmlns:asvg="http://schemas.microsoft.com/office/drawing/2016/SVG/main" r:embed="rId12"/>
+              </a:ext>
+            </a:extLst>
+          </a:blip>
+          <a:stretch>
+            <a:fillRect/>
+          </a:stretch>
+        </p:blipFill>
+        <p:spPr>
+          <a:xfrm>
+            <a:off x="5819694" y="5710117"/>
+            <a:ext cx="914400" cy="914400"/>
+          </a:xfrm>
+          <a:prstGeom prst="rect">
+            <a:avLst/>
+          </a:prstGeom>
+        </p:spPr>
+      </p:pic>
+      <p:pic>
+        <p:nvPicPr>
+          <p:cNvPr id="16" name="Graphique 15" descr="Lune et étoiles">
+            <a:extLst>
+              <a:ext uri="{FF2B5EF4-FFF2-40B4-BE49-F238E27FC236}">
+                <a16:creationId xmlns:a16="http://schemas.microsoft.com/office/drawing/2014/main" id="{D9251C28-70E5-4A1C-98DD-6E47DC918C5F}"/>
+              </a:ext>
+            </a:extLst>
+          </p:cNvPr>
+          <p:cNvPicPr>
+            <a:picLocks noChangeAspect="1"/>
+          </p:cNvPicPr>
+          <p:nvPr/>
+        </p:nvPicPr>
+        <p:blipFill>
+          <a:blip r:embed="rId13">
+            <a:extLst>
+              <a:ext uri="{96DAC541-7B7A-43D3-8B79-37D633B846F1}">
+                <asvg:svgBlip xmlns:asvg="http://schemas.microsoft.com/office/drawing/2016/SVG/main" r:embed="rId14"/>
+              </a:ext>
+            </a:extLst>
+          </a:blip>
+          <a:stretch>
+            <a:fillRect/>
+          </a:stretch>
+        </p:blipFill>
+        <p:spPr>
+          <a:xfrm>
+            <a:off x="2060553" y="5759499"/>
+            <a:ext cx="914400" cy="914400"/>
+          </a:xfrm>
+          <a:prstGeom prst="rect">
+            <a:avLst/>
+          </a:prstGeom>
+        </p:spPr>
+      </p:pic>
+      <p:pic>
+        <p:nvPicPr>
+          <p:cNvPr id="17" name="Graphique 16" descr="Boîte">
+            <a:extLst>
+              <a:ext uri="{FF2B5EF4-FFF2-40B4-BE49-F238E27FC236}">
+                <a16:creationId xmlns:a16="http://schemas.microsoft.com/office/drawing/2014/main" id="{9E880D7A-C92A-4FB2-9A91-4EE8094839EC}"/>
+              </a:ext>
+            </a:extLst>
+          </p:cNvPr>
+          <p:cNvPicPr>
+            <a:picLocks noChangeAspect="1"/>
+          </p:cNvPicPr>
+          <p:nvPr/>
+        </p:nvPicPr>
+        <p:blipFill>
+          <a:blip r:embed="rId15">
+            <a:extLst>
+              <a:ext uri="{96DAC541-7B7A-43D3-8B79-37D633B846F1}">
+                <asvg:svgBlip xmlns:asvg="http://schemas.microsoft.com/office/drawing/2016/SVG/main" r:embed="rId16"/>
+              </a:ext>
+            </a:extLst>
+          </a:blip>
+          <a:stretch>
+            <a:fillRect/>
+          </a:stretch>
+        </p:blipFill>
+        <p:spPr>
+          <a:xfrm>
+            <a:off x="9383151" y="5710117"/>
+            <a:ext cx="914400" cy="914400"/>
+          </a:xfrm>
+          <a:prstGeom prst="rect">
+            <a:avLst/>
+          </a:prstGeom>
+        </p:spPr>
+      </p:pic>
+      <p:pic>
+        <p:nvPicPr>
+          <p:cNvPr id="18" name="Graphique 17" descr="Document">
+            <a:extLst>
+              <a:ext uri="{FF2B5EF4-FFF2-40B4-BE49-F238E27FC236}">
+                <a16:creationId xmlns:a16="http://schemas.microsoft.com/office/drawing/2014/main" id="{3D18A8DE-E9D1-4274-BC76-179B3434DD04}"/>
+              </a:ext>
+            </a:extLst>
+          </p:cNvPr>
+          <p:cNvPicPr>
+            <a:picLocks noChangeAspect="1"/>
+          </p:cNvPicPr>
+          <p:nvPr/>
+        </p:nvPicPr>
+        <p:blipFill>
+          <a:blip r:embed="rId17">
+            <a:extLst>
+              <a:ext uri="{96DAC541-7B7A-43D3-8B79-37D633B846F1}">
+                <asvg:svgBlip xmlns:asvg="http://schemas.microsoft.com/office/drawing/2016/SVG/main" r:embed="rId18"/>
+              </a:ext>
+            </a:extLst>
+          </a:blip>
+          <a:stretch>
+            <a:fillRect/>
+          </a:stretch>
+        </p:blipFill>
+        <p:spPr>
+          <a:xfrm>
+            <a:off x="7496049" y="5710117"/>
+            <a:ext cx="914400" cy="914400"/>
+          </a:xfrm>
+          <a:prstGeom prst="rect">
+            <a:avLst/>
+          </a:prstGeom>
+        </p:spPr>
+      </p:pic>
+      <p:pic>
+        <p:nvPicPr>
+          <p:cNvPr id="19" name="Graphique 18" descr="Pièces de puzzle">
+            <a:extLst>
+              <a:ext uri="{FF2B5EF4-FFF2-40B4-BE49-F238E27FC236}">
+                <a16:creationId xmlns:a16="http://schemas.microsoft.com/office/drawing/2014/main" id="{F00ACC8C-DE80-4F11-BB24-77DF120010E4}"/>
+              </a:ext>
+            </a:extLst>
+          </p:cNvPr>
+          <p:cNvPicPr>
+            <a:picLocks noChangeAspect="1"/>
+          </p:cNvPicPr>
+          <p:nvPr/>
+        </p:nvPicPr>
+        <p:blipFill>
+          <a:blip r:embed="rId19">
+            <a:extLst>
+              <a:ext uri="{96DAC541-7B7A-43D3-8B79-37D633B846F1}">
+                <asvg:svgBlip xmlns:asvg="http://schemas.microsoft.com/office/drawing/2016/SVG/main" r:embed="rId20"/>
+              </a:ext>
+            </a:extLst>
+          </a:blip>
+          <a:stretch>
+            <a:fillRect/>
+          </a:stretch>
+        </p:blipFill>
+        <p:spPr>
+          <a:xfrm>
+            <a:off x="4004618" y="5710117"/>
+            <a:ext cx="914400" cy="914400"/>
+          </a:xfrm>
+          <a:prstGeom prst="rect">
+            <a:avLst/>
+          </a:prstGeom>
+        </p:spPr>
+      </p:pic>
+      <p:pic>
+        <p:nvPicPr>
+          <p:cNvPr id="20" name="Graphique 19" descr="Cerveau dans une tête">
+            <a:extLst>
+              <a:ext uri="{FF2B5EF4-FFF2-40B4-BE49-F238E27FC236}">
+                <a16:creationId xmlns:a16="http://schemas.microsoft.com/office/drawing/2014/main" id="{A8BB59D1-EA04-42D8-8229-3E89C1E5B3DF}"/>
+              </a:ext>
+            </a:extLst>
+          </p:cNvPr>
+          <p:cNvPicPr>
+            <a:picLocks noChangeAspect="1"/>
+          </p:cNvPicPr>
+          <p:nvPr/>
+        </p:nvPicPr>
+        <p:blipFill>
+          <a:blip r:embed="rId21">
+            <a:extLst>
+              <a:ext uri="{96DAC541-7B7A-43D3-8B79-37D633B846F1}">
+                <asvg:svgBlip xmlns:asvg="http://schemas.microsoft.com/office/drawing/2016/SVG/main" r:embed="rId22"/>
+              </a:ext>
+            </a:extLst>
+          </a:blip>
+          <a:stretch>
+            <a:fillRect/>
+          </a:stretch>
+        </p:blipFill>
+        <p:spPr>
+          <a:xfrm>
+            <a:off x="276286" y="5759499"/>
+            <a:ext cx="914400" cy="914400"/>
+          </a:xfrm>
+          <a:prstGeom prst="rect">
+            <a:avLst/>
+          </a:prstGeom>
+        </p:spPr>
+      </p:pic>
+      <p:sp>
+        <p:nvSpPr>
+          <p:cNvPr id="21" name="Flèche : droite 20">
+            <a:extLst>
+              <a:ext uri="{FF2B5EF4-FFF2-40B4-BE49-F238E27FC236}">
+                <a16:creationId xmlns:a16="http://schemas.microsoft.com/office/drawing/2014/main" id="{1199E2B7-E41D-42CD-8914-A978F7F995ED}"/>
+              </a:ext>
+            </a:extLst>
+          </p:cNvPr>
+          <p:cNvSpPr/>
+          <p:nvPr/>
+        </p:nvSpPr>
+        <p:spPr>
+          <a:xfrm>
+            <a:off x="1230189" y="6098657"/>
+            <a:ext cx="682949" cy="262055"/>
+          </a:xfrm>
+          <a:prstGeom prst="rightArrow">
+            <a:avLst/>
+          </a:prstGeom>
+        </p:spPr>
+        <p:style>
+          <a:lnRef idx="2">
+            <a:schemeClr val="accent1">
+              <a:shade val="50000"/>
+            </a:schemeClr>
+          </a:lnRef>
+          <a:fillRef idx="1">
+            <a:schemeClr val="accent1"/>
+          </a:fillRef>
+          <a:effectRef idx="0">
+            <a:schemeClr val="accent1"/>
+          </a:effectRef>
+          <a:fontRef idx="minor">
+            <a:schemeClr val="lt1"/>
+          </a:fontRef>
+        </p:style>
+        <p:txBody>
+          <a:bodyPr rtlCol="0" anchor="ctr"/>
+          <a:lstStyle/>
+          <a:p>
+            <a:pPr algn="ctr"/>
+            <a:endParaRPr lang="en-GB"/>
+          </a:p>
+        </p:txBody>
+      </p:sp>
+      <p:sp>
+        <p:nvSpPr>
+          <p:cNvPr id="22" name="Flèche : droite 21">
+            <a:extLst>
+              <a:ext uri="{FF2B5EF4-FFF2-40B4-BE49-F238E27FC236}">
+                <a16:creationId xmlns:a16="http://schemas.microsoft.com/office/drawing/2014/main" id="{1DC6B156-CA22-405B-9F53-6D11D4100E53}"/>
+              </a:ext>
+            </a:extLst>
+          </p:cNvPr>
+          <p:cNvSpPr/>
+          <p:nvPr/>
+        </p:nvSpPr>
+        <p:spPr>
+          <a:xfrm>
+            <a:off x="3103942" y="6117398"/>
+            <a:ext cx="682949" cy="262055"/>
+          </a:xfrm>
+          <a:prstGeom prst="rightArrow">
+            <a:avLst/>
+          </a:prstGeom>
+        </p:spPr>
+        <p:style>
+          <a:lnRef idx="2">
+            <a:schemeClr val="accent1">
+              <a:shade val="50000"/>
+            </a:schemeClr>
+          </a:lnRef>
+          <a:fillRef idx="1">
+            <a:schemeClr val="accent1"/>
+          </a:fillRef>
+          <a:effectRef idx="0">
+            <a:schemeClr val="accent1"/>
+          </a:effectRef>
+          <a:fontRef idx="minor">
+            <a:schemeClr val="lt1"/>
+          </a:fontRef>
+        </p:style>
+        <p:txBody>
+          <a:bodyPr rtlCol="0" anchor="ctr"/>
+          <a:lstStyle/>
+          <a:p>
+            <a:pPr algn="ctr"/>
+            <a:endParaRPr lang="en-GB"/>
+          </a:p>
+        </p:txBody>
+      </p:sp>
+      <p:sp>
+        <p:nvSpPr>
+          <p:cNvPr id="23" name="Flèche : droite 22">
+            <a:extLst>
+              <a:ext uri="{FF2B5EF4-FFF2-40B4-BE49-F238E27FC236}">
+                <a16:creationId xmlns:a16="http://schemas.microsoft.com/office/drawing/2014/main" id="{2314034C-C1E2-46C0-9290-18F37309396E}"/>
+              </a:ext>
+            </a:extLst>
+          </p:cNvPr>
+          <p:cNvSpPr/>
+          <p:nvPr/>
+        </p:nvSpPr>
+        <p:spPr>
+          <a:xfrm>
+            <a:off x="4958521" y="6109182"/>
+            <a:ext cx="682949" cy="262055"/>
+          </a:xfrm>
+          <a:prstGeom prst="rightArrow">
+            <a:avLst/>
+          </a:prstGeom>
+        </p:spPr>
+        <p:style>
+          <a:lnRef idx="2">
+            <a:schemeClr val="accent1">
+              <a:shade val="50000"/>
+            </a:schemeClr>
+          </a:lnRef>
+          <a:fillRef idx="1">
+            <a:schemeClr val="accent1"/>
+          </a:fillRef>
+          <a:effectRef idx="0">
+            <a:schemeClr val="accent1"/>
+          </a:effectRef>
+          <a:fontRef idx="minor">
+            <a:schemeClr val="lt1"/>
+          </a:fontRef>
+        </p:style>
+        <p:txBody>
+          <a:bodyPr rtlCol="0" anchor="ctr"/>
+          <a:lstStyle/>
+          <a:p>
+            <a:pPr algn="ctr"/>
+            <a:endParaRPr lang="en-GB"/>
+          </a:p>
+        </p:txBody>
+      </p:sp>
+      <p:sp>
+        <p:nvSpPr>
+          <p:cNvPr id="24" name="Flèche : droite 23">
+            <a:extLst>
+              <a:ext uri="{FF2B5EF4-FFF2-40B4-BE49-F238E27FC236}">
+                <a16:creationId xmlns:a16="http://schemas.microsoft.com/office/drawing/2014/main" id="{B50BFD43-8060-431D-BCBD-233B70089C42}"/>
+              </a:ext>
+            </a:extLst>
+          </p:cNvPr>
+          <p:cNvSpPr/>
+          <p:nvPr/>
+        </p:nvSpPr>
+        <p:spPr>
+          <a:xfrm>
+            <a:off x="6754337" y="6098657"/>
+            <a:ext cx="682949" cy="262055"/>
+          </a:xfrm>
+          <a:prstGeom prst="rightArrow">
+            <a:avLst/>
+          </a:prstGeom>
+        </p:spPr>
+        <p:style>
+          <a:lnRef idx="2">
+            <a:schemeClr val="accent1">
+              <a:shade val="50000"/>
+            </a:schemeClr>
+          </a:lnRef>
+          <a:fillRef idx="1">
+            <a:schemeClr val="accent1"/>
+          </a:fillRef>
+          <a:effectRef idx="0">
+            <a:schemeClr val="accent1"/>
+          </a:effectRef>
+          <a:fontRef idx="minor">
+            <a:schemeClr val="lt1"/>
+          </a:fontRef>
+        </p:style>
+        <p:txBody>
+          <a:bodyPr rtlCol="0" anchor="ctr"/>
+          <a:lstStyle/>
+          <a:p>
+            <a:pPr algn="ctr"/>
+            <a:endParaRPr lang="en-GB"/>
+          </a:p>
+        </p:txBody>
+      </p:sp>
+      <p:sp>
+        <p:nvSpPr>
+          <p:cNvPr id="25" name="Flèche : droite 24">
+            <a:extLst>
+              <a:ext uri="{FF2B5EF4-FFF2-40B4-BE49-F238E27FC236}">
+                <a16:creationId xmlns:a16="http://schemas.microsoft.com/office/drawing/2014/main" id="{6873825C-9E39-4ABF-9E84-85069EEA2D9C}"/>
+              </a:ext>
+            </a:extLst>
+          </p:cNvPr>
+          <p:cNvSpPr/>
+          <p:nvPr/>
+        </p:nvSpPr>
+        <p:spPr>
+          <a:xfrm>
+            <a:off x="8468319" y="6085671"/>
+            <a:ext cx="682949" cy="262055"/>
+          </a:xfrm>
+          <a:prstGeom prst="rightArrow">
+            <a:avLst/>
+          </a:prstGeom>
+        </p:spPr>
+        <p:style>
+          <a:lnRef idx="2">
+            <a:schemeClr val="accent1">
+              <a:shade val="50000"/>
+            </a:schemeClr>
+          </a:lnRef>
+          <a:fillRef idx="1">
+            <a:schemeClr val="accent1"/>
+          </a:fillRef>
+          <a:effectRef idx="0">
+            <a:schemeClr val="accent1"/>
+          </a:effectRef>
+          <a:fontRef idx="minor">
+            <a:schemeClr val="lt1"/>
+          </a:fontRef>
+        </p:style>
+        <p:txBody>
+          <a:bodyPr rtlCol="0" anchor="ctr"/>
+          <a:lstStyle/>
+          <a:p>
+            <a:pPr algn="ctr"/>
+            <a:endParaRPr lang="en-GB"/>
+          </a:p>
+        </p:txBody>
+      </p:sp>
+      <p:pic>
+        <p:nvPicPr>
+          <p:cNvPr id="26" name="Graphique 25" descr="Ordinateur">
+            <a:extLst>
+              <a:ext uri="{FF2B5EF4-FFF2-40B4-BE49-F238E27FC236}">
+                <a16:creationId xmlns:a16="http://schemas.microsoft.com/office/drawing/2014/main" id="{162547F3-1C0E-4647-97B9-8DA09EBB66DC}"/>
+              </a:ext>
+            </a:extLst>
+          </p:cNvPr>
+          <p:cNvPicPr>
+            <a:picLocks noChangeAspect="1"/>
+          </p:cNvPicPr>
+          <p:nvPr/>
+        </p:nvPicPr>
+        <p:blipFill>
+          <a:blip r:embed="rId23">
+            <a:extLst>
+              <a:ext uri="{96DAC541-7B7A-43D3-8B79-37D633B846F1}">
+                <asvg:svgBlip xmlns:asvg="http://schemas.microsoft.com/office/drawing/2016/SVG/main" r:embed="rId24"/>
+              </a:ext>
+            </a:extLst>
+          </a:blip>
+          <a:stretch>
+            <a:fillRect/>
+          </a:stretch>
+        </p:blipFill>
+        <p:spPr>
+          <a:xfrm>
+            <a:off x="6582667" y="3914932"/>
+            <a:ext cx="914400" cy="914400"/>
+          </a:xfrm>
+          <a:prstGeom prst="rect">
+            <a:avLst/>
+          </a:prstGeom>
+        </p:spPr>
+      </p:pic>
+      <p:pic>
+        <p:nvPicPr>
+          <p:cNvPr id="27" name="Graphique 26" descr="Micro de radio">
+            <a:extLst>
+              <a:ext uri="{FF2B5EF4-FFF2-40B4-BE49-F238E27FC236}">
+                <a16:creationId xmlns:a16="http://schemas.microsoft.com/office/drawing/2014/main" id="{20445940-117C-45F9-BF5D-6CD9DD818BB8}"/>
+              </a:ext>
+            </a:extLst>
+          </p:cNvPr>
+          <p:cNvPicPr>
+            <a:picLocks noChangeAspect="1"/>
+          </p:cNvPicPr>
+          <p:nvPr/>
+        </p:nvPicPr>
+        <p:blipFill>
+          <a:blip r:embed="rId25">
+            <a:extLst>
+              <a:ext uri="{96DAC541-7B7A-43D3-8B79-37D633B846F1}">
+                <asvg:svgBlip xmlns:asvg="http://schemas.microsoft.com/office/drawing/2016/SVG/main" r:embed="rId26"/>
+              </a:ext>
+            </a:extLst>
+          </a:blip>
+          <a:stretch>
+            <a:fillRect/>
+          </a:stretch>
+        </p:blipFill>
+        <p:spPr>
+          <a:xfrm>
+            <a:off x="8674920" y="3965730"/>
+            <a:ext cx="914400" cy="914400"/>
+          </a:xfrm>
+          <a:prstGeom prst="rect">
+            <a:avLst/>
+          </a:prstGeom>
+        </p:spPr>
+      </p:pic>
+      <p:pic>
+        <p:nvPicPr>
+          <p:cNvPr id="28" name="Graphique 27" descr="Tête avec engrenages">
+            <a:extLst>
+              <a:ext uri="{FF2B5EF4-FFF2-40B4-BE49-F238E27FC236}">
+                <a16:creationId xmlns:a16="http://schemas.microsoft.com/office/drawing/2014/main" id="{27FAD365-255D-463A-90DC-43091F6F8C98}"/>
+              </a:ext>
+            </a:extLst>
+          </p:cNvPr>
+          <p:cNvPicPr>
+            <a:picLocks noChangeAspect="1"/>
+          </p:cNvPicPr>
+          <p:nvPr/>
+        </p:nvPicPr>
+        <p:blipFill>
+          <a:blip r:embed="rId27">
+            <a:extLst>
+              <a:ext uri="{96DAC541-7B7A-43D3-8B79-37D633B846F1}">
+                <asvg:svgBlip xmlns:asvg="http://schemas.microsoft.com/office/drawing/2016/SVG/main" r:embed="rId28"/>
+              </a:ext>
+            </a:extLst>
+          </a:blip>
+          <a:stretch>
+            <a:fillRect/>
+          </a:stretch>
+        </p:blipFill>
+        <p:spPr>
+          <a:xfrm>
+            <a:off x="7203664" y="2661543"/>
+            <a:ext cx="914400" cy="914400"/>
+          </a:xfrm>
+          <a:prstGeom prst="rect">
+            <a:avLst/>
+          </a:prstGeom>
+        </p:spPr>
+      </p:pic>
+      <p:pic>
+        <p:nvPicPr>
+          <p:cNvPr id="29" name="Graphique 28" descr="Parole">
+            <a:extLst>
+              <a:ext uri="{FF2B5EF4-FFF2-40B4-BE49-F238E27FC236}">
+                <a16:creationId xmlns:a16="http://schemas.microsoft.com/office/drawing/2014/main" id="{3087F7AA-DB4E-4292-B874-084A0A7588A6}"/>
+              </a:ext>
+            </a:extLst>
+          </p:cNvPr>
+          <p:cNvPicPr>
+            <a:picLocks noChangeAspect="1"/>
+          </p:cNvPicPr>
+          <p:nvPr/>
+        </p:nvPicPr>
+        <p:blipFill>
+          <a:blip r:embed="rId29">
+            <a:extLst>
+              <a:ext uri="{96DAC541-7B7A-43D3-8B79-37D633B846F1}">
+                <asvg:svgBlip xmlns:asvg="http://schemas.microsoft.com/office/drawing/2016/SVG/main" r:embed="rId30"/>
+              </a:ext>
+            </a:extLst>
+          </a:blip>
+          <a:stretch>
+            <a:fillRect/>
+          </a:stretch>
+        </p:blipFill>
+        <p:spPr>
+          <a:xfrm>
+            <a:off x="10399105" y="3368832"/>
+            <a:ext cx="914400" cy="914400"/>
+          </a:xfrm>
+          <a:prstGeom prst="rect">
+            <a:avLst/>
+          </a:prstGeom>
+        </p:spPr>
+      </p:pic>
+      <p:pic>
+        <p:nvPicPr>
+          <p:cNvPr id="30" name="Graphique 29" descr="Notation musicale">
+            <a:extLst>
+              <a:ext uri="{FF2B5EF4-FFF2-40B4-BE49-F238E27FC236}">
+                <a16:creationId xmlns:a16="http://schemas.microsoft.com/office/drawing/2014/main" id="{C6DFDB75-45DB-43A2-87DA-DC8A0CB1EAB7}"/>
+              </a:ext>
+            </a:extLst>
+          </p:cNvPr>
+          <p:cNvPicPr>
+            <a:picLocks noChangeAspect="1"/>
+          </p:cNvPicPr>
+          <p:nvPr/>
+        </p:nvPicPr>
+        <p:blipFill>
+          <a:blip r:embed="rId31">
+            <a:extLst>
+              <a:ext uri="{96DAC541-7B7A-43D3-8B79-37D633B846F1}">
+                <asvg:svgBlip xmlns:asvg="http://schemas.microsoft.com/office/drawing/2016/SVG/main" r:embed="rId32"/>
+              </a:ext>
+            </a:extLst>
+          </a:blip>
+          <a:stretch>
+            <a:fillRect/>
+          </a:stretch>
+        </p:blipFill>
+        <p:spPr>
+          <a:xfrm>
+            <a:off x="7002126" y="5015597"/>
+            <a:ext cx="914400" cy="914400"/>
+          </a:xfrm>
+          <a:prstGeom prst="rect">
+            <a:avLst/>
+          </a:prstGeom>
+        </p:spPr>
+      </p:pic>
+      <p:sp>
+        <p:nvSpPr>
+          <p:cNvPr id="31" name="Flèche : bas 30">
+            <a:extLst>
+              <a:ext uri="{FF2B5EF4-FFF2-40B4-BE49-F238E27FC236}">
+                <a16:creationId xmlns:a16="http://schemas.microsoft.com/office/drawing/2014/main" id="{E0444035-31BC-487A-88D2-20EB54AE4304}"/>
+              </a:ext>
+            </a:extLst>
+          </p:cNvPr>
+          <p:cNvSpPr/>
+          <p:nvPr/>
+        </p:nvSpPr>
+        <p:spPr>
+          <a:xfrm rot="3732868">
+            <a:off x="9842733" y="3701788"/>
+            <a:ext cx="204210" cy="669928"/>
+          </a:xfrm>
+          <a:prstGeom prst="downArrow">
+            <a:avLst/>
+          </a:prstGeom>
+        </p:spPr>
+        <p:style>
+          <a:lnRef idx="2">
+            <a:schemeClr val="accent1">
+              <a:shade val="50000"/>
+            </a:schemeClr>
+          </a:lnRef>
+          <a:fillRef idx="1">
+            <a:schemeClr val="accent1"/>
+          </a:fillRef>
+          <a:effectRef idx="0">
+            <a:schemeClr val="accent1"/>
+          </a:effectRef>
+          <a:fontRef idx="minor">
+            <a:schemeClr val="lt1"/>
+          </a:fontRef>
+        </p:style>
+        <p:txBody>
+          <a:bodyPr rtlCol="0" anchor="ctr"/>
+          <a:lstStyle/>
+          <a:p>
+            <a:pPr algn="ctr"/>
+            <a:endParaRPr lang="en-GB"/>
+          </a:p>
+        </p:txBody>
+      </p:sp>
+      <p:sp>
+        <p:nvSpPr>
+          <p:cNvPr id="32" name="Flèche : bas 31">
+            <a:extLst>
+              <a:ext uri="{FF2B5EF4-FFF2-40B4-BE49-F238E27FC236}">
+                <a16:creationId xmlns:a16="http://schemas.microsoft.com/office/drawing/2014/main" id="{DE90A64C-ADC8-40AB-A84E-4CD418EF7E5F}"/>
+              </a:ext>
+            </a:extLst>
+          </p:cNvPr>
+          <p:cNvSpPr/>
+          <p:nvPr/>
+        </p:nvSpPr>
+        <p:spPr>
+          <a:xfrm rot="14618119">
+            <a:off x="8193618" y="4697567"/>
+            <a:ext cx="204210" cy="669928"/>
+          </a:xfrm>
+          <a:prstGeom prst="downArrow">
+            <a:avLst/>
+          </a:prstGeom>
+        </p:spPr>
+        <p:style>
+          <a:lnRef idx="2">
+            <a:schemeClr val="accent1">
+              <a:shade val="50000"/>
+            </a:schemeClr>
+          </a:lnRef>
+          <a:fillRef idx="1">
+            <a:schemeClr val="accent1"/>
+          </a:fillRef>
+          <a:effectRef idx="0">
+            <a:schemeClr val="accent1"/>
+          </a:effectRef>
+          <a:fontRef idx="minor">
+            <a:schemeClr val="lt1"/>
+          </a:fontRef>
+        </p:style>
+        <p:txBody>
+          <a:bodyPr rtlCol="0" anchor="ctr"/>
+          <a:lstStyle/>
+          <a:p>
+            <a:pPr algn="ctr"/>
+            <a:endParaRPr lang="en-GB"/>
+          </a:p>
+        </p:txBody>
+      </p:sp>
+      <p:sp>
+        <p:nvSpPr>
+          <p:cNvPr id="33" name="Flèche : bas 32">
+            <a:extLst>
+              <a:ext uri="{FF2B5EF4-FFF2-40B4-BE49-F238E27FC236}">
+                <a16:creationId xmlns:a16="http://schemas.microsoft.com/office/drawing/2014/main" id="{7337FC5F-39F0-4EE8-BB1B-0E5A88AAE0F0}"/>
+              </a:ext>
+            </a:extLst>
+          </p:cNvPr>
+          <p:cNvSpPr/>
+          <p:nvPr/>
+        </p:nvSpPr>
+        <p:spPr>
+          <a:xfrm rot="5400000">
+            <a:off x="8037587" y="4068438"/>
+            <a:ext cx="204210" cy="669928"/>
+          </a:xfrm>
+          <a:prstGeom prst="downArrow">
+            <a:avLst/>
+          </a:prstGeom>
+        </p:spPr>
+        <p:style>
+          <a:lnRef idx="2">
+            <a:schemeClr val="accent1">
+              <a:shade val="50000"/>
+            </a:schemeClr>
+          </a:lnRef>
+          <a:fillRef idx="1">
+            <a:schemeClr val="accent1"/>
+          </a:fillRef>
+          <a:effectRef idx="0">
+            <a:schemeClr val="accent1"/>
+          </a:effectRef>
+          <a:fontRef idx="minor">
+            <a:schemeClr val="lt1"/>
+          </a:fontRef>
+        </p:style>
+        <p:txBody>
+          <a:bodyPr rtlCol="0" anchor="ctr"/>
+          <a:lstStyle/>
+          <a:p>
+            <a:pPr algn="ctr"/>
+            <a:endParaRPr lang="en-GB"/>
+          </a:p>
+        </p:txBody>
+      </p:sp>
+      <p:sp>
+        <p:nvSpPr>
+          <p:cNvPr id="34" name="Flèche : bas 33">
+            <a:extLst>
+              <a:ext uri="{FF2B5EF4-FFF2-40B4-BE49-F238E27FC236}">
+                <a16:creationId xmlns:a16="http://schemas.microsoft.com/office/drawing/2014/main" id="{71911700-EA93-4E63-9E00-D624E01CE5EE}"/>
+              </a:ext>
+            </a:extLst>
+          </p:cNvPr>
+          <p:cNvSpPr/>
+          <p:nvPr/>
+        </p:nvSpPr>
+        <p:spPr>
+          <a:xfrm rot="7014157">
+            <a:off x="8272422" y="3488953"/>
+            <a:ext cx="204210" cy="669928"/>
+          </a:xfrm>
+          <a:prstGeom prst="downArrow">
+            <a:avLst/>
+          </a:prstGeom>
+        </p:spPr>
+        <p:style>
+          <a:lnRef idx="2">
+            <a:schemeClr val="accent1">
+              <a:shade val="50000"/>
+            </a:schemeClr>
+          </a:lnRef>
+          <a:fillRef idx="1">
+            <a:schemeClr val="accent1"/>
+          </a:fillRef>
+          <a:effectRef idx="0">
+            <a:schemeClr val="accent1"/>
+          </a:effectRef>
+          <a:fontRef idx="minor">
+            <a:schemeClr val="lt1"/>
+          </a:fontRef>
+        </p:style>
+        <p:txBody>
+          <a:bodyPr rtlCol="0" anchor="ctr"/>
+          <a:lstStyle/>
+          <a:p>
+            <a:pPr algn="ctr"/>
+            <a:endParaRPr lang="en-GB"/>
+          </a:p>
+        </p:txBody>
+      </p:sp>
+      <p:sp>
+        <p:nvSpPr>
+          <p:cNvPr id="35" name="Flèche : bas 34">
+            <a:extLst>
+              <a:ext uri="{FF2B5EF4-FFF2-40B4-BE49-F238E27FC236}">
+                <a16:creationId xmlns:a16="http://schemas.microsoft.com/office/drawing/2014/main" id="{1B94B5E6-6042-47B3-88F0-1B94707ACCB7}"/>
+              </a:ext>
+            </a:extLst>
+          </p:cNvPr>
+          <p:cNvSpPr/>
+          <p:nvPr/>
+        </p:nvSpPr>
+        <p:spPr>
+          <a:xfrm rot="1747778">
+            <a:off x="6937762" y="3240979"/>
+            <a:ext cx="204210" cy="669928"/>
+          </a:xfrm>
+          <a:prstGeom prst="downArrow">
+            <a:avLst/>
+          </a:prstGeom>
+        </p:spPr>
+        <p:style>
+          <a:lnRef idx="2">
+            <a:schemeClr val="accent1">
+              <a:shade val="50000"/>
+            </a:schemeClr>
+          </a:lnRef>
+          <a:fillRef idx="1">
+            <a:schemeClr val="accent1"/>
+          </a:fillRef>
+          <a:effectRef idx="0">
+            <a:schemeClr val="accent1"/>
+          </a:effectRef>
+          <a:fontRef idx="minor">
+            <a:schemeClr val="lt1"/>
+          </a:fontRef>
+        </p:style>
+        <p:txBody>
+          <a:bodyPr rtlCol="0" anchor="ctr"/>
+          <a:lstStyle/>
+          <a:p>
+            <a:pPr algn="ctr"/>
+            <a:endParaRPr lang="en-GB"/>
+          </a:p>
+        </p:txBody>
+      </p:sp>
+      <p:pic>
+        <p:nvPicPr>
+          <p:cNvPr id="36" name="Graphique 35" descr="Dollar">
+            <a:extLst>
+              <a:ext uri="{FF2B5EF4-FFF2-40B4-BE49-F238E27FC236}">
+                <a16:creationId xmlns:a16="http://schemas.microsoft.com/office/drawing/2014/main" id="{D1FCA88D-3469-4F7B-98E9-829950B480B8}"/>
+              </a:ext>
+            </a:extLst>
+          </p:cNvPr>
+          <p:cNvPicPr>
+            <a:picLocks noChangeAspect="1"/>
+          </p:cNvPicPr>
+          <p:nvPr/>
+        </p:nvPicPr>
+        <p:blipFill>
+          <a:blip r:embed="rId33">
+            <a:extLst>
+              <a:ext uri="{96DAC541-7B7A-43D3-8B79-37D633B846F1}">
+                <asvg:svgBlip xmlns:asvg="http://schemas.microsoft.com/office/drawing/2016/SVG/main" r:embed="rId34"/>
+              </a:ext>
+            </a:extLst>
+          </a:blip>
+          <a:stretch>
+            <a:fillRect/>
+          </a:stretch>
+        </p:blipFill>
+        <p:spPr>
+          <a:xfrm>
+            <a:off x="8641190" y="309433"/>
+            <a:ext cx="914400" cy="914400"/>
+          </a:xfrm>
+          <a:prstGeom prst="rect">
+            <a:avLst/>
+          </a:prstGeom>
+        </p:spPr>
+      </p:pic>
+      <p:pic>
+        <p:nvPicPr>
+          <p:cNvPr id="37" name="Graphique 36" descr="Graphique à barres">
+            <a:extLst>
+              <a:ext uri="{FF2B5EF4-FFF2-40B4-BE49-F238E27FC236}">
+                <a16:creationId xmlns:a16="http://schemas.microsoft.com/office/drawing/2014/main" id="{0FF70A42-3150-4E08-9544-0A3CCE2A8AE8}"/>
+              </a:ext>
+            </a:extLst>
+          </p:cNvPr>
+          <p:cNvPicPr>
+            <a:picLocks noChangeAspect="1"/>
+          </p:cNvPicPr>
+          <p:nvPr/>
+        </p:nvPicPr>
+        <p:blipFill>
+          <a:blip r:embed="rId35">
+            <a:extLst>
+              <a:ext uri="{96DAC541-7B7A-43D3-8B79-37D633B846F1}">
+                <asvg:svgBlip xmlns:asvg="http://schemas.microsoft.com/office/drawing/2016/SVG/main" r:embed="rId36"/>
+              </a:ext>
+            </a:extLst>
+          </a:blip>
+          <a:stretch>
+            <a:fillRect/>
+          </a:stretch>
+        </p:blipFill>
+        <p:spPr>
+          <a:xfrm>
+            <a:off x="10568765" y="1497302"/>
+            <a:ext cx="914400" cy="914400"/>
+          </a:xfrm>
+          <a:prstGeom prst="rect">
+            <a:avLst/>
+          </a:prstGeom>
+        </p:spPr>
+      </p:pic>
+      <p:pic>
+        <p:nvPicPr>
+          <p:cNvPr id="38" name="Graphique 37" descr="Tête avec engrenages">
+            <a:extLst>
+              <a:ext uri="{FF2B5EF4-FFF2-40B4-BE49-F238E27FC236}">
+                <a16:creationId xmlns:a16="http://schemas.microsoft.com/office/drawing/2014/main" id="{E8E178C1-FBEE-4226-BFF1-80B06E74B6B0}"/>
+              </a:ext>
+            </a:extLst>
+          </p:cNvPr>
+          <p:cNvPicPr>
+            <a:picLocks noChangeAspect="1"/>
+          </p:cNvPicPr>
+          <p:nvPr/>
+        </p:nvPicPr>
+        <p:blipFill>
+          <a:blip r:embed="rId27">
+            <a:extLst>
+              <a:ext uri="{96DAC541-7B7A-43D3-8B79-37D633B846F1}">
+                <asvg:svgBlip xmlns:asvg="http://schemas.microsoft.com/office/drawing/2016/SVG/main" r:embed="rId28"/>
+              </a:ext>
+            </a:extLst>
+          </a:blip>
+          <a:stretch>
+            <a:fillRect/>
+          </a:stretch>
+        </p:blipFill>
+        <p:spPr>
+          <a:xfrm>
+            <a:off x="6932772" y="1497302"/>
+            <a:ext cx="914400" cy="914400"/>
+          </a:xfrm>
+          <a:prstGeom prst="rect">
+            <a:avLst/>
+          </a:prstGeom>
+        </p:spPr>
+      </p:pic>
+      <p:sp>
+        <p:nvSpPr>
+          <p:cNvPr id="39" name="Flèche : droite 38">
+            <a:extLst>
+              <a:ext uri="{FF2B5EF4-FFF2-40B4-BE49-F238E27FC236}">
+                <a16:creationId xmlns:a16="http://schemas.microsoft.com/office/drawing/2014/main" id="{5E4B50DA-22E3-4B8B-B018-95F8E91B7925}"/>
+              </a:ext>
+            </a:extLst>
+          </p:cNvPr>
+          <p:cNvSpPr/>
+          <p:nvPr/>
+        </p:nvSpPr>
+        <p:spPr>
+          <a:xfrm>
+            <a:off x="8173720" y="1774165"/>
+            <a:ext cx="2068497" cy="360674"/>
+          </a:xfrm>
+          <a:prstGeom prst="rightArrow">
+            <a:avLst/>
+          </a:prstGeom>
+        </p:spPr>
+        <p:style>
+          <a:lnRef idx="2">
+            <a:schemeClr val="accent1">
+              <a:shade val="50000"/>
+            </a:schemeClr>
+          </a:lnRef>
+          <a:fillRef idx="1">
+            <a:schemeClr val="accent1"/>
+          </a:fillRef>
+          <a:effectRef idx="0">
+            <a:schemeClr val="accent1"/>
+          </a:effectRef>
+          <a:fontRef idx="minor">
+            <a:schemeClr val="lt1"/>
+          </a:fontRef>
+        </p:style>
+        <p:txBody>
+          <a:bodyPr rtlCol="0" anchor="ctr"/>
+          <a:lstStyle/>
+          <a:p>
+            <a:pPr algn="ctr"/>
+            <a:endParaRPr lang="en-GB"/>
+          </a:p>
+        </p:txBody>
+      </p:sp>
+      <p:sp>
+        <p:nvSpPr>
+          <p:cNvPr id="40" name="Flèche : bas 39">
+            <a:extLst>
+              <a:ext uri="{FF2B5EF4-FFF2-40B4-BE49-F238E27FC236}">
+                <a16:creationId xmlns:a16="http://schemas.microsoft.com/office/drawing/2014/main" id="{9E709818-18F1-44CC-847B-AAE702F27A44}"/>
+              </a:ext>
+            </a:extLst>
+          </p:cNvPr>
+          <p:cNvSpPr/>
+          <p:nvPr/>
+        </p:nvSpPr>
+        <p:spPr>
+          <a:xfrm>
+            <a:off x="8947469" y="1361157"/>
+            <a:ext cx="301841" cy="407080"/>
+          </a:xfrm>
+          <a:prstGeom prst="downArrow">
+            <a:avLst/>
+          </a:prstGeom>
+        </p:spPr>
+        <p:style>
+          <a:lnRef idx="2">
+            <a:schemeClr val="accent1">
+              <a:shade val="50000"/>
+            </a:schemeClr>
+          </a:lnRef>
+          <a:fillRef idx="1">
+            <a:schemeClr val="accent1"/>
+          </a:fillRef>
+          <a:effectRef idx="0">
+            <a:schemeClr val="accent1"/>
+          </a:effectRef>
+          <a:fontRef idx="minor">
+            <a:schemeClr val="lt1"/>
+          </a:fontRef>
+        </p:style>
+        <p:txBody>
+          <a:bodyPr rtlCol="0" anchor="ctr"/>
+          <a:lstStyle/>
+          <a:p>
+            <a:pPr algn="ctr"/>
+            <a:endParaRPr lang="en-GB"/>
           </a:p>
         </p:txBody>
       </p:sp>
@@ -20299,7 +21891,12 @@
             <p:ph idx="1"/>
           </p:nvPr>
         </p:nvSpPr>
-        <p:spPr/>
+        <p:spPr>
+          <a:xfrm>
+            <a:off x="684212" y="685800"/>
+            <a:ext cx="8534400" cy="3615267"/>
+          </a:xfrm>
+        </p:spPr>
         <p:txBody>
           <a:bodyPr/>
           <a:lstStyle/>

</xml_diff>

<commit_message>
#12 Backgrounds added schemas on issue slides
</commit_message>
<xml_diff>
--- a/SAI_presentation.pptx
+++ b/SAI_presentation.pptx
@@ -12944,6 +12944,190 @@
       </p:grpSpPr>
       <p:sp>
         <p:nvSpPr>
+          <p:cNvPr id="44" name="Rectangle 43">
+            <a:extLst>
+              <a:ext uri="{FF2B5EF4-FFF2-40B4-BE49-F238E27FC236}">
+                <a16:creationId xmlns:a16="http://schemas.microsoft.com/office/drawing/2014/main" id="{CA7052FE-ADDE-4C4D-9265-EA9C3436BFD4}"/>
+              </a:ext>
+            </a:extLst>
+          </p:cNvPr>
+          <p:cNvSpPr/>
+          <p:nvPr/>
+        </p:nvSpPr>
+        <p:spPr>
+          <a:xfrm>
+            <a:off x="6868174" y="306544"/>
+            <a:ext cx="5043788" cy="2085866"/>
+          </a:xfrm>
+          <a:prstGeom prst="rect">
+            <a:avLst/>
+          </a:prstGeom>
+        </p:spPr>
+        <p:style>
+          <a:lnRef idx="2">
+            <a:schemeClr val="accent1">
+              <a:shade val="50000"/>
+            </a:schemeClr>
+          </a:lnRef>
+          <a:fillRef idx="1">
+            <a:schemeClr val="accent1"/>
+          </a:fillRef>
+          <a:effectRef idx="0">
+            <a:schemeClr val="accent1"/>
+          </a:effectRef>
+          <a:fontRef idx="minor">
+            <a:schemeClr val="lt1"/>
+          </a:fontRef>
+        </p:style>
+        <p:txBody>
+          <a:bodyPr rtlCol="0" anchor="ctr"/>
+          <a:lstStyle/>
+          <a:p>
+            <a:pPr algn="ctr"/>
+            <a:endParaRPr lang="en-GB"/>
+          </a:p>
+        </p:txBody>
+      </p:sp>
+      <p:sp>
+        <p:nvSpPr>
+          <p:cNvPr id="43" name="Rectangle 42">
+            <a:extLst>
+              <a:ext uri="{FF2B5EF4-FFF2-40B4-BE49-F238E27FC236}">
+                <a16:creationId xmlns:a16="http://schemas.microsoft.com/office/drawing/2014/main" id="{8E4B775B-56F6-4FE6-B413-0CFEE52AF3BE}"/>
+              </a:ext>
+            </a:extLst>
+          </p:cNvPr>
+          <p:cNvSpPr/>
+          <p:nvPr/>
+        </p:nvSpPr>
+        <p:spPr>
+          <a:xfrm>
+            <a:off x="6278942" y="2649980"/>
+            <a:ext cx="5633020" cy="3009050"/>
+          </a:xfrm>
+          <a:prstGeom prst="rect">
+            <a:avLst/>
+          </a:prstGeom>
+        </p:spPr>
+        <p:style>
+          <a:lnRef idx="2">
+            <a:schemeClr val="accent1">
+              <a:shade val="50000"/>
+            </a:schemeClr>
+          </a:lnRef>
+          <a:fillRef idx="1">
+            <a:schemeClr val="accent1"/>
+          </a:fillRef>
+          <a:effectRef idx="0">
+            <a:schemeClr val="accent1"/>
+          </a:effectRef>
+          <a:fontRef idx="minor">
+            <a:schemeClr val="lt1"/>
+          </a:fontRef>
+        </p:style>
+        <p:txBody>
+          <a:bodyPr rtlCol="0" anchor="ctr"/>
+          <a:lstStyle/>
+          <a:p>
+            <a:pPr algn="ctr"/>
+            <a:endParaRPr lang="en-GB"/>
+          </a:p>
+        </p:txBody>
+      </p:sp>
+      <p:sp>
+        <p:nvSpPr>
+          <p:cNvPr id="42" name="Rectangle 41">
+            <a:extLst>
+              <a:ext uri="{FF2B5EF4-FFF2-40B4-BE49-F238E27FC236}">
+                <a16:creationId xmlns:a16="http://schemas.microsoft.com/office/drawing/2014/main" id="{A0BEFE8C-1FC6-4754-8DB3-381CB38CFAEF}"/>
+              </a:ext>
+            </a:extLst>
+          </p:cNvPr>
+          <p:cNvSpPr/>
+          <p:nvPr/>
+        </p:nvSpPr>
+        <p:spPr>
+          <a:xfrm>
+            <a:off x="130051" y="5710116"/>
+            <a:ext cx="11183454" cy="1090223"/>
+          </a:xfrm>
+          <a:prstGeom prst="rect">
+            <a:avLst/>
+          </a:prstGeom>
+        </p:spPr>
+        <p:style>
+          <a:lnRef idx="2">
+            <a:schemeClr val="accent1">
+              <a:shade val="50000"/>
+            </a:schemeClr>
+          </a:lnRef>
+          <a:fillRef idx="1">
+            <a:schemeClr val="accent1"/>
+          </a:fillRef>
+          <a:effectRef idx="0">
+            <a:schemeClr val="accent1"/>
+          </a:effectRef>
+          <a:fontRef idx="minor">
+            <a:schemeClr val="lt1"/>
+          </a:fontRef>
+        </p:style>
+        <p:txBody>
+          <a:bodyPr rtlCol="0" anchor="ctr"/>
+          <a:lstStyle/>
+          <a:p>
+            <a:pPr algn="ctr"/>
+            <a:endParaRPr lang="en-GB"/>
+          </a:p>
+        </p:txBody>
+      </p:sp>
+      <p:sp>
+        <p:nvSpPr>
+          <p:cNvPr id="41" name="Rectangle 40">
+            <a:extLst>
+              <a:ext uri="{FF2B5EF4-FFF2-40B4-BE49-F238E27FC236}">
+                <a16:creationId xmlns:a16="http://schemas.microsoft.com/office/drawing/2014/main" id="{43B2111F-69A9-4849-A311-E34BF741BC4B}"/>
+              </a:ext>
+            </a:extLst>
+          </p:cNvPr>
+          <p:cNvSpPr/>
+          <p:nvPr/>
+        </p:nvSpPr>
+        <p:spPr>
+          <a:xfrm>
+            <a:off x="190242" y="1883704"/>
+            <a:ext cx="5594730" cy="3228216"/>
+          </a:xfrm>
+          <a:prstGeom prst="rect">
+            <a:avLst/>
+          </a:prstGeom>
+        </p:spPr>
+        <p:style>
+          <a:lnRef idx="2">
+            <a:schemeClr val="accent1">
+              <a:shade val="50000"/>
+            </a:schemeClr>
+          </a:lnRef>
+          <a:fillRef idx="1">
+            <a:schemeClr val="accent1"/>
+          </a:fillRef>
+          <a:effectRef idx="0">
+            <a:schemeClr val="accent1"/>
+          </a:effectRef>
+          <a:fontRef idx="minor">
+            <a:schemeClr val="lt1"/>
+          </a:fontRef>
+        </p:style>
+        <p:txBody>
+          <a:bodyPr rtlCol="0" anchor="ctr"/>
+          <a:lstStyle/>
+          <a:p>
+            <a:pPr algn="ctr"/>
+            <a:endParaRPr lang="en-GB"/>
+          </a:p>
+        </p:txBody>
+      </p:sp>
+      <p:sp>
+        <p:nvSpPr>
           <p:cNvPr id="2" name="Titre 1">
             <a:extLst>
               <a:ext uri="{FF2B5EF4-FFF2-40B4-BE49-F238E27FC236}">

</xml_diff>

<commit_message>
#12 Backgrounds colors updated on issue slides
</commit_message>
<xml_diff>
--- a/SAI_presentation.pptx
+++ b/SAI_presentation.pptx
@@ -6942,7 +6942,7 @@
             <a:fld id="{B61BEF0D-F0BB-DE4B-95CE-6DB70DBA9567}" type="datetimeFigureOut">
               <a:rPr lang="en-US" dirty="0"/>
               <a:pPr/>
-              <a:t>3/21/2020</a:t>
+              <a:t>3/22/2020</a:t>
             </a:fld>
             <a:endParaRPr lang="en-US" dirty="0"/>
           </a:p>
@@ -7375,7 +7375,7 @@
             <a:fld id="{B61BEF0D-F0BB-DE4B-95CE-6DB70DBA9567}" type="datetimeFigureOut">
               <a:rPr lang="en-US" dirty="0"/>
               <a:pPr/>
-              <a:t>3/21/2020</a:t>
+              <a:t>3/22/2020</a:t>
             </a:fld>
             <a:endParaRPr lang="en-US" dirty="0"/>
           </a:p>
@@ -7622,7 +7622,7 @@
             <a:fld id="{B61BEF0D-F0BB-DE4B-95CE-6DB70DBA9567}" type="datetimeFigureOut">
               <a:rPr lang="en-US" dirty="0"/>
               <a:pPr/>
-              <a:t>3/21/2020</a:t>
+              <a:t>3/22/2020</a:t>
             </a:fld>
             <a:endParaRPr lang="en-US" dirty="0"/>
           </a:p>
@@ -7927,7 +7927,7 @@
             <a:fld id="{B61BEF0D-F0BB-DE4B-95CE-6DB70DBA9567}" type="datetimeFigureOut">
               <a:rPr lang="en-US" dirty="0"/>
               <a:pPr/>
-              <a:t>3/21/2020</a:t>
+              <a:t>3/22/2020</a:t>
             </a:fld>
             <a:endParaRPr lang="en-US" dirty="0"/>
           </a:p>
@@ -8242,7 +8242,7 @@
             <a:fld id="{B61BEF0D-F0BB-DE4B-95CE-6DB70DBA9567}" type="datetimeFigureOut">
               <a:rPr lang="en-US" dirty="0"/>
               <a:pPr/>
-              <a:t>3/21/2020</a:t>
+              <a:t>3/22/2020</a:t>
             </a:fld>
             <a:endParaRPr lang="en-US" dirty="0"/>
           </a:p>
@@ -8541,7 +8541,7 @@
             <a:fld id="{B61BEF0D-F0BB-DE4B-95CE-6DB70DBA9567}" type="datetimeFigureOut">
               <a:rPr lang="en-US" dirty="0"/>
               <a:pPr/>
-              <a:t>3/21/2020</a:t>
+              <a:t>3/22/2020</a:t>
             </a:fld>
             <a:endParaRPr lang="en-US" dirty="0"/>
           </a:p>
@@ -8905,7 +8905,7 @@
             <a:fld id="{B61BEF0D-F0BB-DE4B-95CE-6DB70DBA9567}" type="datetimeFigureOut">
               <a:rPr lang="en-US" dirty="0"/>
               <a:pPr/>
-              <a:t>3/21/2020</a:t>
+              <a:t>3/22/2020</a:t>
             </a:fld>
             <a:endParaRPr lang="en-US" dirty="0"/>
           </a:p>
@@ -9076,7 +9076,7 @@
             <a:fld id="{B61BEF0D-F0BB-DE4B-95CE-6DB70DBA9567}" type="datetimeFigureOut">
               <a:rPr lang="en-US" dirty="0"/>
               <a:pPr/>
-              <a:t>3/21/2020</a:t>
+              <a:t>3/22/2020</a:t>
             </a:fld>
             <a:endParaRPr lang="en-US" dirty="0"/>
           </a:p>
@@ -9253,7 +9253,7 @@
             <a:fld id="{B61BEF0D-F0BB-DE4B-95CE-6DB70DBA9567}" type="datetimeFigureOut">
               <a:rPr lang="en-US" dirty="0"/>
               <a:pPr/>
-              <a:t>3/21/2020</a:t>
+              <a:t>3/22/2020</a:t>
             </a:fld>
             <a:endParaRPr lang="en-US" dirty="0"/>
           </a:p>
@@ -9420,7 +9420,7 @@
             <a:fld id="{B61BEF0D-F0BB-DE4B-95CE-6DB70DBA9567}" type="datetimeFigureOut">
               <a:rPr lang="en-US" dirty="0"/>
               <a:pPr/>
-              <a:t>3/21/2020</a:t>
+              <a:t>3/22/2020</a:t>
             </a:fld>
             <a:endParaRPr lang="en-US" dirty="0"/>
           </a:p>
@@ -9667,7 +9667,7 @@
             <a:fld id="{B61BEF0D-F0BB-DE4B-95CE-6DB70DBA9567}" type="datetimeFigureOut">
               <a:rPr lang="en-US" dirty="0"/>
               <a:pPr/>
-              <a:t>3/21/2020</a:t>
+              <a:t>3/22/2020</a:t>
             </a:fld>
             <a:endParaRPr lang="en-US" dirty="0"/>
           </a:p>
@@ -9900,7 +9900,7 @@
             <a:fld id="{B61BEF0D-F0BB-DE4B-95CE-6DB70DBA9567}" type="datetimeFigureOut">
               <a:rPr lang="en-US" dirty="0"/>
               <a:pPr/>
-              <a:t>3/21/2020</a:t>
+              <a:t>3/22/2020</a:t>
             </a:fld>
             <a:endParaRPr lang="en-US" dirty="0"/>
           </a:p>
@@ -10279,7 +10279,7 @@
             <a:fld id="{B61BEF0D-F0BB-DE4B-95CE-6DB70DBA9567}" type="datetimeFigureOut">
               <a:rPr lang="en-US" dirty="0"/>
               <a:pPr/>
-              <a:t>3/21/2020</a:t>
+              <a:t>3/22/2020</a:t>
             </a:fld>
             <a:endParaRPr lang="en-US" dirty="0"/>
           </a:p>
@@ -10394,7 +10394,7 @@
             <a:fld id="{B61BEF0D-F0BB-DE4B-95CE-6DB70DBA9567}" type="datetimeFigureOut">
               <a:rPr lang="en-US" dirty="0"/>
               <a:pPr/>
-              <a:t>3/21/2020</a:t>
+              <a:t>3/22/2020</a:t>
             </a:fld>
             <a:endParaRPr lang="en-US" dirty="0"/>
           </a:p>
@@ -10486,7 +10486,7 @@
             <a:fld id="{B61BEF0D-F0BB-DE4B-95CE-6DB70DBA9567}" type="datetimeFigureOut">
               <a:rPr lang="en-US" dirty="0"/>
               <a:pPr/>
-              <a:t>3/21/2020</a:t>
+              <a:t>3/22/2020</a:t>
             </a:fld>
             <a:endParaRPr lang="en-US" dirty="0"/>
           </a:p>
@@ -10738,7 +10738,7 @@
             <a:fld id="{B61BEF0D-F0BB-DE4B-95CE-6DB70DBA9567}" type="datetimeFigureOut">
               <a:rPr lang="en-US" dirty="0"/>
               <a:pPr/>
-              <a:t>3/21/2020</a:t>
+              <a:t>3/22/2020</a:t>
             </a:fld>
             <a:endParaRPr lang="en-US" dirty="0"/>
           </a:p>
@@ -11018,7 +11018,7 @@
             <a:fld id="{B61BEF0D-F0BB-DE4B-95CE-6DB70DBA9567}" type="datetimeFigureOut">
               <a:rPr lang="en-US" dirty="0"/>
               <a:pPr/>
-              <a:t>3/21/2020</a:t>
+              <a:t>3/22/2020</a:t>
             </a:fld>
             <a:endParaRPr lang="en-US" dirty="0"/>
           </a:p>
@@ -11421,7 +11421,7 @@
             <a:fld id="{B61BEF0D-F0BB-DE4B-95CE-6DB70DBA9567}" type="datetimeFigureOut">
               <a:rPr lang="en-US" dirty="0"/>
               <a:pPr/>
-              <a:t>3/21/2020</a:t>
+              <a:t>3/22/2020</a:t>
             </a:fld>
             <a:endParaRPr lang="en-US" dirty="0"/>
           </a:p>
@@ -12962,6 +12962,18 @@
           <a:prstGeom prst="rect">
             <a:avLst/>
           </a:prstGeom>
+          <a:solidFill>
+            <a:schemeClr val="accent3">
+              <a:lumMod val="75000"/>
+            </a:schemeClr>
+          </a:solidFill>
+          <a:ln>
+            <a:solidFill>
+              <a:schemeClr val="accent3">
+                <a:lumMod val="75000"/>
+              </a:schemeClr>
+            </a:solidFill>
+          </a:ln>
         </p:spPr>
         <p:style>
           <a:lnRef idx="2">
@@ -12984,7 +12996,7 @@
           <a:lstStyle/>
           <a:p>
             <a:pPr algn="ctr"/>
-            <a:endParaRPr lang="en-GB"/>
+            <a:endParaRPr lang="en-GB" dirty="0"/>
           </a:p>
         </p:txBody>
       </p:sp>
@@ -13002,12 +13014,26 @@
         </p:nvSpPr>
         <p:spPr>
           <a:xfrm>
-            <a:off x="6278942" y="2649980"/>
+            <a:off x="6271082" y="2669568"/>
             <a:ext cx="5633020" cy="3009050"/>
           </a:xfrm>
           <a:prstGeom prst="rect">
             <a:avLst/>
           </a:prstGeom>
+          <a:solidFill>
+            <a:schemeClr val="accent1">
+              <a:lumMod val="20000"/>
+              <a:lumOff val="80000"/>
+            </a:schemeClr>
+          </a:solidFill>
+          <a:ln>
+            <a:solidFill>
+              <a:schemeClr val="accent1">
+                <a:lumMod val="20000"/>
+                <a:lumOff val="80000"/>
+              </a:schemeClr>
+            </a:solidFill>
+          </a:ln>
         </p:spPr>
         <p:style>
           <a:lnRef idx="2">
@@ -13054,6 +13080,20 @@
           <a:prstGeom prst="rect">
             <a:avLst/>
           </a:prstGeom>
+          <a:solidFill>
+            <a:schemeClr val="bg2">
+              <a:lumMod val="60000"/>
+              <a:lumOff val="40000"/>
+            </a:schemeClr>
+          </a:solidFill>
+          <a:ln>
+            <a:solidFill>
+              <a:schemeClr val="bg2">
+                <a:lumMod val="60000"/>
+                <a:lumOff val="40000"/>
+              </a:schemeClr>
+            </a:solidFill>
+          </a:ln>
         </p:spPr>
         <p:style>
           <a:lnRef idx="2">
@@ -13094,12 +13134,26 @@
         </p:nvSpPr>
         <p:spPr>
           <a:xfrm>
-            <a:off x="190242" y="1883704"/>
+            <a:off x="207139" y="1787381"/>
             <a:ext cx="5594730" cy="3228216"/>
           </a:xfrm>
           <a:prstGeom prst="rect">
             <a:avLst/>
           </a:prstGeom>
+          <a:solidFill>
+            <a:schemeClr val="accent4">
+              <a:lumMod val="40000"/>
+              <a:lumOff val="60000"/>
+            </a:schemeClr>
+          </a:solidFill>
+          <a:ln>
+            <a:solidFill>
+              <a:schemeClr val="accent4">
+                <a:lumMod val="40000"/>
+                <a:lumOff val="60000"/>
+              </a:schemeClr>
+            </a:solidFill>
+          </a:ln>
         </p:spPr>
         <p:style>
           <a:lnRef idx="2">
@@ -13182,7 +13236,22 @@
             </a:r>
             <a:r>
               <a:rPr lang="fr-FR" dirty="0"/>
-              <a:t> an adapter to </a:t>
+              <a:t> an </a:t>
+            </a:r>
+            <a:r>
+              <a:rPr lang="fr-FR" b="1" dirty="0">
+                <a:solidFill>
+                  <a:schemeClr val="accent4">
+                    <a:lumMod val="40000"/>
+                    <a:lumOff val="60000"/>
+                  </a:schemeClr>
+                </a:solidFill>
+              </a:rPr>
+              <a:t>adapter</a:t>
+            </a:r>
+            <a:r>
+              <a:rPr lang="fr-FR" dirty="0"/>
+              <a:t> to </a:t>
             </a:r>
             <a:r>
               <a:rPr lang="fr-FR" dirty="0" err="1"/>
@@ -13200,7 +13269,11 @@
           </a:p>
           <a:p>
             <a:r>
-              <a:rPr lang="fr-FR" dirty="0" err="1"/>
+              <a:rPr lang="fr-FR" b="1" dirty="0" err="1">
+                <a:solidFill>
+                  <a:srgbClr val="00B0F0"/>
+                </a:solidFill>
+              </a:rPr>
               <a:t>Compress</a:t>
             </a:r>
             <a:r>
@@ -13226,7 +13299,13 @@
               <a:t> a </a:t>
             </a:r>
             <a:r>
-              <a:rPr lang="fr-FR" dirty="0" err="1"/>
+              <a:rPr lang="fr-FR" b="1" dirty="0" err="1">
+                <a:solidFill>
+                  <a:schemeClr val="accent3">
+                    <a:lumMod val="75000"/>
+                  </a:schemeClr>
+                </a:solidFill>
+              </a:rPr>
               <a:t>reward</a:t>
             </a:r>
             <a:r>
@@ -13252,10 +13331,24 @@
               <a:t> SAI </a:t>
             </a:r>
             <a:r>
-              <a:rPr lang="fr-FR" dirty="0" err="1"/>
+              <a:rPr lang="fr-FR" b="1" dirty="0" err="1">
+                <a:solidFill>
+                  <a:schemeClr val="accent1">
+                    <a:lumMod val="20000"/>
+                    <a:lumOff val="80000"/>
+                  </a:schemeClr>
+                </a:solidFill>
+              </a:rPr>
               <a:t>robust</a:t>
             </a:r>
-            <a:endParaRPr lang="fr-FR" dirty="0"/>
+            <a:endParaRPr lang="fr-FR" b="1" dirty="0">
+              <a:solidFill>
+                <a:schemeClr val="accent1">
+                  <a:lumMod val="20000"/>
+                  <a:lumOff val="80000"/>
+                </a:schemeClr>
+              </a:solidFill>
+            </a:endParaRPr>
           </a:p>
           <a:p>
             <a:pPr marL="0" indent="0">
@@ -14644,7 +14737,7 @@
         </p:nvSpPr>
         <p:spPr>
           <a:xfrm rot="1747778">
-            <a:off x="6937762" y="3240979"/>
+            <a:off x="7095770" y="3427243"/>
             <a:ext cx="204210" cy="669928"/>
           </a:xfrm>
           <a:prstGeom prst="downArrow">

</xml_diff>

<commit_message>
#12 Pyinstaller icon added on solution slides
</commit_message>
<xml_diff>
--- a/SAI_presentation.pptx
+++ b/SAI_presentation.pptx
@@ -15732,37 +15732,242 @@
             </a:r>
             <a:r>
               <a:rPr lang="fr-FR" dirty="0"/>
-              <a:t> SAI </a:t>
-            </a:r>
-            <a:r>
-              <a:rPr lang="fr-FR"/>
-              <a:t>on Windows and OS X</a:t>
-            </a:r>
+              <a:t> SAI on Windows and OS X</a:t>
+            </a:r>
+          </a:p>
+          <a:p>
             <a:endParaRPr lang="fr-FR" dirty="0"/>
           </a:p>
           <a:p>
-            <a:r>
-              <a:rPr lang="fr-FR" dirty="0" err="1"/>
-              <a:t>Schema</a:t>
-            </a:r>
-            <a:r>
-              <a:rPr lang="fr-FR" dirty="0"/>
-              <a:t> to </a:t>
-            </a:r>
-            <a:r>
-              <a:rPr lang="fr-FR" dirty="0" err="1"/>
-              <a:t>explain</a:t>
-            </a:r>
-            <a:endParaRPr lang="en-GB" dirty="0"/>
+            <a:endParaRPr lang="fr-FR" dirty="0"/>
+          </a:p>
+          <a:p>
+            <a:endParaRPr lang="fr-FR" dirty="0"/>
+          </a:p>
+          <a:p>
+            <a:endParaRPr lang="fr-FR" dirty="0"/>
           </a:p>
         </p:txBody>
       </p:sp>
+      <p:pic>
+        <p:nvPicPr>
+          <p:cNvPr id="6" name="Picture 4" descr="RÃ©sultat de recherche d'images pour &quot;windows 10 logo png&quot;">
+            <a:extLst>
+              <a:ext uri="{FF2B5EF4-FFF2-40B4-BE49-F238E27FC236}">
+                <a16:creationId xmlns:a16="http://schemas.microsoft.com/office/drawing/2014/main" id="{8131B6F4-A27F-45AF-B61E-B0FC84411335}"/>
+              </a:ext>
+            </a:extLst>
+          </p:cNvPr>
+          <p:cNvPicPr>
+            <a:picLocks noChangeAspect="1" noChangeArrowheads="1"/>
+          </p:cNvPicPr>
+          <p:nvPr/>
+        </p:nvPicPr>
+        <p:blipFill>
+          <a:blip r:embed="rId2">
+            <a:extLst>
+              <a:ext uri="{28A0092B-C50C-407E-A947-70E740481C1C}">
+                <a14:useLocalDpi xmlns:a14="http://schemas.microsoft.com/office/drawing/2010/main" val="0"/>
+              </a:ext>
+            </a:extLst>
+          </a:blip>
+          <a:srcRect/>
+          <a:stretch>
+            <a:fillRect/>
+          </a:stretch>
+        </p:blipFill>
+        <p:spPr bwMode="auto">
+          <a:xfrm>
+            <a:off x="6995364" y="1949589"/>
+            <a:ext cx="854553" cy="854553"/>
+          </a:xfrm>
+          <a:prstGeom prst="rect">
+            <a:avLst/>
+          </a:prstGeom>
+          <a:noFill/>
+          <a:extLst>
+            <a:ext uri="{909E8E84-426E-40DD-AFC4-6F175D3DCCD1}">
+              <a14:hiddenFill xmlns:a14="http://schemas.microsoft.com/office/drawing/2010/main">
+                <a:solidFill>
+                  <a:srgbClr val="FFFFFF"/>
+                </a:solidFill>
+              </a14:hiddenFill>
+            </a:ext>
+          </a:extLst>
+        </p:spPr>
+      </p:pic>
+      <p:pic>
+        <p:nvPicPr>
+          <p:cNvPr id="7" name="Picture 6" descr="RÃ©sultat de recherche d'images pour &quot;OS X logo png&quot;">
+            <a:extLst>
+              <a:ext uri="{FF2B5EF4-FFF2-40B4-BE49-F238E27FC236}">
+                <a16:creationId xmlns:a16="http://schemas.microsoft.com/office/drawing/2014/main" id="{CF1027BD-EDD2-4249-BC79-F666502E039F}"/>
+              </a:ext>
+            </a:extLst>
+          </p:cNvPr>
+          <p:cNvPicPr>
+            <a:picLocks noChangeAspect="1" noChangeArrowheads="1"/>
+          </p:cNvPicPr>
+          <p:nvPr/>
+        </p:nvPicPr>
+        <p:blipFill>
+          <a:blip r:embed="rId3">
+            <a:extLst>
+              <a:ext uri="{28A0092B-C50C-407E-A947-70E740481C1C}">
+                <a14:useLocalDpi xmlns:a14="http://schemas.microsoft.com/office/drawing/2010/main" val="0"/>
+              </a:ext>
+            </a:extLst>
+          </a:blip>
+          <a:srcRect/>
+          <a:stretch>
+            <a:fillRect/>
+          </a:stretch>
+        </p:blipFill>
+        <p:spPr bwMode="auto">
+          <a:xfrm>
+            <a:off x="6829406" y="4302959"/>
+            <a:ext cx="1181100" cy="473363"/>
+          </a:xfrm>
+          <a:prstGeom prst="rect">
+            <a:avLst/>
+          </a:prstGeom>
+          <a:noFill/>
+          <a:extLst>
+            <a:ext uri="{909E8E84-426E-40DD-AFC4-6F175D3DCCD1}">
+              <a14:hiddenFill xmlns:a14="http://schemas.microsoft.com/office/drawing/2010/main">
+                <a:solidFill>
+                  <a:srgbClr val="FFFFFF"/>
+                </a:solidFill>
+              </a14:hiddenFill>
+            </a:ext>
+          </a:extLst>
+        </p:spPr>
+      </p:pic>
+      <p:pic>
+        <p:nvPicPr>
+          <p:cNvPr id="8" name="Picture 8" descr="RÃ©sultat de recherche d'images pour &quot;linux logo png&quot;">
+            <a:extLst>
+              <a:ext uri="{FF2B5EF4-FFF2-40B4-BE49-F238E27FC236}">
+                <a16:creationId xmlns:a16="http://schemas.microsoft.com/office/drawing/2014/main" id="{F006053A-D8E7-4B5B-A418-F49C933E6DBE}"/>
+              </a:ext>
+            </a:extLst>
+          </p:cNvPr>
+          <p:cNvPicPr>
+            <a:picLocks noChangeAspect="1" noChangeArrowheads="1"/>
+          </p:cNvPicPr>
+          <p:nvPr/>
+        </p:nvPicPr>
+        <p:blipFill>
+          <a:blip r:embed="rId4">
+            <a:extLst>
+              <a:ext uri="{28A0092B-C50C-407E-A947-70E740481C1C}">
+                <a14:useLocalDpi xmlns:a14="http://schemas.microsoft.com/office/drawing/2010/main" val="0"/>
+              </a:ext>
+            </a:extLst>
+          </a:blip>
+          <a:srcRect/>
+          <a:stretch>
+            <a:fillRect/>
+          </a:stretch>
+        </p:blipFill>
+        <p:spPr bwMode="auto">
+          <a:xfrm>
+            <a:off x="6951799" y="2903124"/>
+            <a:ext cx="898118" cy="1040354"/>
+          </a:xfrm>
+          <a:prstGeom prst="rect">
+            <a:avLst/>
+          </a:prstGeom>
+          <a:noFill/>
+          <a:extLst>
+            <a:ext uri="{909E8E84-426E-40DD-AFC4-6F175D3DCCD1}">
+              <a14:hiddenFill xmlns:a14="http://schemas.microsoft.com/office/drawing/2010/main">
+                <a:solidFill>
+                  <a:srgbClr val="FFFFFF"/>
+                </a:solidFill>
+              </a14:hiddenFill>
+            </a:ext>
+          </a:extLst>
+        </p:spPr>
+      </p:pic>
+      <p:pic>
+        <p:nvPicPr>
+          <p:cNvPr id="9" name="Graphique 8" descr="Caméra vidéo">
+            <a:extLst>
+              <a:ext uri="{FF2B5EF4-FFF2-40B4-BE49-F238E27FC236}">
+                <a16:creationId xmlns:a16="http://schemas.microsoft.com/office/drawing/2014/main" id="{45685769-E9BC-4BC8-9298-F04DB0FF6D50}"/>
+              </a:ext>
+            </a:extLst>
+          </p:cNvPr>
+          <p:cNvPicPr>
+            <a:picLocks noChangeAspect="1"/>
+          </p:cNvPicPr>
+          <p:nvPr/>
+        </p:nvPicPr>
+        <p:blipFill>
+          <a:blip r:embed="rId5">
+            <a:extLst>
+              <a:ext uri="{96DAC541-7B7A-43D3-8B79-37D633B846F1}">
+                <asvg:svgBlip xmlns:asvg="http://schemas.microsoft.com/office/drawing/2016/SVG/main" r:embed="rId6"/>
+              </a:ext>
+            </a:extLst>
+          </a:blip>
+          <a:stretch>
+            <a:fillRect/>
+          </a:stretch>
+        </p:blipFill>
+        <p:spPr>
+          <a:xfrm>
+            <a:off x="2616135" y="2071082"/>
+            <a:ext cx="914400" cy="914400"/>
+          </a:xfrm>
+          <a:prstGeom prst="rect">
+            <a:avLst/>
+          </a:prstGeom>
+        </p:spPr>
+      </p:pic>
+      <p:pic>
+        <p:nvPicPr>
+          <p:cNvPr id="10" name="Graphique 9" descr="Microphone">
+            <a:extLst>
+              <a:ext uri="{FF2B5EF4-FFF2-40B4-BE49-F238E27FC236}">
+                <a16:creationId xmlns:a16="http://schemas.microsoft.com/office/drawing/2014/main" id="{7B5A71A8-5903-418D-8920-9DF16EE9A1F1}"/>
+              </a:ext>
+            </a:extLst>
+          </p:cNvPr>
+          <p:cNvPicPr>
+            <a:picLocks noChangeAspect="1"/>
+          </p:cNvPicPr>
+          <p:nvPr/>
+        </p:nvPicPr>
+        <p:blipFill>
+          <a:blip r:embed="rId7">
+            <a:extLst>
+              <a:ext uri="{96DAC541-7B7A-43D3-8B79-37D633B846F1}">
+                <asvg:svgBlip xmlns:asvg="http://schemas.microsoft.com/office/drawing/2016/SVG/main" r:embed="rId8"/>
+              </a:ext>
+            </a:extLst>
+          </a:blip>
+          <a:stretch>
+            <a:fillRect/>
+          </a:stretch>
+        </p:blipFill>
+        <p:spPr>
+          <a:xfrm>
+            <a:off x="2637004" y="3377139"/>
+            <a:ext cx="914400" cy="914400"/>
+          </a:xfrm>
+          <a:prstGeom prst="rect">
+            <a:avLst/>
+          </a:prstGeom>
+        </p:spPr>
+      </p:pic>
       <p:sp>
         <p:nvSpPr>
-          <p:cNvPr id="4" name="Rectangle 3">
+          <p:cNvPr id="11" name="Flèche : droite 10">
             <a:extLst>
               <a:ext uri="{FF2B5EF4-FFF2-40B4-BE49-F238E27FC236}">
-                <a16:creationId xmlns:a16="http://schemas.microsoft.com/office/drawing/2014/main" id="{A810C1CD-F941-464D-B834-8C57EAE14EBD}"/>
+                <a16:creationId xmlns:a16="http://schemas.microsoft.com/office/drawing/2014/main" id="{7EF6963B-DA6F-4AC1-BACD-C595897251AC}"/>
               </a:ext>
             </a:extLst>
           </p:cNvPr>
@@ -15770,11 +15975,11 @@
           <p:nvPr/>
         </p:nvSpPr>
         <p:spPr>
-          <a:xfrm>
-            <a:off x="7551895" y="2870855"/>
-            <a:ext cx="620807" cy="3232956"/>
+          <a:xfrm rot="1192363">
+            <a:off x="3945843" y="2680149"/>
+            <a:ext cx="978408" cy="484632"/>
           </a:xfrm>
-          <a:prstGeom prst="rect">
+          <a:prstGeom prst="rightArrow">
             <a:avLst/>
           </a:prstGeom>
           <a:solidFill>
@@ -15807,16 +16012,16 @@
           <a:lstStyle/>
           <a:p>
             <a:pPr algn="ctr"/>
-            <a:endParaRPr lang="en-GB" dirty="0"/>
+            <a:endParaRPr lang="en-GB"/>
           </a:p>
         </p:txBody>
       </p:sp>
       <p:sp>
         <p:nvSpPr>
-          <p:cNvPr id="5" name="Rectangle 4">
+          <p:cNvPr id="12" name="Flèche : droite 11">
             <a:extLst>
               <a:ext uri="{FF2B5EF4-FFF2-40B4-BE49-F238E27FC236}">
-                <a16:creationId xmlns:a16="http://schemas.microsoft.com/office/drawing/2014/main" id="{017A18ED-A5B0-4D0F-8A49-69AF7BB05528}"/>
+                <a16:creationId xmlns:a16="http://schemas.microsoft.com/office/drawing/2014/main" id="{3F8D0A72-962D-4A9D-881D-7F608DD66762}"/>
               </a:ext>
             </a:extLst>
           </p:cNvPr>
@@ -15824,11 +16029,65 @@
           <p:nvPr/>
         </p:nvSpPr>
         <p:spPr>
-          <a:xfrm>
-            <a:off x="4489142" y="2870854"/>
-            <a:ext cx="620806" cy="3232956"/>
+          <a:xfrm rot="20407754">
+            <a:off x="3925879" y="3466015"/>
+            <a:ext cx="978408" cy="484632"/>
           </a:xfrm>
-          <a:prstGeom prst="rect">
+          <a:prstGeom prst="rightArrow">
+            <a:avLst/>
+          </a:prstGeom>
+          <a:solidFill>
+            <a:srgbClr val="00B050"/>
+          </a:solidFill>
+          <a:ln>
+            <a:solidFill>
+              <a:srgbClr val="00B050"/>
+            </a:solidFill>
+          </a:ln>
+        </p:spPr>
+        <p:style>
+          <a:lnRef idx="2">
+            <a:schemeClr val="accent1">
+              <a:shade val="50000"/>
+            </a:schemeClr>
+          </a:lnRef>
+          <a:fillRef idx="1">
+            <a:schemeClr val="accent1"/>
+          </a:fillRef>
+          <a:effectRef idx="0">
+            <a:schemeClr val="accent1"/>
+          </a:effectRef>
+          <a:fontRef idx="minor">
+            <a:schemeClr val="lt1"/>
+          </a:fontRef>
+        </p:style>
+        <p:txBody>
+          <a:bodyPr rtlCol="0" anchor="ctr"/>
+          <a:lstStyle/>
+          <a:p>
+            <a:pPr algn="ctr"/>
+            <a:endParaRPr lang="en-GB"/>
+          </a:p>
+        </p:txBody>
+      </p:sp>
+      <p:sp>
+        <p:nvSpPr>
+          <p:cNvPr id="13" name="Flèche : droite 12">
+            <a:extLst>
+              <a:ext uri="{FF2B5EF4-FFF2-40B4-BE49-F238E27FC236}">
+                <a16:creationId xmlns:a16="http://schemas.microsoft.com/office/drawing/2014/main" id="{0C8032AF-78E0-41BB-B588-19A4F130E142}"/>
+              </a:ext>
+            </a:extLst>
+          </p:cNvPr>
+          <p:cNvSpPr/>
+          <p:nvPr/>
+        </p:nvSpPr>
+        <p:spPr>
+          <a:xfrm rot="1192363">
+            <a:off x="5699536" y="3788581"/>
+            <a:ext cx="978408" cy="484632"/>
+          </a:xfrm>
+          <a:prstGeom prst="rightArrow">
             <a:avLst/>
           </a:prstGeom>
           <a:solidFill>
@@ -15861,10 +16120,165 @@
           <a:lstStyle/>
           <a:p>
             <a:pPr algn="ctr"/>
-            <a:endParaRPr lang="en-GB" dirty="0"/>
+            <a:endParaRPr lang="en-GB"/>
           </a:p>
         </p:txBody>
       </p:sp>
+      <p:sp>
+        <p:nvSpPr>
+          <p:cNvPr id="14" name="Flèche : droite 13">
+            <a:extLst>
+              <a:ext uri="{FF2B5EF4-FFF2-40B4-BE49-F238E27FC236}">
+                <a16:creationId xmlns:a16="http://schemas.microsoft.com/office/drawing/2014/main" id="{A2A46947-DC4E-48B0-AB36-DC23061B3C0E}"/>
+              </a:ext>
+            </a:extLst>
+          </p:cNvPr>
+          <p:cNvSpPr/>
+          <p:nvPr/>
+        </p:nvSpPr>
+        <p:spPr>
+          <a:xfrm rot="20407754">
+            <a:off x="5774028" y="2461794"/>
+            <a:ext cx="978408" cy="484632"/>
+          </a:xfrm>
+          <a:prstGeom prst="rightArrow">
+            <a:avLst/>
+          </a:prstGeom>
+          <a:solidFill>
+            <a:srgbClr val="FFFF00"/>
+          </a:solidFill>
+          <a:ln>
+            <a:solidFill>
+              <a:srgbClr val="FFFF00"/>
+            </a:solidFill>
+          </a:ln>
+        </p:spPr>
+        <p:style>
+          <a:lnRef idx="2">
+            <a:schemeClr val="accent1">
+              <a:shade val="50000"/>
+            </a:schemeClr>
+          </a:lnRef>
+          <a:fillRef idx="1">
+            <a:schemeClr val="accent1"/>
+          </a:fillRef>
+          <a:effectRef idx="0">
+            <a:schemeClr val="accent1"/>
+          </a:effectRef>
+          <a:fontRef idx="minor">
+            <a:schemeClr val="lt1"/>
+          </a:fontRef>
+        </p:style>
+        <p:txBody>
+          <a:bodyPr rtlCol="0" anchor="ctr"/>
+          <a:lstStyle/>
+          <a:p>
+            <a:pPr algn="ctr"/>
+            <a:endParaRPr lang="en-GB"/>
+          </a:p>
+        </p:txBody>
+      </p:sp>
+      <p:sp>
+        <p:nvSpPr>
+          <p:cNvPr id="15" name="Flèche : droite 14">
+            <a:extLst>
+              <a:ext uri="{FF2B5EF4-FFF2-40B4-BE49-F238E27FC236}">
+                <a16:creationId xmlns:a16="http://schemas.microsoft.com/office/drawing/2014/main" id="{420D7DB5-A0EC-4A22-B814-FFDD4A9BBC0E}"/>
+              </a:ext>
+            </a:extLst>
+          </p:cNvPr>
+          <p:cNvSpPr/>
+          <p:nvPr/>
+        </p:nvSpPr>
+        <p:spPr>
+          <a:xfrm>
+            <a:off x="5849595" y="3121667"/>
+            <a:ext cx="978408" cy="484632"/>
+          </a:xfrm>
+          <a:prstGeom prst="rightArrow">
+            <a:avLst/>
+          </a:prstGeom>
+          <a:solidFill>
+            <a:srgbClr val="FFFF00"/>
+          </a:solidFill>
+          <a:ln>
+            <a:solidFill>
+              <a:srgbClr val="FFFF00"/>
+            </a:solidFill>
+          </a:ln>
+        </p:spPr>
+        <p:style>
+          <a:lnRef idx="2">
+            <a:schemeClr val="accent1">
+              <a:shade val="50000"/>
+            </a:schemeClr>
+          </a:lnRef>
+          <a:fillRef idx="1">
+            <a:schemeClr val="accent1"/>
+          </a:fillRef>
+          <a:effectRef idx="0">
+            <a:schemeClr val="accent1"/>
+          </a:effectRef>
+          <a:fontRef idx="minor">
+            <a:schemeClr val="lt1"/>
+          </a:fontRef>
+        </p:style>
+        <p:txBody>
+          <a:bodyPr rtlCol="0" anchor="ctr"/>
+          <a:lstStyle/>
+          <a:p>
+            <a:pPr algn="ctr"/>
+            <a:endParaRPr lang="en-GB"/>
+          </a:p>
+        </p:txBody>
+      </p:sp>
+      <p:pic>
+        <p:nvPicPr>
+          <p:cNvPr id="1026" name="Picture 2" descr="RÃ©sultat de recherche d'images pour &quot;pyinstaller logo&quot;">
+            <a:extLst>
+              <a:ext uri="{FF2B5EF4-FFF2-40B4-BE49-F238E27FC236}">
+                <a16:creationId xmlns:a16="http://schemas.microsoft.com/office/drawing/2014/main" id="{1B3635C7-2401-436C-A767-67DFE7FDF584}"/>
+              </a:ext>
+            </a:extLst>
+          </p:cNvPr>
+          <p:cNvPicPr>
+            <a:picLocks noChangeAspect="1" noChangeArrowheads="1"/>
+          </p:cNvPicPr>
+          <p:nvPr/>
+        </p:nvPicPr>
+        <p:blipFill>
+          <a:blip r:embed="rId9">
+            <a:extLst>
+              <a:ext uri="{28A0092B-C50C-407E-A947-70E740481C1C}">
+                <a14:useLocalDpi xmlns:a14="http://schemas.microsoft.com/office/drawing/2010/main" val="0"/>
+              </a:ext>
+            </a:extLst>
+          </a:blip>
+          <a:srcRect/>
+          <a:stretch>
+            <a:fillRect/>
+          </a:stretch>
+        </p:blipFill>
+        <p:spPr bwMode="auto">
+          <a:xfrm>
+            <a:off x="4950873" y="2998837"/>
+            <a:ext cx="756603" cy="756603"/>
+          </a:xfrm>
+          <a:prstGeom prst="rect">
+            <a:avLst/>
+          </a:prstGeom>
+          <a:noFill/>
+          <a:extLst>
+            <a:ext uri="{909E8E84-426E-40DD-AFC4-6F175D3DCCD1}">
+              <a14:hiddenFill xmlns:a14="http://schemas.microsoft.com/office/drawing/2010/main">
+                <a:solidFill>
+                  <a:srgbClr val="FFFFFF"/>
+                </a:solidFill>
+              </a14:hiddenFill>
+            </a:ext>
+          </a:extLst>
+        </p:spPr>
+      </p:pic>
     </p:spTree>
     <p:extLst>
       <p:ext uri="{BB962C8B-B14F-4D97-AF65-F5344CB8AC3E}">

</xml_diff>

<commit_message>
#12 Explanation for pyinstaller added on solution slides
</commit_message>
<xml_diff>
--- a/SAI_presentation.pptx
+++ b/SAI_presentation.pptx
@@ -15736,6 +15736,44 @@
             </a:r>
           </a:p>
           <a:p>
+            <a:r>
+              <a:rPr lang="fr-FR" dirty="0" err="1"/>
+              <a:t>Pyinstaller</a:t>
+            </a:r>
+            <a:r>
+              <a:rPr lang="fr-FR" dirty="0"/>
+              <a:t> </a:t>
+            </a:r>
+            <a:r>
+              <a:rPr lang="fr-FR" dirty="0" err="1"/>
+              <a:t>allows</a:t>
+            </a:r>
+            <a:r>
+              <a:rPr lang="fr-FR" dirty="0"/>
+              <a:t> us to </a:t>
+            </a:r>
+            <a:r>
+              <a:rPr lang="fr-FR" dirty="0" err="1"/>
+              <a:t>create</a:t>
+            </a:r>
+            <a:r>
+              <a:rPr lang="fr-FR" dirty="0"/>
+              <a:t> </a:t>
+            </a:r>
+            <a:r>
+              <a:rPr lang="fr-FR" dirty="0" err="1"/>
+              <a:t>executable</a:t>
+            </a:r>
+            <a:r>
+              <a:rPr lang="fr-FR"/>
+              <a:t> for </a:t>
+            </a:r>
+            <a:r>
+              <a:rPr lang="fr-FR" dirty="0"/>
+              <a:t>all platforms</a:t>
+            </a:r>
+          </a:p>
+          <a:p>
             <a:endParaRPr lang="fr-FR" dirty="0"/>
           </a:p>
           <a:p>

</xml_diff>

<commit_message>
#12 Icons for duplicate scan added on solution slides
</commit_message>
<xml_diff>
--- a/SAI_presentation.pptx
+++ b/SAI_presentation.pptx
@@ -6942,7 +6942,7 @@
             <a:fld id="{B61BEF0D-F0BB-DE4B-95CE-6DB70DBA9567}" type="datetimeFigureOut">
               <a:rPr lang="en-US" dirty="0"/>
               <a:pPr/>
-              <a:t>3/22/2020</a:t>
+              <a:t>3/23/2020</a:t>
             </a:fld>
             <a:endParaRPr lang="en-US" dirty="0"/>
           </a:p>
@@ -7375,7 +7375,7 @@
             <a:fld id="{B61BEF0D-F0BB-DE4B-95CE-6DB70DBA9567}" type="datetimeFigureOut">
               <a:rPr lang="en-US" dirty="0"/>
               <a:pPr/>
-              <a:t>3/22/2020</a:t>
+              <a:t>3/23/2020</a:t>
             </a:fld>
             <a:endParaRPr lang="en-US" dirty="0"/>
           </a:p>
@@ -7622,7 +7622,7 @@
             <a:fld id="{B61BEF0D-F0BB-DE4B-95CE-6DB70DBA9567}" type="datetimeFigureOut">
               <a:rPr lang="en-US" dirty="0"/>
               <a:pPr/>
-              <a:t>3/22/2020</a:t>
+              <a:t>3/23/2020</a:t>
             </a:fld>
             <a:endParaRPr lang="en-US" dirty="0"/>
           </a:p>
@@ -7927,7 +7927,7 @@
             <a:fld id="{B61BEF0D-F0BB-DE4B-95CE-6DB70DBA9567}" type="datetimeFigureOut">
               <a:rPr lang="en-US" dirty="0"/>
               <a:pPr/>
-              <a:t>3/22/2020</a:t>
+              <a:t>3/23/2020</a:t>
             </a:fld>
             <a:endParaRPr lang="en-US" dirty="0"/>
           </a:p>
@@ -8242,7 +8242,7 @@
             <a:fld id="{B61BEF0D-F0BB-DE4B-95CE-6DB70DBA9567}" type="datetimeFigureOut">
               <a:rPr lang="en-US" dirty="0"/>
               <a:pPr/>
-              <a:t>3/22/2020</a:t>
+              <a:t>3/23/2020</a:t>
             </a:fld>
             <a:endParaRPr lang="en-US" dirty="0"/>
           </a:p>
@@ -8541,7 +8541,7 @@
             <a:fld id="{B61BEF0D-F0BB-DE4B-95CE-6DB70DBA9567}" type="datetimeFigureOut">
               <a:rPr lang="en-US" dirty="0"/>
               <a:pPr/>
-              <a:t>3/22/2020</a:t>
+              <a:t>3/23/2020</a:t>
             </a:fld>
             <a:endParaRPr lang="en-US" dirty="0"/>
           </a:p>
@@ -8905,7 +8905,7 @@
             <a:fld id="{B61BEF0D-F0BB-DE4B-95CE-6DB70DBA9567}" type="datetimeFigureOut">
               <a:rPr lang="en-US" dirty="0"/>
               <a:pPr/>
-              <a:t>3/22/2020</a:t>
+              <a:t>3/23/2020</a:t>
             </a:fld>
             <a:endParaRPr lang="en-US" dirty="0"/>
           </a:p>
@@ -9076,7 +9076,7 @@
             <a:fld id="{B61BEF0D-F0BB-DE4B-95CE-6DB70DBA9567}" type="datetimeFigureOut">
               <a:rPr lang="en-US" dirty="0"/>
               <a:pPr/>
-              <a:t>3/22/2020</a:t>
+              <a:t>3/23/2020</a:t>
             </a:fld>
             <a:endParaRPr lang="en-US" dirty="0"/>
           </a:p>
@@ -9253,7 +9253,7 @@
             <a:fld id="{B61BEF0D-F0BB-DE4B-95CE-6DB70DBA9567}" type="datetimeFigureOut">
               <a:rPr lang="en-US" dirty="0"/>
               <a:pPr/>
-              <a:t>3/22/2020</a:t>
+              <a:t>3/23/2020</a:t>
             </a:fld>
             <a:endParaRPr lang="en-US" dirty="0"/>
           </a:p>
@@ -9420,7 +9420,7 @@
             <a:fld id="{B61BEF0D-F0BB-DE4B-95CE-6DB70DBA9567}" type="datetimeFigureOut">
               <a:rPr lang="en-US" dirty="0"/>
               <a:pPr/>
-              <a:t>3/22/2020</a:t>
+              <a:t>3/23/2020</a:t>
             </a:fld>
             <a:endParaRPr lang="en-US" dirty="0"/>
           </a:p>
@@ -9667,7 +9667,7 @@
             <a:fld id="{B61BEF0D-F0BB-DE4B-95CE-6DB70DBA9567}" type="datetimeFigureOut">
               <a:rPr lang="en-US" dirty="0"/>
               <a:pPr/>
-              <a:t>3/22/2020</a:t>
+              <a:t>3/23/2020</a:t>
             </a:fld>
             <a:endParaRPr lang="en-US" dirty="0"/>
           </a:p>
@@ -9900,7 +9900,7 @@
             <a:fld id="{B61BEF0D-F0BB-DE4B-95CE-6DB70DBA9567}" type="datetimeFigureOut">
               <a:rPr lang="en-US" dirty="0"/>
               <a:pPr/>
-              <a:t>3/22/2020</a:t>
+              <a:t>3/23/2020</a:t>
             </a:fld>
             <a:endParaRPr lang="en-US" dirty="0"/>
           </a:p>
@@ -10279,7 +10279,7 @@
             <a:fld id="{B61BEF0D-F0BB-DE4B-95CE-6DB70DBA9567}" type="datetimeFigureOut">
               <a:rPr lang="en-US" dirty="0"/>
               <a:pPr/>
-              <a:t>3/22/2020</a:t>
+              <a:t>3/23/2020</a:t>
             </a:fld>
             <a:endParaRPr lang="en-US" dirty="0"/>
           </a:p>
@@ -10394,7 +10394,7 @@
             <a:fld id="{B61BEF0D-F0BB-DE4B-95CE-6DB70DBA9567}" type="datetimeFigureOut">
               <a:rPr lang="en-US" dirty="0"/>
               <a:pPr/>
-              <a:t>3/22/2020</a:t>
+              <a:t>3/23/2020</a:t>
             </a:fld>
             <a:endParaRPr lang="en-US" dirty="0"/>
           </a:p>
@@ -10486,7 +10486,7 @@
             <a:fld id="{B61BEF0D-F0BB-DE4B-95CE-6DB70DBA9567}" type="datetimeFigureOut">
               <a:rPr lang="en-US" dirty="0"/>
               <a:pPr/>
-              <a:t>3/22/2020</a:t>
+              <a:t>3/23/2020</a:t>
             </a:fld>
             <a:endParaRPr lang="en-US" dirty="0"/>
           </a:p>
@@ -10738,7 +10738,7 @@
             <a:fld id="{B61BEF0D-F0BB-DE4B-95CE-6DB70DBA9567}" type="datetimeFigureOut">
               <a:rPr lang="en-US" dirty="0"/>
               <a:pPr/>
-              <a:t>3/22/2020</a:t>
+              <a:t>3/23/2020</a:t>
             </a:fld>
             <a:endParaRPr lang="en-US" dirty="0"/>
           </a:p>
@@ -11018,7 +11018,7 @@
             <a:fld id="{B61BEF0D-F0BB-DE4B-95CE-6DB70DBA9567}" type="datetimeFigureOut">
               <a:rPr lang="en-US" dirty="0"/>
               <a:pPr/>
-              <a:t>3/22/2020</a:t>
+              <a:t>3/23/2020</a:t>
             </a:fld>
             <a:endParaRPr lang="en-US" dirty="0"/>
           </a:p>
@@ -11421,7 +11421,7 @@
             <a:fld id="{B61BEF0D-F0BB-DE4B-95CE-6DB70DBA9567}" type="datetimeFigureOut">
               <a:rPr lang="en-US" dirty="0"/>
               <a:pPr/>
-              <a:t>3/22/2020</a:t>
+              <a:t>3/23/2020</a:t>
             </a:fld>
             <a:endParaRPr lang="en-US" dirty="0"/>
           </a:p>
@@ -12303,58 +12303,6 @@
             </a:r>
             <a:r>
               <a:rPr lang="fr-FR" dirty="0" err="1"/>
-              <a:t>need</a:t>
-            </a:r>
-            <a:r>
-              <a:rPr lang="fr-FR" dirty="0"/>
-              <a:t> to </a:t>
-            </a:r>
-            <a:r>
-              <a:rPr lang="fr-FR" dirty="0" err="1"/>
-              <a:t>be</a:t>
-            </a:r>
-            <a:r>
-              <a:rPr lang="fr-FR" dirty="0"/>
-              <a:t> launch </a:t>
-            </a:r>
-            <a:r>
-              <a:rPr lang="fr-FR" dirty="0" err="1"/>
-              <a:t>everytime</a:t>
-            </a:r>
-            <a:r>
-              <a:rPr lang="fr-FR" dirty="0"/>
-              <a:t> the </a:t>
-            </a:r>
-            <a:r>
-              <a:rPr lang="fr-FR" b="1" dirty="0">
-                <a:solidFill>
-                  <a:srgbClr val="00B050"/>
-                </a:solidFill>
-              </a:rPr>
-              <a:t>computer</a:t>
-            </a:r>
-            <a:r>
-              <a:rPr lang="fr-FR" dirty="0"/>
-              <a:t> </a:t>
-            </a:r>
-            <a:r>
-              <a:rPr lang="fr-FR" dirty="0" err="1"/>
-              <a:t>is</a:t>
-            </a:r>
-            <a:r>
-              <a:rPr lang="fr-FR" dirty="0"/>
-              <a:t> up, </a:t>
-            </a:r>
-            <a:r>
-              <a:rPr lang="fr-FR" dirty="0" err="1"/>
-              <a:t>it</a:t>
-            </a:r>
-            <a:r>
-              <a:rPr lang="fr-FR" dirty="0"/>
-              <a:t> </a:t>
-            </a:r>
-            <a:r>
-              <a:rPr lang="fr-FR" dirty="0" err="1"/>
               <a:t>needs</a:t>
             </a:r>
             <a:r>
@@ -16481,6 +16429,78 @@
           </a:p>
         </p:txBody>
       </p:sp>
+      <p:pic>
+        <p:nvPicPr>
+          <p:cNvPr id="5" name="Graphique 4" descr="Image">
+            <a:extLst>
+              <a:ext uri="{FF2B5EF4-FFF2-40B4-BE49-F238E27FC236}">
+                <a16:creationId xmlns:a16="http://schemas.microsoft.com/office/drawing/2014/main" id="{968FBE39-CB06-48BC-AC2D-6A7704FE5BFE}"/>
+              </a:ext>
+            </a:extLst>
+          </p:cNvPr>
+          <p:cNvPicPr>
+            <a:picLocks noChangeAspect="1"/>
+          </p:cNvPicPr>
+          <p:nvPr/>
+        </p:nvPicPr>
+        <p:blipFill>
+          <a:blip r:embed="rId2">
+            <a:extLst>
+              <a:ext uri="{96DAC541-7B7A-43D3-8B79-37D633B846F1}">
+                <asvg:svgBlip xmlns:asvg="http://schemas.microsoft.com/office/drawing/2016/SVG/main" r:embed="rId3"/>
+              </a:ext>
+            </a:extLst>
+          </a:blip>
+          <a:stretch>
+            <a:fillRect/>
+          </a:stretch>
+        </p:blipFill>
+        <p:spPr>
+          <a:xfrm>
+            <a:off x="5638800" y="2971800"/>
+            <a:ext cx="914400" cy="914400"/>
+          </a:xfrm>
+          <a:prstGeom prst="rect">
+            <a:avLst/>
+          </a:prstGeom>
+        </p:spPr>
+      </p:pic>
+      <p:pic>
+        <p:nvPicPr>
+          <p:cNvPr id="6" name="Graphique 5" descr="Image">
+            <a:extLst>
+              <a:ext uri="{FF2B5EF4-FFF2-40B4-BE49-F238E27FC236}">
+                <a16:creationId xmlns:a16="http://schemas.microsoft.com/office/drawing/2014/main" id="{499067B6-F85E-4192-B447-A39FC3CCE1A9}"/>
+              </a:ext>
+            </a:extLst>
+          </p:cNvPr>
+          <p:cNvPicPr>
+            <a:picLocks noChangeAspect="1"/>
+          </p:cNvPicPr>
+          <p:nvPr/>
+        </p:nvPicPr>
+        <p:blipFill>
+          <a:blip r:embed="rId2">
+            <a:extLst>
+              <a:ext uri="{96DAC541-7B7A-43D3-8B79-37D633B846F1}">
+                <asvg:svgBlip xmlns:asvg="http://schemas.microsoft.com/office/drawing/2016/SVG/main" r:embed="rId3"/>
+              </a:ext>
+            </a:extLst>
+          </a:blip>
+          <a:stretch>
+            <a:fillRect/>
+          </a:stretch>
+        </p:blipFill>
+        <p:spPr>
+          <a:xfrm>
+            <a:off x="6553200" y="2971800"/>
+            <a:ext cx="914400" cy="914400"/>
+          </a:xfrm>
+          <a:prstGeom prst="rect">
+            <a:avLst/>
+          </a:prstGeom>
+        </p:spPr>
+      </p:pic>
     </p:spTree>
     <p:extLst>
       <p:ext uri="{BB962C8B-B14F-4D97-AF65-F5344CB8AC3E}">

</xml_diff>

<commit_message>
#12 Icons for strategy added on solution slides
</commit_message>
<xml_diff>
--- a/SAI_presentation.pptx
+++ b/SAI_presentation.pptx
@@ -16501,6 +16501,42 @@
           </a:prstGeom>
         </p:spPr>
       </p:pic>
+      <p:pic>
+        <p:nvPicPr>
+          <p:cNvPr id="7" name="Graphique 6" descr="Ampoule et engrenage">
+            <a:extLst>
+              <a:ext uri="{FF2B5EF4-FFF2-40B4-BE49-F238E27FC236}">
+                <a16:creationId xmlns:a16="http://schemas.microsoft.com/office/drawing/2014/main" id="{2C5EB943-2682-47ED-B5AE-17412C7C0BB4}"/>
+              </a:ext>
+            </a:extLst>
+          </p:cNvPr>
+          <p:cNvPicPr>
+            <a:picLocks noChangeAspect="1"/>
+          </p:cNvPicPr>
+          <p:nvPr/>
+        </p:nvPicPr>
+        <p:blipFill>
+          <a:blip r:embed="rId4">
+            <a:extLst>
+              <a:ext uri="{96DAC541-7B7A-43D3-8B79-37D633B846F1}">
+                <asvg:svgBlip xmlns:asvg="http://schemas.microsoft.com/office/drawing/2016/SVG/main" r:embed="rId5"/>
+              </a:ext>
+            </a:extLst>
+          </a:blip>
+          <a:stretch>
+            <a:fillRect/>
+          </a:stretch>
+        </p:blipFill>
+        <p:spPr>
+          <a:xfrm>
+            <a:off x="4344988" y="3429000"/>
+            <a:ext cx="914400" cy="914400"/>
+          </a:xfrm>
+          <a:prstGeom prst="rect">
+            <a:avLst/>
+          </a:prstGeom>
+        </p:spPr>
+      </p:pic>
     </p:spTree>
     <p:extLst>
       <p:ext uri="{BB962C8B-B14F-4D97-AF65-F5344CB8AC3E}">

</xml_diff>

<commit_message>
#12 Icon for sort added on solution slides
</commit_message>
<xml_diff>
--- a/SAI_presentation.pptx
+++ b/SAI_presentation.pptx
@@ -16317,8 +16317,12 @@
           <a:lstStyle/>
           <a:p>
             <a:r>
-              <a:rPr lang="fr-FR"/>
-              <a:t>Clean and Strategy</a:t>
+              <a:rPr lang="fr-FR" dirty="0"/>
+              <a:t>Clean and </a:t>
+            </a:r>
+            <a:r>
+              <a:rPr lang="fr-FR" dirty="0" err="1"/>
+              <a:t>Strategy</a:t>
             </a:r>
             <a:endParaRPr lang="en-GB" dirty="0"/>
           </a:p>
@@ -16377,15 +16381,7 @@
             </a:r>
             <a:r>
               <a:rPr lang="fr-FR" dirty="0"/>
-              <a:t> to </a:t>
-            </a:r>
-            <a:r>
-              <a:rPr lang="fr-FR" dirty="0" err="1"/>
-              <a:t>order</a:t>
-            </a:r>
-            <a:r>
-              <a:rPr lang="fr-FR" dirty="0"/>
-              <a:t> </a:t>
+              <a:t> to sort </a:t>
             </a:r>
             <a:r>
               <a:rPr lang="fr-FR" dirty="0" err="1"/>
@@ -16457,7 +16453,7 @@
         </p:blipFill>
         <p:spPr>
           <a:xfrm>
-            <a:off x="5638800" y="2971800"/>
+            <a:off x="6599382" y="1281545"/>
             <a:ext cx="914400" cy="914400"/>
           </a:xfrm>
           <a:prstGeom prst="rect">
@@ -16493,7 +16489,7 @@
         </p:blipFill>
         <p:spPr>
           <a:xfrm>
-            <a:off x="6553200" y="2971800"/>
+            <a:off x="7513782" y="1281545"/>
             <a:ext cx="914400" cy="914400"/>
           </a:xfrm>
           <a:prstGeom prst="rect">
@@ -16529,7 +16525,43 @@
         </p:blipFill>
         <p:spPr>
           <a:xfrm>
-            <a:off x="4344988" y="3429000"/>
+            <a:off x="7748588" y="2025841"/>
+            <a:ext cx="914400" cy="914400"/>
+          </a:xfrm>
+          <a:prstGeom prst="rect">
+            <a:avLst/>
+          </a:prstGeom>
+        </p:spPr>
+      </p:pic>
+      <p:pic>
+        <p:nvPicPr>
+          <p:cNvPr id="8" name="Graphique 7" descr="Graphique à barres avec tendance à la hausse">
+            <a:extLst>
+              <a:ext uri="{FF2B5EF4-FFF2-40B4-BE49-F238E27FC236}">
+                <a16:creationId xmlns:a16="http://schemas.microsoft.com/office/drawing/2014/main" id="{D2276499-F871-43C2-BC21-CCB9D531BA1E}"/>
+              </a:ext>
+            </a:extLst>
+          </p:cNvPr>
+          <p:cNvPicPr>
+            <a:picLocks noChangeAspect="1"/>
+          </p:cNvPicPr>
+          <p:nvPr/>
+        </p:nvPicPr>
+        <p:blipFill>
+          <a:blip r:embed="rId6">
+            <a:extLst>
+              <a:ext uri="{96DAC541-7B7A-43D3-8B79-37D633B846F1}">
+                <asvg:svgBlip xmlns:asvg="http://schemas.microsoft.com/office/drawing/2016/SVG/main" r:embed="rId7"/>
+              </a:ext>
+            </a:extLst>
+          </a:blip>
+          <a:stretch>
+            <a:fillRect/>
+          </a:stretch>
+        </p:blipFill>
+        <p:spPr>
+          <a:xfrm>
+            <a:off x="6599382" y="2116667"/>
             <a:ext cx="914400" cy="914400"/>
           </a:xfrm>
           <a:prstGeom prst="rect">

</xml_diff>

<commit_message>
#12 Icon for remove added on solution slides
</commit_message>
<xml_diff>
--- a/SAI_presentation.pptx
+++ b/SAI_presentation.pptx
@@ -6942,7 +6942,7 @@
             <a:fld id="{B61BEF0D-F0BB-DE4B-95CE-6DB70DBA9567}" type="datetimeFigureOut">
               <a:rPr lang="en-US" dirty="0"/>
               <a:pPr/>
-              <a:t>3/23/2020</a:t>
+              <a:t>3/24/2020</a:t>
             </a:fld>
             <a:endParaRPr lang="en-US" dirty="0"/>
           </a:p>
@@ -7375,7 +7375,7 @@
             <a:fld id="{B61BEF0D-F0BB-DE4B-95CE-6DB70DBA9567}" type="datetimeFigureOut">
               <a:rPr lang="en-US" dirty="0"/>
               <a:pPr/>
-              <a:t>3/23/2020</a:t>
+              <a:t>3/24/2020</a:t>
             </a:fld>
             <a:endParaRPr lang="en-US" dirty="0"/>
           </a:p>
@@ -7622,7 +7622,7 @@
             <a:fld id="{B61BEF0D-F0BB-DE4B-95CE-6DB70DBA9567}" type="datetimeFigureOut">
               <a:rPr lang="en-US" dirty="0"/>
               <a:pPr/>
-              <a:t>3/23/2020</a:t>
+              <a:t>3/24/2020</a:t>
             </a:fld>
             <a:endParaRPr lang="en-US" dirty="0"/>
           </a:p>
@@ -7927,7 +7927,7 @@
             <a:fld id="{B61BEF0D-F0BB-DE4B-95CE-6DB70DBA9567}" type="datetimeFigureOut">
               <a:rPr lang="en-US" dirty="0"/>
               <a:pPr/>
-              <a:t>3/23/2020</a:t>
+              <a:t>3/24/2020</a:t>
             </a:fld>
             <a:endParaRPr lang="en-US" dirty="0"/>
           </a:p>
@@ -8242,7 +8242,7 @@
             <a:fld id="{B61BEF0D-F0BB-DE4B-95CE-6DB70DBA9567}" type="datetimeFigureOut">
               <a:rPr lang="en-US" dirty="0"/>
               <a:pPr/>
-              <a:t>3/23/2020</a:t>
+              <a:t>3/24/2020</a:t>
             </a:fld>
             <a:endParaRPr lang="en-US" dirty="0"/>
           </a:p>
@@ -8541,7 +8541,7 @@
             <a:fld id="{B61BEF0D-F0BB-DE4B-95CE-6DB70DBA9567}" type="datetimeFigureOut">
               <a:rPr lang="en-US" dirty="0"/>
               <a:pPr/>
-              <a:t>3/23/2020</a:t>
+              <a:t>3/24/2020</a:t>
             </a:fld>
             <a:endParaRPr lang="en-US" dirty="0"/>
           </a:p>
@@ -8905,7 +8905,7 @@
             <a:fld id="{B61BEF0D-F0BB-DE4B-95CE-6DB70DBA9567}" type="datetimeFigureOut">
               <a:rPr lang="en-US" dirty="0"/>
               <a:pPr/>
-              <a:t>3/23/2020</a:t>
+              <a:t>3/24/2020</a:t>
             </a:fld>
             <a:endParaRPr lang="en-US" dirty="0"/>
           </a:p>
@@ -9076,7 +9076,7 @@
             <a:fld id="{B61BEF0D-F0BB-DE4B-95CE-6DB70DBA9567}" type="datetimeFigureOut">
               <a:rPr lang="en-US" dirty="0"/>
               <a:pPr/>
-              <a:t>3/23/2020</a:t>
+              <a:t>3/24/2020</a:t>
             </a:fld>
             <a:endParaRPr lang="en-US" dirty="0"/>
           </a:p>
@@ -9253,7 +9253,7 @@
             <a:fld id="{B61BEF0D-F0BB-DE4B-95CE-6DB70DBA9567}" type="datetimeFigureOut">
               <a:rPr lang="en-US" dirty="0"/>
               <a:pPr/>
-              <a:t>3/23/2020</a:t>
+              <a:t>3/24/2020</a:t>
             </a:fld>
             <a:endParaRPr lang="en-US" dirty="0"/>
           </a:p>
@@ -9420,7 +9420,7 @@
             <a:fld id="{B61BEF0D-F0BB-DE4B-95CE-6DB70DBA9567}" type="datetimeFigureOut">
               <a:rPr lang="en-US" dirty="0"/>
               <a:pPr/>
-              <a:t>3/23/2020</a:t>
+              <a:t>3/24/2020</a:t>
             </a:fld>
             <a:endParaRPr lang="en-US" dirty="0"/>
           </a:p>
@@ -9667,7 +9667,7 @@
             <a:fld id="{B61BEF0D-F0BB-DE4B-95CE-6DB70DBA9567}" type="datetimeFigureOut">
               <a:rPr lang="en-US" dirty="0"/>
               <a:pPr/>
-              <a:t>3/23/2020</a:t>
+              <a:t>3/24/2020</a:t>
             </a:fld>
             <a:endParaRPr lang="en-US" dirty="0"/>
           </a:p>
@@ -9900,7 +9900,7 @@
             <a:fld id="{B61BEF0D-F0BB-DE4B-95CE-6DB70DBA9567}" type="datetimeFigureOut">
               <a:rPr lang="en-US" dirty="0"/>
               <a:pPr/>
-              <a:t>3/23/2020</a:t>
+              <a:t>3/24/2020</a:t>
             </a:fld>
             <a:endParaRPr lang="en-US" dirty="0"/>
           </a:p>
@@ -10279,7 +10279,7 @@
             <a:fld id="{B61BEF0D-F0BB-DE4B-95CE-6DB70DBA9567}" type="datetimeFigureOut">
               <a:rPr lang="en-US" dirty="0"/>
               <a:pPr/>
-              <a:t>3/23/2020</a:t>
+              <a:t>3/24/2020</a:t>
             </a:fld>
             <a:endParaRPr lang="en-US" dirty="0"/>
           </a:p>
@@ -10394,7 +10394,7 @@
             <a:fld id="{B61BEF0D-F0BB-DE4B-95CE-6DB70DBA9567}" type="datetimeFigureOut">
               <a:rPr lang="en-US" dirty="0"/>
               <a:pPr/>
-              <a:t>3/23/2020</a:t>
+              <a:t>3/24/2020</a:t>
             </a:fld>
             <a:endParaRPr lang="en-US" dirty="0"/>
           </a:p>
@@ -10486,7 +10486,7 @@
             <a:fld id="{B61BEF0D-F0BB-DE4B-95CE-6DB70DBA9567}" type="datetimeFigureOut">
               <a:rPr lang="en-US" dirty="0"/>
               <a:pPr/>
-              <a:t>3/23/2020</a:t>
+              <a:t>3/24/2020</a:t>
             </a:fld>
             <a:endParaRPr lang="en-US" dirty="0"/>
           </a:p>
@@ -10738,7 +10738,7 @@
             <a:fld id="{B61BEF0D-F0BB-DE4B-95CE-6DB70DBA9567}" type="datetimeFigureOut">
               <a:rPr lang="en-US" dirty="0"/>
               <a:pPr/>
-              <a:t>3/23/2020</a:t>
+              <a:t>3/24/2020</a:t>
             </a:fld>
             <a:endParaRPr lang="en-US" dirty="0"/>
           </a:p>
@@ -11018,7 +11018,7 @@
             <a:fld id="{B61BEF0D-F0BB-DE4B-95CE-6DB70DBA9567}" type="datetimeFigureOut">
               <a:rPr lang="en-US" dirty="0"/>
               <a:pPr/>
-              <a:t>3/23/2020</a:t>
+              <a:t>3/24/2020</a:t>
             </a:fld>
             <a:endParaRPr lang="en-US" dirty="0"/>
           </a:p>
@@ -11421,7 +11421,7 @@
             <a:fld id="{B61BEF0D-F0BB-DE4B-95CE-6DB70DBA9567}" type="datetimeFigureOut">
               <a:rPr lang="en-US" dirty="0"/>
               <a:pPr/>
-              <a:t>3/23/2020</a:t>
+              <a:t>3/24/2020</a:t>
             </a:fld>
             <a:endParaRPr lang="en-US" dirty="0"/>
           </a:p>
@@ -16453,7 +16453,7 @@
         </p:blipFill>
         <p:spPr>
           <a:xfrm>
-            <a:off x="6599382" y="1281545"/>
+            <a:off x="7496961" y="1680584"/>
             <a:ext cx="914400" cy="914400"/>
           </a:xfrm>
           <a:prstGeom prst="rect">
@@ -16489,7 +16489,7 @@
         </p:blipFill>
         <p:spPr>
           <a:xfrm>
-            <a:off x="7513782" y="1281545"/>
+            <a:off x="8304212" y="1579033"/>
             <a:ext cx="914400" cy="914400"/>
           </a:xfrm>
           <a:prstGeom prst="rect">
@@ -16525,7 +16525,7 @@
         </p:blipFill>
         <p:spPr>
           <a:xfrm>
-            <a:off x="7748588" y="2025841"/>
+            <a:off x="8304212" y="3572932"/>
             <a:ext cx="914400" cy="914400"/>
           </a:xfrm>
           <a:prstGeom prst="rect">
@@ -16561,7 +16561,43 @@
         </p:blipFill>
         <p:spPr>
           <a:xfrm>
-            <a:off x="6599382" y="2116667"/>
+            <a:off x="5003186" y="3648433"/>
+            <a:ext cx="914400" cy="914400"/>
+          </a:xfrm>
+          <a:prstGeom prst="rect">
+            <a:avLst/>
+          </a:prstGeom>
+        </p:spPr>
+      </p:pic>
+      <p:pic>
+        <p:nvPicPr>
+          <p:cNvPr id="9" name="Graphique 8" descr="Fermer">
+            <a:extLst>
+              <a:ext uri="{FF2B5EF4-FFF2-40B4-BE49-F238E27FC236}">
+                <a16:creationId xmlns:a16="http://schemas.microsoft.com/office/drawing/2014/main" id="{DED7C00A-47A8-4804-8FC0-F396175C909F}"/>
+              </a:ext>
+            </a:extLst>
+          </p:cNvPr>
+          <p:cNvPicPr>
+            <a:picLocks noChangeAspect="1"/>
+          </p:cNvPicPr>
+          <p:nvPr/>
+        </p:nvPicPr>
+        <p:blipFill>
+          <a:blip r:embed="rId8">
+            <a:extLst>
+              <a:ext uri="{96DAC541-7B7A-43D3-8B79-37D633B846F1}">
+                <asvg:svgBlip xmlns:asvg="http://schemas.microsoft.com/office/drawing/2016/SVG/main" r:embed="rId9"/>
+              </a:ext>
+            </a:extLst>
+          </a:blip>
+          <a:stretch>
+            <a:fillRect/>
+          </a:stretch>
+        </p:blipFill>
+        <p:spPr>
+          <a:xfrm>
+            <a:off x="8304212" y="1591932"/>
             <a:ext cx="914400" cy="914400"/>
           </a:xfrm>
           <a:prstGeom prst="rect">

</xml_diff>

<commit_message>
#12 Icon positions updated on solution slides
</commit_message>
<xml_diff>
--- a/SAI_presentation.pptx
+++ b/SAI_presentation.pptx
@@ -16453,7 +16453,7 @@
         </p:blipFill>
         <p:spPr>
           <a:xfrm>
-            <a:off x="7496961" y="1680584"/>
+            <a:off x="6288946" y="1579033"/>
             <a:ext cx="914400" cy="914400"/>
           </a:xfrm>
           <a:prstGeom prst="rect">
@@ -16489,7 +16489,7 @@
         </p:blipFill>
         <p:spPr>
           <a:xfrm>
-            <a:off x="8304212" y="1579033"/>
+            <a:off x="9405078" y="1579033"/>
             <a:ext cx="914400" cy="914400"/>
           </a:xfrm>
           <a:prstGeom prst="rect">
@@ -16525,7 +16525,7 @@
         </p:blipFill>
         <p:spPr>
           <a:xfrm>
-            <a:off x="8304212" y="3572932"/>
+            <a:off x="9862278" y="3648433"/>
             <a:ext cx="914400" cy="914400"/>
           </a:xfrm>
           <a:prstGeom prst="rect">
@@ -16561,7 +16561,7 @@
         </p:blipFill>
         <p:spPr>
           <a:xfrm>
-            <a:off x="5003186" y="3648433"/>
+            <a:off x="6382179" y="3648433"/>
             <a:ext cx="914400" cy="914400"/>
           </a:xfrm>
           <a:prstGeom prst="rect">
@@ -16597,7 +16597,79 @@
         </p:blipFill>
         <p:spPr>
           <a:xfrm>
-            <a:off x="8304212" y="1591932"/>
+            <a:off x="9485504" y="1579033"/>
+            <a:ext cx="914400" cy="914400"/>
+          </a:xfrm>
+          <a:prstGeom prst="rect">
+            <a:avLst/>
+          </a:prstGeom>
+        </p:spPr>
+      </p:pic>
+      <p:pic>
+        <p:nvPicPr>
+          <p:cNvPr id="10" name="Graphique 9" descr="Image">
+            <a:extLst>
+              <a:ext uri="{FF2B5EF4-FFF2-40B4-BE49-F238E27FC236}">
+                <a16:creationId xmlns:a16="http://schemas.microsoft.com/office/drawing/2014/main" id="{E0EEB8D1-6BD2-4FE9-AFD2-F52BB00F889D}"/>
+              </a:ext>
+            </a:extLst>
+          </p:cNvPr>
+          <p:cNvPicPr>
+            <a:picLocks noChangeAspect="1"/>
+          </p:cNvPicPr>
+          <p:nvPr/>
+        </p:nvPicPr>
+        <p:blipFill>
+          <a:blip r:embed="rId2">
+            <a:extLst>
+              <a:ext uri="{96DAC541-7B7A-43D3-8B79-37D633B846F1}">
+                <asvg:svgBlip xmlns:asvg="http://schemas.microsoft.com/office/drawing/2016/SVG/main" r:embed="rId3"/>
+              </a:ext>
+            </a:extLst>
+          </a:blip>
+          <a:stretch>
+            <a:fillRect/>
+          </a:stretch>
+        </p:blipFill>
+        <p:spPr>
+          <a:xfrm>
+            <a:off x="6839379" y="2222498"/>
+            <a:ext cx="914400" cy="914400"/>
+          </a:xfrm>
+          <a:prstGeom prst="rect">
+            <a:avLst/>
+          </a:prstGeom>
+        </p:spPr>
+      </p:pic>
+      <p:pic>
+        <p:nvPicPr>
+          <p:cNvPr id="11" name="Graphique 10" descr="Image">
+            <a:extLst>
+              <a:ext uri="{FF2B5EF4-FFF2-40B4-BE49-F238E27FC236}">
+                <a16:creationId xmlns:a16="http://schemas.microsoft.com/office/drawing/2014/main" id="{FD44B111-44AE-4C90-982B-CAD2A774AEF5}"/>
+              </a:ext>
+            </a:extLst>
+          </p:cNvPr>
+          <p:cNvPicPr>
+            <a:picLocks noChangeAspect="1"/>
+          </p:cNvPicPr>
+          <p:nvPr/>
+        </p:nvPicPr>
+        <p:blipFill>
+          <a:blip r:embed="rId2">
+            <a:extLst>
+              <a:ext uri="{96DAC541-7B7A-43D3-8B79-37D633B846F1}">
+                <asvg:svgBlip xmlns:asvg="http://schemas.microsoft.com/office/drawing/2016/SVG/main" r:embed="rId3"/>
+              </a:ext>
+            </a:extLst>
+          </a:blip>
+          <a:stretch>
+            <a:fillRect/>
+          </a:stretch>
+        </p:blipFill>
+        <p:spPr>
+          <a:xfrm>
+            <a:off x="10023130" y="2316175"/>
             <a:ext cx="914400" cy="914400"/>
           </a:xfrm>
           <a:prstGeom prst="rect">

</xml_diff>

<commit_message>
#12 Icon colors added on solution slides
</commit_message>
<xml_diff>
--- a/SAI_presentation.pptx
+++ b/SAI_presentation.pptx
@@ -16362,12 +16362,24 @@
               <a:t> to </a:t>
             </a:r>
             <a:r>
-              <a:rPr lang="fr-FR" dirty="0" err="1"/>
+              <a:rPr lang="fr-FR" b="1" dirty="0" err="1">
+                <a:solidFill>
+                  <a:srgbClr val="FF0000"/>
+                </a:solidFill>
+              </a:rPr>
               <a:t>remove</a:t>
             </a:r>
             <a:r>
               <a:rPr lang="fr-FR" dirty="0"/>
-              <a:t> duplicate scan</a:t>
+              <a:t> </a:t>
+            </a:r>
+            <a:r>
+              <a:rPr lang="fr-FR" b="1" dirty="0">
+                <a:solidFill>
+                  <a:srgbClr val="FFFF00"/>
+                </a:solidFill>
+              </a:rPr>
+              <a:t>duplicate scan</a:t>
             </a:r>
           </a:p>
           <a:p>
@@ -16381,7 +16393,19 @@
             </a:r>
             <a:r>
               <a:rPr lang="fr-FR" dirty="0"/>
-              <a:t> to sort </a:t>
+              <a:t> to </a:t>
+            </a:r>
+            <a:r>
+              <a:rPr lang="fr-FR" b="1" dirty="0">
+                <a:solidFill>
+                  <a:srgbClr val="92D050"/>
+                </a:solidFill>
+              </a:rPr>
+              <a:t>sort</a:t>
+            </a:r>
+            <a:r>
+              <a:rPr lang="fr-FR" dirty="0"/>
+              <a:t> </a:t>
             </a:r>
             <a:r>
               <a:rPr lang="fr-FR" dirty="0" err="1"/>
@@ -16392,10 +16416,18 @@
               <a:t> by </a:t>
             </a:r>
             <a:r>
-              <a:rPr lang="fr-FR" dirty="0" err="1"/>
+              <a:rPr lang="fr-FR" b="1" dirty="0" err="1">
+                <a:solidFill>
+                  <a:srgbClr val="0070C0"/>
+                </a:solidFill>
+              </a:rPr>
               <a:t>strategie</a:t>
             </a:r>
-            <a:endParaRPr lang="fr-FR" dirty="0"/>
+            <a:endParaRPr lang="fr-FR" b="1" dirty="0">
+              <a:solidFill>
+                <a:srgbClr val="0070C0"/>
+              </a:solidFill>
+            </a:endParaRPr>
           </a:p>
           <a:p>
             <a:r>
@@ -16597,7 +16629,7 @@
         </p:blipFill>
         <p:spPr>
           <a:xfrm>
-            <a:off x="9485504" y="1579033"/>
+            <a:off x="9405078" y="1579033"/>
             <a:ext cx="914400" cy="914400"/>
           </a:xfrm>
           <a:prstGeom prst="rect">

</xml_diff>

<commit_message>
#12 Object positions updated on solution slides
</commit_message>
<xml_diff>
--- a/SAI_presentation.pptx
+++ b/SAI_presentation.pptx
@@ -6942,7 +6942,7 @@
             <a:fld id="{B61BEF0D-F0BB-DE4B-95CE-6DB70DBA9567}" type="datetimeFigureOut">
               <a:rPr lang="en-US" dirty="0"/>
               <a:pPr/>
-              <a:t>3/24/2020</a:t>
+              <a:t>3/25/2020</a:t>
             </a:fld>
             <a:endParaRPr lang="en-US" dirty="0"/>
           </a:p>
@@ -7375,7 +7375,7 @@
             <a:fld id="{B61BEF0D-F0BB-DE4B-95CE-6DB70DBA9567}" type="datetimeFigureOut">
               <a:rPr lang="en-US" dirty="0"/>
               <a:pPr/>
-              <a:t>3/24/2020</a:t>
+              <a:t>3/25/2020</a:t>
             </a:fld>
             <a:endParaRPr lang="en-US" dirty="0"/>
           </a:p>
@@ -7622,7 +7622,7 @@
             <a:fld id="{B61BEF0D-F0BB-DE4B-95CE-6DB70DBA9567}" type="datetimeFigureOut">
               <a:rPr lang="en-US" dirty="0"/>
               <a:pPr/>
-              <a:t>3/24/2020</a:t>
+              <a:t>3/25/2020</a:t>
             </a:fld>
             <a:endParaRPr lang="en-US" dirty="0"/>
           </a:p>
@@ -7927,7 +7927,7 @@
             <a:fld id="{B61BEF0D-F0BB-DE4B-95CE-6DB70DBA9567}" type="datetimeFigureOut">
               <a:rPr lang="en-US" dirty="0"/>
               <a:pPr/>
-              <a:t>3/24/2020</a:t>
+              <a:t>3/25/2020</a:t>
             </a:fld>
             <a:endParaRPr lang="en-US" dirty="0"/>
           </a:p>
@@ -8242,7 +8242,7 @@
             <a:fld id="{B61BEF0D-F0BB-DE4B-95CE-6DB70DBA9567}" type="datetimeFigureOut">
               <a:rPr lang="en-US" dirty="0"/>
               <a:pPr/>
-              <a:t>3/24/2020</a:t>
+              <a:t>3/25/2020</a:t>
             </a:fld>
             <a:endParaRPr lang="en-US" dirty="0"/>
           </a:p>
@@ -8541,7 +8541,7 @@
             <a:fld id="{B61BEF0D-F0BB-DE4B-95CE-6DB70DBA9567}" type="datetimeFigureOut">
               <a:rPr lang="en-US" dirty="0"/>
               <a:pPr/>
-              <a:t>3/24/2020</a:t>
+              <a:t>3/25/2020</a:t>
             </a:fld>
             <a:endParaRPr lang="en-US" dirty="0"/>
           </a:p>
@@ -8905,7 +8905,7 @@
             <a:fld id="{B61BEF0D-F0BB-DE4B-95CE-6DB70DBA9567}" type="datetimeFigureOut">
               <a:rPr lang="en-US" dirty="0"/>
               <a:pPr/>
-              <a:t>3/24/2020</a:t>
+              <a:t>3/25/2020</a:t>
             </a:fld>
             <a:endParaRPr lang="en-US" dirty="0"/>
           </a:p>
@@ -9076,7 +9076,7 @@
             <a:fld id="{B61BEF0D-F0BB-DE4B-95CE-6DB70DBA9567}" type="datetimeFigureOut">
               <a:rPr lang="en-US" dirty="0"/>
               <a:pPr/>
-              <a:t>3/24/2020</a:t>
+              <a:t>3/25/2020</a:t>
             </a:fld>
             <a:endParaRPr lang="en-US" dirty="0"/>
           </a:p>
@@ -9253,7 +9253,7 @@
             <a:fld id="{B61BEF0D-F0BB-DE4B-95CE-6DB70DBA9567}" type="datetimeFigureOut">
               <a:rPr lang="en-US" dirty="0"/>
               <a:pPr/>
-              <a:t>3/24/2020</a:t>
+              <a:t>3/25/2020</a:t>
             </a:fld>
             <a:endParaRPr lang="en-US" dirty="0"/>
           </a:p>
@@ -9420,7 +9420,7 @@
             <a:fld id="{B61BEF0D-F0BB-DE4B-95CE-6DB70DBA9567}" type="datetimeFigureOut">
               <a:rPr lang="en-US" dirty="0"/>
               <a:pPr/>
-              <a:t>3/24/2020</a:t>
+              <a:t>3/25/2020</a:t>
             </a:fld>
             <a:endParaRPr lang="en-US" dirty="0"/>
           </a:p>
@@ -9667,7 +9667,7 @@
             <a:fld id="{B61BEF0D-F0BB-DE4B-95CE-6DB70DBA9567}" type="datetimeFigureOut">
               <a:rPr lang="en-US" dirty="0"/>
               <a:pPr/>
-              <a:t>3/24/2020</a:t>
+              <a:t>3/25/2020</a:t>
             </a:fld>
             <a:endParaRPr lang="en-US" dirty="0"/>
           </a:p>
@@ -9900,7 +9900,7 @@
             <a:fld id="{B61BEF0D-F0BB-DE4B-95CE-6DB70DBA9567}" type="datetimeFigureOut">
               <a:rPr lang="en-US" dirty="0"/>
               <a:pPr/>
-              <a:t>3/24/2020</a:t>
+              <a:t>3/25/2020</a:t>
             </a:fld>
             <a:endParaRPr lang="en-US" dirty="0"/>
           </a:p>
@@ -10279,7 +10279,7 @@
             <a:fld id="{B61BEF0D-F0BB-DE4B-95CE-6DB70DBA9567}" type="datetimeFigureOut">
               <a:rPr lang="en-US" dirty="0"/>
               <a:pPr/>
-              <a:t>3/24/2020</a:t>
+              <a:t>3/25/2020</a:t>
             </a:fld>
             <a:endParaRPr lang="en-US" dirty="0"/>
           </a:p>
@@ -10394,7 +10394,7 @@
             <a:fld id="{B61BEF0D-F0BB-DE4B-95CE-6DB70DBA9567}" type="datetimeFigureOut">
               <a:rPr lang="en-US" dirty="0"/>
               <a:pPr/>
-              <a:t>3/24/2020</a:t>
+              <a:t>3/25/2020</a:t>
             </a:fld>
             <a:endParaRPr lang="en-US" dirty="0"/>
           </a:p>
@@ -10486,7 +10486,7 @@
             <a:fld id="{B61BEF0D-F0BB-DE4B-95CE-6DB70DBA9567}" type="datetimeFigureOut">
               <a:rPr lang="en-US" dirty="0"/>
               <a:pPr/>
-              <a:t>3/24/2020</a:t>
+              <a:t>3/25/2020</a:t>
             </a:fld>
             <a:endParaRPr lang="en-US" dirty="0"/>
           </a:p>
@@ -10738,7 +10738,7 @@
             <a:fld id="{B61BEF0D-F0BB-DE4B-95CE-6DB70DBA9567}" type="datetimeFigureOut">
               <a:rPr lang="en-US" dirty="0"/>
               <a:pPr/>
-              <a:t>3/24/2020</a:t>
+              <a:t>3/25/2020</a:t>
             </a:fld>
             <a:endParaRPr lang="en-US" dirty="0"/>
           </a:p>
@@ -11018,7 +11018,7 @@
             <a:fld id="{B61BEF0D-F0BB-DE4B-95CE-6DB70DBA9567}" type="datetimeFigureOut">
               <a:rPr lang="en-US" dirty="0"/>
               <a:pPr/>
-              <a:t>3/24/2020</a:t>
+              <a:t>3/25/2020</a:t>
             </a:fld>
             <a:endParaRPr lang="en-US" dirty="0"/>
           </a:p>
@@ -11421,7 +11421,7 @@
             <a:fld id="{B61BEF0D-F0BB-DE4B-95CE-6DB70DBA9567}" type="datetimeFigureOut">
               <a:rPr lang="en-US" dirty="0"/>
               <a:pPr/>
-              <a:t>3/24/2020</a:t>
+              <a:t>3/25/2020</a:t>
             </a:fld>
             <a:endParaRPr lang="en-US" dirty="0"/>
           </a:p>
@@ -16383,6 +16383,18 @@
             </a:r>
           </a:p>
           <a:p>
+            <a:endParaRPr lang="fr-FR" dirty="0"/>
+          </a:p>
+          <a:p>
+            <a:endParaRPr lang="fr-FR" dirty="0"/>
+          </a:p>
+          <a:p>
+            <a:endParaRPr lang="fr-FR" dirty="0"/>
+          </a:p>
+          <a:p>
+            <a:endParaRPr lang="fr-FR" dirty="0"/>
+          </a:p>
+          <a:p>
             <a:r>
               <a:rPr lang="fr-FR" dirty="0"/>
               <a:t>Method </a:t>
@@ -16428,29 +16440,6 @@
                 <a:srgbClr val="0070C0"/>
               </a:solidFill>
             </a:endParaRPr>
-          </a:p>
-          <a:p>
-            <a:r>
-              <a:rPr lang="fr-FR" dirty="0" err="1"/>
-              <a:t>Explain</a:t>
-            </a:r>
-            <a:r>
-              <a:rPr lang="fr-FR" dirty="0"/>
-              <a:t> </a:t>
-            </a:r>
-            <a:r>
-              <a:rPr lang="fr-FR" dirty="0" err="1"/>
-              <a:t>with</a:t>
-            </a:r>
-            <a:r>
-              <a:rPr lang="fr-FR" dirty="0"/>
-              <a:t> a </a:t>
-            </a:r>
-            <a:r>
-              <a:rPr lang="fr-FR" dirty="0" err="1"/>
-              <a:t>schema</a:t>
-            </a:r>
-            <a:endParaRPr lang="fr-FR" dirty="0"/>
           </a:p>
           <a:p>
             <a:endParaRPr lang="en-GB" dirty="0"/>
@@ -16485,7 +16474,7 @@
         </p:blipFill>
         <p:spPr>
           <a:xfrm>
-            <a:off x="6288946" y="1579033"/>
+            <a:off x="3562395" y="1395835"/>
             <a:ext cx="914400" cy="914400"/>
           </a:xfrm>
           <a:prstGeom prst="rect">
@@ -16521,7 +16510,7 @@
         </p:blipFill>
         <p:spPr>
           <a:xfrm>
-            <a:off x="9405078" y="1579033"/>
+            <a:off x="6678527" y="1395835"/>
             <a:ext cx="914400" cy="914400"/>
           </a:xfrm>
           <a:prstGeom prst="rect">
@@ -16557,7 +16546,7 @@
         </p:blipFill>
         <p:spPr>
           <a:xfrm>
-            <a:off x="9862278" y="3648433"/>
+            <a:off x="7042494" y="3904301"/>
             <a:ext cx="914400" cy="914400"/>
           </a:xfrm>
           <a:prstGeom prst="rect">
@@ -16593,7 +16582,7 @@
         </p:blipFill>
         <p:spPr>
           <a:xfrm>
-            <a:off x="6382179" y="3648433"/>
+            <a:off x="3562395" y="3904301"/>
             <a:ext cx="914400" cy="914400"/>
           </a:xfrm>
           <a:prstGeom prst="rect">
@@ -16629,7 +16618,7 @@
         </p:blipFill>
         <p:spPr>
           <a:xfrm>
-            <a:off x="9405078" y="1579033"/>
+            <a:off x="6678527" y="1395835"/>
             <a:ext cx="914400" cy="914400"/>
           </a:xfrm>
           <a:prstGeom prst="rect">
@@ -16665,7 +16654,7 @@
         </p:blipFill>
         <p:spPr>
           <a:xfrm>
-            <a:off x="6839379" y="2222498"/>
+            <a:off x="4112828" y="2039300"/>
             <a:ext cx="914400" cy="914400"/>
           </a:xfrm>
           <a:prstGeom prst="rect">
@@ -16701,7 +16690,7 @@
         </p:blipFill>
         <p:spPr>
           <a:xfrm>
-            <a:off x="10023130" y="2316175"/>
+            <a:off x="7296579" y="2132977"/>
             <a:ext cx="914400" cy="914400"/>
           </a:xfrm>
           <a:prstGeom prst="rect">

</xml_diff>

<commit_message>
#12 Arrows added on clean and strategy on solution slides
</commit_message>
<xml_diff>
--- a/SAI_presentation.pptx
+++ b/SAI_presentation.pptx
@@ -16698,6 +16698,98 @@
           </a:prstGeom>
         </p:spPr>
       </p:pic>
+      <p:sp>
+        <p:nvSpPr>
+          <p:cNvPr id="4" name="Flèche : droite 3">
+            <a:extLst>
+              <a:ext uri="{FF2B5EF4-FFF2-40B4-BE49-F238E27FC236}">
+                <a16:creationId xmlns:a16="http://schemas.microsoft.com/office/drawing/2014/main" id="{15B9DAC4-2F64-421C-B7E8-D72F0180FF28}"/>
+              </a:ext>
+            </a:extLst>
+          </p:cNvPr>
+          <p:cNvSpPr/>
+          <p:nvPr/>
+        </p:nvSpPr>
+        <p:spPr>
+          <a:xfrm>
+            <a:off x="5285064" y="1921079"/>
+            <a:ext cx="1182848" cy="545284"/>
+          </a:xfrm>
+          <a:prstGeom prst="rightArrow">
+            <a:avLst/>
+          </a:prstGeom>
+        </p:spPr>
+        <p:style>
+          <a:lnRef idx="2">
+            <a:schemeClr val="accent1">
+              <a:shade val="50000"/>
+            </a:schemeClr>
+          </a:lnRef>
+          <a:fillRef idx="1">
+            <a:schemeClr val="accent1"/>
+          </a:fillRef>
+          <a:effectRef idx="0">
+            <a:schemeClr val="accent1"/>
+          </a:effectRef>
+          <a:fontRef idx="minor">
+            <a:schemeClr val="lt1"/>
+          </a:fontRef>
+        </p:style>
+        <p:txBody>
+          <a:bodyPr rtlCol="0" anchor="ctr"/>
+          <a:lstStyle/>
+          <a:p>
+            <a:pPr algn="ctr"/>
+            <a:endParaRPr lang="en-GB"/>
+          </a:p>
+        </p:txBody>
+      </p:sp>
+      <p:sp>
+        <p:nvSpPr>
+          <p:cNvPr id="12" name="Flèche : droite 11">
+            <a:extLst>
+              <a:ext uri="{FF2B5EF4-FFF2-40B4-BE49-F238E27FC236}">
+                <a16:creationId xmlns:a16="http://schemas.microsoft.com/office/drawing/2014/main" id="{D0030319-3B40-4CFB-BCC6-30C1AE788EBF}"/>
+              </a:ext>
+            </a:extLst>
+          </p:cNvPr>
+          <p:cNvSpPr/>
+          <p:nvPr/>
+        </p:nvSpPr>
+        <p:spPr>
+          <a:xfrm>
+            <a:off x="5149507" y="4088859"/>
+            <a:ext cx="1182848" cy="545284"/>
+          </a:xfrm>
+          <a:prstGeom prst="rightArrow">
+            <a:avLst/>
+          </a:prstGeom>
+        </p:spPr>
+        <p:style>
+          <a:lnRef idx="2">
+            <a:schemeClr val="accent1">
+              <a:shade val="50000"/>
+            </a:schemeClr>
+          </a:lnRef>
+          <a:fillRef idx="1">
+            <a:schemeClr val="accent1"/>
+          </a:fillRef>
+          <a:effectRef idx="0">
+            <a:schemeClr val="accent1"/>
+          </a:effectRef>
+          <a:fontRef idx="minor">
+            <a:schemeClr val="lt1"/>
+          </a:fontRef>
+        </p:style>
+        <p:txBody>
+          <a:bodyPr rtlCol="0" anchor="ctr"/>
+          <a:lstStyle/>
+          <a:p>
+            <a:pPr algn="ctr"/>
+            <a:endParaRPr lang="en-GB"/>
+          </a:p>
+        </p:txBody>
+      </p:sp>
     </p:spTree>
     <p:extLst>
       <p:ext uri="{BB962C8B-B14F-4D97-AF65-F5344CB8AC3E}">

</xml_diff>

<commit_message>
#12 Method used added on clean and strategy on solution slides
</commit_message>
<xml_diff>
--- a/SAI_presentation.pptx
+++ b/SAI_presentation.pptx
@@ -16433,7 +16433,7 @@
                   <a:srgbClr val="0070C0"/>
                 </a:solidFill>
               </a:rPr>
-              <a:t>strategie</a:t>
+              <a:t>strategy</a:t>
             </a:r>
             <a:endParaRPr lang="fr-FR" b="1" dirty="0">
               <a:solidFill>
@@ -16718,6 +16718,14 @@
           <a:prstGeom prst="rightArrow">
             <a:avLst/>
           </a:prstGeom>
+          <a:solidFill>
+            <a:srgbClr val="00B0F0"/>
+          </a:solidFill>
+          <a:ln>
+            <a:solidFill>
+              <a:srgbClr val="00B0F0"/>
+            </a:solidFill>
+          </a:ln>
         </p:spPr>
         <p:style>
           <a:lnRef idx="2">
@@ -16740,7 +16748,7 @@
           <a:lstStyle/>
           <a:p>
             <a:pPr algn="ctr"/>
-            <a:endParaRPr lang="en-GB"/>
+            <a:endParaRPr lang="en-GB" sz="1600" dirty="0"/>
           </a:p>
         </p:txBody>
       </p:sp>
@@ -16764,6 +16772,14 @@
           <a:prstGeom prst="rightArrow">
             <a:avLst/>
           </a:prstGeom>
+          <a:solidFill>
+            <a:srgbClr val="00B0F0"/>
+          </a:solidFill>
+          <a:ln>
+            <a:solidFill>
+              <a:srgbClr val="00B0F0"/>
+            </a:solidFill>
+          </a:ln>
         </p:spPr>
         <p:style>
           <a:lnRef idx="2">
@@ -16786,7 +16802,91 @@
           <a:lstStyle/>
           <a:p>
             <a:pPr algn="ctr"/>
-            <a:endParaRPr lang="en-GB"/>
+            <a:endParaRPr lang="en-GB" sz="1600" dirty="0"/>
+          </a:p>
+          <a:p>
+            <a:pPr algn="ctr"/>
+            <a:endParaRPr lang="en-GB" sz="1600" dirty="0"/>
+          </a:p>
+        </p:txBody>
+      </p:sp>
+      <p:sp>
+        <p:nvSpPr>
+          <p:cNvPr id="13" name="ZoneTexte 12">
+            <a:extLst>
+              <a:ext uri="{FF2B5EF4-FFF2-40B4-BE49-F238E27FC236}">
+                <a16:creationId xmlns:a16="http://schemas.microsoft.com/office/drawing/2014/main" id="{F2AB9910-13B1-48E0-883D-6F78AE207280}"/>
+              </a:ext>
+            </a:extLst>
+          </p:cNvPr>
+          <p:cNvSpPr txBox="1"/>
+          <p:nvPr/>
+        </p:nvSpPr>
+        <p:spPr>
+          <a:xfrm>
+            <a:off x="4895422" y="2388441"/>
+            <a:ext cx="2707905" cy="369332"/>
+          </a:xfrm>
+          <a:prstGeom prst="rect">
+            <a:avLst/>
+          </a:prstGeom>
+          <a:noFill/>
+        </p:spPr>
+        <p:txBody>
+          <a:bodyPr wrap="square" rtlCol="0">
+            <a:spAutoFit/>
+          </a:bodyPr>
+          <a:lstStyle/>
+          <a:p>
+            <a:r>
+              <a:rPr lang="fr-FR" dirty="0" err="1"/>
+              <a:t>removeDuplicate</a:t>
+            </a:r>
+            <a:r>
+              <a:rPr lang="fr-FR" dirty="0"/>
+              <a:t>()</a:t>
+            </a:r>
+            <a:endParaRPr lang="en-GB" dirty="0"/>
+          </a:p>
+        </p:txBody>
+      </p:sp>
+      <p:sp>
+        <p:nvSpPr>
+          <p:cNvPr id="14" name="ZoneTexte 13">
+            <a:extLst>
+              <a:ext uri="{FF2B5EF4-FFF2-40B4-BE49-F238E27FC236}">
+                <a16:creationId xmlns:a16="http://schemas.microsoft.com/office/drawing/2014/main" id="{307E060C-C11A-4EB9-92E1-29598398EAE6}"/>
+              </a:ext>
+            </a:extLst>
+          </p:cNvPr>
+          <p:cNvSpPr txBox="1"/>
+          <p:nvPr/>
+        </p:nvSpPr>
+        <p:spPr>
+          <a:xfrm>
+            <a:off x="5027228" y="4575200"/>
+            <a:ext cx="2327750" cy="369332"/>
+          </a:xfrm>
+          <a:prstGeom prst="rect">
+            <a:avLst/>
+          </a:prstGeom>
+          <a:noFill/>
+        </p:spPr>
+        <p:txBody>
+          <a:bodyPr wrap="square" rtlCol="0">
+            <a:spAutoFit/>
+          </a:bodyPr>
+          <a:lstStyle/>
+          <a:p>
+            <a:r>
+              <a:rPr lang="fr-FR" dirty="0" err="1"/>
+              <a:t>sortStrategy</a:t>
+            </a:r>
+            <a:r>
+              <a:rPr lang="fr-FR" dirty="0"/>
+              <a:t>()</a:t>
+            </a:r>
+            <a:endParaRPr lang="en-GB" dirty="0"/>
           </a:p>
         </p:txBody>
       </p:sp>

</xml_diff>

<commit_message>
#12 Icon images added on clean and strategy on solution slides
</commit_message>
<xml_diff>
--- a/SAI_presentation.pptx
+++ b/SAI_presentation.pptx
@@ -6942,7 +6942,7 @@
             <a:fld id="{B61BEF0D-F0BB-DE4B-95CE-6DB70DBA9567}" type="datetimeFigureOut">
               <a:rPr lang="en-US" dirty="0"/>
               <a:pPr/>
-              <a:t>3/25/2020</a:t>
+              <a:t>3/26/2020</a:t>
             </a:fld>
             <a:endParaRPr lang="en-US" dirty="0"/>
           </a:p>
@@ -7375,7 +7375,7 @@
             <a:fld id="{B61BEF0D-F0BB-DE4B-95CE-6DB70DBA9567}" type="datetimeFigureOut">
               <a:rPr lang="en-US" dirty="0"/>
               <a:pPr/>
-              <a:t>3/25/2020</a:t>
+              <a:t>3/26/2020</a:t>
             </a:fld>
             <a:endParaRPr lang="en-US" dirty="0"/>
           </a:p>
@@ -7622,7 +7622,7 @@
             <a:fld id="{B61BEF0D-F0BB-DE4B-95CE-6DB70DBA9567}" type="datetimeFigureOut">
               <a:rPr lang="en-US" dirty="0"/>
               <a:pPr/>
-              <a:t>3/25/2020</a:t>
+              <a:t>3/26/2020</a:t>
             </a:fld>
             <a:endParaRPr lang="en-US" dirty="0"/>
           </a:p>
@@ -7927,7 +7927,7 @@
             <a:fld id="{B61BEF0D-F0BB-DE4B-95CE-6DB70DBA9567}" type="datetimeFigureOut">
               <a:rPr lang="en-US" dirty="0"/>
               <a:pPr/>
-              <a:t>3/25/2020</a:t>
+              <a:t>3/26/2020</a:t>
             </a:fld>
             <a:endParaRPr lang="en-US" dirty="0"/>
           </a:p>
@@ -8242,7 +8242,7 @@
             <a:fld id="{B61BEF0D-F0BB-DE4B-95CE-6DB70DBA9567}" type="datetimeFigureOut">
               <a:rPr lang="en-US" dirty="0"/>
               <a:pPr/>
-              <a:t>3/25/2020</a:t>
+              <a:t>3/26/2020</a:t>
             </a:fld>
             <a:endParaRPr lang="en-US" dirty="0"/>
           </a:p>
@@ -8541,7 +8541,7 @@
             <a:fld id="{B61BEF0D-F0BB-DE4B-95CE-6DB70DBA9567}" type="datetimeFigureOut">
               <a:rPr lang="en-US" dirty="0"/>
               <a:pPr/>
-              <a:t>3/25/2020</a:t>
+              <a:t>3/26/2020</a:t>
             </a:fld>
             <a:endParaRPr lang="en-US" dirty="0"/>
           </a:p>
@@ -8905,7 +8905,7 @@
             <a:fld id="{B61BEF0D-F0BB-DE4B-95CE-6DB70DBA9567}" type="datetimeFigureOut">
               <a:rPr lang="en-US" dirty="0"/>
               <a:pPr/>
-              <a:t>3/25/2020</a:t>
+              <a:t>3/26/2020</a:t>
             </a:fld>
             <a:endParaRPr lang="en-US" dirty="0"/>
           </a:p>
@@ -9076,7 +9076,7 @@
             <a:fld id="{B61BEF0D-F0BB-DE4B-95CE-6DB70DBA9567}" type="datetimeFigureOut">
               <a:rPr lang="en-US" dirty="0"/>
               <a:pPr/>
-              <a:t>3/25/2020</a:t>
+              <a:t>3/26/2020</a:t>
             </a:fld>
             <a:endParaRPr lang="en-US" dirty="0"/>
           </a:p>
@@ -9253,7 +9253,7 @@
             <a:fld id="{B61BEF0D-F0BB-DE4B-95CE-6DB70DBA9567}" type="datetimeFigureOut">
               <a:rPr lang="en-US" dirty="0"/>
               <a:pPr/>
-              <a:t>3/25/2020</a:t>
+              <a:t>3/26/2020</a:t>
             </a:fld>
             <a:endParaRPr lang="en-US" dirty="0"/>
           </a:p>
@@ -9420,7 +9420,7 @@
             <a:fld id="{B61BEF0D-F0BB-DE4B-95CE-6DB70DBA9567}" type="datetimeFigureOut">
               <a:rPr lang="en-US" dirty="0"/>
               <a:pPr/>
-              <a:t>3/25/2020</a:t>
+              <a:t>3/26/2020</a:t>
             </a:fld>
             <a:endParaRPr lang="en-US" dirty="0"/>
           </a:p>
@@ -9667,7 +9667,7 @@
             <a:fld id="{B61BEF0D-F0BB-DE4B-95CE-6DB70DBA9567}" type="datetimeFigureOut">
               <a:rPr lang="en-US" dirty="0"/>
               <a:pPr/>
-              <a:t>3/25/2020</a:t>
+              <a:t>3/26/2020</a:t>
             </a:fld>
             <a:endParaRPr lang="en-US" dirty="0"/>
           </a:p>
@@ -9900,7 +9900,7 @@
             <a:fld id="{B61BEF0D-F0BB-DE4B-95CE-6DB70DBA9567}" type="datetimeFigureOut">
               <a:rPr lang="en-US" dirty="0"/>
               <a:pPr/>
-              <a:t>3/25/2020</a:t>
+              <a:t>3/26/2020</a:t>
             </a:fld>
             <a:endParaRPr lang="en-US" dirty="0"/>
           </a:p>
@@ -10279,7 +10279,7 @@
             <a:fld id="{B61BEF0D-F0BB-DE4B-95CE-6DB70DBA9567}" type="datetimeFigureOut">
               <a:rPr lang="en-US" dirty="0"/>
               <a:pPr/>
-              <a:t>3/25/2020</a:t>
+              <a:t>3/26/2020</a:t>
             </a:fld>
             <a:endParaRPr lang="en-US" dirty="0"/>
           </a:p>
@@ -10394,7 +10394,7 @@
             <a:fld id="{B61BEF0D-F0BB-DE4B-95CE-6DB70DBA9567}" type="datetimeFigureOut">
               <a:rPr lang="en-US" dirty="0"/>
               <a:pPr/>
-              <a:t>3/25/2020</a:t>
+              <a:t>3/26/2020</a:t>
             </a:fld>
             <a:endParaRPr lang="en-US" dirty="0"/>
           </a:p>
@@ -10486,7 +10486,7 @@
             <a:fld id="{B61BEF0D-F0BB-DE4B-95CE-6DB70DBA9567}" type="datetimeFigureOut">
               <a:rPr lang="en-US" dirty="0"/>
               <a:pPr/>
-              <a:t>3/25/2020</a:t>
+              <a:t>3/26/2020</a:t>
             </a:fld>
             <a:endParaRPr lang="en-US" dirty="0"/>
           </a:p>
@@ -10738,7 +10738,7 @@
             <a:fld id="{B61BEF0D-F0BB-DE4B-95CE-6DB70DBA9567}" type="datetimeFigureOut">
               <a:rPr lang="en-US" dirty="0"/>
               <a:pPr/>
-              <a:t>3/25/2020</a:t>
+              <a:t>3/26/2020</a:t>
             </a:fld>
             <a:endParaRPr lang="en-US" dirty="0"/>
           </a:p>
@@ -11018,7 +11018,7 @@
             <a:fld id="{B61BEF0D-F0BB-DE4B-95CE-6DB70DBA9567}" type="datetimeFigureOut">
               <a:rPr lang="en-US" dirty="0"/>
               <a:pPr/>
-              <a:t>3/25/2020</a:t>
+              <a:t>3/26/2020</a:t>
             </a:fld>
             <a:endParaRPr lang="en-US" dirty="0"/>
           </a:p>
@@ -11421,7 +11421,7 @@
             <a:fld id="{B61BEF0D-F0BB-DE4B-95CE-6DB70DBA9567}" type="datetimeFigureOut">
               <a:rPr lang="en-US" dirty="0"/>
               <a:pPr/>
-              <a:t>3/25/2020</a:t>
+              <a:t>3/26/2020</a:t>
             </a:fld>
             <a:endParaRPr lang="en-US" dirty="0"/>
           </a:p>
@@ -17069,6 +17069,78 @@
           </a:p>
         </p:txBody>
       </p:sp>
+      <p:pic>
+        <p:nvPicPr>
+          <p:cNvPr id="4" name="Graphique 3" descr="Image">
+            <a:extLst>
+              <a:ext uri="{FF2B5EF4-FFF2-40B4-BE49-F238E27FC236}">
+                <a16:creationId xmlns:a16="http://schemas.microsoft.com/office/drawing/2014/main" id="{D7D2B978-C28D-4159-B7C9-152EA3E76EDE}"/>
+              </a:ext>
+            </a:extLst>
+          </p:cNvPr>
+          <p:cNvPicPr>
+            <a:picLocks noChangeAspect="1"/>
+          </p:cNvPicPr>
+          <p:nvPr/>
+        </p:nvPicPr>
+        <p:blipFill>
+          <a:blip r:embed="rId2">
+            <a:extLst>
+              <a:ext uri="{96DAC541-7B7A-43D3-8B79-37D633B846F1}">
+                <asvg:svgBlip xmlns:asvg="http://schemas.microsoft.com/office/drawing/2016/SVG/main" r:embed="rId3"/>
+              </a:ext>
+            </a:extLst>
+          </a:blip>
+          <a:stretch>
+            <a:fillRect/>
+          </a:stretch>
+        </p:blipFill>
+        <p:spPr>
+          <a:xfrm>
+            <a:off x="1862904" y="3158067"/>
+            <a:ext cx="914400" cy="914400"/>
+          </a:xfrm>
+          <a:prstGeom prst="rect">
+            <a:avLst/>
+          </a:prstGeom>
+        </p:spPr>
+      </p:pic>
+      <p:pic>
+        <p:nvPicPr>
+          <p:cNvPr id="5" name="Graphique 4" descr="Image">
+            <a:extLst>
+              <a:ext uri="{FF2B5EF4-FFF2-40B4-BE49-F238E27FC236}">
+                <a16:creationId xmlns:a16="http://schemas.microsoft.com/office/drawing/2014/main" id="{0B7047A4-FBC2-4D6F-A1F9-E195E39B6875}"/>
+              </a:ext>
+            </a:extLst>
+          </p:cNvPr>
+          <p:cNvPicPr>
+            <a:picLocks noChangeAspect="1"/>
+          </p:cNvPicPr>
+          <p:nvPr/>
+        </p:nvPicPr>
+        <p:blipFill>
+          <a:blip r:embed="rId2">
+            <a:extLst>
+              <a:ext uri="{96DAC541-7B7A-43D3-8B79-37D633B846F1}">
+                <asvg:svgBlip xmlns:asvg="http://schemas.microsoft.com/office/drawing/2016/SVG/main" r:embed="rId3"/>
+              </a:ext>
+            </a:extLst>
+          </a:blip>
+          <a:stretch>
+            <a:fillRect/>
+          </a:stretch>
+        </p:blipFill>
+        <p:spPr>
+          <a:xfrm>
+            <a:off x="2413337" y="3801532"/>
+            <a:ext cx="914400" cy="914400"/>
+          </a:xfrm>
+          <a:prstGeom prst="rect">
+            <a:avLst/>
+          </a:prstGeom>
+        </p:spPr>
+      </p:pic>
     </p:spTree>
     <p:extLst>
       <p:ext uri="{BB962C8B-B14F-4D97-AF65-F5344CB8AC3E}">

</xml_diff>

<commit_message>
#12 Icon strategy added on clean and strategy on solution slides
</commit_message>
<xml_diff>
--- a/SAI_presentation.pptx
+++ b/SAI_presentation.pptx
@@ -17141,6 +17141,42 @@
           </a:prstGeom>
         </p:spPr>
       </p:pic>
+      <p:pic>
+        <p:nvPicPr>
+          <p:cNvPr id="6" name="Graphique 5" descr="Ampoule et engrenage">
+            <a:extLst>
+              <a:ext uri="{FF2B5EF4-FFF2-40B4-BE49-F238E27FC236}">
+                <a16:creationId xmlns:a16="http://schemas.microsoft.com/office/drawing/2014/main" id="{95AC170B-FCFE-4FD8-861B-848ED4E54BBA}"/>
+              </a:ext>
+            </a:extLst>
+          </p:cNvPr>
+          <p:cNvPicPr>
+            <a:picLocks noChangeAspect="1"/>
+          </p:cNvPicPr>
+          <p:nvPr/>
+        </p:nvPicPr>
+        <p:blipFill>
+          <a:blip r:embed="rId4">
+            <a:extLst>
+              <a:ext uri="{96DAC541-7B7A-43D3-8B79-37D633B846F1}">
+                <asvg:svgBlip xmlns:asvg="http://schemas.microsoft.com/office/drawing/2016/SVG/main" r:embed="rId5"/>
+              </a:ext>
+            </a:extLst>
+          </a:blip>
+          <a:stretch>
+            <a:fillRect/>
+          </a:stretch>
+        </p:blipFill>
+        <p:spPr>
+          <a:xfrm>
+            <a:off x="4494212" y="3386667"/>
+            <a:ext cx="914400" cy="914400"/>
+          </a:xfrm>
+          <a:prstGeom prst="rect">
+            <a:avLst/>
+          </a:prstGeom>
+        </p:spPr>
+      </p:pic>
     </p:spTree>
     <p:extLst>
       <p:ext uri="{BB962C8B-B14F-4D97-AF65-F5344CB8AC3E}">

</xml_diff>

<commit_message>
#12 Icon threshold added on clean and strategy on solution slides
</commit_message>
<xml_diff>
--- a/SAI_presentation.pptx
+++ b/SAI_presentation.pptx
@@ -17177,6 +17177,53 @@
           </a:prstGeom>
         </p:spPr>
       </p:pic>
+      <p:pic>
+        <p:nvPicPr>
+          <p:cNvPr id="1026" name="Picture 2" descr="RÃ©sultat de recherche d'images pour &quot;threshold icon png&quot;">
+            <a:extLst>
+              <a:ext uri="{FF2B5EF4-FFF2-40B4-BE49-F238E27FC236}">
+                <a16:creationId xmlns:a16="http://schemas.microsoft.com/office/drawing/2014/main" id="{FEE79BD3-EEDB-4A25-AFE0-9C677A9DA565}"/>
+              </a:ext>
+            </a:extLst>
+          </p:cNvPr>
+          <p:cNvPicPr>
+            <a:picLocks noChangeAspect="1" noChangeArrowheads="1"/>
+          </p:cNvPicPr>
+          <p:nvPr/>
+        </p:nvPicPr>
+        <p:blipFill>
+          <a:blip r:embed="rId6">
+            <a:extLst>
+              <a:ext uri="{28A0092B-C50C-407E-A947-70E740481C1C}">
+                <a14:useLocalDpi xmlns:a14="http://schemas.microsoft.com/office/drawing/2010/main" val="0"/>
+              </a:ext>
+            </a:extLst>
+          </a:blip>
+          <a:srcRect/>
+          <a:stretch>
+            <a:fillRect/>
+          </a:stretch>
+        </p:blipFill>
+        <p:spPr bwMode="auto">
+          <a:xfrm>
+            <a:off x="5986653" y="3255433"/>
+            <a:ext cx="914401" cy="914401"/>
+          </a:xfrm>
+          <a:prstGeom prst="rect">
+            <a:avLst/>
+          </a:prstGeom>
+          <a:noFill/>
+          <a:extLst>
+            <a:ext uri="{909E8E84-426E-40DD-AFC4-6F175D3DCCD1}">
+              <a14:hiddenFill xmlns:a14="http://schemas.microsoft.com/office/drawing/2010/main">
+                <a:solidFill>
+                  <a:srgbClr val="FFFFFF"/>
+                </a:solidFill>
+              </a14:hiddenFill>
+            </a:ext>
+          </a:extLst>
+        </p:spPr>
+      </p:pic>
     </p:spTree>
     <p:extLst>
       <p:ext uri="{BB962C8B-B14F-4D97-AF65-F5344CB8AC3E}">

</xml_diff>

<commit_message>
#12 Colors added on strategy on solution slides
</commit_message>
<xml_diff>
--- a/SAI_presentation.pptx
+++ b/SAI_presentation.pptx
@@ -6942,7 +6942,7 @@
             <a:fld id="{B61BEF0D-F0BB-DE4B-95CE-6DB70DBA9567}" type="datetimeFigureOut">
               <a:rPr lang="en-US" dirty="0"/>
               <a:pPr/>
-              <a:t>3/26/2020</a:t>
+              <a:t>3/27/2020</a:t>
             </a:fld>
             <a:endParaRPr lang="en-US" dirty="0"/>
           </a:p>
@@ -7375,7 +7375,7 @@
             <a:fld id="{B61BEF0D-F0BB-DE4B-95CE-6DB70DBA9567}" type="datetimeFigureOut">
               <a:rPr lang="en-US" dirty="0"/>
               <a:pPr/>
-              <a:t>3/26/2020</a:t>
+              <a:t>3/27/2020</a:t>
             </a:fld>
             <a:endParaRPr lang="en-US" dirty="0"/>
           </a:p>
@@ -7622,7 +7622,7 @@
             <a:fld id="{B61BEF0D-F0BB-DE4B-95CE-6DB70DBA9567}" type="datetimeFigureOut">
               <a:rPr lang="en-US" dirty="0"/>
               <a:pPr/>
-              <a:t>3/26/2020</a:t>
+              <a:t>3/27/2020</a:t>
             </a:fld>
             <a:endParaRPr lang="en-US" dirty="0"/>
           </a:p>
@@ -7927,7 +7927,7 @@
             <a:fld id="{B61BEF0D-F0BB-DE4B-95CE-6DB70DBA9567}" type="datetimeFigureOut">
               <a:rPr lang="en-US" dirty="0"/>
               <a:pPr/>
-              <a:t>3/26/2020</a:t>
+              <a:t>3/27/2020</a:t>
             </a:fld>
             <a:endParaRPr lang="en-US" dirty="0"/>
           </a:p>
@@ -8242,7 +8242,7 @@
             <a:fld id="{B61BEF0D-F0BB-DE4B-95CE-6DB70DBA9567}" type="datetimeFigureOut">
               <a:rPr lang="en-US" dirty="0"/>
               <a:pPr/>
-              <a:t>3/26/2020</a:t>
+              <a:t>3/27/2020</a:t>
             </a:fld>
             <a:endParaRPr lang="en-US" dirty="0"/>
           </a:p>
@@ -8541,7 +8541,7 @@
             <a:fld id="{B61BEF0D-F0BB-DE4B-95CE-6DB70DBA9567}" type="datetimeFigureOut">
               <a:rPr lang="en-US" dirty="0"/>
               <a:pPr/>
-              <a:t>3/26/2020</a:t>
+              <a:t>3/27/2020</a:t>
             </a:fld>
             <a:endParaRPr lang="en-US" dirty="0"/>
           </a:p>
@@ -8905,7 +8905,7 @@
             <a:fld id="{B61BEF0D-F0BB-DE4B-95CE-6DB70DBA9567}" type="datetimeFigureOut">
               <a:rPr lang="en-US" dirty="0"/>
               <a:pPr/>
-              <a:t>3/26/2020</a:t>
+              <a:t>3/27/2020</a:t>
             </a:fld>
             <a:endParaRPr lang="en-US" dirty="0"/>
           </a:p>
@@ -9076,7 +9076,7 @@
             <a:fld id="{B61BEF0D-F0BB-DE4B-95CE-6DB70DBA9567}" type="datetimeFigureOut">
               <a:rPr lang="en-US" dirty="0"/>
               <a:pPr/>
-              <a:t>3/26/2020</a:t>
+              <a:t>3/27/2020</a:t>
             </a:fld>
             <a:endParaRPr lang="en-US" dirty="0"/>
           </a:p>
@@ -9253,7 +9253,7 @@
             <a:fld id="{B61BEF0D-F0BB-DE4B-95CE-6DB70DBA9567}" type="datetimeFigureOut">
               <a:rPr lang="en-US" dirty="0"/>
               <a:pPr/>
-              <a:t>3/26/2020</a:t>
+              <a:t>3/27/2020</a:t>
             </a:fld>
             <a:endParaRPr lang="en-US" dirty="0"/>
           </a:p>
@@ -9420,7 +9420,7 @@
             <a:fld id="{B61BEF0D-F0BB-DE4B-95CE-6DB70DBA9567}" type="datetimeFigureOut">
               <a:rPr lang="en-US" dirty="0"/>
               <a:pPr/>
-              <a:t>3/26/2020</a:t>
+              <a:t>3/27/2020</a:t>
             </a:fld>
             <a:endParaRPr lang="en-US" dirty="0"/>
           </a:p>
@@ -9667,7 +9667,7 @@
             <a:fld id="{B61BEF0D-F0BB-DE4B-95CE-6DB70DBA9567}" type="datetimeFigureOut">
               <a:rPr lang="en-US" dirty="0"/>
               <a:pPr/>
-              <a:t>3/26/2020</a:t>
+              <a:t>3/27/2020</a:t>
             </a:fld>
             <a:endParaRPr lang="en-US" dirty="0"/>
           </a:p>
@@ -9900,7 +9900,7 @@
             <a:fld id="{B61BEF0D-F0BB-DE4B-95CE-6DB70DBA9567}" type="datetimeFigureOut">
               <a:rPr lang="en-US" dirty="0"/>
               <a:pPr/>
-              <a:t>3/26/2020</a:t>
+              <a:t>3/27/2020</a:t>
             </a:fld>
             <a:endParaRPr lang="en-US" dirty="0"/>
           </a:p>
@@ -10279,7 +10279,7 @@
             <a:fld id="{B61BEF0D-F0BB-DE4B-95CE-6DB70DBA9567}" type="datetimeFigureOut">
               <a:rPr lang="en-US" dirty="0"/>
               <a:pPr/>
-              <a:t>3/26/2020</a:t>
+              <a:t>3/27/2020</a:t>
             </a:fld>
             <a:endParaRPr lang="en-US" dirty="0"/>
           </a:p>
@@ -10394,7 +10394,7 @@
             <a:fld id="{B61BEF0D-F0BB-DE4B-95CE-6DB70DBA9567}" type="datetimeFigureOut">
               <a:rPr lang="en-US" dirty="0"/>
               <a:pPr/>
-              <a:t>3/26/2020</a:t>
+              <a:t>3/27/2020</a:t>
             </a:fld>
             <a:endParaRPr lang="en-US" dirty="0"/>
           </a:p>
@@ -10486,7 +10486,7 @@
             <a:fld id="{B61BEF0D-F0BB-DE4B-95CE-6DB70DBA9567}" type="datetimeFigureOut">
               <a:rPr lang="en-US" dirty="0"/>
               <a:pPr/>
-              <a:t>3/26/2020</a:t>
+              <a:t>3/27/2020</a:t>
             </a:fld>
             <a:endParaRPr lang="en-US" dirty="0"/>
           </a:p>
@@ -10738,7 +10738,7 @@
             <a:fld id="{B61BEF0D-F0BB-DE4B-95CE-6DB70DBA9567}" type="datetimeFigureOut">
               <a:rPr lang="en-US" dirty="0"/>
               <a:pPr/>
-              <a:t>3/26/2020</a:t>
+              <a:t>3/27/2020</a:t>
             </a:fld>
             <a:endParaRPr lang="en-US" dirty="0"/>
           </a:p>
@@ -11018,7 +11018,7 @@
             <a:fld id="{B61BEF0D-F0BB-DE4B-95CE-6DB70DBA9567}" type="datetimeFigureOut">
               <a:rPr lang="en-US" dirty="0"/>
               <a:pPr/>
-              <a:t>3/26/2020</a:t>
+              <a:t>3/27/2020</a:t>
             </a:fld>
             <a:endParaRPr lang="en-US" dirty="0"/>
           </a:p>
@@ -11421,7 +11421,7 @@
             <a:fld id="{B61BEF0D-F0BB-DE4B-95CE-6DB70DBA9567}" type="datetimeFigureOut">
               <a:rPr lang="en-US" dirty="0"/>
               <a:pPr/>
-              <a:t>3/26/2020</a:t>
+              <a:t>3/27/2020</a:t>
             </a:fld>
             <a:endParaRPr lang="en-US" dirty="0"/>
           </a:p>
@@ -16983,7 +16983,7 @@
           <a:lstStyle/>
           <a:p>
             <a:r>
-              <a:rPr lang="fr-FR" dirty="0" err="1"/>
+              <a:rPr lang="fr-FR" b="1" dirty="0" err="1"/>
               <a:t>Create</a:t>
             </a:r>
             <a:r>
@@ -16991,7 +16991,11 @@
               <a:t> a </a:t>
             </a:r>
             <a:r>
-              <a:rPr lang="fr-FR" dirty="0" err="1"/>
+              <a:rPr lang="fr-FR" b="1" dirty="0" err="1">
+                <a:solidFill>
+                  <a:srgbClr val="0070C0"/>
+                </a:solidFill>
+              </a:rPr>
               <a:t>strategy</a:t>
             </a:r>
             <a:r>
@@ -17007,12 +17011,24 @@
               <a:t> </a:t>
             </a:r>
             <a:r>
-              <a:rPr lang="fr-FR" dirty="0" err="1"/>
+              <a:rPr lang="fr-FR" b="1" dirty="0" err="1">
+                <a:solidFill>
+                  <a:srgbClr val="FFFF00"/>
+                </a:solidFill>
+              </a:rPr>
               <a:t>some</a:t>
             </a:r>
             <a:r>
+              <a:rPr lang="fr-FR" b="1" dirty="0">
+                <a:solidFill>
+                  <a:srgbClr val="FFFF00"/>
+                </a:solidFill>
+              </a:rPr>
+              <a:t> images </a:t>
+            </a:r>
+            <a:r>
               <a:rPr lang="fr-FR" dirty="0"/>
-              <a:t> images are </a:t>
+              <a:t>are </a:t>
             </a:r>
             <a:r>
               <a:rPr lang="fr-FR" dirty="0" err="1"/>
@@ -17039,10 +17055,24 @@
               <a:t> a </a:t>
             </a:r>
             <a:r>
-              <a:rPr lang="fr-FR" dirty="0" err="1"/>
+              <a:rPr lang="fr-FR" b="1" dirty="0" err="1">
+                <a:solidFill>
+                  <a:schemeClr val="accent6">
+                    <a:lumMod val="40000"/>
+                    <a:lumOff val="60000"/>
+                  </a:schemeClr>
+                </a:solidFill>
+              </a:rPr>
               <a:t>threshold</a:t>
             </a:r>
-            <a:endParaRPr lang="fr-FR" dirty="0"/>
+            <a:endParaRPr lang="fr-FR" b="1" dirty="0">
+              <a:solidFill>
+                <a:schemeClr val="accent6">
+                  <a:lumMod val="40000"/>
+                  <a:lumOff val="60000"/>
+                </a:schemeClr>
+              </a:solidFill>
+            </a:endParaRPr>
           </a:p>
           <a:p>
             <a:r>
@@ -17062,10 +17092,10 @@
               <a:t> a </a:t>
             </a:r>
             <a:r>
-              <a:rPr lang="fr-FR"/>
+              <a:rPr lang="fr-FR" dirty="0" err="1"/>
               <a:t>schema</a:t>
             </a:r>
-            <a:endParaRPr lang="en-GB"/>
+            <a:endParaRPr lang="en-GB" dirty="0"/>
           </a:p>
         </p:txBody>
       </p:sp>
@@ -17169,7 +17199,7 @@
         </p:blipFill>
         <p:spPr>
           <a:xfrm>
-            <a:off x="4494212" y="3386667"/>
+            <a:off x="7797445" y="3368746"/>
             <a:ext cx="914400" cy="914400"/>
           </a:xfrm>
           <a:prstGeom prst="rect">
@@ -17206,7 +17236,7 @@
         </p:blipFill>
         <p:spPr bwMode="auto">
           <a:xfrm>
-            <a:off x="5986653" y="3255433"/>
+            <a:off x="4758774" y="3366279"/>
             <a:ext cx="914401" cy="914401"/>
           </a:xfrm>
           <a:prstGeom prst="rect">

</xml_diff>

<commit_message>
#12 Operators added on strategy on solution slides
</commit_message>
<xml_diff>
--- a/SAI_presentation.pptx
+++ b/SAI_presentation.pptx
@@ -17199,7 +17199,7 @@
         </p:blipFill>
         <p:spPr>
           <a:xfrm>
-            <a:off x="7797445" y="3368746"/>
+            <a:off x="7197445" y="3439767"/>
             <a:ext cx="914400" cy="914400"/>
           </a:xfrm>
           <a:prstGeom prst="rect">
@@ -17254,6 +17254,300 @@
           </a:extLst>
         </p:spPr>
       </p:pic>
+      <p:sp>
+        <p:nvSpPr>
+          <p:cNvPr id="8" name="Signe Plus 7">
+            <a:extLst>
+              <a:ext uri="{FF2B5EF4-FFF2-40B4-BE49-F238E27FC236}">
+                <a16:creationId xmlns:a16="http://schemas.microsoft.com/office/drawing/2014/main" id="{8C1B28C2-2CB5-4525-B4D8-01F117288700}"/>
+              </a:ext>
+            </a:extLst>
+          </p:cNvPr>
+          <p:cNvSpPr/>
+          <p:nvPr/>
+        </p:nvSpPr>
+        <p:spPr>
+          <a:xfrm>
+            <a:off x="3568823" y="3429000"/>
+            <a:ext cx="937606" cy="914400"/>
+          </a:xfrm>
+          <a:prstGeom prst="mathPlus">
+            <a:avLst/>
+          </a:prstGeom>
+        </p:spPr>
+        <p:style>
+          <a:lnRef idx="2">
+            <a:schemeClr val="accent1">
+              <a:shade val="50000"/>
+            </a:schemeClr>
+          </a:lnRef>
+          <a:fillRef idx="1">
+            <a:schemeClr val="accent1"/>
+          </a:fillRef>
+          <a:effectRef idx="0">
+            <a:schemeClr val="accent1"/>
+          </a:effectRef>
+          <a:fontRef idx="minor">
+            <a:schemeClr val="lt1"/>
+          </a:fontRef>
+        </p:style>
+        <p:txBody>
+          <a:bodyPr rot="0" spcFirstLastPara="0" vert="horz" wrap="square" lIns="91440" tIns="45720" rIns="91440" bIns="45720" numCol="1" spcCol="0" rtlCol="0" fromWordArt="0" anchor="ctr" anchorCtr="0" forceAA="0" compatLnSpc="1">
+            <a:prstTxWarp prst="textNoShape">
+              <a:avLst/>
+            </a:prstTxWarp>
+            <a:noAutofit/>
+          </a:bodyPr>
+          <a:lstStyle>
+            <a:defPPr>
+              <a:defRPr lang="en-US"/>
+            </a:defPPr>
+            <a:lvl1pPr marL="0" algn="l" defTabSz="457200" rtl="0" eaLnBrk="1" latinLnBrk="0" hangingPunct="1">
+              <a:defRPr sz="1800" kern="1200">
+                <a:solidFill>
+                  <a:schemeClr val="lt1"/>
+                </a:solidFill>
+                <a:latin typeface="+mn-lt"/>
+                <a:ea typeface="+mn-ea"/>
+                <a:cs typeface="+mn-cs"/>
+              </a:defRPr>
+            </a:lvl1pPr>
+            <a:lvl2pPr marL="457200" algn="l" defTabSz="457200" rtl="0" eaLnBrk="1" latinLnBrk="0" hangingPunct="1">
+              <a:defRPr sz="1800" kern="1200">
+                <a:solidFill>
+                  <a:schemeClr val="lt1"/>
+                </a:solidFill>
+                <a:latin typeface="+mn-lt"/>
+                <a:ea typeface="+mn-ea"/>
+                <a:cs typeface="+mn-cs"/>
+              </a:defRPr>
+            </a:lvl2pPr>
+            <a:lvl3pPr marL="914400" algn="l" defTabSz="457200" rtl="0" eaLnBrk="1" latinLnBrk="0" hangingPunct="1">
+              <a:defRPr sz="1800" kern="1200">
+                <a:solidFill>
+                  <a:schemeClr val="lt1"/>
+                </a:solidFill>
+                <a:latin typeface="+mn-lt"/>
+                <a:ea typeface="+mn-ea"/>
+                <a:cs typeface="+mn-cs"/>
+              </a:defRPr>
+            </a:lvl3pPr>
+            <a:lvl4pPr marL="1371600" algn="l" defTabSz="457200" rtl="0" eaLnBrk="1" latinLnBrk="0" hangingPunct="1">
+              <a:defRPr sz="1800" kern="1200">
+                <a:solidFill>
+                  <a:schemeClr val="lt1"/>
+                </a:solidFill>
+                <a:latin typeface="+mn-lt"/>
+                <a:ea typeface="+mn-ea"/>
+                <a:cs typeface="+mn-cs"/>
+              </a:defRPr>
+            </a:lvl4pPr>
+            <a:lvl5pPr marL="1828800" algn="l" defTabSz="457200" rtl="0" eaLnBrk="1" latinLnBrk="0" hangingPunct="1">
+              <a:defRPr sz="1800" kern="1200">
+                <a:solidFill>
+                  <a:schemeClr val="lt1"/>
+                </a:solidFill>
+                <a:latin typeface="+mn-lt"/>
+                <a:ea typeface="+mn-ea"/>
+                <a:cs typeface="+mn-cs"/>
+              </a:defRPr>
+            </a:lvl5pPr>
+            <a:lvl6pPr marL="2286000" algn="l" defTabSz="457200" rtl="0" eaLnBrk="1" latinLnBrk="0" hangingPunct="1">
+              <a:defRPr sz="1800" kern="1200">
+                <a:solidFill>
+                  <a:schemeClr val="lt1"/>
+                </a:solidFill>
+                <a:latin typeface="+mn-lt"/>
+                <a:ea typeface="+mn-ea"/>
+                <a:cs typeface="+mn-cs"/>
+              </a:defRPr>
+            </a:lvl6pPr>
+            <a:lvl7pPr marL="2743200" algn="l" defTabSz="457200" rtl="0" eaLnBrk="1" latinLnBrk="0" hangingPunct="1">
+              <a:defRPr sz="1800" kern="1200">
+                <a:solidFill>
+                  <a:schemeClr val="lt1"/>
+                </a:solidFill>
+                <a:latin typeface="+mn-lt"/>
+                <a:ea typeface="+mn-ea"/>
+                <a:cs typeface="+mn-cs"/>
+              </a:defRPr>
+            </a:lvl7pPr>
+            <a:lvl8pPr marL="3200400" algn="l" defTabSz="457200" rtl="0" eaLnBrk="1" latinLnBrk="0" hangingPunct="1">
+              <a:defRPr sz="1800" kern="1200">
+                <a:solidFill>
+                  <a:schemeClr val="lt1"/>
+                </a:solidFill>
+                <a:latin typeface="+mn-lt"/>
+                <a:ea typeface="+mn-ea"/>
+                <a:cs typeface="+mn-cs"/>
+              </a:defRPr>
+            </a:lvl8pPr>
+            <a:lvl9pPr marL="3657600" algn="l" defTabSz="457200" rtl="0" eaLnBrk="1" latinLnBrk="0" hangingPunct="1">
+              <a:defRPr sz="1800" kern="1200">
+                <a:solidFill>
+                  <a:schemeClr val="lt1"/>
+                </a:solidFill>
+                <a:latin typeface="+mn-lt"/>
+                <a:ea typeface="+mn-ea"/>
+                <a:cs typeface="+mn-cs"/>
+              </a:defRPr>
+            </a:lvl9pPr>
+          </a:lstStyle>
+          <a:p>
+            <a:pPr algn="ctr"/>
+            <a:endParaRPr lang="en-GB"/>
+          </a:p>
+        </p:txBody>
+      </p:sp>
+      <p:sp>
+        <p:nvSpPr>
+          <p:cNvPr id="9" name="Est égal à 8">
+            <a:extLst>
+              <a:ext uri="{FF2B5EF4-FFF2-40B4-BE49-F238E27FC236}">
+                <a16:creationId xmlns:a16="http://schemas.microsoft.com/office/drawing/2014/main" id="{02C0E2FF-8EA3-4B93-BD15-1EEDFE45AEAF}"/>
+              </a:ext>
+            </a:extLst>
+          </p:cNvPr>
+          <p:cNvSpPr/>
+          <p:nvPr/>
+        </p:nvSpPr>
+        <p:spPr>
+          <a:xfrm>
+            <a:off x="6096000" y="3654310"/>
+            <a:ext cx="738345" cy="566116"/>
+          </a:xfrm>
+          <a:prstGeom prst="mathEqual">
+            <a:avLst/>
+          </a:prstGeom>
+        </p:spPr>
+        <p:style>
+          <a:lnRef idx="2">
+            <a:schemeClr val="accent1">
+              <a:shade val="50000"/>
+            </a:schemeClr>
+          </a:lnRef>
+          <a:fillRef idx="1">
+            <a:schemeClr val="accent1"/>
+          </a:fillRef>
+          <a:effectRef idx="0">
+            <a:schemeClr val="accent1"/>
+          </a:effectRef>
+          <a:fontRef idx="minor">
+            <a:schemeClr val="lt1"/>
+          </a:fontRef>
+        </p:style>
+        <p:txBody>
+          <a:bodyPr rot="0" spcFirstLastPara="0" vert="horz" wrap="square" lIns="91440" tIns="45720" rIns="91440" bIns="45720" numCol="1" spcCol="0" rtlCol="0" fromWordArt="0" anchor="ctr" anchorCtr="0" forceAA="0" compatLnSpc="1">
+            <a:prstTxWarp prst="textNoShape">
+              <a:avLst/>
+            </a:prstTxWarp>
+            <a:noAutofit/>
+          </a:bodyPr>
+          <a:lstStyle>
+            <a:defPPr>
+              <a:defRPr lang="en-US"/>
+            </a:defPPr>
+            <a:lvl1pPr marL="0" algn="l" defTabSz="457200" rtl="0" eaLnBrk="1" latinLnBrk="0" hangingPunct="1">
+              <a:defRPr sz="1800" kern="1200">
+                <a:solidFill>
+                  <a:schemeClr val="lt1"/>
+                </a:solidFill>
+                <a:latin typeface="+mn-lt"/>
+                <a:ea typeface="+mn-ea"/>
+                <a:cs typeface="+mn-cs"/>
+              </a:defRPr>
+            </a:lvl1pPr>
+            <a:lvl2pPr marL="457200" algn="l" defTabSz="457200" rtl="0" eaLnBrk="1" latinLnBrk="0" hangingPunct="1">
+              <a:defRPr sz="1800" kern="1200">
+                <a:solidFill>
+                  <a:schemeClr val="lt1"/>
+                </a:solidFill>
+                <a:latin typeface="+mn-lt"/>
+                <a:ea typeface="+mn-ea"/>
+                <a:cs typeface="+mn-cs"/>
+              </a:defRPr>
+            </a:lvl2pPr>
+            <a:lvl3pPr marL="914400" algn="l" defTabSz="457200" rtl="0" eaLnBrk="1" latinLnBrk="0" hangingPunct="1">
+              <a:defRPr sz="1800" kern="1200">
+                <a:solidFill>
+                  <a:schemeClr val="lt1"/>
+                </a:solidFill>
+                <a:latin typeface="+mn-lt"/>
+                <a:ea typeface="+mn-ea"/>
+                <a:cs typeface="+mn-cs"/>
+              </a:defRPr>
+            </a:lvl3pPr>
+            <a:lvl4pPr marL="1371600" algn="l" defTabSz="457200" rtl="0" eaLnBrk="1" latinLnBrk="0" hangingPunct="1">
+              <a:defRPr sz="1800" kern="1200">
+                <a:solidFill>
+                  <a:schemeClr val="lt1"/>
+                </a:solidFill>
+                <a:latin typeface="+mn-lt"/>
+                <a:ea typeface="+mn-ea"/>
+                <a:cs typeface="+mn-cs"/>
+              </a:defRPr>
+            </a:lvl4pPr>
+            <a:lvl5pPr marL="1828800" algn="l" defTabSz="457200" rtl="0" eaLnBrk="1" latinLnBrk="0" hangingPunct="1">
+              <a:defRPr sz="1800" kern="1200">
+                <a:solidFill>
+                  <a:schemeClr val="lt1"/>
+                </a:solidFill>
+                <a:latin typeface="+mn-lt"/>
+                <a:ea typeface="+mn-ea"/>
+                <a:cs typeface="+mn-cs"/>
+              </a:defRPr>
+            </a:lvl5pPr>
+            <a:lvl6pPr marL="2286000" algn="l" defTabSz="457200" rtl="0" eaLnBrk="1" latinLnBrk="0" hangingPunct="1">
+              <a:defRPr sz="1800" kern="1200">
+                <a:solidFill>
+                  <a:schemeClr val="lt1"/>
+                </a:solidFill>
+                <a:latin typeface="+mn-lt"/>
+                <a:ea typeface="+mn-ea"/>
+                <a:cs typeface="+mn-cs"/>
+              </a:defRPr>
+            </a:lvl6pPr>
+            <a:lvl7pPr marL="2743200" algn="l" defTabSz="457200" rtl="0" eaLnBrk="1" latinLnBrk="0" hangingPunct="1">
+              <a:defRPr sz="1800" kern="1200">
+                <a:solidFill>
+                  <a:schemeClr val="lt1"/>
+                </a:solidFill>
+                <a:latin typeface="+mn-lt"/>
+                <a:ea typeface="+mn-ea"/>
+                <a:cs typeface="+mn-cs"/>
+              </a:defRPr>
+            </a:lvl7pPr>
+            <a:lvl8pPr marL="3200400" algn="l" defTabSz="457200" rtl="0" eaLnBrk="1" latinLnBrk="0" hangingPunct="1">
+              <a:defRPr sz="1800" kern="1200">
+                <a:solidFill>
+                  <a:schemeClr val="lt1"/>
+                </a:solidFill>
+                <a:latin typeface="+mn-lt"/>
+                <a:ea typeface="+mn-ea"/>
+                <a:cs typeface="+mn-cs"/>
+              </a:defRPr>
+            </a:lvl8pPr>
+            <a:lvl9pPr marL="3657600" algn="l" defTabSz="457200" rtl="0" eaLnBrk="1" latinLnBrk="0" hangingPunct="1">
+              <a:defRPr sz="1800" kern="1200">
+                <a:solidFill>
+                  <a:schemeClr val="lt1"/>
+                </a:solidFill>
+                <a:latin typeface="+mn-lt"/>
+                <a:ea typeface="+mn-ea"/>
+                <a:cs typeface="+mn-cs"/>
+              </a:defRPr>
+            </a:lvl9pPr>
+          </a:lstStyle>
+          <a:p>
+            <a:pPr algn="ctr"/>
+            <a:endParaRPr lang="en-GB">
+              <a:solidFill>
+                <a:schemeClr val="tx1"/>
+              </a:solidFill>
+            </a:endParaRPr>
+          </a:p>
+        </p:txBody>
+      </p:sp>
     </p:spTree>
     <p:extLst>
       <p:ext uri="{BB962C8B-B14F-4D97-AF65-F5344CB8AC3E}">

</xml_diff>

<commit_message>
#12 Icons added on web page on solution slides
</commit_message>
<xml_diff>
--- a/SAI_presentation.pptx
+++ b/SAI_presentation.pptx
@@ -17075,26 +17075,9 @@
             </a:endParaRPr>
           </a:p>
           <a:p>
-            <a:r>
-              <a:rPr lang="fr-FR" dirty="0" err="1"/>
-              <a:t>Explain</a:t>
-            </a:r>
-            <a:r>
-              <a:rPr lang="fr-FR" dirty="0"/>
-              <a:t> </a:t>
-            </a:r>
-            <a:r>
-              <a:rPr lang="fr-FR" dirty="0" err="1"/>
-              <a:t>with</a:t>
-            </a:r>
-            <a:r>
-              <a:rPr lang="fr-FR" dirty="0"/>
-              <a:t> a </a:t>
-            </a:r>
-            <a:r>
-              <a:rPr lang="fr-FR" dirty="0" err="1"/>
-              <a:t>schema</a:t>
-            </a:r>
+            <a:pPr marL="0" indent="0">
+              <a:buNone/>
+            </a:pPr>
             <a:endParaRPr lang="en-GB" dirty="0"/>
           </a:p>
         </p:txBody>
@@ -17687,6 +17670,150 @@
           </a:p>
         </p:txBody>
       </p:sp>
+      <p:pic>
+        <p:nvPicPr>
+          <p:cNvPr id="5" name="Graphique 4" descr="Monde">
+            <a:extLst>
+              <a:ext uri="{FF2B5EF4-FFF2-40B4-BE49-F238E27FC236}">
+                <a16:creationId xmlns:a16="http://schemas.microsoft.com/office/drawing/2014/main" id="{0C050CD2-33F2-499F-A1BB-64AC53A3CCEF}"/>
+              </a:ext>
+            </a:extLst>
+          </p:cNvPr>
+          <p:cNvPicPr>
+            <a:picLocks noChangeAspect="1"/>
+          </p:cNvPicPr>
+          <p:nvPr/>
+        </p:nvPicPr>
+        <p:blipFill>
+          <a:blip r:embed="rId2">
+            <a:extLst>
+              <a:ext uri="{96DAC541-7B7A-43D3-8B79-37D633B846F1}">
+                <asvg:svgBlip xmlns:asvg="http://schemas.microsoft.com/office/drawing/2016/SVG/main" r:embed="rId3"/>
+              </a:ext>
+            </a:extLst>
+          </a:blip>
+          <a:stretch>
+            <a:fillRect/>
+          </a:stretch>
+        </p:blipFill>
+        <p:spPr>
+          <a:xfrm>
+            <a:off x="1982587" y="3710496"/>
+            <a:ext cx="914400" cy="914400"/>
+          </a:xfrm>
+          <a:prstGeom prst="rect">
+            <a:avLst/>
+          </a:prstGeom>
+        </p:spPr>
+      </p:pic>
+      <p:pic>
+        <p:nvPicPr>
+          <p:cNvPr id="6" name="Graphique 5" descr="Ampoule et engrenage">
+            <a:extLst>
+              <a:ext uri="{FF2B5EF4-FFF2-40B4-BE49-F238E27FC236}">
+                <a16:creationId xmlns:a16="http://schemas.microsoft.com/office/drawing/2014/main" id="{C695E499-CAEB-4BF4-9F29-AEF2A346229D}"/>
+              </a:ext>
+            </a:extLst>
+          </p:cNvPr>
+          <p:cNvPicPr>
+            <a:picLocks noChangeAspect="1"/>
+          </p:cNvPicPr>
+          <p:nvPr/>
+        </p:nvPicPr>
+        <p:blipFill>
+          <a:blip r:embed="rId4">
+            <a:extLst>
+              <a:ext uri="{96DAC541-7B7A-43D3-8B79-37D633B846F1}">
+                <asvg:svgBlip xmlns:asvg="http://schemas.microsoft.com/office/drawing/2016/SVG/main" r:embed="rId5"/>
+              </a:ext>
+            </a:extLst>
+          </a:blip>
+          <a:stretch>
+            <a:fillRect/>
+          </a:stretch>
+        </p:blipFill>
+        <p:spPr>
+          <a:xfrm>
+            <a:off x="3558895" y="3253296"/>
+            <a:ext cx="914400" cy="914400"/>
+          </a:xfrm>
+          <a:prstGeom prst="rect">
+            <a:avLst/>
+          </a:prstGeom>
+        </p:spPr>
+      </p:pic>
+      <p:pic>
+        <p:nvPicPr>
+          <p:cNvPr id="7" name="Graphique 6" descr="Ampoule et engrenage">
+            <a:extLst>
+              <a:ext uri="{FF2B5EF4-FFF2-40B4-BE49-F238E27FC236}">
+                <a16:creationId xmlns:a16="http://schemas.microsoft.com/office/drawing/2014/main" id="{AFBCBC37-D4E8-497E-A54A-17CB448095FA}"/>
+              </a:ext>
+            </a:extLst>
+          </p:cNvPr>
+          <p:cNvPicPr>
+            <a:picLocks noChangeAspect="1"/>
+          </p:cNvPicPr>
+          <p:nvPr/>
+        </p:nvPicPr>
+        <p:blipFill>
+          <a:blip r:embed="rId4">
+            <a:extLst>
+              <a:ext uri="{96DAC541-7B7A-43D3-8B79-37D633B846F1}">
+                <asvg:svgBlip xmlns:asvg="http://schemas.microsoft.com/office/drawing/2016/SVG/main" r:embed="rId5"/>
+              </a:ext>
+            </a:extLst>
+          </a:blip>
+          <a:stretch>
+            <a:fillRect/>
+          </a:stretch>
+        </p:blipFill>
+        <p:spPr>
+          <a:xfrm>
+            <a:off x="4037012" y="4030132"/>
+            <a:ext cx="914400" cy="914400"/>
+          </a:xfrm>
+          <a:prstGeom prst="rect">
+            <a:avLst/>
+          </a:prstGeom>
+        </p:spPr>
+      </p:pic>
+      <p:pic>
+        <p:nvPicPr>
+          <p:cNvPr id="8" name="Graphique 7" descr="Ampoule et engrenage">
+            <a:extLst>
+              <a:ext uri="{FF2B5EF4-FFF2-40B4-BE49-F238E27FC236}">
+                <a16:creationId xmlns:a16="http://schemas.microsoft.com/office/drawing/2014/main" id="{DB0647B2-0745-4B12-80BB-80E66217D890}"/>
+              </a:ext>
+            </a:extLst>
+          </p:cNvPr>
+          <p:cNvPicPr>
+            <a:picLocks noChangeAspect="1"/>
+          </p:cNvPicPr>
+          <p:nvPr/>
+        </p:nvPicPr>
+        <p:blipFill>
+          <a:blip r:embed="rId4">
+            <a:extLst>
+              <a:ext uri="{96DAC541-7B7A-43D3-8B79-37D633B846F1}">
+                <asvg:svgBlip xmlns:asvg="http://schemas.microsoft.com/office/drawing/2016/SVG/main" r:embed="rId5"/>
+              </a:ext>
+            </a:extLst>
+          </a:blip>
+          <a:stretch>
+            <a:fillRect/>
+          </a:stretch>
+        </p:blipFill>
+        <p:spPr>
+          <a:xfrm>
+            <a:off x="4573387" y="3253296"/>
+            <a:ext cx="914400" cy="914400"/>
+          </a:xfrm>
+          <a:prstGeom prst="rect">
+            <a:avLst/>
+          </a:prstGeom>
+        </p:spPr>
+      </p:pic>
     </p:spTree>
     <p:extLst>
       <p:ext uri="{BB962C8B-B14F-4D97-AF65-F5344CB8AC3E}">

</xml_diff>

<commit_message>
#12 Box added on web page on solution slides
</commit_message>
<xml_diff>
--- a/SAI_presentation.pptx
+++ b/SAI_presentation.pptx
@@ -6942,7 +6942,7 @@
             <a:fld id="{B61BEF0D-F0BB-DE4B-95CE-6DB70DBA9567}" type="datetimeFigureOut">
               <a:rPr lang="en-US" dirty="0"/>
               <a:pPr/>
-              <a:t>3/27/2020</a:t>
+              <a:t>3/28/2020</a:t>
             </a:fld>
             <a:endParaRPr lang="en-US" dirty="0"/>
           </a:p>
@@ -7375,7 +7375,7 @@
             <a:fld id="{B61BEF0D-F0BB-DE4B-95CE-6DB70DBA9567}" type="datetimeFigureOut">
               <a:rPr lang="en-US" dirty="0"/>
               <a:pPr/>
-              <a:t>3/27/2020</a:t>
+              <a:t>3/28/2020</a:t>
             </a:fld>
             <a:endParaRPr lang="en-US" dirty="0"/>
           </a:p>
@@ -7622,7 +7622,7 @@
             <a:fld id="{B61BEF0D-F0BB-DE4B-95CE-6DB70DBA9567}" type="datetimeFigureOut">
               <a:rPr lang="en-US" dirty="0"/>
               <a:pPr/>
-              <a:t>3/27/2020</a:t>
+              <a:t>3/28/2020</a:t>
             </a:fld>
             <a:endParaRPr lang="en-US" dirty="0"/>
           </a:p>
@@ -7927,7 +7927,7 @@
             <a:fld id="{B61BEF0D-F0BB-DE4B-95CE-6DB70DBA9567}" type="datetimeFigureOut">
               <a:rPr lang="en-US" dirty="0"/>
               <a:pPr/>
-              <a:t>3/27/2020</a:t>
+              <a:t>3/28/2020</a:t>
             </a:fld>
             <a:endParaRPr lang="en-US" dirty="0"/>
           </a:p>
@@ -8242,7 +8242,7 @@
             <a:fld id="{B61BEF0D-F0BB-DE4B-95CE-6DB70DBA9567}" type="datetimeFigureOut">
               <a:rPr lang="en-US" dirty="0"/>
               <a:pPr/>
-              <a:t>3/27/2020</a:t>
+              <a:t>3/28/2020</a:t>
             </a:fld>
             <a:endParaRPr lang="en-US" dirty="0"/>
           </a:p>
@@ -8541,7 +8541,7 @@
             <a:fld id="{B61BEF0D-F0BB-DE4B-95CE-6DB70DBA9567}" type="datetimeFigureOut">
               <a:rPr lang="en-US" dirty="0"/>
               <a:pPr/>
-              <a:t>3/27/2020</a:t>
+              <a:t>3/28/2020</a:t>
             </a:fld>
             <a:endParaRPr lang="en-US" dirty="0"/>
           </a:p>
@@ -8905,7 +8905,7 @@
             <a:fld id="{B61BEF0D-F0BB-DE4B-95CE-6DB70DBA9567}" type="datetimeFigureOut">
               <a:rPr lang="en-US" dirty="0"/>
               <a:pPr/>
-              <a:t>3/27/2020</a:t>
+              <a:t>3/28/2020</a:t>
             </a:fld>
             <a:endParaRPr lang="en-US" dirty="0"/>
           </a:p>
@@ -9076,7 +9076,7 @@
             <a:fld id="{B61BEF0D-F0BB-DE4B-95CE-6DB70DBA9567}" type="datetimeFigureOut">
               <a:rPr lang="en-US" dirty="0"/>
               <a:pPr/>
-              <a:t>3/27/2020</a:t>
+              <a:t>3/28/2020</a:t>
             </a:fld>
             <a:endParaRPr lang="en-US" dirty="0"/>
           </a:p>
@@ -9253,7 +9253,7 @@
             <a:fld id="{B61BEF0D-F0BB-DE4B-95CE-6DB70DBA9567}" type="datetimeFigureOut">
               <a:rPr lang="en-US" dirty="0"/>
               <a:pPr/>
-              <a:t>3/27/2020</a:t>
+              <a:t>3/28/2020</a:t>
             </a:fld>
             <a:endParaRPr lang="en-US" dirty="0"/>
           </a:p>
@@ -9420,7 +9420,7 @@
             <a:fld id="{B61BEF0D-F0BB-DE4B-95CE-6DB70DBA9567}" type="datetimeFigureOut">
               <a:rPr lang="en-US" dirty="0"/>
               <a:pPr/>
-              <a:t>3/27/2020</a:t>
+              <a:t>3/28/2020</a:t>
             </a:fld>
             <a:endParaRPr lang="en-US" dirty="0"/>
           </a:p>
@@ -9667,7 +9667,7 @@
             <a:fld id="{B61BEF0D-F0BB-DE4B-95CE-6DB70DBA9567}" type="datetimeFigureOut">
               <a:rPr lang="en-US" dirty="0"/>
               <a:pPr/>
-              <a:t>3/27/2020</a:t>
+              <a:t>3/28/2020</a:t>
             </a:fld>
             <a:endParaRPr lang="en-US" dirty="0"/>
           </a:p>
@@ -9900,7 +9900,7 @@
             <a:fld id="{B61BEF0D-F0BB-DE4B-95CE-6DB70DBA9567}" type="datetimeFigureOut">
               <a:rPr lang="en-US" dirty="0"/>
               <a:pPr/>
-              <a:t>3/27/2020</a:t>
+              <a:t>3/28/2020</a:t>
             </a:fld>
             <a:endParaRPr lang="en-US" dirty="0"/>
           </a:p>
@@ -10279,7 +10279,7 @@
             <a:fld id="{B61BEF0D-F0BB-DE4B-95CE-6DB70DBA9567}" type="datetimeFigureOut">
               <a:rPr lang="en-US" dirty="0"/>
               <a:pPr/>
-              <a:t>3/27/2020</a:t>
+              <a:t>3/28/2020</a:t>
             </a:fld>
             <a:endParaRPr lang="en-US" dirty="0"/>
           </a:p>
@@ -10394,7 +10394,7 @@
             <a:fld id="{B61BEF0D-F0BB-DE4B-95CE-6DB70DBA9567}" type="datetimeFigureOut">
               <a:rPr lang="en-US" dirty="0"/>
               <a:pPr/>
-              <a:t>3/27/2020</a:t>
+              <a:t>3/28/2020</a:t>
             </a:fld>
             <a:endParaRPr lang="en-US" dirty="0"/>
           </a:p>
@@ -10486,7 +10486,7 @@
             <a:fld id="{B61BEF0D-F0BB-DE4B-95CE-6DB70DBA9567}" type="datetimeFigureOut">
               <a:rPr lang="en-US" dirty="0"/>
               <a:pPr/>
-              <a:t>3/27/2020</a:t>
+              <a:t>3/28/2020</a:t>
             </a:fld>
             <a:endParaRPr lang="en-US" dirty="0"/>
           </a:p>
@@ -10738,7 +10738,7 @@
             <a:fld id="{B61BEF0D-F0BB-DE4B-95CE-6DB70DBA9567}" type="datetimeFigureOut">
               <a:rPr lang="en-US" dirty="0"/>
               <a:pPr/>
-              <a:t>3/27/2020</a:t>
+              <a:t>3/28/2020</a:t>
             </a:fld>
             <a:endParaRPr lang="en-US" dirty="0"/>
           </a:p>
@@ -11018,7 +11018,7 @@
             <a:fld id="{B61BEF0D-F0BB-DE4B-95CE-6DB70DBA9567}" type="datetimeFigureOut">
               <a:rPr lang="en-US" dirty="0"/>
               <a:pPr/>
-              <a:t>3/27/2020</a:t>
+              <a:t>3/28/2020</a:t>
             </a:fld>
             <a:endParaRPr lang="en-US" dirty="0"/>
           </a:p>
@@ -11421,7 +11421,7 @@
             <a:fld id="{B61BEF0D-F0BB-DE4B-95CE-6DB70DBA9567}" type="datetimeFigureOut">
               <a:rPr lang="en-US" dirty="0"/>
               <a:pPr/>
-              <a:t>3/27/2020</a:t>
+              <a:t>3/28/2020</a:t>
             </a:fld>
             <a:endParaRPr lang="en-US" dirty="0"/>
           </a:p>
@@ -17563,6 +17563,52 @@
       </p:grpSpPr>
       <p:sp>
         <p:nvSpPr>
+          <p:cNvPr id="4" name="Rectangle 3">
+            <a:extLst>
+              <a:ext uri="{FF2B5EF4-FFF2-40B4-BE49-F238E27FC236}">
+                <a16:creationId xmlns:a16="http://schemas.microsoft.com/office/drawing/2014/main" id="{FB329B1D-B999-42F2-AF76-67A414193A73}"/>
+              </a:ext>
+            </a:extLst>
+          </p:cNvPr>
+          <p:cNvSpPr/>
+          <p:nvPr/>
+        </p:nvSpPr>
+        <p:spPr>
+          <a:xfrm>
+            <a:off x="4751033" y="2898395"/>
+            <a:ext cx="2689934" cy="3719744"/>
+          </a:xfrm>
+          <a:prstGeom prst="rect">
+            <a:avLst/>
+          </a:prstGeom>
+        </p:spPr>
+        <p:style>
+          <a:lnRef idx="2">
+            <a:schemeClr val="accent1">
+              <a:shade val="50000"/>
+            </a:schemeClr>
+          </a:lnRef>
+          <a:fillRef idx="1">
+            <a:schemeClr val="accent1"/>
+          </a:fillRef>
+          <a:effectRef idx="0">
+            <a:schemeClr val="accent1"/>
+          </a:effectRef>
+          <a:fontRef idx="minor">
+            <a:schemeClr val="lt1"/>
+          </a:fontRef>
+        </p:style>
+        <p:txBody>
+          <a:bodyPr rtlCol="0" anchor="ctr"/>
+          <a:lstStyle/>
+          <a:p>
+            <a:pPr algn="ctr"/>
+            <a:endParaRPr lang="en-GB"/>
+          </a:p>
+        </p:txBody>
+      </p:sp>
+      <p:sp>
+        <p:nvSpPr>
           <p:cNvPr id="2" name="Titre 1">
             <a:extLst>
               <a:ext uri="{FF2B5EF4-FFF2-40B4-BE49-F238E27FC236}">
@@ -17698,8 +17744,8 @@
         </p:blipFill>
         <p:spPr>
           <a:xfrm>
-            <a:off x="1982587" y="3710496"/>
-            <a:ext cx="914400" cy="914400"/>
+            <a:off x="4843568" y="3067031"/>
+            <a:ext cx="641781" cy="641781"/>
           </a:xfrm>
           <a:prstGeom prst="rect">
             <a:avLst/>
@@ -17734,7 +17780,7 @@
         </p:blipFill>
         <p:spPr>
           <a:xfrm>
-            <a:off x="3558895" y="3253296"/>
+            <a:off x="5485349" y="3843867"/>
             <a:ext cx="914400" cy="914400"/>
           </a:xfrm>
           <a:prstGeom prst="rect">
@@ -17770,7 +17816,7 @@
         </p:blipFill>
         <p:spPr>
           <a:xfrm>
-            <a:off x="4037012" y="4030132"/>
+            <a:off x="5963466" y="4620703"/>
             <a:ext cx="914400" cy="914400"/>
           </a:xfrm>
           <a:prstGeom prst="rect">
@@ -17806,7 +17852,7 @@
         </p:blipFill>
         <p:spPr>
           <a:xfrm>
-            <a:off x="4573387" y="3253296"/>
+            <a:off x="6499841" y="3843867"/>
             <a:ext cx="914400" cy="914400"/>
           </a:xfrm>
           <a:prstGeom prst="rect">

</xml_diff>

<commit_message>
#12 Colors added on web page on solution slides
</commit_message>
<xml_diff>
--- a/SAI_presentation.pptx
+++ b/SAI_presentation.pptx
@@ -17581,6 +17581,18 @@
           <a:prstGeom prst="rect">
             <a:avLst/>
           </a:prstGeom>
+          <a:solidFill>
+            <a:schemeClr val="tx1">
+              <a:lumMod val="95000"/>
+            </a:schemeClr>
+          </a:solidFill>
+          <a:ln>
+            <a:solidFill>
+              <a:schemeClr val="tx1">
+                <a:lumMod val="95000"/>
+              </a:schemeClr>
+            </a:solidFill>
+          </a:ln>
         </p:spPr>
         <p:style>
           <a:lnRef idx="2">
@@ -17659,7 +17671,17 @@
           <a:p>
             <a:r>
               <a:rPr lang="fr-FR" dirty="0"/>
-              <a:t>The web page </a:t>
+              <a:t>The </a:t>
+            </a:r>
+            <a:r>
+              <a:rPr lang="fr-FR" b="1" dirty="0">
+                <a:solidFill>
+                  <a:schemeClr val="tx1">
+                    <a:lumMod val="95000"/>
+                  </a:schemeClr>
+                </a:solidFill>
+              </a:rPr>
+              <a:t>web page </a:t>
             </a:r>
             <a:r>
               <a:rPr lang="fr-FR" dirty="0" err="1"/>
@@ -17670,7 +17692,11 @@
               <a:t> show us all the </a:t>
             </a:r>
             <a:r>
-              <a:rPr lang="fr-FR" dirty="0" err="1"/>
+              <a:rPr lang="fr-FR" b="1" dirty="0" err="1">
+                <a:solidFill>
+                  <a:srgbClr val="0070C0"/>
+                </a:solidFill>
+              </a:rPr>
               <a:t>strategies</a:t>
             </a:r>
             <a:r>
@@ -17709,10 +17735,10 @@
               <a:t> a </a:t>
             </a:r>
             <a:r>
-              <a:rPr lang="fr-FR"/>
+              <a:rPr lang="fr-FR" dirty="0" err="1"/>
               <a:t>schema</a:t>
             </a:r>
-            <a:endParaRPr lang="en-GB"/>
+            <a:endParaRPr lang="en-GB" dirty="0"/>
           </a:p>
         </p:txBody>
       </p:sp>
@@ -17744,7 +17770,7 @@
         </p:blipFill>
         <p:spPr>
           <a:xfrm>
-            <a:off x="4843568" y="3067031"/>
+            <a:off x="4843568" y="2989719"/>
             <a:ext cx="641781" cy="641781"/>
           </a:xfrm>
           <a:prstGeom prst="rect">

</xml_diff>

<commit_message>
#12 SAI record each day icons added on web page on solution slides
</commit_message>
<xml_diff>
--- a/SAI_presentation.pptx
+++ b/SAI_presentation.pptx
@@ -17886,6 +17886,114 @@
           </a:prstGeom>
         </p:spPr>
       </p:pic>
+      <p:pic>
+        <p:nvPicPr>
+          <p:cNvPr id="10" name="Graphique 9" descr="Horloge">
+            <a:extLst>
+              <a:ext uri="{FF2B5EF4-FFF2-40B4-BE49-F238E27FC236}">
+                <a16:creationId xmlns:a16="http://schemas.microsoft.com/office/drawing/2014/main" id="{479E69F6-6BE9-4170-BB96-7D173C73EC8F}"/>
+              </a:ext>
+            </a:extLst>
+          </p:cNvPr>
+          <p:cNvPicPr>
+            <a:picLocks noChangeAspect="1"/>
+          </p:cNvPicPr>
+          <p:nvPr/>
+        </p:nvPicPr>
+        <p:blipFill>
+          <a:blip r:embed="rId6">
+            <a:extLst>
+              <a:ext uri="{96DAC541-7B7A-43D3-8B79-37D633B846F1}">
+                <asvg:svgBlip xmlns:asvg="http://schemas.microsoft.com/office/drawing/2016/SVG/main" r:embed="rId7"/>
+              </a:ext>
+            </a:extLst>
+          </a:blip>
+          <a:stretch>
+            <a:fillRect/>
+          </a:stretch>
+        </p:blipFill>
+        <p:spPr>
+          <a:xfrm>
+            <a:off x="9011147" y="2989719"/>
+            <a:ext cx="914400" cy="914400"/>
+          </a:xfrm>
+          <a:prstGeom prst="rect">
+            <a:avLst/>
+          </a:prstGeom>
+        </p:spPr>
+      </p:pic>
+      <p:pic>
+        <p:nvPicPr>
+          <p:cNvPr id="12" name="Graphique 11" descr="Actualiser">
+            <a:extLst>
+              <a:ext uri="{FF2B5EF4-FFF2-40B4-BE49-F238E27FC236}">
+                <a16:creationId xmlns:a16="http://schemas.microsoft.com/office/drawing/2014/main" id="{9489F746-EE44-4F66-8664-D00408CD640E}"/>
+              </a:ext>
+            </a:extLst>
+          </p:cNvPr>
+          <p:cNvPicPr>
+            <a:picLocks noChangeAspect="1"/>
+          </p:cNvPicPr>
+          <p:nvPr/>
+        </p:nvPicPr>
+        <p:blipFill>
+          <a:blip r:embed="rId8">
+            <a:extLst>
+              <a:ext uri="{96DAC541-7B7A-43D3-8B79-37D633B846F1}">
+                <asvg:svgBlip xmlns:asvg="http://schemas.microsoft.com/office/drawing/2016/SVG/main" r:embed="rId9"/>
+              </a:ext>
+            </a:extLst>
+          </a:blip>
+          <a:stretch>
+            <a:fillRect/>
+          </a:stretch>
+        </p:blipFill>
+        <p:spPr>
+          <a:xfrm>
+            <a:off x="9161147" y="3139719"/>
+            <a:ext cx="914400" cy="914400"/>
+          </a:xfrm>
+          <a:prstGeom prst="rect">
+            <a:avLst/>
+          </a:prstGeom>
+        </p:spPr>
+      </p:pic>
+      <p:pic>
+        <p:nvPicPr>
+          <p:cNvPr id="17" name="Graphique 16" descr="Tête avec engrenages">
+            <a:extLst>
+              <a:ext uri="{FF2B5EF4-FFF2-40B4-BE49-F238E27FC236}">
+                <a16:creationId xmlns:a16="http://schemas.microsoft.com/office/drawing/2014/main" id="{CAC4CC61-8AA2-42E5-953B-592A704E2740}"/>
+              </a:ext>
+            </a:extLst>
+          </p:cNvPr>
+          <p:cNvPicPr>
+            <a:picLocks noChangeAspect="1"/>
+          </p:cNvPicPr>
+          <p:nvPr/>
+        </p:nvPicPr>
+        <p:blipFill>
+          <a:blip r:embed="rId10">
+            <a:extLst>
+              <a:ext uri="{96DAC541-7B7A-43D3-8B79-37D633B846F1}">
+                <asvg:svgBlip xmlns:asvg="http://schemas.microsoft.com/office/drawing/2016/SVG/main" r:embed="rId11"/>
+              </a:ext>
+            </a:extLst>
+          </a:blip>
+          <a:stretch>
+            <a:fillRect/>
+          </a:stretch>
+        </p:blipFill>
+        <p:spPr>
+          <a:xfrm>
+            <a:off x="9696729" y="3801617"/>
+            <a:ext cx="914400" cy="914400"/>
+          </a:xfrm>
+          <a:prstGeom prst="rect">
+            <a:avLst/>
+          </a:prstGeom>
+        </p:spPr>
+      </p:pic>
     </p:spTree>
     <p:extLst>
       <p:ext uri="{BB962C8B-B14F-4D97-AF65-F5344CB8AC3E}">

</xml_diff>

<commit_message>
#12 Others colors updated on web page on solution slides
</commit_message>
<xml_diff>
--- a/SAI_presentation.pptx
+++ b/SAI_presentation.pptx
@@ -6942,7 +6942,7 @@
             <a:fld id="{B61BEF0D-F0BB-DE4B-95CE-6DB70DBA9567}" type="datetimeFigureOut">
               <a:rPr lang="en-US" dirty="0"/>
               <a:pPr/>
-              <a:t>3/28/2020</a:t>
+              <a:t>3/29/2020</a:t>
             </a:fld>
             <a:endParaRPr lang="en-US" dirty="0"/>
           </a:p>
@@ -7375,7 +7375,7 @@
             <a:fld id="{B61BEF0D-F0BB-DE4B-95CE-6DB70DBA9567}" type="datetimeFigureOut">
               <a:rPr lang="en-US" dirty="0"/>
               <a:pPr/>
-              <a:t>3/28/2020</a:t>
+              <a:t>3/29/2020</a:t>
             </a:fld>
             <a:endParaRPr lang="en-US" dirty="0"/>
           </a:p>
@@ -7622,7 +7622,7 @@
             <a:fld id="{B61BEF0D-F0BB-DE4B-95CE-6DB70DBA9567}" type="datetimeFigureOut">
               <a:rPr lang="en-US" dirty="0"/>
               <a:pPr/>
-              <a:t>3/28/2020</a:t>
+              <a:t>3/29/2020</a:t>
             </a:fld>
             <a:endParaRPr lang="en-US" dirty="0"/>
           </a:p>
@@ -7927,7 +7927,7 @@
             <a:fld id="{B61BEF0D-F0BB-DE4B-95CE-6DB70DBA9567}" type="datetimeFigureOut">
               <a:rPr lang="en-US" dirty="0"/>
               <a:pPr/>
-              <a:t>3/28/2020</a:t>
+              <a:t>3/29/2020</a:t>
             </a:fld>
             <a:endParaRPr lang="en-US" dirty="0"/>
           </a:p>
@@ -8242,7 +8242,7 @@
             <a:fld id="{B61BEF0D-F0BB-DE4B-95CE-6DB70DBA9567}" type="datetimeFigureOut">
               <a:rPr lang="en-US" dirty="0"/>
               <a:pPr/>
-              <a:t>3/28/2020</a:t>
+              <a:t>3/29/2020</a:t>
             </a:fld>
             <a:endParaRPr lang="en-US" dirty="0"/>
           </a:p>
@@ -8541,7 +8541,7 @@
             <a:fld id="{B61BEF0D-F0BB-DE4B-95CE-6DB70DBA9567}" type="datetimeFigureOut">
               <a:rPr lang="en-US" dirty="0"/>
               <a:pPr/>
-              <a:t>3/28/2020</a:t>
+              <a:t>3/29/2020</a:t>
             </a:fld>
             <a:endParaRPr lang="en-US" dirty="0"/>
           </a:p>
@@ -8905,7 +8905,7 @@
             <a:fld id="{B61BEF0D-F0BB-DE4B-95CE-6DB70DBA9567}" type="datetimeFigureOut">
               <a:rPr lang="en-US" dirty="0"/>
               <a:pPr/>
-              <a:t>3/28/2020</a:t>
+              <a:t>3/29/2020</a:t>
             </a:fld>
             <a:endParaRPr lang="en-US" dirty="0"/>
           </a:p>
@@ -9076,7 +9076,7 @@
             <a:fld id="{B61BEF0D-F0BB-DE4B-95CE-6DB70DBA9567}" type="datetimeFigureOut">
               <a:rPr lang="en-US" dirty="0"/>
               <a:pPr/>
-              <a:t>3/28/2020</a:t>
+              <a:t>3/29/2020</a:t>
             </a:fld>
             <a:endParaRPr lang="en-US" dirty="0"/>
           </a:p>
@@ -9253,7 +9253,7 @@
             <a:fld id="{B61BEF0D-F0BB-DE4B-95CE-6DB70DBA9567}" type="datetimeFigureOut">
               <a:rPr lang="en-US" dirty="0"/>
               <a:pPr/>
-              <a:t>3/28/2020</a:t>
+              <a:t>3/29/2020</a:t>
             </a:fld>
             <a:endParaRPr lang="en-US" dirty="0"/>
           </a:p>
@@ -9420,7 +9420,7 @@
             <a:fld id="{B61BEF0D-F0BB-DE4B-95CE-6DB70DBA9567}" type="datetimeFigureOut">
               <a:rPr lang="en-US" dirty="0"/>
               <a:pPr/>
-              <a:t>3/28/2020</a:t>
+              <a:t>3/29/2020</a:t>
             </a:fld>
             <a:endParaRPr lang="en-US" dirty="0"/>
           </a:p>
@@ -9667,7 +9667,7 @@
             <a:fld id="{B61BEF0D-F0BB-DE4B-95CE-6DB70DBA9567}" type="datetimeFigureOut">
               <a:rPr lang="en-US" dirty="0"/>
               <a:pPr/>
-              <a:t>3/28/2020</a:t>
+              <a:t>3/29/2020</a:t>
             </a:fld>
             <a:endParaRPr lang="en-US" dirty="0"/>
           </a:p>
@@ -9900,7 +9900,7 @@
             <a:fld id="{B61BEF0D-F0BB-DE4B-95CE-6DB70DBA9567}" type="datetimeFigureOut">
               <a:rPr lang="en-US" dirty="0"/>
               <a:pPr/>
-              <a:t>3/28/2020</a:t>
+              <a:t>3/29/2020</a:t>
             </a:fld>
             <a:endParaRPr lang="en-US" dirty="0"/>
           </a:p>
@@ -10279,7 +10279,7 @@
             <a:fld id="{B61BEF0D-F0BB-DE4B-95CE-6DB70DBA9567}" type="datetimeFigureOut">
               <a:rPr lang="en-US" dirty="0"/>
               <a:pPr/>
-              <a:t>3/28/2020</a:t>
+              <a:t>3/29/2020</a:t>
             </a:fld>
             <a:endParaRPr lang="en-US" dirty="0"/>
           </a:p>
@@ -10394,7 +10394,7 @@
             <a:fld id="{B61BEF0D-F0BB-DE4B-95CE-6DB70DBA9567}" type="datetimeFigureOut">
               <a:rPr lang="en-US" dirty="0"/>
               <a:pPr/>
-              <a:t>3/28/2020</a:t>
+              <a:t>3/29/2020</a:t>
             </a:fld>
             <a:endParaRPr lang="en-US" dirty="0"/>
           </a:p>
@@ -10486,7 +10486,7 @@
             <a:fld id="{B61BEF0D-F0BB-DE4B-95CE-6DB70DBA9567}" type="datetimeFigureOut">
               <a:rPr lang="en-US" dirty="0"/>
               <a:pPr/>
-              <a:t>3/28/2020</a:t>
+              <a:t>3/29/2020</a:t>
             </a:fld>
             <a:endParaRPr lang="en-US" dirty="0"/>
           </a:p>
@@ -10738,7 +10738,7 @@
             <a:fld id="{B61BEF0D-F0BB-DE4B-95CE-6DB70DBA9567}" type="datetimeFigureOut">
               <a:rPr lang="en-US" dirty="0"/>
               <a:pPr/>
-              <a:t>3/28/2020</a:t>
+              <a:t>3/29/2020</a:t>
             </a:fld>
             <a:endParaRPr lang="en-US" dirty="0"/>
           </a:p>
@@ -11018,7 +11018,7 @@
             <a:fld id="{B61BEF0D-F0BB-DE4B-95CE-6DB70DBA9567}" type="datetimeFigureOut">
               <a:rPr lang="en-US" dirty="0"/>
               <a:pPr/>
-              <a:t>3/28/2020</a:t>
+              <a:t>3/29/2020</a:t>
             </a:fld>
             <a:endParaRPr lang="en-US" dirty="0"/>
           </a:p>
@@ -11421,7 +11421,7 @@
             <a:fld id="{B61BEF0D-F0BB-DE4B-95CE-6DB70DBA9567}" type="datetimeFigureOut">
               <a:rPr lang="en-US" dirty="0"/>
               <a:pPr/>
-              <a:t>3/28/2020</a:t>
+              <a:t>3/29/2020</a:t>
             </a:fld>
             <a:endParaRPr lang="en-US" dirty="0"/>
           </a:p>
@@ -17701,21 +17701,61 @@
             </a:r>
             <a:r>
               <a:rPr lang="fr-FR" dirty="0"/>
-              <a:t> SAI record </a:t>
-            </a:r>
-            <a:r>
-              <a:rPr lang="fr-FR" dirty="0" err="1"/>
+              <a:t> </a:t>
+            </a:r>
+            <a:r>
+              <a:rPr lang="fr-FR" b="1" dirty="0">
+                <a:solidFill>
+                  <a:srgbClr val="FFC000"/>
+                </a:solidFill>
+              </a:rPr>
+              <a:t>SAI</a:t>
+            </a:r>
+            <a:r>
+              <a:rPr lang="fr-FR" dirty="0"/>
+              <a:t> record </a:t>
+            </a:r>
+            <a:r>
+              <a:rPr lang="fr-FR" b="1" dirty="0" err="1">
+                <a:solidFill>
+                  <a:schemeClr val="accent3">
+                    <a:lumMod val="60000"/>
+                    <a:lumOff val="40000"/>
+                  </a:schemeClr>
+                </a:solidFill>
+              </a:rPr>
               <a:t>during</a:t>
             </a:r>
             <a:r>
-              <a:rPr lang="fr-FR" dirty="0"/>
+              <a:rPr lang="fr-FR" b="1" dirty="0">
+                <a:solidFill>
+                  <a:schemeClr val="accent3">
+                    <a:lumMod val="60000"/>
+                    <a:lumOff val="40000"/>
+                  </a:schemeClr>
+                </a:solidFill>
+              </a:rPr>
               <a:t> the </a:t>
             </a:r>
             <a:r>
-              <a:rPr lang="fr-FR" dirty="0" err="1"/>
+              <a:rPr lang="fr-FR" b="1" dirty="0" err="1">
+                <a:solidFill>
+                  <a:schemeClr val="accent3">
+                    <a:lumMod val="60000"/>
+                    <a:lumOff val="40000"/>
+                  </a:schemeClr>
+                </a:solidFill>
+              </a:rPr>
               <a:t>day</a:t>
             </a:r>
-            <a:endParaRPr lang="fr-FR" dirty="0"/>
+            <a:endParaRPr lang="fr-FR" b="1" dirty="0">
+              <a:solidFill>
+                <a:schemeClr val="accent3">
+                  <a:lumMod val="60000"/>
+                  <a:lumOff val="40000"/>
+                </a:schemeClr>
+              </a:solidFill>
+            </a:endParaRPr>
           </a:p>
           <a:p>
             <a:r>
@@ -17806,7 +17846,7 @@
         </p:blipFill>
         <p:spPr>
           <a:xfrm>
-            <a:off x="5485349" y="3843867"/>
+            <a:off x="5028149" y="4248269"/>
             <a:ext cx="914400" cy="914400"/>
           </a:xfrm>
           <a:prstGeom prst="rect">
@@ -17842,7 +17882,7 @@
         </p:blipFill>
         <p:spPr>
           <a:xfrm>
-            <a:off x="5963466" y="4620703"/>
+            <a:off x="5506266" y="5025105"/>
             <a:ext cx="914400" cy="914400"/>
           </a:xfrm>
           <a:prstGeom prst="rect">
@@ -17878,7 +17918,7 @@
         </p:blipFill>
         <p:spPr>
           <a:xfrm>
-            <a:off x="6499841" y="3843867"/>
+            <a:off x="6042641" y="4248269"/>
             <a:ext cx="914400" cy="914400"/>
           </a:xfrm>
           <a:prstGeom prst="rect">
@@ -17914,7 +17954,7 @@
         </p:blipFill>
         <p:spPr>
           <a:xfrm>
-            <a:off x="9011147" y="2989719"/>
+            <a:off x="8761411" y="2319245"/>
             <a:ext cx="914400" cy="914400"/>
           </a:xfrm>
           <a:prstGeom prst="rect">
@@ -17950,7 +17990,7 @@
         </p:blipFill>
         <p:spPr>
           <a:xfrm>
-            <a:off x="9161147" y="3139719"/>
+            <a:off x="7961576" y="2587098"/>
             <a:ext cx="914400" cy="914400"/>
           </a:xfrm>
           <a:prstGeom prst="rect">
@@ -17986,7 +18026,7 @@
         </p:blipFill>
         <p:spPr>
           <a:xfrm>
-            <a:off x="9696729" y="3801617"/>
+            <a:off x="3363556" y="4030132"/>
             <a:ext cx="914400" cy="914400"/>
           </a:xfrm>
           <a:prstGeom prst="rect">

</xml_diff>

<commit_message>
#12 Arrows added for record on web page on solution slides
</commit_message>
<xml_diff>
--- a/SAI_presentation.pptx
+++ b/SAI_presentation.pptx
@@ -17713,7 +17713,21 @@
             </a:r>
             <a:r>
               <a:rPr lang="fr-FR" dirty="0"/>
-              <a:t> record </a:t>
+              <a:t> </a:t>
+            </a:r>
+            <a:r>
+              <a:rPr lang="fr-FR" b="1" dirty="0">
+                <a:solidFill>
+                  <a:schemeClr val="tx1">
+                    <a:lumMod val="85000"/>
+                  </a:schemeClr>
+                </a:solidFill>
+              </a:rPr>
+              <a:t>record</a:t>
+            </a:r>
+            <a:r>
+              <a:rPr lang="fr-FR" dirty="0"/>
+              <a:t> </a:t>
             </a:r>
             <a:r>
               <a:rPr lang="fr-FR" b="1" dirty="0" err="1">
@@ -18026,7 +18040,7 @@
         </p:blipFill>
         <p:spPr>
           <a:xfrm>
-            <a:off x="3363556" y="4030132"/>
+            <a:off x="2973388" y="3863592"/>
             <a:ext cx="914400" cy="914400"/>
           </a:xfrm>
           <a:prstGeom prst="rect">
@@ -18034,6 +18048,141 @@
           </a:prstGeom>
         </p:spPr>
       </p:pic>
+      <p:cxnSp>
+        <p:nvCxnSpPr>
+          <p:cNvPr id="11" name="Connecteur droit avec flèche 10">
+            <a:extLst>
+              <a:ext uri="{FF2B5EF4-FFF2-40B4-BE49-F238E27FC236}">
+                <a16:creationId xmlns:a16="http://schemas.microsoft.com/office/drawing/2014/main" id="{49046588-8882-40B8-AFD8-13FBAD213412}"/>
+              </a:ext>
+            </a:extLst>
+          </p:cNvPr>
+          <p:cNvCxnSpPr/>
+          <p:nvPr/>
+        </p:nvCxnSpPr>
+        <p:spPr>
+          <a:xfrm>
+            <a:off x="4012707" y="4487332"/>
+            <a:ext cx="1493559" cy="857025"/>
+          </a:xfrm>
+          <a:prstGeom prst="straightConnector1">
+            <a:avLst/>
+          </a:prstGeom>
+          <a:ln>
+            <a:solidFill>
+              <a:schemeClr val="tx1">
+                <a:lumMod val="85000"/>
+                <a:alpha val="60000"/>
+              </a:schemeClr>
+            </a:solidFill>
+            <a:tailEnd type="triangle"/>
+          </a:ln>
+        </p:spPr>
+        <p:style>
+          <a:lnRef idx="1">
+            <a:schemeClr val="accent1"/>
+          </a:lnRef>
+          <a:fillRef idx="0">
+            <a:schemeClr val="accent1"/>
+          </a:fillRef>
+          <a:effectRef idx="0">
+            <a:schemeClr val="accent1"/>
+          </a:effectRef>
+          <a:fontRef idx="minor">
+            <a:schemeClr val="tx1"/>
+          </a:fontRef>
+        </p:style>
+      </p:cxnSp>
+      <p:cxnSp>
+        <p:nvCxnSpPr>
+          <p:cNvPr id="14" name="Connecteur droit avec flèche 13">
+            <a:extLst>
+              <a:ext uri="{FF2B5EF4-FFF2-40B4-BE49-F238E27FC236}">
+                <a16:creationId xmlns:a16="http://schemas.microsoft.com/office/drawing/2014/main" id="{A8DB9E10-DB04-4D81-B1EF-92D338CE39DA}"/>
+              </a:ext>
+            </a:extLst>
+          </p:cNvPr>
+          <p:cNvCxnSpPr/>
+          <p:nvPr/>
+        </p:nvCxnSpPr>
+        <p:spPr>
+          <a:xfrm>
+            <a:off x="4012707" y="4248269"/>
+            <a:ext cx="2029934" cy="239063"/>
+          </a:xfrm>
+          <a:prstGeom prst="straightConnector1">
+            <a:avLst/>
+          </a:prstGeom>
+          <a:ln>
+            <a:solidFill>
+              <a:schemeClr val="tx1">
+                <a:lumMod val="85000"/>
+                <a:alpha val="60000"/>
+              </a:schemeClr>
+            </a:solidFill>
+            <a:tailEnd type="triangle"/>
+          </a:ln>
+        </p:spPr>
+        <p:style>
+          <a:lnRef idx="1">
+            <a:schemeClr val="accent1"/>
+          </a:lnRef>
+          <a:fillRef idx="0">
+            <a:schemeClr val="accent1"/>
+          </a:fillRef>
+          <a:effectRef idx="0">
+            <a:schemeClr val="accent1"/>
+          </a:effectRef>
+          <a:fontRef idx="minor">
+            <a:schemeClr val="tx1"/>
+          </a:fontRef>
+        </p:style>
+      </p:cxnSp>
+      <p:cxnSp>
+        <p:nvCxnSpPr>
+          <p:cNvPr id="16" name="Connecteur droit avec flèche 15">
+            <a:extLst>
+              <a:ext uri="{FF2B5EF4-FFF2-40B4-BE49-F238E27FC236}">
+                <a16:creationId xmlns:a16="http://schemas.microsoft.com/office/drawing/2014/main" id="{8119E420-423A-45B3-A215-0D0CB95A378F}"/>
+              </a:ext>
+            </a:extLst>
+          </p:cNvPr>
+          <p:cNvCxnSpPr/>
+          <p:nvPr/>
+        </p:nvCxnSpPr>
+        <p:spPr>
+          <a:xfrm>
+            <a:off x="4012707" y="4367800"/>
+            <a:ext cx="938705" cy="239711"/>
+          </a:xfrm>
+          <a:prstGeom prst="straightConnector1">
+            <a:avLst/>
+          </a:prstGeom>
+          <a:ln>
+            <a:solidFill>
+              <a:schemeClr val="tx1">
+                <a:lumMod val="85000"/>
+                <a:alpha val="60000"/>
+              </a:schemeClr>
+            </a:solidFill>
+            <a:tailEnd type="triangle"/>
+          </a:ln>
+        </p:spPr>
+        <p:style>
+          <a:lnRef idx="1">
+            <a:schemeClr val="accent1"/>
+          </a:lnRef>
+          <a:fillRef idx="0">
+            <a:schemeClr val="accent1"/>
+          </a:fillRef>
+          <a:effectRef idx="0">
+            <a:schemeClr val="accent1"/>
+          </a:effectRef>
+          <a:fontRef idx="minor">
+            <a:schemeClr val="tx1"/>
+          </a:fontRef>
+        </p:style>
+      </p:cxnSp>
     </p:spTree>
     <p:extLst>
       <p:ext uri="{BB962C8B-B14F-4D97-AF65-F5344CB8AC3E}">

</xml_diff>

<commit_message>
#12 During the day color updated on web page on solution slides
</commit_message>
<xml_diff>
--- a/SAI_presentation.pptx
+++ b/SAI_presentation.pptx
@@ -17968,7 +17968,7 @@
         </p:blipFill>
         <p:spPr>
           <a:xfrm>
-            <a:off x="8761411" y="2319245"/>
+            <a:off x="7944505" y="2602536"/>
             <a:ext cx="914400" cy="914400"/>
           </a:xfrm>
           <a:prstGeom prst="rect">
@@ -18004,8 +18004,8 @@
         </p:blipFill>
         <p:spPr>
           <a:xfrm>
-            <a:off x="7961576" y="2587098"/>
-            <a:ext cx="914400" cy="914400"/>
+            <a:off x="6671159" y="3059736"/>
+            <a:ext cx="571764" cy="571764"/>
           </a:xfrm>
           <a:prstGeom prst="rect">
             <a:avLst/>
@@ -18162,6 +18162,55 @@
             <a:solidFill>
               <a:schemeClr val="tx1">
                 <a:lumMod val="85000"/>
+                <a:alpha val="60000"/>
+              </a:schemeClr>
+            </a:solidFill>
+            <a:tailEnd type="triangle"/>
+          </a:ln>
+        </p:spPr>
+        <p:style>
+          <a:lnRef idx="1">
+            <a:schemeClr val="accent1"/>
+          </a:lnRef>
+          <a:fillRef idx="0">
+            <a:schemeClr val="accent1"/>
+          </a:fillRef>
+          <a:effectRef idx="0">
+            <a:schemeClr val="accent1"/>
+          </a:effectRef>
+          <a:fontRef idx="minor">
+            <a:schemeClr val="tx1"/>
+          </a:fontRef>
+        </p:style>
+      </p:cxnSp>
+      <p:cxnSp>
+        <p:nvCxnSpPr>
+          <p:cNvPr id="13" name="Connecteur droit avec flèche 12">
+            <a:extLst>
+              <a:ext uri="{FF2B5EF4-FFF2-40B4-BE49-F238E27FC236}">
+                <a16:creationId xmlns:a16="http://schemas.microsoft.com/office/drawing/2014/main" id="{FD02414A-A8CC-49B9-852E-816555F7BD14}"/>
+              </a:ext>
+            </a:extLst>
+          </p:cNvPr>
+          <p:cNvCxnSpPr>
+            <a:cxnSpLocks/>
+            <a:stCxn id="12" idx="3"/>
+          </p:cNvCxnSpPr>
+          <p:nvPr/>
+        </p:nvCxnSpPr>
+        <p:spPr>
+          <a:xfrm flipV="1">
+            <a:off x="7242923" y="3222596"/>
+            <a:ext cx="629666" cy="123022"/>
+          </a:xfrm>
+          <a:prstGeom prst="straightConnector1">
+            <a:avLst/>
+          </a:prstGeom>
+          <a:ln>
+            <a:solidFill>
+              <a:schemeClr val="accent3">
+                <a:lumMod val="40000"/>
+                <a:lumOff val="60000"/>
                 <a:alpha val="60000"/>
               </a:schemeClr>
             </a:solidFill>

</xml_diff>

<commit_message>
#12 Icons on strategy learning added on solutions slides
</commit_message>
<xml_diff>
--- a/SAI_presentation.pptx
+++ b/SAI_presentation.pptx
@@ -6942,7 +6942,7 @@
             <a:fld id="{B61BEF0D-F0BB-DE4B-95CE-6DB70DBA9567}" type="datetimeFigureOut">
               <a:rPr lang="en-US" dirty="0"/>
               <a:pPr/>
-              <a:t>3/29/2020</a:t>
+              <a:t>3/30/2020</a:t>
             </a:fld>
             <a:endParaRPr lang="en-US" dirty="0"/>
           </a:p>
@@ -7375,7 +7375,7 @@
             <a:fld id="{B61BEF0D-F0BB-DE4B-95CE-6DB70DBA9567}" type="datetimeFigureOut">
               <a:rPr lang="en-US" dirty="0"/>
               <a:pPr/>
-              <a:t>3/29/2020</a:t>
+              <a:t>3/30/2020</a:t>
             </a:fld>
             <a:endParaRPr lang="en-US" dirty="0"/>
           </a:p>
@@ -7622,7 +7622,7 @@
             <a:fld id="{B61BEF0D-F0BB-DE4B-95CE-6DB70DBA9567}" type="datetimeFigureOut">
               <a:rPr lang="en-US" dirty="0"/>
               <a:pPr/>
-              <a:t>3/29/2020</a:t>
+              <a:t>3/30/2020</a:t>
             </a:fld>
             <a:endParaRPr lang="en-US" dirty="0"/>
           </a:p>
@@ -7927,7 +7927,7 @@
             <a:fld id="{B61BEF0D-F0BB-DE4B-95CE-6DB70DBA9567}" type="datetimeFigureOut">
               <a:rPr lang="en-US" dirty="0"/>
               <a:pPr/>
-              <a:t>3/29/2020</a:t>
+              <a:t>3/30/2020</a:t>
             </a:fld>
             <a:endParaRPr lang="en-US" dirty="0"/>
           </a:p>
@@ -8242,7 +8242,7 @@
             <a:fld id="{B61BEF0D-F0BB-DE4B-95CE-6DB70DBA9567}" type="datetimeFigureOut">
               <a:rPr lang="en-US" dirty="0"/>
               <a:pPr/>
-              <a:t>3/29/2020</a:t>
+              <a:t>3/30/2020</a:t>
             </a:fld>
             <a:endParaRPr lang="en-US" dirty="0"/>
           </a:p>
@@ -8541,7 +8541,7 @@
             <a:fld id="{B61BEF0D-F0BB-DE4B-95CE-6DB70DBA9567}" type="datetimeFigureOut">
               <a:rPr lang="en-US" dirty="0"/>
               <a:pPr/>
-              <a:t>3/29/2020</a:t>
+              <a:t>3/30/2020</a:t>
             </a:fld>
             <a:endParaRPr lang="en-US" dirty="0"/>
           </a:p>
@@ -8905,7 +8905,7 @@
             <a:fld id="{B61BEF0D-F0BB-DE4B-95CE-6DB70DBA9567}" type="datetimeFigureOut">
               <a:rPr lang="en-US" dirty="0"/>
               <a:pPr/>
-              <a:t>3/29/2020</a:t>
+              <a:t>3/30/2020</a:t>
             </a:fld>
             <a:endParaRPr lang="en-US" dirty="0"/>
           </a:p>
@@ -9076,7 +9076,7 @@
             <a:fld id="{B61BEF0D-F0BB-DE4B-95CE-6DB70DBA9567}" type="datetimeFigureOut">
               <a:rPr lang="en-US" dirty="0"/>
               <a:pPr/>
-              <a:t>3/29/2020</a:t>
+              <a:t>3/30/2020</a:t>
             </a:fld>
             <a:endParaRPr lang="en-US" dirty="0"/>
           </a:p>
@@ -9253,7 +9253,7 @@
             <a:fld id="{B61BEF0D-F0BB-DE4B-95CE-6DB70DBA9567}" type="datetimeFigureOut">
               <a:rPr lang="en-US" dirty="0"/>
               <a:pPr/>
-              <a:t>3/29/2020</a:t>
+              <a:t>3/30/2020</a:t>
             </a:fld>
             <a:endParaRPr lang="en-US" dirty="0"/>
           </a:p>
@@ -9420,7 +9420,7 @@
             <a:fld id="{B61BEF0D-F0BB-DE4B-95CE-6DB70DBA9567}" type="datetimeFigureOut">
               <a:rPr lang="en-US" dirty="0"/>
               <a:pPr/>
-              <a:t>3/29/2020</a:t>
+              <a:t>3/30/2020</a:t>
             </a:fld>
             <a:endParaRPr lang="en-US" dirty="0"/>
           </a:p>
@@ -9667,7 +9667,7 @@
             <a:fld id="{B61BEF0D-F0BB-DE4B-95CE-6DB70DBA9567}" type="datetimeFigureOut">
               <a:rPr lang="en-US" dirty="0"/>
               <a:pPr/>
-              <a:t>3/29/2020</a:t>
+              <a:t>3/30/2020</a:t>
             </a:fld>
             <a:endParaRPr lang="en-US" dirty="0"/>
           </a:p>
@@ -9900,7 +9900,7 @@
             <a:fld id="{B61BEF0D-F0BB-DE4B-95CE-6DB70DBA9567}" type="datetimeFigureOut">
               <a:rPr lang="en-US" dirty="0"/>
               <a:pPr/>
-              <a:t>3/29/2020</a:t>
+              <a:t>3/30/2020</a:t>
             </a:fld>
             <a:endParaRPr lang="en-US" dirty="0"/>
           </a:p>
@@ -10279,7 +10279,7 @@
             <a:fld id="{B61BEF0D-F0BB-DE4B-95CE-6DB70DBA9567}" type="datetimeFigureOut">
               <a:rPr lang="en-US" dirty="0"/>
               <a:pPr/>
-              <a:t>3/29/2020</a:t>
+              <a:t>3/30/2020</a:t>
             </a:fld>
             <a:endParaRPr lang="en-US" dirty="0"/>
           </a:p>
@@ -10394,7 +10394,7 @@
             <a:fld id="{B61BEF0D-F0BB-DE4B-95CE-6DB70DBA9567}" type="datetimeFigureOut">
               <a:rPr lang="en-US" dirty="0"/>
               <a:pPr/>
-              <a:t>3/29/2020</a:t>
+              <a:t>3/30/2020</a:t>
             </a:fld>
             <a:endParaRPr lang="en-US" dirty="0"/>
           </a:p>
@@ -10486,7 +10486,7 @@
             <a:fld id="{B61BEF0D-F0BB-DE4B-95CE-6DB70DBA9567}" type="datetimeFigureOut">
               <a:rPr lang="en-US" dirty="0"/>
               <a:pPr/>
-              <a:t>3/29/2020</a:t>
+              <a:t>3/30/2020</a:t>
             </a:fld>
             <a:endParaRPr lang="en-US" dirty="0"/>
           </a:p>
@@ -10738,7 +10738,7 @@
             <a:fld id="{B61BEF0D-F0BB-DE4B-95CE-6DB70DBA9567}" type="datetimeFigureOut">
               <a:rPr lang="en-US" dirty="0"/>
               <a:pPr/>
-              <a:t>3/29/2020</a:t>
+              <a:t>3/30/2020</a:t>
             </a:fld>
             <a:endParaRPr lang="en-US" dirty="0"/>
           </a:p>
@@ -11018,7 +11018,7 @@
             <a:fld id="{B61BEF0D-F0BB-DE4B-95CE-6DB70DBA9567}" type="datetimeFigureOut">
               <a:rPr lang="en-US" dirty="0"/>
               <a:pPr/>
-              <a:t>3/29/2020</a:t>
+              <a:t>3/30/2020</a:t>
             </a:fld>
             <a:endParaRPr lang="en-US" dirty="0"/>
           </a:p>
@@ -11421,7 +11421,7 @@
             <a:fld id="{B61BEF0D-F0BB-DE4B-95CE-6DB70DBA9567}" type="datetimeFigureOut">
               <a:rPr lang="en-US" dirty="0"/>
               <a:pPr/>
-              <a:t>3/29/2020</a:t>
+              <a:t>3/30/2020</a:t>
             </a:fld>
             <a:endParaRPr lang="en-US" dirty="0"/>
           </a:p>
@@ -17771,29 +17771,6 @@
               </a:solidFill>
             </a:endParaRPr>
           </a:p>
-          <a:p>
-            <a:r>
-              <a:rPr lang="fr-FR" dirty="0" err="1"/>
-              <a:t>Explain</a:t>
-            </a:r>
-            <a:r>
-              <a:rPr lang="fr-FR" dirty="0"/>
-              <a:t> </a:t>
-            </a:r>
-            <a:r>
-              <a:rPr lang="fr-FR" dirty="0" err="1"/>
-              <a:t>with</a:t>
-            </a:r>
-            <a:r>
-              <a:rPr lang="fr-FR" dirty="0"/>
-              <a:t> a </a:t>
-            </a:r>
-            <a:r>
-              <a:rPr lang="fr-FR" dirty="0" err="1"/>
-              <a:t>schema</a:t>
-            </a:r>
-            <a:endParaRPr lang="en-GB" dirty="0"/>
-          </a:p>
         </p:txBody>
       </p:sp>
       <p:pic>
@@ -18407,13 +18384,386 @@
               <a:t> a </a:t>
             </a:r>
             <a:r>
-              <a:rPr lang="fr-FR"/>
+              <a:rPr lang="fr-FR" dirty="0" err="1"/>
               <a:t>schema</a:t>
             </a:r>
-            <a:endParaRPr lang="en-GB"/>
+            <a:endParaRPr lang="en-GB" dirty="0"/>
           </a:p>
         </p:txBody>
       </p:sp>
+      <p:sp>
+        <p:nvSpPr>
+          <p:cNvPr id="4" name="Rectangle 3">
+            <a:extLst>
+              <a:ext uri="{FF2B5EF4-FFF2-40B4-BE49-F238E27FC236}">
+                <a16:creationId xmlns:a16="http://schemas.microsoft.com/office/drawing/2014/main" id="{64413460-5A15-4874-858D-35057B41DD79}"/>
+              </a:ext>
+            </a:extLst>
+          </p:cNvPr>
+          <p:cNvSpPr/>
+          <p:nvPr/>
+        </p:nvSpPr>
+        <p:spPr>
+          <a:xfrm>
+            <a:off x="5430541" y="2730615"/>
+            <a:ext cx="2689934" cy="3719744"/>
+          </a:xfrm>
+          <a:prstGeom prst="rect">
+            <a:avLst/>
+          </a:prstGeom>
+          <a:solidFill>
+            <a:schemeClr val="tx1">
+              <a:lumMod val="95000"/>
+            </a:schemeClr>
+          </a:solidFill>
+          <a:ln>
+            <a:solidFill>
+              <a:schemeClr val="tx1">
+                <a:lumMod val="95000"/>
+              </a:schemeClr>
+            </a:solidFill>
+          </a:ln>
+        </p:spPr>
+        <p:style>
+          <a:lnRef idx="2">
+            <a:schemeClr val="accent1">
+              <a:shade val="50000"/>
+            </a:schemeClr>
+          </a:lnRef>
+          <a:fillRef idx="1">
+            <a:schemeClr val="accent1"/>
+          </a:fillRef>
+          <a:effectRef idx="0">
+            <a:schemeClr val="accent1"/>
+          </a:effectRef>
+          <a:fontRef idx="minor">
+            <a:schemeClr val="lt1"/>
+          </a:fontRef>
+        </p:style>
+        <p:txBody>
+          <a:bodyPr rtlCol="0" anchor="ctr"/>
+          <a:lstStyle/>
+          <a:p>
+            <a:pPr algn="ctr"/>
+            <a:endParaRPr lang="en-GB"/>
+          </a:p>
+        </p:txBody>
+      </p:sp>
+      <p:pic>
+        <p:nvPicPr>
+          <p:cNvPr id="5" name="Graphique 4" descr="Monde">
+            <a:extLst>
+              <a:ext uri="{FF2B5EF4-FFF2-40B4-BE49-F238E27FC236}">
+                <a16:creationId xmlns:a16="http://schemas.microsoft.com/office/drawing/2014/main" id="{D9F63643-CA9D-4FB8-8F6F-98B64A36E37D}"/>
+              </a:ext>
+            </a:extLst>
+          </p:cNvPr>
+          <p:cNvPicPr>
+            <a:picLocks noChangeAspect="1"/>
+          </p:cNvPicPr>
+          <p:nvPr/>
+        </p:nvPicPr>
+        <p:blipFill>
+          <a:blip r:embed="rId2">
+            <a:extLst>
+              <a:ext uri="{96DAC541-7B7A-43D3-8B79-37D633B846F1}">
+                <asvg:svgBlip xmlns:asvg="http://schemas.microsoft.com/office/drawing/2016/SVG/main" r:embed="rId3"/>
+              </a:ext>
+            </a:extLst>
+          </a:blip>
+          <a:stretch>
+            <a:fillRect/>
+          </a:stretch>
+        </p:blipFill>
+        <p:spPr>
+          <a:xfrm>
+            <a:off x="5523076" y="2821939"/>
+            <a:ext cx="641781" cy="641781"/>
+          </a:xfrm>
+          <a:prstGeom prst="rect">
+            <a:avLst/>
+          </a:prstGeom>
+        </p:spPr>
+      </p:pic>
+      <p:pic>
+        <p:nvPicPr>
+          <p:cNvPr id="6" name="Graphique 5" descr="Ampoule et engrenage">
+            <a:extLst>
+              <a:ext uri="{FF2B5EF4-FFF2-40B4-BE49-F238E27FC236}">
+                <a16:creationId xmlns:a16="http://schemas.microsoft.com/office/drawing/2014/main" id="{0B4A8D7A-4CDC-4721-B4A2-E392D6359560}"/>
+              </a:ext>
+            </a:extLst>
+          </p:cNvPr>
+          <p:cNvPicPr>
+            <a:picLocks noChangeAspect="1"/>
+          </p:cNvPicPr>
+          <p:nvPr/>
+        </p:nvPicPr>
+        <p:blipFill>
+          <a:blip r:embed="rId4">
+            <a:extLst>
+              <a:ext uri="{96DAC541-7B7A-43D3-8B79-37D633B846F1}">
+                <asvg:svgBlip xmlns:asvg="http://schemas.microsoft.com/office/drawing/2016/SVG/main" r:embed="rId5"/>
+              </a:ext>
+            </a:extLst>
+          </a:blip>
+          <a:stretch>
+            <a:fillRect/>
+          </a:stretch>
+        </p:blipFill>
+        <p:spPr>
+          <a:xfrm>
+            <a:off x="5707657" y="4080489"/>
+            <a:ext cx="914400" cy="914400"/>
+          </a:xfrm>
+          <a:prstGeom prst="rect">
+            <a:avLst/>
+          </a:prstGeom>
+        </p:spPr>
+      </p:pic>
+      <p:pic>
+        <p:nvPicPr>
+          <p:cNvPr id="7" name="Graphique 6" descr="Ampoule et engrenage">
+            <a:extLst>
+              <a:ext uri="{FF2B5EF4-FFF2-40B4-BE49-F238E27FC236}">
+                <a16:creationId xmlns:a16="http://schemas.microsoft.com/office/drawing/2014/main" id="{CC2F196C-46B2-43F8-BBE0-697B73CF5F4D}"/>
+              </a:ext>
+            </a:extLst>
+          </p:cNvPr>
+          <p:cNvPicPr>
+            <a:picLocks noChangeAspect="1"/>
+          </p:cNvPicPr>
+          <p:nvPr/>
+        </p:nvPicPr>
+        <p:blipFill>
+          <a:blip r:embed="rId4">
+            <a:extLst>
+              <a:ext uri="{96DAC541-7B7A-43D3-8B79-37D633B846F1}">
+                <asvg:svgBlip xmlns:asvg="http://schemas.microsoft.com/office/drawing/2016/SVG/main" r:embed="rId5"/>
+              </a:ext>
+            </a:extLst>
+          </a:blip>
+          <a:stretch>
+            <a:fillRect/>
+          </a:stretch>
+        </p:blipFill>
+        <p:spPr>
+          <a:xfrm>
+            <a:off x="6185774" y="4857325"/>
+            <a:ext cx="914400" cy="914400"/>
+          </a:xfrm>
+          <a:prstGeom prst="rect">
+            <a:avLst/>
+          </a:prstGeom>
+        </p:spPr>
+      </p:pic>
+      <p:pic>
+        <p:nvPicPr>
+          <p:cNvPr id="8" name="Graphique 7" descr="Ampoule et engrenage">
+            <a:extLst>
+              <a:ext uri="{FF2B5EF4-FFF2-40B4-BE49-F238E27FC236}">
+                <a16:creationId xmlns:a16="http://schemas.microsoft.com/office/drawing/2014/main" id="{8A20387E-13B3-477D-8EBA-DC0B14E2E4C9}"/>
+              </a:ext>
+            </a:extLst>
+          </p:cNvPr>
+          <p:cNvPicPr>
+            <a:picLocks noChangeAspect="1"/>
+          </p:cNvPicPr>
+          <p:nvPr/>
+        </p:nvPicPr>
+        <p:blipFill>
+          <a:blip r:embed="rId4">
+            <a:extLst>
+              <a:ext uri="{96DAC541-7B7A-43D3-8B79-37D633B846F1}">
+                <asvg:svgBlip xmlns:asvg="http://schemas.microsoft.com/office/drawing/2016/SVG/main" r:embed="rId5"/>
+              </a:ext>
+            </a:extLst>
+          </a:blip>
+          <a:stretch>
+            <a:fillRect/>
+          </a:stretch>
+        </p:blipFill>
+        <p:spPr>
+          <a:xfrm>
+            <a:off x="6722149" y="4080489"/>
+            <a:ext cx="914400" cy="914400"/>
+          </a:xfrm>
+          <a:prstGeom prst="rect">
+            <a:avLst/>
+          </a:prstGeom>
+        </p:spPr>
+      </p:pic>
+      <p:pic>
+        <p:nvPicPr>
+          <p:cNvPr id="9" name="Graphique 8" descr="Tête avec engrenages">
+            <a:extLst>
+              <a:ext uri="{FF2B5EF4-FFF2-40B4-BE49-F238E27FC236}">
+                <a16:creationId xmlns:a16="http://schemas.microsoft.com/office/drawing/2014/main" id="{1A18EF52-3E85-46E2-94A7-ACFE71EE9F80}"/>
+              </a:ext>
+            </a:extLst>
+          </p:cNvPr>
+          <p:cNvPicPr>
+            <a:picLocks noChangeAspect="1"/>
+          </p:cNvPicPr>
+          <p:nvPr/>
+        </p:nvPicPr>
+        <p:blipFill>
+          <a:blip r:embed="rId6">
+            <a:extLst>
+              <a:ext uri="{96DAC541-7B7A-43D3-8B79-37D633B846F1}">
+                <asvg:svgBlip xmlns:asvg="http://schemas.microsoft.com/office/drawing/2016/SVG/main" r:embed="rId7"/>
+              </a:ext>
+            </a:extLst>
+          </a:blip>
+          <a:stretch>
+            <a:fillRect/>
+          </a:stretch>
+        </p:blipFill>
+        <p:spPr>
+          <a:xfrm>
+            <a:off x="3652896" y="3695812"/>
+            <a:ext cx="914400" cy="914400"/>
+          </a:xfrm>
+          <a:prstGeom prst="rect">
+            <a:avLst/>
+          </a:prstGeom>
+        </p:spPr>
+      </p:pic>
+      <p:cxnSp>
+        <p:nvCxnSpPr>
+          <p:cNvPr id="10" name="Connecteur droit avec flèche 9">
+            <a:extLst>
+              <a:ext uri="{FF2B5EF4-FFF2-40B4-BE49-F238E27FC236}">
+                <a16:creationId xmlns:a16="http://schemas.microsoft.com/office/drawing/2014/main" id="{11A88239-3F78-4E8E-80D1-7DBAAF35F143}"/>
+              </a:ext>
+            </a:extLst>
+          </p:cNvPr>
+          <p:cNvCxnSpPr/>
+          <p:nvPr/>
+        </p:nvCxnSpPr>
+        <p:spPr>
+          <a:xfrm>
+            <a:off x="4692215" y="4319552"/>
+            <a:ext cx="1493559" cy="857025"/>
+          </a:xfrm>
+          <a:prstGeom prst="straightConnector1">
+            <a:avLst/>
+          </a:prstGeom>
+          <a:ln>
+            <a:solidFill>
+              <a:schemeClr val="tx1">
+                <a:lumMod val="85000"/>
+                <a:alpha val="60000"/>
+              </a:schemeClr>
+            </a:solidFill>
+            <a:tailEnd type="triangle"/>
+          </a:ln>
+        </p:spPr>
+        <p:style>
+          <a:lnRef idx="1">
+            <a:schemeClr val="accent1"/>
+          </a:lnRef>
+          <a:fillRef idx="0">
+            <a:schemeClr val="accent1"/>
+          </a:fillRef>
+          <a:effectRef idx="0">
+            <a:schemeClr val="accent1"/>
+          </a:effectRef>
+          <a:fontRef idx="minor">
+            <a:schemeClr val="tx1"/>
+          </a:fontRef>
+        </p:style>
+      </p:cxnSp>
+      <p:cxnSp>
+        <p:nvCxnSpPr>
+          <p:cNvPr id="11" name="Connecteur droit avec flèche 10">
+            <a:extLst>
+              <a:ext uri="{FF2B5EF4-FFF2-40B4-BE49-F238E27FC236}">
+                <a16:creationId xmlns:a16="http://schemas.microsoft.com/office/drawing/2014/main" id="{2E3A1095-3C96-4071-BA14-802B2DB85EF6}"/>
+              </a:ext>
+            </a:extLst>
+          </p:cNvPr>
+          <p:cNvCxnSpPr/>
+          <p:nvPr/>
+        </p:nvCxnSpPr>
+        <p:spPr>
+          <a:xfrm>
+            <a:off x="4692215" y="4080489"/>
+            <a:ext cx="2029934" cy="239063"/>
+          </a:xfrm>
+          <a:prstGeom prst="straightConnector1">
+            <a:avLst/>
+          </a:prstGeom>
+          <a:ln>
+            <a:solidFill>
+              <a:schemeClr val="tx1">
+                <a:lumMod val="85000"/>
+                <a:alpha val="60000"/>
+              </a:schemeClr>
+            </a:solidFill>
+            <a:tailEnd type="triangle"/>
+          </a:ln>
+        </p:spPr>
+        <p:style>
+          <a:lnRef idx="1">
+            <a:schemeClr val="accent1"/>
+          </a:lnRef>
+          <a:fillRef idx="0">
+            <a:schemeClr val="accent1"/>
+          </a:fillRef>
+          <a:effectRef idx="0">
+            <a:schemeClr val="accent1"/>
+          </a:effectRef>
+          <a:fontRef idx="minor">
+            <a:schemeClr val="tx1"/>
+          </a:fontRef>
+        </p:style>
+      </p:cxnSp>
+      <p:cxnSp>
+        <p:nvCxnSpPr>
+          <p:cNvPr id="12" name="Connecteur droit avec flèche 11">
+            <a:extLst>
+              <a:ext uri="{FF2B5EF4-FFF2-40B4-BE49-F238E27FC236}">
+                <a16:creationId xmlns:a16="http://schemas.microsoft.com/office/drawing/2014/main" id="{3C67EBC5-9AFB-4F1A-BD5A-AE8C81A0052A}"/>
+              </a:ext>
+            </a:extLst>
+          </p:cNvPr>
+          <p:cNvCxnSpPr/>
+          <p:nvPr/>
+        </p:nvCxnSpPr>
+        <p:spPr>
+          <a:xfrm>
+            <a:off x="4692215" y="4200020"/>
+            <a:ext cx="938705" cy="239711"/>
+          </a:xfrm>
+          <a:prstGeom prst="straightConnector1">
+            <a:avLst/>
+          </a:prstGeom>
+          <a:ln>
+            <a:solidFill>
+              <a:schemeClr val="tx1">
+                <a:lumMod val="85000"/>
+                <a:alpha val="60000"/>
+              </a:schemeClr>
+            </a:solidFill>
+            <a:tailEnd type="triangle"/>
+          </a:ln>
+        </p:spPr>
+        <p:style>
+          <a:lnRef idx="1">
+            <a:schemeClr val="accent1"/>
+          </a:lnRef>
+          <a:fillRef idx="0">
+            <a:schemeClr val="accent1"/>
+          </a:fillRef>
+          <a:effectRef idx="0">
+            <a:schemeClr val="accent1"/>
+          </a:effectRef>
+          <a:fontRef idx="minor">
+            <a:schemeClr val="tx1"/>
+          </a:fontRef>
+        </p:style>
+      </p:cxnSp>
     </p:spTree>
     <p:extLst>
       <p:ext uri="{BB962C8B-B14F-4D97-AF65-F5344CB8AC3E}">

</xml_diff>

<commit_message>
#12 Colors on strategy learning added on solutions slides
</commit_message>
<xml_diff>
--- a/SAI_presentation.pptx
+++ b/SAI_presentation.pptx
@@ -18299,7 +18299,17 @@
           <a:p>
             <a:r>
               <a:rPr lang="fr-FR" dirty="0"/>
-              <a:t>The web page </a:t>
+              <a:t>The </a:t>
+            </a:r>
+            <a:r>
+              <a:rPr lang="fr-FR" b="1" dirty="0">
+                <a:solidFill>
+                  <a:schemeClr val="tx1">
+                    <a:lumMod val="95000"/>
+                  </a:schemeClr>
+                </a:solidFill>
+              </a:rPr>
+              <a:t>web page </a:t>
             </a:r>
             <a:r>
               <a:rPr lang="fr-FR" dirty="0" err="1"/>
@@ -18331,7 +18341,31 @@
             </a:r>
             <a:r>
               <a:rPr lang="fr-FR" dirty="0"/>
-              <a:t> SAI </a:t>
+              <a:t> (</a:t>
+            </a:r>
+            <a:r>
+              <a:rPr lang="fr-FR" b="1" dirty="0" err="1">
+                <a:solidFill>
+                  <a:srgbClr val="0070C0"/>
+                </a:solidFill>
+              </a:rPr>
+              <a:t>strategy</a:t>
+            </a:r>
+            <a:r>
+              <a:rPr lang="fr-FR" dirty="0"/>
+              <a:t>) </a:t>
+            </a:r>
+            <a:r>
+              <a:rPr lang="fr-FR" b="1" dirty="0">
+                <a:solidFill>
+                  <a:srgbClr val="FFC000"/>
+                </a:solidFill>
+              </a:rPr>
+              <a:t>SAI</a:t>
+            </a:r>
+            <a:r>
+              <a:rPr lang="fr-FR" dirty="0"/>
+              <a:t> </a:t>
             </a:r>
             <a:r>
               <a:rPr lang="fr-FR" dirty="0" err="1"/>

</xml_diff>

<commit_message>
#12 Use icon on strategy learning added on solutions slides
</commit_message>
<xml_diff>
--- a/SAI_presentation.pptx
+++ b/SAI_presentation.pptx
@@ -18798,6 +18798,42 @@
           </a:fontRef>
         </p:style>
       </p:cxnSp>
+      <p:pic>
+        <p:nvPicPr>
+          <p:cNvPr id="14" name="Graphique 13" descr="Visage souriant noir">
+            <a:extLst>
+              <a:ext uri="{FF2B5EF4-FFF2-40B4-BE49-F238E27FC236}">
+                <a16:creationId xmlns:a16="http://schemas.microsoft.com/office/drawing/2014/main" id="{B45FBF34-02CE-43D9-BD8F-AB06833CA7F8}"/>
+              </a:ext>
+            </a:extLst>
+          </p:cNvPr>
+          <p:cNvPicPr>
+            <a:picLocks noChangeAspect="1"/>
+          </p:cNvPicPr>
+          <p:nvPr/>
+        </p:nvPicPr>
+        <p:blipFill>
+          <a:blip r:embed="rId8">
+            <a:extLst>
+              <a:ext uri="{96DAC541-7B7A-43D3-8B79-37D633B846F1}">
+                <asvg:svgBlip xmlns:asvg="http://schemas.microsoft.com/office/drawing/2016/SVG/main" r:embed="rId9"/>
+              </a:ext>
+            </a:extLst>
+          </a:blip>
+          <a:stretch>
+            <a:fillRect/>
+          </a:stretch>
+        </p:blipFill>
+        <p:spPr>
+          <a:xfrm>
+            <a:off x="9736577" y="3429000"/>
+            <a:ext cx="914400" cy="914400"/>
+          </a:xfrm>
+          <a:prstGeom prst="rect">
+            <a:avLst/>
+          </a:prstGeom>
+        </p:spPr>
+      </p:pic>
     </p:spTree>
     <p:extLst>
       <p:ext uri="{BB962C8B-B14F-4D97-AF65-F5344CB8AC3E}">

</xml_diff>

<commit_message>
#12 Choice icon on strategy learning added on solutions slides
</commit_message>
<xml_diff>
--- a/SAI_presentation.pptx
+++ b/SAI_presentation.pptx
@@ -6942,7 +6942,7 @@
             <a:fld id="{B61BEF0D-F0BB-DE4B-95CE-6DB70DBA9567}" type="datetimeFigureOut">
               <a:rPr lang="en-US" dirty="0"/>
               <a:pPr/>
-              <a:t>3/30/2020</a:t>
+              <a:t>3/31/2020</a:t>
             </a:fld>
             <a:endParaRPr lang="en-US" dirty="0"/>
           </a:p>
@@ -7375,7 +7375,7 @@
             <a:fld id="{B61BEF0D-F0BB-DE4B-95CE-6DB70DBA9567}" type="datetimeFigureOut">
               <a:rPr lang="en-US" dirty="0"/>
               <a:pPr/>
-              <a:t>3/30/2020</a:t>
+              <a:t>3/31/2020</a:t>
             </a:fld>
             <a:endParaRPr lang="en-US" dirty="0"/>
           </a:p>
@@ -7622,7 +7622,7 @@
             <a:fld id="{B61BEF0D-F0BB-DE4B-95CE-6DB70DBA9567}" type="datetimeFigureOut">
               <a:rPr lang="en-US" dirty="0"/>
               <a:pPr/>
-              <a:t>3/30/2020</a:t>
+              <a:t>3/31/2020</a:t>
             </a:fld>
             <a:endParaRPr lang="en-US" dirty="0"/>
           </a:p>
@@ -7927,7 +7927,7 @@
             <a:fld id="{B61BEF0D-F0BB-DE4B-95CE-6DB70DBA9567}" type="datetimeFigureOut">
               <a:rPr lang="en-US" dirty="0"/>
               <a:pPr/>
-              <a:t>3/30/2020</a:t>
+              <a:t>3/31/2020</a:t>
             </a:fld>
             <a:endParaRPr lang="en-US" dirty="0"/>
           </a:p>
@@ -8242,7 +8242,7 @@
             <a:fld id="{B61BEF0D-F0BB-DE4B-95CE-6DB70DBA9567}" type="datetimeFigureOut">
               <a:rPr lang="en-US" dirty="0"/>
               <a:pPr/>
-              <a:t>3/30/2020</a:t>
+              <a:t>3/31/2020</a:t>
             </a:fld>
             <a:endParaRPr lang="en-US" dirty="0"/>
           </a:p>
@@ -8541,7 +8541,7 @@
             <a:fld id="{B61BEF0D-F0BB-DE4B-95CE-6DB70DBA9567}" type="datetimeFigureOut">
               <a:rPr lang="en-US" dirty="0"/>
               <a:pPr/>
-              <a:t>3/30/2020</a:t>
+              <a:t>3/31/2020</a:t>
             </a:fld>
             <a:endParaRPr lang="en-US" dirty="0"/>
           </a:p>
@@ -8905,7 +8905,7 @@
             <a:fld id="{B61BEF0D-F0BB-DE4B-95CE-6DB70DBA9567}" type="datetimeFigureOut">
               <a:rPr lang="en-US" dirty="0"/>
               <a:pPr/>
-              <a:t>3/30/2020</a:t>
+              <a:t>3/31/2020</a:t>
             </a:fld>
             <a:endParaRPr lang="en-US" dirty="0"/>
           </a:p>
@@ -9076,7 +9076,7 @@
             <a:fld id="{B61BEF0D-F0BB-DE4B-95CE-6DB70DBA9567}" type="datetimeFigureOut">
               <a:rPr lang="en-US" dirty="0"/>
               <a:pPr/>
-              <a:t>3/30/2020</a:t>
+              <a:t>3/31/2020</a:t>
             </a:fld>
             <a:endParaRPr lang="en-US" dirty="0"/>
           </a:p>
@@ -9253,7 +9253,7 @@
             <a:fld id="{B61BEF0D-F0BB-DE4B-95CE-6DB70DBA9567}" type="datetimeFigureOut">
               <a:rPr lang="en-US" dirty="0"/>
               <a:pPr/>
-              <a:t>3/30/2020</a:t>
+              <a:t>3/31/2020</a:t>
             </a:fld>
             <a:endParaRPr lang="en-US" dirty="0"/>
           </a:p>
@@ -9420,7 +9420,7 @@
             <a:fld id="{B61BEF0D-F0BB-DE4B-95CE-6DB70DBA9567}" type="datetimeFigureOut">
               <a:rPr lang="en-US" dirty="0"/>
               <a:pPr/>
-              <a:t>3/30/2020</a:t>
+              <a:t>3/31/2020</a:t>
             </a:fld>
             <a:endParaRPr lang="en-US" dirty="0"/>
           </a:p>
@@ -9667,7 +9667,7 @@
             <a:fld id="{B61BEF0D-F0BB-DE4B-95CE-6DB70DBA9567}" type="datetimeFigureOut">
               <a:rPr lang="en-US" dirty="0"/>
               <a:pPr/>
-              <a:t>3/30/2020</a:t>
+              <a:t>3/31/2020</a:t>
             </a:fld>
             <a:endParaRPr lang="en-US" dirty="0"/>
           </a:p>
@@ -9900,7 +9900,7 @@
             <a:fld id="{B61BEF0D-F0BB-DE4B-95CE-6DB70DBA9567}" type="datetimeFigureOut">
               <a:rPr lang="en-US" dirty="0"/>
               <a:pPr/>
-              <a:t>3/30/2020</a:t>
+              <a:t>3/31/2020</a:t>
             </a:fld>
             <a:endParaRPr lang="en-US" dirty="0"/>
           </a:p>
@@ -10279,7 +10279,7 @@
             <a:fld id="{B61BEF0D-F0BB-DE4B-95CE-6DB70DBA9567}" type="datetimeFigureOut">
               <a:rPr lang="en-US" dirty="0"/>
               <a:pPr/>
-              <a:t>3/30/2020</a:t>
+              <a:t>3/31/2020</a:t>
             </a:fld>
             <a:endParaRPr lang="en-US" dirty="0"/>
           </a:p>
@@ -10394,7 +10394,7 @@
             <a:fld id="{B61BEF0D-F0BB-DE4B-95CE-6DB70DBA9567}" type="datetimeFigureOut">
               <a:rPr lang="en-US" dirty="0"/>
               <a:pPr/>
-              <a:t>3/30/2020</a:t>
+              <a:t>3/31/2020</a:t>
             </a:fld>
             <a:endParaRPr lang="en-US" dirty="0"/>
           </a:p>
@@ -10486,7 +10486,7 @@
             <a:fld id="{B61BEF0D-F0BB-DE4B-95CE-6DB70DBA9567}" type="datetimeFigureOut">
               <a:rPr lang="en-US" dirty="0"/>
               <a:pPr/>
-              <a:t>3/30/2020</a:t>
+              <a:t>3/31/2020</a:t>
             </a:fld>
             <a:endParaRPr lang="en-US" dirty="0"/>
           </a:p>
@@ -10738,7 +10738,7 @@
             <a:fld id="{B61BEF0D-F0BB-DE4B-95CE-6DB70DBA9567}" type="datetimeFigureOut">
               <a:rPr lang="en-US" dirty="0"/>
               <a:pPr/>
-              <a:t>3/30/2020</a:t>
+              <a:t>3/31/2020</a:t>
             </a:fld>
             <a:endParaRPr lang="en-US" dirty="0"/>
           </a:p>
@@ -11018,7 +11018,7 @@
             <a:fld id="{B61BEF0D-F0BB-DE4B-95CE-6DB70DBA9567}" type="datetimeFigureOut">
               <a:rPr lang="en-US" dirty="0"/>
               <a:pPr/>
-              <a:t>3/30/2020</a:t>
+              <a:t>3/31/2020</a:t>
             </a:fld>
             <a:endParaRPr lang="en-US" dirty="0"/>
           </a:p>
@@ -11421,7 +11421,7 @@
             <a:fld id="{B61BEF0D-F0BB-DE4B-95CE-6DB70DBA9567}" type="datetimeFigureOut">
               <a:rPr lang="en-US" dirty="0"/>
               <a:pPr/>
-              <a:t>3/30/2020</a:t>
+              <a:t>3/31/2020</a:t>
             </a:fld>
             <a:endParaRPr lang="en-US" dirty="0"/>
           </a:p>
@@ -18826,7 +18826,7 @@
         </p:blipFill>
         <p:spPr>
           <a:xfrm>
-            <a:off x="9736577" y="3429000"/>
+            <a:off x="9653720" y="3605372"/>
             <a:ext cx="914400" cy="914400"/>
           </a:xfrm>
           <a:prstGeom prst="rect">
@@ -18834,6 +18834,52 @@
           </a:prstGeom>
         </p:spPr>
       </p:pic>
+      <p:sp>
+        <p:nvSpPr>
+          <p:cNvPr id="13" name="Flèche : droite 12">
+            <a:extLst>
+              <a:ext uri="{FF2B5EF4-FFF2-40B4-BE49-F238E27FC236}">
+                <a16:creationId xmlns:a16="http://schemas.microsoft.com/office/drawing/2014/main" id="{758D04B2-D796-4F0C-B392-CCEC1D1E29B9}"/>
+              </a:ext>
+            </a:extLst>
+          </p:cNvPr>
+          <p:cNvSpPr/>
+          <p:nvPr/>
+        </p:nvSpPr>
+        <p:spPr>
+          <a:xfrm rot="10325417">
+            <a:off x="7855050" y="4105316"/>
+            <a:ext cx="1785993" cy="307713"/>
+          </a:xfrm>
+          <a:prstGeom prst="rightArrow">
+            <a:avLst/>
+          </a:prstGeom>
+        </p:spPr>
+        <p:style>
+          <a:lnRef idx="2">
+            <a:schemeClr val="accent1">
+              <a:shade val="50000"/>
+            </a:schemeClr>
+          </a:lnRef>
+          <a:fillRef idx="1">
+            <a:schemeClr val="accent1"/>
+          </a:fillRef>
+          <a:effectRef idx="0">
+            <a:schemeClr val="accent1"/>
+          </a:effectRef>
+          <a:fontRef idx="minor">
+            <a:schemeClr val="lt1"/>
+          </a:fontRef>
+        </p:style>
+        <p:txBody>
+          <a:bodyPr rtlCol="0" anchor="ctr"/>
+          <a:lstStyle/>
+          <a:p>
+            <a:pPr algn="ctr"/>
+            <a:endParaRPr lang="en-GB"/>
+          </a:p>
+        </p:txBody>
+      </p:sp>
     </p:spTree>
     <p:extLst>
       <p:ext uri="{BB962C8B-B14F-4D97-AF65-F5344CB8AC3E}">

</xml_diff>

<commit_message>
#12 Choice colors on strategy learning updated on solutions slides
</commit_message>
<xml_diff>
--- a/SAI_presentation.pptx
+++ b/SAI_presentation.pptx
@@ -18325,15 +18325,35 @@
             </a:r>
             <a:r>
               <a:rPr lang="fr-FR" dirty="0"/>
-              <a:t> the user to </a:t>
-            </a:r>
-            <a:r>
-              <a:rPr lang="fr-FR" dirty="0" err="1"/>
+              <a:t> the </a:t>
+            </a:r>
+            <a:r>
+              <a:rPr lang="fr-FR" b="1" dirty="0">
+                <a:solidFill>
+                  <a:srgbClr val="002060"/>
+                </a:solidFill>
+              </a:rPr>
+              <a:t>user to </a:t>
+            </a:r>
+            <a:r>
+              <a:rPr lang="fr-FR" b="1" dirty="0" err="1">
+                <a:solidFill>
+                  <a:srgbClr val="002060"/>
+                </a:solidFill>
+              </a:rPr>
               <a:t>choose</a:t>
             </a:r>
             <a:r>
+              <a:rPr lang="fr-FR" b="1" dirty="0">
+                <a:solidFill>
+                  <a:srgbClr val="002060"/>
+                </a:solidFill>
+              </a:rPr>
+              <a:t> </a:t>
+            </a:r>
+            <a:r>
               <a:rPr lang="fr-FR" dirty="0"/>
-              <a:t> the best </a:t>
+              <a:t>the best </a:t>
             </a:r>
             <a:r>
               <a:rPr lang="fr-FR" dirty="0" err="1"/>
@@ -18854,6 +18874,9 @@
           <a:prstGeom prst="rightArrow">
             <a:avLst/>
           </a:prstGeom>
+          <a:solidFill>
+            <a:srgbClr val="002060"/>
+          </a:solidFill>
         </p:spPr>
         <p:style>
           <a:lnRef idx="2">

</xml_diff>

<commit_message>
#12 Understand color on strategy learning updated on solutions slides
</commit_message>
<xml_diff>
--- a/SAI_presentation.pptx
+++ b/SAI_presentation.pptx
@@ -18396,7 +18396,11 @@
               <a:t> </a:t>
             </a:r>
             <a:r>
-              <a:rPr lang="fr-FR" dirty="0" err="1"/>
+              <a:rPr lang="fr-FR" b="1" dirty="0" err="1">
+                <a:solidFill>
+                  <a:srgbClr val="FF0000"/>
+                </a:solidFill>
+              </a:rPr>
               <a:t>understand</a:t>
             </a:r>
             <a:r>
@@ -18412,35 +18416,23 @@
               <a:t> </a:t>
             </a:r>
             <a:r>
-              <a:rPr lang="fr-FR" dirty="0" err="1"/>
+              <a:rPr lang="fr-FR" b="1" dirty="0" err="1">
+                <a:solidFill>
+                  <a:srgbClr val="FF0000"/>
+                </a:solidFill>
+              </a:rPr>
               <a:t>needs</a:t>
             </a:r>
             <a:r>
-              <a:rPr lang="fr-FR" dirty="0"/>
+              <a:rPr lang="fr-FR" b="1" dirty="0">
+                <a:solidFill>
+                  <a:srgbClr val="FF0000"/>
+                </a:solidFill>
+              </a:rPr>
               <a:t> to do</a:t>
             </a:r>
           </a:p>
           <a:p>
-            <a:r>
-              <a:rPr lang="fr-FR" dirty="0" err="1"/>
-              <a:t>Explain</a:t>
-            </a:r>
-            <a:r>
-              <a:rPr lang="fr-FR" dirty="0"/>
-              <a:t> </a:t>
-            </a:r>
-            <a:r>
-              <a:rPr lang="fr-FR" dirty="0" err="1"/>
-              <a:t>with</a:t>
-            </a:r>
-            <a:r>
-              <a:rPr lang="fr-FR" dirty="0"/>
-              <a:t> a </a:t>
-            </a:r>
-            <a:r>
-              <a:rPr lang="fr-FR" dirty="0" err="1"/>
-              <a:t>schema</a:t>
-            </a:r>
             <a:endParaRPr lang="en-GB" dirty="0"/>
           </a:p>
         </p:txBody>
@@ -18626,10 +18618,10 @@
           <p:nvPr/>
         </p:nvPicPr>
         <p:blipFill>
-          <a:blip r:embed="rId4">
+          <a:blip r:embed="rId6">
             <a:extLst>
               <a:ext uri="{96DAC541-7B7A-43D3-8B79-37D633B846F1}">
-                <asvg:svgBlip xmlns:asvg="http://schemas.microsoft.com/office/drawing/2016/SVG/main" r:embed="rId5"/>
+                <asvg:svgBlip xmlns:asvg="http://schemas.microsoft.com/office/drawing/2016/SVG/main" r:embed="rId7"/>
               </a:ext>
             </a:extLst>
           </a:blip>
@@ -18662,10 +18654,10 @@
           <p:nvPr/>
         </p:nvPicPr>
         <p:blipFill>
-          <a:blip r:embed="rId6">
+          <a:blip r:embed="rId8">
             <a:extLst>
               <a:ext uri="{96DAC541-7B7A-43D3-8B79-37D633B846F1}">
-                <asvg:svgBlip xmlns:asvg="http://schemas.microsoft.com/office/drawing/2016/SVG/main" r:embed="rId7"/>
+                <asvg:svgBlip xmlns:asvg="http://schemas.microsoft.com/office/drawing/2016/SVG/main" r:embed="rId9"/>
               </a:ext>
             </a:extLst>
           </a:blip>
@@ -18833,10 +18825,10 @@
           <p:nvPr/>
         </p:nvPicPr>
         <p:blipFill>
-          <a:blip r:embed="rId8">
+          <a:blip r:embed="rId10">
             <a:extLst>
               <a:ext uri="{96DAC541-7B7A-43D3-8B79-37D633B846F1}">
-                <asvg:svgBlip xmlns:asvg="http://schemas.microsoft.com/office/drawing/2016/SVG/main" r:embed="rId9"/>
+                <asvg:svgBlip xmlns:asvg="http://schemas.microsoft.com/office/drawing/2016/SVG/main" r:embed="rId11"/>
               </a:ext>
             </a:extLst>
           </a:blip>

</xml_diff>

<commit_message>
#12 Theory graph added on solution slides on presentation
</commit_message>
<xml_diff>
--- a/SAI_presentation.pptx
+++ b/SAI_presentation.pptx
@@ -6942,7 +6942,7 @@
             <a:fld id="{B61BEF0D-F0BB-DE4B-95CE-6DB70DBA9567}" type="datetimeFigureOut">
               <a:rPr lang="en-US" dirty="0"/>
               <a:pPr/>
-              <a:t>3/31/2020</a:t>
+              <a:t>4/1/2020</a:t>
             </a:fld>
             <a:endParaRPr lang="en-US" dirty="0"/>
           </a:p>
@@ -7375,7 +7375,7 @@
             <a:fld id="{B61BEF0D-F0BB-DE4B-95CE-6DB70DBA9567}" type="datetimeFigureOut">
               <a:rPr lang="en-US" dirty="0"/>
               <a:pPr/>
-              <a:t>3/31/2020</a:t>
+              <a:t>4/1/2020</a:t>
             </a:fld>
             <a:endParaRPr lang="en-US" dirty="0"/>
           </a:p>
@@ -7622,7 +7622,7 @@
             <a:fld id="{B61BEF0D-F0BB-DE4B-95CE-6DB70DBA9567}" type="datetimeFigureOut">
               <a:rPr lang="en-US" dirty="0"/>
               <a:pPr/>
-              <a:t>3/31/2020</a:t>
+              <a:t>4/1/2020</a:t>
             </a:fld>
             <a:endParaRPr lang="en-US" dirty="0"/>
           </a:p>
@@ -7927,7 +7927,7 @@
             <a:fld id="{B61BEF0D-F0BB-DE4B-95CE-6DB70DBA9567}" type="datetimeFigureOut">
               <a:rPr lang="en-US" dirty="0"/>
               <a:pPr/>
-              <a:t>3/31/2020</a:t>
+              <a:t>4/1/2020</a:t>
             </a:fld>
             <a:endParaRPr lang="en-US" dirty="0"/>
           </a:p>
@@ -8242,7 +8242,7 @@
             <a:fld id="{B61BEF0D-F0BB-DE4B-95CE-6DB70DBA9567}" type="datetimeFigureOut">
               <a:rPr lang="en-US" dirty="0"/>
               <a:pPr/>
-              <a:t>3/31/2020</a:t>
+              <a:t>4/1/2020</a:t>
             </a:fld>
             <a:endParaRPr lang="en-US" dirty="0"/>
           </a:p>
@@ -8541,7 +8541,7 @@
             <a:fld id="{B61BEF0D-F0BB-DE4B-95CE-6DB70DBA9567}" type="datetimeFigureOut">
               <a:rPr lang="en-US" dirty="0"/>
               <a:pPr/>
-              <a:t>3/31/2020</a:t>
+              <a:t>4/1/2020</a:t>
             </a:fld>
             <a:endParaRPr lang="en-US" dirty="0"/>
           </a:p>
@@ -8905,7 +8905,7 @@
             <a:fld id="{B61BEF0D-F0BB-DE4B-95CE-6DB70DBA9567}" type="datetimeFigureOut">
               <a:rPr lang="en-US" dirty="0"/>
               <a:pPr/>
-              <a:t>3/31/2020</a:t>
+              <a:t>4/1/2020</a:t>
             </a:fld>
             <a:endParaRPr lang="en-US" dirty="0"/>
           </a:p>
@@ -9076,7 +9076,7 @@
             <a:fld id="{B61BEF0D-F0BB-DE4B-95CE-6DB70DBA9567}" type="datetimeFigureOut">
               <a:rPr lang="en-US" dirty="0"/>
               <a:pPr/>
-              <a:t>3/31/2020</a:t>
+              <a:t>4/1/2020</a:t>
             </a:fld>
             <a:endParaRPr lang="en-US" dirty="0"/>
           </a:p>
@@ -9253,7 +9253,7 @@
             <a:fld id="{B61BEF0D-F0BB-DE4B-95CE-6DB70DBA9567}" type="datetimeFigureOut">
               <a:rPr lang="en-US" dirty="0"/>
               <a:pPr/>
-              <a:t>3/31/2020</a:t>
+              <a:t>4/1/2020</a:t>
             </a:fld>
             <a:endParaRPr lang="en-US" dirty="0"/>
           </a:p>
@@ -9420,7 +9420,7 @@
             <a:fld id="{B61BEF0D-F0BB-DE4B-95CE-6DB70DBA9567}" type="datetimeFigureOut">
               <a:rPr lang="en-US" dirty="0"/>
               <a:pPr/>
-              <a:t>3/31/2020</a:t>
+              <a:t>4/1/2020</a:t>
             </a:fld>
             <a:endParaRPr lang="en-US" dirty="0"/>
           </a:p>
@@ -9667,7 +9667,7 @@
             <a:fld id="{B61BEF0D-F0BB-DE4B-95CE-6DB70DBA9567}" type="datetimeFigureOut">
               <a:rPr lang="en-US" dirty="0"/>
               <a:pPr/>
-              <a:t>3/31/2020</a:t>
+              <a:t>4/1/2020</a:t>
             </a:fld>
             <a:endParaRPr lang="en-US" dirty="0"/>
           </a:p>
@@ -9900,7 +9900,7 @@
             <a:fld id="{B61BEF0D-F0BB-DE4B-95CE-6DB70DBA9567}" type="datetimeFigureOut">
               <a:rPr lang="en-US" dirty="0"/>
               <a:pPr/>
-              <a:t>3/31/2020</a:t>
+              <a:t>4/1/2020</a:t>
             </a:fld>
             <a:endParaRPr lang="en-US" dirty="0"/>
           </a:p>
@@ -10279,7 +10279,7 @@
             <a:fld id="{B61BEF0D-F0BB-DE4B-95CE-6DB70DBA9567}" type="datetimeFigureOut">
               <a:rPr lang="en-US" dirty="0"/>
               <a:pPr/>
-              <a:t>3/31/2020</a:t>
+              <a:t>4/1/2020</a:t>
             </a:fld>
             <a:endParaRPr lang="en-US" dirty="0"/>
           </a:p>
@@ -10394,7 +10394,7 @@
             <a:fld id="{B61BEF0D-F0BB-DE4B-95CE-6DB70DBA9567}" type="datetimeFigureOut">
               <a:rPr lang="en-US" dirty="0"/>
               <a:pPr/>
-              <a:t>3/31/2020</a:t>
+              <a:t>4/1/2020</a:t>
             </a:fld>
             <a:endParaRPr lang="en-US" dirty="0"/>
           </a:p>
@@ -10486,7 +10486,7 @@
             <a:fld id="{B61BEF0D-F0BB-DE4B-95CE-6DB70DBA9567}" type="datetimeFigureOut">
               <a:rPr lang="en-US" dirty="0"/>
               <a:pPr/>
-              <a:t>3/31/2020</a:t>
+              <a:t>4/1/2020</a:t>
             </a:fld>
             <a:endParaRPr lang="en-US" dirty="0"/>
           </a:p>
@@ -10738,7 +10738,7 @@
             <a:fld id="{B61BEF0D-F0BB-DE4B-95CE-6DB70DBA9567}" type="datetimeFigureOut">
               <a:rPr lang="en-US" dirty="0"/>
               <a:pPr/>
-              <a:t>3/31/2020</a:t>
+              <a:t>4/1/2020</a:t>
             </a:fld>
             <a:endParaRPr lang="en-US" dirty="0"/>
           </a:p>
@@ -11018,7 +11018,7 @@
             <a:fld id="{B61BEF0D-F0BB-DE4B-95CE-6DB70DBA9567}" type="datetimeFigureOut">
               <a:rPr lang="en-US" dirty="0"/>
               <a:pPr/>
-              <a:t>3/31/2020</a:t>
+              <a:t>4/1/2020</a:t>
             </a:fld>
             <a:endParaRPr lang="en-US" dirty="0"/>
           </a:p>
@@ -11421,7 +11421,7 @@
             <a:fld id="{B61BEF0D-F0BB-DE4B-95CE-6DB70DBA9567}" type="datetimeFigureOut">
               <a:rPr lang="en-US" dirty="0"/>
               <a:pPr/>
-              <a:t>3/31/2020</a:t>
+              <a:t>4/1/2020</a:t>
             </a:fld>
             <a:endParaRPr lang="en-US" dirty="0"/>
           </a:p>
@@ -18976,19 +18976,124 @@
           <a:lstStyle/>
           <a:p>
             <a:r>
-              <a:rPr lang="fr-FR"/>
-              <a:t>Show a graph with the strategies learn with a little picture</a:t>
-            </a:r>
-          </a:p>
-          <a:p>
-            <a:r>
-              <a:rPr lang="fr-FR"/>
-              <a:t>Show the web interface to choose strategies</a:t>
-            </a:r>
-            <a:endParaRPr lang="en-GB"/>
+              <a:rPr lang="fr-FR" dirty="0"/>
+              <a:t>Show a graph </a:t>
+            </a:r>
+            <a:r>
+              <a:rPr lang="fr-FR" dirty="0" err="1"/>
+              <a:t>with</a:t>
+            </a:r>
+            <a:r>
+              <a:rPr lang="fr-FR" dirty="0"/>
+              <a:t> the </a:t>
+            </a:r>
+            <a:r>
+              <a:rPr lang="fr-FR" dirty="0" err="1"/>
+              <a:t>strategies</a:t>
+            </a:r>
+            <a:r>
+              <a:rPr lang="fr-FR" dirty="0"/>
+              <a:t> </a:t>
+            </a:r>
+            <a:r>
+              <a:rPr lang="fr-FR" dirty="0" err="1"/>
+              <a:t>learn</a:t>
+            </a:r>
+            <a:r>
+              <a:rPr lang="fr-FR" dirty="0"/>
+              <a:t> </a:t>
+            </a:r>
+            <a:r>
+              <a:rPr lang="fr-FR" dirty="0" err="1"/>
+              <a:t>with</a:t>
+            </a:r>
+            <a:r>
+              <a:rPr lang="fr-FR" dirty="0"/>
+              <a:t> a </a:t>
+            </a:r>
+            <a:r>
+              <a:rPr lang="fr-FR" dirty="0" err="1"/>
+              <a:t>little</a:t>
+            </a:r>
+            <a:r>
+              <a:rPr lang="fr-FR" dirty="0"/>
+              <a:t> </a:t>
+            </a:r>
+            <a:r>
+              <a:rPr lang="fr-FR" dirty="0" err="1"/>
+              <a:t>picture</a:t>
+            </a:r>
+            <a:endParaRPr lang="fr-FR" dirty="0"/>
+          </a:p>
+          <a:p>
+            <a:r>
+              <a:rPr lang="fr-FR" dirty="0"/>
+              <a:t>Show the web interface to </a:t>
+            </a:r>
+            <a:r>
+              <a:rPr lang="fr-FR" dirty="0" err="1"/>
+              <a:t>choose</a:t>
+            </a:r>
+            <a:r>
+              <a:rPr lang="fr-FR" dirty="0"/>
+              <a:t> </a:t>
+            </a:r>
+            <a:r>
+              <a:rPr lang="fr-FR" dirty="0" err="1"/>
+              <a:t>strategies</a:t>
+            </a:r>
+            <a:endParaRPr lang="fr-FR" dirty="0"/>
+          </a:p>
+          <a:p>
+            <a:endParaRPr lang="fr-FR" dirty="0"/>
+          </a:p>
+          <a:p>
+            <a:endParaRPr lang="fr-FR" dirty="0"/>
+          </a:p>
+          <a:p>
+            <a:endParaRPr lang="fr-FR" dirty="0"/>
+          </a:p>
+          <a:p>
+            <a:endParaRPr lang="fr-FR" dirty="0"/>
+          </a:p>
+          <a:p>
+            <a:endParaRPr lang="fr-FR" dirty="0"/>
+          </a:p>
+          <a:p>
+            <a:endParaRPr lang="en-GB" dirty="0"/>
           </a:p>
         </p:txBody>
       </p:sp>
+      <p:pic>
+        <p:nvPicPr>
+          <p:cNvPr id="4" name="Image 3">
+            <a:extLst>
+              <a:ext uri="{FF2B5EF4-FFF2-40B4-BE49-F238E27FC236}">
+                <a16:creationId xmlns:a16="http://schemas.microsoft.com/office/drawing/2014/main" id="{9D62F857-5EC1-4AE8-891B-4ED50A500B12}"/>
+              </a:ext>
+            </a:extLst>
+          </p:cNvPr>
+          <p:cNvPicPr>
+            <a:picLocks noChangeAspect="1"/>
+          </p:cNvPicPr>
+          <p:nvPr/>
+        </p:nvPicPr>
+        <p:blipFill>
+          <a:blip r:embed="rId2"/>
+          <a:stretch>
+            <a:fillRect/>
+          </a:stretch>
+        </p:blipFill>
+        <p:spPr>
+          <a:xfrm>
+            <a:off x="909421" y="1812721"/>
+            <a:ext cx="3536806" cy="2488346"/>
+          </a:xfrm>
+          <a:prstGeom prst="rect">
+            <a:avLst/>
+          </a:prstGeom>
+        </p:spPr>
+      </p:pic>
     </p:spTree>
     <p:extLst>
       <p:ext uri="{BB962C8B-B14F-4D97-AF65-F5344CB8AC3E}">

</xml_diff>

<commit_message>
#12 Web interface schemas added on slides on presentation
</commit_message>
<xml_diff>
--- a/SAI_presentation.pptx
+++ b/SAI_presentation.pptx
@@ -6942,7 +6942,7 @@
             <a:fld id="{B61BEF0D-F0BB-DE4B-95CE-6DB70DBA9567}" type="datetimeFigureOut">
               <a:rPr lang="en-US" dirty="0"/>
               <a:pPr/>
-              <a:t>4/1/2020</a:t>
+              <a:t>4/4/2020</a:t>
             </a:fld>
             <a:endParaRPr lang="en-US" dirty="0"/>
           </a:p>
@@ -7375,7 +7375,7 @@
             <a:fld id="{B61BEF0D-F0BB-DE4B-95CE-6DB70DBA9567}" type="datetimeFigureOut">
               <a:rPr lang="en-US" dirty="0"/>
               <a:pPr/>
-              <a:t>4/1/2020</a:t>
+              <a:t>4/4/2020</a:t>
             </a:fld>
             <a:endParaRPr lang="en-US" dirty="0"/>
           </a:p>
@@ -7622,7 +7622,7 @@
             <a:fld id="{B61BEF0D-F0BB-DE4B-95CE-6DB70DBA9567}" type="datetimeFigureOut">
               <a:rPr lang="en-US" dirty="0"/>
               <a:pPr/>
-              <a:t>4/1/2020</a:t>
+              <a:t>4/4/2020</a:t>
             </a:fld>
             <a:endParaRPr lang="en-US" dirty="0"/>
           </a:p>
@@ -7927,7 +7927,7 @@
             <a:fld id="{B61BEF0D-F0BB-DE4B-95CE-6DB70DBA9567}" type="datetimeFigureOut">
               <a:rPr lang="en-US" dirty="0"/>
               <a:pPr/>
-              <a:t>4/1/2020</a:t>
+              <a:t>4/4/2020</a:t>
             </a:fld>
             <a:endParaRPr lang="en-US" dirty="0"/>
           </a:p>
@@ -8242,7 +8242,7 @@
             <a:fld id="{B61BEF0D-F0BB-DE4B-95CE-6DB70DBA9567}" type="datetimeFigureOut">
               <a:rPr lang="en-US" dirty="0"/>
               <a:pPr/>
-              <a:t>4/1/2020</a:t>
+              <a:t>4/4/2020</a:t>
             </a:fld>
             <a:endParaRPr lang="en-US" dirty="0"/>
           </a:p>
@@ -8541,7 +8541,7 @@
             <a:fld id="{B61BEF0D-F0BB-DE4B-95CE-6DB70DBA9567}" type="datetimeFigureOut">
               <a:rPr lang="en-US" dirty="0"/>
               <a:pPr/>
-              <a:t>4/1/2020</a:t>
+              <a:t>4/4/2020</a:t>
             </a:fld>
             <a:endParaRPr lang="en-US" dirty="0"/>
           </a:p>
@@ -8905,7 +8905,7 @@
             <a:fld id="{B61BEF0D-F0BB-DE4B-95CE-6DB70DBA9567}" type="datetimeFigureOut">
               <a:rPr lang="en-US" dirty="0"/>
               <a:pPr/>
-              <a:t>4/1/2020</a:t>
+              <a:t>4/4/2020</a:t>
             </a:fld>
             <a:endParaRPr lang="en-US" dirty="0"/>
           </a:p>
@@ -9076,7 +9076,7 @@
             <a:fld id="{B61BEF0D-F0BB-DE4B-95CE-6DB70DBA9567}" type="datetimeFigureOut">
               <a:rPr lang="en-US" dirty="0"/>
               <a:pPr/>
-              <a:t>4/1/2020</a:t>
+              <a:t>4/4/2020</a:t>
             </a:fld>
             <a:endParaRPr lang="en-US" dirty="0"/>
           </a:p>
@@ -9253,7 +9253,7 @@
             <a:fld id="{B61BEF0D-F0BB-DE4B-95CE-6DB70DBA9567}" type="datetimeFigureOut">
               <a:rPr lang="en-US" dirty="0"/>
               <a:pPr/>
-              <a:t>4/1/2020</a:t>
+              <a:t>4/4/2020</a:t>
             </a:fld>
             <a:endParaRPr lang="en-US" dirty="0"/>
           </a:p>
@@ -9420,7 +9420,7 @@
             <a:fld id="{B61BEF0D-F0BB-DE4B-95CE-6DB70DBA9567}" type="datetimeFigureOut">
               <a:rPr lang="en-US" dirty="0"/>
               <a:pPr/>
-              <a:t>4/1/2020</a:t>
+              <a:t>4/4/2020</a:t>
             </a:fld>
             <a:endParaRPr lang="en-US" dirty="0"/>
           </a:p>
@@ -9667,7 +9667,7 @@
             <a:fld id="{B61BEF0D-F0BB-DE4B-95CE-6DB70DBA9567}" type="datetimeFigureOut">
               <a:rPr lang="en-US" dirty="0"/>
               <a:pPr/>
-              <a:t>4/1/2020</a:t>
+              <a:t>4/4/2020</a:t>
             </a:fld>
             <a:endParaRPr lang="en-US" dirty="0"/>
           </a:p>
@@ -9900,7 +9900,7 @@
             <a:fld id="{B61BEF0D-F0BB-DE4B-95CE-6DB70DBA9567}" type="datetimeFigureOut">
               <a:rPr lang="en-US" dirty="0"/>
               <a:pPr/>
-              <a:t>4/1/2020</a:t>
+              <a:t>4/4/2020</a:t>
             </a:fld>
             <a:endParaRPr lang="en-US" dirty="0"/>
           </a:p>
@@ -10279,7 +10279,7 @@
             <a:fld id="{B61BEF0D-F0BB-DE4B-95CE-6DB70DBA9567}" type="datetimeFigureOut">
               <a:rPr lang="en-US" dirty="0"/>
               <a:pPr/>
-              <a:t>4/1/2020</a:t>
+              <a:t>4/4/2020</a:t>
             </a:fld>
             <a:endParaRPr lang="en-US" dirty="0"/>
           </a:p>
@@ -10394,7 +10394,7 @@
             <a:fld id="{B61BEF0D-F0BB-DE4B-95CE-6DB70DBA9567}" type="datetimeFigureOut">
               <a:rPr lang="en-US" dirty="0"/>
               <a:pPr/>
-              <a:t>4/1/2020</a:t>
+              <a:t>4/4/2020</a:t>
             </a:fld>
             <a:endParaRPr lang="en-US" dirty="0"/>
           </a:p>
@@ -10486,7 +10486,7 @@
             <a:fld id="{B61BEF0D-F0BB-DE4B-95CE-6DB70DBA9567}" type="datetimeFigureOut">
               <a:rPr lang="en-US" dirty="0"/>
               <a:pPr/>
-              <a:t>4/1/2020</a:t>
+              <a:t>4/4/2020</a:t>
             </a:fld>
             <a:endParaRPr lang="en-US" dirty="0"/>
           </a:p>
@@ -10738,7 +10738,7 @@
             <a:fld id="{B61BEF0D-F0BB-DE4B-95CE-6DB70DBA9567}" type="datetimeFigureOut">
               <a:rPr lang="en-US" dirty="0"/>
               <a:pPr/>
-              <a:t>4/1/2020</a:t>
+              <a:t>4/4/2020</a:t>
             </a:fld>
             <a:endParaRPr lang="en-US" dirty="0"/>
           </a:p>
@@ -11018,7 +11018,7 @@
             <a:fld id="{B61BEF0D-F0BB-DE4B-95CE-6DB70DBA9567}" type="datetimeFigureOut">
               <a:rPr lang="en-US" dirty="0"/>
               <a:pPr/>
-              <a:t>4/1/2020</a:t>
+              <a:t>4/4/2020</a:t>
             </a:fld>
             <a:endParaRPr lang="en-US" dirty="0"/>
           </a:p>
@@ -11421,7 +11421,7 @@
             <a:fld id="{B61BEF0D-F0BB-DE4B-95CE-6DB70DBA9567}" type="datetimeFigureOut">
               <a:rPr lang="en-US" dirty="0"/>
               <a:pPr/>
-              <a:t>4/1/2020</a:t>
+              <a:t>4/4/2020</a:t>
             </a:fld>
             <a:endParaRPr lang="en-US" dirty="0"/>
           </a:p>
@@ -18975,91 +18975,6 @@
           <a:bodyPr/>
           <a:lstStyle/>
           <a:p>
-            <a:r>
-              <a:rPr lang="fr-FR" dirty="0"/>
-              <a:t>Show a graph </a:t>
-            </a:r>
-            <a:r>
-              <a:rPr lang="fr-FR" dirty="0" err="1"/>
-              <a:t>with</a:t>
-            </a:r>
-            <a:r>
-              <a:rPr lang="fr-FR" dirty="0"/>
-              <a:t> the </a:t>
-            </a:r>
-            <a:r>
-              <a:rPr lang="fr-FR" dirty="0" err="1"/>
-              <a:t>strategies</a:t>
-            </a:r>
-            <a:r>
-              <a:rPr lang="fr-FR" dirty="0"/>
-              <a:t> </a:t>
-            </a:r>
-            <a:r>
-              <a:rPr lang="fr-FR" dirty="0" err="1"/>
-              <a:t>learn</a:t>
-            </a:r>
-            <a:r>
-              <a:rPr lang="fr-FR" dirty="0"/>
-              <a:t> </a:t>
-            </a:r>
-            <a:r>
-              <a:rPr lang="fr-FR" dirty="0" err="1"/>
-              <a:t>with</a:t>
-            </a:r>
-            <a:r>
-              <a:rPr lang="fr-FR" dirty="0"/>
-              <a:t> a </a:t>
-            </a:r>
-            <a:r>
-              <a:rPr lang="fr-FR" dirty="0" err="1"/>
-              <a:t>little</a:t>
-            </a:r>
-            <a:r>
-              <a:rPr lang="fr-FR" dirty="0"/>
-              <a:t> </a:t>
-            </a:r>
-            <a:r>
-              <a:rPr lang="fr-FR" dirty="0" err="1"/>
-              <a:t>picture</a:t>
-            </a:r>
-            <a:endParaRPr lang="fr-FR" dirty="0"/>
-          </a:p>
-          <a:p>
-            <a:r>
-              <a:rPr lang="fr-FR" dirty="0"/>
-              <a:t>Show the web interface to </a:t>
-            </a:r>
-            <a:r>
-              <a:rPr lang="fr-FR" dirty="0" err="1"/>
-              <a:t>choose</a:t>
-            </a:r>
-            <a:r>
-              <a:rPr lang="fr-FR" dirty="0"/>
-              <a:t> </a:t>
-            </a:r>
-            <a:r>
-              <a:rPr lang="fr-FR" dirty="0" err="1"/>
-              <a:t>strategies</a:t>
-            </a:r>
-            <a:endParaRPr lang="fr-FR" dirty="0"/>
-          </a:p>
-          <a:p>
-            <a:endParaRPr lang="fr-FR" dirty="0"/>
-          </a:p>
-          <a:p>
-            <a:endParaRPr lang="fr-FR" dirty="0"/>
-          </a:p>
-          <a:p>
-            <a:endParaRPr lang="fr-FR" dirty="0"/>
-          </a:p>
-          <a:p>
-            <a:endParaRPr lang="fr-FR" dirty="0"/>
-          </a:p>
-          <a:p>
-            <a:endParaRPr lang="fr-FR" dirty="0"/>
-          </a:p>
-          <a:p>
             <a:endParaRPr lang="en-GB" dirty="0"/>
           </a:p>
         </p:txBody>
@@ -19086,8 +19001,98 @@
         </p:blipFill>
         <p:spPr>
           <a:xfrm>
-            <a:off x="909421" y="1812721"/>
-            <a:ext cx="3536806" cy="2488346"/>
+            <a:off x="636074" y="380699"/>
+            <a:ext cx="3002931" cy="2112734"/>
+          </a:xfrm>
+          <a:prstGeom prst="rect">
+            <a:avLst/>
+          </a:prstGeom>
+        </p:spPr>
+      </p:pic>
+      <p:pic>
+        <p:nvPicPr>
+          <p:cNvPr id="6" name="Image 5" descr="Une image contenant capture d’écran, oiseau&#10;&#10;Description générée automatiquement">
+            <a:extLst>
+              <a:ext uri="{FF2B5EF4-FFF2-40B4-BE49-F238E27FC236}">
+                <a16:creationId xmlns:a16="http://schemas.microsoft.com/office/drawing/2014/main" id="{0AF7F0D6-8E6D-49FA-8B44-6BFC53D2DF47}"/>
+              </a:ext>
+            </a:extLst>
+          </p:cNvPr>
+          <p:cNvPicPr>
+            <a:picLocks noChangeAspect="1"/>
+          </p:cNvPicPr>
+          <p:nvPr/>
+        </p:nvPicPr>
+        <p:blipFill>
+          <a:blip r:embed="rId3"/>
+          <a:stretch>
+            <a:fillRect/>
+          </a:stretch>
+        </p:blipFill>
+        <p:spPr>
+          <a:xfrm>
+            <a:off x="2440760" y="4532481"/>
+            <a:ext cx="2708721" cy="1151740"/>
+          </a:xfrm>
+          <a:prstGeom prst="rect">
+            <a:avLst/>
+          </a:prstGeom>
+        </p:spPr>
+      </p:pic>
+      <p:pic>
+        <p:nvPicPr>
+          <p:cNvPr id="8" name="Image 7" descr="Une image contenant capture d’écran&#10;&#10;Description générée automatiquement">
+            <a:extLst>
+              <a:ext uri="{FF2B5EF4-FFF2-40B4-BE49-F238E27FC236}">
+                <a16:creationId xmlns:a16="http://schemas.microsoft.com/office/drawing/2014/main" id="{C942D87B-80D2-4A93-8A91-5AB910811A68}"/>
+              </a:ext>
+            </a:extLst>
+          </p:cNvPr>
+          <p:cNvPicPr>
+            <a:picLocks noChangeAspect="1"/>
+          </p:cNvPicPr>
+          <p:nvPr/>
+        </p:nvPicPr>
+        <p:blipFill>
+          <a:blip r:embed="rId4"/>
+          <a:stretch>
+            <a:fillRect/>
+          </a:stretch>
+        </p:blipFill>
+        <p:spPr>
+          <a:xfrm>
+            <a:off x="2770200" y="3150726"/>
+            <a:ext cx="6774767" cy="2880610"/>
+          </a:xfrm>
+          <a:prstGeom prst="rect">
+            <a:avLst/>
+          </a:prstGeom>
+        </p:spPr>
+      </p:pic>
+      <p:pic>
+        <p:nvPicPr>
+          <p:cNvPr id="10" name="Image 9" descr="Une image contenant capture d’écran&#10;&#10;Description générée automatiquement">
+            <a:extLst>
+              <a:ext uri="{FF2B5EF4-FFF2-40B4-BE49-F238E27FC236}">
+                <a16:creationId xmlns:a16="http://schemas.microsoft.com/office/drawing/2014/main" id="{C77288A5-4F31-438B-84DC-837FEAB13938}"/>
+              </a:ext>
+            </a:extLst>
+          </p:cNvPr>
+          <p:cNvPicPr>
+            <a:picLocks noChangeAspect="1"/>
+          </p:cNvPicPr>
+          <p:nvPr/>
+        </p:nvPicPr>
+        <p:blipFill>
+          <a:blip r:embed="rId5"/>
+          <a:stretch>
+            <a:fillRect/>
+          </a:stretch>
+        </p:blipFill>
+        <p:spPr>
+          <a:xfrm>
+            <a:off x="4507811" y="2493433"/>
+            <a:ext cx="6774767" cy="2880610"/>
           </a:xfrm>
           <a:prstGeom prst="rect">
             <a:avLst/>

</xml_diff>

<commit_message>
#12 Web interface schemas correctly placed on slides on presentation
</commit_message>
<xml_diff>
--- a/SAI_presentation.pptx
+++ b/SAI_presentation.pptx
@@ -19001,7 +19001,7 @@
         </p:blipFill>
         <p:spPr>
           <a:xfrm>
-            <a:off x="636074" y="380699"/>
+            <a:off x="4510236" y="267295"/>
             <a:ext cx="3002931" cy="2112734"/>
           </a:xfrm>
           <a:prstGeom prst="rect">
@@ -19031,8 +19031,8 @@
         </p:blipFill>
         <p:spPr>
           <a:xfrm>
-            <a:off x="2440760" y="4532481"/>
-            <a:ext cx="2708721" cy="1151740"/>
+            <a:off x="0" y="2591926"/>
+            <a:ext cx="3867652" cy="1644514"/>
           </a:xfrm>
           <a:prstGeom prst="rect">
             <a:avLst/>
@@ -19061,8 +19061,8 @@
         </p:blipFill>
         <p:spPr>
           <a:xfrm>
-            <a:off x="2770200" y="3150726"/>
-            <a:ext cx="6774767" cy="2880610"/>
+            <a:off x="4077876" y="2591926"/>
+            <a:ext cx="3867652" cy="1644514"/>
           </a:xfrm>
           <a:prstGeom prst="rect">
             <a:avLst/>
@@ -19091,8 +19091,8 @@
         </p:blipFill>
         <p:spPr>
           <a:xfrm>
-            <a:off x="4507811" y="2493433"/>
-            <a:ext cx="6774767" cy="2880610"/>
+            <a:off x="8146536" y="2591926"/>
+            <a:ext cx="3867653" cy="1644514"/>
           </a:xfrm>
           <a:prstGeom prst="rect">
             <a:avLst/>

</xml_diff>

<commit_message>
#12 Arrows added on solution slides on presentation
</commit_message>
<xml_diff>
--- a/SAI_presentation.pptx
+++ b/SAI_presentation.pptx
@@ -19099,6 +19099,98 @@
           </a:prstGeom>
         </p:spPr>
       </p:pic>
+      <p:sp>
+        <p:nvSpPr>
+          <p:cNvPr id="5" name="Flèche : droite 4">
+            <a:extLst>
+              <a:ext uri="{FF2B5EF4-FFF2-40B4-BE49-F238E27FC236}">
+                <a16:creationId xmlns:a16="http://schemas.microsoft.com/office/drawing/2014/main" id="{ED5BC045-61E3-4912-A527-7355BB8C8E6C}"/>
+              </a:ext>
+            </a:extLst>
+          </p:cNvPr>
+          <p:cNvSpPr/>
+          <p:nvPr/>
+        </p:nvSpPr>
+        <p:spPr>
+          <a:xfrm>
+            <a:off x="3934438" y="3254930"/>
+            <a:ext cx="67111" cy="319287"/>
+          </a:xfrm>
+          <a:prstGeom prst="rightArrow">
+            <a:avLst/>
+          </a:prstGeom>
+        </p:spPr>
+        <p:style>
+          <a:lnRef idx="2">
+            <a:schemeClr val="accent1">
+              <a:shade val="50000"/>
+            </a:schemeClr>
+          </a:lnRef>
+          <a:fillRef idx="1">
+            <a:schemeClr val="accent1"/>
+          </a:fillRef>
+          <a:effectRef idx="0">
+            <a:schemeClr val="accent1"/>
+          </a:effectRef>
+          <a:fontRef idx="minor">
+            <a:schemeClr val="lt1"/>
+          </a:fontRef>
+        </p:style>
+        <p:txBody>
+          <a:bodyPr rtlCol="0" anchor="ctr"/>
+          <a:lstStyle/>
+          <a:p>
+            <a:pPr algn="ctr"/>
+            <a:endParaRPr lang="en-GB"/>
+          </a:p>
+        </p:txBody>
+      </p:sp>
+      <p:sp>
+        <p:nvSpPr>
+          <p:cNvPr id="9" name="Flèche : droite 8">
+            <a:extLst>
+              <a:ext uri="{FF2B5EF4-FFF2-40B4-BE49-F238E27FC236}">
+                <a16:creationId xmlns:a16="http://schemas.microsoft.com/office/drawing/2014/main" id="{F0E62A44-5A51-4131-9F9D-03F9B47BB065}"/>
+              </a:ext>
+            </a:extLst>
+          </p:cNvPr>
+          <p:cNvSpPr/>
+          <p:nvPr/>
+        </p:nvSpPr>
+        <p:spPr>
+          <a:xfrm>
+            <a:off x="8004501" y="3281495"/>
+            <a:ext cx="67111" cy="319287"/>
+          </a:xfrm>
+          <a:prstGeom prst="rightArrow">
+            <a:avLst/>
+          </a:prstGeom>
+        </p:spPr>
+        <p:style>
+          <a:lnRef idx="2">
+            <a:schemeClr val="accent1">
+              <a:shade val="50000"/>
+            </a:schemeClr>
+          </a:lnRef>
+          <a:fillRef idx="1">
+            <a:schemeClr val="accent1"/>
+          </a:fillRef>
+          <a:effectRef idx="0">
+            <a:schemeClr val="accent1"/>
+          </a:effectRef>
+          <a:fontRef idx="minor">
+            <a:schemeClr val="lt1"/>
+          </a:fontRef>
+        </p:style>
+        <p:txBody>
+          <a:bodyPr rtlCol="0" anchor="ctr"/>
+          <a:lstStyle/>
+          <a:p>
+            <a:pPr algn="ctr"/>
+            <a:endParaRPr lang="en-GB"/>
+          </a:p>
+        </p:txBody>
+      </p:sp>
     </p:spTree>
     <p:extLst>
       <p:ext uri="{BB962C8B-B14F-4D97-AF65-F5344CB8AC3E}">

</xml_diff>

<commit_message>
#12 Scemas reshaped on solution slides on presentation
</commit_message>
<xml_diff>
--- a/SAI_presentation.pptx
+++ b/SAI_presentation.pptx
@@ -6942,7 +6942,7 @@
             <a:fld id="{B61BEF0D-F0BB-DE4B-95CE-6DB70DBA9567}" type="datetimeFigureOut">
               <a:rPr lang="en-US" dirty="0"/>
               <a:pPr/>
-              <a:t>4/4/2020</a:t>
+              <a:t>4/5/2020</a:t>
             </a:fld>
             <a:endParaRPr lang="en-US" dirty="0"/>
           </a:p>
@@ -7375,7 +7375,7 @@
             <a:fld id="{B61BEF0D-F0BB-DE4B-95CE-6DB70DBA9567}" type="datetimeFigureOut">
               <a:rPr lang="en-US" dirty="0"/>
               <a:pPr/>
-              <a:t>4/4/2020</a:t>
+              <a:t>4/5/2020</a:t>
             </a:fld>
             <a:endParaRPr lang="en-US" dirty="0"/>
           </a:p>
@@ -7622,7 +7622,7 @@
             <a:fld id="{B61BEF0D-F0BB-DE4B-95CE-6DB70DBA9567}" type="datetimeFigureOut">
               <a:rPr lang="en-US" dirty="0"/>
               <a:pPr/>
-              <a:t>4/4/2020</a:t>
+              <a:t>4/5/2020</a:t>
             </a:fld>
             <a:endParaRPr lang="en-US" dirty="0"/>
           </a:p>
@@ -7927,7 +7927,7 @@
             <a:fld id="{B61BEF0D-F0BB-DE4B-95CE-6DB70DBA9567}" type="datetimeFigureOut">
               <a:rPr lang="en-US" dirty="0"/>
               <a:pPr/>
-              <a:t>4/4/2020</a:t>
+              <a:t>4/5/2020</a:t>
             </a:fld>
             <a:endParaRPr lang="en-US" dirty="0"/>
           </a:p>
@@ -8242,7 +8242,7 @@
             <a:fld id="{B61BEF0D-F0BB-DE4B-95CE-6DB70DBA9567}" type="datetimeFigureOut">
               <a:rPr lang="en-US" dirty="0"/>
               <a:pPr/>
-              <a:t>4/4/2020</a:t>
+              <a:t>4/5/2020</a:t>
             </a:fld>
             <a:endParaRPr lang="en-US" dirty="0"/>
           </a:p>
@@ -8541,7 +8541,7 @@
             <a:fld id="{B61BEF0D-F0BB-DE4B-95CE-6DB70DBA9567}" type="datetimeFigureOut">
               <a:rPr lang="en-US" dirty="0"/>
               <a:pPr/>
-              <a:t>4/4/2020</a:t>
+              <a:t>4/5/2020</a:t>
             </a:fld>
             <a:endParaRPr lang="en-US" dirty="0"/>
           </a:p>
@@ -8905,7 +8905,7 @@
             <a:fld id="{B61BEF0D-F0BB-DE4B-95CE-6DB70DBA9567}" type="datetimeFigureOut">
               <a:rPr lang="en-US" dirty="0"/>
               <a:pPr/>
-              <a:t>4/4/2020</a:t>
+              <a:t>4/5/2020</a:t>
             </a:fld>
             <a:endParaRPr lang="en-US" dirty="0"/>
           </a:p>
@@ -9076,7 +9076,7 @@
             <a:fld id="{B61BEF0D-F0BB-DE4B-95CE-6DB70DBA9567}" type="datetimeFigureOut">
               <a:rPr lang="en-US" dirty="0"/>
               <a:pPr/>
-              <a:t>4/4/2020</a:t>
+              <a:t>4/5/2020</a:t>
             </a:fld>
             <a:endParaRPr lang="en-US" dirty="0"/>
           </a:p>
@@ -9253,7 +9253,7 @@
             <a:fld id="{B61BEF0D-F0BB-DE4B-95CE-6DB70DBA9567}" type="datetimeFigureOut">
               <a:rPr lang="en-US" dirty="0"/>
               <a:pPr/>
-              <a:t>4/4/2020</a:t>
+              <a:t>4/5/2020</a:t>
             </a:fld>
             <a:endParaRPr lang="en-US" dirty="0"/>
           </a:p>
@@ -9420,7 +9420,7 @@
             <a:fld id="{B61BEF0D-F0BB-DE4B-95CE-6DB70DBA9567}" type="datetimeFigureOut">
               <a:rPr lang="en-US" dirty="0"/>
               <a:pPr/>
-              <a:t>4/4/2020</a:t>
+              <a:t>4/5/2020</a:t>
             </a:fld>
             <a:endParaRPr lang="en-US" dirty="0"/>
           </a:p>
@@ -9667,7 +9667,7 @@
             <a:fld id="{B61BEF0D-F0BB-DE4B-95CE-6DB70DBA9567}" type="datetimeFigureOut">
               <a:rPr lang="en-US" dirty="0"/>
               <a:pPr/>
-              <a:t>4/4/2020</a:t>
+              <a:t>4/5/2020</a:t>
             </a:fld>
             <a:endParaRPr lang="en-US" dirty="0"/>
           </a:p>
@@ -9900,7 +9900,7 @@
             <a:fld id="{B61BEF0D-F0BB-DE4B-95CE-6DB70DBA9567}" type="datetimeFigureOut">
               <a:rPr lang="en-US" dirty="0"/>
               <a:pPr/>
-              <a:t>4/4/2020</a:t>
+              <a:t>4/5/2020</a:t>
             </a:fld>
             <a:endParaRPr lang="en-US" dirty="0"/>
           </a:p>
@@ -10279,7 +10279,7 @@
             <a:fld id="{B61BEF0D-F0BB-DE4B-95CE-6DB70DBA9567}" type="datetimeFigureOut">
               <a:rPr lang="en-US" dirty="0"/>
               <a:pPr/>
-              <a:t>4/4/2020</a:t>
+              <a:t>4/5/2020</a:t>
             </a:fld>
             <a:endParaRPr lang="en-US" dirty="0"/>
           </a:p>
@@ -10394,7 +10394,7 @@
             <a:fld id="{B61BEF0D-F0BB-DE4B-95CE-6DB70DBA9567}" type="datetimeFigureOut">
               <a:rPr lang="en-US" dirty="0"/>
               <a:pPr/>
-              <a:t>4/4/2020</a:t>
+              <a:t>4/5/2020</a:t>
             </a:fld>
             <a:endParaRPr lang="en-US" dirty="0"/>
           </a:p>
@@ -10486,7 +10486,7 @@
             <a:fld id="{B61BEF0D-F0BB-DE4B-95CE-6DB70DBA9567}" type="datetimeFigureOut">
               <a:rPr lang="en-US" dirty="0"/>
               <a:pPr/>
-              <a:t>4/4/2020</a:t>
+              <a:t>4/5/2020</a:t>
             </a:fld>
             <a:endParaRPr lang="en-US" dirty="0"/>
           </a:p>
@@ -10738,7 +10738,7 @@
             <a:fld id="{B61BEF0D-F0BB-DE4B-95CE-6DB70DBA9567}" type="datetimeFigureOut">
               <a:rPr lang="en-US" dirty="0"/>
               <a:pPr/>
-              <a:t>4/4/2020</a:t>
+              <a:t>4/5/2020</a:t>
             </a:fld>
             <a:endParaRPr lang="en-US" dirty="0"/>
           </a:p>
@@ -11018,7 +11018,7 @@
             <a:fld id="{B61BEF0D-F0BB-DE4B-95CE-6DB70DBA9567}" type="datetimeFigureOut">
               <a:rPr lang="en-US" dirty="0"/>
               <a:pPr/>
-              <a:t>4/4/2020</a:t>
+              <a:t>4/5/2020</a:t>
             </a:fld>
             <a:endParaRPr lang="en-US" dirty="0"/>
           </a:p>
@@ -11421,7 +11421,7 @@
             <a:fld id="{B61BEF0D-F0BB-DE4B-95CE-6DB70DBA9567}" type="datetimeFigureOut">
               <a:rPr lang="en-US" dirty="0"/>
               <a:pPr/>
-              <a:t>4/4/2020</a:t>
+              <a:t>4/5/2020</a:t>
             </a:fld>
             <a:endParaRPr lang="en-US" dirty="0"/>
           </a:p>
@@ -19001,8 +19001,8 @@
         </p:blipFill>
         <p:spPr>
           <a:xfrm>
-            <a:off x="4510236" y="267295"/>
-            <a:ext cx="3002931" cy="2112734"/>
+            <a:off x="4051883" y="68130"/>
+            <a:ext cx="4046535" cy="2846969"/>
           </a:xfrm>
           <a:prstGeom prst="rect">
             <a:avLst/>
@@ -19031,7 +19031,7 @@
         </p:blipFill>
         <p:spPr>
           <a:xfrm>
-            <a:off x="0" y="2591926"/>
+            <a:off x="83890" y="3103655"/>
             <a:ext cx="3867652" cy="1644514"/>
           </a:xfrm>
           <a:prstGeom prst="rect">
@@ -19061,7 +19061,7 @@
         </p:blipFill>
         <p:spPr>
           <a:xfrm>
-            <a:off x="4077876" y="2591926"/>
+            <a:off x="4161766" y="3103655"/>
             <a:ext cx="3867652" cy="1644514"/>
           </a:xfrm>
           <a:prstGeom prst="rect">
@@ -19091,7 +19091,7 @@
         </p:blipFill>
         <p:spPr>
           <a:xfrm>
-            <a:off x="8146536" y="2591926"/>
+            <a:off x="8230426" y="3103655"/>
             <a:ext cx="3867653" cy="1644514"/>
           </a:xfrm>
           <a:prstGeom prst="rect">
@@ -19113,8 +19113,8 @@
         </p:nvSpPr>
         <p:spPr>
           <a:xfrm>
-            <a:off x="3934438" y="3254930"/>
-            <a:ext cx="67111" cy="319287"/>
+            <a:off x="3993737" y="3766659"/>
+            <a:ext cx="151251" cy="319287"/>
           </a:xfrm>
           <a:prstGeom prst="rightArrow">
             <a:avLst/>
@@ -19159,8 +19159,8 @@
         </p:nvSpPr>
         <p:spPr>
           <a:xfrm>
-            <a:off x="8004501" y="3281495"/>
-            <a:ext cx="67111" cy="319287"/>
+            <a:off x="8073250" y="3793224"/>
+            <a:ext cx="132009" cy="319287"/>
           </a:xfrm>
           <a:prstGeom prst="rightArrow">
             <a:avLst/>

</xml_diff>

<commit_message>
#12 Indication bubbles added on solution slides on presentation
</commit_message>
<xml_diff>
--- a/SAI_presentation.pptx
+++ b/SAI_presentation.pptx
@@ -19191,6 +19191,171 @@
           </a:p>
         </p:txBody>
       </p:sp>
+      <p:sp>
+        <p:nvSpPr>
+          <p:cNvPr id="11" name="Bulle narrative : rectangle 10">
+            <a:extLst>
+              <a:ext uri="{FF2B5EF4-FFF2-40B4-BE49-F238E27FC236}">
+                <a16:creationId xmlns:a16="http://schemas.microsoft.com/office/drawing/2014/main" id="{DA571948-BFED-44C5-A29B-38E1A841D144}"/>
+              </a:ext>
+            </a:extLst>
+          </p:cNvPr>
+          <p:cNvSpPr/>
+          <p:nvPr/>
+        </p:nvSpPr>
+        <p:spPr>
+          <a:xfrm>
+            <a:off x="2701255" y="5176007"/>
+            <a:ext cx="1350628" cy="818392"/>
+          </a:xfrm>
+          <a:prstGeom prst="wedgeRectCallout">
+            <a:avLst>
+              <a:gd name="adj1" fmla="val -53752"/>
+              <a:gd name="adj2" fmla="val -124060"/>
+            </a:avLst>
+          </a:prstGeom>
+        </p:spPr>
+        <p:style>
+          <a:lnRef idx="2">
+            <a:schemeClr val="accent1">
+              <a:shade val="50000"/>
+            </a:schemeClr>
+          </a:lnRef>
+          <a:fillRef idx="1">
+            <a:schemeClr val="accent1"/>
+          </a:fillRef>
+          <a:effectRef idx="0">
+            <a:schemeClr val="accent1"/>
+          </a:effectRef>
+          <a:fontRef idx="minor">
+            <a:schemeClr val="lt1"/>
+          </a:fontRef>
+        </p:style>
+        <p:txBody>
+          <a:bodyPr rtlCol="0" anchor="ctr"/>
+          <a:lstStyle/>
+          <a:p>
+            <a:pPr algn="ctr"/>
+            <a:r>
+              <a:rPr lang="en-GB" dirty="0">
+                <a:hlinkClick r:id="rId6"/>
+              </a:rPr>
+              <a:t>GEORGIA-PACIFIC</a:t>
+            </a:r>
+            <a:endParaRPr lang="en-GB" dirty="0"/>
+          </a:p>
+        </p:txBody>
+      </p:sp>
+      <p:sp>
+        <p:nvSpPr>
+          <p:cNvPr id="12" name="Bulle narrative : rectangle 11">
+            <a:extLst>
+              <a:ext uri="{FF2B5EF4-FFF2-40B4-BE49-F238E27FC236}">
+                <a16:creationId xmlns:a16="http://schemas.microsoft.com/office/drawing/2014/main" id="{304A7D1D-F1D1-49B5-AA75-AFD35641AB94}"/>
+              </a:ext>
+            </a:extLst>
+          </p:cNvPr>
+          <p:cNvSpPr/>
+          <p:nvPr/>
+        </p:nvSpPr>
+        <p:spPr>
+          <a:xfrm>
+            <a:off x="6722622" y="5196520"/>
+            <a:ext cx="1350628" cy="818392"/>
+          </a:xfrm>
+          <a:prstGeom prst="wedgeRectCallout">
+            <a:avLst>
+              <a:gd name="adj1" fmla="val -4063"/>
+              <a:gd name="adj2" fmla="val -250142"/>
+            </a:avLst>
+          </a:prstGeom>
+        </p:spPr>
+        <p:style>
+          <a:lnRef idx="2">
+            <a:schemeClr val="accent1">
+              <a:shade val="50000"/>
+            </a:schemeClr>
+          </a:lnRef>
+          <a:fillRef idx="1">
+            <a:schemeClr val="accent1"/>
+          </a:fillRef>
+          <a:effectRef idx="0">
+            <a:schemeClr val="accent1"/>
+          </a:effectRef>
+          <a:fontRef idx="minor">
+            <a:schemeClr val="lt1"/>
+          </a:fontRef>
+        </p:style>
+        <p:txBody>
+          <a:bodyPr rtlCol="0" anchor="ctr"/>
+          <a:lstStyle/>
+          <a:p>
+            <a:pPr algn="ctr"/>
+            <a:r>
+              <a:rPr lang="en-GB" dirty="0">
+                <a:hlinkClick r:id="rId6"/>
+              </a:rPr>
+              <a:t>GEORGIA-PACIFIC</a:t>
+            </a:r>
+            <a:endParaRPr lang="en-GB" dirty="0"/>
+          </a:p>
+        </p:txBody>
+      </p:sp>
+      <p:sp>
+        <p:nvSpPr>
+          <p:cNvPr id="13" name="Bulle narrative : rectangle 12">
+            <a:extLst>
+              <a:ext uri="{FF2B5EF4-FFF2-40B4-BE49-F238E27FC236}">
+                <a16:creationId xmlns:a16="http://schemas.microsoft.com/office/drawing/2014/main" id="{417EF19A-8C2D-4EE7-8CC7-BC51D89E19EB}"/>
+              </a:ext>
+            </a:extLst>
+          </p:cNvPr>
+          <p:cNvSpPr/>
+          <p:nvPr/>
+        </p:nvSpPr>
+        <p:spPr>
+          <a:xfrm>
+            <a:off x="10165079" y="5131618"/>
+            <a:ext cx="1350628" cy="818392"/>
+          </a:xfrm>
+          <a:prstGeom prst="wedgeRectCallout">
+            <a:avLst>
+              <a:gd name="adj1" fmla="val -53752"/>
+              <a:gd name="adj2" fmla="val -124060"/>
+            </a:avLst>
+          </a:prstGeom>
+        </p:spPr>
+        <p:style>
+          <a:lnRef idx="2">
+            <a:schemeClr val="accent1">
+              <a:shade val="50000"/>
+            </a:schemeClr>
+          </a:lnRef>
+          <a:fillRef idx="1">
+            <a:schemeClr val="accent1"/>
+          </a:fillRef>
+          <a:effectRef idx="0">
+            <a:schemeClr val="accent1"/>
+          </a:effectRef>
+          <a:fontRef idx="minor">
+            <a:schemeClr val="lt1"/>
+          </a:fontRef>
+        </p:style>
+        <p:txBody>
+          <a:bodyPr rtlCol="0" anchor="ctr"/>
+          <a:lstStyle/>
+          <a:p>
+            <a:pPr algn="ctr"/>
+            <a:r>
+              <a:rPr lang="en-GB" dirty="0">
+                <a:hlinkClick r:id="rId6"/>
+              </a:rPr>
+              <a:t>GEORGIA-PACIFIC</a:t>
+            </a:r>
+            <a:endParaRPr lang="en-GB" dirty="0"/>
+          </a:p>
+        </p:txBody>
+      </p:sp>
     </p:spTree>
     <p:extLst>
       <p:ext uri="{BB962C8B-B14F-4D97-AF65-F5344CB8AC3E}">

</xml_diff>

<commit_message>
#12 Bubbles text added on solution slides on presentation
</commit_message>
<xml_diff>
--- a/SAI_presentation.pptx
+++ b/SAI_presentation.pptx
@@ -19237,12 +19237,13 @@
           <a:p>
             <a:pPr algn="ctr"/>
             <a:r>
-              <a:rPr lang="en-GB" dirty="0">
-                <a:hlinkClick r:id="rId6"/>
-              </a:rPr>
-              <a:t>GEORGIA-PACIFIC</a:t>
-            </a:r>
-            <a:endParaRPr lang="en-GB" dirty="0"/>
+              <a:rPr lang="fr-FR" dirty="0"/>
+              <a:t>B</a:t>
+            </a:r>
+            <a:r>
+              <a:rPr lang="en-GB" dirty="0"/>
+              <a:t>ox to show SAI understanding</a:t>
+            </a:r>
           </a:p>
         </p:txBody>
       </p:sp>
@@ -19292,12 +19293,9 @@
           <a:p>
             <a:pPr algn="ctr"/>
             <a:r>
-              <a:rPr lang="en-GB" dirty="0">
-                <a:hlinkClick r:id="rId6"/>
-              </a:rPr>
-              <a:t>GEORGIA-PACIFIC</a:t>
-            </a:r>
-            <a:endParaRPr lang="en-GB" dirty="0"/>
+              <a:rPr lang="en-GB" dirty="0"/>
+              <a:t>Click to match the strategy with their label</a:t>
+            </a:r>
           </a:p>
         </p:txBody>
       </p:sp>
@@ -19320,8 +19318,8 @@
           </a:xfrm>
           <a:prstGeom prst="wedgeRectCallout">
             <a:avLst>
-              <a:gd name="adj1" fmla="val -53752"/>
-              <a:gd name="adj2" fmla="val -124060"/>
+              <a:gd name="adj1" fmla="val -46920"/>
+              <a:gd name="adj2" fmla="val -136361"/>
             </a:avLst>
           </a:prstGeom>
         </p:spPr>
@@ -19347,10 +19345,12 @@
           <a:p>
             <a:pPr algn="ctr"/>
             <a:r>
-              <a:rPr lang="en-GB" dirty="0">
-                <a:hlinkClick r:id="rId6"/>
-              </a:rPr>
-              <a:t>GEORGIA-PACIFIC</a:t>
+              <a:rPr lang="en-GB" dirty="0"/>
+              <a:t>Show the </a:t>
+            </a:r>
+            <a:r>
+              <a:rPr lang="en-GB" dirty="0" err="1"/>
+              <a:t>understading</a:t>
             </a:r>
             <a:endParaRPr lang="en-GB" dirty="0"/>
           </a:p>

</xml_diff>

<commit_message>
#12 Bubbles colors updated on solution slides on presentation
</commit_message>
<xml_diff>
--- a/SAI_presentation.pptx
+++ b/SAI_presentation.pptx
@@ -6942,7 +6942,7 @@
             <a:fld id="{B61BEF0D-F0BB-DE4B-95CE-6DB70DBA9567}" type="datetimeFigureOut">
               <a:rPr lang="en-US" dirty="0"/>
               <a:pPr/>
-              <a:t>4/5/2020</a:t>
+              <a:t>4/6/2020</a:t>
             </a:fld>
             <a:endParaRPr lang="en-US" dirty="0"/>
           </a:p>
@@ -7375,7 +7375,7 @@
             <a:fld id="{B61BEF0D-F0BB-DE4B-95CE-6DB70DBA9567}" type="datetimeFigureOut">
               <a:rPr lang="en-US" dirty="0"/>
               <a:pPr/>
-              <a:t>4/5/2020</a:t>
+              <a:t>4/6/2020</a:t>
             </a:fld>
             <a:endParaRPr lang="en-US" dirty="0"/>
           </a:p>
@@ -7622,7 +7622,7 @@
             <a:fld id="{B61BEF0D-F0BB-DE4B-95CE-6DB70DBA9567}" type="datetimeFigureOut">
               <a:rPr lang="en-US" dirty="0"/>
               <a:pPr/>
-              <a:t>4/5/2020</a:t>
+              <a:t>4/6/2020</a:t>
             </a:fld>
             <a:endParaRPr lang="en-US" dirty="0"/>
           </a:p>
@@ -7927,7 +7927,7 @@
             <a:fld id="{B61BEF0D-F0BB-DE4B-95CE-6DB70DBA9567}" type="datetimeFigureOut">
               <a:rPr lang="en-US" dirty="0"/>
               <a:pPr/>
-              <a:t>4/5/2020</a:t>
+              <a:t>4/6/2020</a:t>
             </a:fld>
             <a:endParaRPr lang="en-US" dirty="0"/>
           </a:p>
@@ -8242,7 +8242,7 @@
             <a:fld id="{B61BEF0D-F0BB-DE4B-95CE-6DB70DBA9567}" type="datetimeFigureOut">
               <a:rPr lang="en-US" dirty="0"/>
               <a:pPr/>
-              <a:t>4/5/2020</a:t>
+              <a:t>4/6/2020</a:t>
             </a:fld>
             <a:endParaRPr lang="en-US" dirty="0"/>
           </a:p>
@@ -8541,7 +8541,7 @@
             <a:fld id="{B61BEF0D-F0BB-DE4B-95CE-6DB70DBA9567}" type="datetimeFigureOut">
               <a:rPr lang="en-US" dirty="0"/>
               <a:pPr/>
-              <a:t>4/5/2020</a:t>
+              <a:t>4/6/2020</a:t>
             </a:fld>
             <a:endParaRPr lang="en-US" dirty="0"/>
           </a:p>
@@ -8905,7 +8905,7 @@
             <a:fld id="{B61BEF0D-F0BB-DE4B-95CE-6DB70DBA9567}" type="datetimeFigureOut">
               <a:rPr lang="en-US" dirty="0"/>
               <a:pPr/>
-              <a:t>4/5/2020</a:t>
+              <a:t>4/6/2020</a:t>
             </a:fld>
             <a:endParaRPr lang="en-US" dirty="0"/>
           </a:p>
@@ -9076,7 +9076,7 @@
             <a:fld id="{B61BEF0D-F0BB-DE4B-95CE-6DB70DBA9567}" type="datetimeFigureOut">
               <a:rPr lang="en-US" dirty="0"/>
               <a:pPr/>
-              <a:t>4/5/2020</a:t>
+              <a:t>4/6/2020</a:t>
             </a:fld>
             <a:endParaRPr lang="en-US" dirty="0"/>
           </a:p>
@@ -9253,7 +9253,7 @@
             <a:fld id="{B61BEF0D-F0BB-DE4B-95CE-6DB70DBA9567}" type="datetimeFigureOut">
               <a:rPr lang="en-US" dirty="0"/>
               <a:pPr/>
-              <a:t>4/5/2020</a:t>
+              <a:t>4/6/2020</a:t>
             </a:fld>
             <a:endParaRPr lang="en-US" dirty="0"/>
           </a:p>
@@ -9420,7 +9420,7 @@
             <a:fld id="{B61BEF0D-F0BB-DE4B-95CE-6DB70DBA9567}" type="datetimeFigureOut">
               <a:rPr lang="en-US" dirty="0"/>
               <a:pPr/>
-              <a:t>4/5/2020</a:t>
+              <a:t>4/6/2020</a:t>
             </a:fld>
             <a:endParaRPr lang="en-US" dirty="0"/>
           </a:p>
@@ -9667,7 +9667,7 @@
             <a:fld id="{B61BEF0D-F0BB-DE4B-95CE-6DB70DBA9567}" type="datetimeFigureOut">
               <a:rPr lang="en-US" dirty="0"/>
               <a:pPr/>
-              <a:t>4/5/2020</a:t>
+              <a:t>4/6/2020</a:t>
             </a:fld>
             <a:endParaRPr lang="en-US" dirty="0"/>
           </a:p>
@@ -9900,7 +9900,7 @@
             <a:fld id="{B61BEF0D-F0BB-DE4B-95CE-6DB70DBA9567}" type="datetimeFigureOut">
               <a:rPr lang="en-US" dirty="0"/>
               <a:pPr/>
-              <a:t>4/5/2020</a:t>
+              <a:t>4/6/2020</a:t>
             </a:fld>
             <a:endParaRPr lang="en-US" dirty="0"/>
           </a:p>
@@ -10279,7 +10279,7 @@
             <a:fld id="{B61BEF0D-F0BB-DE4B-95CE-6DB70DBA9567}" type="datetimeFigureOut">
               <a:rPr lang="en-US" dirty="0"/>
               <a:pPr/>
-              <a:t>4/5/2020</a:t>
+              <a:t>4/6/2020</a:t>
             </a:fld>
             <a:endParaRPr lang="en-US" dirty="0"/>
           </a:p>
@@ -10394,7 +10394,7 @@
             <a:fld id="{B61BEF0D-F0BB-DE4B-95CE-6DB70DBA9567}" type="datetimeFigureOut">
               <a:rPr lang="en-US" dirty="0"/>
               <a:pPr/>
-              <a:t>4/5/2020</a:t>
+              <a:t>4/6/2020</a:t>
             </a:fld>
             <a:endParaRPr lang="en-US" dirty="0"/>
           </a:p>
@@ -10486,7 +10486,7 @@
             <a:fld id="{B61BEF0D-F0BB-DE4B-95CE-6DB70DBA9567}" type="datetimeFigureOut">
               <a:rPr lang="en-US" dirty="0"/>
               <a:pPr/>
-              <a:t>4/5/2020</a:t>
+              <a:t>4/6/2020</a:t>
             </a:fld>
             <a:endParaRPr lang="en-US" dirty="0"/>
           </a:p>
@@ -10738,7 +10738,7 @@
             <a:fld id="{B61BEF0D-F0BB-DE4B-95CE-6DB70DBA9567}" type="datetimeFigureOut">
               <a:rPr lang="en-US" dirty="0"/>
               <a:pPr/>
-              <a:t>4/5/2020</a:t>
+              <a:t>4/6/2020</a:t>
             </a:fld>
             <a:endParaRPr lang="en-US" dirty="0"/>
           </a:p>
@@ -11018,7 +11018,7 @@
             <a:fld id="{B61BEF0D-F0BB-DE4B-95CE-6DB70DBA9567}" type="datetimeFigureOut">
               <a:rPr lang="en-US" dirty="0"/>
               <a:pPr/>
-              <a:t>4/5/2020</a:t>
+              <a:t>4/6/2020</a:t>
             </a:fld>
             <a:endParaRPr lang="en-US" dirty="0"/>
           </a:p>
@@ -11421,7 +11421,7 @@
             <a:fld id="{B61BEF0D-F0BB-DE4B-95CE-6DB70DBA9567}" type="datetimeFigureOut">
               <a:rPr lang="en-US" dirty="0"/>
               <a:pPr/>
-              <a:t>4/5/2020</a:t>
+              <a:t>4/6/2020</a:t>
             </a:fld>
             <a:endParaRPr lang="en-US" dirty="0"/>
           </a:p>
@@ -19214,6 +19214,14 @@
               <a:gd name="adj2" fmla="val -124060"/>
             </a:avLst>
           </a:prstGeom>
+          <a:solidFill>
+            <a:srgbClr val="00B0F0"/>
+          </a:solidFill>
+          <a:ln>
+            <a:solidFill>
+              <a:srgbClr val="00B0F0"/>
+            </a:solidFill>
+          </a:ln>
         </p:spPr>
         <p:style>
           <a:lnRef idx="2">
@@ -19270,6 +19278,14 @@
               <a:gd name="adj2" fmla="val -250142"/>
             </a:avLst>
           </a:prstGeom>
+          <a:solidFill>
+            <a:srgbClr val="00B0F0"/>
+          </a:solidFill>
+          <a:ln>
+            <a:solidFill>
+              <a:srgbClr val="00B0F0"/>
+            </a:solidFill>
+          </a:ln>
         </p:spPr>
         <p:style>
           <a:lnRef idx="2">
@@ -19322,6 +19338,14 @@
               <a:gd name="adj2" fmla="val -136361"/>
             </a:avLst>
           </a:prstGeom>
+          <a:solidFill>
+            <a:srgbClr val="00B0F0"/>
+          </a:solidFill>
+          <a:ln>
+            <a:solidFill>
+              <a:srgbClr val="00B0F0"/>
+            </a:solidFill>
+          </a:ln>
         </p:spPr>
         <p:style>
           <a:lnRef idx="2">

</xml_diff>

<commit_message>
#12 Bubble boxes reshaped on solution slides on presentation
</commit_message>
<xml_diff>
--- a/SAI_presentation.pptx
+++ b/SAI_presentation.pptx
@@ -19205,13 +19205,13 @@
         </p:nvSpPr>
         <p:spPr>
           <a:xfrm>
-            <a:off x="2701255" y="5176007"/>
-            <a:ext cx="1350628" cy="818392"/>
+            <a:off x="2701254" y="5176006"/>
+            <a:ext cx="1837189" cy="922789"/>
           </a:xfrm>
           <a:prstGeom prst="wedgeRectCallout">
             <a:avLst>
-              <a:gd name="adj1" fmla="val -53752"/>
-              <a:gd name="adj2" fmla="val -124060"/>
+              <a:gd name="adj1" fmla="val -45989"/>
+              <a:gd name="adj2" fmla="val -117696"/>
             </a:avLst>
           </a:prstGeom>
           <a:solidFill>
@@ -19269,13 +19269,13 @@
         </p:nvSpPr>
         <p:spPr>
           <a:xfrm>
-            <a:off x="6722622" y="5196520"/>
-            <a:ext cx="1350628" cy="818392"/>
+            <a:off x="6722622" y="5196519"/>
+            <a:ext cx="1968372" cy="826003"/>
           </a:xfrm>
           <a:prstGeom prst="wedgeRectCallout">
             <a:avLst>
-              <a:gd name="adj1" fmla="val -4063"/>
-              <a:gd name="adj2" fmla="val -250142"/>
+              <a:gd name="adj1" fmla="val -18980"/>
+              <a:gd name="adj2" fmla="val -247095"/>
             </a:avLst>
           </a:prstGeom>
           <a:solidFill>
@@ -19329,13 +19329,13 @@
         </p:nvSpPr>
         <p:spPr>
           <a:xfrm>
-            <a:off x="10165079" y="5131618"/>
-            <a:ext cx="1350628" cy="818392"/>
+            <a:off x="9731230" y="5131618"/>
+            <a:ext cx="2105636" cy="656786"/>
           </a:xfrm>
           <a:prstGeom prst="wedgeRectCallout">
             <a:avLst>
-              <a:gd name="adj1" fmla="val -46920"/>
-              <a:gd name="adj2" fmla="val -136361"/>
+              <a:gd name="adj1" fmla="val -28992"/>
+              <a:gd name="adj2" fmla="val -159352"/>
             </a:avLst>
           </a:prstGeom>
           <a:solidFill>

</xml_diff>

<commit_message>
#12 Axes labels added on solution slides on presentation
</commit_message>
<xml_diff>
--- a/SAI_presentation.pptx
+++ b/SAI_presentation.pptx
@@ -19001,7 +19001,7 @@
         </p:blipFill>
         <p:spPr>
           <a:xfrm>
-            <a:off x="4051883" y="68130"/>
+            <a:off x="4069362" y="82812"/>
             <a:ext cx="4046535" cy="2846969"/>
           </a:xfrm>
           <a:prstGeom prst="rect">
@@ -19377,6 +19377,102 @@
               <a:t>understading</a:t>
             </a:r>
             <a:endParaRPr lang="en-GB" dirty="0"/>
+          </a:p>
+        </p:txBody>
+      </p:sp>
+      <p:sp>
+        <p:nvSpPr>
+          <p:cNvPr id="14" name="ZoneTexte 13">
+            <a:extLst>
+              <a:ext uri="{FF2B5EF4-FFF2-40B4-BE49-F238E27FC236}">
+                <a16:creationId xmlns:a16="http://schemas.microsoft.com/office/drawing/2014/main" id="{650B99DC-B831-4132-ACAD-6D065108A238}"/>
+              </a:ext>
+            </a:extLst>
+          </p:cNvPr>
+          <p:cNvSpPr txBox="1"/>
+          <p:nvPr/>
+        </p:nvSpPr>
+        <p:spPr>
+          <a:xfrm>
+            <a:off x="5033393" y="2516697"/>
+            <a:ext cx="2575421" cy="369332"/>
+          </a:xfrm>
+          <a:prstGeom prst="rect">
+            <a:avLst/>
+          </a:prstGeom>
+          <a:noFill/>
+        </p:spPr>
+        <p:txBody>
+          <a:bodyPr wrap="square" rtlCol="0">
+            <a:spAutoFit/>
+          </a:bodyPr>
+          <a:lstStyle/>
+          <a:p>
+            <a:r>
+              <a:rPr lang="fr-FR" dirty="0">
+                <a:solidFill>
+                  <a:schemeClr val="bg1"/>
+                </a:solidFill>
+              </a:rPr>
+              <a:t>Time</a:t>
+            </a:r>
+            <a:endParaRPr lang="en-GB" dirty="0">
+              <a:solidFill>
+                <a:schemeClr val="bg1"/>
+              </a:solidFill>
+            </a:endParaRPr>
+          </a:p>
+        </p:txBody>
+      </p:sp>
+      <p:sp>
+        <p:nvSpPr>
+          <p:cNvPr id="15" name="ZoneTexte 14">
+            <a:extLst>
+              <a:ext uri="{FF2B5EF4-FFF2-40B4-BE49-F238E27FC236}">
+                <a16:creationId xmlns:a16="http://schemas.microsoft.com/office/drawing/2014/main" id="{3FBCF1A4-4E92-4010-95A9-A55FD5B9419D}"/>
+              </a:ext>
+            </a:extLst>
+          </p:cNvPr>
+          <p:cNvSpPr txBox="1"/>
+          <p:nvPr/>
+        </p:nvSpPr>
+        <p:spPr>
+          <a:xfrm rot="16200000">
+            <a:off x="3179543" y="1263071"/>
+            <a:ext cx="1964447" cy="369332"/>
+          </a:xfrm>
+          <a:prstGeom prst="rect">
+            <a:avLst/>
+          </a:prstGeom>
+          <a:noFill/>
+        </p:spPr>
+        <p:txBody>
+          <a:bodyPr wrap="square" rtlCol="0">
+            <a:spAutoFit/>
+          </a:bodyPr>
+          <a:lstStyle/>
+          <a:p>
+            <a:r>
+              <a:rPr lang="fr-FR" dirty="0">
+                <a:solidFill>
+                  <a:schemeClr val="bg1"/>
+                </a:solidFill>
+              </a:rPr>
+              <a:t>Nb </a:t>
+            </a:r>
+            <a:r>
+              <a:rPr lang="fr-FR" dirty="0" err="1">
+                <a:solidFill>
+                  <a:schemeClr val="bg1"/>
+                </a:solidFill>
+              </a:rPr>
+              <a:t>commands</a:t>
+            </a:r>
+            <a:endParaRPr lang="en-GB" dirty="0">
+              <a:solidFill>
+                <a:schemeClr val="bg1"/>
+              </a:solidFill>
+            </a:endParaRPr>
           </a:p>
         </p:txBody>
       </p:sp>

</xml_diff>

<commit_message>
#12 Speech text added on introduction slide on presentation
</commit_message>
<xml_diff>
--- a/SAI_presentation.pptx
+++ b/SAI_presentation.pptx
@@ -4,6 +4,9 @@
   <p:sldMasterIdLst>
     <p:sldMasterId id="2147483648" r:id="rId1"/>
   </p:sldMasterIdLst>
+  <p:notesMasterIdLst>
+    <p:notesMasterId r:id="rId25"/>
+  </p:notesMasterIdLst>
   <p:sldIdLst>
     <p:sldId id="256" r:id="rId2"/>
     <p:sldId id="257" r:id="rId3"/>
@@ -2407,7 +2410,7 @@
   <dgm:whole/>
   <dgm:extLst>
     <a:ext uri="http://schemas.microsoft.com/office/drawing/2008/diagram">
-      <dsp:dataModelExt xmlns:dsp="http://schemas.microsoft.com/office/drawing/2008/diagram" relId="rId6" minVer="http://schemas.openxmlformats.org/drawingml/2006/diagram"/>
+      <dsp:dataModelExt xmlns:dsp="http://schemas.microsoft.com/office/drawing/2008/diagram" relId="rId7" minVer="http://schemas.openxmlformats.org/drawingml/2006/diagram"/>
     </a:ext>
   </dgm:extLst>
 </dgm:dataModel>
@@ -6750,6 +6753,712 @@
 </dgm:styleDef>
 </file>
 
+<file path=ppt/notesMasters/notesMaster1.xml><?xml version="1.0" encoding="utf-8"?>
+<p:notesMaster xmlns:a="http://schemas.openxmlformats.org/drawingml/2006/main" xmlns:r="http://schemas.openxmlformats.org/officeDocument/2006/relationships" xmlns:p="http://schemas.openxmlformats.org/presentationml/2006/main">
+  <p:cSld>
+    <p:bg>
+      <p:bgRef idx="1001">
+        <a:schemeClr val="bg1"/>
+      </p:bgRef>
+    </p:bg>
+    <p:spTree>
+      <p:nvGrpSpPr>
+        <p:cNvPr id="1" name=""/>
+        <p:cNvGrpSpPr/>
+        <p:nvPr/>
+      </p:nvGrpSpPr>
+      <p:grpSpPr>
+        <a:xfrm>
+          <a:off x="0" y="0"/>
+          <a:ext cx="0" cy="0"/>
+          <a:chOff x="0" y="0"/>
+          <a:chExt cx="0" cy="0"/>
+        </a:xfrm>
+      </p:grpSpPr>
+      <p:sp>
+        <p:nvSpPr>
+          <p:cNvPr id="2" name="Espace réservé de l'en-tête 1"/>
+          <p:cNvSpPr>
+            <a:spLocks noGrp="1"/>
+          </p:cNvSpPr>
+          <p:nvPr>
+            <p:ph type="hdr" sz="quarter"/>
+          </p:nvPr>
+        </p:nvSpPr>
+        <p:spPr>
+          <a:xfrm>
+            <a:off x="0" y="0"/>
+            <a:ext cx="2971800" cy="458788"/>
+          </a:xfrm>
+          <a:prstGeom prst="rect">
+            <a:avLst/>
+          </a:prstGeom>
+        </p:spPr>
+        <p:txBody>
+          <a:bodyPr vert="horz" lIns="91440" tIns="45720" rIns="91440" bIns="45720" rtlCol="0"/>
+          <a:lstStyle>
+            <a:lvl1pPr algn="l">
+              <a:defRPr sz="1200"/>
+            </a:lvl1pPr>
+          </a:lstStyle>
+          <a:p>
+            <a:endParaRPr lang="en-GB"/>
+          </a:p>
+        </p:txBody>
+      </p:sp>
+      <p:sp>
+        <p:nvSpPr>
+          <p:cNvPr id="3" name="Espace réservé de la date 2"/>
+          <p:cNvSpPr>
+            <a:spLocks noGrp="1"/>
+          </p:cNvSpPr>
+          <p:nvPr>
+            <p:ph type="dt" idx="1"/>
+          </p:nvPr>
+        </p:nvSpPr>
+        <p:spPr>
+          <a:xfrm>
+            <a:off x="3884613" y="0"/>
+            <a:ext cx="2971800" cy="458788"/>
+          </a:xfrm>
+          <a:prstGeom prst="rect">
+            <a:avLst/>
+          </a:prstGeom>
+        </p:spPr>
+        <p:txBody>
+          <a:bodyPr vert="horz" lIns="91440" tIns="45720" rIns="91440" bIns="45720" rtlCol="0"/>
+          <a:lstStyle>
+            <a:lvl1pPr algn="r">
+              <a:defRPr sz="1200"/>
+            </a:lvl1pPr>
+          </a:lstStyle>
+          <a:p>
+            <a:fld id="{76162502-F79B-49BA-ABA1-44817C9D6501}" type="datetimeFigureOut">
+              <a:rPr lang="en-GB" smtClean="0"/>
+              <a:t>07/04/2020</a:t>
+            </a:fld>
+            <a:endParaRPr lang="en-GB"/>
+          </a:p>
+        </p:txBody>
+      </p:sp>
+      <p:sp>
+        <p:nvSpPr>
+          <p:cNvPr id="4" name="Espace réservé de l'image des diapositives 3"/>
+          <p:cNvSpPr>
+            <a:spLocks noGrp="1" noRot="1" noChangeAspect="1"/>
+          </p:cNvSpPr>
+          <p:nvPr>
+            <p:ph type="sldImg" idx="2"/>
+          </p:nvPr>
+        </p:nvSpPr>
+        <p:spPr>
+          <a:xfrm>
+            <a:off x="685800" y="1143000"/>
+            <a:ext cx="5486400" cy="3086100"/>
+          </a:xfrm>
+          <a:prstGeom prst="rect">
+            <a:avLst/>
+          </a:prstGeom>
+          <a:noFill/>
+          <a:ln w="12700">
+            <a:solidFill>
+              <a:prstClr val="black"/>
+            </a:solidFill>
+          </a:ln>
+        </p:spPr>
+        <p:txBody>
+          <a:bodyPr vert="horz" lIns="91440" tIns="45720" rIns="91440" bIns="45720" rtlCol="0" anchor="ctr"/>
+          <a:lstStyle/>
+          <a:p>
+            <a:endParaRPr lang="en-GB"/>
+          </a:p>
+        </p:txBody>
+      </p:sp>
+      <p:sp>
+        <p:nvSpPr>
+          <p:cNvPr id="5" name="Espace réservé des notes 4"/>
+          <p:cNvSpPr>
+            <a:spLocks noGrp="1"/>
+          </p:cNvSpPr>
+          <p:nvPr>
+            <p:ph type="body" sz="quarter" idx="3"/>
+          </p:nvPr>
+        </p:nvSpPr>
+        <p:spPr>
+          <a:xfrm>
+            <a:off x="685800" y="4400550"/>
+            <a:ext cx="5486400" cy="3600450"/>
+          </a:xfrm>
+          <a:prstGeom prst="rect">
+            <a:avLst/>
+          </a:prstGeom>
+        </p:spPr>
+        <p:txBody>
+          <a:bodyPr vert="horz" lIns="91440" tIns="45720" rIns="91440" bIns="45720" rtlCol="0"/>
+          <a:lstStyle/>
+          <a:p>
+            <a:pPr lvl="0"/>
+            <a:r>
+              <a:rPr lang="fr-FR"/>
+              <a:t>Cliquez pour modifier les styles du texte du masque</a:t>
+            </a:r>
+          </a:p>
+          <a:p>
+            <a:pPr lvl="1"/>
+            <a:r>
+              <a:rPr lang="fr-FR"/>
+              <a:t>Deuxième niveau</a:t>
+            </a:r>
+          </a:p>
+          <a:p>
+            <a:pPr lvl="2"/>
+            <a:r>
+              <a:rPr lang="fr-FR"/>
+              <a:t>Troisième niveau</a:t>
+            </a:r>
+          </a:p>
+          <a:p>
+            <a:pPr lvl="3"/>
+            <a:r>
+              <a:rPr lang="fr-FR"/>
+              <a:t>Quatrième niveau</a:t>
+            </a:r>
+          </a:p>
+          <a:p>
+            <a:pPr lvl="4"/>
+            <a:r>
+              <a:rPr lang="fr-FR"/>
+              <a:t>Cinquième niveau</a:t>
+            </a:r>
+            <a:endParaRPr lang="en-GB"/>
+          </a:p>
+        </p:txBody>
+      </p:sp>
+      <p:sp>
+        <p:nvSpPr>
+          <p:cNvPr id="6" name="Espace réservé du pied de page 5"/>
+          <p:cNvSpPr>
+            <a:spLocks noGrp="1"/>
+          </p:cNvSpPr>
+          <p:nvPr>
+            <p:ph type="ftr" sz="quarter" idx="4"/>
+          </p:nvPr>
+        </p:nvSpPr>
+        <p:spPr>
+          <a:xfrm>
+            <a:off x="0" y="8685213"/>
+            <a:ext cx="2971800" cy="458787"/>
+          </a:xfrm>
+          <a:prstGeom prst="rect">
+            <a:avLst/>
+          </a:prstGeom>
+        </p:spPr>
+        <p:txBody>
+          <a:bodyPr vert="horz" lIns="91440" tIns="45720" rIns="91440" bIns="45720" rtlCol="0" anchor="b"/>
+          <a:lstStyle>
+            <a:lvl1pPr algn="l">
+              <a:defRPr sz="1200"/>
+            </a:lvl1pPr>
+          </a:lstStyle>
+          <a:p>
+            <a:endParaRPr lang="en-GB"/>
+          </a:p>
+        </p:txBody>
+      </p:sp>
+      <p:sp>
+        <p:nvSpPr>
+          <p:cNvPr id="7" name="Espace réservé du numéro de diapositive 6"/>
+          <p:cNvSpPr>
+            <a:spLocks noGrp="1"/>
+          </p:cNvSpPr>
+          <p:nvPr>
+            <p:ph type="sldNum" sz="quarter" idx="5"/>
+          </p:nvPr>
+        </p:nvSpPr>
+        <p:spPr>
+          <a:xfrm>
+            <a:off x="3884613" y="8685213"/>
+            <a:ext cx="2971800" cy="458787"/>
+          </a:xfrm>
+          <a:prstGeom prst="rect">
+            <a:avLst/>
+          </a:prstGeom>
+        </p:spPr>
+        <p:txBody>
+          <a:bodyPr vert="horz" lIns="91440" tIns="45720" rIns="91440" bIns="45720" rtlCol="0" anchor="b"/>
+          <a:lstStyle>
+            <a:lvl1pPr algn="r">
+              <a:defRPr sz="1200"/>
+            </a:lvl1pPr>
+          </a:lstStyle>
+          <a:p>
+            <a:fld id="{70E91AD3-41F0-4AF2-986E-6281E051088E}" type="slidenum">
+              <a:rPr lang="en-GB" smtClean="0"/>
+              <a:t>‹N°›</a:t>
+            </a:fld>
+            <a:endParaRPr lang="en-GB"/>
+          </a:p>
+        </p:txBody>
+      </p:sp>
+    </p:spTree>
+    <p:extLst>
+      <p:ext uri="{BB962C8B-B14F-4D97-AF65-F5344CB8AC3E}">
+        <p14:creationId xmlns:p14="http://schemas.microsoft.com/office/powerpoint/2010/main" val="4006388551"/>
+      </p:ext>
+    </p:extLst>
+  </p:cSld>
+  <p:clrMap bg1="lt1" tx1="dk1" bg2="lt2" tx2="dk2" accent1="accent1" accent2="accent2" accent3="accent3" accent4="accent4" accent5="accent5" accent6="accent6" hlink="hlink" folHlink="folHlink"/>
+  <p:notesStyle>
+    <a:lvl1pPr marL="0" algn="l" defTabSz="914400" rtl="0" eaLnBrk="1" latinLnBrk="0" hangingPunct="1">
+      <a:defRPr sz="1200" kern="1200">
+        <a:solidFill>
+          <a:schemeClr val="tx1"/>
+        </a:solidFill>
+        <a:latin typeface="+mn-lt"/>
+        <a:ea typeface="+mn-ea"/>
+        <a:cs typeface="+mn-cs"/>
+      </a:defRPr>
+    </a:lvl1pPr>
+    <a:lvl2pPr marL="457200" algn="l" defTabSz="914400" rtl="0" eaLnBrk="1" latinLnBrk="0" hangingPunct="1">
+      <a:defRPr sz="1200" kern="1200">
+        <a:solidFill>
+          <a:schemeClr val="tx1"/>
+        </a:solidFill>
+        <a:latin typeface="+mn-lt"/>
+        <a:ea typeface="+mn-ea"/>
+        <a:cs typeface="+mn-cs"/>
+      </a:defRPr>
+    </a:lvl2pPr>
+    <a:lvl3pPr marL="914400" algn="l" defTabSz="914400" rtl="0" eaLnBrk="1" latinLnBrk="0" hangingPunct="1">
+      <a:defRPr sz="1200" kern="1200">
+        <a:solidFill>
+          <a:schemeClr val="tx1"/>
+        </a:solidFill>
+        <a:latin typeface="+mn-lt"/>
+        <a:ea typeface="+mn-ea"/>
+        <a:cs typeface="+mn-cs"/>
+      </a:defRPr>
+    </a:lvl3pPr>
+    <a:lvl4pPr marL="1371600" algn="l" defTabSz="914400" rtl="0" eaLnBrk="1" latinLnBrk="0" hangingPunct="1">
+      <a:defRPr sz="1200" kern="1200">
+        <a:solidFill>
+          <a:schemeClr val="tx1"/>
+        </a:solidFill>
+        <a:latin typeface="+mn-lt"/>
+        <a:ea typeface="+mn-ea"/>
+        <a:cs typeface="+mn-cs"/>
+      </a:defRPr>
+    </a:lvl4pPr>
+    <a:lvl5pPr marL="1828800" algn="l" defTabSz="914400" rtl="0" eaLnBrk="1" latinLnBrk="0" hangingPunct="1">
+      <a:defRPr sz="1200" kern="1200">
+        <a:solidFill>
+          <a:schemeClr val="tx1"/>
+        </a:solidFill>
+        <a:latin typeface="+mn-lt"/>
+        <a:ea typeface="+mn-ea"/>
+        <a:cs typeface="+mn-cs"/>
+      </a:defRPr>
+    </a:lvl5pPr>
+    <a:lvl6pPr marL="2286000" algn="l" defTabSz="914400" rtl="0" eaLnBrk="1" latinLnBrk="0" hangingPunct="1">
+      <a:defRPr sz="1200" kern="1200">
+        <a:solidFill>
+          <a:schemeClr val="tx1"/>
+        </a:solidFill>
+        <a:latin typeface="+mn-lt"/>
+        <a:ea typeface="+mn-ea"/>
+        <a:cs typeface="+mn-cs"/>
+      </a:defRPr>
+    </a:lvl6pPr>
+    <a:lvl7pPr marL="2743200" algn="l" defTabSz="914400" rtl="0" eaLnBrk="1" latinLnBrk="0" hangingPunct="1">
+      <a:defRPr sz="1200" kern="1200">
+        <a:solidFill>
+          <a:schemeClr val="tx1"/>
+        </a:solidFill>
+        <a:latin typeface="+mn-lt"/>
+        <a:ea typeface="+mn-ea"/>
+        <a:cs typeface="+mn-cs"/>
+      </a:defRPr>
+    </a:lvl7pPr>
+    <a:lvl8pPr marL="3200400" algn="l" defTabSz="914400" rtl="0" eaLnBrk="1" latinLnBrk="0" hangingPunct="1">
+      <a:defRPr sz="1200" kern="1200">
+        <a:solidFill>
+          <a:schemeClr val="tx1"/>
+        </a:solidFill>
+        <a:latin typeface="+mn-lt"/>
+        <a:ea typeface="+mn-ea"/>
+        <a:cs typeface="+mn-cs"/>
+      </a:defRPr>
+    </a:lvl8pPr>
+    <a:lvl9pPr marL="3657600" algn="l" defTabSz="914400" rtl="0" eaLnBrk="1" latinLnBrk="0" hangingPunct="1">
+      <a:defRPr sz="1200" kern="1200">
+        <a:solidFill>
+          <a:schemeClr val="tx1"/>
+        </a:solidFill>
+        <a:latin typeface="+mn-lt"/>
+        <a:ea typeface="+mn-ea"/>
+        <a:cs typeface="+mn-cs"/>
+      </a:defRPr>
+    </a:lvl9pPr>
+  </p:notesStyle>
+</p:notesMaster>
+</file>
+
+<file path=ppt/notesSlides/notesSlide1.xml><?xml version="1.0" encoding="utf-8"?>
+<p:notes xmlns:a="http://schemas.openxmlformats.org/drawingml/2006/main" xmlns:r="http://schemas.openxmlformats.org/officeDocument/2006/relationships" xmlns:p="http://schemas.openxmlformats.org/presentationml/2006/main">
+  <p:cSld>
+    <p:spTree>
+      <p:nvGrpSpPr>
+        <p:cNvPr id="1" name=""/>
+        <p:cNvGrpSpPr/>
+        <p:nvPr/>
+      </p:nvGrpSpPr>
+      <p:grpSpPr>
+        <a:xfrm>
+          <a:off x="0" y="0"/>
+          <a:ext cx="0" cy="0"/>
+          <a:chOff x="0" y="0"/>
+          <a:chExt cx="0" cy="0"/>
+        </a:xfrm>
+      </p:grpSpPr>
+      <p:sp>
+        <p:nvSpPr>
+          <p:cNvPr id="2" name="Espace réservé de l'image des diapositives 1"/>
+          <p:cNvSpPr>
+            <a:spLocks noGrp="1" noRot="1" noChangeAspect="1"/>
+          </p:cNvSpPr>
+          <p:nvPr>
+            <p:ph type="sldImg"/>
+          </p:nvPr>
+        </p:nvSpPr>
+        <p:spPr/>
+      </p:sp>
+      <p:sp>
+        <p:nvSpPr>
+          <p:cNvPr id="3" name="Espace réservé des notes 2"/>
+          <p:cNvSpPr>
+            <a:spLocks noGrp="1"/>
+          </p:cNvSpPr>
+          <p:nvPr>
+            <p:ph type="body" idx="1"/>
+          </p:nvPr>
+        </p:nvSpPr>
+        <p:spPr/>
+        <p:txBody>
+          <a:bodyPr/>
+          <a:lstStyle/>
+          <a:p>
+            <a:r>
+              <a:rPr lang="fr-FR" dirty="0"/>
+              <a:t>Hello </a:t>
+            </a:r>
+            <a:r>
+              <a:rPr lang="fr-FR" dirty="0" err="1"/>
+              <a:t>everyone</a:t>
+            </a:r>
+            <a:endParaRPr lang="fr-FR" dirty="0"/>
+          </a:p>
+          <a:p>
+            <a:br>
+              <a:rPr lang="fr-FR" dirty="0"/>
+            </a:br>
+            <a:r>
+              <a:rPr lang="fr-FR" dirty="0" err="1"/>
+              <a:t>My</a:t>
+            </a:r>
+            <a:r>
+              <a:rPr lang="fr-FR" dirty="0"/>
+              <a:t> </a:t>
+            </a:r>
+            <a:r>
+              <a:rPr lang="fr-FR" dirty="0" err="1"/>
+              <a:t>name</a:t>
+            </a:r>
+            <a:r>
+              <a:rPr lang="fr-FR" dirty="0"/>
+              <a:t> </a:t>
+            </a:r>
+            <a:r>
+              <a:rPr lang="fr-FR" dirty="0" err="1"/>
+              <a:t>is</a:t>
+            </a:r>
+            <a:r>
+              <a:rPr lang="fr-FR" dirty="0"/>
+              <a:t> Johnny NGUYEN</a:t>
+            </a:r>
+          </a:p>
+          <a:p>
+            <a:r>
+              <a:rPr lang="fr-FR" dirty="0"/>
+              <a:t>I </a:t>
+            </a:r>
+            <a:r>
+              <a:rPr lang="fr-FR" dirty="0" err="1"/>
+              <a:t>hope</a:t>
+            </a:r>
+            <a:r>
+              <a:rPr lang="fr-FR" dirty="0"/>
+              <a:t> </a:t>
+            </a:r>
+            <a:r>
+              <a:rPr lang="fr-FR" dirty="0" err="1"/>
+              <a:t>that</a:t>
+            </a:r>
+            <a:r>
+              <a:rPr lang="fr-FR" dirty="0"/>
+              <a:t> </a:t>
+            </a:r>
+            <a:r>
+              <a:rPr lang="fr-FR" dirty="0" err="1"/>
+              <a:t>you</a:t>
+            </a:r>
+            <a:r>
+              <a:rPr lang="fr-FR" dirty="0"/>
+              <a:t> are all </a:t>
+            </a:r>
+            <a:r>
+              <a:rPr lang="fr-FR" dirty="0" err="1"/>
+              <a:t>safe</a:t>
+            </a:r>
+            <a:r>
+              <a:rPr lang="fr-FR" dirty="0"/>
+              <a:t> </a:t>
+            </a:r>
+            <a:r>
+              <a:rPr lang="fr-FR" dirty="0" err="1"/>
+              <a:t>with</a:t>
+            </a:r>
+            <a:r>
+              <a:rPr lang="fr-FR" dirty="0"/>
+              <a:t> </a:t>
+            </a:r>
+            <a:r>
+              <a:rPr lang="fr-FR" dirty="0" err="1"/>
+              <a:t>this</a:t>
+            </a:r>
+            <a:r>
+              <a:rPr lang="fr-FR" dirty="0"/>
+              <a:t> </a:t>
+            </a:r>
+            <a:r>
+              <a:rPr lang="fr-FR" dirty="0" err="1"/>
+              <a:t>epidemic</a:t>
+            </a:r>
+            <a:endParaRPr lang="fr-FR" dirty="0"/>
+          </a:p>
+          <a:p>
+            <a:r>
+              <a:rPr lang="fr-FR" dirty="0" err="1"/>
+              <a:t>I’m</a:t>
+            </a:r>
+            <a:r>
+              <a:rPr lang="fr-FR" dirty="0"/>
+              <a:t> </a:t>
+            </a:r>
+            <a:r>
+              <a:rPr lang="fr-FR" dirty="0" err="1"/>
+              <a:t>from</a:t>
+            </a:r>
+            <a:r>
+              <a:rPr lang="fr-FR" dirty="0"/>
+              <a:t> France</a:t>
+            </a:r>
+          </a:p>
+          <a:p>
+            <a:r>
+              <a:rPr lang="fr-FR" dirty="0"/>
+              <a:t>And </a:t>
+            </a:r>
+            <a:r>
+              <a:rPr lang="fr-FR" dirty="0" err="1"/>
+              <a:t>today</a:t>
+            </a:r>
+            <a:r>
+              <a:rPr lang="fr-FR" dirty="0"/>
+              <a:t> </a:t>
+            </a:r>
+            <a:r>
+              <a:rPr lang="fr-FR" dirty="0" err="1"/>
+              <a:t>I’m</a:t>
+            </a:r>
+            <a:r>
+              <a:rPr lang="fr-FR" dirty="0"/>
+              <a:t> </a:t>
+            </a:r>
+            <a:r>
+              <a:rPr lang="fr-FR" dirty="0" err="1"/>
+              <a:t>going</a:t>
+            </a:r>
+            <a:r>
+              <a:rPr lang="fr-FR" dirty="0"/>
+              <a:t> to show </a:t>
+            </a:r>
+            <a:r>
+              <a:rPr lang="fr-FR" dirty="0" err="1"/>
+              <a:t>you</a:t>
+            </a:r>
+            <a:r>
+              <a:rPr lang="fr-FR" dirty="0"/>
+              <a:t> </a:t>
+            </a:r>
+            <a:r>
+              <a:rPr lang="fr-FR" dirty="0" err="1"/>
+              <a:t>what</a:t>
+            </a:r>
+            <a:r>
+              <a:rPr lang="fr-FR" dirty="0"/>
+              <a:t> </a:t>
+            </a:r>
+            <a:r>
+              <a:rPr lang="fr-FR" dirty="0" err="1"/>
+              <a:t>my</a:t>
+            </a:r>
+            <a:r>
+              <a:rPr lang="fr-FR" dirty="0"/>
+              <a:t> </a:t>
+            </a:r>
+            <a:r>
+              <a:rPr lang="fr-FR" dirty="0" err="1"/>
+              <a:t>work</a:t>
+            </a:r>
+            <a:r>
+              <a:rPr lang="fr-FR" dirty="0"/>
+              <a:t> </a:t>
+            </a:r>
+            <a:r>
+              <a:rPr lang="fr-FR" dirty="0" err="1"/>
+              <a:t>consist</a:t>
+            </a:r>
+            <a:r>
+              <a:rPr lang="fr-FR" dirty="0"/>
+              <a:t> to</a:t>
+            </a:r>
+            <a:br>
+              <a:rPr lang="fr-FR" dirty="0"/>
+            </a:br>
+            <a:endParaRPr lang="en-GB" dirty="0"/>
+          </a:p>
+        </p:txBody>
+      </p:sp>
+      <p:sp>
+        <p:nvSpPr>
+          <p:cNvPr id="4" name="Espace réservé du numéro de diapositive 3"/>
+          <p:cNvSpPr>
+            <a:spLocks noGrp="1"/>
+          </p:cNvSpPr>
+          <p:nvPr>
+            <p:ph type="sldNum" sz="quarter" idx="5"/>
+          </p:nvPr>
+        </p:nvSpPr>
+        <p:spPr/>
+        <p:txBody>
+          <a:bodyPr/>
+          <a:lstStyle/>
+          <a:p>
+            <a:fld id="{70E91AD3-41F0-4AF2-986E-6281E051088E}" type="slidenum">
+              <a:rPr lang="en-GB" smtClean="0"/>
+              <a:t>1</a:t>
+            </a:fld>
+            <a:endParaRPr lang="en-GB"/>
+          </a:p>
+        </p:txBody>
+      </p:sp>
+    </p:spTree>
+    <p:extLst>
+      <p:ext uri="{BB962C8B-B14F-4D97-AF65-F5344CB8AC3E}">
+        <p14:creationId xmlns:p14="http://schemas.microsoft.com/office/powerpoint/2010/main" val="1423620871"/>
+      </p:ext>
+    </p:extLst>
+  </p:cSld>
+  <p:clrMapOvr>
+    <a:masterClrMapping/>
+  </p:clrMapOvr>
+</p:notes>
+</file>
+
+<file path=ppt/notesSlides/notesSlide2.xml><?xml version="1.0" encoding="utf-8"?>
+<p:notes xmlns:a="http://schemas.openxmlformats.org/drawingml/2006/main" xmlns:r="http://schemas.openxmlformats.org/officeDocument/2006/relationships" xmlns:p="http://schemas.openxmlformats.org/presentationml/2006/main">
+  <p:cSld>
+    <p:spTree>
+      <p:nvGrpSpPr>
+        <p:cNvPr id="1" name=""/>
+        <p:cNvGrpSpPr/>
+        <p:nvPr/>
+      </p:nvGrpSpPr>
+      <p:grpSpPr>
+        <a:xfrm>
+          <a:off x="0" y="0"/>
+          <a:ext cx="0" cy="0"/>
+          <a:chOff x="0" y="0"/>
+          <a:chExt cx="0" cy="0"/>
+        </a:xfrm>
+      </p:grpSpPr>
+      <p:sp>
+        <p:nvSpPr>
+          <p:cNvPr id="2" name="Espace réservé de l'image des diapositives 1"/>
+          <p:cNvSpPr>
+            <a:spLocks noGrp="1" noRot="1" noChangeAspect="1"/>
+          </p:cNvSpPr>
+          <p:nvPr>
+            <p:ph type="sldImg"/>
+          </p:nvPr>
+        </p:nvSpPr>
+        <p:spPr/>
+      </p:sp>
+      <p:sp>
+        <p:nvSpPr>
+          <p:cNvPr id="3" name="Espace réservé des notes 2"/>
+          <p:cNvSpPr>
+            <a:spLocks noGrp="1"/>
+          </p:cNvSpPr>
+          <p:nvPr>
+            <p:ph type="body" idx="1"/>
+          </p:nvPr>
+        </p:nvSpPr>
+        <p:spPr/>
+        <p:txBody>
+          <a:bodyPr/>
+          <a:lstStyle/>
+          <a:p>
+            <a:endParaRPr lang="en-GB" dirty="0"/>
+          </a:p>
+        </p:txBody>
+      </p:sp>
+      <p:sp>
+        <p:nvSpPr>
+          <p:cNvPr id="4" name="Espace réservé du numéro de diapositive 3"/>
+          <p:cNvSpPr>
+            <a:spLocks noGrp="1"/>
+          </p:cNvSpPr>
+          <p:nvPr>
+            <p:ph type="sldNum" sz="quarter" idx="5"/>
+          </p:nvPr>
+        </p:nvSpPr>
+        <p:spPr/>
+        <p:txBody>
+          <a:bodyPr/>
+          <a:lstStyle/>
+          <a:p>
+            <a:fld id="{70E91AD3-41F0-4AF2-986E-6281E051088E}" type="slidenum">
+              <a:rPr lang="en-GB" smtClean="0"/>
+              <a:t>2</a:t>
+            </a:fld>
+            <a:endParaRPr lang="en-GB"/>
+          </a:p>
+        </p:txBody>
+      </p:sp>
+    </p:spTree>
+    <p:extLst>
+      <p:ext uri="{BB962C8B-B14F-4D97-AF65-F5344CB8AC3E}">
+        <p14:creationId xmlns:p14="http://schemas.microsoft.com/office/powerpoint/2010/main" val="1647600525"/>
+      </p:ext>
+    </p:extLst>
+  </p:cSld>
+  <p:clrMapOvr>
+    <a:masterClrMapping/>
+  </p:clrMapOvr>
+</p:notes>
+</file>
+
 <file path=ppt/slideLayouts/slideLayout1.xml><?xml version="1.0" encoding="utf-8"?>
 <p:sldLayout xmlns:a="http://schemas.openxmlformats.org/drawingml/2006/main" xmlns:r="http://schemas.openxmlformats.org/officeDocument/2006/relationships" xmlns:p="http://schemas.openxmlformats.org/presentationml/2006/main" showMasterSp="0" type="title" preserve="1">
   <p:cSld name="Diapositive de titre">
@@ -6942,7 +7651,7 @@
             <a:fld id="{B61BEF0D-F0BB-DE4B-95CE-6DB70DBA9567}" type="datetimeFigureOut">
               <a:rPr lang="en-US" dirty="0"/>
               <a:pPr/>
-              <a:t>4/6/2020</a:t>
+              <a:t>4/7/2020</a:t>
             </a:fld>
             <a:endParaRPr lang="en-US" dirty="0"/>
           </a:p>
@@ -7375,7 +8084,7 @@
             <a:fld id="{B61BEF0D-F0BB-DE4B-95CE-6DB70DBA9567}" type="datetimeFigureOut">
               <a:rPr lang="en-US" dirty="0"/>
               <a:pPr/>
-              <a:t>4/6/2020</a:t>
+              <a:t>4/7/2020</a:t>
             </a:fld>
             <a:endParaRPr lang="en-US" dirty="0"/>
           </a:p>
@@ -7622,7 +8331,7 @@
             <a:fld id="{B61BEF0D-F0BB-DE4B-95CE-6DB70DBA9567}" type="datetimeFigureOut">
               <a:rPr lang="en-US" dirty="0"/>
               <a:pPr/>
-              <a:t>4/6/2020</a:t>
+              <a:t>4/7/2020</a:t>
             </a:fld>
             <a:endParaRPr lang="en-US" dirty="0"/>
           </a:p>
@@ -7927,7 +8636,7 @@
             <a:fld id="{B61BEF0D-F0BB-DE4B-95CE-6DB70DBA9567}" type="datetimeFigureOut">
               <a:rPr lang="en-US" dirty="0"/>
               <a:pPr/>
-              <a:t>4/6/2020</a:t>
+              <a:t>4/7/2020</a:t>
             </a:fld>
             <a:endParaRPr lang="en-US" dirty="0"/>
           </a:p>
@@ -8242,7 +8951,7 @@
             <a:fld id="{B61BEF0D-F0BB-DE4B-95CE-6DB70DBA9567}" type="datetimeFigureOut">
               <a:rPr lang="en-US" dirty="0"/>
               <a:pPr/>
-              <a:t>4/6/2020</a:t>
+              <a:t>4/7/2020</a:t>
             </a:fld>
             <a:endParaRPr lang="en-US" dirty="0"/>
           </a:p>
@@ -8541,7 +9250,7 @@
             <a:fld id="{B61BEF0D-F0BB-DE4B-95CE-6DB70DBA9567}" type="datetimeFigureOut">
               <a:rPr lang="en-US" dirty="0"/>
               <a:pPr/>
-              <a:t>4/6/2020</a:t>
+              <a:t>4/7/2020</a:t>
             </a:fld>
             <a:endParaRPr lang="en-US" dirty="0"/>
           </a:p>
@@ -8905,7 +9614,7 @@
             <a:fld id="{B61BEF0D-F0BB-DE4B-95CE-6DB70DBA9567}" type="datetimeFigureOut">
               <a:rPr lang="en-US" dirty="0"/>
               <a:pPr/>
-              <a:t>4/6/2020</a:t>
+              <a:t>4/7/2020</a:t>
             </a:fld>
             <a:endParaRPr lang="en-US" dirty="0"/>
           </a:p>
@@ -9076,7 +9785,7 @@
             <a:fld id="{B61BEF0D-F0BB-DE4B-95CE-6DB70DBA9567}" type="datetimeFigureOut">
               <a:rPr lang="en-US" dirty="0"/>
               <a:pPr/>
-              <a:t>4/6/2020</a:t>
+              <a:t>4/7/2020</a:t>
             </a:fld>
             <a:endParaRPr lang="en-US" dirty="0"/>
           </a:p>
@@ -9253,7 +9962,7 @@
             <a:fld id="{B61BEF0D-F0BB-DE4B-95CE-6DB70DBA9567}" type="datetimeFigureOut">
               <a:rPr lang="en-US" dirty="0"/>
               <a:pPr/>
-              <a:t>4/6/2020</a:t>
+              <a:t>4/7/2020</a:t>
             </a:fld>
             <a:endParaRPr lang="en-US" dirty="0"/>
           </a:p>
@@ -9420,7 +10129,7 @@
             <a:fld id="{B61BEF0D-F0BB-DE4B-95CE-6DB70DBA9567}" type="datetimeFigureOut">
               <a:rPr lang="en-US" dirty="0"/>
               <a:pPr/>
-              <a:t>4/6/2020</a:t>
+              <a:t>4/7/2020</a:t>
             </a:fld>
             <a:endParaRPr lang="en-US" dirty="0"/>
           </a:p>
@@ -9667,7 +10376,7 @@
             <a:fld id="{B61BEF0D-F0BB-DE4B-95CE-6DB70DBA9567}" type="datetimeFigureOut">
               <a:rPr lang="en-US" dirty="0"/>
               <a:pPr/>
-              <a:t>4/6/2020</a:t>
+              <a:t>4/7/2020</a:t>
             </a:fld>
             <a:endParaRPr lang="en-US" dirty="0"/>
           </a:p>
@@ -9900,7 +10609,7 @@
             <a:fld id="{B61BEF0D-F0BB-DE4B-95CE-6DB70DBA9567}" type="datetimeFigureOut">
               <a:rPr lang="en-US" dirty="0"/>
               <a:pPr/>
-              <a:t>4/6/2020</a:t>
+              <a:t>4/7/2020</a:t>
             </a:fld>
             <a:endParaRPr lang="en-US" dirty="0"/>
           </a:p>
@@ -10279,7 +10988,7 @@
             <a:fld id="{B61BEF0D-F0BB-DE4B-95CE-6DB70DBA9567}" type="datetimeFigureOut">
               <a:rPr lang="en-US" dirty="0"/>
               <a:pPr/>
-              <a:t>4/6/2020</a:t>
+              <a:t>4/7/2020</a:t>
             </a:fld>
             <a:endParaRPr lang="en-US" dirty="0"/>
           </a:p>
@@ -10394,7 +11103,7 @@
             <a:fld id="{B61BEF0D-F0BB-DE4B-95CE-6DB70DBA9567}" type="datetimeFigureOut">
               <a:rPr lang="en-US" dirty="0"/>
               <a:pPr/>
-              <a:t>4/6/2020</a:t>
+              <a:t>4/7/2020</a:t>
             </a:fld>
             <a:endParaRPr lang="en-US" dirty="0"/>
           </a:p>
@@ -10486,7 +11195,7 @@
             <a:fld id="{B61BEF0D-F0BB-DE4B-95CE-6DB70DBA9567}" type="datetimeFigureOut">
               <a:rPr lang="en-US" dirty="0"/>
               <a:pPr/>
-              <a:t>4/6/2020</a:t>
+              <a:t>4/7/2020</a:t>
             </a:fld>
             <a:endParaRPr lang="en-US" dirty="0"/>
           </a:p>
@@ -10738,7 +11447,7 @@
             <a:fld id="{B61BEF0D-F0BB-DE4B-95CE-6DB70DBA9567}" type="datetimeFigureOut">
               <a:rPr lang="en-US" dirty="0"/>
               <a:pPr/>
-              <a:t>4/6/2020</a:t>
+              <a:t>4/7/2020</a:t>
             </a:fld>
             <a:endParaRPr lang="en-US" dirty="0"/>
           </a:p>
@@ -11018,7 +11727,7 @@
             <a:fld id="{B61BEF0D-F0BB-DE4B-95CE-6DB70DBA9567}" type="datetimeFigureOut">
               <a:rPr lang="en-US" dirty="0"/>
               <a:pPr/>
-              <a:t>4/6/2020</a:t>
+              <a:t>4/7/2020</a:t>
             </a:fld>
             <a:endParaRPr lang="en-US" dirty="0"/>
           </a:p>
@@ -11421,7 +12130,7 @@
             <a:fld id="{B61BEF0D-F0BB-DE4B-95CE-6DB70DBA9567}" type="datetimeFigureOut">
               <a:rPr lang="en-US" dirty="0"/>
               <a:pPr/>
-              <a:t>4/6/2020</a:t>
+              <a:t>4/7/2020</a:t>
             </a:fld>
             <a:endParaRPr lang="en-US" dirty="0"/>
           </a:p>
@@ -19370,13 +20079,8 @@
             <a:pPr algn="ctr"/>
             <a:r>
               <a:rPr lang="en-GB" dirty="0"/>
-              <a:t>Show the </a:t>
-            </a:r>
-            <a:r>
-              <a:rPr lang="en-GB" dirty="0" err="1"/>
-              <a:t>understading</a:t>
-            </a:r>
-            <a:endParaRPr lang="en-GB" dirty="0"/>
+              <a:t>Show the understanding</a:t>
+            </a:r>
           </a:p>
         </p:txBody>
       </p:sp>
@@ -20157,7 +20861,7 @@
         </p:xfrm>
         <a:graphic>
           <a:graphicData uri="http://schemas.openxmlformats.org/drawingml/2006/diagram">
-            <dgm:relIds xmlns:dgm="http://schemas.openxmlformats.org/drawingml/2006/diagram" xmlns:r="http://schemas.openxmlformats.org/officeDocument/2006/relationships" r:dm="rId2" r:lo="rId3" r:qs="rId4" r:cs="rId5"/>
+            <dgm:relIds xmlns:dgm="http://schemas.openxmlformats.org/drawingml/2006/diagram" xmlns:r="http://schemas.openxmlformats.org/officeDocument/2006/relationships" r:dm="rId3" r:lo="rId4" r:qs="rId5" r:cs="rId6"/>
           </a:graphicData>
         </a:graphic>
       </p:graphicFrame>
@@ -26304,4 +27008,299 @@
     </a:ext>
   </a:extLst>
 </a:theme>
+</file>
+
+<file path=ppt/theme/theme2.xml><?xml version="1.0" encoding="utf-8"?>
+<a:theme xmlns:a="http://schemas.openxmlformats.org/drawingml/2006/main" name="Thème Office">
+  <a:themeElements>
+    <a:clrScheme name="Office">
+      <a:dk1>
+        <a:sysClr val="windowText" lastClr="000000"/>
+      </a:dk1>
+      <a:lt1>
+        <a:sysClr val="window" lastClr="FFFFFF"/>
+      </a:lt1>
+      <a:dk2>
+        <a:srgbClr val="44546A"/>
+      </a:dk2>
+      <a:lt2>
+        <a:srgbClr val="E7E6E6"/>
+      </a:lt2>
+      <a:accent1>
+        <a:srgbClr val="4472C4"/>
+      </a:accent1>
+      <a:accent2>
+        <a:srgbClr val="ED7D31"/>
+      </a:accent2>
+      <a:accent3>
+        <a:srgbClr val="A5A5A5"/>
+      </a:accent3>
+      <a:accent4>
+        <a:srgbClr val="FFC000"/>
+      </a:accent4>
+      <a:accent5>
+        <a:srgbClr val="5B9BD5"/>
+      </a:accent5>
+      <a:accent6>
+        <a:srgbClr val="70AD47"/>
+      </a:accent6>
+      <a:hlink>
+        <a:srgbClr val="0563C1"/>
+      </a:hlink>
+      <a:folHlink>
+        <a:srgbClr val="954F72"/>
+      </a:folHlink>
+    </a:clrScheme>
+    <a:fontScheme name="Office">
+      <a:majorFont>
+        <a:latin typeface="Calibri Light" panose="020F0302020204030204"/>
+        <a:ea typeface=""/>
+        <a:cs typeface=""/>
+        <a:font script="Jpan" typeface="游ゴシック Light"/>
+        <a:font script="Hang" typeface="맑은 고딕"/>
+        <a:font script="Hans" typeface="等线 Light"/>
+        <a:font script="Hant" typeface="新細明體"/>
+        <a:font script="Arab" typeface="Times New Roman"/>
+        <a:font script="Hebr" typeface="Times New Roman"/>
+        <a:font script="Thai" typeface="Angsana New"/>
+        <a:font script="Ethi" typeface="Nyala"/>
+        <a:font script="Beng" typeface="Vrinda"/>
+        <a:font script="Gujr" typeface="Shruti"/>
+        <a:font script="Khmr" typeface="MoolBoran"/>
+        <a:font script="Knda" typeface="Tunga"/>
+        <a:font script="Guru" typeface="Raavi"/>
+        <a:font script="Cans" typeface="Euphemia"/>
+        <a:font script="Cher" typeface="Plantagenet Cherokee"/>
+        <a:font script="Yiii" typeface="Microsoft Yi Baiti"/>
+        <a:font script="Tibt" typeface="Microsoft Himalaya"/>
+        <a:font script="Thaa" typeface="MV Boli"/>
+        <a:font script="Deva" typeface="Mangal"/>
+        <a:font script="Telu" typeface="Gautami"/>
+        <a:font script="Taml" typeface="Latha"/>
+        <a:font script="Syrc" typeface="Estrangelo Edessa"/>
+        <a:font script="Orya" typeface="Kalinga"/>
+        <a:font script="Mlym" typeface="Kartika"/>
+        <a:font script="Laoo" typeface="DokChampa"/>
+        <a:font script="Sinh" typeface="Iskoola Pota"/>
+        <a:font script="Mong" typeface="Mongolian Baiti"/>
+        <a:font script="Viet" typeface="Times New Roman"/>
+        <a:font script="Uigh" typeface="Microsoft Uighur"/>
+        <a:font script="Geor" typeface="Sylfaen"/>
+        <a:font script="Armn" typeface="Arial"/>
+        <a:font script="Bugi" typeface="Leelawadee UI"/>
+        <a:font script="Bopo" typeface="Microsoft JhengHei"/>
+        <a:font script="Java" typeface="Javanese Text"/>
+        <a:font script="Lisu" typeface="Segoe UI"/>
+        <a:font script="Mymr" typeface="Myanmar Text"/>
+        <a:font script="Nkoo" typeface="Ebrima"/>
+        <a:font script="Olck" typeface="Nirmala UI"/>
+        <a:font script="Osma" typeface="Ebrima"/>
+        <a:font script="Phag" typeface="Phagspa"/>
+        <a:font script="Syrn" typeface="Estrangelo Edessa"/>
+        <a:font script="Syrj" typeface="Estrangelo Edessa"/>
+        <a:font script="Syre" typeface="Estrangelo Edessa"/>
+        <a:font script="Sora" typeface="Nirmala UI"/>
+        <a:font script="Tale" typeface="Microsoft Tai Le"/>
+        <a:font script="Talu" typeface="Microsoft New Tai Lue"/>
+        <a:font script="Tfng" typeface="Ebrima"/>
+      </a:majorFont>
+      <a:minorFont>
+        <a:latin typeface="Calibri" panose="020F0502020204030204"/>
+        <a:ea typeface=""/>
+        <a:cs typeface=""/>
+        <a:font script="Jpan" typeface="游ゴシック"/>
+        <a:font script="Hang" typeface="맑은 고딕"/>
+        <a:font script="Hans" typeface="等线"/>
+        <a:font script="Hant" typeface="新細明體"/>
+        <a:font script="Arab" typeface="Arial"/>
+        <a:font script="Hebr" typeface="Arial"/>
+        <a:font script="Thai" typeface="Cordia New"/>
+        <a:font script="Ethi" typeface="Nyala"/>
+        <a:font script="Beng" typeface="Vrinda"/>
+        <a:font script="Gujr" typeface="Shruti"/>
+        <a:font script="Khmr" typeface="DaunPenh"/>
+        <a:font script="Knda" typeface="Tunga"/>
+        <a:font script="Guru" typeface="Raavi"/>
+        <a:font script="Cans" typeface="Euphemia"/>
+        <a:font script="Cher" typeface="Plantagenet Cherokee"/>
+        <a:font script="Yiii" typeface="Microsoft Yi Baiti"/>
+        <a:font script="Tibt" typeface="Microsoft Himalaya"/>
+        <a:font script="Thaa" typeface="MV Boli"/>
+        <a:font script="Deva" typeface="Mangal"/>
+        <a:font script="Telu" typeface="Gautami"/>
+        <a:font script="Taml" typeface="Latha"/>
+        <a:font script="Syrc" typeface="Estrangelo Edessa"/>
+        <a:font script="Orya" typeface="Kalinga"/>
+        <a:font script="Mlym" typeface="Kartika"/>
+        <a:font script="Laoo" typeface="DokChampa"/>
+        <a:font script="Sinh" typeface="Iskoola Pota"/>
+        <a:font script="Mong" typeface="Mongolian Baiti"/>
+        <a:font script="Viet" typeface="Arial"/>
+        <a:font script="Uigh" typeface="Microsoft Uighur"/>
+        <a:font script="Geor" typeface="Sylfaen"/>
+        <a:font script="Armn" typeface="Arial"/>
+        <a:font script="Bugi" typeface="Leelawadee UI"/>
+        <a:font script="Bopo" typeface="Microsoft JhengHei"/>
+        <a:font script="Java" typeface="Javanese Text"/>
+        <a:font script="Lisu" typeface="Segoe UI"/>
+        <a:font script="Mymr" typeface="Myanmar Text"/>
+        <a:font script="Nkoo" typeface="Ebrima"/>
+        <a:font script="Olck" typeface="Nirmala UI"/>
+        <a:font script="Osma" typeface="Ebrima"/>
+        <a:font script="Phag" typeface="Phagspa"/>
+        <a:font script="Syrn" typeface="Estrangelo Edessa"/>
+        <a:font script="Syrj" typeface="Estrangelo Edessa"/>
+        <a:font script="Syre" typeface="Estrangelo Edessa"/>
+        <a:font script="Sora" typeface="Nirmala UI"/>
+        <a:font script="Tale" typeface="Microsoft Tai Le"/>
+        <a:font script="Talu" typeface="Microsoft New Tai Lue"/>
+        <a:font script="Tfng" typeface="Ebrima"/>
+      </a:minorFont>
+    </a:fontScheme>
+    <a:fmtScheme name="Office">
+      <a:fillStyleLst>
+        <a:solidFill>
+          <a:schemeClr val="phClr"/>
+        </a:solidFill>
+        <a:gradFill rotWithShape="1">
+          <a:gsLst>
+            <a:gs pos="0">
+              <a:schemeClr val="phClr">
+                <a:lumMod val="110000"/>
+                <a:satMod val="105000"/>
+                <a:tint val="67000"/>
+              </a:schemeClr>
+            </a:gs>
+            <a:gs pos="50000">
+              <a:schemeClr val="phClr">
+                <a:lumMod val="105000"/>
+                <a:satMod val="103000"/>
+                <a:tint val="73000"/>
+              </a:schemeClr>
+            </a:gs>
+            <a:gs pos="100000">
+              <a:schemeClr val="phClr">
+                <a:lumMod val="105000"/>
+                <a:satMod val="109000"/>
+                <a:tint val="81000"/>
+              </a:schemeClr>
+            </a:gs>
+          </a:gsLst>
+          <a:lin ang="5400000" scaled="0"/>
+        </a:gradFill>
+        <a:gradFill rotWithShape="1">
+          <a:gsLst>
+            <a:gs pos="0">
+              <a:schemeClr val="phClr">
+                <a:satMod val="103000"/>
+                <a:lumMod val="102000"/>
+                <a:tint val="94000"/>
+              </a:schemeClr>
+            </a:gs>
+            <a:gs pos="50000">
+              <a:schemeClr val="phClr">
+                <a:satMod val="110000"/>
+                <a:lumMod val="100000"/>
+                <a:shade val="100000"/>
+              </a:schemeClr>
+            </a:gs>
+            <a:gs pos="100000">
+              <a:schemeClr val="phClr">
+                <a:lumMod val="99000"/>
+                <a:satMod val="120000"/>
+                <a:shade val="78000"/>
+              </a:schemeClr>
+            </a:gs>
+          </a:gsLst>
+          <a:lin ang="5400000" scaled="0"/>
+        </a:gradFill>
+      </a:fillStyleLst>
+      <a:lnStyleLst>
+        <a:ln w="6350" cap="flat" cmpd="sng" algn="ctr">
+          <a:solidFill>
+            <a:schemeClr val="phClr"/>
+          </a:solidFill>
+          <a:prstDash val="solid"/>
+          <a:miter lim="800000"/>
+        </a:ln>
+        <a:ln w="12700" cap="flat" cmpd="sng" algn="ctr">
+          <a:solidFill>
+            <a:schemeClr val="phClr"/>
+          </a:solidFill>
+          <a:prstDash val="solid"/>
+          <a:miter lim="800000"/>
+        </a:ln>
+        <a:ln w="19050" cap="flat" cmpd="sng" algn="ctr">
+          <a:solidFill>
+            <a:schemeClr val="phClr"/>
+          </a:solidFill>
+          <a:prstDash val="solid"/>
+          <a:miter lim="800000"/>
+        </a:ln>
+      </a:lnStyleLst>
+      <a:effectStyleLst>
+        <a:effectStyle>
+          <a:effectLst/>
+        </a:effectStyle>
+        <a:effectStyle>
+          <a:effectLst/>
+        </a:effectStyle>
+        <a:effectStyle>
+          <a:effectLst>
+            <a:outerShdw blurRad="57150" dist="19050" dir="5400000" algn="ctr" rotWithShape="0">
+              <a:srgbClr val="000000">
+                <a:alpha val="63000"/>
+              </a:srgbClr>
+            </a:outerShdw>
+          </a:effectLst>
+        </a:effectStyle>
+      </a:effectStyleLst>
+      <a:bgFillStyleLst>
+        <a:solidFill>
+          <a:schemeClr val="phClr"/>
+        </a:solidFill>
+        <a:solidFill>
+          <a:schemeClr val="phClr">
+            <a:tint val="95000"/>
+            <a:satMod val="170000"/>
+          </a:schemeClr>
+        </a:solidFill>
+        <a:gradFill rotWithShape="1">
+          <a:gsLst>
+            <a:gs pos="0">
+              <a:schemeClr val="phClr">
+                <a:tint val="93000"/>
+                <a:satMod val="150000"/>
+                <a:shade val="98000"/>
+                <a:lumMod val="102000"/>
+              </a:schemeClr>
+            </a:gs>
+            <a:gs pos="50000">
+              <a:schemeClr val="phClr">
+                <a:tint val="98000"/>
+                <a:satMod val="130000"/>
+                <a:shade val="90000"/>
+                <a:lumMod val="103000"/>
+              </a:schemeClr>
+            </a:gs>
+            <a:gs pos="100000">
+              <a:schemeClr val="phClr">
+                <a:shade val="63000"/>
+                <a:satMod val="120000"/>
+              </a:schemeClr>
+            </a:gs>
+          </a:gsLst>
+          <a:lin ang="5400000" scaled="0"/>
+        </a:gradFill>
+      </a:bgFillStyleLst>
+    </a:fmtScheme>
+  </a:themeElements>
+  <a:objectDefaults/>
+  <a:extraClrSchemeLst/>
+  <a:extLst>
+    <a:ext uri="{05A4C25C-085E-4340-85A3-A5531E510DB2}">
+      <thm15:themeFamily xmlns:thm15="http://schemas.microsoft.com/office/thememl/2012/main" name="Office Theme" id="{62F939B6-93AF-4DB8-9C6B-D6C7DFDC589F}" vid="{4A3C46E8-61CC-4603-A589-7422A47A8E4A}"/>
+    </a:ext>
+  </a:extLst>
+</a:theme>
 </file>
</xml_diff>

<commit_message>
#12 Speech text added on environment slide on presentation
</commit_message>
<xml_diff>
--- a/SAI_presentation.pptx
+++ b/SAI_presentation.pptx
@@ -7419,6 +7419,175 @@
           <a:bodyPr/>
           <a:lstStyle/>
           <a:p>
+            <a:r>
+              <a:rPr lang="fr-FR" dirty="0"/>
+              <a:t>First I </a:t>
+            </a:r>
+            <a:r>
+              <a:rPr lang="fr-FR" dirty="0" err="1"/>
+              <a:t>will</a:t>
+            </a:r>
+            <a:r>
+              <a:rPr lang="fr-FR" dirty="0"/>
+              <a:t> </a:t>
+            </a:r>
+            <a:r>
+              <a:rPr lang="fr-FR" dirty="0" err="1"/>
+              <a:t>present</a:t>
+            </a:r>
+            <a:r>
+              <a:rPr lang="fr-FR" dirty="0"/>
+              <a:t> </a:t>
+            </a:r>
+            <a:r>
+              <a:rPr lang="fr-FR" dirty="0" err="1"/>
+              <a:t>you</a:t>
+            </a:r>
+            <a:r>
+              <a:rPr lang="fr-FR" dirty="0"/>
+              <a:t> </a:t>
+            </a:r>
+            <a:r>
+              <a:rPr lang="fr-FR" dirty="0" err="1"/>
+              <a:t>my</a:t>
+            </a:r>
+            <a:r>
+              <a:rPr lang="fr-FR" dirty="0"/>
+              <a:t> situation</a:t>
+            </a:r>
+          </a:p>
+          <a:p>
+            <a:endParaRPr lang="fr-FR" dirty="0"/>
+          </a:p>
+          <a:p>
+            <a:r>
+              <a:rPr lang="fr-FR" dirty="0"/>
+              <a:t>Second I </a:t>
+            </a:r>
+            <a:r>
+              <a:rPr lang="fr-FR" dirty="0" err="1"/>
+              <a:t>will</a:t>
+            </a:r>
+            <a:r>
+              <a:rPr lang="fr-FR" dirty="0"/>
+              <a:t> </a:t>
+            </a:r>
+            <a:r>
+              <a:rPr lang="fr-FR" dirty="0" err="1"/>
+              <a:t>explain</a:t>
+            </a:r>
+            <a:r>
+              <a:rPr lang="fr-FR" dirty="0"/>
+              <a:t> </a:t>
+            </a:r>
+            <a:r>
+              <a:rPr lang="fr-FR" dirty="0" err="1"/>
+              <a:t>you</a:t>
+            </a:r>
+            <a:r>
+              <a:rPr lang="fr-FR" dirty="0"/>
+              <a:t> the AI I </a:t>
+            </a:r>
+            <a:r>
+              <a:rPr lang="fr-FR" dirty="0" err="1"/>
+              <a:t>want</a:t>
+            </a:r>
+            <a:r>
+              <a:rPr lang="fr-FR" dirty="0"/>
+              <a:t> to </a:t>
+            </a:r>
+            <a:r>
+              <a:rPr lang="fr-FR" dirty="0" err="1"/>
+              <a:t>create</a:t>
+            </a:r>
+            <a:endParaRPr lang="fr-FR" dirty="0"/>
+          </a:p>
+          <a:p>
+            <a:endParaRPr lang="fr-FR" dirty="0"/>
+          </a:p>
+          <a:p>
+            <a:r>
+              <a:rPr lang="fr-FR" dirty="0" err="1"/>
+              <a:t>Third</a:t>
+            </a:r>
+            <a:r>
+              <a:rPr lang="fr-FR" dirty="0"/>
+              <a:t> the technologies </a:t>
+            </a:r>
+            <a:r>
+              <a:rPr lang="fr-FR" dirty="0" err="1"/>
+              <a:t>that</a:t>
+            </a:r>
+            <a:r>
+              <a:rPr lang="fr-FR" dirty="0"/>
+              <a:t> </a:t>
+            </a:r>
+            <a:r>
+              <a:rPr lang="fr-FR" dirty="0" err="1"/>
+              <a:t>will</a:t>
+            </a:r>
+            <a:r>
+              <a:rPr lang="fr-FR" dirty="0"/>
+              <a:t> </a:t>
+            </a:r>
+            <a:r>
+              <a:rPr lang="fr-FR" dirty="0" err="1"/>
+              <a:t>be</a:t>
+            </a:r>
+            <a:r>
+              <a:rPr lang="fr-FR" dirty="0"/>
+              <a:t> </a:t>
+            </a:r>
+            <a:r>
+              <a:rPr lang="fr-FR" dirty="0" err="1"/>
+              <a:t>covered</a:t>
+            </a:r>
+            <a:endParaRPr lang="fr-FR" dirty="0"/>
+          </a:p>
+          <a:p>
+            <a:endParaRPr lang="fr-FR" dirty="0"/>
+          </a:p>
+          <a:p>
+            <a:r>
+              <a:rPr lang="fr-FR" dirty="0"/>
+              <a:t>And the new </a:t>
+            </a:r>
+            <a:r>
+              <a:rPr lang="fr-FR" dirty="0" err="1"/>
+              <a:t>algorithm</a:t>
+            </a:r>
+            <a:r>
+              <a:rPr lang="fr-FR" dirty="0"/>
+              <a:t> </a:t>
+            </a:r>
+            <a:r>
+              <a:rPr lang="fr-FR" dirty="0" err="1"/>
+              <a:t>that</a:t>
+            </a:r>
+            <a:r>
+              <a:rPr lang="fr-FR" dirty="0"/>
+              <a:t> </a:t>
+            </a:r>
+            <a:r>
+              <a:rPr lang="fr-FR" dirty="0" err="1"/>
+              <a:t>will</a:t>
+            </a:r>
+            <a:r>
+              <a:rPr lang="fr-FR" dirty="0"/>
+              <a:t> </a:t>
+            </a:r>
+            <a:r>
+              <a:rPr lang="fr-FR" dirty="0" err="1"/>
+              <a:t>be</a:t>
+            </a:r>
+            <a:r>
+              <a:rPr lang="fr-FR" dirty="0"/>
+              <a:t> </a:t>
+            </a:r>
+            <a:r>
+              <a:rPr lang="fr-FR"/>
+              <a:t>use for the AI</a:t>
+            </a:r>
             <a:endParaRPr lang="en-GB" dirty="0"/>
           </a:p>
         </p:txBody>

</xml_diff>

<commit_message>
#12 Speech text part 1 added on environment slide on presentation
</commit_message>
<xml_diff>
--- a/SAI_presentation.pptx
+++ b/SAI_presentation.pptx
@@ -7582,12 +7582,290 @@
             </a:r>
             <a:r>
               <a:rPr lang="fr-FR" dirty="0"/>
+              <a:t> use for the AI</a:t>
+            </a:r>
+          </a:p>
+          <a:p>
+            <a:endParaRPr lang="fr-FR" dirty="0"/>
+          </a:p>
+          <a:p>
+            <a:endParaRPr lang="fr-FR" dirty="0"/>
+          </a:p>
+          <a:p>
+            <a:r>
+              <a:rPr lang="fr-FR" dirty="0" err="1"/>
+              <a:t>Well</a:t>
+            </a:r>
+            <a:r>
+              <a:rPr lang="fr-FR" dirty="0"/>
+              <a:t>, </a:t>
+            </a:r>
+            <a:r>
+              <a:rPr lang="fr-FR" dirty="0" err="1"/>
+              <a:t>what</a:t>
+            </a:r>
+            <a:r>
+              <a:rPr lang="fr-FR" dirty="0"/>
               <a:t> </a:t>
             </a:r>
             <a:r>
+              <a:rPr lang="fr-FR" dirty="0" err="1"/>
+              <a:t>is</a:t>
+            </a:r>
+            <a:r>
+              <a:rPr lang="fr-FR" dirty="0"/>
+              <a:t> </a:t>
+            </a:r>
+            <a:r>
+              <a:rPr lang="fr-FR" dirty="0" err="1"/>
+              <a:t>my</a:t>
+            </a:r>
+            <a:r>
+              <a:rPr lang="fr-FR" dirty="0"/>
+              <a:t> job ?</a:t>
+            </a:r>
+          </a:p>
+          <a:p>
+            <a:r>
+              <a:rPr lang="fr-FR" dirty="0" err="1"/>
+              <a:t>Actually</a:t>
+            </a:r>
+            <a:r>
+              <a:rPr lang="fr-FR" dirty="0"/>
+              <a:t> </a:t>
+            </a:r>
+            <a:r>
+              <a:rPr lang="fr-FR" dirty="0" err="1"/>
+              <a:t>I’m</a:t>
+            </a:r>
+            <a:r>
+              <a:rPr lang="fr-FR" dirty="0"/>
+              <a:t> </a:t>
+            </a:r>
+            <a:r>
+              <a:rPr lang="fr-FR" dirty="0" err="1"/>
+              <a:t>currently</a:t>
+            </a:r>
+            <a:r>
+              <a:rPr lang="fr-FR" dirty="0"/>
+              <a:t> </a:t>
+            </a:r>
+            <a:r>
+              <a:rPr lang="fr-FR" dirty="0" err="1"/>
+              <a:t>searching</a:t>
+            </a:r>
+            <a:r>
+              <a:rPr lang="fr-FR" dirty="0"/>
+              <a:t> for a Data </a:t>
+            </a:r>
+            <a:r>
+              <a:rPr lang="fr-FR" dirty="0" err="1"/>
+              <a:t>Scientist</a:t>
+            </a:r>
+            <a:r>
+              <a:rPr lang="fr-FR" dirty="0"/>
+              <a:t> job </a:t>
+            </a:r>
+            <a:r>
+              <a:rPr lang="fr-FR" dirty="0" err="1"/>
+              <a:t>near</a:t>
+            </a:r>
+            <a:r>
+              <a:rPr lang="fr-FR" dirty="0"/>
+              <a:t> </a:t>
+            </a:r>
+            <a:r>
+              <a:rPr lang="fr-FR" dirty="0" err="1"/>
+              <a:t>from</a:t>
+            </a:r>
+            <a:r>
+              <a:rPr lang="fr-FR" dirty="0"/>
+              <a:t> </a:t>
+            </a:r>
+            <a:r>
+              <a:rPr lang="fr-FR" dirty="0" err="1"/>
+              <a:t>my</a:t>
+            </a:r>
+            <a:r>
+              <a:rPr lang="fr-FR" dirty="0"/>
+              <a:t> house in Simiane-Collongue</a:t>
+            </a:r>
+          </a:p>
+          <a:p>
+            <a:r>
+              <a:rPr lang="fr-FR" dirty="0"/>
+              <a:t>And to </a:t>
+            </a:r>
+            <a:r>
+              <a:rPr lang="fr-FR" dirty="0" err="1"/>
+              <a:t>synthetisis</a:t>
+            </a:r>
+            <a:r>
+              <a:rPr lang="fr-FR" dirty="0"/>
+              <a:t>, </a:t>
+            </a:r>
+            <a:r>
+              <a:rPr lang="fr-FR" dirty="0" err="1"/>
+              <a:t>it</a:t>
+            </a:r>
+            <a:r>
+              <a:rPr lang="fr-FR" dirty="0"/>
+              <a:t> </a:t>
+            </a:r>
+            <a:r>
+              <a:rPr lang="fr-FR" dirty="0" err="1"/>
+              <a:t>is</a:t>
+            </a:r>
+            <a:r>
+              <a:rPr lang="fr-FR" dirty="0"/>
+              <a:t> a </a:t>
+            </a:r>
+            <a:r>
+              <a:rPr lang="fr-FR" dirty="0" err="1"/>
+              <a:t>campaign</a:t>
+            </a:r>
+            <a:r>
+              <a:rPr lang="fr-FR" dirty="0"/>
+              <a:t> and </a:t>
+            </a:r>
+            <a:r>
+              <a:rPr lang="fr-FR" dirty="0" err="1"/>
+              <a:t>there</a:t>
+            </a:r>
+            <a:r>
+              <a:rPr lang="fr-FR" dirty="0"/>
+              <a:t> </a:t>
+            </a:r>
+            <a:r>
+              <a:rPr lang="fr-FR" dirty="0" err="1"/>
+              <a:t>was</a:t>
+            </a:r>
+            <a:r>
+              <a:rPr lang="fr-FR" dirty="0"/>
+              <a:t> </a:t>
+            </a:r>
+            <a:r>
+              <a:rPr lang="fr-FR" dirty="0" err="1"/>
+              <a:t>actually</a:t>
+            </a:r>
+            <a:r>
+              <a:rPr lang="fr-FR" dirty="0"/>
+              <a:t> no </a:t>
+            </a:r>
+            <a:r>
+              <a:rPr lang="fr-FR" dirty="0" err="1"/>
+              <a:t>similar</a:t>
+            </a:r>
+            <a:r>
+              <a:rPr lang="fr-FR" dirty="0"/>
+              <a:t> job</a:t>
+            </a:r>
+          </a:p>
+          <a:p>
+            <a:r>
+              <a:rPr lang="fr-FR" dirty="0" err="1"/>
+              <a:t>Why</a:t>
+            </a:r>
+            <a:r>
+              <a:rPr lang="fr-FR" dirty="0"/>
+              <a:t> </a:t>
+            </a:r>
+            <a:r>
+              <a:rPr lang="fr-FR" dirty="0" err="1"/>
+              <a:t>am</a:t>
+            </a:r>
+            <a:r>
+              <a:rPr lang="fr-FR" dirty="0"/>
+              <a:t> I </a:t>
+            </a:r>
+            <a:r>
+              <a:rPr lang="fr-FR" dirty="0" err="1"/>
+              <a:t>want</a:t>
+            </a:r>
+            <a:r>
+              <a:rPr lang="fr-FR" dirty="0"/>
+              <a:t> to change job </a:t>
+            </a:r>
+            <a:r>
+              <a:rPr lang="fr-FR" dirty="0" err="1"/>
+              <a:t>after</a:t>
+            </a:r>
+            <a:r>
+              <a:rPr lang="fr-FR" dirty="0"/>
+              <a:t> </a:t>
+            </a:r>
+            <a:r>
+              <a:rPr lang="fr-FR" dirty="0" err="1"/>
+              <a:t>my</a:t>
+            </a:r>
+            <a:r>
+              <a:rPr lang="fr-FR" dirty="0"/>
+              <a:t> Master</a:t>
+            </a:r>
+          </a:p>
+          <a:p>
+            <a:r>
+              <a:rPr lang="fr-FR" dirty="0" err="1"/>
+              <a:t>Because</a:t>
+            </a:r>
+            <a:r>
+              <a:rPr lang="fr-FR" dirty="0"/>
+              <a:t> I </a:t>
+            </a:r>
+            <a:r>
+              <a:rPr lang="fr-FR" dirty="0" err="1"/>
+              <a:t>think</a:t>
+            </a:r>
+            <a:r>
+              <a:rPr lang="fr-FR" dirty="0"/>
+              <a:t> </a:t>
+            </a:r>
+            <a:r>
+              <a:rPr lang="fr-FR" dirty="0" err="1"/>
+              <a:t>that</a:t>
+            </a:r>
+            <a:r>
+              <a:rPr lang="fr-FR" dirty="0"/>
+              <a:t> </a:t>
+            </a:r>
+            <a:r>
+              <a:rPr lang="fr-FR" dirty="0" err="1"/>
+              <a:t>my</a:t>
+            </a:r>
+            <a:r>
+              <a:rPr lang="fr-FR" dirty="0"/>
+              <a:t> </a:t>
+            </a:r>
+            <a:r>
+              <a:rPr lang="fr-FR" dirty="0" err="1"/>
+              <a:t>dream</a:t>
+            </a:r>
+            <a:r>
+              <a:rPr lang="fr-FR" dirty="0"/>
+              <a:t> </a:t>
+            </a:r>
+            <a:r>
+              <a:rPr lang="fr-FR" dirty="0" err="1"/>
+              <a:t>was</a:t>
+            </a:r>
+            <a:r>
+              <a:rPr lang="fr-FR" dirty="0"/>
+              <a:t> to </a:t>
+            </a:r>
+            <a:r>
+              <a:rPr lang="fr-FR" dirty="0" err="1"/>
+              <a:t>worked</a:t>
+            </a:r>
+            <a:r>
+              <a:rPr lang="fr-FR" dirty="0"/>
+              <a:t> </a:t>
+            </a:r>
+            <a:r>
               <a:rPr lang="fr-FR"/>
-              <a:t>use for the AI</a:t>
-            </a:r>
+              <a:t>at Google</a:t>
+            </a:r>
+          </a:p>
+          <a:p>
             <a:endParaRPr lang="en-GB" dirty="0"/>
           </a:p>
         </p:txBody>
@@ -7619,6 +7897,90 @@
     <p:extLst>
       <p:ext uri="{BB962C8B-B14F-4D97-AF65-F5344CB8AC3E}">
         <p14:creationId xmlns:p14="http://schemas.microsoft.com/office/powerpoint/2010/main" val="1647600525"/>
+      </p:ext>
+    </p:extLst>
+  </p:cSld>
+  <p:clrMapOvr>
+    <a:masterClrMapping/>
+  </p:clrMapOvr>
+</p:notes>
+</file>
+
+<file path=ppt/notesSlides/notesSlide3.xml><?xml version="1.0" encoding="utf-8"?>
+<p:notes xmlns:a="http://schemas.openxmlformats.org/drawingml/2006/main" xmlns:r="http://schemas.openxmlformats.org/officeDocument/2006/relationships" xmlns:p="http://schemas.openxmlformats.org/presentationml/2006/main">
+  <p:cSld>
+    <p:spTree>
+      <p:nvGrpSpPr>
+        <p:cNvPr id="1" name=""/>
+        <p:cNvGrpSpPr/>
+        <p:nvPr/>
+      </p:nvGrpSpPr>
+      <p:grpSpPr>
+        <a:xfrm>
+          <a:off x="0" y="0"/>
+          <a:ext cx="0" cy="0"/>
+          <a:chOff x="0" y="0"/>
+          <a:chExt cx="0" cy="0"/>
+        </a:xfrm>
+      </p:grpSpPr>
+      <p:sp>
+        <p:nvSpPr>
+          <p:cNvPr id="2" name="Espace réservé de l'image des diapositives 1"/>
+          <p:cNvSpPr>
+            <a:spLocks noGrp="1" noRot="1" noChangeAspect="1"/>
+          </p:cNvSpPr>
+          <p:nvPr>
+            <p:ph type="sldImg"/>
+          </p:nvPr>
+        </p:nvSpPr>
+        <p:spPr/>
+      </p:sp>
+      <p:sp>
+        <p:nvSpPr>
+          <p:cNvPr id="3" name="Espace réservé des notes 2"/>
+          <p:cNvSpPr>
+            <a:spLocks noGrp="1"/>
+          </p:cNvSpPr>
+          <p:nvPr>
+            <p:ph type="body" idx="1"/>
+          </p:nvPr>
+        </p:nvSpPr>
+        <p:spPr/>
+        <p:txBody>
+          <a:bodyPr/>
+          <a:lstStyle/>
+          <a:p>
+            <a:endParaRPr lang="en-GB" dirty="0"/>
+          </a:p>
+        </p:txBody>
+      </p:sp>
+      <p:sp>
+        <p:nvSpPr>
+          <p:cNvPr id="4" name="Espace réservé du numéro de diapositive 3"/>
+          <p:cNvSpPr>
+            <a:spLocks noGrp="1"/>
+          </p:cNvSpPr>
+          <p:nvPr>
+            <p:ph type="sldNum" sz="quarter" idx="5"/>
+          </p:nvPr>
+        </p:nvSpPr>
+        <p:spPr/>
+        <p:txBody>
+          <a:bodyPr/>
+          <a:lstStyle/>
+          <a:p>
+            <a:fld id="{70E91AD3-41F0-4AF2-986E-6281E051088E}" type="slidenum">
+              <a:rPr lang="en-GB" smtClean="0"/>
+              <a:t>3</a:t>
+            </a:fld>
+            <a:endParaRPr lang="en-GB"/>
+          </a:p>
+        </p:txBody>
+      </p:sp>
+    </p:spTree>
+    <p:extLst>
+      <p:ext uri="{BB962C8B-B14F-4D97-AF65-F5344CB8AC3E}">
+        <p14:creationId xmlns:p14="http://schemas.microsoft.com/office/powerpoint/2010/main" val="1642094159"/>
       </p:ext>
     </p:extLst>
   </p:cSld>

</xml_diff>